<commit_message>
Add slides on Slurm job dependencies
</commit_message>
<xml_diff>
--- a/workflow_for_HPC.pptx
+++ b/workflow_for_HPC.pptx
@@ -5,7 +5,7 @@
     <p:sldMasterId id="2147483648" r:id="rId1"/>
   </p:sldMasterIdLst>
   <p:notesMasterIdLst>
-    <p:notesMasterId r:id="rId18"/>
+    <p:notesMasterId r:id="rId22"/>
   </p:notesMasterIdLst>
   <p:sldIdLst>
     <p:sldId id="257" r:id="rId2"/>
@@ -24,6 +24,10 @@
     <p:sldId id="366" r:id="rId15"/>
     <p:sldId id="368" r:id="rId16"/>
     <p:sldId id="369" r:id="rId17"/>
+    <p:sldId id="370" r:id="rId18"/>
+    <p:sldId id="371" r:id="rId19"/>
+    <p:sldId id="372" r:id="rId20"/>
+    <p:sldId id="373" r:id="rId21"/>
   </p:sldIdLst>
   <p:sldSz cx="12192000" cy="6858000"/>
   <p:notesSz cx="6858000" cy="9144000"/>
@@ -270,7 +274,7 @@
           <a:p>
             <a:fld id="{73883714-178E-4B15-9757-B35BA94A8683}" type="datetimeFigureOut">
               <a:rPr lang="LID4096" smtClean="0"/>
-              <a:t>01/17/2025</a:t>
+              <a:t>01/20/2025</a:t>
             </a:fld>
             <a:endParaRPr lang="LID4096"/>
           </a:p>
@@ -687,7 +691,7 @@
           <a:p>
             <a:fld id="{79C3820C-113F-44F8-B9F0-B420D49D92E2}" type="datetime1">
               <a:rPr lang="LID4096" smtClean="0"/>
-              <a:t>01/17/2025</a:t>
+              <a:t>01/20/2025</a:t>
             </a:fld>
             <a:endParaRPr lang="LID4096"/>
           </a:p>
@@ -887,7 +891,7 @@
           <a:p>
             <a:fld id="{C474BD19-3F18-48BE-A5EF-9901C12974EC}" type="datetime1">
               <a:rPr lang="LID4096" smtClean="0"/>
-              <a:t>01/17/2025</a:t>
+              <a:t>01/20/2025</a:t>
             </a:fld>
             <a:endParaRPr lang="LID4096"/>
           </a:p>
@@ -1097,7 +1101,7 @@
           <a:p>
             <a:fld id="{3D9C8965-1E65-4BA0-B000-1C71657656B0}" type="datetime1">
               <a:rPr lang="LID4096" smtClean="0"/>
-              <a:t>01/17/2025</a:t>
+              <a:t>01/20/2025</a:t>
             </a:fld>
             <a:endParaRPr lang="LID4096"/>
           </a:p>
@@ -1297,7 +1301,7 @@
           <a:p>
             <a:fld id="{359C310E-3440-4977-A384-DF7787465F0D}" type="datetime1">
               <a:rPr lang="LID4096" smtClean="0"/>
-              <a:t>01/17/2025</a:t>
+              <a:t>01/20/2025</a:t>
             </a:fld>
             <a:endParaRPr lang="LID4096"/>
           </a:p>
@@ -1573,7 +1577,7 @@
           <a:p>
             <a:fld id="{8851FFFE-D1A0-478F-95F3-0717F595E5E0}" type="datetime1">
               <a:rPr lang="LID4096" smtClean="0"/>
-              <a:t>01/17/2025</a:t>
+              <a:t>01/20/2025</a:t>
             </a:fld>
             <a:endParaRPr lang="LID4096"/>
           </a:p>
@@ -1841,7 +1845,7 @@
           <a:p>
             <a:fld id="{9893FA69-F9D8-41AB-8C89-AF67E0FE726F}" type="datetime1">
               <a:rPr lang="LID4096" smtClean="0"/>
-              <a:t>01/17/2025</a:t>
+              <a:t>01/20/2025</a:t>
             </a:fld>
             <a:endParaRPr lang="LID4096"/>
           </a:p>
@@ -2256,7 +2260,7 @@
           <a:p>
             <a:fld id="{67B3B7A2-CF30-4194-A0BB-D6BA777C4B18}" type="datetime1">
               <a:rPr lang="LID4096" smtClean="0"/>
-              <a:t>01/17/2025</a:t>
+              <a:t>01/20/2025</a:t>
             </a:fld>
             <a:endParaRPr lang="LID4096"/>
           </a:p>
@@ -2398,7 +2402,7 @@
           <a:p>
             <a:fld id="{D4841D55-DE28-40B4-BA41-94A019AE94F6}" type="datetime1">
               <a:rPr lang="LID4096" smtClean="0"/>
-              <a:t>01/17/2025</a:t>
+              <a:t>01/20/2025</a:t>
             </a:fld>
             <a:endParaRPr lang="LID4096"/>
           </a:p>
@@ -2511,7 +2515,7 @@
           <a:p>
             <a:fld id="{FC4F46A0-A4F7-48C0-B147-2A861724699B}" type="datetime1">
               <a:rPr lang="LID4096" smtClean="0"/>
-              <a:t>01/17/2025</a:t>
+              <a:t>01/20/2025</a:t>
             </a:fld>
             <a:endParaRPr lang="LID4096"/>
           </a:p>
@@ -2824,7 +2828,7 @@
           <a:p>
             <a:fld id="{9BA57A11-0A57-4413-BC99-4B1EF8D08CEB}" type="datetime1">
               <a:rPr lang="LID4096" smtClean="0"/>
-              <a:t>01/17/2025</a:t>
+              <a:t>01/20/2025</a:t>
             </a:fld>
             <a:endParaRPr lang="LID4096"/>
           </a:p>
@@ -3113,7 +3117,7 @@
           <a:p>
             <a:fld id="{C54A9F42-7F32-49F2-A831-1EC1433EAED3}" type="datetime1">
               <a:rPr lang="LID4096" smtClean="0"/>
-              <a:t>01/17/2025</a:t>
+              <a:t>01/20/2025</a:t>
             </a:fld>
             <a:endParaRPr lang="LID4096"/>
           </a:p>
@@ -3356,7 +3360,7 @@
           <a:p>
             <a:fld id="{92609726-042A-4DD3-BACB-A0E177E383BE}" type="datetime1">
               <a:rPr lang="LID4096" smtClean="0"/>
-              <a:t>01/17/2025</a:t>
+              <a:t>01/20/2025</a:t>
             </a:fld>
             <a:endParaRPr lang="LID4096"/>
           </a:p>
@@ -4685,7 +4689,9 @@
         </p:nvSpPr>
         <p:spPr/>
         <p:txBody>
-          <a:bodyPr/>
+          <a:bodyPr>
+            <a:normAutofit lnSpcReduction="10000"/>
+          </a:bodyPr>
           <a:lstStyle/>
           <a:p>
             <a:r>
@@ -4753,6 +4759,13 @@
             <a:r>
               <a:rPr lang="en-US" dirty="0"/>
               <a:t>Version control repository status check</a:t>
+            </a:r>
+          </a:p>
+          <a:p>
+            <a:pPr lvl="1"/>
+            <a:r>
+              <a:rPr lang="en-US" dirty="0"/>
+              <a:t>Process the day's data</a:t>
             </a:r>
             <a:endParaRPr lang="LID4096" dirty="0"/>
           </a:p>
@@ -7983,6 +7996,973 @@
 </p:sld>
 </file>
 
+<file path=ppt/slides/slide17.xml><?xml version="1.0" encoding="utf-8"?>
+<p:sld xmlns:a="http://schemas.openxmlformats.org/drawingml/2006/main" xmlns:r="http://schemas.openxmlformats.org/officeDocument/2006/relationships" xmlns:p="http://schemas.openxmlformats.org/presentationml/2006/main">
+  <p:cSld>
+    <p:spTree>
+      <p:nvGrpSpPr>
+        <p:cNvPr id="1" name=""/>
+        <p:cNvGrpSpPr/>
+        <p:nvPr/>
+      </p:nvGrpSpPr>
+      <p:grpSpPr>
+        <a:xfrm>
+          <a:off x="0" y="0"/>
+          <a:ext cx="0" cy="0"/>
+          <a:chOff x="0" y="0"/>
+          <a:chExt cx="0" cy="0"/>
+        </a:xfrm>
+      </p:grpSpPr>
+      <p:sp>
+        <p:nvSpPr>
+          <p:cNvPr id="2" name="Title 1">
+            <a:extLst>
+              <a:ext uri="{FF2B5EF4-FFF2-40B4-BE49-F238E27FC236}">
+                <a16:creationId xmlns:a16="http://schemas.microsoft.com/office/drawing/2014/main" id="{5936B3AE-0236-CC26-186C-B749D9478897}"/>
+              </a:ext>
+            </a:extLst>
+          </p:cNvPr>
+          <p:cNvSpPr>
+            <a:spLocks noGrp="1"/>
+          </p:cNvSpPr>
+          <p:nvPr>
+            <p:ph type="title"/>
+          </p:nvPr>
+        </p:nvSpPr>
+        <p:spPr/>
+        <p:txBody>
+          <a:bodyPr/>
+          <a:lstStyle/>
+          <a:p>
+            <a:r>
+              <a:rPr lang="en-US" dirty="0"/>
+              <a:t>Chaining jobs</a:t>
+            </a:r>
+            <a:endParaRPr lang="LID4096" dirty="0"/>
+          </a:p>
+        </p:txBody>
+      </p:sp>
+      <p:sp>
+        <p:nvSpPr>
+          <p:cNvPr id="3" name="Text Placeholder 2">
+            <a:extLst>
+              <a:ext uri="{FF2B5EF4-FFF2-40B4-BE49-F238E27FC236}">
+                <a16:creationId xmlns:a16="http://schemas.microsoft.com/office/drawing/2014/main" id="{3EB023F5-3755-61A7-A786-799A9F28B12B}"/>
+              </a:ext>
+            </a:extLst>
+          </p:cNvPr>
+          <p:cNvSpPr>
+            <a:spLocks noGrp="1"/>
+          </p:cNvSpPr>
+          <p:nvPr>
+            <p:ph type="body" idx="1"/>
+          </p:nvPr>
+        </p:nvSpPr>
+        <p:spPr/>
+        <p:txBody>
+          <a:bodyPr/>
+          <a:lstStyle/>
+          <a:p>
+            <a:endParaRPr lang="LID4096"/>
+          </a:p>
+        </p:txBody>
+      </p:sp>
+      <p:sp>
+        <p:nvSpPr>
+          <p:cNvPr id="4" name="Slide Number Placeholder 3">
+            <a:extLst>
+              <a:ext uri="{FF2B5EF4-FFF2-40B4-BE49-F238E27FC236}">
+                <a16:creationId xmlns:a16="http://schemas.microsoft.com/office/drawing/2014/main" id="{8C148330-5A33-58E5-624B-8DDBB7526EF6}"/>
+              </a:ext>
+            </a:extLst>
+          </p:cNvPr>
+          <p:cNvSpPr>
+            <a:spLocks noGrp="1"/>
+          </p:cNvSpPr>
+          <p:nvPr>
+            <p:ph type="sldNum" sz="quarter" idx="12"/>
+          </p:nvPr>
+        </p:nvSpPr>
+        <p:spPr/>
+        <p:txBody>
+          <a:bodyPr/>
+          <a:lstStyle/>
+          <a:p>
+            <a:fld id="{9C7CE217-4467-4B8D-A735-B008FA7C4816}" type="slidenum">
+              <a:rPr lang="LID4096" smtClean="0"/>
+              <a:t>17</a:t>
+            </a:fld>
+            <a:endParaRPr lang="LID4096"/>
+          </a:p>
+        </p:txBody>
+      </p:sp>
+    </p:spTree>
+    <p:extLst>
+      <p:ext uri="{BB962C8B-B14F-4D97-AF65-F5344CB8AC3E}">
+        <p14:creationId xmlns:p14="http://schemas.microsoft.com/office/powerpoint/2010/main" val="1238967585"/>
+      </p:ext>
+    </p:extLst>
+  </p:cSld>
+  <p:clrMapOvr>
+    <a:masterClrMapping/>
+  </p:clrMapOvr>
+</p:sld>
+</file>
+
+<file path=ppt/slides/slide18.xml><?xml version="1.0" encoding="utf-8"?>
+<p:sld xmlns:a="http://schemas.openxmlformats.org/drawingml/2006/main" xmlns:r="http://schemas.openxmlformats.org/officeDocument/2006/relationships" xmlns:p="http://schemas.openxmlformats.org/presentationml/2006/main">
+  <p:cSld>
+    <p:spTree>
+      <p:nvGrpSpPr>
+        <p:cNvPr id="1" name="">
+          <a:extLst>
+            <a:ext uri="{FF2B5EF4-FFF2-40B4-BE49-F238E27FC236}">
+              <a16:creationId xmlns:a16="http://schemas.microsoft.com/office/drawing/2014/main" id="{B3DA07CC-2DE1-B22D-FAFD-4E33A65EF4B9}"/>
+            </a:ext>
+          </a:extLst>
+        </p:cNvPr>
+        <p:cNvGrpSpPr/>
+        <p:nvPr/>
+      </p:nvGrpSpPr>
+      <p:grpSpPr>
+        <a:xfrm>
+          <a:off x="0" y="0"/>
+          <a:ext cx="0" cy="0"/>
+          <a:chOff x="0" y="0"/>
+          <a:chExt cx="0" cy="0"/>
+        </a:xfrm>
+      </p:grpSpPr>
+      <p:sp>
+        <p:nvSpPr>
+          <p:cNvPr id="2" name="Title 1">
+            <a:extLst>
+              <a:ext uri="{FF2B5EF4-FFF2-40B4-BE49-F238E27FC236}">
+                <a16:creationId xmlns:a16="http://schemas.microsoft.com/office/drawing/2014/main" id="{077F6D8E-94D2-24DD-4BA0-B6C0935C59A3}"/>
+              </a:ext>
+            </a:extLst>
+          </p:cNvPr>
+          <p:cNvSpPr>
+            <a:spLocks noGrp="1"/>
+          </p:cNvSpPr>
+          <p:nvPr>
+            <p:ph type="title"/>
+          </p:nvPr>
+        </p:nvSpPr>
+        <p:spPr/>
+        <p:txBody>
+          <a:bodyPr/>
+          <a:lstStyle/>
+          <a:p>
+            <a:r>
+              <a:rPr lang="en-US" dirty="0"/>
+              <a:t>Motivation</a:t>
+            </a:r>
+            <a:endParaRPr lang="LID4096" dirty="0"/>
+          </a:p>
+        </p:txBody>
+      </p:sp>
+      <p:sp>
+        <p:nvSpPr>
+          <p:cNvPr id="3" name="Content Placeholder 2">
+            <a:extLst>
+              <a:ext uri="{FF2B5EF4-FFF2-40B4-BE49-F238E27FC236}">
+                <a16:creationId xmlns:a16="http://schemas.microsoft.com/office/drawing/2014/main" id="{5C116016-5EE0-A9B2-1C7C-5CA4BE05350A}"/>
+              </a:ext>
+            </a:extLst>
+          </p:cNvPr>
+          <p:cNvSpPr>
+            <a:spLocks noGrp="1"/>
+          </p:cNvSpPr>
+          <p:nvPr>
+            <p:ph idx="1"/>
+          </p:nvPr>
+        </p:nvSpPr>
+        <p:spPr/>
+        <p:txBody>
+          <a:bodyPr>
+            <a:normAutofit/>
+          </a:bodyPr>
+          <a:lstStyle/>
+          <a:p>
+            <a:r>
+              <a:rPr lang="en-US" dirty="0"/>
+              <a:t>Characteristics</a:t>
+            </a:r>
+          </a:p>
+          <a:p>
+            <a:pPr lvl="1"/>
+            <a:r>
+              <a:rPr lang="en-US" dirty="0"/>
+              <a:t>Non-interactive</a:t>
+            </a:r>
+          </a:p>
+          <a:p>
+            <a:pPr lvl="1"/>
+            <a:r>
+              <a:rPr lang="en-US" dirty="0"/>
+              <a:t>Execute tasks with dependencies</a:t>
+            </a:r>
+          </a:p>
+          <a:p>
+            <a:pPr lvl="1"/>
+            <a:r>
+              <a:rPr lang="en-US" dirty="0"/>
+              <a:t>Potential inefficient resource usage</a:t>
+            </a:r>
+          </a:p>
+          <a:p>
+            <a:r>
+              <a:rPr lang="en-US" dirty="0"/>
+              <a:t>Use cases</a:t>
+            </a:r>
+          </a:p>
+          <a:p>
+            <a:pPr lvl="1"/>
+            <a:r>
+              <a:rPr lang="en-US" dirty="0"/>
+              <a:t>Preprocess/process/postprocess</a:t>
+            </a:r>
+          </a:p>
+          <a:p>
+            <a:pPr lvl="1"/>
+            <a:r>
+              <a:rPr lang="en-US" dirty="0"/>
+              <a:t>Aggregate results</a:t>
+            </a:r>
+          </a:p>
+        </p:txBody>
+      </p:sp>
+      <p:sp>
+        <p:nvSpPr>
+          <p:cNvPr id="4" name="Slide Number Placeholder 3">
+            <a:extLst>
+              <a:ext uri="{FF2B5EF4-FFF2-40B4-BE49-F238E27FC236}">
+                <a16:creationId xmlns:a16="http://schemas.microsoft.com/office/drawing/2014/main" id="{4E501813-7DA3-F0F2-A7C8-A8F96F0A2B09}"/>
+              </a:ext>
+            </a:extLst>
+          </p:cNvPr>
+          <p:cNvSpPr>
+            <a:spLocks noGrp="1"/>
+          </p:cNvSpPr>
+          <p:nvPr>
+            <p:ph type="sldNum" sz="quarter" idx="12"/>
+          </p:nvPr>
+        </p:nvSpPr>
+        <p:spPr/>
+        <p:txBody>
+          <a:bodyPr/>
+          <a:lstStyle/>
+          <a:p>
+            <a:fld id="{9C7CE217-4467-4B8D-A735-B008FA7C4816}" type="slidenum">
+              <a:rPr lang="LID4096" smtClean="0"/>
+              <a:t>18</a:t>
+            </a:fld>
+            <a:endParaRPr lang="LID4096"/>
+          </a:p>
+        </p:txBody>
+      </p:sp>
+    </p:spTree>
+    <p:extLst>
+      <p:ext uri="{BB962C8B-B14F-4D97-AF65-F5344CB8AC3E}">
+        <p14:creationId xmlns:p14="http://schemas.microsoft.com/office/powerpoint/2010/main" val="2304745693"/>
+      </p:ext>
+    </p:extLst>
+  </p:cSld>
+  <p:clrMapOvr>
+    <a:masterClrMapping/>
+  </p:clrMapOvr>
+</p:sld>
+</file>
+
+<file path=ppt/slides/slide19.xml><?xml version="1.0" encoding="utf-8"?>
+<p:sld xmlns:a="http://schemas.openxmlformats.org/drawingml/2006/main" xmlns:r="http://schemas.openxmlformats.org/officeDocument/2006/relationships" xmlns:p="http://schemas.openxmlformats.org/presentationml/2006/main">
+  <p:cSld>
+    <p:spTree>
+      <p:nvGrpSpPr>
+        <p:cNvPr id="1" name=""/>
+        <p:cNvGrpSpPr/>
+        <p:nvPr/>
+      </p:nvGrpSpPr>
+      <p:grpSpPr>
+        <a:xfrm>
+          <a:off x="0" y="0"/>
+          <a:ext cx="0" cy="0"/>
+          <a:chOff x="0" y="0"/>
+          <a:chExt cx="0" cy="0"/>
+        </a:xfrm>
+      </p:grpSpPr>
+      <p:sp>
+        <p:nvSpPr>
+          <p:cNvPr id="2" name="Title 1">
+            <a:extLst>
+              <a:ext uri="{FF2B5EF4-FFF2-40B4-BE49-F238E27FC236}">
+                <a16:creationId xmlns:a16="http://schemas.microsoft.com/office/drawing/2014/main" id="{AE788B11-81D0-0A3C-99E3-1B22331B7865}"/>
+              </a:ext>
+            </a:extLst>
+          </p:cNvPr>
+          <p:cNvSpPr>
+            <a:spLocks noGrp="1"/>
+          </p:cNvSpPr>
+          <p:nvPr>
+            <p:ph type="title"/>
+          </p:nvPr>
+        </p:nvSpPr>
+        <p:spPr/>
+        <p:txBody>
+          <a:bodyPr/>
+          <a:lstStyle/>
+          <a:p>
+            <a:r>
+              <a:rPr lang="en-US" dirty="0"/>
+              <a:t>Problem example</a:t>
+            </a:r>
+            <a:endParaRPr lang="LID4096" dirty="0"/>
+          </a:p>
+        </p:txBody>
+      </p:sp>
+      <p:sp>
+        <p:nvSpPr>
+          <p:cNvPr id="3" name="Slide Number Placeholder 2">
+            <a:extLst>
+              <a:ext uri="{FF2B5EF4-FFF2-40B4-BE49-F238E27FC236}">
+                <a16:creationId xmlns:a16="http://schemas.microsoft.com/office/drawing/2014/main" id="{DA4478CC-B0D4-B142-BEAB-693BABA6E88B}"/>
+              </a:ext>
+            </a:extLst>
+          </p:cNvPr>
+          <p:cNvSpPr>
+            <a:spLocks noGrp="1"/>
+          </p:cNvSpPr>
+          <p:nvPr>
+            <p:ph type="sldNum" sz="quarter" idx="12"/>
+          </p:nvPr>
+        </p:nvSpPr>
+        <p:spPr/>
+        <p:txBody>
+          <a:bodyPr/>
+          <a:lstStyle/>
+          <a:p>
+            <a:fld id="{9C7CE217-4467-4B8D-A735-B008FA7C4816}" type="slidenum">
+              <a:rPr lang="LID4096" smtClean="0"/>
+              <a:t>19</a:t>
+            </a:fld>
+            <a:endParaRPr lang="LID4096"/>
+          </a:p>
+        </p:txBody>
+      </p:sp>
+      <p:sp>
+        <p:nvSpPr>
+          <p:cNvPr id="4" name="Rectangle: Rounded Corners 3">
+            <a:extLst>
+              <a:ext uri="{FF2B5EF4-FFF2-40B4-BE49-F238E27FC236}">
+                <a16:creationId xmlns:a16="http://schemas.microsoft.com/office/drawing/2014/main" id="{79DB2582-346B-9E16-7C09-B897A8BDCB6B}"/>
+              </a:ext>
+            </a:extLst>
+          </p:cNvPr>
+          <p:cNvSpPr/>
+          <p:nvPr/>
+        </p:nvSpPr>
+        <p:spPr>
+          <a:xfrm>
+            <a:off x="1534884" y="1909310"/>
+            <a:ext cx="2264228" cy="900112"/>
+          </a:xfrm>
+          <a:prstGeom prst="roundRect">
+            <a:avLst/>
+          </a:prstGeom>
+        </p:spPr>
+        <p:style>
+          <a:lnRef idx="2">
+            <a:schemeClr val="accent1">
+              <a:shade val="15000"/>
+            </a:schemeClr>
+          </a:lnRef>
+          <a:fillRef idx="1">
+            <a:schemeClr val="accent1"/>
+          </a:fillRef>
+          <a:effectRef idx="0">
+            <a:schemeClr val="accent1"/>
+          </a:effectRef>
+          <a:fontRef idx="minor">
+            <a:schemeClr val="lt1"/>
+          </a:fontRef>
+        </p:style>
+        <p:txBody>
+          <a:bodyPr rtlCol="0" anchor="ctr"/>
+          <a:lstStyle/>
+          <a:p>
+            <a:pPr algn="ctr"/>
+            <a:r>
+              <a:rPr lang="en-US" dirty="0"/>
+              <a:t>Preprocess</a:t>
+            </a:r>
+            <a:endParaRPr lang="LID4096" dirty="0"/>
+          </a:p>
+        </p:txBody>
+      </p:sp>
+      <p:cxnSp>
+        <p:nvCxnSpPr>
+          <p:cNvPr id="6" name="Straight Arrow Connector 5">
+            <a:extLst>
+              <a:ext uri="{FF2B5EF4-FFF2-40B4-BE49-F238E27FC236}">
+                <a16:creationId xmlns:a16="http://schemas.microsoft.com/office/drawing/2014/main" id="{ABC90984-4FF8-AD9E-70D2-0F81F7D9B2E8}"/>
+              </a:ext>
+            </a:extLst>
+          </p:cNvPr>
+          <p:cNvCxnSpPr/>
+          <p:nvPr/>
+        </p:nvCxnSpPr>
+        <p:spPr>
+          <a:xfrm>
+            <a:off x="1240971" y="1611086"/>
+            <a:ext cx="0" cy="4561114"/>
+          </a:xfrm>
+          <a:prstGeom prst="straightConnector1">
+            <a:avLst/>
+          </a:prstGeom>
+          <a:ln w="28575">
+            <a:solidFill>
+              <a:schemeClr val="tx1"/>
+            </a:solidFill>
+            <a:tailEnd type="stealth" w="lg" len="lg"/>
+          </a:ln>
+        </p:spPr>
+        <p:style>
+          <a:lnRef idx="2">
+            <a:schemeClr val="accent1"/>
+          </a:lnRef>
+          <a:fillRef idx="0">
+            <a:schemeClr val="accent1"/>
+          </a:fillRef>
+          <a:effectRef idx="1">
+            <a:schemeClr val="accent1"/>
+          </a:effectRef>
+          <a:fontRef idx="minor">
+            <a:schemeClr val="tx1"/>
+          </a:fontRef>
+        </p:style>
+      </p:cxnSp>
+      <p:sp>
+        <p:nvSpPr>
+          <p:cNvPr id="8" name="TextBox 7">
+            <a:extLst>
+              <a:ext uri="{FF2B5EF4-FFF2-40B4-BE49-F238E27FC236}">
+                <a16:creationId xmlns:a16="http://schemas.microsoft.com/office/drawing/2014/main" id="{E289CAF0-D51B-8E51-5972-970D3637F89D}"/>
+              </a:ext>
+            </a:extLst>
+          </p:cNvPr>
+          <p:cNvSpPr txBox="1"/>
+          <p:nvPr/>
+        </p:nvSpPr>
+        <p:spPr>
+          <a:xfrm>
+            <a:off x="418031" y="5987018"/>
+            <a:ext cx="633507" cy="369332"/>
+          </a:xfrm>
+          <a:prstGeom prst="rect">
+            <a:avLst/>
+          </a:prstGeom>
+          <a:noFill/>
+        </p:spPr>
+        <p:txBody>
+          <a:bodyPr wrap="none" rtlCol="0">
+            <a:spAutoFit/>
+          </a:bodyPr>
+          <a:lstStyle/>
+          <a:p>
+            <a:r>
+              <a:rPr lang="en-US" dirty="0"/>
+              <a:t>time</a:t>
+            </a:r>
+            <a:endParaRPr lang="LID4096" dirty="0"/>
+          </a:p>
+        </p:txBody>
+      </p:sp>
+      <p:grpSp>
+        <p:nvGrpSpPr>
+          <p:cNvPr id="11" name="Group 10">
+            <a:extLst>
+              <a:ext uri="{FF2B5EF4-FFF2-40B4-BE49-F238E27FC236}">
+                <a16:creationId xmlns:a16="http://schemas.microsoft.com/office/drawing/2014/main" id="{5970831A-D0EB-3E11-8702-F57F9731A581}"/>
+              </a:ext>
+            </a:extLst>
+          </p:cNvPr>
+          <p:cNvGrpSpPr/>
+          <p:nvPr/>
+        </p:nvGrpSpPr>
+        <p:grpSpPr>
+          <a:xfrm>
+            <a:off x="1240971" y="1162151"/>
+            <a:ext cx="8365997" cy="448935"/>
+            <a:chOff x="1850573" y="1162151"/>
+            <a:chExt cx="8365997" cy="448935"/>
+          </a:xfrm>
+        </p:grpSpPr>
+        <p:cxnSp>
+          <p:nvCxnSpPr>
+            <p:cNvPr id="7" name="Straight Arrow Connector 6">
+              <a:extLst>
+                <a:ext uri="{FF2B5EF4-FFF2-40B4-BE49-F238E27FC236}">
+                  <a16:creationId xmlns:a16="http://schemas.microsoft.com/office/drawing/2014/main" id="{76643ECF-40E6-A240-3BDF-CEAB3FE88776}"/>
+                </a:ext>
+              </a:extLst>
+            </p:cNvPr>
+            <p:cNvCxnSpPr>
+              <a:cxnSpLocks/>
+            </p:cNvCxnSpPr>
+            <p:nvPr/>
+          </p:nvCxnSpPr>
+          <p:spPr>
+            <a:xfrm>
+              <a:off x="1850573" y="1611086"/>
+              <a:ext cx="8000998" cy="0"/>
+            </a:xfrm>
+            <a:prstGeom prst="straightConnector1">
+              <a:avLst/>
+            </a:prstGeom>
+            <a:ln w="28575">
+              <a:solidFill>
+                <a:schemeClr val="tx1"/>
+              </a:solidFill>
+              <a:tailEnd type="stealth" w="lg" len="lg"/>
+            </a:ln>
+          </p:spPr>
+          <p:style>
+            <a:lnRef idx="2">
+              <a:schemeClr val="accent1"/>
+            </a:lnRef>
+            <a:fillRef idx="0">
+              <a:schemeClr val="accent1"/>
+            </a:fillRef>
+            <a:effectRef idx="1">
+              <a:schemeClr val="accent1"/>
+            </a:effectRef>
+            <a:fontRef idx="minor">
+              <a:schemeClr val="tx1"/>
+            </a:fontRef>
+          </p:style>
+        </p:cxnSp>
+        <p:sp>
+          <p:nvSpPr>
+            <p:cNvPr id="9" name="TextBox 8">
+              <a:extLst>
+                <a:ext uri="{FF2B5EF4-FFF2-40B4-BE49-F238E27FC236}">
+                  <a16:creationId xmlns:a16="http://schemas.microsoft.com/office/drawing/2014/main" id="{4CB99526-9E4F-20A0-8EEE-3621B324C134}"/>
+                </a:ext>
+              </a:extLst>
+            </p:cNvPr>
+            <p:cNvSpPr txBox="1"/>
+            <p:nvPr/>
+          </p:nvSpPr>
+          <p:spPr>
+            <a:xfrm>
+              <a:off x="9039517" y="1162151"/>
+              <a:ext cx="1177053" cy="369332"/>
+            </a:xfrm>
+            <a:prstGeom prst="rect">
+              <a:avLst/>
+            </a:prstGeom>
+            <a:noFill/>
+          </p:spPr>
+          <p:txBody>
+            <a:bodyPr wrap="none" rtlCol="0">
+              <a:spAutoFit/>
+            </a:bodyPr>
+            <a:lstStyle/>
+            <a:p>
+              <a:r>
+                <a:rPr lang="en-US" dirty="0"/>
+                <a:t>resources</a:t>
+              </a:r>
+              <a:endParaRPr lang="LID4096" dirty="0"/>
+            </a:p>
+          </p:txBody>
+        </p:sp>
+      </p:grpSp>
+      <p:sp>
+        <p:nvSpPr>
+          <p:cNvPr id="12" name="Rectangle: Rounded Corners 11">
+            <a:extLst>
+              <a:ext uri="{FF2B5EF4-FFF2-40B4-BE49-F238E27FC236}">
+                <a16:creationId xmlns:a16="http://schemas.microsoft.com/office/drawing/2014/main" id="{6420B495-512D-D733-1B61-7CF968DB7D0F}"/>
+              </a:ext>
+            </a:extLst>
+          </p:cNvPr>
+          <p:cNvSpPr/>
+          <p:nvPr/>
+        </p:nvSpPr>
+        <p:spPr>
+          <a:xfrm>
+            <a:off x="1534884" y="2981892"/>
+            <a:ext cx="6803572" cy="1742507"/>
+          </a:xfrm>
+          <a:prstGeom prst="roundRect">
+            <a:avLst/>
+          </a:prstGeom>
+        </p:spPr>
+        <p:style>
+          <a:lnRef idx="2">
+            <a:schemeClr val="accent1">
+              <a:shade val="15000"/>
+            </a:schemeClr>
+          </a:lnRef>
+          <a:fillRef idx="1">
+            <a:schemeClr val="accent1"/>
+          </a:fillRef>
+          <a:effectRef idx="0">
+            <a:schemeClr val="accent1"/>
+          </a:effectRef>
+          <a:fontRef idx="minor">
+            <a:schemeClr val="lt1"/>
+          </a:fontRef>
+        </p:style>
+        <p:txBody>
+          <a:bodyPr rtlCol="0" anchor="ctr"/>
+          <a:lstStyle/>
+          <a:p>
+            <a:pPr algn="ctr"/>
+            <a:r>
+              <a:rPr lang="en-US" dirty="0"/>
+              <a:t>process</a:t>
+            </a:r>
+            <a:endParaRPr lang="LID4096" dirty="0"/>
+          </a:p>
+        </p:txBody>
+      </p:sp>
+      <p:sp>
+        <p:nvSpPr>
+          <p:cNvPr id="14" name="Rectangle: Rounded Corners 13">
+            <a:extLst>
+              <a:ext uri="{FF2B5EF4-FFF2-40B4-BE49-F238E27FC236}">
+                <a16:creationId xmlns:a16="http://schemas.microsoft.com/office/drawing/2014/main" id="{C0A08953-1019-78EE-B3B1-8B261EAB14D1}"/>
+              </a:ext>
+            </a:extLst>
+          </p:cNvPr>
+          <p:cNvSpPr/>
+          <p:nvPr/>
+        </p:nvSpPr>
+        <p:spPr>
+          <a:xfrm>
+            <a:off x="1534883" y="4896868"/>
+            <a:ext cx="1436913" cy="1133817"/>
+          </a:xfrm>
+          <a:prstGeom prst="roundRect">
+            <a:avLst/>
+          </a:prstGeom>
+        </p:spPr>
+        <p:style>
+          <a:lnRef idx="2">
+            <a:schemeClr val="accent1">
+              <a:shade val="15000"/>
+            </a:schemeClr>
+          </a:lnRef>
+          <a:fillRef idx="1">
+            <a:schemeClr val="accent1"/>
+          </a:fillRef>
+          <a:effectRef idx="0">
+            <a:schemeClr val="accent1"/>
+          </a:effectRef>
+          <a:fontRef idx="minor">
+            <a:schemeClr val="lt1"/>
+          </a:fontRef>
+        </p:style>
+        <p:txBody>
+          <a:bodyPr rtlCol="0" anchor="ctr"/>
+          <a:lstStyle/>
+          <a:p>
+            <a:pPr algn="ctr"/>
+            <a:r>
+              <a:rPr lang="en-US" dirty="0" err="1"/>
+              <a:t>Ppost</a:t>
+            </a:r>
+            <a:r>
+              <a:rPr lang="en-US" dirty="0"/>
+              <a:t>-preprocess</a:t>
+            </a:r>
+            <a:endParaRPr lang="LID4096" dirty="0"/>
+          </a:p>
+        </p:txBody>
+      </p:sp>
+      <p:sp>
+        <p:nvSpPr>
+          <p:cNvPr id="15" name="Rectangle 14">
+            <a:extLst>
+              <a:ext uri="{FF2B5EF4-FFF2-40B4-BE49-F238E27FC236}">
+                <a16:creationId xmlns:a16="http://schemas.microsoft.com/office/drawing/2014/main" id="{FF60ECBB-891C-5356-1255-29A304528126}"/>
+              </a:ext>
+            </a:extLst>
+          </p:cNvPr>
+          <p:cNvSpPr/>
+          <p:nvPr/>
+        </p:nvSpPr>
+        <p:spPr>
+          <a:xfrm>
+            <a:off x="3984170" y="1909310"/>
+            <a:ext cx="4354285" cy="885825"/>
+          </a:xfrm>
+          <a:prstGeom prst="rect">
+            <a:avLst/>
+          </a:prstGeom>
+          <a:pattFill prst="wdUpDiag">
+            <a:fgClr>
+              <a:srgbClr val="C00000"/>
+            </a:fgClr>
+            <a:bgClr>
+              <a:schemeClr val="bg1"/>
+            </a:bgClr>
+          </a:pattFill>
+          <a:ln>
+            <a:noFill/>
+          </a:ln>
+        </p:spPr>
+        <p:style>
+          <a:lnRef idx="2">
+            <a:schemeClr val="accent1">
+              <a:shade val="15000"/>
+            </a:schemeClr>
+          </a:lnRef>
+          <a:fillRef idx="1">
+            <a:schemeClr val="accent1"/>
+          </a:fillRef>
+          <a:effectRef idx="0">
+            <a:schemeClr val="accent1"/>
+          </a:effectRef>
+          <a:fontRef idx="minor">
+            <a:schemeClr val="lt1"/>
+          </a:fontRef>
+        </p:style>
+        <p:txBody>
+          <a:bodyPr rtlCol="0" anchor="ctr"/>
+          <a:lstStyle/>
+          <a:p>
+            <a:pPr algn="ctr"/>
+            <a:endParaRPr lang="LID4096"/>
+          </a:p>
+        </p:txBody>
+      </p:sp>
+      <p:sp>
+        <p:nvSpPr>
+          <p:cNvPr id="16" name="Rectangle 15">
+            <a:extLst>
+              <a:ext uri="{FF2B5EF4-FFF2-40B4-BE49-F238E27FC236}">
+                <a16:creationId xmlns:a16="http://schemas.microsoft.com/office/drawing/2014/main" id="{E79C912B-15B1-59BF-A713-EEC96ED89317}"/>
+              </a:ext>
+            </a:extLst>
+          </p:cNvPr>
+          <p:cNvSpPr/>
+          <p:nvPr/>
+        </p:nvSpPr>
+        <p:spPr>
+          <a:xfrm>
+            <a:off x="3145975" y="4894374"/>
+            <a:ext cx="5192468" cy="1133817"/>
+          </a:xfrm>
+          <a:prstGeom prst="rect">
+            <a:avLst/>
+          </a:prstGeom>
+          <a:pattFill prst="wdUpDiag">
+            <a:fgClr>
+              <a:srgbClr val="C00000"/>
+            </a:fgClr>
+            <a:bgClr>
+              <a:schemeClr val="bg1"/>
+            </a:bgClr>
+          </a:pattFill>
+          <a:ln>
+            <a:noFill/>
+          </a:ln>
+        </p:spPr>
+        <p:style>
+          <a:lnRef idx="2">
+            <a:schemeClr val="accent1">
+              <a:shade val="15000"/>
+            </a:schemeClr>
+          </a:lnRef>
+          <a:fillRef idx="1">
+            <a:schemeClr val="accent1"/>
+          </a:fillRef>
+          <a:effectRef idx="0">
+            <a:schemeClr val="accent1"/>
+          </a:effectRef>
+          <a:fontRef idx="minor">
+            <a:schemeClr val="lt1"/>
+          </a:fontRef>
+        </p:style>
+        <p:txBody>
+          <a:bodyPr rtlCol="0" anchor="ctr"/>
+          <a:lstStyle/>
+          <a:p>
+            <a:pPr algn="ctr"/>
+            <a:endParaRPr lang="LID4096"/>
+          </a:p>
+        </p:txBody>
+      </p:sp>
+      <p:grpSp>
+        <p:nvGrpSpPr>
+          <p:cNvPr id="24" name="Group 23">
+            <a:extLst>
+              <a:ext uri="{FF2B5EF4-FFF2-40B4-BE49-F238E27FC236}">
+                <a16:creationId xmlns:a16="http://schemas.microsoft.com/office/drawing/2014/main" id="{6AF9C100-D310-5D2F-1CF1-37097B31A359}"/>
+              </a:ext>
+            </a:extLst>
+          </p:cNvPr>
+          <p:cNvGrpSpPr/>
+          <p:nvPr/>
+        </p:nvGrpSpPr>
+        <p:grpSpPr>
+          <a:xfrm>
+            <a:off x="8518071" y="2715534"/>
+            <a:ext cx="3319481" cy="2389866"/>
+            <a:chOff x="8768442" y="2857048"/>
+            <a:chExt cx="3319481" cy="2389866"/>
+          </a:xfrm>
+        </p:grpSpPr>
+        <p:cxnSp>
+          <p:nvCxnSpPr>
+            <p:cNvPr id="18" name="Straight Arrow Connector 17">
+              <a:extLst>
+                <a:ext uri="{FF2B5EF4-FFF2-40B4-BE49-F238E27FC236}">
+                  <a16:creationId xmlns:a16="http://schemas.microsoft.com/office/drawing/2014/main" id="{20310894-512F-F3A3-240B-74FA0B4BDB34}"/>
+                </a:ext>
+              </a:extLst>
+            </p:cNvPr>
+            <p:cNvCxnSpPr>
+              <a:cxnSpLocks/>
+              <a:stCxn id="19" idx="1"/>
+            </p:cNvCxnSpPr>
+            <p:nvPr/>
+          </p:nvCxnSpPr>
+          <p:spPr>
+            <a:xfrm flipH="1" flipV="1">
+              <a:off x="8768442" y="2857048"/>
+              <a:ext cx="745187" cy="1074396"/>
+            </a:xfrm>
+            <a:prstGeom prst="straightConnector1">
+              <a:avLst/>
+            </a:prstGeom>
+            <a:ln w="28575">
+              <a:solidFill>
+                <a:schemeClr val="tx1"/>
+              </a:solidFill>
+              <a:tailEnd type="stealth" w="lg" len="lg"/>
+            </a:ln>
+          </p:spPr>
+          <p:style>
+            <a:lnRef idx="2">
+              <a:schemeClr val="accent1"/>
+            </a:lnRef>
+            <a:fillRef idx="0">
+              <a:schemeClr val="accent1"/>
+            </a:fillRef>
+            <a:effectRef idx="1">
+              <a:schemeClr val="accent1"/>
+            </a:effectRef>
+            <a:fontRef idx="minor">
+              <a:schemeClr val="tx1"/>
+            </a:fontRef>
+          </p:style>
+        </p:cxnSp>
+        <p:sp>
+          <p:nvSpPr>
+            <p:cNvPr id="19" name="TextBox 18">
+              <a:extLst>
+                <a:ext uri="{FF2B5EF4-FFF2-40B4-BE49-F238E27FC236}">
+                  <a16:creationId xmlns:a16="http://schemas.microsoft.com/office/drawing/2014/main" id="{3B00BD2D-8F78-56D9-4ECC-F839902F866A}"/>
+                </a:ext>
+              </a:extLst>
+            </p:cNvPr>
+            <p:cNvSpPr txBox="1"/>
+            <p:nvPr/>
+          </p:nvSpPr>
+          <p:spPr>
+            <a:xfrm>
+              <a:off x="9513629" y="3700611"/>
+              <a:ext cx="2574294" cy="461665"/>
+            </a:xfrm>
+            <a:prstGeom prst="rect">
+              <a:avLst/>
+            </a:prstGeom>
+            <a:solidFill>
+              <a:schemeClr val="bg1"/>
+            </a:solidFill>
+            <a:ln>
+              <a:solidFill>
+                <a:schemeClr val="tx1"/>
+              </a:solidFill>
+            </a:ln>
+          </p:spPr>
+          <p:txBody>
+            <a:bodyPr wrap="none" rtlCol="0">
+              <a:spAutoFit/>
+            </a:bodyPr>
+            <a:lstStyle/>
+            <a:p>
+              <a:r>
+                <a:rPr lang="en-US" sz="2400" dirty="0"/>
+                <a:t>Wasted resources</a:t>
+              </a:r>
+              <a:endParaRPr lang="LID4096" sz="2400" dirty="0"/>
+            </a:p>
+          </p:txBody>
+        </p:sp>
+        <p:cxnSp>
+          <p:nvCxnSpPr>
+            <p:cNvPr id="20" name="Straight Arrow Connector 19">
+              <a:extLst>
+                <a:ext uri="{FF2B5EF4-FFF2-40B4-BE49-F238E27FC236}">
+                  <a16:creationId xmlns:a16="http://schemas.microsoft.com/office/drawing/2014/main" id="{6BE1FFCA-D5FC-B90A-E87E-4F0E2393D2D9}"/>
+                </a:ext>
+              </a:extLst>
+            </p:cNvPr>
+            <p:cNvCxnSpPr>
+              <a:cxnSpLocks/>
+              <a:stCxn id="19" idx="1"/>
+            </p:cNvCxnSpPr>
+            <p:nvPr/>
+          </p:nvCxnSpPr>
+          <p:spPr>
+            <a:xfrm flipH="1">
+              <a:off x="8768442" y="3931444"/>
+              <a:ext cx="745187" cy="1315470"/>
+            </a:xfrm>
+            <a:prstGeom prst="straightConnector1">
+              <a:avLst/>
+            </a:prstGeom>
+            <a:ln w="28575">
+              <a:solidFill>
+                <a:schemeClr val="tx1"/>
+              </a:solidFill>
+              <a:tailEnd type="stealth" w="lg" len="lg"/>
+            </a:ln>
+          </p:spPr>
+          <p:style>
+            <a:lnRef idx="2">
+              <a:schemeClr val="accent1"/>
+            </a:lnRef>
+            <a:fillRef idx="0">
+              <a:schemeClr val="accent1"/>
+            </a:fillRef>
+            <a:effectRef idx="1">
+              <a:schemeClr val="accent1"/>
+            </a:effectRef>
+            <a:fontRef idx="minor">
+              <a:schemeClr val="tx1"/>
+            </a:fontRef>
+          </p:style>
+        </p:cxnSp>
+      </p:grpSp>
+    </p:spTree>
+    <p:extLst>
+      <p:ext uri="{BB962C8B-B14F-4D97-AF65-F5344CB8AC3E}">
+        <p14:creationId xmlns:p14="http://schemas.microsoft.com/office/powerpoint/2010/main" val="4232575412"/>
+      </p:ext>
+    </p:extLst>
+  </p:cSld>
+  <p:clrMapOvr>
+    <a:masterClrMapping/>
+  </p:clrMapOvr>
+</p:sld>
+</file>
+
 <file path=ppt/slides/slide2.xml><?xml version="1.0" encoding="utf-8"?>
 <p:sld xmlns:a="http://schemas.openxmlformats.org/drawingml/2006/main" xmlns:r="http://schemas.openxmlformats.org/officeDocument/2006/relationships" xmlns:p="http://schemas.openxmlformats.org/presentationml/2006/main">
   <p:cSld>
@@ -8098,6 +9078,1017 @@
     <p:extLst>
       <p:ext uri="{BB962C8B-B14F-4D97-AF65-F5344CB8AC3E}">
         <p14:creationId xmlns:p14="http://schemas.microsoft.com/office/powerpoint/2010/main" val="4231110881"/>
+      </p:ext>
+    </p:extLst>
+  </p:cSld>
+  <p:clrMapOvr>
+    <a:masterClrMapping/>
+  </p:clrMapOvr>
+</p:sld>
+</file>
+
+<file path=ppt/slides/slide20.xml><?xml version="1.0" encoding="utf-8"?>
+<p:sld xmlns:a="http://schemas.openxmlformats.org/drawingml/2006/main" xmlns:r="http://schemas.openxmlformats.org/officeDocument/2006/relationships" xmlns:p="http://schemas.openxmlformats.org/presentationml/2006/main">
+  <p:cSld>
+    <p:spTree>
+      <p:nvGrpSpPr>
+        <p:cNvPr id="1" name=""/>
+        <p:cNvGrpSpPr/>
+        <p:nvPr/>
+      </p:nvGrpSpPr>
+      <p:grpSpPr>
+        <a:xfrm>
+          <a:off x="0" y="0"/>
+          <a:ext cx="0" cy="0"/>
+          <a:chOff x="0" y="0"/>
+          <a:chExt cx="0" cy="0"/>
+        </a:xfrm>
+      </p:grpSpPr>
+      <p:sp>
+        <p:nvSpPr>
+          <p:cNvPr id="2" name="Title 1">
+            <a:extLst>
+              <a:ext uri="{FF2B5EF4-FFF2-40B4-BE49-F238E27FC236}">
+                <a16:creationId xmlns:a16="http://schemas.microsoft.com/office/drawing/2014/main" id="{363FDB0F-8069-3812-671E-150A0EBECC87}"/>
+              </a:ext>
+            </a:extLst>
+          </p:cNvPr>
+          <p:cNvSpPr>
+            <a:spLocks noGrp="1"/>
+          </p:cNvSpPr>
+          <p:nvPr>
+            <p:ph type="title"/>
+          </p:nvPr>
+        </p:nvSpPr>
+        <p:spPr/>
+        <p:txBody>
+          <a:bodyPr/>
+          <a:lstStyle/>
+          <a:p>
+            <a:r>
+              <a:rPr lang="en-US" dirty="0"/>
+              <a:t>Solution: job dependencies</a:t>
+            </a:r>
+            <a:endParaRPr lang="LID4096" dirty="0"/>
+          </a:p>
+        </p:txBody>
+      </p:sp>
+      <p:sp>
+        <p:nvSpPr>
+          <p:cNvPr id="20" name="Content Placeholder 19">
+            <a:extLst>
+              <a:ext uri="{FF2B5EF4-FFF2-40B4-BE49-F238E27FC236}">
+                <a16:creationId xmlns:a16="http://schemas.microsoft.com/office/drawing/2014/main" id="{0B95269E-5950-1D3C-4BC1-9DAD87800AF4}"/>
+              </a:ext>
+            </a:extLst>
+          </p:cNvPr>
+          <p:cNvSpPr>
+            <a:spLocks noGrp="1"/>
+          </p:cNvSpPr>
+          <p:nvPr>
+            <p:ph idx="1"/>
+          </p:nvPr>
+        </p:nvSpPr>
+        <p:spPr>
+          <a:xfrm>
+            <a:off x="5943600" y="1825625"/>
+            <a:ext cx="5410200" cy="4351338"/>
+          </a:xfrm>
+        </p:spPr>
+        <p:txBody>
+          <a:bodyPr>
+            <a:normAutofit lnSpcReduction="10000"/>
+          </a:bodyPr>
+          <a:lstStyle/>
+          <a:p>
+            <a:r>
+              <a:rPr lang="en-US" dirty="0"/>
+              <a:t>Dependency types</a:t>
+            </a:r>
+          </a:p>
+          <a:p>
+            <a:pPr lvl="1"/>
+            <a:r>
+              <a:rPr lang="en-US" dirty="0" err="1">
+                <a:latin typeface="Courier New" panose="02070309020205020404" pitchFamily="49" charset="0"/>
+                <a:cs typeface="Courier New" panose="02070309020205020404" pitchFamily="49" charset="0"/>
+              </a:rPr>
+              <a:t>afterok</a:t>
+            </a:r>
+            <a:endParaRPr lang="en-US" dirty="0">
+              <a:latin typeface="Courier New" panose="02070309020205020404" pitchFamily="49" charset="0"/>
+              <a:cs typeface="Courier New" panose="02070309020205020404" pitchFamily="49" charset="0"/>
+            </a:endParaRPr>
+          </a:p>
+          <a:p>
+            <a:pPr lvl="1"/>
+            <a:r>
+              <a:rPr lang="en-US" dirty="0" err="1">
+                <a:latin typeface="Courier New" panose="02070309020205020404" pitchFamily="49" charset="0"/>
+                <a:cs typeface="Courier New" panose="02070309020205020404" pitchFamily="49" charset="0"/>
+              </a:rPr>
+              <a:t>afternotok</a:t>
+            </a:r>
+            <a:endParaRPr lang="en-US" dirty="0">
+              <a:latin typeface="Courier New" panose="02070309020205020404" pitchFamily="49" charset="0"/>
+              <a:cs typeface="Courier New" panose="02070309020205020404" pitchFamily="49" charset="0"/>
+            </a:endParaRPr>
+          </a:p>
+          <a:p>
+            <a:pPr lvl="1"/>
+            <a:r>
+              <a:rPr lang="en-US" dirty="0" err="1">
+                <a:latin typeface="Courier New" panose="02070309020205020404" pitchFamily="49" charset="0"/>
+                <a:cs typeface="Courier New" panose="02070309020205020404" pitchFamily="49" charset="0"/>
+              </a:rPr>
+              <a:t>afterany</a:t>
+            </a:r>
+            <a:endParaRPr lang="en-US" dirty="0">
+              <a:latin typeface="Courier New" panose="02070309020205020404" pitchFamily="49" charset="0"/>
+              <a:cs typeface="Courier New" panose="02070309020205020404" pitchFamily="49" charset="0"/>
+            </a:endParaRPr>
+          </a:p>
+          <a:p>
+            <a:endParaRPr lang="en-US" dirty="0"/>
+          </a:p>
+          <a:p>
+            <a:endParaRPr lang="en-US" dirty="0"/>
+          </a:p>
+          <a:p>
+            <a:r>
+              <a:rPr lang="en-US" dirty="0"/>
+              <a:t>Depends on job ID(s)</a:t>
+            </a:r>
+          </a:p>
+          <a:p>
+            <a:r>
+              <a:rPr lang="en-US" dirty="0"/>
+              <a:t>Combinations of dependencies</a:t>
+            </a:r>
+          </a:p>
+          <a:p>
+            <a:pPr lvl="1"/>
+            <a:r>
+              <a:rPr lang="en-US" dirty="0"/>
+              <a:t>Logical and: </a:t>
+            </a:r>
+            <a:r>
+              <a:rPr lang="en-US" dirty="0">
+                <a:latin typeface="Courier New" panose="02070309020205020404" pitchFamily="49" charset="0"/>
+                <a:cs typeface="Courier New" panose="02070309020205020404" pitchFamily="49" charset="0"/>
+              </a:rPr>
+              <a:t>,</a:t>
+            </a:r>
+          </a:p>
+          <a:p>
+            <a:pPr lvl="1"/>
+            <a:r>
+              <a:rPr lang="en-US" dirty="0"/>
+              <a:t>Logical or: </a:t>
+            </a:r>
+            <a:r>
+              <a:rPr lang="en-US" dirty="0">
+                <a:latin typeface="Courier New" panose="02070309020205020404" pitchFamily="49" charset="0"/>
+                <a:cs typeface="Courier New" panose="02070309020205020404" pitchFamily="49" charset="0"/>
+              </a:rPr>
+              <a:t>?</a:t>
+            </a:r>
+            <a:endParaRPr lang="LID4096" dirty="0">
+              <a:latin typeface="Courier New" panose="02070309020205020404" pitchFamily="49" charset="0"/>
+              <a:cs typeface="Courier New" panose="02070309020205020404" pitchFamily="49" charset="0"/>
+            </a:endParaRPr>
+          </a:p>
+        </p:txBody>
+      </p:sp>
+      <p:sp>
+        <p:nvSpPr>
+          <p:cNvPr id="3" name="Slide Number Placeholder 2">
+            <a:extLst>
+              <a:ext uri="{FF2B5EF4-FFF2-40B4-BE49-F238E27FC236}">
+                <a16:creationId xmlns:a16="http://schemas.microsoft.com/office/drawing/2014/main" id="{F8281933-5B42-72E7-35D1-70A048B597C6}"/>
+              </a:ext>
+            </a:extLst>
+          </p:cNvPr>
+          <p:cNvSpPr>
+            <a:spLocks noGrp="1"/>
+          </p:cNvSpPr>
+          <p:nvPr>
+            <p:ph type="sldNum" sz="quarter" idx="12"/>
+          </p:nvPr>
+        </p:nvSpPr>
+        <p:spPr/>
+        <p:txBody>
+          <a:bodyPr/>
+          <a:lstStyle/>
+          <a:p>
+            <a:fld id="{9C7CE217-4467-4B8D-A735-B008FA7C4816}" type="slidenum">
+              <a:rPr lang="LID4096" smtClean="0"/>
+              <a:t>20</a:t>
+            </a:fld>
+            <a:endParaRPr lang="LID4096"/>
+          </a:p>
+        </p:txBody>
+      </p:sp>
+      <p:grpSp>
+        <p:nvGrpSpPr>
+          <p:cNvPr id="6" name="Group 5">
+            <a:extLst>
+              <a:ext uri="{FF2B5EF4-FFF2-40B4-BE49-F238E27FC236}">
+                <a16:creationId xmlns:a16="http://schemas.microsoft.com/office/drawing/2014/main" id="{38DF9D0B-0CD7-B3D6-D9CB-B28D81562FFD}"/>
+              </a:ext>
+            </a:extLst>
+          </p:cNvPr>
+          <p:cNvGrpSpPr/>
+          <p:nvPr/>
+        </p:nvGrpSpPr>
+        <p:grpSpPr>
+          <a:xfrm>
+            <a:off x="2579914" y="1719942"/>
+            <a:ext cx="2671156" cy="979715"/>
+            <a:chOff x="2579914" y="1719942"/>
+            <a:chExt cx="2671156" cy="979715"/>
+          </a:xfrm>
+        </p:grpSpPr>
+        <p:sp>
+          <p:nvSpPr>
+            <p:cNvPr id="4" name="Rectangle: Folded Corner 3">
+              <a:extLst>
+                <a:ext uri="{FF2B5EF4-FFF2-40B4-BE49-F238E27FC236}">
+                  <a16:creationId xmlns:a16="http://schemas.microsoft.com/office/drawing/2014/main" id="{C749EFAE-B64E-0BD0-3DBD-3F25BB161978}"/>
+                </a:ext>
+              </a:extLst>
+            </p:cNvPr>
+            <p:cNvSpPr/>
+            <p:nvPr/>
+          </p:nvSpPr>
+          <p:spPr>
+            <a:xfrm>
+              <a:off x="2579914" y="1905000"/>
+              <a:ext cx="566057" cy="794657"/>
+            </a:xfrm>
+            <a:prstGeom prst="foldedCorner">
+              <a:avLst/>
+            </a:prstGeom>
+            <a:solidFill>
+              <a:schemeClr val="bg1"/>
+            </a:solidFill>
+          </p:spPr>
+          <p:style>
+            <a:lnRef idx="2">
+              <a:schemeClr val="accent1">
+                <a:shade val="15000"/>
+              </a:schemeClr>
+            </a:lnRef>
+            <a:fillRef idx="1">
+              <a:schemeClr val="accent1"/>
+            </a:fillRef>
+            <a:effectRef idx="0">
+              <a:schemeClr val="accent1"/>
+            </a:effectRef>
+            <a:fontRef idx="minor">
+              <a:schemeClr val="lt1"/>
+            </a:fontRef>
+          </p:style>
+          <p:txBody>
+            <a:bodyPr rtlCol="0" anchor="ctr"/>
+            <a:lstStyle/>
+            <a:p>
+              <a:pPr algn="ctr"/>
+              <a:endParaRPr lang="LID4096"/>
+            </a:p>
+          </p:txBody>
+        </p:sp>
+        <p:sp>
+          <p:nvSpPr>
+            <p:cNvPr id="5" name="TextBox 4">
+              <a:extLst>
+                <a:ext uri="{FF2B5EF4-FFF2-40B4-BE49-F238E27FC236}">
+                  <a16:creationId xmlns:a16="http://schemas.microsoft.com/office/drawing/2014/main" id="{213CFD93-7C17-1A26-5B47-57AFFF802A22}"/>
+                </a:ext>
+              </a:extLst>
+            </p:cNvPr>
+            <p:cNvSpPr txBox="1"/>
+            <p:nvPr/>
+          </p:nvSpPr>
+          <p:spPr>
+            <a:xfrm>
+              <a:off x="3309256" y="1719942"/>
+              <a:ext cx="1941814" cy="369332"/>
+            </a:xfrm>
+            <a:prstGeom prst="rect">
+              <a:avLst/>
+            </a:prstGeom>
+            <a:noFill/>
+          </p:spPr>
+          <p:txBody>
+            <a:bodyPr wrap="none" rtlCol="0">
+              <a:spAutoFit/>
+            </a:bodyPr>
+            <a:lstStyle/>
+            <a:p>
+              <a:r>
+                <a:rPr lang="en-US" dirty="0" err="1"/>
+                <a:t>preprocess.slurm</a:t>
+              </a:r>
+              <a:endParaRPr lang="LID4096" dirty="0"/>
+            </a:p>
+          </p:txBody>
+        </p:sp>
+      </p:grpSp>
+      <p:grpSp>
+        <p:nvGrpSpPr>
+          <p:cNvPr id="7" name="Group 6">
+            <a:extLst>
+              <a:ext uri="{FF2B5EF4-FFF2-40B4-BE49-F238E27FC236}">
+                <a16:creationId xmlns:a16="http://schemas.microsoft.com/office/drawing/2014/main" id="{4F88950D-A427-8DED-0814-58ED7F983BA5}"/>
+              </a:ext>
+            </a:extLst>
+          </p:cNvPr>
+          <p:cNvGrpSpPr/>
+          <p:nvPr/>
+        </p:nvGrpSpPr>
+        <p:grpSpPr>
+          <a:xfrm>
+            <a:off x="2579914" y="2913969"/>
+            <a:ext cx="2345682" cy="979715"/>
+            <a:chOff x="2579914" y="1719942"/>
+            <a:chExt cx="2345682" cy="979715"/>
+          </a:xfrm>
+        </p:grpSpPr>
+        <p:sp>
+          <p:nvSpPr>
+            <p:cNvPr id="8" name="Rectangle: Folded Corner 7">
+              <a:extLst>
+                <a:ext uri="{FF2B5EF4-FFF2-40B4-BE49-F238E27FC236}">
+                  <a16:creationId xmlns:a16="http://schemas.microsoft.com/office/drawing/2014/main" id="{51E64205-080D-2D47-14BF-4F9A92C95DF4}"/>
+                </a:ext>
+              </a:extLst>
+            </p:cNvPr>
+            <p:cNvSpPr/>
+            <p:nvPr/>
+          </p:nvSpPr>
+          <p:spPr>
+            <a:xfrm>
+              <a:off x="2579914" y="1905000"/>
+              <a:ext cx="566057" cy="794657"/>
+            </a:xfrm>
+            <a:prstGeom prst="foldedCorner">
+              <a:avLst/>
+            </a:prstGeom>
+            <a:solidFill>
+              <a:schemeClr val="bg1"/>
+            </a:solidFill>
+          </p:spPr>
+          <p:style>
+            <a:lnRef idx="2">
+              <a:schemeClr val="accent1">
+                <a:shade val="15000"/>
+              </a:schemeClr>
+            </a:lnRef>
+            <a:fillRef idx="1">
+              <a:schemeClr val="accent1"/>
+            </a:fillRef>
+            <a:effectRef idx="0">
+              <a:schemeClr val="accent1"/>
+            </a:effectRef>
+            <a:fontRef idx="minor">
+              <a:schemeClr val="lt1"/>
+            </a:fontRef>
+          </p:style>
+          <p:txBody>
+            <a:bodyPr rtlCol="0" anchor="ctr"/>
+            <a:lstStyle/>
+            <a:p>
+              <a:pPr algn="ctr"/>
+              <a:endParaRPr lang="LID4096"/>
+            </a:p>
+          </p:txBody>
+        </p:sp>
+        <p:sp>
+          <p:nvSpPr>
+            <p:cNvPr id="9" name="TextBox 8">
+              <a:extLst>
+                <a:ext uri="{FF2B5EF4-FFF2-40B4-BE49-F238E27FC236}">
+                  <a16:creationId xmlns:a16="http://schemas.microsoft.com/office/drawing/2014/main" id="{720D89E0-0A93-E3EF-5AD3-4C1EB90FCF48}"/>
+                </a:ext>
+              </a:extLst>
+            </p:cNvPr>
+            <p:cNvSpPr txBox="1"/>
+            <p:nvPr/>
+          </p:nvSpPr>
+          <p:spPr>
+            <a:xfrm>
+              <a:off x="3309256" y="1719942"/>
+              <a:ext cx="1616340" cy="369332"/>
+            </a:xfrm>
+            <a:prstGeom prst="rect">
+              <a:avLst/>
+            </a:prstGeom>
+            <a:noFill/>
+          </p:spPr>
+          <p:txBody>
+            <a:bodyPr wrap="none" rtlCol="0">
+              <a:spAutoFit/>
+            </a:bodyPr>
+            <a:lstStyle/>
+            <a:p>
+              <a:r>
+                <a:rPr lang="en-US" dirty="0" err="1"/>
+                <a:t>process.slurm</a:t>
+              </a:r>
+              <a:endParaRPr lang="LID4096" dirty="0"/>
+            </a:p>
+          </p:txBody>
+        </p:sp>
+      </p:grpSp>
+      <p:grpSp>
+        <p:nvGrpSpPr>
+          <p:cNvPr id="10" name="Group 9">
+            <a:extLst>
+              <a:ext uri="{FF2B5EF4-FFF2-40B4-BE49-F238E27FC236}">
+                <a16:creationId xmlns:a16="http://schemas.microsoft.com/office/drawing/2014/main" id="{C977203D-3B5F-4DC3-B023-25DBE4909F8E}"/>
+              </a:ext>
+            </a:extLst>
+          </p:cNvPr>
+          <p:cNvGrpSpPr/>
+          <p:nvPr/>
+        </p:nvGrpSpPr>
+        <p:grpSpPr>
+          <a:xfrm>
+            <a:off x="2579914" y="4082822"/>
+            <a:ext cx="3113841" cy="979715"/>
+            <a:chOff x="2579914" y="1719942"/>
+            <a:chExt cx="3113841" cy="979715"/>
+          </a:xfrm>
+        </p:grpSpPr>
+        <p:sp>
+          <p:nvSpPr>
+            <p:cNvPr id="11" name="Rectangle: Folded Corner 10">
+              <a:extLst>
+                <a:ext uri="{FF2B5EF4-FFF2-40B4-BE49-F238E27FC236}">
+                  <a16:creationId xmlns:a16="http://schemas.microsoft.com/office/drawing/2014/main" id="{98AD105C-654C-FE4F-A57E-9A5ABF9005A5}"/>
+                </a:ext>
+              </a:extLst>
+            </p:cNvPr>
+            <p:cNvSpPr/>
+            <p:nvPr/>
+          </p:nvSpPr>
+          <p:spPr>
+            <a:xfrm>
+              <a:off x="2579914" y="1905000"/>
+              <a:ext cx="566057" cy="794657"/>
+            </a:xfrm>
+            <a:prstGeom prst="foldedCorner">
+              <a:avLst/>
+            </a:prstGeom>
+            <a:solidFill>
+              <a:schemeClr val="bg1"/>
+            </a:solidFill>
+          </p:spPr>
+          <p:style>
+            <a:lnRef idx="2">
+              <a:schemeClr val="accent1">
+                <a:shade val="15000"/>
+              </a:schemeClr>
+            </a:lnRef>
+            <a:fillRef idx="1">
+              <a:schemeClr val="accent1"/>
+            </a:fillRef>
+            <a:effectRef idx="0">
+              <a:schemeClr val="accent1"/>
+            </a:effectRef>
+            <a:fontRef idx="minor">
+              <a:schemeClr val="lt1"/>
+            </a:fontRef>
+          </p:style>
+          <p:txBody>
+            <a:bodyPr rtlCol="0" anchor="ctr"/>
+            <a:lstStyle/>
+            <a:p>
+              <a:pPr algn="ctr"/>
+              <a:endParaRPr lang="LID4096"/>
+            </a:p>
+          </p:txBody>
+        </p:sp>
+        <p:sp>
+          <p:nvSpPr>
+            <p:cNvPr id="12" name="TextBox 11">
+              <a:extLst>
+                <a:ext uri="{FF2B5EF4-FFF2-40B4-BE49-F238E27FC236}">
+                  <a16:creationId xmlns:a16="http://schemas.microsoft.com/office/drawing/2014/main" id="{A8554C5A-1A11-085F-9824-0D67990D6A1E}"/>
+                </a:ext>
+              </a:extLst>
+            </p:cNvPr>
+            <p:cNvSpPr txBox="1"/>
+            <p:nvPr/>
+          </p:nvSpPr>
+          <p:spPr>
+            <a:xfrm>
+              <a:off x="3309256" y="1719942"/>
+              <a:ext cx="2384499" cy="369332"/>
+            </a:xfrm>
+            <a:prstGeom prst="rect">
+              <a:avLst/>
+            </a:prstGeom>
+            <a:noFill/>
+          </p:spPr>
+          <p:txBody>
+            <a:bodyPr wrap="none" rtlCol="0">
+              <a:spAutoFit/>
+            </a:bodyPr>
+            <a:lstStyle/>
+            <a:p>
+              <a:r>
+                <a:rPr lang="en-US" dirty="0" err="1"/>
+                <a:t>postpreprocess.slurm</a:t>
+              </a:r>
+              <a:endParaRPr lang="LID4096" dirty="0"/>
+            </a:p>
+          </p:txBody>
+        </p:sp>
+      </p:grpSp>
+      <p:grpSp>
+        <p:nvGrpSpPr>
+          <p:cNvPr id="16" name="Group 15">
+            <a:extLst>
+              <a:ext uri="{FF2B5EF4-FFF2-40B4-BE49-F238E27FC236}">
+                <a16:creationId xmlns:a16="http://schemas.microsoft.com/office/drawing/2014/main" id="{9D16A536-9CE9-6CE1-9D2E-F48578198995}"/>
+              </a:ext>
+            </a:extLst>
+          </p:cNvPr>
+          <p:cNvGrpSpPr/>
+          <p:nvPr/>
+        </p:nvGrpSpPr>
+        <p:grpSpPr>
+          <a:xfrm>
+            <a:off x="245479" y="2234479"/>
+            <a:ext cx="2149376" cy="1023257"/>
+            <a:chOff x="245479" y="2234479"/>
+            <a:chExt cx="2149376" cy="1023257"/>
+          </a:xfrm>
+        </p:grpSpPr>
+        <p:sp>
+          <p:nvSpPr>
+            <p:cNvPr id="13" name="Arrow: Curved Left 12">
+              <a:extLst>
+                <a:ext uri="{FF2B5EF4-FFF2-40B4-BE49-F238E27FC236}">
+                  <a16:creationId xmlns:a16="http://schemas.microsoft.com/office/drawing/2014/main" id="{76155C8C-8299-D4E1-EB62-F1063C6E9132}"/>
+                </a:ext>
+              </a:extLst>
+            </p:cNvPr>
+            <p:cNvSpPr/>
+            <p:nvPr/>
+          </p:nvSpPr>
+          <p:spPr>
+            <a:xfrm flipH="1" flipV="1">
+              <a:off x="1828798" y="2234479"/>
+              <a:ext cx="566057" cy="1023257"/>
+            </a:xfrm>
+            <a:prstGeom prst="curvedLeftArrow">
+              <a:avLst/>
+            </a:prstGeom>
+            <a:solidFill>
+              <a:srgbClr val="FF0000"/>
+            </a:solidFill>
+            <a:ln>
+              <a:solidFill>
+                <a:srgbClr val="FF0000"/>
+              </a:solidFill>
+            </a:ln>
+          </p:spPr>
+          <p:style>
+            <a:lnRef idx="2">
+              <a:schemeClr val="accent1">
+                <a:shade val="15000"/>
+              </a:schemeClr>
+            </a:lnRef>
+            <a:fillRef idx="1">
+              <a:schemeClr val="accent1"/>
+            </a:fillRef>
+            <a:effectRef idx="0">
+              <a:schemeClr val="accent1"/>
+            </a:effectRef>
+            <a:fontRef idx="minor">
+              <a:schemeClr val="lt1"/>
+            </a:fontRef>
+          </p:style>
+          <p:txBody>
+            <a:bodyPr rtlCol="0" anchor="ctr"/>
+            <a:lstStyle/>
+            <a:p>
+              <a:pPr algn="ctr"/>
+              <a:endParaRPr lang="LID4096" b="1">
+                <a:ln w="22225">
+                  <a:solidFill>
+                    <a:schemeClr val="accent2"/>
+                  </a:solidFill>
+                  <a:prstDash val="solid"/>
+                </a:ln>
+                <a:solidFill>
+                  <a:schemeClr val="accent2">
+                    <a:lumMod val="40000"/>
+                    <a:lumOff val="60000"/>
+                  </a:schemeClr>
+                </a:solidFill>
+              </a:endParaRPr>
+            </a:p>
+          </p:txBody>
+        </p:sp>
+        <p:sp>
+          <p:nvSpPr>
+            <p:cNvPr id="15" name="TextBox 14">
+              <a:extLst>
+                <a:ext uri="{FF2B5EF4-FFF2-40B4-BE49-F238E27FC236}">
+                  <a16:creationId xmlns:a16="http://schemas.microsoft.com/office/drawing/2014/main" id="{BE4A77B0-4D22-30D2-EA8E-7BC2F11D7CBF}"/>
+                </a:ext>
+              </a:extLst>
+            </p:cNvPr>
+            <p:cNvSpPr txBox="1"/>
+            <p:nvPr/>
+          </p:nvSpPr>
+          <p:spPr>
+            <a:xfrm>
+              <a:off x="245479" y="2609952"/>
+              <a:ext cx="1418402" cy="369332"/>
+            </a:xfrm>
+            <a:prstGeom prst="rect">
+              <a:avLst/>
+            </a:prstGeom>
+            <a:noFill/>
+          </p:spPr>
+          <p:txBody>
+            <a:bodyPr wrap="none" rtlCol="0">
+              <a:spAutoFit/>
+            </a:bodyPr>
+            <a:lstStyle/>
+            <a:p>
+              <a:r>
+                <a:rPr lang="en-US" dirty="0">
+                  <a:solidFill>
+                    <a:srgbClr val="FF0000"/>
+                  </a:solidFill>
+                </a:rPr>
+                <a:t>dependency</a:t>
+              </a:r>
+              <a:endParaRPr lang="LID4096" dirty="0">
+                <a:solidFill>
+                  <a:srgbClr val="FF0000"/>
+                </a:solidFill>
+              </a:endParaRPr>
+            </a:p>
+          </p:txBody>
+        </p:sp>
+      </p:grpSp>
+      <p:grpSp>
+        <p:nvGrpSpPr>
+          <p:cNvPr id="17" name="Group 16">
+            <a:extLst>
+              <a:ext uri="{FF2B5EF4-FFF2-40B4-BE49-F238E27FC236}">
+                <a16:creationId xmlns:a16="http://schemas.microsoft.com/office/drawing/2014/main" id="{C1613D8D-A66B-2C5D-F6ED-C7CFE460F38B}"/>
+              </a:ext>
+            </a:extLst>
+          </p:cNvPr>
+          <p:cNvGrpSpPr/>
+          <p:nvPr/>
+        </p:nvGrpSpPr>
+        <p:grpSpPr>
+          <a:xfrm>
+            <a:off x="267253" y="3382055"/>
+            <a:ext cx="2149376" cy="1023257"/>
+            <a:chOff x="245479" y="2234479"/>
+            <a:chExt cx="2149376" cy="1023257"/>
+          </a:xfrm>
+        </p:grpSpPr>
+        <p:sp>
+          <p:nvSpPr>
+            <p:cNvPr id="18" name="Arrow: Curved Left 17">
+              <a:extLst>
+                <a:ext uri="{FF2B5EF4-FFF2-40B4-BE49-F238E27FC236}">
+                  <a16:creationId xmlns:a16="http://schemas.microsoft.com/office/drawing/2014/main" id="{69563A28-7C51-C715-A262-49E7DBC2209F}"/>
+                </a:ext>
+              </a:extLst>
+            </p:cNvPr>
+            <p:cNvSpPr/>
+            <p:nvPr/>
+          </p:nvSpPr>
+          <p:spPr>
+            <a:xfrm flipH="1" flipV="1">
+              <a:off x="1828798" y="2234479"/>
+              <a:ext cx="566057" cy="1023257"/>
+            </a:xfrm>
+            <a:prstGeom prst="curvedLeftArrow">
+              <a:avLst/>
+            </a:prstGeom>
+            <a:solidFill>
+              <a:srgbClr val="FF0000"/>
+            </a:solidFill>
+            <a:ln>
+              <a:solidFill>
+                <a:srgbClr val="FF0000"/>
+              </a:solidFill>
+            </a:ln>
+          </p:spPr>
+          <p:style>
+            <a:lnRef idx="2">
+              <a:schemeClr val="accent1">
+                <a:shade val="15000"/>
+              </a:schemeClr>
+            </a:lnRef>
+            <a:fillRef idx="1">
+              <a:schemeClr val="accent1"/>
+            </a:fillRef>
+            <a:effectRef idx="0">
+              <a:schemeClr val="accent1"/>
+            </a:effectRef>
+            <a:fontRef idx="minor">
+              <a:schemeClr val="lt1"/>
+            </a:fontRef>
+          </p:style>
+          <p:txBody>
+            <a:bodyPr rtlCol="0" anchor="ctr"/>
+            <a:lstStyle/>
+            <a:p>
+              <a:pPr algn="ctr"/>
+              <a:endParaRPr lang="LID4096" b="1">
+                <a:ln w="22225">
+                  <a:solidFill>
+                    <a:schemeClr val="accent2"/>
+                  </a:solidFill>
+                  <a:prstDash val="solid"/>
+                </a:ln>
+                <a:solidFill>
+                  <a:schemeClr val="accent2">
+                    <a:lumMod val="40000"/>
+                    <a:lumOff val="60000"/>
+                  </a:schemeClr>
+                </a:solidFill>
+              </a:endParaRPr>
+            </a:p>
+          </p:txBody>
+        </p:sp>
+        <p:sp>
+          <p:nvSpPr>
+            <p:cNvPr id="19" name="TextBox 18">
+              <a:extLst>
+                <a:ext uri="{FF2B5EF4-FFF2-40B4-BE49-F238E27FC236}">
+                  <a16:creationId xmlns:a16="http://schemas.microsoft.com/office/drawing/2014/main" id="{9DA135BE-C91B-F581-D290-95F92F9EB3BB}"/>
+                </a:ext>
+              </a:extLst>
+            </p:cNvPr>
+            <p:cNvSpPr txBox="1"/>
+            <p:nvPr/>
+          </p:nvSpPr>
+          <p:spPr>
+            <a:xfrm>
+              <a:off x="245479" y="2609952"/>
+              <a:ext cx="1418402" cy="369332"/>
+            </a:xfrm>
+            <a:prstGeom prst="rect">
+              <a:avLst/>
+            </a:prstGeom>
+            <a:noFill/>
+          </p:spPr>
+          <p:txBody>
+            <a:bodyPr wrap="none" rtlCol="0">
+              <a:spAutoFit/>
+            </a:bodyPr>
+            <a:lstStyle/>
+            <a:p>
+              <a:r>
+                <a:rPr lang="en-US" dirty="0">
+                  <a:solidFill>
+                    <a:srgbClr val="FF0000"/>
+                  </a:solidFill>
+                </a:rPr>
+                <a:t>dependency</a:t>
+              </a:r>
+              <a:endParaRPr lang="LID4096" dirty="0">
+                <a:solidFill>
+                  <a:srgbClr val="FF0000"/>
+                </a:solidFill>
+              </a:endParaRPr>
+            </a:p>
+          </p:txBody>
+        </p:sp>
+      </p:grpSp>
+      <p:grpSp>
+        <p:nvGrpSpPr>
+          <p:cNvPr id="21" name="Group 20">
+            <a:extLst>
+              <a:ext uri="{FF2B5EF4-FFF2-40B4-BE49-F238E27FC236}">
+                <a16:creationId xmlns:a16="http://schemas.microsoft.com/office/drawing/2014/main" id="{F8DDDF41-D713-AA72-79A2-48E28889C63A}"/>
+              </a:ext>
+            </a:extLst>
+          </p:cNvPr>
+          <p:cNvGrpSpPr/>
+          <p:nvPr/>
+        </p:nvGrpSpPr>
+        <p:grpSpPr>
+          <a:xfrm>
+            <a:off x="6919877" y="2833857"/>
+            <a:ext cx="4558508" cy="1108337"/>
+            <a:chOff x="2162820" y="5421283"/>
+            <a:chExt cx="4558508" cy="1108337"/>
+          </a:xfrm>
+        </p:grpSpPr>
+        <p:sp>
+          <p:nvSpPr>
+            <p:cNvPr id="22" name="TextBox 21">
+              <a:extLst>
+                <a:ext uri="{FF2B5EF4-FFF2-40B4-BE49-F238E27FC236}">
+                  <a16:creationId xmlns:a16="http://schemas.microsoft.com/office/drawing/2014/main" id="{3C2AEF1D-4CA2-389B-931C-AABCF29046CE}"/>
+                </a:ext>
+              </a:extLst>
+            </p:cNvPr>
+            <p:cNvSpPr txBox="1"/>
+            <p:nvPr/>
+          </p:nvSpPr>
+          <p:spPr>
+            <a:xfrm>
+              <a:off x="2162820" y="6006400"/>
+              <a:ext cx="4112280" cy="523220"/>
+            </a:xfrm>
+            <a:prstGeom prst="rect">
+              <a:avLst/>
+            </a:prstGeom>
+            <a:noFill/>
+            <a:ln>
+              <a:solidFill>
+                <a:schemeClr val="tx1"/>
+              </a:solidFill>
+            </a:ln>
+          </p:spPr>
+          <p:txBody>
+            <a:bodyPr wrap="none" rtlCol="0">
+              <a:spAutoFit/>
+            </a:bodyPr>
+            <a:lstStyle/>
+            <a:p>
+              <a:r>
+                <a:rPr lang="en-US" sz="2800" dirty="0"/>
+                <a:t>Determined by exit status</a:t>
+              </a:r>
+              <a:endParaRPr lang="LID4096" sz="2800" dirty="0"/>
+            </a:p>
+          </p:txBody>
+        </p:sp>
+        <p:pic>
+          <p:nvPicPr>
+            <p:cNvPr id="23" name="Picture 2" descr="C:\Users\lucg5005\AppData\Local\Microsoft\Windows\Temporary Internet Files\Content.IE5\CWZUAEH4\lgi01a201309290600[1].jpg">
+              <a:extLst>
+                <a:ext uri="{FF2B5EF4-FFF2-40B4-BE49-F238E27FC236}">
+                  <a16:creationId xmlns:a16="http://schemas.microsoft.com/office/drawing/2014/main" id="{99126C30-1226-C50F-46F6-EEFF97C972FB}"/>
+                </a:ext>
+              </a:extLst>
+            </p:cNvPr>
+            <p:cNvPicPr>
+              <a:picLocks noChangeAspect="1" noChangeArrowheads="1"/>
+            </p:cNvPicPr>
+            <p:nvPr/>
+          </p:nvPicPr>
+          <p:blipFill>
+            <a:blip r:embed="rId2" cstate="print">
+              <a:extLst>
+                <a:ext uri="{28A0092B-C50C-407E-A947-70E740481C1C}">
+                  <a14:useLocalDpi xmlns:a14="http://schemas.microsoft.com/office/drawing/2010/main" val="0"/>
+                </a:ext>
+              </a:extLst>
+            </a:blip>
+            <a:srcRect/>
+            <a:stretch>
+              <a:fillRect/>
+            </a:stretch>
+          </p:blipFill>
+          <p:spPr bwMode="auto">
+            <a:xfrm>
+              <a:off x="5990273" y="5421283"/>
+              <a:ext cx="731055" cy="750110"/>
+            </a:xfrm>
+            <a:prstGeom prst="rect">
+              <a:avLst/>
+            </a:prstGeom>
+            <a:noFill/>
+            <a:extLst>
+              <a:ext uri="{909E8E84-426E-40DD-AFC4-6F175D3DCCD1}">
+                <a14:hiddenFill xmlns:a14="http://schemas.microsoft.com/office/drawing/2010/main">
+                  <a:solidFill>
+                    <a:srgbClr val="FFFFFF"/>
+                  </a:solidFill>
+                </a14:hiddenFill>
+              </a:ext>
+            </a:extLst>
+          </p:spPr>
+        </p:pic>
+      </p:grpSp>
+      <p:grpSp>
+        <p:nvGrpSpPr>
+          <p:cNvPr id="26" name="Group 25">
+            <a:extLst>
+              <a:ext uri="{FF2B5EF4-FFF2-40B4-BE49-F238E27FC236}">
+                <a16:creationId xmlns:a16="http://schemas.microsoft.com/office/drawing/2014/main" id="{772C266B-DB7D-138B-00A8-03DCE4C4A31A}"/>
+              </a:ext>
+            </a:extLst>
+          </p:cNvPr>
+          <p:cNvGrpSpPr/>
+          <p:nvPr/>
+        </p:nvGrpSpPr>
+        <p:grpSpPr>
+          <a:xfrm>
+            <a:off x="1312728" y="5139094"/>
+            <a:ext cx="3666485" cy="1268712"/>
+            <a:chOff x="1084992" y="5452763"/>
+            <a:chExt cx="3666485" cy="1268712"/>
+          </a:xfrm>
+        </p:grpSpPr>
+        <p:pic>
+          <p:nvPicPr>
+            <p:cNvPr id="24" name="Graphic 23" descr="Thumbs up sign with solid fill">
+              <a:extLst>
+                <a:ext uri="{FF2B5EF4-FFF2-40B4-BE49-F238E27FC236}">
+                  <a16:creationId xmlns:a16="http://schemas.microsoft.com/office/drawing/2014/main" id="{0A9F7319-B0DD-259E-E4A6-80773051C67D}"/>
+                </a:ext>
+              </a:extLst>
+            </p:cNvPr>
+            <p:cNvPicPr>
+              <a:picLocks noChangeAspect="1"/>
+            </p:cNvPicPr>
+            <p:nvPr/>
+          </p:nvPicPr>
+          <p:blipFill>
+            <a:blip r:embed="rId3">
+              <a:extLst>
+                <a:ext uri="{96DAC541-7B7A-43D3-8B79-37D633B846F1}">
+                  <asvg:svgBlip xmlns:asvg="http://schemas.microsoft.com/office/drawing/2016/SVG/main" r:embed="rId4"/>
+                </a:ext>
+              </a:extLst>
+            </a:blip>
+            <a:stretch>
+              <a:fillRect/>
+            </a:stretch>
+          </p:blipFill>
+          <p:spPr>
+            <a:xfrm>
+              <a:off x="4027277" y="5452763"/>
+              <a:ext cx="724200" cy="724200"/>
+            </a:xfrm>
+            <a:prstGeom prst="rect">
+              <a:avLst/>
+            </a:prstGeom>
+          </p:spPr>
+        </p:pic>
+        <p:sp>
+          <p:nvSpPr>
+            <p:cNvPr id="25" name="TextBox 24">
+              <a:extLst>
+                <a:ext uri="{FF2B5EF4-FFF2-40B4-BE49-F238E27FC236}">
+                  <a16:creationId xmlns:a16="http://schemas.microsoft.com/office/drawing/2014/main" id="{5DD478A5-AE5D-BA90-C742-3B78EB089EAE}"/>
+                </a:ext>
+              </a:extLst>
+            </p:cNvPr>
+            <p:cNvSpPr txBox="1"/>
+            <p:nvPr/>
+          </p:nvSpPr>
+          <p:spPr>
+            <a:xfrm>
+              <a:off x="1084992" y="5890478"/>
+              <a:ext cx="3459793" cy="830997"/>
+            </a:xfrm>
+            <a:prstGeom prst="rect">
+              <a:avLst/>
+            </a:prstGeom>
+            <a:noFill/>
+            <a:ln>
+              <a:solidFill>
+                <a:schemeClr val="tx1"/>
+              </a:solidFill>
+            </a:ln>
+          </p:spPr>
+          <p:txBody>
+            <a:bodyPr wrap="none" rtlCol="0">
+              <a:spAutoFit/>
+            </a:bodyPr>
+            <a:lstStyle/>
+            <a:p>
+              <a:r>
+                <a:rPr lang="en-US" sz="2400" dirty="0"/>
+                <a:t>Jobs accrue priority,</a:t>
+              </a:r>
+              <a:br>
+                <a:rPr lang="en-US" sz="2400" dirty="0"/>
+              </a:br>
+              <a:r>
+                <a:rPr lang="en-US" sz="2400" dirty="0"/>
+                <a:t>start as soon as possible</a:t>
+              </a:r>
+              <a:endParaRPr lang="LID4096" sz="2400" dirty="0"/>
+            </a:p>
+          </p:txBody>
+        </p:sp>
+      </p:grpSp>
+    </p:spTree>
+    <p:extLst>
+      <p:ext uri="{BB962C8B-B14F-4D97-AF65-F5344CB8AC3E}">
+        <p14:creationId xmlns:p14="http://schemas.microsoft.com/office/powerpoint/2010/main" val="1512476624"/>
       </p:ext>
     </p:extLst>
   </p:cSld>

</xml_diff>

<commit_message>
Add submission of jobs with dependencies
</commit_message>
<xml_diff>
--- a/workflow_for_HPC.pptx
+++ b/workflow_for_HPC.pptx
@@ -5,7 +5,7 @@
     <p:sldMasterId id="2147483648" r:id="rId1"/>
   </p:sldMasterIdLst>
   <p:notesMasterIdLst>
-    <p:notesMasterId r:id="rId22"/>
+    <p:notesMasterId r:id="rId23"/>
   </p:notesMasterIdLst>
   <p:sldIdLst>
     <p:sldId id="257" r:id="rId2"/>
@@ -28,6 +28,7 @@
     <p:sldId id="371" r:id="rId19"/>
     <p:sldId id="372" r:id="rId20"/>
     <p:sldId id="373" r:id="rId21"/>
+    <p:sldId id="374" r:id="rId22"/>
   </p:sldIdLst>
   <p:sldSz cx="12192000" cy="6858000"/>
   <p:notesSz cx="6858000" cy="9144000"/>
@@ -274,7 +275,7 @@
           <a:p>
             <a:fld id="{73883714-178E-4B15-9757-B35BA94A8683}" type="datetimeFigureOut">
               <a:rPr lang="LID4096" smtClean="0"/>
-              <a:t>01/20/2025</a:t>
+              <a:t>01/21/2025</a:t>
             </a:fld>
             <a:endParaRPr lang="LID4096"/>
           </a:p>
@@ -691,7 +692,7 @@
           <a:p>
             <a:fld id="{79C3820C-113F-44F8-B9F0-B420D49D92E2}" type="datetime1">
               <a:rPr lang="LID4096" smtClean="0"/>
-              <a:t>01/20/2025</a:t>
+              <a:t>01/21/2025</a:t>
             </a:fld>
             <a:endParaRPr lang="LID4096"/>
           </a:p>
@@ -891,7 +892,7 @@
           <a:p>
             <a:fld id="{C474BD19-3F18-48BE-A5EF-9901C12974EC}" type="datetime1">
               <a:rPr lang="LID4096" smtClean="0"/>
-              <a:t>01/20/2025</a:t>
+              <a:t>01/21/2025</a:t>
             </a:fld>
             <a:endParaRPr lang="LID4096"/>
           </a:p>
@@ -1101,7 +1102,7 @@
           <a:p>
             <a:fld id="{3D9C8965-1E65-4BA0-B000-1C71657656B0}" type="datetime1">
               <a:rPr lang="LID4096" smtClean="0"/>
-              <a:t>01/20/2025</a:t>
+              <a:t>01/21/2025</a:t>
             </a:fld>
             <a:endParaRPr lang="LID4096"/>
           </a:p>
@@ -1301,7 +1302,7 @@
           <a:p>
             <a:fld id="{359C310E-3440-4977-A384-DF7787465F0D}" type="datetime1">
               <a:rPr lang="LID4096" smtClean="0"/>
-              <a:t>01/20/2025</a:t>
+              <a:t>01/21/2025</a:t>
             </a:fld>
             <a:endParaRPr lang="LID4096"/>
           </a:p>
@@ -1577,7 +1578,7 @@
           <a:p>
             <a:fld id="{8851FFFE-D1A0-478F-95F3-0717F595E5E0}" type="datetime1">
               <a:rPr lang="LID4096" smtClean="0"/>
-              <a:t>01/20/2025</a:t>
+              <a:t>01/21/2025</a:t>
             </a:fld>
             <a:endParaRPr lang="LID4096"/>
           </a:p>
@@ -1845,7 +1846,7 @@
           <a:p>
             <a:fld id="{9893FA69-F9D8-41AB-8C89-AF67E0FE726F}" type="datetime1">
               <a:rPr lang="LID4096" smtClean="0"/>
-              <a:t>01/20/2025</a:t>
+              <a:t>01/21/2025</a:t>
             </a:fld>
             <a:endParaRPr lang="LID4096"/>
           </a:p>
@@ -2260,7 +2261,7 @@
           <a:p>
             <a:fld id="{67B3B7A2-CF30-4194-A0BB-D6BA777C4B18}" type="datetime1">
               <a:rPr lang="LID4096" smtClean="0"/>
-              <a:t>01/20/2025</a:t>
+              <a:t>01/21/2025</a:t>
             </a:fld>
             <a:endParaRPr lang="LID4096"/>
           </a:p>
@@ -2402,7 +2403,7 @@
           <a:p>
             <a:fld id="{D4841D55-DE28-40B4-BA41-94A019AE94F6}" type="datetime1">
               <a:rPr lang="LID4096" smtClean="0"/>
-              <a:t>01/20/2025</a:t>
+              <a:t>01/21/2025</a:t>
             </a:fld>
             <a:endParaRPr lang="LID4096"/>
           </a:p>
@@ -2515,7 +2516,7 @@
           <a:p>
             <a:fld id="{FC4F46A0-A4F7-48C0-B147-2A861724699B}" type="datetime1">
               <a:rPr lang="LID4096" smtClean="0"/>
-              <a:t>01/20/2025</a:t>
+              <a:t>01/21/2025</a:t>
             </a:fld>
             <a:endParaRPr lang="LID4096"/>
           </a:p>
@@ -2828,7 +2829,7 @@
           <a:p>
             <a:fld id="{9BA57A11-0A57-4413-BC99-4B1EF8D08CEB}" type="datetime1">
               <a:rPr lang="LID4096" smtClean="0"/>
-              <a:t>01/20/2025</a:t>
+              <a:t>01/21/2025</a:t>
             </a:fld>
             <a:endParaRPr lang="LID4096"/>
           </a:p>
@@ -3117,7 +3118,7 @@
           <a:p>
             <a:fld id="{C54A9F42-7F32-49F2-A831-1EC1433EAED3}" type="datetime1">
               <a:rPr lang="LID4096" smtClean="0"/>
-              <a:t>01/20/2025</a:t>
+              <a:t>01/21/2025</a:t>
             </a:fld>
             <a:endParaRPr lang="LID4096"/>
           </a:p>
@@ -3360,7 +3361,7 @@
           <a:p>
             <a:fld id="{92609726-042A-4DD3-BACB-A0E177E383BE}" type="datetime1">
               <a:rPr lang="LID4096" smtClean="0"/>
-              <a:t>01/20/2025</a:t>
+              <a:t>01/21/2025</a:t>
             </a:fld>
             <a:endParaRPr lang="LID4096"/>
           </a:p>
@@ -10095,6 +10096,653 @@
   <p:clrMapOvr>
     <a:masterClrMapping/>
   </p:clrMapOvr>
+</p:sld>
+</file>
+
+<file path=ppt/slides/slide21.xml><?xml version="1.0" encoding="utf-8"?>
+<p:sld xmlns:a="http://schemas.openxmlformats.org/drawingml/2006/main" xmlns:r="http://schemas.openxmlformats.org/officeDocument/2006/relationships" xmlns:p="http://schemas.openxmlformats.org/presentationml/2006/main">
+  <p:cSld>
+    <p:spTree>
+      <p:nvGrpSpPr>
+        <p:cNvPr id="1" name=""/>
+        <p:cNvGrpSpPr/>
+        <p:nvPr/>
+      </p:nvGrpSpPr>
+      <p:grpSpPr>
+        <a:xfrm>
+          <a:off x="0" y="0"/>
+          <a:ext cx="0" cy="0"/>
+          <a:chOff x="0" y="0"/>
+          <a:chExt cx="0" cy="0"/>
+        </a:xfrm>
+      </p:grpSpPr>
+      <p:sp>
+        <p:nvSpPr>
+          <p:cNvPr id="2" name="Title 1">
+            <a:extLst>
+              <a:ext uri="{FF2B5EF4-FFF2-40B4-BE49-F238E27FC236}">
+                <a16:creationId xmlns:a16="http://schemas.microsoft.com/office/drawing/2014/main" id="{DC6094B8-AB17-638E-64C2-9C90917018D6}"/>
+              </a:ext>
+            </a:extLst>
+          </p:cNvPr>
+          <p:cNvSpPr>
+            <a:spLocks noGrp="1"/>
+          </p:cNvSpPr>
+          <p:nvPr>
+            <p:ph type="title"/>
+          </p:nvPr>
+        </p:nvSpPr>
+        <p:spPr/>
+        <p:txBody>
+          <a:bodyPr/>
+          <a:lstStyle/>
+          <a:p>
+            <a:r>
+              <a:rPr lang="en-US" dirty="0"/>
+              <a:t>Submit workflow</a:t>
+            </a:r>
+            <a:endParaRPr lang="LID4096" dirty="0"/>
+          </a:p>
+        </p:txBody>
+      </p:sp>
+      <p:sp>
+        <p:nvSpPr>
+          <p:cNvPr id="3" name="Slide Number Placeholder 2">
+            <a:extLst>
+              <a:ext uri="{FF2B5EF4-FFF2-40B4-BE49-F238E27FC236}">
+                <a16:creationId xmlns:a16="http://schemas.microsoft.com/office/drawing/2014/main" id="{0825A4AD-9087-A0B3-77BA-A2673DC89E47}"/>
+              </a:ext>
+            </a:extLst>
+          </p:cNvPr>
+          <p:cNvSpPr>
+            <a:spLocks noGrp="1"/>
+          </p:cNvSpPr>
+          <p:nvPr>
+            <p:ph type="sldNum" sz="quarter" idx="12"/>
+          </p:nvPr>
+        </p:nvSpPr>
+        <p:spPr/>
+        <p:txBody>
+          <a:bodyPr/>
+          <a:lstStyle/>
+          <a:p>
+            <a:fld id="{9C7CE217-4467-4B8D-A735-B008FA7C4816}" type="slidenum">
+              <a:rPr lang="LID4096" smtClean="0"/>
+              <a:t>21</a:t>
+            </a:fld>
+            <a:endParaRPr lang="LID4096"/>
+          </a:p>
+        </p:txBody>
+      </p:sp>
+      <p:sp>
+        <p:nvSpPr>
+          <p:cNvPr id="4" name="TextBox 3">
+            <a:extLst>
+              <a:ext uri="{FF2B5EF4-FFF2-40B4-BE49-F238E27FC236}">
+                <a16:creationId xmlns:a16="http://schemas.microsoft.com/office/drawing/2014/main" id="{199A9222-54B4-5257-23F0-F432D0652B70}"/>
+              </a:ext>
+            </a:extLst>
+          </p:cNvPr>
+          <p:cNvSpPr txBox="1"/>
+          <p:nvPr/>
+        </p:nvSpPr>
+        <p:spPr>
+          <a:xfrm>
+            <a:off x="275722" y="1794898"/>
+            <a:ext cx="11626901" cy="1477328"/>
+          </a:xfrm>
+          <a:prstGeom prst="rect">
+            <a:avLst/>
+          </a:prstGeom>
+          <a:solidFill>
+            <a:schemeClr val="tx1"/>
+          </a:solidFill>
+          <a:ln>
+            <a:solidFill>
+              <a:schemeClr val="tx1"/>
+            </a:solidFill>
+          </a:ln>
+        </p:spPr>
+        <p:txBody>
+          <a:bodyPr wrap="none" rtlCol="0">
+            <a:spAutoFit/>
+          </a:bodyPr>
+          <a:lstStyle/>
+          <a:p>
+            <a:r>
+              <a:rPr lang="en-US" b="1" dirty="0">
+                <a:solidFill>
+                  <a:schemeClr val="bg1"/>
+                </a:solidFill>
+                <a:latin typeface="Courier New" pitchFamily="49" charset="0"/>
+                <a:cs typeface="Courier New" pitchFamily="49" charset="0"/>
+              </a:rPr>
+              <a:t>$ </a:t>
+            </a:r>
+            <a:r>
+              <a:rPr lang="en-US" b="1" dirty="0">
+                <a:solidFill>
+                  <a:srgbClr val="FFC000"/>
+                </a:solidFill>
+                <a:latin typeface="Courier New" pitchFamily="49" charset="0"/>
+                <a:cs typeface="Courier New" pitchFamily="49" charset="0"/>
+              </a:rPr>
+              <a:t>PRE_ID</a:t>
+            </a:r>
+            <a:r>
+              <a:rPr lang="en-US" b="1" dirty="0">
+                <a:solidFill>
+                  <a:schemeClr val="bg1"/>
+                </a:solidFill>
+                <a:latin typeface="Courier New" pitchFamily="49" charset="0"/>
+                <a:cs typeface="Courier New" pitchFamily="49" charset="0"/>
+              </a:rPr>
+              <a:t>=$(</a:t>
+            </a:r>
+            <a:r>
+              <a:rPr lang="en-US" b="1" dirty="0" err="1">
+                <a:solidFill>
+                  <a:schemeClr val="bg1"/>
+                </a:solidFill>
+                <a:latin typeface="Courier New" pitchFamily="49" charset="0"/>
+                <a:cs typeface="Courier New" pitchFamily="49" charset="0"/>
+              </a:rPr>
+              <a:t>sbatch</a:t>
+            </a:r>
+            <a:r>
+              <a:rPr lang="en-US" b="1" dirty="0">
+                <a:solidFill>
+                  <a:schemeClr val="bg1"/>
+                </a:solidFill>
+                <a:latin typeface="Courier New" pitchFamily="49" charset="0"/>
+                <a:cs typeface="Courier New" pitchFamily="49" charset="0"/>
+              </a:rPr>
+              <a:t> </a:t>
+            </a:r>
+            <a:r>
+              <a:rPr lang="en-US" b="1" dirty="0" err="1">
+                <a:solidFill>
+                  <a:schemeClr val="bg1"/>
+                </a:solidFill>
+                <a:latin typeface="Courier New" pitchFamily="49" charset="0"/>
+                <a:cs typeface="Courier New" pitchFamily="49" charset="0"/>
+              </a:rPr>
+              <a:t>preprocess.slurm</a:t>
+            </a:r>
+            <a:r>
+              <a:rPr lang="en-US" b="1" dirty="0">
+                <a:solidFill>
+                  <a:schemeClr val="bg1"/>
+                </a:solidFill>
+                <a:latin typeface="Courier New" pitchFamily="49" charset="0"/>
+                <a:cs typeface="Courier New" pitchFamily="49" charset="0"/>
+              </a:rPr>
+              <a:t> | grep -</a:t>
+            </a:r>
+            <a:r>
+              <a:rPr lang="en-US" b="1" dirty="0" err="1">
+                <a:solidFill>
+                  <a:schemeClr val="bg1"/>
+                </a:solidFill>
+                <a:latin typeface="Courier New" pitchFamily="49" charset="0"/>
+                <a:cs typeface="Courier New" pitchFamily="49" charset="0"/>
+              </a:rPr>
+              <a:t>oP</a:t>
+            </a:r>
+            <a:r>
+              <a:rPr lang="en-US" b="1" dirty="0">
+                <a:solidFill>
+                  <a:schemeClr val="bg1"/>
+                </a:solidFill>
+                <a:latin typeface="Courier New" pitchFamily="49" charset="0"/>
+                <a:cs typeface="Courier New" pitchFamily="49" charset="0"/>
+              </a:rPr>
+              <a:t> '\b\d+\b')</a:t>
+            </a:r>
+          </a:p>
+          <a:p>
+            <a:endParaRPr lang="en-US" b="1" dirty="0">
+              <a:solidFill>
+                <a:schemeClr val="bg1"/>
+              </a:solidFill>
+              <a:latin typeface="Courier New" pitchFamily="49" charset="0"/>
+              <a:cs typeface="Courier New" pitchFamily="49" charset="0"/>
+            </a:endParaRPr>
+          </a:p>
+          <a:p>
+            <a:r>
+              <a:rPr lang="en-US" b="1" dirty="0">
+                <a:solidFill>
+                  <a:schemeClr val="bg1"/>
+                </a:solidFill>
+                <a:latin typeface="Courier New" pitchFamily="49" charset="0"/>
+                <a:cs typeface="Courier New" pitchFamily="49" charset="0"/>
+              </a:rPr>
+              <a:t>$ </a:t>
+            </a:r>
+            <a:r>
+              <a:rPr lang="en-US" b="1" dirty="0">
+                <a:solidFill>
+                  <a:srgbClr val="00B0F0"/>
+                </a:solidFill>
+                <a:latin typeface="Courier New" pitchFamily="49" charset="0"/>
+                <a:cs typeface="Courier New" pitchFamily="49" charset="0"/>
+              </a:rPr>
+              <a:t>PROC_ID</a:t>
+            </a:r>
+            <a:r>
+              <a:rPr lang="en-US" b="1" dirty="0">
+                <a:solidFill>
+                  <a:schemeClr val="bg1"/>
+                </a:solidFill>
+                <a:latin typeface="Courier New" pitchFamily="49" charset="0"/>
+                <a:cs typeface="Courier New" pitchFamily="49" charset="0"/>
+              </a:rPr>
+              <a:t>=$(</a:t>
+            </a:r>
+            <a:r>
+              <a:rPr lang="en-US" b="1" dirty="0" err="1">
+                <a:solidFill>
+                  <a:schemeClr val="bg1"/>
+                </a:solidFill>
+                <a:latin typeface="Courier New" pitchFamily="49" charset="0"/>
+                <a:cs typeface="Courier New" pitchFamily="49" charset="0"/>
+              </a:rPr>
+              <a:t>sbatch</a:t>
+            </a:r>
+            <a:r>
+              <a:rPr lang="en-US" b="1" dirty="0">
+                <a:solidFill>
+                  <a:schemeClr val="bg1"/>
+                </a:solidFill>
+                <a:latin typeface="Courier New" pitchFamily="49" charset="0"/>
+                <a:cs typeface="Courier New" pitchFamily="49" charset="0"/>
+              </a:rPr>
+              <a:t> </a:t>
+            </a:r>
+            <a:r>
+              <a:rPr lang="en-US" b="1" dirty="0">
+                <a:solidFill>
+                  <a:srgbClr val="FFC000"/>
+                </a:solidFill>
+                <a:latin typeface="Courier New" pitchFamily="49" charset="0"/>
+                <a:cs typeface="Courier New" pitchFamily="49" charset="0"/>
+              </a:rPr>
+              <a:t>--dependency=</a:t>
+            </a:r>
+            <a:r>
+              <a:rPr lang="en-US" b="1" dirty="0" err="1">
+                <a:solidFill>
+                  <a:srgbClr val="FFC000"/>
+                </a:solidFill>
+                <a:latin typeface="Courier New" pitchFamily="49" charset="0"/>
+                <a:cs typeface="Courier New" pitchFamily="49" charset="0"/>
+              </a:rPr>
+              <a:t>afterok</a:t>
+            </a:r>
+            <a:r>
+              <a:rPr lang="en-US" b="1" dirty="0">
+                <a:solidFill>
+                  <a:srgbClr val="FFC000"/>
+                </a:solidFill>
+                <a:latin typeface="Courier New" pitchFamily="49" charset="0"/>
+                <a:cs typeface="Courier New" pitchFamily="49" charset="0"/>
+              </a:rPr>
+              <a:t>:$PRE_ID</a:t>
+            </a:r>
+            <a:r>
+              <a:rPr lang="en-US" b="1" dirty="0">
+                <a:solidFill>
+                  <a:schemeClr val="bg1"/>
+                </a:solidFill>
+                <a:latin typeface="Courier New" pitchFamily="49" charset="0"/>
+                <a:cs typeface="Courier New" pitchFamily="49" charset="0"/>
+              </a:rPr>
+              <a:t> </a:t>
+            </a:r>
+            <a:r>
+              <a:rPr lang="en-US" b="1" dirty="0" err="1">
+                <a:solidFill>
+                  <a:schemeClr val="bg1"/>
+                </a:solidFill>
+                <a:latin typeface="Courier New" pitchFamily="49" charset="0"/>
+                <a:cs typeface="Courier New" pitchFamily="49" charset="0"/>
+              </a:rPr>
+              <a:t>process.slurm</a:t>
+            </a:r>
+            <a:r>
+              <a:rPr lang="en-US" b="1" dirty="0">
+                <a:solidFill>
+                  <a:schemeClr val="bg1"/>
+                </a:solidFill>
+                <a:latin typeface="Courier New" pitchFamily="49" charset="0"/>
+                <a:cs typeface="Courier New" pitchFamily="49" charset="0"/>
+              </a:rPr>
+              <a:t> | grep -</a:t>
+            </a:r>
+            <a:r>
+              <a:rPr lang="en-US" b="1" dirty="0" err="1">
+                <a:solidFill>
+                  <a:schemeClr val="bg1"/>
+                </a:solidFill>
+                <a:latin typeface="Courier New" pitchFamily="49" charset="0"/>
+                <a:cs typeface="Courier New" pitchFamily="49" charset="0"/>
+              </a:rPr>
+              <a:t>oP</a:t>
+            </a:r>
+            <a:r>
+              <a:rPr lang="en-US" b="1" dirty="0">
+                <a:solidFill>
+                  <a:schemeClr val="bg1"/>
+                </a:solidFill>
+                <a:latin typeface="Courier New" pitchFamily="49" charset="0"/>
+                <a:cs typeface="Courier New" pitchFamily="49" charset="0"/>
+              </a:rPr>
+              <a:t> '\b\d+\b')</a:t>
+            </a:r>
+          </a:p>
+          <a:p>
+            <a:endParaRPr lang="en-US" b="1" dirty="0">
+              <a:solidFill>
+                <a:schemeClr val="bg1"/>
+              </a:solidFill>
+              <a:latin typeface="Courier New" pitchFamily="49" charset="0"/>
+              <a:cs typeface="Courier New" pitchFamily="49" charset="0"/>
+            </a:endParaRPr>
+          </a:p>
+          <a:p>
+            <a:r>
+              <a:rPr lang="en-US" b="1" dirty="0">
+                <a:solidFill>
+                  <a:schemeClr val="bg1"/>
+                </a:solidFill>
+                <a:latin typeface="Courier New" pitchFamily="49" charset="0"/>
+                <a:cs typeface="Courier New" pitchFamily="49" charset="0"/>
+              </a:rPr>
+              <a:t>$ </a:t>
+            </a:r>
+            <a:r>
+              <a:rPr lang="en-US" b="1" dirty="0" err="1">
+                <a:solidFill>
+                  <a:schemeClr val="bg1"/>
+                </a:solidFill>
+                <a:latin typeface="Courier New" pitchFamily="49" charset="0"/>
+                <a:cs typeface="Courier New" pitchFamily="49" charset="0"/>
+              </a:rPr>
+              <a:t>sbatch</a:t>
+            </a:r>
+            <a:r>
+              <a:rPr lang="en-US" b="1" dirty="0">
+                <a:solidFill>
+                  <a:schemeClr val="bg1"/>
+                </a:solidFill>
+                <a:latin typeface="Courier New" pitchFamily="49" charset="0"/>
+                <a:cs typeface="Courier New" pitchFamily="49" charset="0"/>
+              </a:rPr>
+              <a:t> </a:t>
+            </a:r>
+            <a:r>
+              <a:rPr lang="en-US" b="1" dirty="0">
+                <a:solidFill>
+                  <a:srgbClr val="00B0F0"/>
+                </a:solidFill>
+                <a:latin typeface="Courier New" pitchFamily="49" charset="0"/>
+                <a:cs typeface="Courier New" pitchFamily="49" charset="0"/>
+              </a:rPr>
+              <a:t>--dependency=</a:t>
+            </a:r>
+            <a:r>
+              <a:rPr lang="en-US" b="1" dirty="0" err="1">
+                <a:solidFill>
+                  <a:srgbClr val="00B0F0"/>
+                </a:solidFill>
+                <a:latin typeface="Courier New" pitchFamily="49" charset="0"/>
+                <a:cs typeface="Courier New" pitchFamily="49" charset="0"/>
+              </a:rPr>
+              <a:t>afterok</a:t>
+            </a:r>
+            <a:r>
+              <a:rPr lang="en-US" b="1" dirty="0">
+                <a:solidFill>
+                  <a:srgbClr val="00B0F0"/>
+                </a:solidFill>
+                <a:latin typeface="Courier New" pitchFamily="49" charset="0"/>
+                <a:cs typeface="Courier New" pitchFamily="49" charset="0"/>
+              </a:rPr>
+              <a:t>:$PROC_ID</a:t>
+            </a:r>
+            <a:r>
+              <a:rPr lang="en-US" b="1" dirty="0">
+                <a:solidFill>
+                  <a:schemeClr val="bg1"/>
+                </a:solidFill>
+                <a:latin typeface="Courier New" pitchFamily="49" charset="0"/>
+                <a:cs typeface="Courier New" pitchFamily="49" charset="0"/>
+              </a:rPr>
+              <a:t> </a:t>
+            </a:r>
+            <a:r>
+              <a:rPr lang="en-US" b="1" dirty="0" err="1">
+                <a:solidFill>
+                  <a:schemeClr val="bg1"/>
+                </a:solidFill>
+                <a:latin typeface="Courier New" pitchFamily="49" charset="0"/>
+                <a:cs typeface="Courier New" pitchFamily="49" charset="0"/>
+              </a:rPr>
+              <a:t>postprocess.slurm</a:t>
+            </a:r>
+            <a:endParaRPr lang="en-US" b="1" dirty="0">
+              <a:solidFill>
+                <a:schemeClr val="bg1"/>
+              </a:solidFill>
+              <a:latin typeface="Courier New" pitchFamily="49" charset="0"/>
+              <a:cs typeface="Courier New" pitchFamily="49" charset="0"/>
+            </a:endParaRPr>
+          </a:p>
+        </p:txBody>
+      </p:sp>
+      <p:grpSp>
+        <p:nvGrpSpPr>
+          <p:cNvPr id="5" name="Group 4">
+            <a:extLst>
+              <a:ext uri="{FF2B5EF4-FFF2-40B4-BE49-F238E27FC236}">
+                <a16:creationId xmlns:a16="http://schemas.microsoft.com/office/drawing/2014/main" id="{768E0198-3F9B-4C9D-B0CB-69559EA72A26}"/>
+              </a:ext>
+            </a:extLst>
+          </p:cNvPr>
+          <p:cNvGrpSpPr/>
+          <p:nvPr/>
+        </p:nvGrpSpPr>
+        <p:grpSpPr>
+          <a:xfrm>
+            <a:off x="986158" y="3996094"/>
+            <a:ext cx="3296369" cy="1268712"/>
+            <a:chOff x="1455108" y="5452763"/>
+            <a:chExt cx="3296369" cy="1268712"/>
+          </a:xfrm>
+        </p:grpSpPr>
+        <p:pic>
+          <p:nvPicPr>
+            <p:cNvPr id="6" name="Graphic 5" descr="Thumbs up sign with solid fill">
+              <a:extLst>
+                <a:ext uri="{FF2B5EF4-FFF2-40B4-BE49-F238E27FC236}">
+                  <a16:creationId xmlns:a16="http://schemas.microsoft.com/office/drawing/2014/main" id="{19BEA20F-0E2E-AF14-F90F-E6E591833EF2}"/>
+                </a:ext>
+              </a:extLst>
+            </p:cNvPr>
+            <p:cNvPicPr>
+              <a:picLocks noChangeAspect="1"/>
+            </p:cNvPicPr>
+            <p:nvPr/>
+          </p:nvPicPr>
+          <p:blipFill>
+            <a:blip r:embed="rId2">
+              <a:extLst>
+                <a:ext uri="{96DAC541-7B7A-43D3-8B79-37D633B846F1}">
+                  <asvg:svgBlip xmlns:asvg="http://schemas.microsoft.com/office/drawing/2016/SVG/main" r:embed="rId3"/>
+                </a:ext>
+              </a:extLst>
+            </a:blip>
+            <a:stretch>
+              <a:fillRect/>
+            </a:stretch>
+          </p:blipFill>
+          <p:spPr>
+            <a:xfrm>
+              <a:off x="4027277" y="5452763"/>
+              <a:ext cx="724200" cy="724200"/>
+            </a:xfrm>
+            <a:prstGeom prst="rect">
+              <a:avLst/>
+            </a:prstGeom>
+          </p:spPr>
+        </p:pic>
+        <p:sp>
+          <p:nvSpPr>
+            <p:cNvPr id="7" name="TextBox 6">
+              <a:extLst>
+                <a:ext uri="{FF2B5EF4-FFF2-40B4-BE49-F238E27FC236}">
+                  <a16:creationId xmlns:a16="http://schemas.microsoft.com/office/drawing/2014/main" id="{E5E91FDD-8F9A-F6C6-2BA4-7BC946A926C4}"/>
+                </a:ext>
+              </a:extLst>
+            </p:cNvPr>
+            <p:cNvSpPr txBox="1"/>
+            <p:nvPr/>
+          </p:nvSpPr>
+          <p:spPr>
+            <a:xfrm>
+              <a:off x="1455108" y="5890478"/>
+              <a:ext cx="2737609" cy="830997"/>
+            </a:xfrm>
+            <a:prstGeom prst="rect">
+              <a:avLst/>
+            </a:prstGeom>
+            <a:noFill/>
+            <a:ln>
+              <a:solidFill>
+                <a:schemeClr val="tx1"/>
+              </a:solidFill>
+            </a:ln>
+          </p:spPr>
+          <p:txBody>
+            <a:bodyPr wrap="none" rtlCol="0">
+              <a:spAutoFit/>
+            </a:bodyPr>
+            <a:lstStyle/>
+            <a:p>
+              <a:r>
+                <a:rPr lang="en-US" sz="2400" dirty="0"/>
+                <a:t>In shell scripts, use</a:t>
+              </a:r>
+              <a:br>
+                <a:rPr lang="en-US" sz="2400" dirty="0"/>
+              </a:br>
+              <a:r>
+                <a:rPr lang="en-US" sz="2400" dirty="0">
+                  <a:latin typeface="Courier New" panose="02070309020205020404" pitchFamily="49" charset="0"/>
+                  <a:cs typeface="Courier New" panose="02070309020205020404" pitchFamily="49" charset="0"/>
+                </a:rPr>
+                <a:t>set -e</a:t>
+              </a:r>
+              <a:endParaRPr lang="LID4096" sz="2400" dirty="0">
+                <a:latin typeface="Courier New" panose="02070309020205020404" pitchFamily="49" charset="0"/>
+                <a:cs typeface="Courier New" panose="02070309020205020404" pitchFamily="49" charset="0"/>
+              </a:endParaRPr>
+            </a:p>
+          </p:txBody>
+        </p:sp>
+      </p:grpSp>
+    </p:spTree>
+    <p:extLst>
+      <p:ext uri="{BB962C8B-B14F-4D97-AF65-F5344CB8AC3E}">
+        <p14:creationId xmlns:p14="http://schemas.microsoft.com/office/powerpoint/2010/main" val="1844474554"/>
+      </p:ext>
+    </p:extLst>
+  </p:cSld>
+  <p:clrMapOvr>
+    <a:masterClrMapping/>
+  </p:clrMapOvr>
+  <p:timing>
+    <p:tnLst>
+      <p:par>
+        <p:cTn id="1" dur="indefinite" restart="never" nodeType="tmRoot">
+          <p:childTnLst>
+            <p:seq concurrent="1" nextAc="seek">
+              <p:cTn id="2" dur="indefinite" nodeType="mainSeq">
+                <p:childTnLst>
+                  <p:par>
+                    <p:cTn id="3" fill="hold">
+                      <p:stCondLst>
+                        <p:cond delay="indefinite"/>
+                        <p:cond evt="onBegin" delay="0">
+                          <p:tn val="2"/>
+                        </p:cond>
+                      </p:stCondLst>
+                      <p:childTnLst>
+                        <p:par>
+                          <p:cTn id="4" fill="hold">
+                            <p:stCondLst>
+                              <p:cond delay="0"/>
+                            </p:stCondLst>
+                            <p:childTnLst>
+                              <p:par>
+                                <p:cTn id="5" presetID="1" presetClass="entr" presetSubtype="0" fill="hold" grpId="0" nodeType="withEffect">
+                                  <p:stCondLst>
+                                    <p:cond delay="0"/>
+                                  </p:stCondLst>
+                                  <p:childTnLst>
+                                    <p:set>
+                                      <p:cBhvr>
+                                        <p:cTn id="6" dur="1" fill="hold">
+                                          <p:stCondLst>
+                                            <p:cond delay="0"/>
+                                          </p:stCondLst>
+                                        </p:cTn>
+                                        <p:tgtEl>
+                                          <p:spTgt spid="4"/>
+                                        </p:tgtEl>
+                                        <p:attrNameLst>
+                                          <p:attrName>style.visibility</p:attrName>
+                                        </p:attrNameLst>
+                                      </p:cBhvr>
+                                      <p:to>
+                                        <p:strVal val="visible"/>
+                                      </p:to>
+                                    </p:set>
+                                  </p:childTnLst>
+                                </p:cTn>
+                              </p:par>
+                            </p:childTnLst>
+                          </p:cTn>
+                        </p:par>
+                      </p:childTnLst>
+                    </p:cTn>
+                  </p:par>
+                </p:childTnLst>
+              </p:cTn>
+              <p:prevCondLst>
+                <p:cond evt="onPrev" delay="0">
+                  <p:tgtEl>
+                    <p:sldTgt/>
+                  </p:tgtEl>
+                </p:cond>
+              </p:prevCondLst>
+              <p:nextCondLst>
+                <p:cond evt="onNext" delay="0">
+                  <p:tgtEl>
+                    <p:sldTgt/>
+                  </p:tgtEl>
+                </p:cond>
+              </p:nextCondLst>
+            </p:seq>
+          </p:childTnLst>
+        </p:cTn>
+      </p:par>
+    </p:tnLst>
+    <p:bldLst>
+      <p:bldP spid="4" grpId="0" animBg="1"/>
+    </p:bldLst>
+  </p:timing>
 </p:sld>
 </file>
 

</xml_diff>

<commit_message>
Add more sophisticated job dependency slide
</commit_message>
<xml_diff>
--- a/workflow_for_HPC.pptx
+++ b/workflow_for_HPC.pptx
@@ -5,7 +5,7 @@
     <p:sldMasterId id="2147483648" r:id="rId1"/>
   </p:sldMasterIdLst>
   <p:notesMasterIdLst>
-    <p:notesMasterId r:id="rId23"/>
+    <p:notesMasterId r:id="rId24"/>
   </p:notesMasterIdLst>
   <p:sldIdLst>
     <p:sldId id="257" r:id="rId2"/>
@@ -29,6 +29,7 @@
     <p:sldId id="372" r:id="rId20"/>
     <p:sldId id="373" r:id="rId21"/>
     <p:sldId id="374" r:id="rId22"/>
+    <p:sldId id="375" r:id="rId23"/>
   </p:sldIdLst>
   <p:sldSz cx="12192000" cy="6858000"/>
   <p:notesSz cx="6858000" cy="9144000"/>
@@ -10743,6 +10744,2330 @@
       <p:bldP spid="4" grpId="0" animBg="1"/>
     </p:bldLst>
   </p:timing>
+</p:sld>
+</file>
+
+<file path=ppt/slides/slide22.xml><?xml version="1.0" encoding="utf-8"?>
+<p:sld xmlns:a="http://schemas.openxmlformats.org/drawingml/2006/main" xmlns:r="http://schemas.openxmlformats.org/officeDocument/2006/relationships" xmlns:p="http://schemas.openxmlformats.org/presentationml/2006/main">
+  <p:cSld>
+    <p:spTree>
+      <p:nvGrpSpPr>
+        <p:cNvPr id="1" name=""/>
+        <p:cNvGrpSpPr/>
+        <p:nvPr/>
+      </p:nvGrpSpPr>
+      <p:grpSpPr>
+        <a:xfrm>
+          <a:off x="0" y="0"/>
+          <a:ext cx="0" cy="0"/>
+          <a:chOff x="0" y="0"/>
+          <a:chExt cx="0" cy="0"/>
+        </a:xfrm>
+      </p:grpSpPr>
+      <p:sp>
+        <p:nvSpPr>
+          <p:cNvPr id="2" name="Title 1">
+            <a:extLst>
+              <a:ext uri="{FF2B5EF4-FFF2-40B4-BE49-F238E27FC236}">
+                <a16:creationId xmlns:a16="http://schemas.microsoft.com/office/drawing/2014/main" id="{224AB32B-AD6F-8B3D-0AAE-58729A2C2306}"/>
+              </a:ext>
+            </a:extLst>
+          </p:cNvPr>
+          <p:cNvSpPr>
+            <a:spLocks noGrp="1"/>
+          </p:cNvSpPr>
+          <p:nvPr>
+            <p:ph type="title"/>
+          </p:nvPr>
+        </p:nvSpPr>
+        <p:spPr/>
+        <p:txBody>
+          <a:bodyPr/>
+          <a:lstStyle/>
+          <a:p>
+            <a:r>
+              <a:rPr lang="en-US" dirty="0"/>
+              <a:t>More sophisticated example</a:t>
+            </a:r>
+            <a:endParaRPr lang="LID4096" dirty="0"/>
+          </a:p>
+        </p:txBody>
+      </p:sp>
+      <p:sp>
+        <p:nvSpPr>
+          <p:cNvPr id="3" name="Slide Number Placeholder 2">
+            <a:extLst>
+              <a:ext uri="{FF2B5EF4-FFF2-40B4-BE49-F238E27FC236}">
+                <a16:creationId xmlns:a16="http://schemas.microsoft.com/office/drawing/2014/main" id="{521C0A22-645B-2F01-1FBF-676DDE1BADED}"/>
+              </a:ext>
+            </a:extLst>
+          </p:cNvPr>
+          <p:cNvSpPr>
+            <a:spLocks noGrp="1"/>
+          </p:cNvSpPr>
+          <p:nvPr>
+            <p:ph type="sldNum" sz="quarter" idx="12"/>
+          </p:nvPr>
+        </p:nvSpPr>
+        <p:spPr/>
+        <p:txBody>
+          <a:bodyPr/>
+          <a:lstStyle/>
+          <a:p>
+            <a:fld id="{9C7CE217-4467-4B8D-A735-B008FA7C4816}" type="slidenum">
+              <a:rPr lang="LID4096" smtClean="0"/>
+              <a:t>22</a:t>
+            </a:fld>
+            <a:endParaRPr lang="LID4096"/>
+          </a:p>
+        </p:txBody>
+      </p:sp>
+      <p:grpSp>
+        <p:nvGrpSpPr>
+          <p:cNvPr id="12" name="Group 11">
+            <a:extLst>
+              <a:ext uri="{FF2B5EF4-FFF2-40B4-BE49-F238E27FC236}">
+                <a16:creationId xmlns:a16="http://schemas.microsoft.com/office/drawing/2014/main" id="{ECDD4EB7-F4E4-9D38-89D9-21C1318F2A13}"/>
+              </a:ext>
+            </a:extLst>
+          </p:cNvPr>
+          <p:cNvGrpSpPr/>
+          <p:nvPr/>
+        </p:nvGrpSpPr>
+        <p:grpSpPr>
+          <a:xfrm>
+            <a:off x="1981199" y="1535668"/>
+            <a:ext cx="2174185" cy="1289176"/>
+            <a:chOff x="1981199" y="1535668"/>
+            <a:chExt cx="2174185" cy="1289176"/>
+          </a:xfrm>
+        </p:grpSpPr>
+        <p:grpSp>
+          <p:nvGrpSpPr>
+            <p:cNvPr id="4" name="Group 3">
+              <a:extLst>
+                <a:ext uri="{FF2B5EF4-FFF2-40B4-BE49-F238E27FC236}">
+                  <a16:creationId xmlns:a16="http://schemas.microsoft.com/office/drawing/2014/main" id="{68AD0433-2E37-58AC-A150-8223412E188E}"/>
+                </a:ext>
+              </a:extLst>
+            </p:cNvPr>
+            <p:cNvGrpSpPr/>
+            <p:nvPr/>
+          </p:nvGrpSpPr>
+          <p:grpSpPr>
+            <a:xfrm>
+              <a:off x="1981199" y="1535668"/>
+              <a:ext cx="2174185" cy="1163989"/>
+              <a:chOff x="1981199" y="1535668"/>
+              <a:chExt cx="2174185" cy="1163989"/>
+            </a:xfrm>
+          </p:grpSpPr>
+          <p:sp>
+            <p:nvSpPr>
+              <p:cNvPr id="5" name="Rectangle: Folded Corner 4">
+                <a:extLst>
+                  <a:ext uri="{FF2B5EF4-FFF2-40B4-BE49-F238E27FC236}">
+                    <a16:creationId xmlns:a16="http://schemas.microsoft.com/office/drawing/2014/main" id="{611C6340-765A-40F5-C8ED-3381DDBBA4FF}"/>
+                  </a:ext>
+                </a:extLst>
+              </p:cNvPr>
+              <p:cNvSpPr/>
+              <p:nvPr/>
+            </p:nvSpPr>
+            <p:spPr>
+              <a:xfrm>
+                <a:off x="2785263" y="1905000"/>
+                <a:ext cx="566057" cy="794657"/>
+              </a:xfrm>
+              <a:prstGeom prst="foldedCorner">
+                <a:avLst/>
+              </a:prstGeom>
+              <a:solidFill>
+                <a:schemeClr val="bg1"/>
+              </a:solidFill>
+            </p:spPr>
+            <p:style>
+              <a:lnRef idx="2">
+                <a:schemeClr val="accent1">
+                  <a:shade val="15000"/>
+                </a:schemeClr>
+              </a:lnRef>
+              <a:fillRef idx="1">
+                <a:schemeClr val="accent1"/>
+              </a:fillRef>
+              <a:effectRef idx="0">
+                <a:schemeClr val="accent1"/>
+              </a:effectRef>
+              <a:fontRef idx="minor">
+                <a:schemeClr val="lt1"/>
+              </a:fontRef>
+            </p:style>
+            <p:txBody>
+              <a:bodyPr rtlCol="0" anchor="ctr"/>
+              <a:lstStyle/>
+              <a:p>
+                <a:pPr algn="ctr"/>
+                <a:endParaRPr lang="LID4096"/>
+              </a:p>
+            </p:txBody>
+          </p:sp>
+          <p:sp>
+            <p:nvSpPr>
+              <p:cNvPr id="6" name="TextBox 5">
+                <a:extLst>
+                  <a:ext uri="{FF2B5EF4-FFF2-40B4-BE49-F238E27FC236}">
+                    <a16:creationId xmlns:a16="http://schemas.microsoft.com/office/drawing/2014/main" id="{507C37F8-B75A-B357-13DC-E9E635C16FF7}"/>
+                  </a:ext>
+                </a:extLst>
+              </p:cNvPr>
+              <p:cNvSpPr txBox="1"/>
+              <p:nvPr/>
+            </p:nvSpPr>
+            <p:spPr>
+              <a:xfrm>
+                <a:off x="1981199" y="1535668"/>
+                <a:ext cx="2174185" cy="369332"/>
+              </a:xfrm>
+              <a:prstGeom prst="rect">
+                <a:avLst/>
+              </a:prstGeom>
+              <a:noFill/>
+            </p:spPr>
+            <p:txBody>
+              <a:bodyPr wrap="none" rtlCol="0">
+                <a:spAutoFit/>
+              </a:bodyPr>
+              <a:lstStyle/>
+              <a:p>
+                <a:r>
+                  <a:rPr lang="en-US" dirty="0"/>
+                  <a:t>preprocess_1.slurm</a:t>
+                </a:r>
+                <a:endParaRPr lang="LID4096" dirty="0"/>
+              </a:p>
+            </p:txBody>
+          </p:sp>
+        </p:grpSp>
+        <p:sp>
+          <p:nvSpPr>
+            <p:cNvPr id="10" name="Rectangle: Rounded Corners 9">
+              <a:extLst>
+                <a:ext uri="{FF2B5EF4-FFF2-40B4-BE49-F238E27FC236}">
+                  <a16:creationId xmlns:a16="http://schemas.microsoft.com/office/drawing/2014/main" id="{18A0FC01-C442-BCFD-2937-1AD52AAC72C3}"/>
+                </a:ext>
+              </a:extLst>
+            </p:cNvPr>
+            <p:cNvSpPr/>
+            <p:nvPr/>
+          </p:nvSpPr>
+          <p:spPr>
+            <a:xfrm>
+              <a:off x="2284520" y="2552701"/>
+              <a:ext cx="783771" cy="272143"/>
+            </a:xfrm>
+            <a:prstGeom prst="roundRect">
+              <a:avLst/>
+            </a:prstGeom>
+          </p:spPr>
+          <p:style>
+            <a:lnRef idx="2">
+              <a:schemeClr val="accent1">
+                <a:shade val="15000"/>
+              </a:schemeClr>
+            </a:lnRef>
+            <a:fillRef idx="1">
+              <a:schemeClr val="accent1"/>
+            </a:fillRef>
+            <a:effectRef idx="0">
+              <a:schemeClr val="accent1"/>
+            </a:effectRef>
+            <a:fontRef idx="minor">
+              <a:schemeClr val="lt1"/>
+            </a:fontRef>
+          </p:style>
+          <p:txBody>
+            <a:bodyPr rtlCol="0" anchor="ctr"/>
+            <a:lstStyle/>
+            <a:p>
+              <a:pPr algn="ctr"/>
+              <a:r>
+                <a:rPr lang="en-US" dirty="0"/>
+                <a:t>501</a:t>
+              </a:r>
+              <a:endParaRPr lang="LID4096" dirty="0"/>
+            </a:p>
+          </p:txBody>
+        </p:sp>
+      </p:grpSp>
+      <p:grpSp>
+        <p:nvGrpSpPr>
+          <p:cNvPr id="13" name="Group 12">
+            <a:extLst>
+              <a:ext uri="{FF2B5EF4-FFF2-40B4-BE49-F238E27FC236}">
+                <a16:creationId xmlns:a16="http://schemas.microsoft.com/office/drawing/2014/main" id="{EBD8BBD3-9503-EB08-257E-0BADC1710809}"/>
+              </a:ext>
+            </a:extLst>
+          </p:cNvPr>
+          <p:cNvGrpSpPr/>
+          <p:nvPr/>
+        </p:nvGrpSpPr>
+        <p:grpSpPr>
+          <a:xfrm>
+            <a:off x="5008907" y="1535668"/>
+            <a:ext cx="2174185" cy="1289176"/>
+            <a:chOff x="1981199" y="1535668"/>
+            <a:chExt cx="2174185" cy="1289176"/>
+          </a:xfrm>
+        </p:grpSpPr>
+        <p:grpSp>
+          <p:nvGrpSpPr>
+            <p:cNvPr id="14" name="Group 13">
+              <a:extLst>
+                <a:ext uri="{FF2B5EF4-FFF2-40B4-BE49-F238E27FC236}">
+                  <a16:creationId xmlns:a16="http://schemas.microsoft.com/office/drawing/2014/main" id="{9F7894EA-4064-AE5D-3811-DA6BE757F68A}"/>
+                </a:ext>
+              </a:extLst>
+            </p:cNvPr>
+            <p:cNvGrpSpPr/>
+            <p:nvPr/>
+          </p:nvGrpSpPr>
+          <p:grpSpPr>
+            <a:xfrm>
+              <a:off x="1981199" y="1535668"/>
+              <a:ext cx="2174185" cy="1163989"/>
+              <a:chOff x="1981199" y="1535668"/>
+              <a:chExt cx="2174185" cy="1163989"/>
+            </a:xfrm>
+          </p:grpSpPr>
+          <p:sp>
+            <p:nvSpPr>
+              <p:cNvPr id="16" name="Rectangle: Folded Corner 15">
+                <a:extLst>
+                  <a:ext uri="{FF2B5EF4-FFF2-40B4-BE49-F238E27FC236}">
+                    <a16:creationId xmlns:a16="http://schemas.microsoft.com/office/drawing/2014/main" id="{509EDA13-7801-D54F-7525-3351B12C1EA5}"/>
+                  </a:ext>
+                </a:extLst>
+              </p:cNvPr>
+              <p:cNvSpPr/>
+              <p:nvPr/>
+            </p:nvSpPr>
+            <p:spPr>
+              <a:xfrm>
+                <a:off x="2785263" y="1905000"/>
+                <a:ext cx="566057" cy="794657"/>
+              </a:xfrm>
+              <a:prstGeom prst="foldedCorner">
+                <a:avLst/>
+              </a:prstGeom>
+              <a:solidFill>
+                <a:schemeClr val="bg1"/>
+              </a:solidFill>
+            </p:spPr>
+            <p:style>
+              <a:lnRef idx="2">
+                <a:schemeClr val="accent1">
+                  <a:shade val="15000"/>
+                </a:schemeClr>
+              </a:lnRef>
+              <a:fillRef idx="1">
+                <a:schemeClr val="accent1"/>
+              </a:fillRef>
+              <a:effectRef idx="0">
+                <a:schemeClr val="accent1"/>
+              </a:effectRef>
+              <a:fontRef idx="minor">
+                <a:schemeClr val="lt1"/>
+              </a:fontRef>
+            </p:style>
+            <p:txBody>
+              <a:bodyPr rtlCol="0" anchor="ctr"/>
+              <a:lstStyle/>
+              <a:p>
+                <a:pPr algn="ctr"/>
+                <a:endParaRPr lang="LID4096"/>
+              </a:p>
+            </p:txBody>
+          </p:sp>
+          <p:sp>
+            <p:nvSpPr>
+              <p:cNvPr id="17" name="TextBox 16">
+                <a:extLst>
+                  <a:ext uri="{FF2B5EF4-FFF2-40B4-BE49-F238E27FC236}">
+                    <a16:creationId xmlns:a16="http://schemas.microsoft.com/office/drawing/2014/main" id="{CFBB42DF-8799-04D9-0B61-55E64EF53782}"/>
+                  </a:ext>
+                </a:extLst>
+              </p:cNvPr>
+              <p:cNvSpPr txBox="1"/>
+              <p:nvPr/>
+            </p:nvSpPr>
+            <p:spPr>
+              <a:xfrm>
+                <a:off x="1981199" y="1535668"/>
+                <a:ext cx="2174185" cy="369332"/>
+              </a:xfrm>
+              <a:prstGeom prst="rect">
+                <a:avLst/>
+              </a:prstGeom>
+              <a:noFill/>
+            </p:spPr>
+            <p:txBody>
+              <a:bodyPr wrap="none" rtlCol="0">
+                <a:spAutoFit/>
+              </a:bodyPr>
+              <a:lstStyle/>
+              <a:p>
+                <a:r>
+                  <a:rPr lang="en-US" dirty="0"/>
+                  <a:t>preprocess_2.slurm</a:t>
+                </a:r>
+                <a:endParaRPr lang="LID4096" dirty="0"/>
+              </a:p>
+            </p:txBody>
+          </p:sp>
+        </p:grpSp>
+        <p:sp>
+          <p:nvSpPr>
+            <p:cNvPr id="15" name="Rectangle: Rounded Corners 14">
+              <a:extLst>
+                <a:ext uri="{FF2B5EF4-FFF2-40B4-BE49-F238E27FC236}">
+                  <a16:creationId xmlns:a16="http://schemas.microsoft.com/office/drawing/2014/main" id="{A666BCB8-F168-F61A-9DEC-AB8ED683FBD4}"/>
+                </a:ext>
+              </a:extLst>
+            </p:cNvPr>
+            <p:cNvSpPr/>
+            <p:nvPr/>
+          </p:nvSpPr>
+          <p:spPr>
+            <a:xfrm>
+              <a:off x="2284520" y="2552701"/>
+              <a:ext cx="783771" cy="272143"/>
+            </a:xfrm>
+            <a:prstGeom prst="roundRect">
+              <a:avLst/>
+            </a:prstGeom>
+          </p:spPr>
+          <p:style>
+            <a:lnRef idx="2">
+              <a:schemeClr val="accent1">
+                <a:shade val="15000"/>
+              </a:schemeClr>
+            </a:lnRef>
+            <a:fillRef idx="1">
+              <a:schemeClr val="accent1"/>
+            </a:fillRef>
+            <a:effectRef idx="0">
+              <a:schemeClr val="accent1"/>
+            </a:effectRef>
+            <a:fontRef idx="minor">
+              <a:schemeClr val="lt1"/>
+            </a:fontRef>
+          </p:style>
+          <p:txBody>
+            <a:bodyPr rtlCol="0" anchor="ctr"/>
+            <a:lstStyle/>
+            <a:p>
+              <a:pPr algn="ctr"/>
+              <a:r>
+                <a:rPr lang="en-US" dirty="0"/>
+                <a:t>502</a:t>
+              </a:r>
+              <a:endParaRPr lang="LID4096" dirty="0"/>
+            </a:p>
+          </p:txBody>
+        </p:sp>
+      </p:grpSp>
+      <p:grpSp>
+        <p:nvGrpSpPr>
+          <p:cNvPr id="18" name="Group 17">
+            <a:extLst>
+              <a:ext uri="{FF2B5EF4-FFF2-40B4-BE49-F238E27FC236}">
+                <a16:creationId xmlns:a16="http://schemas.microsoft.com/office/drawing/2014/main" id="{0F62EE26-8E00-AB74-946E-8A4B1D0698D6}"/>
+              </a:ext>
+            </a:extLst>
+          </p:cNvPr>
+          <p:cNvGrpSpPr/>
+          <p:nvPr/>
+        </p:nvGrpSpPr>
+        <p:grpSpPr>
+          <a:xfrm>
+            <a:off x="3233058" y="3513756"/>
+            <a:ext cx="1848711" cy="1289176"/>
+            <a:chOff x="2198913" y="1535668"/>
+            <a:chExt cx="1848711" cy="1289176"/>
+          </a:xfrm>
+        </p:grpSpPr>
+        <p:grpSp>
+          <p:nvGrpSpPr>
+            <p:cNvPr id="19" name="Group 18">
+              <a:extLst>
+                <a:ext uri="{FF2B5EF4-FFF2-40B4-BE49-F238E27FC236}">
+                  <a16:creationId xmlns:a16="http://schemas.microsoft.com/office/drawing/2014/main" id="{A154F94C-74BB-40EA-A190-29FD6381FCBE}"/>
+                </a:ext>
+              </a:extLst>
+            </p:cNvPr>
+            <p:cNvGrpSpPr/>
+            <p:nvPr/>
+          </p:nvGrpSpPr>
+          <p:grpSpPr>
+            <a:xfrm>
+              <a:off x="2198913" y="1535668"/>
+              <a:ext cx="1848711" cy="1163989"/>
+              <a:chOff x="2198913" y="1535668"/>
+              <a:chExt cx="1848711" cy="1163989"/>
+            </a:xfrm>
+          </p:grpSpPr>
+          <p:sp>
+            <p:nvSpPr>
+              <p:cNvPr id="21" name="Rectangle: Folded Corner 20">
+                <a:extLst>
+                  <a:ext uri="{FF2B5EF4-FFF2-40B4-BE49-F238E27FC236}">
+                    <a16:creationId xmlns:a16="http://schemas.microsoft.com/office/drawing/2014/main" id="{AC109E50-4386-F3A9-FFB8-3ABE285EFF53}"/>
+                  </a:ext>
+                </a:extLst>
+              </p:cNvPr>
+              <p:cNvSpPr/>
+              <p:nvPr/>
+            </p:nvSpPr>
+            <p:spPr>
+              <a:xfrm>
+                <a:off x="2785263" y="1905000"/>
+                <a:ext cx="566057" cy="794657"/>
+              </a:xfrm>
+              <a:prstGeom prst="foldedCorner">
+                <a:avLst/>
+              </a:prstGeom>
+              <a:solidFill>
+                <a:schemeClr val="bg1"/>
+              </a:solidFill>
+            </p:spPr>
+            <p:style>
+              <a:lnRef idx="2">
+                <a:schemeClr val="accent1">
+                  <a:shade val="15000"/>
+                </a:schemeClr>
+              </a:lnRef>
+              <a:fillRef idx="1">
+                <a:schemeClr val="accent1"/>
+              </a:fillRef>
+              <a:effectRef idx="0">
+                <a:schemeClr val="accent1"/>
+              </a:effectRef>
+              <a:fontRef idx="minor">
+                <a:schemeClr val="lt1"/>
+              </a:fontRef>
+            </p:style>
+            <p:txBody>
+              <a:bodyPr rtlCol="0" anchor="ctr"/>
+              <a:lstStyle/>
+              <a:p>
+                <a:pPr algn="ctr"/>
+                <a:endParaRPr lang="LID4096"/>
+              </a:p>
+            </p:txBody>
+          </p:sp>
+          <p:sp>
+            <p:nvSpPr>
+              <p:cNvPr id="22" name="TextBox 21">
+                <a:extLst>
+                  <a:ext uri="{FF2B5EF4-FFF2-40B4-BE49-F238E27FC236}">
+                    <a16:creationId xmlns:a16="http://schemas.microsoft.com/office/drawing/2014/main" id="{577F83A6-AB39-C489-03BB-A43CDE53CED4}"/>
+                  </a:ext>
+                </a:extLst>
+              </p:cNvPr>
+              <p:cNvSpPr txBox="1"/>
+              <p:nvPr/>
+            </p:nvSpPr>
+            <p:spPr>
+              <a:xfrm>
+                <a:off x="2198913" y="1535668"/>
+                <a:ext cx="1848711" cy="369332"/>
+              </a:xfrm>
+              <a:prstGeom prst="rect">
+                <a:avLst/>
+              </a:prstGeom>
+              <a:noFill/>
+            </p:spPr>
+            <p:txBody>
+              <a:bodyPr wrap="none" rtlCol="0">
+                <a:spAutoFit/>
+              </a:bodyPr>
+              <a:lstStyle/>
+              <a:p>
+                <a:r>
+                  <a:rPr lang="en-US" dirty="0"/>
+                  <a:t>process_1.slurm</a:t>
+                </a:r>
+                <a:endParaRPr lang="LID4096" dirty="0"/>
+              </a:p>
+            </p:txBody>
+          </p:sp>
+        </p:grpSp>
+        <p:sp>
+          <p:nvSpPr>
+            <p:cNvPr id="20" name="Rectangle: Rounded Corners 19">
+              <a:extLst>
+                <a:ext uri="{FF2B5EF4-FFF2-40B4-BE49-F238E27FC236}">
+                  <a16:creationId xmlns:a16="http://schemas.microsoft.com/office/drawing/2014/main" id="{56D6126D-44EE-7279-55E5-BF38F8EE51E0}"/>
+                </a:ext>
+              </a:extLst>
+            </p:cNvPr>
+            <p:cNvSpPr/>
+            <p:nvPr/>
+          </p:nvSpPr>
+          <p:spPr>
+            <a:xfrm>
+              <a:off x="2284520" y="2552701"/>
+              <a:ext cx="783771" cy="272143"/>
+            </a:xfrm>
+            <a:prstGeom prst="roundRect">
+              <a:avLst/>
+            </a:prstGeom>
+          </p:spPr>
+          <p:style>
+            <a:lnRef idx="2">
+              <a:schemeClr val="accent1">
+                <a:shade val="15000"/>
+              </a:schemeClr>
+            </a:lnRef>
+            <a:fillRef idx="1">
+              <a:schemeClr val="accent1"/>
+            </a:fillRef>
+            <a:effectRef idx="0">
+              <a:schemeClr val="accent1"/>
+            </a:effectRef>
+            <a:fontRef idx="minor">
+              <a:schemeClr val="lt1"/>
+            </a:fontRef>
+          </p:style>
+          <p:txBody>
+            <a:bodyPr rtlCol="0" anchor="ctr"/>
+            <a:lstStyle/>
+            <a:p>
+              <a:pPr algn="ctr"/>
+              <a:r>
+                <a:rPr lang="en-US" dirty="0"/>
+                <a:t>506</a:t>
+              </a:r>
+              <a:endParaRPr lang="LID4096" dirty="0"/>
+            </a:p>
+          </p:txBody>
+        </p:sp>
+      </p:grpSp>
+      <p:grpSp>
+        <p:nvGrpSpPr>
+          <p:cNvPr id="23" name="Group 22">
+            <a:extLst>
+              <a:ext uri="{FF2B5EF4-FFF2-40B4-BE49-F238E27FC236}">
+                <a16:creationId xmlns:a16="http://schemas.microsoft.com/office/drawing/2014/main" id="{79BA9F85-CC69-82E9-6FE4-3DCFFEE4A26C}"/>
+              </a:ext>
+            </a:extLst>
+          </p:cNvPr>
+          <p:cNvGrpSpPr/>
+          <p:nvPr/>
+        </p:nvGrpSpPr>
+        <p:grpSpPr>
+          <a:xfrm>
+            <a:off x="5966302" y="3513756"/>
+            <a:ext cx="1848711" cy="1289176"/>
+            <a:chOff x="2198913" y="1535668"/>
+            <a:chExt cx="1848711" cy="1289176"/>
+          </a:xfrm>
+        </p:grpSpPr>
+        <p:grpSp>
+          <p:nvGrpSpPr>
+            <p:cNvPr id="24" name="Group 23">
+              <a:extLst>
+                <a:ext uri="{FF2B5EF4-FFF2-40B4-BE49-F238E27FC236}">
+                  <a16:creationId xmlns:a16="http://schemas.microsoft.com/office/drawing/2014/main" id="{ABDF7043-C8E5-A774-4C50-548D3A529ED8}"/>
+                </a:ext>
+              </a:extLst>
+            </p:cNvPr>
+            <p:cNvGrpSpPr/>
+            <p:nvPr/>
+          </p:nvGrpSpPr>
+          <p:grpSpPr>
+            <a:xfrm>
+              <a:off x="2198913" y="1535668"/>
+              <a:ext cx="1848711" cy="1163989"/>
+              <a:chOff x="2198913" y="1535668"/>
+              <a:chExt cx="1848711" cy="1163989"/>
+            </a:xfrm>
+          </p:grpSpPr>
+          <p:sp>
+            <p:nvSpPr>
+              <p:cNvPr id="26" name="Rectangle: Folded Corner 25">
+                <a:extLst>
+                  <a:ext uri="{FF2B5EF4-FFF2-40B4-BE49-F238E27FC236}">
+                    <a16:creationId xmlns:a16="http://schemas.microsoft.com/office/drawing/2014/main" id="{02416266-CD89-3B8F-7367-324D0AB05012}"/>
+                  </a:ext>
+                </a:extLst>
+              </p:cNvPr>
+              <p:cNvSpPr/>
+              <p:nvPr/>
+            </p:nvSpPr>
+            <p:spPr>
+              <a:xfrm>
+                <a:off x="2785263" y="1905000"/>
+                <a:ext cx="566057" cy="794657"/>
+              </a:xfrm>
+              <a:prstGeom prst="foldedCorner">
+                <a:avLst/>
+              </a:prstGeom>
+              <a:solidFill>
+                <a:schemeClr val="bg1"/>
+              </a:solidFill>
+            </p:spPr>
+            <p:style>
+              <a:lnRef idx="2">
+                <a:schemeClr val="accent1">
+                  <a:shade val="15000"/>
+                </a:schemeClr>
+              </a:lnRef>
+              <a:fillRef idx="1">
+                <a:schemeClr val="accent1"/>
+              </a:fillRef>
+              <a:effectRef idx="0">
+                <a:schemeClr val="accent1"/>
+              </a:effectRef>
+              <a:fontRef idx="minor">
+                <a:schemeClr val="lt1"/>
+              </a:fontRef>
+            </p:style>
+            <p:txBody>
+              <a:bodyPr rtlCol="0" anchor="ctr"/>
+              <a:lstStyle/>
+              <a:p>
+                <a:pPr algn="ctr"/>
+                <a:endParaRPr lang="LID4096"/>
+              </a:p>
+            </p:txBody>
+          </p:sp>
+          <p:sp>
+            <p:nvSpPr>
+              <p:cNvPr id="27" name="TextBox 26">
+                <a:extLst>
+                  <a:ext uri="{FF2B5EF4-FFF2-40B4-BE49-F238E27FC236}">
+                    <a16:creationId xmlns:a16="http://schemas.microsoft.com/office/drawing/2014/main" id="{1AB8BDDE-1AEE-753B-149F-2BF57A70FFAB}"/>
+                  </a:ext>
+                </a:extLst>
+              </p:cNvPr>
+              <p:cNvSpPr txBox="1"/>
+              <p:nvPr/>
+            </p:nvSpPr>
+            <p:spPr>
+              <a:xfrm>
+                <a:off x="2198913" y="1535668"/>
+                <a:ext cx="1848711" cy="369332"/>
+              </a:xfrm>
+              <a:prstGeom prst="rect">
+                <a:avLst/>
+              </a:prstGeom>
+              <a:noFill/>
+            </p:spPr>
+            <p:txBody>
+              <a:bodyPr wrap="none" rtlCol="0">
+                <a:spAutoFit/>
+              </a:bodyPr>
+              <a:lstStyle/>
+              <a:p>
+                <a:r>
+                  <a:rPr lang="en-US" dirty="0"/>
+                  <a:t>process_2.slurm</a:t>
+                </a:r>
+                <a:endParaRPr lang="LID4096" dirty="0"/>
+              </a:p>
+            </p:txBody>
+          </p:sp>
+        </p:grpSp>
+        <p:sp>
+          <p:nvSpPr>
+            <p:cNvPr id="25" name="Rectangle: Rounded Corners 24">
+              <a:extLst>
+                <a:ext uri="{FF2B5EF4-FFF2-40B4-BE49-F238E27FC236}">
+                  <a16:creationId xmlns:a16="http://schemas.microsoft.com/office/drawing/2014/main" id="{288C371D-BD64-23D5-E941-55079FF93A1F}"/>
+                </a:ext>
+              </a:extLst>
+            </p:cNvPr>
+            <p:cNvSpPr/>
+            <p:nvPr/>
+          </p:nvSpPr>
+          <p:spPr>
+            <a:xfrm>
+              <a:off x="2284520" y="2552701"/>
+              <a:ext cx="783771" cy="272143"/>
+            </a:xfrm>
+            <a:prstGeom prst="roundRect">
+              <a:avLst/>
+            </a:prstGeom>
+          </p:spPr>
+          <p:style>
+            <a:lnRef idx="2">
+              <a:schemeClr val="accent1">
+                <a:shade val="15000"/>
+              </a:schemeClr>
+            </a:lnRef>
+            <a:fillRef idx="1">
+              <a:schemeClr val="accent1"/>
+            </a:fillRef>
+            <a:effectRef idx="0">
+              <a:schemeClr val="accent1"/>
+            </a:effectRef>
+            <a:fontRef idx="minor">
+              <a:schemeClr val="lt1"/>
+            </a:fontRef>
+          </p:style>
+          <p:txBody>
+            <a:bodyPr rtlCol="0" anchor="ctr"/>
+            <a:lstStyle/>
+            <a:p>
+              <a:pPr algn="ctr"/>
+              <a:r>
+                <a:rPr lang="en-US" dirty="0"/>
+                <a:t>507</a:t>
+              </a:r>
+              <a:endParaRPr lang="LID4096" dirty="0"/>
+            </a:p>
+          </p:txBody>
+        </p:sp>
+      </p:grpSp>
+      <p:grpSp>
+        <p:nvGrpSpPr>
+          <p:cNvPr id="28" name="Group 27">
+            <a:extLst>
+              <a:ext uri="{FF2B5EF4-FFF2-40B4-BE49-F238E27FC236}">
+                <a16:creationId xmlns:a16="http://schemas.microsoft.com/office/drawing/2014/main" id="{9A14C215-448C-EB79-FF7A-C9F847E3C655}"/>
+              </a:ext>
+            </a:extLst>
+          </p:cNvPr>
+          <p:cNvGrpSpPr/>
+          <p:nvPr/>
+        </p:nvGrpSpPr>
+        <p:grpSpPr>
+          <a:xfrm>
+            <a:off x="4656912" y="5432299"/>
+            <a:ext cx="2059025" cy="1289176"/>
+            <a:chOff x="2079170" y="1535668"/>
+            <a:chExt cx="2059025" cy="1289176"/>
+          </a:xfrm>
+        </p:grpSpPr>
+        <p:grpSp>
+          <p:nvGrpSpPr>
+            <p:cNvPr id="29" name="Group 28">
+              <a:extLst>
+                <a:ext uri="{FF2B5EF4-FFF2-40B4-BE49-F238E27FC236}">
+                  <a16:creationId xmlns:a16="http://schemas.microsoft.com/office/drawing/2014/main" id="{6A54D21F-918E-83EE-4787-D01B87DBBDDC}"/>
+                </a:ext>
+              </a:extLst>
+            </p:cNvPr>
+            <p:cNvGrpSpPr/>
+            <p:nvPr/>
+          </p:nvGrpSpPr>
+          <p:grpSpPr>
+            <a:xfrm>
+              <a:off x="2079170" y="1535668"/>
+              <a:ext cx="2059025" cy="1163989"/>
+              <a:chOff x="2079170" y="1535668"/>
+              <a:chExt cx="2059025" cy="1163989"/>
+            </a:xfrm>
+          </p:grpSpPr>
+          <p:sp>
+            <p:nvSpPr>
+              <p:cNvPr id="31" name="Rectangle: Folded Corner 30">
+                <a:extLst>
+                  <a:ext uri="{FF2B5EF4-FFF2-40B4-BE49-F238E27FC236}">
+                    <a16:creationId xmlns:a16="http://schemas.microsoft.com/office/drawing/2014/main" id="{52015C28-E58E-7B74-748F-1076952693A4}"/>
+                  </a:ext>
+                </a:extLst>
+              </p:cNvPr>
+              <p:cNvSpPr/>
+              <p:nvPr/>
+            </p:nvSpPr>
+            <p:spPr>
+              <a:xfrm>
+                <a:off x="2785263" y="1905000"/>
+                <a:ext cx="566057" cy="794657"/>
+              </a:xfrm>
+              <a:prstGeom prst="foldedCorner">
+                <a:avLst/>
+              </a:prstGeom>
+              <a:solidFill>
+                <a:schemeClr val="bg1"/>
+              </a:solidFill>
+            </p:spPr>
+            <p:style>
+              <a:lnRef idx="2">
+                <a:schemeClr val="accent1">
+                  <a:shade val="15000"/>
+                </a:schemeClr>
+              </a:lnRef>
+              <a:fillRef idx="1">
+                <a:schemeClr val="accent1"/>
+              </a:fillRef>
+              <a:effectRef idx="0">
+                <a:schemeClr val="accent1"/>
+              </a:effectRef>
+              <a:fontRef idx="minor">
+                <a:schemeClr val="lt1"/>
+              </a:fontRef>
+            </p:style>
+            <p:txBody>
+              <a:bodyPr rtlCol="0" anchor="ctr"/>
+              <a:lstStyle/>
+              <a:p>
+                <a:pPr algn="ctr"/>
+                <a:endParaRPr lang="LID4096"/>
+              </a:p>
+            </p:txBody>
+          </p:sp>
+          <p:sp>
+            <p:nvSpPr>
+              <p:cNvPr id="32" name="TextBox 31">
+                <a:extLst>
+                  <a:ext uri="{FF2B5EF4-FFF2-40B4-BE49-F238E27FC236}">
+                    <a16:creationId xmlns:a16="http://schemas.microsoft.com/office/drawing/2014/main" id="{1111980E-BA31-F5E4-6C93-4035687952BD}"/>
+                  </a:ext>
+                </a:extLst>
+              </p:cNvPr>
+              <p:cNvSpPr txBox="1"/>
+              <p:nvPr/>
+            </p:nvSpPr>
+            <p:spPr>
+              <a:xfrm>
+                <a:off x="2079170" y="1535668"/>
+                <a:ext cx="2059025" cy="369332"/>
+              </a:xfrm>
+              <a:prstGeom prst="rect">
+                <a:avLst/>
+              </a:prstGeom>
+              <a:noFill/>
+            </p:spPr>
+            <p:txBody>
+              <a:bodyPr wrap="none" rtlCol="0">
+                <a:spAutoFit/>
+              </a:bodyPr>
+              <a:lstStyle/>
+              <a:p>
+                <a:r>
+                  <a:rPr lang="en-US" dirty="0" err="1"/>
+                  <a:t>postprocess.slurm</a:t>
+                </a:r>
+                <a:endParaRPr lang="LID4096" dirty="0"/>
+              </a:p>
+            </p:txBody>
+          </p:sp>
+        </p:grpSp>
+        <p:sp>
+          <p:nvSpPr>
+            <p:cNvPr id="30" name="Rectangle: Rounded Corners 29">
+              <a:extLst>
+                <a:ext uri="{FF2B5EF4-FFF2-40B4-BE49-F238E27FC236}">
+                  <a16:creationId xmlns:a16="http://schemas.microsoft.com/office/drawing/2014/main" id="{1856B132-3E82-2B07-81EB-4614352170EB}"/>
+                </a:ext>
+              </a:extLst>
+            </p:cNvPr>
+            <p:cNvSpPr/>
+            <p:nvPr/>
+          </p:nvSpPr>
+          <p:spPr>
+            <a:xfrm>
+              <a:off x="2284520" y="2552701"/>
+              <a:ext cx="783771" cy="272143"/>
+            </a:xfrm>
+            <a:prstGeom prst="roundRect">
+              <a:avLst/>
+            </a:prstGeom>
+          </p:spPr>
+          <p:style>
+            <a:lnRef idx="2">
+              <a:schemeClr val="accent1">
+                <a:shade val="15000"/>
+              </a:schemeClr>
+            </a:lnRef>
+            <a:fillRef idx="1">
+              <a:schemeClr val="accent1"/>
+            </a:fillRef>
+            <a:effectRef idx="0">
+              <a:schemeClr val="accent1"/>
+            </a:effectRef>
+            <a:fontRef idx="minor">
+              <a:schemeClr val="lt1"/>
+            </a:fontRef>
+          </p:style>
+          <p:txBody>
+            <a:bodyPr rtlCol="0" anchor="ctr"/>
+            <a:lstStyle/>
+            <a:p>
+              <a:pPr algn="ctr"/>
+              <a:r>
+                <a:rPr lang="en-US" dirty="0"/>
+                <a:t>508</a:t>
+              </a:r>
+              <a:endParaRPr lang="LID4096" dirty="0"/>
+            </a:p>
+          </p:txBody>
+        </p:sp>
+      </p:grpSp>
+      <p:sp>
+        <p:nvSpPr>
+          <p:cNvPr id="33" name="Arrow: Up 32">
+            <a:extLst>
+              <a:ext uri="{FF2B5EF4-FFF2-40B4-BE49-F238E27FC236}">
+                <a16:creationId xmlns:a16="http://schemas.microsoft.com/office/drawing/2014/main" id="{FFA00B24-E944-304D-B419-C191E14E8419}"/>
+              </a:ext>
+            </a:extLst>
+          </p:cNvPr>
+          <p:cNvSpPr/>
+          <p:nvPr/>
+        </p:nvSpPr>
+        <p:spPr>
+          <a:xfrm rot="19367276">
+            <a:off x="3601692" y="2836436"/>
+            <a:ext cx="217715" cy="611930"/>
+          </a:xfrm>
+          <a:prstGeom prst="upArrow">
+            <a:avLst/>
+          </a:prstGeom>
+          <a:solidFill>
+            <a:srgbClr val="00B050"/>
+          </a:solidFill>
+          <a:ln>
+            <a:solidFill>
+              <a:srgbClr val="00B050"/>
+            </a:solidFill>
+          </a:ln>
+        </p:spPr>
+        <p:style>
+          <a:lnRef idx="2">
+            <a:schemeClr val="accent1">
+              <a:shade val="15000"/>
+            </a:schemeClr>
+          </a:lnRef>
+          <a:fillRef idx="1">
+            <a:schemeClr val="accent1"/>
+          </a:fillRef>
+          <a:effectRef idx="0">
+            <a:schemeClr val="accent1"/>
+          </a:effectRef>
+          <a:fontRef idx="minor">
+            <a:schemeClr val="lt1"/>
+          </a:fontRef>
+        </p:style>
+        <p:txBody>
+          <a:bodyPr rtlCol="0" anchor="ctr"/>
+          <a:lstStyle/>
+          <a:p>
+            <a:pPr algn="ctr"/>
+            <a:endParaRPr lang="LID4096"/>
+          </a:p>
+        </p:txBody>
+      </p:sp>
+      <p:sp>
+        <p:nvSpPr>
+          <p:cNvPr id="34" name="Arrow: Up 33">
+            <a:extLst>
+              <a:ext uri="{FF2B5EF4-FFF2-40B4-BE49-F238E27FC236}">
+                <a16:creationId xmlns:a16="http://schemas.microsoft.com/office/drawing/2014/main" id="{AC52F1F0-343E-6B0B-3772-37043E3354EA}"/>
+              </a:ext>
+            </a:extLst>
+          </p:cNvPr>
+          <p:cNvSpPr/>
+          <p:nvPr/>
+        </p:nvSpPr>
+        <p:spPr>
+          <a:xfrm rot="1868865">
+            <a:off x="4862574" y="2836436"/>
+            <a:ext cx="217715" cy="611930"/>
+          </a:xfrm>
+          <a:prstGeom prst="upArrow">
+            <a:avLst/>
+          </a:prstGeom>
+          <a:solidFill>
+            <a:srgbClr val="00B050"/>
+          </a:solidFill>
+          <a:ln>
+            <a:solidFill>
+              <a:srgbClr val="00B050"/>
+            </a:solidFill>
+          </a:ln>
+        </p:spPr>
+        <p:style>
+          <a:lnRef idx="2">
+            <a:schemeClr val="accent1">
+              <a:shade val="15000"/>
+            </a:schemeClr>
+          </a:lnRef>
+          <a:fillRef idx="1">
+            <a:schemeClr val="accent1"/>
+          </a:fillRef>
+          <a:effectRef idx="0">
+            <a:schemeClr val="accent1"/>
+          </a:effectRef>
+          <a:fontRef idx="minor">
+            <a:schemeClr val="lt1"/>
+          </a:fontRef>
+        </p:style>
+        <p:txBody>
+          <a:bodyPr rtlCol="0" anchor="ctr"/>
+          <a:lstStyle/>
+          <a:p>
+            <a:pPr algn="ctr"/>
+            <a:endParaRPr lang="LID4096"/>
+          </a:p>
+        </p:txBody>
+      </p:sp>
+      <p:sp>
+        <p:nvSpPr>
+          <p:cNvPr id="35" name="Arrow: Up 34">
+            <a:extLst>
+              <a:ext uri="{FF2B5EF4-FFF2-40B4-BE49-F238E27FC236}">
+                <a16:creationId xmlns:a16="http://schemas.microsoft.com/office/drawing/2014/main" id="{3EC977E0-4438-E9F5-8D85-6A0BAE1AD1A4}"/>
+              </a:ext>
+            </a:extLst>
+          </p:cNvPr>
+          <p:cNvSpPr/>
+          <p:nvPr/>
+        </p:nvSpPr>
+        <p:spPr>
+          <a:xfrm rot="19367276">
+            <a:off x="6493982" y="2836436"/>
+            <a:ext cx="217715" cy="611930"/>
+          </a:xfrm>
+          <a:prstGeom prst="upArrow">
+            <a:avLst/>
+          </a:prstGeom>
+          <a:pattFill prst="dkHorz">
+            <a:fgClr>
+              <a:srgbClr val="00B050"/>
+            </a:fgClr>
+            <a:bgClr>
+              <a:schemeClr val="bg1"/>
+            </a:bgClr>
+          </a:pattFill>
+          <a:ln>
+            <a:noFill/>
+          </a:ln>
+        </p:spPr>
+        <p:style>
+          <a:lnRef idx="2">
+            <a:schemeClr val="accent1">
+              <a:shade val="15000"/>
+            </a:schemeClr>
+          </a:lnRef>
+          <a:fillRef idx="1">
+            <a:schemeClr val="accent1"/>
+          </a:fillRef>
+          <a:effectRef idx="0">
+            <a:schemeClr val="accent1"/>
+          </a:effectRef>
+          <a:fontRef idx="minor">
+            <a:schemeClr val="lt1"/>
+          </a:fontRef>
+        </p:style>
+        <p:txBody>
+          <a:bodyPr rtlCol="0" anchor="ctr"/>
+          <a:lstStyle/>
+          <a:p>
+            <a:pPr algn="ctr"/>
+            <a:endParaRPr lang="LID4096"/>
+          </a:p>
+        </p:txBody>
+      </p:sp>
+      <p:sp>
+        <p:nvSpPr>
+          <p:cNvPr id="36" name="Arrow: Up 35">
+            <a:extLst>
+              <a:ext uri="{FF2B5EF4-FFF2-40B4-BE49-F238E27FC236}">
+                <a16:creationId xmlns:a16="http://schemas.microsoft.com/office/drawing/2014/main" id="{7FEDC41A-0666-0A44-4D85-387897F70882}"/>
+              </a:ext>
+            </a:extLst>
+          </p:cNvPr>
+          <p:cNvSpPr/>
+          <p:nvPr/>
+        </p:nvSpPr>
+        <p:spPr>
+          <a:xfrm rot="19367276">
+            <a:off x="4862575" y="4818313"/>
+            <a:ext cx="217715" cy="611930"/>
+          </a:xfrm>
+          <a:prstGeom prst="upArrow">
+            <a:avLst/>
+          </a:prstGeom>
+          <a:solidFill>
+            <a:srgbClr val="00B050"/>
+          </a:solidFill>
+          <a:ln>
+            <a:solidFill>
+              <a:srgbClr val="00B050"/>
+            </a:solidFill>
+          </a:ln>
+        </p:spPr>
+        <p:style>
+          <a:lnRef idx="2">
+            <a:schemeClr val="accent1">
+              <a:shade val="15000"/>
+            </a:schemeClr>
+          </a:lnRef>
+          <a:fillRef idx="1">
+            <a:schemeClr val="accent1"/>
+          </a:fillRef>
+          <a:effectRef idx="0">
+            <a:schemeClr val="accent1"/>
+          </a:effectRef>
+          <a:fontRef idx="minor">
+            <a:schemeClr val="lt1"/>
+          </a:fontRef>
+        </p:style>
+        <p:txBody>
+          <a:bodyPr rtlCol="0" anchor="ctr"/>
+          <a:lstStyle/>
+          <a:p>
+            <a:pPr algn="ctr"/>
+            <a:endParaRPr lang="LID4096"/>
+          </a:p>
+        </p:txBody>
+      </p:sp>
+      <p:sp>
+        <p:nvSpPr>
+          <p:cNvPr id="37" name="Arrow: Up 36">
+            <a:extLst>
+              <a:ext uri="{FF2B5EF4-FFF2-40B4-BE49-F238E27FC236}">
+                <a16:creationId xmlns:a16="http://schemas.microsoft.com/office/drawing/2014/main" id="{FBFC2DF0-BEFC-FA03-0C35-3B58601D11F6}"/>
+              </a:ext>
+            </a:extLst>
+          </p:cNvPr>
+          <p:cNvSpPr/>
+          <p:nvPr/>
+        </p:nvSpPr>
+        <p:spPr>
+          <a:xfrm rot="1868865">
+            <a:off x="6123457" y="4818313"/>
+            <a:ext cx="217715" cy="611930"/>
+          </a:xfrm>
+          <a:prstGeom prst="upArrow">
+            <a:avLst/>
+          </a:prstGeom>
+          <a:solidFill>
+            <a:srgbClr val="00B050"/>
+          </a:solidFill>
+          <a:ln>
+            <a:solidFill>
+              <a:srgbClr val="00B050"/>
+            </a:solidFill>
+          </a:ln>
+        </p:spPr>
+        <p:style>
+          <a:lnRef idx="2">
+            <a:schemeClr val="accent1">
+              <a:shade val="15000"/>
+            </a:schemeClr>
+          </a:lnRef>
+          <a:fillRef idx="1">
+            <a:schemeClr val="accent1"/>
+          </a:fillRef>
+          <a:effectRef idx="0">
+            <a:schemeClr val="accent1"/>
+          </a:effectRef>
+          <a:fontRef idx="minor">
+            <a:schemeClr val="lt1"/>
+          </a:fontRef>
+        </p:style>
+        <p:txBody>
+          <a:bodyPr rtlCol="0" anchor="ctr"/>
+          <a:lstStyle/>
+          <a:p>
+            <a:pPr algn="ctr"/>
+            <a:endParaRPr lang="LID4096"/>
+          </a:p>
+        </p:txBody>
+      </p:sp>
+      <p:sp>
+        <p:nvSpPr>
+          <p:cNvPr id="38" name="TextBox 37">
+            <a:extLst>
+              <a:ext uri="{FF2B5EF4-FFF2-40B4-BE49-F238E27FC236}">
+                <a16:creationId xmlns:a16="http://schemas.microsoft.com/office/drawing/2014/main" id="{CBA6D92E-48CA-A751-97CC-FB07C13788B1}"/>
+              </a:ext>
+            </a:extLst>
+          </p:cNvPr>
+          <p:cNvSpPr txBox="1"/>
+          <p:nvPr/>
+        </p:nvSpPr>
+        <p:spPr>
+          <a:xfrm>
+            <a:off x="1253688" y="4934343"/>
+            <a:ext cx="2666114" cy="369332"/>
+          </a:xfrm>
+          <a:prstGeom prst="rect">
+            <a:avLst/>
+          </a:prstGeom>
+          <a:noFill/>
+          <a:ln>
+            <a:solidFill>
+              <a:schemeClr val="tx1"/>
+            </a:solidFill>
+          </a:ln>
+        </p:spPr>
+        <p:txBody>
+          <a:bodyPr wrap="none" rtlCol="0">
+            <a:spAutoFit/>
+          </a:bodyPr>
+          <a:lstStyle/>
+          <a:p>
+            <a:r>
+              <a:rPr lang="en-US" dirty="0">
+                <a:latin typeface="Courier New" panose="02070309020205020404" pitchFamily="49" charset="0"/>
+                <a:cs typeface="Courier New" panose="02070309020205020404" pitchFamily="49" charset="0"/>
+              </a:rPr>
+              <a:t>-d=afterok:501:502</a:t>
+            </a:r>
+            <a:endParaRPr lang="LID4096" dirty="0">
+              <a:latin typeface="Courier New" panose="02070309020205020404" pitchFamily="49" charset="0"/>
+              <a:cs typeface="Courier New" panose="02070309020205020404" pitchFamily="49" charset="0"/>
+            </a:endParaRPr>
+          </a:p>
+        </p:txBody>
+      </p:sp>
+      <p:sp>
+        <p:nvSpPr>
+          <p:cNvPr id="39" name="TextBox 38">
+            <a:extLst>
+              <a:ext uri="{FF2B5EF4-FFF2-40B4-BE49-F238E27FC236}">
+                <a16:creationId xmlns:a16="http://schemas.microsoft.com/office/drawing/2014/main" id="{89111A51-56FE-EA81-A5F7-58417F501155}"/>
+              </a:ext>
+            </a:extLst>
+          </p:cNvPr>
+          <p:cNvSpPr txBox="1"/>
+          <p:nvPr/>
+        </p:nvSpPr>
+        <p:spPr>
+          <a:xfrm>
+            <a:off x="6531425" y="4912571"/>
+            <a:ext cx="3906839" cy="369332"/>
+          </a:xfrm>
+          <a:prstGeom prst="rect">
+            <a:avLst/>
+          </a:prstGeom>
+          <a:noFill/>
+          <a:ln>
+            <a:solidFill>
+              <a:schemeClr val="tx1"/>
+            </a:solidFill>
+          </a:ln>
+        </p:spPr>
+        <p:txBody>
+          <a:bodyPr wrap="none" rtlCol="0">
+            <a:spAutoFit/>
+          </a:bodyPr>
+          <a:lstStyle/>
+          <a:p>
+            <a:r>
+              <a:rPr lang="en-US" dirty="0">
+                <a:latin typeface="Courier New" panose="02070309020205020404" pitchFamily="49" charset="0"/>
+                <a:cs typeface="Courier New" panose="02070309020205020404" pitchFamily="49" charset="0"/>
+              </a:rPr>
+              <a:t>-d=afterany:502,afterok:505</a:t>
+            </a:r>
+            <a:endParaRPr lang="LID4096" dirty="0">
+              <a:latin typeface="Courier New" panose="02070309020205020404" pitchFamily="49" charset="0"/>
+              <a:cs typeface="Courier New" panose="02070309020205020404" pitchFamily="49" charset="0"/>
+            </a:endParaRPr>
+          </a:p>
+        </p:txBody>
+      </p:sp>
+      <p:grpSp>
+        <p:nvGrpSpPr>
+          <p:cNvPr id="40" name="Group 39">
+            <a:extLst>
+              <a:ext uri="{FF2B5EF4-FFF2-40B4-BE49-F238E27FC236}">
+                <a16:creationId xmlns:a16="http://schemas.microsoft.com/office/drawing/2014/main" id="{61FCBC10-5180-8932-A7A9-5AF117EE549B}"/>
+              </a:ext>
+            </a:extLst>
+          </p:cNvPr>
+          <p:cNvGrpSpPr/>
+          <p:nvPr/>
+        </p:nvGrpSpPr>
+        <p:grpSpPr>
+          <a:xfrm>
+            <a:off x="7456544" y="123293"/>
+            <a:ext cx="2166427" cy="1289176"/>
+            <a:chOff x="2046515" y="1535668"/>
+            <a:chExt cx="2166427" cy="1289176"/>
+          </a:xfrm>
+        </p:grpSpPr>
+        <p:grpSp>
+          <p:nvGrpSpPr>
+            <p:cNvPr id="41" name="Group 40">
+              <a:extLst>
+                <a:ext uri="{FF2B5EF4-FFF2-40B4-BE49-F238E27FC236}">
+                  <a16:creationId xmlns:a16="http://schemas.microsoft.com/office/drawing/2014/main" id="{BB3498DF-657C-D4A3-BA49-0A5583EEE18F}"/>
+                </a:ext>
+              </a:extLst>
+            </p:cNvPr>
+            <p:cNvGrpSpPr/>
+            <p:nvPr/>
+          </p:nvGrpSpPr>
+          <p:grpSpPr>
+            <a:xfrm>
+              <a:off x="2046515" y="1535668"/>
+              <a:ext cx="2166427" cy="1163989"/>
+              <a:chOff x="2046515" y="1535668"/>
+              <a:chExt cx="2166427" cy="1163989"/>
+            </a:xfrm>
+          </p:grpSpPr>
+          <p:sp>
+            <p:nvSpPr>
+              <p:cNvPr id="43" name="Rectangle: Folded Corner 42">
+                <a:extLst>
+                  <a:ext uri="{FF2B5EF4-FFF2-40B4-BE49-F238E27FC236}">
+                    <a16:creationId xmlns:a16="http://schemas.microsoft.com/office/drawing/2014/main" id="{82B14A26-4964-F0E2-5CF0-26AEB76D6591}"/>
+                  </a:ext>
+                </a:extLst>
+              </p:cNvPr>
+              <p:cNvSpPr/>
+              <p:nvPr/>
+            </p:nvSpPr>
+            <p:spPr>
+              <a:xfrm>
+                <a:off x="2785263" y="1905000"/>
+                <a:ext cx="566057" cy="794657"/>
+              </a:xfrm>
+              <a:prstGeom prst="foldedCorner">
+                <a:avLst/>
+              </a:prstGeom>
+              <a:solidFill>
+                <a:schemeClr val="bg1"/>
+              </a:solidFill>
+            </p:spPr>
+            <p:style>
+              <a:lnRef idx="2">
+                <a:schemeClr val="accent1">
+                  <a:shade val="15000"/>
+                </a:schemeClr>
+              </a:lnRef>
+              <a:fillRef idx="1">
+                <a:schemeClr val="accent1"/>
+              </a:fillRef>
+              <a:effectRef idx="0">
+                <a:schemeClr val="accent1"/>
+              </a:effectRef>
+              <a:fontRef idx="minor">
+                <a:schemeClr val="lt1"/>
+              </a:fontRef>
+            </p:style>
+            <p:txBody>
+              <a:bodyPr rtlCol="0" anchor="ctr"/>
+              <a:lstStyle/>
+              <a:p>
+                <a:pPr algn="ctr"/>
+                <a:endParaRPr lang="LID4096"/>
+              </a:p>
+            </p:txBody>
+          </p:sp>
+          <p:sp>
+            <p:nvSpPr>
+              <p:cNvPr id="44" name="TextBox 43">
+                <a:extLst>
+                  <a:ext uri="{FF2B5EF4-FFF2-40B4-BE49-F238E27FC236}">
+                    <a16:creationId xmlns:a16="http://schemas.microsoft.com/office/drawing/2014/main" id="{6029E503-A8E3-85DB-A127-D8DAE9835DC3}"/>
+                  </a:ext>
+                </a:extLst>
+              </p:cNvPr>
+              <p:cNvSpPr txBox="1"/>
+              <p:nvPr/>
+            </p:nvSpPr>
+            <p:spPr>
+              <a:xfrm>
+                <a:off x="2046515" y="1535668"/>
+                <a:ext cx="2166427" cy="369332"/>
+              </a:xfrm>
+              <a:prstGeom prst="rect">
+                <a:avLst/>
+              </a:prstGeom>
+              <a:noFill/>
+            </p:spPr>
+            <p:txBody>
+              <a:bodyPr wrap="none" rtlCol="0">
+                <a:spAutoFit/>
+              </a:bodyPr>
+              <a:lstStyle/>
+              <a:p>
+                <a:r>
+                  <a:rPr lang="en-US" dirty="0" err="1"/>
+                  <a:t>download_db.slurm</a:t>
+                </a:r>
+                <a:endParaRPr lang="LID4096" dirty="0"/>
+              </a:p>
+            </p:txBody>
+          </p:sp>
+        </p:grpSp>
+        <p:sp>
+          <p:nvSpPr>
+            <p:cNvPr id="42" name="Rectangle: Rounded Corners 41">
+              <a:extLst>
+                <a:ext uri="{FF2B5EF4-FFF2-40B4-BE49-F238E27FC236}">
+                  <a16:creationId xmlns:a16="http://schemas.microsoft.com/office/drawing/2014/main" id="{36DE0500-157D-1B68-574A-56E3EA1BA28C}"/>
+                </a:ext>
+              </a:extLst>
+            </p:cNvPr>
+            <p:cNvSpPr/>
+            <p:nvPr/>
+          </p:nvSpPr>
+          <p:spPr>
+            <a:xfrm>
+              <a:off x="2284520" y="2552701"/>
+              <a:ext cx="783771" cy="272143"/>
+            </a:xfrm>
+            <a:prstGeom prst="roundRect">
+              <a:avLst/>
+            </a:prstGeom>
+          </p:spPr>
+          <p:style>
+            <a:lnRef idx="2">
+              <a:schemeClr val="accent1">
+                <a:shade val="15000"/>
+              </a:schemeClr>
+            </a:lnRef>
+            <a:fillRef idx="1">
+              <a:schemeClr val="accent1"/>
+            </a:fillRef>
+            <a:effectRef idx="0">
+              <a:schemeClr val="accent1"/>
+            </a:effectRef>
+            <a:fontRef idx="minor">
+              <a:schemeClr val="lt1"/>
+            </a:fontRef>
+          </p:style>
+          <p:txBody>
+            <a:bodyPr rtlCol="0" anchor="ctr"/>
+            <a:lstStyle/>
+            <a:p>
+              <a:pPr algn="ctr"/>
+              <a:r>
+                <a:rPr lang="en-US" dirty="0"/>
+                <a:t>503</a:t>
+              </a:r>
+              <a:endParaRPr lang="LID4096" dirty="0"/>
+            </a:p>
+          </p:txBody>
+        </p:sp>
+      </p:grpSp>
+      <p:sp>
+        <p:nvSpPr>
+          <p:cNvPr id="45" name="Arrow: Up 44">
+            <a:extLst>
+              <a:ext uri="{FF2B5EF4-FFF2-40B4-BE49-F238E27FC236}">
+                <a16:creationId xmlns:a16="http://schemas.microsoft.com/office/drawing/2014/main" id="{80EC674C-D227-F75A-3196-15AA14CAD095}"/>
+              </a:ext>
+            </a:extLst>
+          </p:cNvPr>
+          <p:cNvSpPr/>
+          <p:nvPr/>
+        </p:nvSpPr>
+        <p:spPr>
+          <a:xfrm rot="3693472">
+            <a:off x="7684261" y="2885293"/>
+            <a:ext cx="217715" cy="611930"/>
+          </a:xfrm>
+          <a:prstGeom prst="upArrow">
+            <a:avLst/>
+          </a:prstGeom>
+          <a:solidFill>
+            <a:srgbClr val="00B050"/>
+          </a:solidFill>
+          <a:ln>
+            <a:noFill/>
+          </a:ln>
+        </p:spPr>
+        <p:style>
+          <a:lnRef idx="2">
+            <a:schemeClr val="accent1">
+              <a:shade val="15000"/>
+            </a:schemeClr>
+          </a:lnRef>
+          <a:fillRef idx="1">
+            <a:schemeClr val="accent1"/>
+          </a:fillRef>
+          <a:effectRef idx="0">
+            <a:schemeClr val="accent1"/>
+          </a:effectRef>
+          <a:fontRef idx="minor">
+            <a:schemeClr val="lt1"/>
+          </a:fontRef>
+        </p:style>
+        <p:txBody>
+          <a:bodyPr rtlCol="0" anchor="ctr"/>
+          <a:lstStyle/>
+          <a:p>
+            <a:pPr algn="ctr"/>
+            <a:endParaRPr lang="LID4096"/>
+          </a:p>
+        </p:txBody>
+      </p:sp>
+      <p:sp>
+        <p:nvSpPr>
+          <p:cNvPr id="46" name="TextBox 45">
+            <a:extLst>
+              <a:ext uri="{FF2B5EF4-FFF2-40B4-BE49-F238E27FC236}">
+                <a16:creationId xmlns:a16="http://schemas.microsoft.com/office/drawing/2014/main" id="{C0C36B08-EBAE-3FA8-897D-DC3FC814D4B7}"/>
+              </a:ext>
+            </a:extLst>
+          </p:cNvPr>
+          <p:cNvSpPr txBox="1"/>
+          <p:nvPr/>
+        </p:nvSpPr>
+        <p:spPr>
+          <a:xfrm>
+            <a:off x="2026572" y="6318355"/>
+            <a:ext cx="2666114" cy="369332"/>
+          </a:xfrm>
+          <a:prstGeom prst="rect">
+            <a:avLst/>
+          </a:prstGeom>
+          <a:noFill/>
+          <a:ln>
+            <a:solidFill>
+              <a:schemeClr val="tx1"/>
+            </a:solidFill>
+          </a:ln>
+        </p:spPr>
+        <p:txBody>
+          <a:bodyPr wrap="none" rtlCol="0">
+            <a:spAutoFit/>
+          </a:bodyPr>
+          <a:lstStyle/>
+          <a:p>
+            <a:r>
+              <a:rPr lang="en-US" dirty="0">
+                <a:latin typeface="Courier New" panose="02070309020205020404" pitchFamily="49" charset="0"/>
+                <a:cs typeface="Courier New" panose="02070309020205020404" pitchFamily="49" charset="0"/>
+              </a:rPr>
+              <a:t>-d=afterok:506:507</a:t>
+            </a:r>
+            <a:endParaRPr lang="LID4096" dirty="0">
+              <a:latin typeface="Courier New" panose="02070309020205020404" pitchFamily="49" charset="0"/>
+              <a:cs typeface="Courier New" panose="02070309020205020404" pitchFamily="49" charset="0"/>
+            </a:endParaRPr>
+          </a:p>
+        </p:txBody>
+      </p:sp>
+      <p:grpSp>
+        <p:nvGrpSpPr>
+          <p:cNvPr id="47" name="Group 46">
+            <a:extLst>
+              <a:ext uri="{FF2B5EF4-FFF2-40B4-BE49-F238E27FC236}">
+                <a16:creationId xmlns:a16="http://schemas.microsoft.com/office/drawing/2014/main" id="{E31CB5A4-9F6A-6233-EBCD-5002119C39A7}"/>
+              </a:ext>
+            </a:extLst>
+          </p:cNvPr>
+          <p:cNvGrpSpPr/>
+          <p:nvPr/>
+        </p:nvGrpSpPr>
+        <p:grpSpPr>
+          <a:xfrm>
+            <a:off x="9684069" y="123293"/>
+            <a:ext cx="2507931" cy="1289176"/>
+            <a:chOff x="2046515" y="1535668"/>
+            <a:chExt cx="2507931" cy="1289176"/>
+          </a:xfrm>
+        </p:grpSpPr>
+        <p:grpSp>
+          <p:nvGrpSpPr>
+            <p:cNvPr id="48" name="Group 47">
+              <a:extLst>
+                <a:ext uri="{FF2B5EF4-FFF2-40B4-BE49-F238E27FC236}">
+                  <a16:creationId xmlns:a16="http://schemas.microsoft.com/office/drawing/2014/main" id="{A6B33C7D-4C0E-0465-AE21-EF1B4E0E5B76}"/>
+                </a:ext>
+              </a:extLst>
+            </p:cNvPr>
+            <p:cNvGrpSpPr/>
+            <p:nvPr/>
+          </p:nvGrpSpPr>
+          <p:grpSpPr>
+            <a:xfrm>
+              <a:off x="2046515" y="1535668"/>
+              <a:ext cx="2507931" cy="1163989"/>
+              <a:chOff x="2046515" y="1535668"/>
+              <a:chExt cx="2507931" cy="1163989"/>
+            </a:xfrm>
+          </p:grpSpPr>
+          <p:sp>
+            <p:nvSpPr>
+              <p:cNvPr id="50" name="Rectangle: Folded Corner 49">
+                <a:extLst>
+                  <a:ext uri="{FF2B5EF4-FFF2-40B4-BE49-F238E27FC236}">
+                    <a16:creationId xmlns:a16="http://schemas.microsoft.com/office/drawing/2014/main" id="{F818C888-E3B1-0770-F511-9D13967F12C4}"/>
+                  </a:ext>
+                </a:extLst>
+              </p:cNvPr>
+              <p:cNvSpPr/>
+              <p:nvPr/>
+            </p:nvSpPr>
+            <p:spPr>
+              <a:xfrm>
+                <a:off x="2785263" y="1905000"/>
+                <a:ext cx="566057" cy="794657"/>
+              </a:xfrm>
+              <a:prstGeom prst="foldedCorner">
+                <a:avLst/>
+              </a:prstGeom>
+              <a:solidFill>
+                <a:schemeClr val="bg1"/>
+              </a:solidFill>
+            </p:spPr>
+            <p:style>
+              <a:lnRef idx="2">
+                <a:schemeClr val="accent1">
+                  <a:shade val="15000"/>
+                </a:schemeClr>
+              </a:lnRef>
+              <a:fillRef idx="1">
+                <a:schemeClr val="accent1"/>
+              </a:fillRef>
+              <a:effectRef idx="0">
+                <a:schemeClr val="accent1"/>
+              </a:effectRef>
+              <a:fontRef idx="minor">
+                <a:schemeClr val="lt1"/>
+              </a:fontRef>
+            </p:style>
+            <p:txBody>
+              <a:bodyPr rtlCol="0" anchor="ctr"/>
+              <a:lstStyle/>
+              <a:p>
+                <a:pPr algn="ctr"/>
+                <a:endParaRPr lang="LID4096"/>
+              </a:p>
+            </p:txBody>
+          </p:sp>
+          <p:sp>
+            <p:nvSpPr>
+              <p:cNvPr id="51" name="TextBox 50">
+                <a:extLst>
+                  <a:ext uri="{FF2B5EF4-FFF2-40B4-BE49-F238E27FC236}">
+                    <a16:creationId xmlns:a16="http://schemas.microsoft.com/office/drawing/2014/main" id="{72B79012-F1D2-29F7-8C85-656F60642A03}"/>
+                  </a:ext>
+                </a:extLst>
+              </p:cNvPr>
+              <p:cNvSpPr txBox="1"/>
+              <p:nvPr/>
+            </p:nvSpPr>
+            <p:spPr>
+              <a:xfrm>
+                <a:off x="2046515" y="1535668"/>
+                <a:ext cx="2507931" cy="369332"/>
+              </a:xfrm>
+              <a:prstGeom prst="rect">
+                <a:avLst/>
+              </a:prstGeom>
+              <a:noFill/>
+            </p:spPr>
+            <p:txBody>
+              <a:bodyPr wrap="none" rtlCol="0">
+                <a:spAutoFit/>
+              </a:bodyPr>
+              <a:lstStyle/>
+              <a:p>
+                <a:r>
+                  <a:rPr lang="en-US" dirty="0" err="1"/>
+                  <a:t>copy_backup_db.slurm</a:t>
+                </a:r>
+                <a:endParaRPr lang="LID4096" dirty="0"/>
+              </a:p>
+            </p:txBody>
+          </p:sp>
+        </p:grpSp>
+        <p:sp>
+          <p:nvSpPr>
+            <p:cNvPr id="49" name="Rectangle: Rounded Corners 48">
+              <a:extLst>
+                <a:ext uri="{FF2B5EF4-FFF2-40B4-BE49-F238E27FC236}">
+                  <a16:creationId xmlns:a16="http://schemas.microsoft.com/office/drawing/2014/main" id="{D0F46604-10E6-467F-9F0F-053FCB65AEE8}"/>
+                </a:ext>
+              </a:extLst>
+            </p:cNvPr>
+            <p:cNvSpPr/>
+            <p:nvPr/>
+          </p:nvSpPr>
+          <p:spPr>
+            <a:xfrm>
+              <a:off x="2284520" y="2552701"/>
+              <a:ext cx="783771" cy="272143"/>
+            </a:xfrm>
+            <a:prstGeom prst="roundRect">
+              <a:avLst/>
+            </a:prstGeom>
+          </p:spPr>
+          <p:style>
+            <a:lnRef idx="2">
+              <a:schemeClr val="accent1">
+                <a:shade val="15000"/>
+              </a:schemeClr>
+            </a:lnRef>
+            <a:fillRef idx="1">
+              <a:schemeClr val="accent1"/>
+            </a:fillRef>
+            <a:effectRef idx="0">
+              <a:schemeClr val="accent1"/>
+            </a:effectRef>
+            <a:fontRef idx="minor">
+              <a:schemeClr val="lt1"/>
+            </a:fontRef>
+          </p:style>
+          <p:txBody>
+            <a:bodyPr rtlCol="0" anchor="ctr"/>
+            <a:lstStyle/>
+            <a:p>
+              <a:pPr algn="ctr"/>
+              <a:r>
+                <a:rPr lang="en-US" dirty="0"/>
+                <a:t>504</a:t>
+              </a:r>
+              <a:endParaRPr lang="LID4096" dirty="0"/>
+            </a:p>
+          </p:txBody>
+        </p:sp>
+      </p:grpSp>
+      <p:sp>
+        <p:nvSpPr>
+          <p:cNvPr id="52" name="TextBox 51">
+            <a:extLst>
+              <a:ext uri="{FF2B5EF4-FFF2-40B4-BE49-F238E27FC236}">
+                <a16:creationId xmlns:a16="http://schemas.microsoft.com/office/drawing/2014/main" id="{1A618E49-F340-C5F9-7D79-712395CF81B8}"/>
+              </a:ext>
+            </a:extLst>
+          </p:cNvPr>
+          <p:cNvSpPr txBox="1"/>
+          <p:nvPr/>
+        </p:nvSpPr>
+        <p:spPr>
+          <a:xfrm>
+            <a:off x="9534138" y="1505478"/>
+            <a:ext cx="2528256" cy="369332"/>
+          </a:xfrm>
+          <a:prstGeom prst="rect">
+            <a:avLst/>
+          </a:prstGeom>
+          <a:noFill/>
+          <a:ln>
+            <a:solidFill>
+              <a:schemeClr val="tx1"/>
+            </a:solidFill>
+          </a:ln>
+        </p:spPr>
+        <p:txBody>
+          <a:bodyPr wrap="none" rtlCol="0">
+            <a:spAutoFit/>
+          </a:bodyPr>
+          <a:lstStyle/>
+          <a:p>
+            <a:r>
+              <a:rPr lang="en-US" dirty="0">
+                <a:latin typeface="Courier New" panose="02070309020205020404" pitchFamily="49" charset="0"/>
+                <a:cs typeface="Courier New" panose="02070309020205020404" pitchFamily="49" charset="0"/>
+              </a:rPr>
+              <a:t>-d=afternotok:503</a:t>
+            </a:r>
+            <a:endParaRPr lang="LID4096" dirty="0">
+              <a:latin typeface="Courier New" panose="02070309020205020404" pitchFamily="49" charset="0"/>
+              <a:cs typeface="Courier New" panose="02070309020205020404" pitchFamily="49" charset="0"/>
+            </a:endParaRPr>
+          </a:p>
+        </p:txBody>
+      </p:sp>
+      <p:sp>
+        <p:nvSpPr>
+          <p:cNvPr id="53" name="Arrow: Up 52">
+            <a:extLst>
+              <a:ext uri="{FF2B5EF4-FFF2-40B4-BE49-F238E27FC236}">
+                <a16:creationId xmlns:a16="http://schemas.microsoft.com/office/drawing/2014/main" id="{5D22D205-7D54-9767-B877-7E5A4BD7ECEE}"/>
+              </a:ext>
+            </a:extLst>
+          </p:cNvPr>
+          <p:cNvSpPr/>
+          <p:nvPr/>
+        </p:nvSpPr>
+        <p:spPr>
+          <a:xfrm rot="16200000">
+            <a:off x="9262920" y="907621"/>
+            <a:ext cx="217715" cy="611930"/>
+          </a:xfrm>
+          <a:prstGeom prst="upArrow">
+            <a:avLst/>
+          </a:prstGeom>
+          <a:solidFill>
+            <a:srgbClr val="FF0000"/>
+          </a:solidFill>
+          <a:ln>
+            <a:solidFill>
+              <a:srgbClr val="FF0000"/>
+            </a:solidFill>
+          </a:ln>
+        </p:spPr>
+        <p:style>
+          <a:lnRef idx="2">
+            <a:schemeClr val="accent1">
+              <a:shade val="15000"/>
+            </a:schemeClr>
+          </a:lnRef>
+          <a:fillRef idx="1">
+            <a:schemeClr val="accent1"/>
+          </a:fillRef>
+          <a:effectRef idx="0">
+            <a:schemeClr val="accent1"/>
+          </a:effectRef>
+          <a:fontRef idx="minor">
+            <a:schemeClr val="lt1"/>
+          </a:fontRef>
+        </p:style>
+        <p:txBody>
+          <a:bodyPr rtlCol="0" anchor="ctr"/>
+          <a:lstStyle/>
+          <a:p>
+            <a:pPr algn="ctr"/>
+            <a:endParaRPr lang="LID4096"/>
+          </a:p>
+        </p:txBody>
+      </p:sp>
+      <p:grpSp>
+        <p:nvGrpSpPr>
+          <p:cNvPr id="54" name="Group 53">
+            <a:extLst>
+              <a:ext uri="{FF2B5EF4-FFF2-40B4-BE49-F238E27FC236}">
+                <a16:creationId xmlns:a16="http://schemas.microsoft.com/office/drawing/2014/main" id="{36E642FE-7589-607E-314D-CCC15F126D6A}"/>
+              </a:ext>
+            </a:extLst>
+          </p:cNvPr>
+          <p:cNvGrpSpPr/>
+          <p:nvPr/>
+        </p:nvGrpSpPr>
+        <p:grpSpPr>
+          <a:xfrm>
+            <a:off x="8131577" y="2251713"/>
+            <a:ext cx="1720727" cy="1289176"/>
+            <a:chOff x="2133603" y="1535668"/>
+            <a:chExt cx="1720727" cy="1289176"/>
+          </a:xfrm>
+        </p:grpSpPr>
+        <p:grpSp>
+          <p:nvGrpSpPr>
+            <p:cNvPr id="55" name="Group 54">
+              <a:extLst>
+                <a:ext uri="{FF2B5EF4-FFF2-40B4-BE49-F238E27FC236}">
+                  <a16:creationId xmlns:a16="http://schemas.microsoft.com/office/drawing/2014/main" id="{31C45BA4-626A-399F-23CB-70FD36106F92}"/>
+                </a:ext>
+              </a:extLst>
+            </p:cNvPr>
+            <p:cNvGrpSpPr/>
+            <p:nvPr/>
+          </p:nvGrpSpPr>
+          <p:grpSpPr>
+            <a:xfrm>
+              <a:off x="2133603" y="1535668"/>
+              <a:ext cx="1720727" cy="1163989"/>
+              <a:chOff x="2133603" y="1535668"/>
+              <a:chExt cx="1720727" cy="1163989"/>
+            </a:xfrm>
+          </p:grpSpPr>
+          <p:sp>
+            <p:nvSpPr>
+              <p:cNvPr id="57" name="Rectangle: Folded Corner 56">
+                <a:extLst>
+                  <a:ext uri="{FF2B5EF4-FFF2-40B4-BE49-F238E27FC236}">
+                    <a16:creationId xmlns:a16="http://schemas.microsoft.com/office/drawing/2014/main" id="{DBA9155D-B474-1418-FD9A-9E9EFFAE5630}"/>
+                  </a:ext>
+                </a:extLst>
+              </p:cNvPr>
+              <p:cNvSpPr/>
+              <p:nvPr/>
+            </p:nvSpPr>
+            <p:spPr>
+              <a:xfrm>
+                <a:off x="2785263" y="1905000"/>
+                <a:ext cx="566057" cy="794657"/>
+              </a:xfrm>
+              <a:prstGeom prst="foldedCorner">
+                <a:avLst/>
+              </a:prstGeom>
+              <a:solidFill>
+                <a:schemeClr val="bg1"/>
+              </a:solidFill>
+            </p:spPr>
+            <p:style>
+              <a:lnRef idx="2">
+                <a:schemeClr val="accent1">
+                  <a:shade val="15000"/>
+                </a:schemeClr>
+              </a:lnRef>
+              <a:fillRef idx="1">
+                <a:schemeClr val="accent1"/>
+              </a:fillRef>
+              <a:effectRef idx="0">
+                <a:schemeClr val="accent1"/>
+              </a:effectRef>
+              <a:fontRef idx="minor">
+                <a:schemeClr val="lt1"/>
+              </a:fontRef>
+            </p:style>
+            <p:txBody>
+              <a:bodyPr rtlCol="0" anchor="ctr"/>
+              <a:lstStyle/>
+              <a:p>
+                <a:pPr algn="ctr"/>
+                <a:endParaRPr lang="LID4096"/>
+              </a:p>
+            </p:txBody>
+          </p:sp>
+          <p:sp>
+            <p:nvSpPr>
+              <p:cNvPr id="58" name="TextBox 57">
+                <a:extLst>
+                  <a:ext uri="{FF2B5EF4-FFF2-40B4-BE49-F238E27FC236}">
+                    <a16:creationId xmlns:a16="http://schemas.microsoft.com/office/drawing/2014/main" id="{1CE1D740-1F71-C496-35E8-86D76F7CFFBF}"/>
+                  </a:ext>
+                </a:extLst>
+              </p:cNvPr>
+              <p:cNvSpPr txBox="1"/>
+              <p:nvPr/>
+            </p:nvSpPr>
+            <p:spPr>
+              <a:xfrm>
+                <a:off x="2133603" y="1535668"/>
+                <a:ext cx="1720727" cy="369332"/>
+              </a:xfrm>
+              <a:prstGeom prst="rect">
+                <a:avLst/>
+              </a:prstGeom>
+              <a:noFill/>
+            </p:spPr>
+            <p:txBody>
+              <a:bodyPr wrap="none" rtlCol="0">
+                <a:spAutoFit/>
+              </a:bodyPr>
+              <a:lstStyle/>
+              <a:p>
+                <a:r>
+                  <a:rPr lang="en-US" dirty="0" err="1"/>
+                  <a:t>stage_db.slurm</a:t>
+                </a:r>
+                <a:endParaRPr lang="LID4096" dirty="0"/>
+              </a:p>
+            </p:txBody>
+          </p:sp>
+        </p:grpSp>
+        <p:sp>
+          <p:nvSpPr>
+            <p:cNvPr id="56" name="Rectangle: Rounded Corners 55">
+              <a:extLst>
+                <a:ext uri="{FF2B5EF4-FFF2-40B4-BE49-F238E27FC236}">
+                  <a16:creationId xmlns:a16="http://schemas.microsoft.com/office/drawing/2014/main" id="{3059A485-4892-4F27-487E-D21C871907F2}"/>
+                </a:ext>
+              </a:extLst>
+            </p:cNvPr>
+            <p:cNvSpPr/>
+            <p:nvPr/>
+          </p:nvSpPr>
+          <p:spPr>
+            <a:xfrm>
+              <a:off x="2284520" y="2552701"/>
+              <a:ext cx="783771" cy="272143"/>
+            </a:xfrm>
+            <a:prstGeom prst="roundRect">
+              <a:avLst/>
+            </a:prstGeom>
+          </p:spPr>
+          <p:style>
+            <a:lnRef idx="2">
+              <a:schemeClr val="accent1">
+                <a:shade val="15000"/>
+              </a:schemeClr>
+            </a:lnRef>
+            <a:fillRef idx="1">
+              <a:schemeClr val="accent1"/>
+            </a:fillRef>
+            <a:effectRef idx="0">
+              <a:schemeClr val="accent1"/>
+            </a:effectRef>
+            <a:fontRef idx="minor">
+              <a:schemeClr val="lt1"/>
+            </a:fontRef>
+          </p:style>
+          <p:txBody>
+            <a:bodyPr rtlCol="0" anchor="ctr"/>
+            <a:lstStyle/>
+            <a:p>
+              <a:pPr algn="ctr"/>
+              <a:r>
+                <a:rPr lang="en-US" dirty="0"/>
+                <a:t>505</a:t>
+              </a:r>
+              <a:endParaRPr lang="LID4096" dirty="0"/>
+            </a:p>
+          </p:txBody>
+        </p:sp>
+      </p:grpSp>
+      <p:sp>
+        <p:nvSpPr>
+          <p:cNvPr id="59" name="TextBox 58">
+            <a:extLst>
+              <a:ext uri="{FF2B5EF4-FFF2-40B4-BE49-F238E27FC236}">
+                <a16:creationId xmlns:a16="http://schemas.microsoft.com/office/drawing/2014/main" id="{DCD04A86-0E45-088C-66CD-E239DB0C45CE}"/>
+              </a:ext>
+            </a:extLst>
+          </p:cNvPr>
+          <p:cNvSpPr txBox="1"/>
+          <p:nvPr/>
+        </p:nvSpPr>
+        <p:spPr>
+          <a:xfrm>
+            <a:off x="8055379" y="3628241"/>
+            <a:ext cx="3768980" cy="369332"/>
+          </a:xfrm>
+          <a:prstGeom prst="rect">
+            <a:avLst/>
+          </a:prstGeom>
+          <a:noFill/>
+          <a:ln>
+            <a:solidFill>
+              <a:schemeClr val="tx1"/>
+            </a:solidFill>
+          </a:ln>
+        </p:spPr>
+        <p:txBody>
+          <a:bodyPr wrap="none" rtlCol="0">
+            <a:spAutoFit/>
+          </a:bodyPr>
+          <a:lstStyle/>
+          <a:p>
+            <a:r>
+              <a:rPr lang="en-US" dirty="0">
+                <a:latin typeface="Courier New" panose="02070309020205020404" pitchFamily="49" charset="0"/>
+                <a:cs typeface="Courier New" panose="02070309020205020404" pitchFamily="49" charset="0"/>
+              </a:rPr>
+              <a:t>-d=afterok:503?afterok=504</a:t>
+            </a:r>
+            <a:endParaRPr lang="LID4096" dirty="0">
+              <a:latin typeface="Courier New" panose="02070309020205020404" pitchFamily="49" charset="0"/>
+              <a:cs typeface="Courier New" panose="02070309020205020404" pitchFamily="49" charset="0"/>
+            </a:endParaRPr>
+          </a:p>
+        </p:txBody>
+      </p:sp>
+      <p:sp>
+        <p:nvSpPr>
+          <p:cNvPr id="60" name="Arrow: Up 59">
+            <a:extLst>
+              <a:ext uri="{FF2B5EF4-FFF2-40B4-BE49-F238E27FC236}">
+                <a16:creationId xmlns:a16="http://schemas.microsoft.com/office/drawing/2014/main" id="{BD8948AD-F4AE-630C-6739-702E62B33CEC}"/>
+              </a:ext>
+            </a:extLst>
+          </p:cNvPr>
+          <p:cNvSpPr/>
+          <p:nvPr/>
+        </p:nvSpPr>
+        <p:spPr>
+          <a:xfrm rot="3061519">
+            <a:off x="10089502" y="1989060"/>
+            <a:ext cx="217715" cy="611930"/>
+          </a:xfrm>
+          <a:prstGeom prst="upArrow">
+            <a:avLst/>
+          </a:prstGeom>
+          <a:solidFill>
+            <a:srgbClr val="FFC000"/>
+          </a:solidFill>
+          <a:ln>
+            <a:solidFill>
+              <a:srgbClr val="FFC000"/>
+            </a:solidFill>
+          </a:ln>
+        </p:spPr>
+        <p:style>
+          <a:lnRef idx="2">
+            <a:schemeClr val="accent1">
+              <a:shade val="15000"/>
+            </a:schemeClr>
+          </a:lnRef>
+          <a:fillRef idx="1">
+            <a:schemeClr val="accent1"/>
+          </a:fillRef>
+          <a:effectRef idx="0">
+            <a:schemeClr val="accent1"/>
+          </a:effectRef>
+          <a:fontRef idx="minor">
+            <a:schemeClr val="lt1"/>
+          </a:fontRef>
+        </p:style>
+        <p:txBody>
+          <a:bodyPr rtlCol="0" anchor="ctr"/>
+          <a:lstStyle/>
+          <a:p>
+            <a:pPr algn="ctr"/>
+            <a:endParaRPr lang="LID4096"/>
+          </a:p>
+        </p:txBody>
+      </p:sp>
+      <p:sp>
+        <p:nvSpPr>
+          <p:cNvPr id="61" name="Arrow: Up 60">
+            <a:extLst>
+              <a:ext uri="{FF2B5EF4-FFF2-40B4-BE49-F238E27FC236}">
+                <a16:creationId xmlns:a16="http://schemas.microsoft.com/office/drawing/2014/main" id="{2FA27E33-5AAD-F40F-1D9F-3B0190F89309}"/>
+              </a:ext>
+            </a:extLst>
+          </p:cNvPr>
+          <p:cNvSpPr/>
+          <p:nvPr/>
+        </p:nvSpPr>
+        <p:spPr>
+          <a:xfrm rot="19501917">
+            <a:off x="8565521" y="1610102"/>
+            <a:ext cx="217715" cy="611930"/>
+          </a:xfrm>
+          <a:prstGeom prst="upArrow">
+            <a:avLst/>
+          </a:prstGeom>
+          <a:solidFill>
+            <a:srgbClr val="FFC000"/>
+          </a:solidFill>
+          <a:ln>
+            <a:solidFill>
+              <a:srgbClr val="FFC000"/>
+            </a:solidFill>
+          </a:ln>
+        </p:spPr>
+        <p:style>
+          <a:lnRef idx="2">
+            <a:schemeClr val="accent1">
+              <a:shade val="15000"/>
+            </a:schemeClr>
+          </a:lnRef>
+          <a:fillRef idx="1">
+            <a:schemeClr val="accent1"/>
+          </a:fillRef>
+          <a:effectRef idx="0">
+            <a:schemeClr val="accent1"/>
+          </a:effectRef>
+          <a:fontRef idx="minor">
+            <a:schemeClr val="lt1"/>
+          </a:fontRef>
+        </p:style>
+        <p:txBody>
+          <a:bodyPr rtlCol="0" anchor="ctr"/>
+          <a:lstStyle/>
+          <a:p>
+            <a:pPr algn="ctr"/>
+            <a:endParaRPr lang="LID4096"/>
+          </a:p>
+        </p:txBody>
+      </p:sp>
+      <p:grpSp>
+        <p:nvGrpSpPr>
+          <p:cNvPr id="64" name="Group 63">
+            <a:extLst>
+              <a:ext uri="{FF2B5EF4-FFF2-40B4-BE49-F238E27FC236}">
+                <a16:creationId xmlns:a16="http://schemas.microsoft.com/office/drawing/2014/main" id="{93A65F86-F69F-655E-0C33-1ED6E2CC09DC}"/>
+              </a:ext>
+            </a:extLst>
+          </p:cNvPr>
+          <p:cNvGrpSpPr/>
+          <p:nvPr/>
+        </p:nvGrpSpPr>
+        <p:grpSpPr>
+          <a:xfrm>
+            <a:off x="7835426" y="5153031"/>
+            <a:ext cx="3388788" cy="977467"/>
+            <a:chOff x="7835426" y="5153031"/>
+            <a:chExt cx="3388788" cy="977467"/>
+          </a:xfrm>
+        </p:grpSpPr>
+        <p:sp>
+          <p:nvSpPr>
+            <p:cNvPr id="62" name="TextBox 61">
+              <a:extLst>
+                <a:ext uri="{FF2B5EF4-FFF2-40B4-BE49-F238E27FC236}">
+                  <a16:creationId xmlns:a16="http://schemas.microsoft.com/office/drawing/2014/main" id="{2F324816-4167-CB63-4126-A80A1D1A2839}"/>
+                </a:ext>
+              </a:extLst>
+            </p:cNvPr>
+            <p:cNvSpPr txBox="1"/>
+            <p:nvPr/>
+          </p:nvSpPr>
+          <p:spPr>
+            <a:xfrm>
+              <a:off x="7835426" y="5668833"/>
+              <a:ext cx="3072701" cy="461665"/>
+            </a:xfrm>
+            <a:prstGeom prst="rect">
+              <a:avLst/>
+            </a:prstGeom>
+            <a:noFill/>
+            <a:ln>
+              <a:solidFill>
+                <a:schemeClr val="tx1"/>
+              </a:solidFill>
+            </a:ln>
+          </p:spPr>
+          <p:txBody>
+            <a:bodyPr wrap="none" rtlCol="0">
+              <a:spAutoFit/>
+            </a:bodyPr>
+            <a:lstStyle/>
+            <a:p>
+              <a:r>
+                <a:rPr lang="en-US" sz="2400" dirty="0"/>
+                <a:t>Note: workflow = DAG</a:t>
+              </a:r>
+              <a:endParaRPr lang="LID4096" sz="2400" dirty="0"/>
+            </a:p>
+          </p:txBody>
+        </p:sp>
+        <p:pic>
+          <p:nvPicPr>
+            <p:cNvPr id="63" name="Graphic 62" descr="Warning with solid fill">
+              <a:extLst>
+                <a:ext uri="{FF2B5EF4-FFF2-40B4-BE49-F238E27FC236}">
+                  <a16:creationId xmlns:a16="http://schemas.microsoft.com/office/drawing/2014/main" id="{166B610C-3C24-5A6E-97F2-1E265980517A}"/>
+                </a:ext>
+              </a:extLst>
+            </p:cNvPr>
+            <p:cNvPicPr>
+              <a:picLocks noChangeAspect="1"/>
+            </p:cNvPicPr>
+            <p:nvPr/>
+          </p:nvPicPr>
+          <p:blipFill>
+            <a:blip r:embed="rId2">
+              <a:extLst>
+                <a:ext uri="{96DAC541-7B7A-43D3-8B79-37D633B846F1}">
+                  <asvg:svgBlip xmlns:asvg="http://schemas.microsoft.com/office/drawing/2016/SVG/main" r:embed="rId3"/>
+                </a:ext>
+              </a:extLst>
+            </a:blip>
+            <a:stretch>
+              <a:fillRect/>
+            </a:stretch>
+          </p:blipFill>
+          <p:spPr>
+            <a:xfrm>
+              <a:off x="10576142" y="5153031"/>
+              <a:ext cx="648072" cy="648072"/>
+            </a:xfrm>
+            <a:prstGeom prst="rect">
+              <a:avLst/>
+            </a:prstGeom>
+          </p:spPr>
+        </p:pic>
+      </p:grpSp>
+    </p:spTree>
+    <p:extLst>
+      <p:ext uri="{BB962C8B-B14F-4D97-AF65-F5344CB8AC3E}">
+        <p14:creationId xmlns:p14="http://schemas.microsoft.com/office/powerpoint/2010/main" val="424466571"/>
+      </p:ext>
+    </p:extLst>
+  </p:cSld>
+  <p:clrMapOvr>
+    <a:masterClrMapping/>
+  </p:clrMapOvr>
 </p:sld>
 </file>
 

</xml_diff>

<commit_message>
Add slides on dangling jobs
</commit_message>
<xml_diff>
--- a/workflow_for_HPC.pptx
+++ b/workflow_for_HPC.pptx
@@ -5,7 +5,7 @@
     <p:sldMasterId id="2147483648" r:id="rId1"/>
   </p:sldMasterIdLst>
   <p:notesMasterIdLst>
-    <p:notesMasterId r:id="rId24"/>
+    <p:notesMasterId r:id="rId26"/>
   </p:notesMasterIdLst>
   <p:sldIdLst>
     <p:sldId id="257" r:id="rId2"/>
@@ -30,6 +30,8 @@
     <p:sldId id="373" r:id="rId21"/>
     <p:sldId id="374" r:id="rId22"/>
     <p:sldId id="375" r:id="rId23"/>
+    <p:sldId id="376" r:id="rId24"/>
+    <p:sldId id="377" r:id="rId25"/>
   </p:sldIdLst>
   <p:sldSz cx="12192000" cy="6858000"/>
   <p:notesSz cx="6858000" cy="9144000"/>
@@ -6508,6 +6510,7 @@
             </a:bodyPr>
             <a:lstStyle/>
             <a:p>
+              <a:pPr algn="ctr"/>
               <a:r>
                 <a:rPr lang="en-US" sz="2400" dirty="0"/>
                 <a:t>Every day at 04:12</a:t>
@@ -13068,6 +13071,2071 @@
   <p:clrMapOvr>
     <a:masterClrMapping/>
   </p:clrMapOvr>
+</p:sld>
+</file>
+
+<file path=ppt/slides/slide23.xml><?xml version="1.0" encoding="utf-8"?>
+<p:sld xmlns:a="http://schemas.openxmlformats.org/drawingml/2006/main" xmlns:r="http://schemas.openxmlformats.org/officeDocument/2006/relationships" xmlns:p="http://schemas.openxmlformats.org/presentationml/2006/main">
+  <p:cSld>
+    <p:spTree>
+      <p:nvGrpSpPr>
+        <p:cNvPr id="1" name=""/>
+        <p:cNvGrpSpPr/>
+        <p:nvPr/>
+      </p:nvGrpSpPr>
+      <p:grpSpPr>
+        <a:xfrm>
+          <a:off x="0" y="0"/>
+          <a:ext cx="0" cy="0"/>
+          <a:chOff x="0" y="0"/>
+          <a:chExt cx="0" cy="0"/>
+        </a:xfrm>
+      </p:grpSpPr>
+      <p:grpSp>
+        <p:nvGrpSpPr>
+          <p:cNvPr id="55" name="Group 54">
+            <a:extLst>
+              <a:ext uri="{FF2B5EF4-FFF2-40B4-BE49-F238E27FC236}">
+                <a16:creationId xmlns:a16="http://schemas.microsoft.com/office/drawing/2014/main" id="{5E76CDFB-3859-DEB1-83CD-3FD0184C49D7}"/>
+              </a:ext>
+            </a:extLst>
+          </p:cNvPr>
+          <p:cNvGrpSpPr/>
+          <p:nvPr/>
+        </p:nvGrpSpPr>
+        <p:grpSpPr>
+          <a:xfrm>
+            <a:off x="1415144" y="1788807"/>
+            <a:ext cx="5442860" cy="3874280"/>
+            <a:chOff x="1415144" y="1788807"/>
+            <a:chExt cx="5442860" cy="3874280"/>
+          </a:xfrm>
+        </p:grpSpPr>
+        <p:grpSp>
+          <p:nvGrpSpPr>
+            <p:cNvPr id="25" name="Group 24">
+              <a:extLst>
+                <a:ext uri="{FF2B5EF4-FFF2-40B4-BE49-F238E27FC236}">
+                  <a16:creationId xmlns:a16="http://schemas.microsoft.com/office/drawing/2014/main" id="{09C54D44-E869-CD62-0DBD-5FEE3EE34198}"/>
+                </a:ext>
+              </a:extLst>
+            </p:cNvPr>
+            <p:cNvGrpSpPr/>
+            <p:nvPr/>
+          </p:nvGrpSpPr>
+          <p:grpSpPr>
+            <a:xfrm>
+              <a:off x="2122548" y="1788807"/>
+              <a:ext cx="2166427" cy="1289176"/>
+              <a:chOff x="2046515" y="1535668"/>
+              <a:chExt cx="2166427" cy="1289176"/>
+            </a:xfrm>
+          </p:grpSpPr>
+          <p:grpSp>
+            <p:nvGrpSpPr>
+              <p:cNvPr id="26" name="Group 25">
+                <a:extLst>
+                  <a:ext uri="{FF2B5EF4-FFF2-40B4-BE49-F238E27FC236}">
+                    <a16:creationId xmlns:a16="http://schemas.microsoft.com/office/drawing/2014/main" id="{05C058D5-61FF-CC11-D920-5E90A60A3FA1}"/>
+                  </a:ext>
+                </a:extLst>
+              </p:cNvPr>
+              <p:cNvGrpSpPr/>
+              <p:nvPr/>
+            </p:nvGrpSpPr>
+            <p:grpSpPr>
+              <a:xfrm>
+                <a:off x="2046515" y="1535668"/>
+                <a:ext cx="2166427" cy="1163989"/>
+                <a:chOff x="2046515" y="1535668"/>
+                <a:chExt cx="2166427" cy="1163989"/>
+              </a:xfrm>
+            </p:grpSpPr>
+            <p:sp>
+              <p:nvSpPr>
+                <p:cNvPr id="28" name="Rectangle: Folded Corner 27">
+                  <a:extLst>
+                    <a:ext uri="{FF2B5EF4-FFF2-40B4-BE49-F238E27FC236}">
+                      <a16:creationId xmlns:a16="http://schemas.microsoft.com/office/drawing/2014/main" id="{D9F08C08-BB5D-750A-219D-7FC591029939}"/>
+                    </a:ext>
+                  </a:extLst>
+                </p:cNvPr>
+                <p:cNvSpPr/>
+                <p:nvPr/>
+              </p:nvSpPr>
+              <p:spPr>
+                <a:xfrm>
+                  <a:off x="2785263" y="1905000"/>
+                  <a:ext cx="566057" cy="794657"/>
+                </a:xfrm>
+                <a:prstGeom prst="foldedCorner">
+                  <a:avLst/>
+                </a:prstGeom>
+                <a:solidFill>
+                  <a:schemeClr val="bg1"/>
+                </a:solidFill>
+              </p:spPr>
+              <p:style>
+                <a:lnRef idx="2">
+                  <a:schemeClr val="accent1">
+                    <a:shade val="15000"/>
+                  </a:schemeClr>
+                </a:lnRef>
+                <a:fillRef idx="1">
+                  <a:schemeClr val="accent1"/>
+                </a:fillRef>
+                <a:effectRef idx="0">
+                  <a:schemeClr val="accent1"/>
+                </a:effectRef>
+                <a:fontRef idx="minor">
+                  <a:schemeClr val="lt1"/>
+                </a:fontRef>
+              </p:style>
+              <p:txBody>
+                <a:bodyPr rtlCol="0" anchor="ctr"/>
+                <a:lstStyle/>
+                <a:p>
+                  <a:pPr algn="ctr"/>
+                  <a:endParaRPr lang="LID4096"/>
+                </a:p>
+              </p:txBody>
+            </p:sp>
+            <p:sp>
+              <p:nvSpPr>
+                <p:cNvPr id="29" name="TextBox 28">
+                  <a:extLst>
+                    <a:ext uri="{FF2B5EF4-FFF2-40B4-BE49-F238E27FC236}">
+                      <a16:creationId xmlns:a16="http://schemas.microsoft.com/office/drawing/2014/main" id="{3A4FADA4-4C83-F6A8-6423-BB21D54DA3CB}"/>
+                    </a:ext>
+                  </a:extLst>
+                </p:cNvPr>
+                <p:cNvSpPr txBox="1"/>
+                <p:nvPr/>
+              </p:nvSpPr>
+              <p:spPr>
+                <a:xfrm>
+                  <a:off x="2046515" y="1535668"/>
+                  <a:ext cx="2166427" cy="369332"/>
+                </a:xfrm>
+                <a:prstGeom prst="rect">
+                  <a:avLst/>
+                </a:prstGeom>
+                <a:noFill/>
+              </p:spPr>
+              <p:txBody>
+                <a:bodyPr wrap="none" rtlCol="0">
+                  <a:spAutoFit/>
+                </a:bodyPr>
+                <a:lstStyle/>
+                <a:p>
+                  <a:r>
+                    <a:rPr lang="en-US" dirty="0" err="1"/>
+                    <a:t>download_db.slurm</a:t>
+                  </a:r>
+                  <a:endParaRPr lang="LID4096" dirty="0"/>
+                </a:p>
+              </p:txBody>
+            </p:sp>
+          </p:grpSp>
+          <p:sp>
+            <p:nvSpPr>
+              <p:cNvPr id="27" name="Rectangle: Rounded Corners 26">
+                <a:extLst>
+                  <a:ext uri="{FF2B5EF4-FFF2-40B4-BE49-F238E27FC236}">
+                    <a16:creationId xmlns:a16="http://schemas.microsoft.com/office/drawing/2014/main" id="{CEBB5EF8-DBB0-8D7F-437B-27DBC19D7ED4}"/>
+                  </a:ext>
+                </a:extLst>
+              </p:cNvPr>
+              <p:cNvSpPr/>
+              <p:nvPr/>
+            </p:nvSpPr>
+            <p:spPr>
+              <a:xfrm>
+                <a:off x="2284520" y="2552701"/>
+                <a:ext cx="783771" cy="272143"/>
+              </a:xfrm>
+              <a:prstGeom prst="roundRect">
+                <a:avLst/>
+              </a:prstGeom>
+            </p:spPr>
+            <p:style>
+              <a:lnRef idx="2">
+                <a:schemeClr val="accent1">
+                  <a:shade val="15000"/>
+                </a:schemeClr>
+              </a:lnRef>
+              <a:fillRef idx="1">
+                <a:schemeClr val="accent1"/>
+              </a:fillRef>
+              <a:effectRef idx="0">
+                <a:schemeClr val="accent1"/>
+              </a:effectRef>
+              <a:fontRef idx="minor">
+                <a:schemeClr val="lt1"/>
+              </a:fontRef>
+            </p:style>
+            <p:txBody>
+              <a:bodyPr rtlCol="0" anchor="ctr"/>
+              <a:lstStyle/>
+              <a:p>
+                <a:pPr algn="ctr"/>
+                <a:r>
+                  <a:rPr lang="en-US" dirty="0"/>
+                  <a:t>503</a:t>
+                </a:r>
+                <a:endParaRPr lang="LID4096" dirty="0"/>
+              </a:p>
+            </p:txBody>
+          </p:sp>
+        </p:grpSp>
+        <p:sp>
+          <p:nvSpPr>
+            <p:cNvPr id="30" name="Arrow: Up 29">
+              <a:extLst>
+                <a:ext uri="{FF2B5EF4-FFF2-40B4-BE49-F238E27FC236}">
+                  <a16:creationId xmlns:a16="http://schemas.microsoft.com/office/drawing/2014/main" id="{1C227E51-C69B-CDAD-35B9-D0D11957CEEC}"/>
+                </a:ext>
+              </a:extLst>
+            </p:cNvPr>
+            <p:cNvSpPr/>
+            <p:nvPr/>
+          </p:nvSpPr>
+          <p:spPr>
+            <a:xfrm rot="3693472">
+              <a:off x="2350265" y="4550807"/>
+              <a:ext cx="217715" cy="611930"/>
+            </a:xfrm>
+            <a:prstGeom prst="upArrow">
+              <a:avLst/>
+            </a:prstGeom>
+            <a:solidFill>
+              <a:srgbClr val="00B050"/>
+            </a:solidFill>
+            <a:ln>
+              <a:noFill/>
+            </a:ln>
+          </p:spPr>
+          <p:style>
+            <a:lnRef idx="2">
+              <a:schemeClr val="accent1">
+                <a:shade val="15000"/>
+              </a:schemeClr>
+            </a:lnRef>
+            <a:fillRef idx="1">
+              <a:schemeClr val="accent1"/>
+            </a:fillRef>
+            <a:effectRef idx="0">
+              <a:schemeClr val="accent1"/>
+            </a:effectRef>
+            <a:fontRef idx="minor">
+              <a:schemeClr val="lt1"/>
+            </a:fontRef>
+          </p:style>
+          <p:txBody>
+            <a:bodyPr rtlCol="0" anchor="ctr"/>
+            <a:lstStyle/>
+            <a:p>
+              <a:pPr algn="ctr"/>
+              <a:endParaRPr lang="LID4096"/>
+            </a:p>
+          </p:txBody>
+        </p:sp>
+        <p:grpSp>
+          <p:nvGrpSpPr>
+            <p:cNvPr id="31" name="Group 30">
+              <a:extLst>
+                <a:ext uri="{FF2B5EF4-FFF2-40B4-BE49-F238E27FC236}">
+                  <a16:creationId xmlns:a16="http://schemas.microsoft.com/office/drawing/2014/main" id="{23EA51E6-D4AD-4681-CFCF-1487D3DA5E2C}"/>
+                </a:ext>
+              </a:extLst>
+            </p:cNvPr>
+            <p:cNvGrpSpPr/>
+            <p:nvPr/>
+          </p:nvGrpSpPr>
+          <p:grpSpPr>
+            <a:xfrm>
+              <a:off x="4350073" y="1788807"/>
+              <a:ext cx="2507931" cy="1289176"/>
+              <a:chOff x="2046515" y="1535668"/>
+              <a:chExt cx="2507931" cy="1289176"/>
+            </a:xfrm>
+          </p:grpSpPr>
+          <p:grpSp>
+            <p:nvGrpSpPr>
+              <p:cNvPr id="32" name="Group 31">
+                <a:extLst>
+                  <a:ext uri="{FF2B5EF4-FFF2-40B4-BE49-F238E27FC236}">
+                    <a16:creationId xmlns:a16="http://schemas.microsoft.com/office/drawing/2014/main" id="{CA4A22A5-CA84-A76C-A17E-6D7004B1DE55}"/>
+                  </a:ext>
+                </a:extLst>
+              </p:cNvPr>
+              <p:cNvGrpSpPr/>
+              <p:nvPr/>
+            </p:nvGrpSpPr>
+            <p:grpSpPr>
+              <a:xfrm>
+                <a:off x="2046515" y="1535668"/>
+                <a:ext cx="2507931" cy="1163989"/>
+                <a:chOff x="2046515" y="1535668"/>
+                <a:chExt cx="2507931" cy="1163989"/>
+              </a:xfrm>
+            </p:grpSpPr>
+            <p:sp>
+              <p:nvSpPr>
+                <p:cNvPr id="34" name="Rectangle: Folded Corner 33">
+                  <a:extLst>
+                    <a:ext uri="{FF2B5EF4-FFF2-40B4-BE49-F238E27FC236}">
+                      <a16:creationId xmlns:a16="http://schemas.microsoft.com/office/drawing/2014/main" id="{34465976-EE4C-75F8-9A37-9D1482607178}"/>
+                    </a:ext>
+                  </a:extLst>
+                </p:cNvPr>
+                <p:cNvSpPr/>
+                <p:nvPr/>
+              </p:nvSpPr>
+              <p:spPr>
+                <a:xfrm>
+                  <a:off x="2785263" y="1905000"/>
+                  <a:ext cx="566057" cy="794657"/>
+                </a:xfrm>
+                <a:prstGeom prst="foldedCorner">
+                  <a:avLst/>
+                </a:prstGeom>
+                <a:solidFill>
+                  <a:schemeClr val="bg1"/>
+                </a:solidFill>
+              </p:spPr>
+              <p:style>
+                <a:lnRef idx="2">
+                  <a:schemeClr val="accent1">
+                    <a:shade val="15000"/>
+                  </a:schemeClr>
+                </a:lnRef>
+                <a:fillRef idx="1">
+                  <a:schemeClr val="accent1"/>
+                </a:fillRef>
+                <a:effectRef idx="0">
+                  <a:schemeClr val="accent1"/>
+                </a:effectRef>
+                <a:fontRef idx="minor">
+                  <a:schemeClr val="lt1"/>
+                </a:fontRef>
+              </p:style>
+              <p:txBody>
+                <a:bodyPr rtlCol="0" anchor="ctr"/>
+                <a:lstStyle/>
+                <a:p>
+                  <a:pPr algn="ctr"/>
+                  <a:endParaRPr lang="LID4096"/>
+                </a:p>
+              </p:txBody>
+            </p:sp>
+            <p:sp>
+              <p:nvSpPr>
+                <p:cNvPr id="35" name="TextBox 34">
+                  <a:extLst>
+                    <a:ext uri="{FF2B5EF4-FFF2-40B4-BE49-F238E27FC236}">
+                      <a16:creationId xmlns:a16="http://schemas.microsoft.com/office/drawing/2014/main" id="{3E0EAC70-A2E5-9E28-211E-003FE22E6869}"/>
+                    </a:ext>
+                  </a:extLst>
+                </p:cNvPr>
+                <p:cNvSpPr txBox="1"/>
+                <p:nvPr/>
+              </p:nvSpPr>
+              <p:spPr>
+                <a:xfrm>
+                  <a:off x="2046515" y="1535668"/>
+                  <a:ext cx="2507931" cy="369332"/>
+                </a:xfrm>
+                <a:prstGeom prst="rect">
+                  <a:avLst/>
+                </a:prstGeom>
+                <a:noFill/>
+              </p:spPr>
+              <p:txBody>
+                <a:bodyPr wrap="none" rtlCol="0">
+                  <a:spAutoFit/>
+                </a:bodyPr>
+                <a:lstStyle/>
+                <a:p>
+                  <a:r>
+                    <a:rPr lang="en-US" dirty="0" err="1"/>
+                    <a:t>copy_backup_db.slurm</a:t>
+                  </a:r>
+                  <a:endParaRPr lang="LID4096" dirty="0"/>
+                </a:p>
+              </p:txBody>
+            </p:sp>
+          </p:grpSp>
+          <p:sp>
+            <p:nvSpPr>
+              <p:cNvPr id="33" name="Rectangle: Rounded Corners 32">
+                <a:extLst>
+                  <a:ext uri="{FF2B5EF4-FFF2-40B4-BE49-F238E27FC236}">
+                    <a16:creationId xmlns:a16="http://schemas.microsoft.com/office/drawing/2014/main" id="{5CC8E42E-375E-F303-F0A8-62A8C62A840B}"/>
+                  </a:ext>
+                </a:extLst>
+              </p:cNvPr>
+              <p:cNvSpPr/>
+              <p:nvPr/>
+            </p:nvSpPr>
+            <p:spPr>
+              <a:xfrm>
+                <a:off x="2284520" y="2552701"/>
+                <a:ext cx="783771" cy="272143"/>
+              </a:xfrm>
+              <a:prstGeom prst="roundRect">
+                <a:avLst/>
+              </a:prstGeom>
+            </p:spPr>
+            <p:style>
+              <a:lnRef idx="2">
+                <a:schemeClr val="accent1">
+                  <a:shade val="15000"/>
+                </a:schemeClr>
+              </a:lnRef>
+              <a:fillRef idx="1">
+                <a:schemeClr val="accent1"/>
+              </a:fillRef>
+              <a:effectRef idx="0">
+                <a:schemeClr val="accent1"/>
+              </a:effectRef>
+              <a:fontRef idx="minor">
+                <a:schemeClr val="lt1"/>
+              </a:fontRef>
+            </p:style>
+            <p:txBody>
+              <a:bodyPr rtlCol="0" anchor="ctr"/>
+              <a:lstStyle/>
+              <a:p>
+                <a:pPr algn="ctr"/>
+                <a:r>
+                  <a:rPr lang="en-US" dirty="0"/>
+                  <a:t>504</a:t>
+                </a:r>
+                <a:endParaRPr lang="LID4096" dirty="0"/>
+              </a:p>
+            </p:txBody>
+          </p:sp>
+        </p:grpSp>
+        <p:sp>
+          <p:nvSpPr>
+            <p:cNvPr id="36" name="TextBox 35">
+              <a:extLst>
+                <a:ext uri="{FF2B5EF4-FFF2-40B4-BE49-F238E27FC236}">
+                  <a16:creationId xmlns:a16="http://schemas.microsoft.com/office/drawing/2014/main" id="{F5C5C785-19A8-497A-E51A-2C1BEFA74421}"/>
+                </a:ext>
+              </a:extLst>
+            </p:cNvPr>
+            <p:cNvSpPr txBox="1"/>
+            <p:nvPr/>
+          </p:nvSpPr>
+          <p:spPr>
+            <a:xfrm>
+              <a:off x="4200142" y="3170992"/>
+              <a:ext cx="2528256" cy="369332"/>
+            </a:xfrm>
+            <a:prstGeom prst="rect">
+              <a:avLst/>
+            </a:prstGeom>
+            <a:noFill/>
+            <a:ln>
+              <a:solidFill>
+                <a:schemeClr val="tx1"/>
+              </a:solidFill>
+            </a:ln>
+          </p:spPr>
+          <p:txBody>
+            <a:bodyPr wrap="none" rtlCol="0">
+              <a:spAutoFit/>
+            </a:bodyPr>
+            <a:lstStyle/>
+            <a:p>
+              <a:r>
+                <a:rPr lang="en-US" dirty="0">
+                  <a:latin typeface="Courier New" panose="02070309020205020404" pitchFamily="49" charset="0"/>
+                  <a:cs typeface="Courier New" panose="02070309020205020404" pitchFamily="49" charset="0"/>
+                </a:rPr>
+                <a:t>-d=afternotok:503</a:t>
+              </a:r>
+              <a:endParaRPr lang="LID4096" dirty="0">
+                <a:latin typeface="Courier New" panose="02070309020205020404" pitchFamily="49" charset="0"/>
+                <a:cs typeface="Courier New" panose="02070309020205020404" pitchFamily="49" charset="0"/>
+              </a:endParaRPr>
+            </a:p>
+          </p:txBody>
+        </p:sp>
+        <p:grpSp>
+          <p:nvGrpSpPr>
+            <p:cNvPr id="37" name="Group 36">
+              <a:extLst>
+                <a:ext uri="{FF2B5EF4-FFF2-40B4-BE49-F238E27FC236}">
+                  <a16:creationId xmlns:a16="http://schemas.microsoft.com/office/drawing/2014/main" id="{250AE7CC-48C6-7646-E466-04015BD12573}"/>
+                </a:ext>
+              </a:extLst>
+            </p:cNvPr>
+            <p:cNvGrpSpPr/>
+            <p:nvPr/>
+          </p:nvGrpSpPr>
+          <p:grpSpPr>
+            <a:xfrm>
+              <a:off x="2797581" y="3917227"/>
+              <a:ext cx="1720727" cy="1289176"/>
+              <a:chOff x="2133603" y="1535668"/>
+              <a:chExt cx="1720727" cy="1289176"/>
+            </a:xfrm>
+          </p:grpSpPr>
+          <p:grpSp>
+            <p:nvGrpSpPr>
+              <p:cNvPr id="38" name="Group 37">
+                <a:extLst>
+                  <a:ext uri="{FF2B5EF4-FFF2-40B4-BE49-F238E27FC236}">
+                    <a16:creationId xmlns:a16="http://schemas.microsoft.com/office/drawing/2014/main" id="{7E73DE47-09ED-B31A-EF18-F9E87402D1BF}"/>
+                  </a:ext>
+                </a:extLst>
+              </p:cNvPr>
+              <p:cNvGrpSpPr/>
+              <p:nvPr/>
+            </p:nvGrpSpPr>
+            <p:grpSpPr>
+              <a:xfrm>
+                <a:off x="2133603" y="1535668"/>
+                <a:ext cx="1720727" cy="1163989"/>
+                <a:chOff x="2133603" y="1535668"/>
+                <a:chExt cx="1720727" cy="1163989"/>
+              </a:xfrm>
+            </p:grpSpPr>
+            <p:sp>
+              <p:nvSpPr>
+                <p:cNvPr id="40" name="Rectangle: Folded Corner 39">
+                  <a:extLst>
+                    <a:ext uri="{FF2B5EF4-FFF2-40B4-BE49-F238E27FC236}">
+                      <a16:creationId xmlns:a16="http://schemas.microsoft.com/office/drawing/2014/main" id="{C13F8ADC-8862-AF0E-C521-D235BEDCF3A8}"/>
+                    </a:ext>
+                  </a:extLst>
+                </p:cNvPr>
+                <p:cNvSpPr/>
+                <p:nvPr/>
+              </p:nvSpPr>
+              <p:spPr>
+                <a:xfrm>
+                  <a:off x="2785263" y="1905000"/>
+                  <a:ext cx="566057" cy="794657"/>
+                </a:xfrm>
+                <a:prstGeom prst="foldedCorner">
+                  <a:avLst/>
+                </a:prstGeom>
+                <a:solidFill>
+                  <a:schemeClr val="bg1"/>
+                </a:solidFill>
+              </p:spPr>
+              <p:style>
+                <a:lnRef idx="2">
+                  <a:schemeClr val="accent1">
+                    <a:shade val="15000"/>
+                  </a:schemeClr>
+                </a:lnRef>
+                <a:fillRef idx="1">
+                  <a:schemeClr val="accent1"/>
+                </a:fillRef>
+                <a:effectRef idx="0">
+                  <a:schemeClr val="accent1"/>
+                </a:effectRef>
+                <a:fontRef idx="minor">
+                  <a:schemeClr val="lt1"/>
+                </a:fontRef>
+              </p:style>
+              <p:txBody>
+                <a:bodyPr rtlCol="0" anchor="ctr"/>
+                <a:lstStyle/>
+                <a:p>
+                  <a:pPr algn="ctr"/>
+                  <a:endParaRPr lang="LID4096"/>
+                </a:p>
+              </p:txBody>
+            </p:sp>
+            <p:sp>
+              <p:nvSpPr>
+                <p:cNvPr id="41" name="TextBox 40">
+                  <a:extLst>
+                    <a:ext uri="{FF2B5EF4-FFF2-40B4-BE49-F238E27FC236}">
+                      <a16:creationId xmlns:a16="http://schemas.microsoft.com/office/drawing/2014/main" id="{97CB68FB-3A50-00ED-C1A4-B3F290A96D38}"/>
+                    </a:ext>
+                  </a:extLst>
+                </p:cNvPr>
+                <p:cNvSpPr txBox="1"/>
+                <p:nvPr/>
+              </p:nvSpPr>
+              <p:spPr>
+                <a:xfrm>
+                  <a:off x="2133603" y="1535668"/>
+                  <a:ext cx="1720727" cy="369332"/>
+                </a:xfrm>
+                <a:prstGeom prst="rect">
+                  <a:avLst/>
+                </a:prstGeom>
+                <a:noFill/>
+              </p:spPr>
+              <p:txBody>
+                <a:bodyPr wrap="none" rtlCol="0">
+                  <a:spAutoFit/>
+                </a:bodyPr>
+                <a:lstStyle/>
+                <a:p>
+                  <a:r>
+                    <a:rPr lang="en-US" dirty="0" err="1"/>
+                    <a:t>stage_db.slurm</a:t>
+                  </a:r>
+                  <a:endParaRPr lang="LID4096" dirty="0"/>
+                </a:p>
+              </p:txBody>
+            </p:sp>
+          </p:grpSp>
+          <p:sp>
+            <p:nvSpPr>
+              <p:cNvPr id="39" name="Rectangle: Rounded Corners 38">
+                <a:extLst>
+                  <a:ext uri="{FF2B5EF4-FFF2-40B4-BE49-F238E27FC236}">
+                    <a16:creationId xmlns:a16="http://schemas.microsoft.com/office/drawing/2014/main" id="{F5FEDB67-F443-DFDB-9917-FF7EA5FB21D1}"/>
+                  </a:ext>
+                </a:extLst>
+              </p:cNvPr>
+              <p:cNvSpPr/>
+              <p:nvPr/>
+            </p:nvSpPr>
+            <p:spPr>
+              <a:xfrm>
+                <a:off x="2284520" y="2552701"/>
+                <a:ext cx="783771" cy="272143"/>
+              </a:xfrm>
+              <a:prstGeom prst="roundRect">
+                <a:avLst/>
+              </a:prstGeom>
+            </p:spPr>
+            <p:style>
+              <a:lnRef idx="2">
+                <a:schemeClr val="accent1">
+                  <a:shade val="15000"/>
+                </a:schemeClr>
+              </a:lnRef>
+              <a:fillRef idx="1">
+                <a:schemeClr val="accent1"/>
+              </a:fillRef>
+              <a:effectRef idx="0">
+                <a:schemeClr val="accent1"/>
+              </a:effectRef>
+              <a:fontRef idx="minor">
+                <a:schemeClr val="lt1"/>
+              </a:fontRef>
+            </p:style>
+            <p:txBody>
+              <a:bodyPr rtlCol="0" anchor="ctr"/>
+              <a:lstStyle/>
+              <a:p>
+                <a:pPr algn="ctr"/>
+                <a:r>
+                  <a:rPr lang="en-US" dirty="0"/>
+                  <a:t>505</a:t>
+                </a:r>
+                <a:endParaRPr lang="LID4096" dirty="0"/>
+              </a:p>
+            </p:txBody>
+          </p:sp>
+        </p:grpSp>
+        <p:sp>
+          <p:nvSpPr>
+            <p:cNvPr id="42" name="TextBox 41">
+              <a:extLst>
+                <a:ext uri="{FF2B5EF4-FFF2-40B4-BE49-F238E27FC236}">
+                  <a16:creationId xmlns:a16="http://schemas.microsoft.com/office/drawing/2014/main" id="{3312E896-3E1A-27C3-A53F-D34F75E8878F}"/>
+                </a:ext>
+              </a:extLst>
+            </p:cNvPr>
+            <p:cNvSpPr txBox="1"/>
+            <p:nvPr/>
+          </p:nvSpPr>
+          <p:spPr>
+            <a:xfrm>
+              <a:off x="2721383" y="5293755"/>
+              <a:ext cx="3768980" cy="369332"/>
+            </a:xfrm>
+            <a:prstGeom prst="rect">
+              <a:avLst/>
+            </a:prstGeom>
+            <a:noFill/>
+            <a:ln>
+              <a:solidFill>
+                <a:schemeClr val="tx1"/>
+              </a:solidFill>
+            </a:ln>
+          </p:spPr>
+          <p:txBody>
+            <a:bodyPr wrap="none" rtlCol="0">
+              <a:spAutoFit/>
+            </a:bodyPr>
+            <a:lstStyle/>
+            <a:p>
+              <a:r>
+                <a:rPr lang="en-US" dirty="0">
+                  <a:latin typeface="Courier New" panose="02070309020205020404" pitchFamily="49" charset="0"/>
+                  <a:cs typeface="Courier New" panose="02070309020205020404" pitchFamily="49" charset="0"/>
+                </a:rPr>
+                <a:t>-d=afterok:503?afterok=504</a:t>
+              </a:r>
+              <a:endParaRPr lang="LID4096" dirty="0">
+                <a:latin typeface="Courier New" panose="02070309020205020404" pitchFamily="49" charset="0"/>
+                <a:cs typeface="Courier New" panose="02070309020205020404" pitchFamily="49" charset="0"/>
+              </a:endParaRPr>
+            </a:p>
+          </p:txBody>
+        </p:sp>
+        <p:sp>
+          <p:nvSpPr>
+            <p:cNvPr id="43" name="Arrow: Up 42">
+              <a:extLst>
+                <a:ext uri="{FF2B5EF4-FFF2-40B4-BE49-F238E27FC236}">
+                  <a16:creationId xmlns:a16="http://schemas.microsoft.com/office/drawing/2014/main" id="{FBDB6FEF-2237-3B3D-0172-501AADC5CB3D}"/>
+                </a:ext>
+              </a:extLst>
+            </p:cNvPr>
+            <p:cNvSpPr/>
+            <p:nvPr/>
+          </p:nvSpPr>
+          <p:spPr>
+            <a:xfrm rot="3061519">
+              <a:off x="4755506" y="3654574"/>
+              <a:ext cx="217715" cy="611930"/>
+            </a:xfrm>
+            <a:prstGeom prst="upArrow">
+              <a:avLst/>
+            </a:prstGeom>
+            <a:solidFill>
+              <a:srgbClr val="FFC000"/>
+            </a:solidFill>
+            <a:ln>
+              <a:solidFill>
+                <a:srgbClr val="FFC000"/>
+              </a:solidFill>
+            </a:ln>
+          </p:spPr>
+          <p:style>
+            <a:lnRef idx="2">
+              <a:schemeClr val="accent1">
+                <a:shade val="15000"/>
+              </a:schemeClr>
+            </a:lnRef>
+            <a:fillRef idx="1">
+              <a:schemeClr val="accent1"/>
+            </a:fillRef>
+            <a:effectRef idx="0">
+              <a:schemeClr val="accent1"/>
+            </a:effectRef>
+            <a:fontRef idx="minor">
+              <a:schemeClr val="lt1"/>
+            </a:fontRef>
+          </p:style>
+          <p:txBody>
+            <a:bodyPr rtlCol="0" anchor="ctr"/>
+            <a:lstStyle/>
+            <a:p>
+              <a:pPr algn="ctr"/>
+              <a:endParaRPr lang="LID4096"/>
+            </a:p>
+          </p:txBody>
+        </p:sp>
+        <p:sp>
+          <p:nvSpPr>
+            <p:cNvPr id="44" name="Arrow: Up 43">
+              <a:extLst>
+                <a:ext uri="{FF2B5EF4-FFF2-40B4-BE49-F238E27FC236}">
+                  <a16:creationId xmlns:a16="http://schemas.microsoft.com/office/drawing/2014/main" id="{7964AB8C-2B86-6768-D087-EC579CDB0E9C}"/>
+                </a:ext>
+              </a:extLst>
+            </p:cNvPr>
+            <p:cNvSpPr/>
+            <p:nvPr/>
+          </p:nvSpPr>
+          <p:spPr>
+            <a:xfrm rot="19501917">
+              <a:off x="3231525" y="3275616"/>
+              <a:ext cx="217715" cy="611930"/>
+            </a:xfrm>
+            <a:prstGeom prst="upArrow">
+              <a:avLst/>
+            </a:prstGeom>
+            <a:solidFill>
+              <a:srgbClr val="FFC000"/>
+            </a:solidFill>
+            <a:ln>
+              <a:solidFill>
+                <a:srgbClr val="FFC000"/>
+              </a:solidFill>
+            </a:ln>
+          </p:spPr>
+          <p:style>
+            <a:lnRef idx="2">
+              <a:schemeClr val="accent1">
+                <a:shade val="15000"/>
+              </a:schemeClr>
+            </a:lnRef>
+            <a:fillRef idx="1">
+              <a:schemeClr val="accent1"/>
+            </a:fillRef>
+            <a:effectRef idx="0">
+              <a:schemeClr val="accent1"/>
+            </a:effectRef>
+            <a:fontRef idx="minor">
+              <a:schemeClr val="lt1"/>
+            </a:fontRef>
+          </p:style>
+          <p:txBody>
+            <a:bodyPr rtlCol="0" anchor="ctr"/>
+            <a:lstStyle/>
+            <a:p>
+              <a:pPr algn="ctr"/>
+              <a:endParaRPr lang="LID4096"/>
+            </a:p>
+          </p:txBody>
+        </p:sp>
+        <p:sp>
+          <p:nvSpPr>
+            <p:cNvPr id="47" name="TextBox 46">
+              <a:extLst>
+                <a:ext uri="{FF2B5EF4-FFF2-40B4-BE49-F238E27FC236}">
+                  <a16:creationId xmlns:a16="http://schemas.microsoft.com/office/drawing/2014/main" id="{A08EEC57-DDC2-B936-F8BC-F8150C95ED96}"/>
+                </a:ext>
+              </a:extLst>
+            </p:cNvPr>
+            <p:cNvSpPr txBox="1"/>
+            <p:nvPr/>
+          </p:nvSpPr>
+          <p:spPr>
+            <a:xfrm>
+              <a:off x="1415144" y="4744896"/>
+              <a:ext cx="579005" cy="646331"/>
+            </a:xfrm>
+            <a:prstGeom prst="rect">
+              <a:avLst/>
+            </a:prstGeom>
+            <a:noFill/>
+          </p:spPr>
+          <p:txBody>
+            <a:bodyPr wrap="none" rtlCol="0">
+              <a:spAutoFit/>
+            </a:bodyPr>
+            <a:lstStyle/>
+            <a:p>
+              <a:r>
+                <a:rPr lang="en-US" sz="3600" dirty="0"/>
+                <a:t>...</a:t>
+              </a:r>
+              <a:endParaRPr lang="LID4096" dirty="0"/>
+            </a:p>
+          </p:txBody>
+        </p:sp>
+      </p:grpSp>
+      <p:sp>
+        <p:nvSpPr>
+          <p:cNvPr id="2" name="Title 1">
+            <a:extLst>
+              <a:ext uri="{FF2B5EF4-FFF2-40B4-BE49-F238E27FC236}">
+                <a16:creationId xmlns:a16="http://schemas.microsoft.com/office/drawing/2014/main" id="{91A97ABF-F185-6E7F-0ACC-461F3A70E7E4}"/>
+              </a:ext>
+            </a:extLst>
+          </p:cNvPr>
+          <p:cNvSpPr>
+            <a:spLocks noGrp="1"/>
+          </p:cNvSpPr>
+          <p:nvPr>
+            <p:ph type="title"/>
+          </p:nvPr>
+        </p:nvSpPr>
+        <p:spPr/>
+        <p:txBody>
+          <a:bodyPr/>
+          <a:lstStyle/>
+          <a:p>
+            <a:r>
+              <a:rPr lang="en-US" dirty="0"/>
+              <a:t>Dangling jobs</a:t>
+            </a:r>
+            <a:endParaRPr lang="LID4096" dirty="0"/>
+          </a:p>
+        </p:txBody>
+      </p:sp>
+      <p:sp>
+        <p:nvSpPr>
+          <p:cNvPr id="3" name="Slide Number Placeholder 2">
+            <a:extLst>
+              <a:ext uri="{FF2B5EF4-FFF2-40B4-BE49-F238E27FC236}">
+                <a16:creationId xmlns:a16="http://schemas.microsoft.com/office/drawing/2014/main" id="{9A3E4515-7072-17EB-65D0-FE1394D26CD2}"/>
+              </a:ext>
+            </a:extLst>
+          </p:cNvPr>
+          <p:cNvSpPr>
+            <a:spLocks noGrp="1"/>
+          </p:cNvSpPr>
+          <p:nvPr>
+            <p:ph type="sldNum" sz="quarter" idx="12"/>
+          </p:nvPr>
+        </p:nvSpPr>
+        <p:spPr/>
+        <p:txBody>
+          <a:bodyPr/>
+          <a:lstStyle/>
+          <a:p>
+            <a:fld id="{9C7CE217-4467-4B8D-A735-B008FA7C4816}" type="slidenum">
+              <a:rPr lang="LID4096" smtClean="0"/>
+              <a:t>23</a:t>
+            </a:fld>
+            <a:endParaRPr lang="LID4096"/>
+          </a:p>
+        </p:txBody>
+      </p:sp>
+      <p:sp>
+        <p:nvSpPr>
+          <p:cNvPr id="45" name="TextBox 44">
+            <a:extLst>
+              <a:ext uri="{FF2B5EF4-FFF2-40B4-BE49-F238E27FC236}">
+                <a16:creationId xmlns:a16="http://schemas.microsoft.com/office/drawing/2014/main" id="{48078485-FAB2-40EC-5B19-B650333D4010}"/>
+              </a:ext>
+            </a:extLst>
+          </p:cNvPr>
+          <p:cNvSpPr txBox="1"/>
+          <p:nvPr/>
+        </p:nvSpPr>
+        <p:spPr>
+          <a:xfrm rot="1134657">
+            <a:off x="1941328" y="2523985"/>
+            <a:ext cx="649537" cy="1107996"/>
+          </a:xfrm>
+          <a:prstGeom prst="rect">
+            <a:avLst/>
+          </a:prstGeom>
+          <a:noFill/>
+        </p:spPr>
+        <p:txBody>
+          <a:bodyPr wrap="none" rtlCol="0">
+            <a:spAutoFit/>
+          </a:bodyPr>
+          <a:lstStyle/>
+          <a:p>
+            <a:r>
+              <a:rPr lang="en-US" sz="6600" b="1" dirty="0">
+                <a:solidFill>
+                  <a:srgbClr val="00B050"/>
+                </a:solidFill>
+                <a:sym typeface="Symbol" panose="05050102010706020507" pitchFamily="18" charset="2"/>
+              </a:rPr>
+              <a:t></a:t>
+            </a:r>
+            <a:endParaRPr lang="LID4096" sz="6600" b="1" dirty="0">
+              <a:solidFill>
+                <a:srgbClr val="00B050"/>
+              </a:solidFill>
+            </a:endParaRPr>
+          </a:p>
+        </p:txBody>
+      </p:sp>
+      <p:sp>
+        <p:nvSpPr>
+          <p:cNvPr id="46" name="TextBox 45">
+            <a:extLst>
+              <a:ext uri="{FF2B5EF4-FFF2-40B4-BE49-F238E27FC236}">
+                <a16:creationId xmlns:a16="http://schemas.microsoft.com/office/drawing/2014/main" id="{D2A47C86-2CAB-8E4E-1061-F457F64C453A}"/>
+              </a:ext>
+            </a:extLst>
+          </p:cNvPr>
+          <p:cNvSpPr txBox="1"/>
+          <p:nvPr/>
+        </p:nvSpPr>
+        <p:spPr>
+          <a:xfrm rot="1134657">
+            <a:off x="2428116" y="4767838"/>
+            <a:ext cx="649537" cy="1107996"/>
+          </a:xfrm>
+          <a:prstGeom prst="rect">
+            <a:avLst/>
+          </a:prstGeom>
+          <a:noFill/>
+        </p:spPr>
+        <p:txBody>
+          <a:bodyPr wrap="none" rtlCol="0">
+            <a:spAutoFit/>
+          </a:bodyPr>
+          <a:lstStyle/>
+          <a:p>
+            <a:r>
+              <a:rPr lang="en-US" sz="6600" b="1" dirty="0">
+                <a:solidFill>
+                  <a:srgbClr val="00B050"/>
+                </a:solidFill>
+                <a:sym typeface="Symbol" panose="05050102010706020507" pitchFamily="18" charset="2"/>
+              </a:rPr>
+              <a:t></a:t>
+            </a:r>
+            <a:endParaRPr lang="LID4096" sz="6600" b="1" dirty="0">
+              <a:solidFill>
+                <a:srgbClr val="00B050"/>
+              </a:solidFill>
+            </a:endParaRPr>
+          </a:p>
+        </p:txBody>
+      </p:sp>
+      <p:grpSp>
+        <p:nvGrpSpPr>
+          <p:cNvPr id="54" name="Group 53">
+            <a:extLst>
+              <a:ext uri="{FF2B5EF4-FFF2-40B4-BE49-F238E27FC236}">
+                <a16:creationId xmlns:a16="http://schemas.microsoft.com/office/drawing/2014/main" id="{539ED194-4B24-27CB-E833-CA1C9329EDD0}"/>
+              </a:ext>
+            </a:extLst>
+          </p:cNvPr>
+          <p:cNvGrpSpPr/>
+          <p:nvPr/>
+        </p:nvGrpSpPr>
+        <p:grpSpPr>
+          <a:xfrm>
+            <a:off x="4350073" y="1788807"/>
+            <a:ext cx="7314405" cy="1333763"/>
+            <a:chOff x="4350073" y="1788807"/>
+            <a:chExt cx="7314405" cy="1333763"/>
+          </a:xfrm>
+        </p:grpSpPr>
+        <p:sp>
+          <p:nvSpPr>
+            <p:cNvPr id="48" name="Rectangle: Rounded Corners 47">
+              <a:extLst>
+                <a:ext uri="{FF2B5EF4-FFF2-40B4-BE49-F238E27FC236}">
+                  <a16:creationId xmlns:a16="http://schemas.microsoft.com/office/drawing/2014/main" id="{B801FD92-2D03-84D3-159C-6774E46B1E81}"/>
+                </a:ext>
+              </a:extLst>
+            </p:cNvPr>
+            <p:cNvSpPr/>
+            <p:nvPr/>
+          </p:nvSpPr>
+          <p:spPr>
+            <a:xfrm>
+              <a:off x="4350073" y="1788807"/>
+              <a:ext cx="2528256" cy="1333763"/>
+            </a:xfrm>
+            <a:prstGeom prst="roundRect">
+              <a:avLst/>
+            </a:prstGeom>
+            <a:solidFill>
+              <a:srgbClr val="FFC000">
+                <a:alpha val="40000"/>
+              </a:srgbClr>
+            </a:solidFill>
+            <a:ln>
+              <a:solidFill>
+                <a:srgbClr val="FFC000"/>
+              </a:solidFill>
+            </a:ln>
+          </p:spPr>
+          <p:style>
+            <a:lnRef idx="2">
+              <a:schemeClr val="accent1">
+                <a:shade val="15000"/>
+              </a:schemeClr>
+            </a:lnRef>
+            <a:fillRef idx="1">
+              <a:schemeClr val="accent1"/>
+            </a:fillRef>
+            <a:effectRef idx="0">
+              <a:schemeClr val="accent1"/>
+            </a:effectRef>
+            <a:fontRef idx="minor">
+              <a:schemeClr val="lt1"/>
+            </a:fontRef>
+          </p:style>
+          <p:txBody>
+            <a:bodyPr rtlCol="0" anchor="ctr"/>
+            <a:lstStyle/>
+            <a:p>
+              <a:pPr algn="ctr"/>
+              <a:endParaRPr lang="LID4096"/>
+            </a:p>
+          </p:txBody>
+        </p:sp>
+        <p:grpSp>
+          <p:nvGrpSpPr>
+            <p:cNvPr id="50" name="Group 49">
+              <a:extLst>
+                <a:ext uri="{FF2B5EF4-FFF2-40B4-BE49-F238E27FC236}">
+                  <a16:creationId xmlns:a16="http://schemas.microsoft.com/office/drawing/2014/main" id="{006C0B06-8AF8-91C4-873C-77CDA098D65D}"/>
+                </a:ext>
+              </a:extLst>
+            </p:cNvPr>
+            <p:cNvGrpSpPr/>
+            <p:nvPr/>
+          </p:nvGrpSpPr>
+          <p:grpSpPr>
+            <a:xfrm>
+              <a:off x="6878329" y="1886103"/>
+              <a:ext cx="4786149" cy="569586"/>
+              <a:chOff x="7389993" y="4488434"/>
+              <a:chExt cx="4786149" cy="569586"/>
+            </a:xfrm>
+          </p:grpSpPr>
+          <p:cxnSp>
+            <p:nvCxnSpPr>
+              <p:cNvPr id="51" name="Straight Arrow Connector 50">
+                <a:extLst>
+                  <a:ext uri="{FF2B5EF4-FFF2-40B4-BE49-F238E27FC236}">
+                    <a16:creationId xmlns:a16="http://schemas.microsoft.com/office/drawing/2014/main" id="{E7D0947D-F49D-1D8C-714A-167D638B4B46}"/>
+                  </a:ext>
+                </a:extLst>
+              </p:cNvPr>
+              <p:cNvCxnSpPr>
+                <a:cxnSpLocks/>
+                <a:stCxn id="52" idx="1"/>
+                <a:endCxn id="48" idx="3"/>
+              </p:cNvCxnSpPr>
+              <p:nvPr/>
+            </p:nvCxnSpPr>
+            <p:spPr>
+              <a:xfrm flipH="1">
+                <a:off x="7389993" y="4719267"/>
+                <a:ext cx="716830" cy="338753"/>
+              </a:xfrm>
+              <a:prstGeom prst="straightConnector1">
+                <a:avLst/>
+              </a:prstGeom>
+              <a:ln w="28575">
+                <a:solidFill>
+                  <a:schemeClr val="tx1"/>
+                </a:solidFill>
+                <a:tailEnd type="stealth" w="lg" len="lg"/>
+              </a:ln>
+            </p:spPr>
+            <p:style>
+              <a:lnRef idx="2">
+                <a:schemeClr val="accent1"/>
+              </a:lnRef>
+              <a:fillRef idx="0">
+                <a:schemeClr val="accent1"/>
+              </a:fillRef>
+              <a:effectRef idx="1">
+                <a:schemeClr val="accent1"/>
+              </a:effectRef>
+              <a:fontRef idx="minor">
+                <a:schemeClr val="tx1"/>
+              </a:fontRef>
+            </p:style>
+          </p:cxnSp>
+          <p:sp>
+            <p:nvSpPr>
+              <p:cNvPr id="52" name="TextBox 51">
+                <a:extLst>
+                  <a:ext uri="{FF2B5EF4-FFF2-40B4-BE49-F238E27FC236}">
+                    <a16:creationId xmlns:a16="http://schemas.microsoft.com/office/drawing/2014/main" id="{0D2C6B7D-68E1-F04B-DFDD-B5C86E886B3C}"/>
+                  </a:ext>
+                </a:extLst>
+              </p:cNvPr>
+              <p:cNvSpPr txBox="1"/>
+              <p:nvPr/>
+            </p:nvSpPr>
+            <p:spPr>
+              <a:xfrm>
+                <a:off x="8106823" y="4488434"/>
+                <a:ext cx="4069319" cy="461665"/>
+              </a:xfrm>
+              <a:prstGeom prst="rect">
+                <a:avLst/>
+              </a:prstGeom>
+              <a:solidFill>
+                <a:schemeClr val="bg1"/>
+              </a:solidFill>
+              <a:ln>
+                <a:solidFill>
+                  <a:schemeClr val="tx1"/>
+                </a:solidFill>
+              </a:ln>
+            </p:spPr>
+            <p:txBody>
+              <a:bodyPr wrap="none" rtlCol="0">
+                <a:spAutoFit/>
+              </a:bodyPr>
+              <a:lstStyle/>
+              <a:p>
+                <a:r>
+                  <a:rPr lang="en-US" sz="2400" dirty="0"/>
+                  <a:t>Job remains queued: pending</a:t>
+                </a:r>
+                <a:endParaRPr lang="LID4096" sz="2400" dirty="0"/>
+              </a:p>
+            </p:txBody>
+          </p:sp>
+        </p:grpSp>
+      </p:grpSp>
+      <p:grpSp>
+        <p:nvGrpSpPr>
+          <p:cNvPr id="56" name="Group 55">
+            <a:extLst>
+              <a:ext uri="{FF2B5EF4-FFF2-40B4-BE49-F238E27FC236}">
+                <a16:creationId xmlns:a16="http://schemas.microsoft.com/office/drawing/2014/main" id="{C594FA10-F08D-E6A6-D475-E99DF043C373}"/>
+              </a:ext>
+            </a:extLst>
+          </p:cNvPr>
+          <p:cNvGrpSpPr/>
+          <p:nvPr/>
+        </p:nvGrpSpPr>
+        <p:grpSpPr>
+          <a:xfrm>
+            <a:off x="7595159" y="3080111"/>
+            <a:ext cx="2958306" cy="1433420"/>
+            <a:chOff x="6985191" y="5410397"/>
+            <a:chExt cx="2958306" cy="1433420"/>
+          </a:xfrm>
+        </p:grpSpPr>
+        <p:sp>
+          <p:nvSpPr>
+            <p:cNvPr id="57" name="TextBox 56">
+              <a:extLst>
+                <a:ext uri="{FF2B5EF4-FFF2-40B4-BE49-F238E27FC236}">
+                  <a16:creationId xmlns:a16="http://schemas.microsoft.com/office/drawing/2014/main" id="{BACB53C3-FF82-342B-EAB5-37F1916C0344}"/>
+                </a:ext>
+              </a:extLst>
+            </p:cNvPr>
+            <p:cNvSpPr txBox="1"/>
+            <p:nvPr/>
+          </p:nvSpPr>
+          <p:spPr>
+            <a:xfrm>
+              <a:off x="6985191" y="5889710"/>
+              <a:ext cx="2370392" cy="954107"/>
+            </a:xfrm>
+            <a:prstGeom prst="rect">
+              <a:avLst/>
+            </a:prstGeom>
+            <a:noFill/>
+            <a:ln>
+              <a:solidFill>
+                <a:schemeClr val="tx1"/>
+              </a:solidFill>
+            </a:ln>
+          </p:spPr>
+          <p:txBody>
+            <a:bodyPr wrap="none" rtlCol="0">
+              <a:spAutoFit/>
+            </a:bodyPr>
+            <a:lstStyle/>
+            <a:p>
+              <a:pPr algn="ctr"/>
+              <a:r>
+                <a:rPr lang="en-US" sz="2800" dirty="0"/>
+                <a:t>Don't forget to</a:t>
+              </a:r>
+            </a:p>
+            <a:p>
+              <a:pPr algn="ctr"/>
+              <a:r>
+                <a:rPr lang="en-US" sz="2800" dirty="0"/>
+                <a:t>clean up!</a:t>
+              </a:r>
+              <a:endParaRPr lang="LID4096" sz="2800" dirty="0"/>
+            </a:p>
+          </p:txBody>
+        </p:sp>
+        <p:pic>
+          <p:nvPicPr>
+            <p:cNvPr id="58" name="Picture 2" descr="C:\Users\lucg5005\AppData\Local\Microsoft\Windows\Temporary Internet Files\Content.IE5\CWZUAEH4\lgi01a201309290600[1].jpg">
+              <a:extLst>
+                <a:ext uri="{FF2B5EF4-FFF2-40B4-BE49-F238E27FC236}">
+                  <a16:creationId xmlns:a16="http://schemas.microsoft.com/office/drawing/2014/main" id="{EC95EF92-8140-3CE0-369D-B9319DAE60BA}"/>
+                </a:ext>
+              </a:extLst>
+            </p:cNvPr>
+            <p:cNvPicPr>
+              <a:picLocks noChangeAspect="1" noChangeArrowheads="1"/>
+            </p:cNvPicPr>
+            <p:nvPr/>
+          </p:nvPicPr>
+          <p:blipFill>
+            <a:blip r:embed="rId2" cstate="print">
+              <a:extLst>
+                <a:ext uri="{28A0092B-C50C-407E-A947-70E740481C1C}">
+                  <a14:useLocalDpi xmlns:a14="http://schemas.microsoft.com/office/drawing/2010/main" val="0"/>
+                </a:ext>
+              </a:extLst>
+            </a:blip>
+            <a:srcRect/>
+            <a:stretch>
+              <a:fillRect/>
+            </a:stretch>
+          </p:blipFill>
+          <p:spPr bwMode="auto">
+            <a:xfrm>
+              <a:off x="9212442" y="5410397"/>
+              <a:ext cx="731055" cy="750110"/>
+            </a:xfrm>
+            <a:prstGeom prst="rect">
+              <a:avLst/>
+            </a:prstGeom>
+            <a:noFill/>
+            <a:extLst>
+              <a:ext uri="{909E8E84-426E-40DD-AFC4-6F175D3DCCD1}">
+                <a14:hiddenFill xmlns:a14="http://schemas.microsoft.com/office/drawing/2010/main">
+                  <a:solidFill>
+                    <a:srgbClr val="FFFFFF"/>
+                  </a:solidFill>
+                </a14:hiddenFill>
+              </a:ext>
+            </a:extLst>
+          </p:spPr>
+        </p:pic>
+      </p:grpSp>
+    </p:spTree>
+    <p:extLst>
+      <p:ext uri="{BB962C8B-B14F-4D97-AF65-F5344CB8AC3E}">
+        <p14:creationId xmlns:p14="http://schemas.microsoft.com/office/powerpoint/2010/main" val="1624029541"/>
+      </p:ext>
+    </p:extLst>
+  </p:cSld>
+  <p:clrMapOvr>
+    <a:masterClrMapping/>
+  </p:clrMapOvr>
+</p:sld>
+</file>
+
+<file path=ppt/slides/slide24.xml><?xml version="1.0" encoding="utf-8"?>
+<p:sld xmlns:a="http://schemas.openxmlformats.org/drawingml/2006/main" xmlns:r="http://schemas.openxmlformats.org/officeDocument/2006/relationships" xmlns:p="http://schemas.openxmlformats.org/presentationml/2006/main">
+  <p:cSld>
+    <p:spTree>
+      <p:nvGrpSpPr>
+        <p:cNvPr id="1" name=""/>
+        <p:cNvGrpSpPr/>
+        <p:nvPr/>
+      </p:nvGrpSpPr>
+      <p:grpSpPr>
+        <a:xfrm>
+          <a:off x="0" y="0"/>
+          <a:ext cx="0" cy="0"/>
+          <a:chOff x="0" y="0"/>
+          <a:chExt cx="0" cy="0"/>
+        </a:xfrm>
+      </p:grpSpPr>
+      <p:sp>
+        <p:nvSpPr>
+          <p:cNvPr id="2" name="Title 1">
+            <a:extLst>
+              <a:ext uri="{FF2B5EF4-FFF2-40B4-BE49-F238E27FC236}">
+                <a16:creationId xmlns:a16="http://schemas.microsoft.com/office/drawing/2014/main" id="{F5549952-4F63-6942-C560-BF51271176E2}"/>
+              </a:ext>
+            </a:extLst>
+          </p:cNvPr>
+          <p:cNvSpPr>
+            <a:spLocks noGrp="1"/>
+          </p:cNvSpPr>
+          <p:nvPr>
+            <p:ph type="title"/>
+          </p:nvPr>
+        </p:nvSpPr>
+        <p:spPr/>
+        <p:txBody>
+          <a:bodyPr/>
+          <a:lstStyle/>
+          <a:p>
+            <a:r>
+              <a:rPr lang="en-US" dirty="0"/>
+              <a:t>Clean up dangling jobs</a:t>
+            </a:r>
+            <a:endParaRPr lang="LID4096" dirty="0"/>
+          </a:p>
+        </p:txBody>
+      </p:sp>
+      <p:sp>
+        <p:nvSpPr>
+          <p:cNvPr id="3" name="Slide Number Placeholder 2">
+            <a:extLst>
+              <a:ext uri="{FF2B5EF4-FFF2-40B4-BE49-F238E27FC236}">
+                <a16:creationId xmlns:a16="http://schemas.microsoft.com/office/drawing/2014/main" id="{5308B71E-6CFA-BD12-0A3A-1EE777015267}"/>
+              </a:ext>
+            </a:extLst>
+          </p:cNvPr>
+          <p:cNvSpPr>
+            <a:spLocks noGrp="1"/>
+          </p:cNvSpPr>
+          <p:nvPr>
+            <p:ph type="sldNum" sz="quarter" idx="12"/>
+          </p:nvPr>
+        </p:nvSpPr>
+        <p:spPr/>
+        <p:txBody>
+          <a:bodyPr/>
+          <a:lstStyle/>
+          <a:p>
+            <a:fld id="{9C7CE217-4467-4B8D-A735-B008FA7C4816}" type="slidenum">
+              <a:rPr lang="LID4096" smtClean="0"/>
+              <a:t>24</a:t>
+            </a:fld>
+            <a:endParaRPr lang="LID4096"/>
+          </a:p>
+        </p:txBody>
+      </p:sp>
+      <p:sp>
+        <p:nvSpPr>
+          <p:cNvPr id="4" name="TextBox 3">
+            <a:extLst>
+              <a:ext uri="{FF2B5EF4-FFF2-40B4-BE49-F238E27FC236}">
+                <a16:creationId xmlns:a16="http://schemas.microsoft.com/office/drawing/2014/main" id="{428DF987-F378-1147-12B9-5D492C477435}"/>
+              </a:ext>
+            </a:extLst>
+          </p:cNvPr>
+          <p:cNvSpPr txBox="1"/>
+          <p:nvPr/>
+        </p:nvSpPr>
+        <p:spPr>
+          <a:xfrm>
+            <a:off x="275722" y="1794898"/>
+            <a:ext cx="11626901" cy="1200329"/>
+          </a:xfrm>
+          <a:prstGeom prst="rect">
+            <a:avLst/>
+          </a:prstGeom>
+          <a:solidFill>
+            <a:schemeClr val="tx1"/>
+          </a:solidFill>
+          <a:ln>
+            <a:solidFill>
+              <a:schemeClr val="tx1"/>
+            </a:solidFill>
+          </a:ln>
+        </p:spPr>
+        <p:txBody>
+          <a:bodyPr wrap="none" rtlCol="0">
+            <a:spAutoFit/>
+          </a:bodyPr>
+          <a:lstStyle/>
+          <a:p>
+            <a:r>
+              <a:rPr lang="en-US" b="1" dirty="0">
+                <a:solidFill>
+                  <a:schemeClr val="bg1"/>
+                </a:solidFill>
+                <a:latin typeface="Courier New" pitchFamily="49" charset="0"/>
+                <a:cs typeface="Courier New" pitchFamily="49" charset="0"/>
+              </a:rPr>
+              <a:t>$ </a:t>
+            </a:r>
+            <a:r>
+              <a:rPr lang="en-US" b="1" dirty="0" err="1">
+                <a:solidFill>
+                  <a:schemeClr val="bg1"/>
+                </a:solidFill>
+                <a:latin typeface="Courier New" pitchFamily="49" charset="0"/>
+                <a:cs typeface="Courier New" pitchFamily="49" charset="0"/>
+              </a:rPr>
+              <a:t>squeue</a:t>
+            </a:r>
+            <a:r>
+              <a:rPr lang="en-US" b="1" dirty="0">
+                <a:solidFill>
+                  <a:schemeClr val="bg1"/>
+                </a:solidFill>
+                <a:latin typeface="Courier New" pitchFamily="49" charset="0"/>
+                <a:cs typeface="Courier New" pitchFamily="49" charset="0"/>
+              </a:rPr>
+              <a:t> --cluster=all</a:t>
+            </a:r>
+          </a:p>
+          <a:p>
+            <a:r>
+              <a:rPr lang="en-US" b="1" dirty="0">
+                <a:solidFill>
+                  <a:schemeClr val="bg1"/>
+                </a:solidFill>
+                <a:latin typeface="Courier New" pitchFamily="49" charset="0"/>
+                <a:cs typeface="Courier New" pitchFamily="49" charset="0"/>
+              </a:rPr>
+              <a:t>CLUSTER: </a:t>
+            </a:r>
+            <a:r>
+              <a:rPr lang="en-US" b="1" dirty="0" err="1">
+                <a:solidFill>
+                  <a:schemeClr val="bg1"/>
+                </a:solidFill>
+                <a:latin typeface="Courier New" pitchFamily="49" charset="0"/>
+                <a:cs typeface="Courier New" pitchFamily="49" charset="0"/>
+              </a:rPr>
+              <a:t>wice</a:t>
+            </a:r>
+            <a:endParaRPr lang="en-US" b="1" dirty="0">
+              <a:solidFill>
+                <a:schemeClr val="bg1"/>
+              </a:solidFill>
+              <a:latin typeface="Courier New" pitchFamily="49" charset="0"/>
+              <a:cs typeface="Courier New" pitchFamily="49" charset="0"/>
+            </a:endParaRPr>
+          </a:p>
+          <a:p>
+            <a:r>
+              <a:rPr lang="en-US" b="1" dirty="0">
+                <a:solidFill>
+                  <a:schemeClr val="bg1"/>
+                </a:solidFill>
+                <a:latin typeface="Courier New" pitchFamily="49" charset="0"/>
+                <a:cs typeface="Courier New" pitchFamily="49" charset="0"/>
+              </a:rPr>
+              <a:t>JOBID PARTITION     NAME     USER ST       TIME  NODES NODELIST(REASON)</a:t>
+            </a:r>
+          </a:p>
+          <a:p>
+            <a:r>
+              <a:rPr lang="en-US" b="1" dirty="0">
+                <a:solidFill>
+                  <a:schemeClr val="bg1"/>
+                </a:solidFill>
+                <a:latin typeface="Courier New" pitchFamily="49" charset="0"/>
+                <a:cs typeface="Courier New" pitchFamily="49" charset="0"/>
+              </a:rPr>
+              <a:t>  504     batch </a:t>
+            </a:r>
+            <a:r>
+              <a:rPr lang="en-US" b="1" dirty="0" err="1">
+                <a:solidFill>
+                  <a:schemeClr val="bg1"/>
+                </a:solidFill>
+                <a:latin typeface="Courier New" pitchFamily="49" charset="0"/>
+                <a:cs typeface="Courier New" pitchFamily="49" charset="0"/>
+              </a:rPr>
+              <a:t>copy_bac</a:t>
+            </a:r>
+            <a:r>
+              <a:rPr lang="en-US" b="1" dirty="0">
+                <a:solidFill>
+                  <a:schemeClr val="bg1"/>
+                </a:solidFill>
+                <a:latin typeface="Courier New" pitchFamily="49" charset="0"/>
+                <a:cs typeface="Courier New" pitchFamily="49" charset="0"/>
+              </a:rPr>
+              <a:t> vsc30001 PD       0:00      1 (</a:t>
+            </a:r>
+            <a:r>
+              <a:rPr lang="en-US" b="1" dirty="0" err="1">
+                <a:solidFill>
+                  <a:schemeClr val="bg1"/>
+                </a:solidFill>
+                <a:latin typeface="Courier New" pitchFamily="49" charset="0"/>
+                <a:cs typeface="Courier New" pitchFamily="49" charset="0"/>
+              </a:rPr>
+              <a:t>DependencyNeverSatisfied</a:t>
+            </a:r>
+            <a:r>
+              <a:rPr lang="en-US" b="1" dirty="0">
+                <a:solidFill>
+                  <a:schemeClr val="bg1"/>
+                </a:solidFill>
+                <a:latin typeface="Courier New" pitchFamily="49" charset="0"/>
+                <a:cs typeface="Courier New" pitchFamily="49" charset="0"/>
+              </a:rPr>
+              <a:t>)</a:t>
+            </a:r>
+          </a:p>
+        </p:txBody>
+      </p:sp>
+      <p:grpSp>
+        <p:nvGrpSpPr>
+          <p:cNvPr id="7" name="Group 6">
+            <a:extLst>
+              <a:ext uri="{FF2B5EF4-FFF2-40B4-BE49-F238E27FC236}">
+                <a16:creationId xmlns:a16="http://schemas.microsoft.com/office/drawing/2014/main" id="{DE78EEAD-807C-A38D-3808-547122FA495D}"/>
+              </a:ext>
+            </a:extLst>
+          </p:cNvPr>
+          <p:cNvGrpSpPr/>
+          <p:nvPr/>
+        </p:nvGrpSpPr>
+        <p:grpSpPr>
+          <a:xfrm>
+            <a:off x="275721" y="3238731"/>
+            <a:ext cx="11626901" cy="2868218"/>
+            <a:chOff x="275721" y="3238731"/>
+            <a:chExt cx="11626901" cy="2868218"/>
+          </a:xfrm>
+        </p:grpSpPr>
+        <p:sp>
+          <p:nvSpPr>
+            <p:cNvPr id="5" name="TextBox 4">
+              <a:extLst>
+                <a:ext uri="{FF2B5EF4-FFF2-40B4-BE49-F238E27FC236}">
+                  <a16:creationId xmlns:a16="http://schemas.microsoft.com/office/drawing/2014/main" id="{93748F83-ECFA-029E-3ADB-E7290590D023}"/>
+                </a:ext>
+              </a:extLst>
+            </p:cNvPr>
+            <p:cNvSpPr txBox="1"/>
+            <p:nvPr/>
+          </p:nvSpPr>
+          <p:spPr>
+            <a:xfrm>
+              <a:off x="275721" y="3244627"/>
+              <a:ext cx="11626901" cy="2862322"/>
+            </a:xfrm>
+            <a:prstGeom prst="rect">
+              <a:avLst/>
+            </a:prstGeom>
+            <a:solidFill>
+              <a:schemeClr val="bg1">
+                <a:lumMod val="85000"/>
+              </a:schemeClr>
+            </a:solidFill>
+          </p:spPr>
+          <p:txBody>
+            <a:bodyPr wrap="square" rtlCol="0">
+              <a:spAutoFit/>
+            </a:bodyPr>
+            <a:lstStyle/>
+            <a:p>
+              <a:pPr lvl="0">
+                <a:defRPr/>
+              </a:pPr>
+              <a:r>
+                <a:rPr lang="en-US" dirty="0">
+                  <a:solidFill>
+                    <a:prstClr val="black"/>
+                  </a:solidFill>
+                  <a:latin typeface="Courier New" pitchFamily="49" charset="0"/>
+                  <a:cs typeface="Courier New" pitchFamily="49" charset="0"/>
+                </a:rPr>
+                <a:t>#!/usr/bin/env bash</a:t>
+              </a:r>
+            </a:p>
+            <a:p>
+              <a:pPr lvl="0">
+                <a:defRPr/>
+              </a:pPr>
+              <a:endParaRPr lang="en-US" dirty="0">
+                <a:solidFill>
+                  <a:prstClr val="black"/>
+                </a:solidFill>
+                <a:latin typeface="Courier New" pitchFamily="49" charset="0"/>
+                <a:cs typeface="Courier New" pitchFamily="49" charset="0"/>
+              </a:endParaRPr>
+            </a:p>
+            <a:p>
+              <a:pPr lvl="0">
+                <a:defRPr/>
+              </a:pPr>
+              <a:r>
+                <a:rPr lang="en-US" dirty="0" err="1">
+                  <a:solidFill>
+                    <a:prstClr val="black"/>
+                  </a:solidFill>
+                  <a:latin typeface="Courier New" pitchFamily="49" charset="0"/>
+                  <a:cs typeface="Courier New" pitchFamily="49" charset="0"/>
+                </a:rPr>
+                <a:t>job_ids</a:t>
+              </a:r>
+              <a:r>
+                <a:rPr lang="en-US" dirty="0">
+                  <a:solidFill>
+                    <a:prstClr val="black"/>
+                  </a:solidFill>
+                  <a:latin typeface="Courier New" pitchFamily="49" charset="0"/>
+                  <a:cs typeface="Courier New" pitchFamily="49" charset="0"/>
+                </a:rPr>
+                <a:t>= $(</a:t>
+              </a:r>
+              <a:r>
+                <a:rPr lang="en-US" dirty="0" err="1">
+                  <a:solidFill>
+                    <a:prstClr val="black"/>
+                  </a:solidFill>
+                  <a:latin typeface="Courier New" pitchFamily="49" charset="0"/>
+                  <a:cs typeface="Courier New" pitchFamily="49" charset="0"/>
+                </a:rPr>
+                <a:t>squeue</a:t>
+              </a:r>
+              <a:r>
+                <a:rPr lang="en-US" dirty="0">
+                  <a:solidFill>
+                    <a:prstClr val="black"/>
+                  </a:solidFill>
+                  <a:latin typeface="Courier New" pitchFamily="49" charset="0"/>
+                  <a:cs typeface="Courier New" pitchFamily="49" charset="0"/>
+                </a:rPr>
+                <a:t> --cluster=all -t PD | \</a:t>
+              </a:r>
+            </a:p>
+            <a:p>
+              <a:pPr lvl="0">
+                <a:defRPr/>
+              </a:pPr>
+              <a:r>
+                <a:rPr lang="en-US" dirty="0">
+                  <a:solidFill>
+                    <a:prstClr val="black"/>
+                  </a:solidFill>
+                  <a:latin typeface="Courier New" pitchFamily="49" charset="0"/>
+                  <a:cs typeface="Courier New" pitchFamily="49" charset="0"/>
+                </a:rPr>
+                <a:t>               grep </a:t>
+              </a:r>
+              <a:r>
+                <a:rPr lang="en-US" dirty="0" err="1">
+                  <a:solidFill>
+                    <a:prstClr val="black"/>
+                  </a:solidFill>
+                  <a:latin typeface="Courier New" pitchFamily="49" charset="0"/>
+                  <a:cs typeface="Courier New" pitchFamily="49" charset="0"/>
+                </a:rPr>
+                <a:t>DependencyNeverSatisfied</a:t>
+              </a:r>
+              <a:r>
+                <a:rPr lang="en-US" dirty="0">
+                  <a:solidFill>
+                    <a:prstClr val="black"/>
+                  </a:solidFill>
+                  <a:latin typeface="Courier New" pitchFamily="49" charset="0"/>
+                  <a:cs typeface="Courier New" pitchFamily="49" charset="0"/>
+                </a:rPr>
+                <a:t> | \</a:t>
+              </a:r>
+            </a:p>
+            <a:p>
+              <a:pPr lvl="0">
+                <a:defRPr/>
+              </a:pPr>
+              <a:r>
+                <a:rPr lang="en-US" dirty="0">
+                  <a:solidFill>
+                    <a:prstClr val="black"/>
+                  </a:solidFill>
+                  <a:latin typeface="Courier New" pitchFamily="49" charset="0"/>
+                  <a:cs typeface="Courier New" pitchFamily="49" charset="0"/>
+                </a:rPr>
+                <a:t>               grep -</a:t>
+              </a:r>
+              <a:r>
+                <a:rPr lang="en-US" dirty="0" err="1">
+                  <a:solidFill>
+                    <a:prstClr val="black"/>
+                  </a:solidFill>
+                  <a:latin typeface="Courier New" pitchFamily="49" charset="0"/>
+                  <a:cs typeface="Courier New" pitchFamily="49" charset="0"/>
+                </a:rPr>
+                <a:t>oP</a:t>
+              </a:r>
+              <a:r>
+                <a:rPr lang="en-US" dirty="0">
+                  <a:solidFill>
+                    <a:prstClr val="black"/>
+                  </a:solidFill>
+                  <a:latin typeface="Courier New" pitchFamily="49" charset="0"/>
+                  <a:cs typeface="Courier New" pitchFamily="49" charset="0"/>
+                </a:rPr>
+                <a:t> '^\s+(\d+)\b')</a:t>
+              </a:r>
+            </a:p>
+            <a:p>
+              <a:pPr lvl="0">
+                <a:defRPr/>
+              </a:pPr>
+              <a:r>
+                <a:rPr lang="en-US" dirty="0">
+                  <a:solidFill>
+                    <a:prstClr val="black"/>
+                  </a:solidFill>
+                  <a:latin typeface="Courier New" pitchFamily="49" charset="0"/>
+                  <a:cs typeface="Courier New" pitchFamily="49" charset="0"/>
+                </a:rPr>
+                <a:t>for </a:t>
+              </a:r>
+              <a:r>
+                <a:rPr lang="en-US" dirty="0" err="1">
+                  <a:solidFill>
+                    <a:prstClr val="black"/>
+                  </a:solidFill>
+                  <a:latin typeface="Courier New" pitchFamily="49" charset="0"/>
+                  <a:cs typeface="Courier New" pitchFamily="49" charset="0"/>
+                </a:rPr>
+                <a:t>job_id</a:t>
+              </a:r>
+              <a:r>
+                <a:rPr lang="en-US" dirty="0">
+                  <a:solidFill>
+                    <a:prstClr val="black"/>
+                  </a:solidFill>
+                  <a:latin typeface="Courier New" pitchFamily="49" charset="0"/>
+                  <a:cs typeface="Courier New" pitchFamily="49" charset="0"/>
+                </a:rPr>
+                <a:t> in</a:t>
+              </a:r>
+            </a:p>
+            <a:p>
+              <a:pPr lvl="0">
+                <a:defRPr/>
+              </a:pPr>
+              <a:r>
+                <a:rPr lang="en-US" dirty="0">
+                  <a:solidFill>
+                    <a:prstClr val="black"/>
+                  </a:solidFill>
+                  <a:latin typeface="Courier New" pitchFamily="49" charset="0"/>
+                  <a:cs typeface="Courier New" pitchFamily="49" charset="0"/>
+                </a:rPr>
+                <a:t>do</a:t>
+              </a:r>
+            </a:p>
+            <a:p>
+              <a:pPr lvl="0">
+                <a:defRPr/>
+              </a:pPr>
+              <a:r>
+                <a:rPr lang="en-US" dirty="0">
+                  <a:solidFill>
+                    <a:prstClr val="black"/>
+                  </a:solidFill>
+                  <a:latin typeface="Courier New" pitchFamily="49" charset="0"/>
+                  <a:cs typeface="Courier New" pitchFamily="49" charset="0"/>
+                </a:rPr>
+                <a:t>    </a:t>
+              </a:r>
+              <a:r>
+                <a:rPr lang="en-US" dirty="0" err="1">
+                  <a:solidFill>
+                    <a:prstClr val="black"/>
+                  </a:solidFill>
+                  <a:latin typeface="Courier New" pitchFamily="49" charset="0"/>
+                  <a:cs typeface="Courier New" pitchFamily="49" charset="0"/>
+                </a:rPr>
+                <a:t>scancel</a:t>
+              </a:r>
+              <a:r>
+                <a:rPr lang="en-US" dirty="0">
+                  <a:solidFill>
+                    <a:prstClr val="black"/>
+                  </a:solidFill>
+                  <a:latin typeface="Courier New" pitchFamily="49" charset="0"/>
+                  <a:cs typeface="Courier New" pitchFamily="49" charset="0"/>
+                </a:rPr>
+                <a:t> --cluster=all $</a:t>
+              </a:r>
+              <a:r>
+                <a:rPr lang="en-US" dirty="0" err="1">
+                  <a:solidFill>
+                    <a:prstClr val="black"/>
+                  </a:solidFill>
+                  <a:latin typeface="Courier New" pitchFamily="49" charset="0"/>
+                  <a:cs typeface="Courier New" pitchFamily="49" charset="0"/>
+                </a:rPr>
+                <a:t>job_id</a:t>
+              </a:r>
+              <a:endParaRPr lang="en-US" dirty="0">
+                <a:solidFill>
+                  <a:prstClr val="black"/>
+                </a:solidFill>
+                <a:latin typeface="Courier New" pitchFamily="49" charset="0"/>
+                <a:cs typeface="Courier New" pitchFamily="49" charset="0"/>
+              </a:endParaRPr>
+            </a:p>
+            <a:p>
+              <a:pPr lvl="0">
+                <a:defRPr/>
+              </a:pPr>
+              <a:r>
+                <a:rPr lang="en-US" dirty="0">
+                  <a:solidFill>
+                    <a:prstClr val="black"/>
+                  </a:solidFill>
+                  <a:latin typeface="Courier New" pitchFamily="49" charset="0"/>
+                  <a:cs typeface="Courier New" pitchFamily="49" charset="0"/>
+                </a:rPr>
+                <a:t>    echo job $</a:t>
+              </a:r>
+              <a:r>
+                <a:rPr lang="en-US" dirty="0" err="1">
+                  <a:solidFill>
+                    <a:prstClr val="black"/>
+                  </a:solidFill>
+                  <a:latin typeface="Courier New" pitchFamily="49" charset="0"/>
+                  <a:cs typeface="Courier New" pitchFamily="49" charset="0"/>
+                </a:rPr>
+                <a:t>job_id</a:t>
+              </a:r>
+              <a:r>
+                <a:rPr lang="en-US" dirty="0">
+                  <a:solidFill>
+                    <a:prstClr val="black"/>
+                  </a:solidFill>
+                  <a:latin typeface="Courier New" pitchFamily="49" charset="0"/>
+                  <a:cs typeface="Courier New" pitchFamily="49" charset="0"/>
+                </a:rPr>
+                <a:t> cancelled</a:t>
+              </a:r>
+            </a:p>
+            <a:p>
+              <a:pPr lvl="0">
+                <a:defRPr/>
+              </a:pPr>
+              <a:r>
+                <a:rPr lang="en-US" dirty="0">
+                  <a:solidFill>
+                    <a:prstClr val="black"/>
+                  </a:solidFill>
+                  <a:latin typeface="Courier New" pitchFamily="49" charset="0"/>
+                  <a:cs typeface="Courier New" pitchFamily="49" charset="0"/>
+                </a:rPr>
+                <a:t>done</a:t>
+              </a:r>
+              <a:endParaRPr kumimoji="0" lang="en-US" sz="1800" b="0" i="0" u="none" strike="noStrike" kern="1200" cap="none" spc="0" normalizeH="0" baseline="0" noProof="0" dirty="0">
+                <a:ln>
+                  <a:noFill/>
+                </a:ln>
+                <a:solidFill>
+                  <a:prstClr val="black"/>
+                </a:solidFill>
+                <a:effectLst/>
+                <a:uLnTx/>
+                <a:uFillTx/>
+                <a:latin typeface="Courier New" pitchFamily="49" charset="0"/>
+                <a:ea typeface="+mn-ea"/>
+                <a:cs typeface="Courier New" pitchFamily="49" charset="0"/>
+              </a:endParaRPr>
+            </a:p>
+          </p:txBody>
+        </p:sp>
+        <p:sp>
+          <p:nvSpPr>
+            <p:cNvPr id="6" name="TextBox 5">
+              <a:extLst>
+                <a:ext uri="{FF2B5EF4-FFF2-40B4-BE49-F238E27FC236}">
+                  <a16:creationId xmlns:a16="http://schemas.microsoft.com/office/drawing/2014/main" id="{04412DC3-5D6E-FE74-DC2B-DE9FDE69D9C5}"/>
+                </a:ext>
+              </a:extLst>
+            </p:cNvPr>
+            <p:cNvSpPr txBox="1"/>
+            <p:nvPr/>
+          </p:nvSpPr>
+          <p:spPr>
+            <a:xfrm>
+              <a:off x="10360212" y="3238731"/>
+              <a:ext cx="1542410" cy="338554"/>
+            </a:xfrm>
+            <a:prstGeom prst="rect">
+              <a:avLst/>
+            </a:prstGeom>
+            <a:solidFill>
+              <a:schemeClr val="bg1"/>
+            </a:solidFill>
+            <a:ln>
+              <a:solidFill>
+                <a:schemeClr val="tx1"/>
+              </a:solidFill>
+            </a:ln>
+          </p:spPr>
+          <p:txBody>
+            <a:bodyPr wrap="none" rtlCol="0">
+              <a:spAutoFit/>
+            </a:bodyPr>
+            <a:lstStyle/>
+            <a:p>
+              <a:r>
+                <a:rPr lang="en-US" sz="1600" dirty="0">
+                  <a:latin typeface="Courier New" panose="02070309020205020404" pitchFamily="49" charset="0"/>
+                  <a:cs typeface="Courier New" panose="02070309020205020404" pitchFamily="49" charset="0"/>
+                </a:rPr>
+                <a:t>clean_up.sh</a:t>
+              </a:r>
+              <a:endParaRPr lang="LID4096" sz="1600" dirty="0">
+                <a:latin typeface="Courier New" panose="02070309020205020404" pitchFamily="49" charset="0"/>
+                <a:cs typeface="Courier New" panose="02070309020205020404" pitchFamily="49" charset="0"/>
+              </a:endParaRPr>
+            </a:p>
+          </p:txBody>
+        </p:sp>
+      </p:grpSp>
+    </p:spTree>
+    <p:extLst>
+      <p:ext uri="{BB962C8B-B14F-4D97-AF65-F5344CB8AC3E}">
+        <p14:creationId xmlns:p14="http://schemas.microsoft.com/office/powerpoint/2010/main" val="3234550175"/>
+      </p:ext>
+    </p:extLst>
+  </p:cSld>
+  <p:clrMapOvr>
+    <a:masterClrMapping/>
+  </p:clrMapOvr>
+  <p:timing>
+    <p:tnLst>
+      <p:par>
+        <p:cTn id="1" dur="indefinite" restart="never" nodeType="tmRoot">
+          <p:childTnLst>
+            <p:seq concurrent="1" nextAc="seek">
+              <p:cTn id="2" dur="indefinite" nodeType="mainSeq">
+                <p:childTnLst>
+                  <p:par>
+                    <p:cTn id="3" fill="hold">
+                      <p:stCondLst>
+                        <p:cond delay="indefinite"/>
+                        <p:cond evt="onBegin" delay="0">
+                          <p:tn val="2"/>
+                        </p:cond>
+                      </p:stCondLst>
+                      <p:childTnLst>
+                        <p:par>
+                          <p:cTn id="4" fill="hold">
+                            <p:stCondLst>
+                              <p:cond delay="0"/>
+                            </p:stCondLst>
+                            <p:childTnLst>
+                              <p:par>
+                                <p:cTn id="5" presetID="1" presetClass="entr" presetSubtype="0" fill="hold" grpId="0" nodeType="withEffect">
+                                  <p:stCondLst>
+                                    <p:cond delay="0"/>
+                                  </p:stCondLst>
+                                  <p:childTnLst>
+                                    <p:set>
+                                      <p:cBhvr>
+                                        <p:cTn id="6" dur="1" fill="hold">
+                                          <p:stCondLst>
+                                            <p:cond delay="0"/>
+                                          </p:stCondLst>
+                                        </p:cTn>
+                                        <p:tgtEl>
+                                          <p:spTgt spid="4"/>
+                                        </p:tgtEl>
+                                        <p:attrNameLst>
+                                          <p:attrName>style.visibility</p:attrName>
+                                        </p:attrNameLst>
+                                      </p:cBhvr>
+                                      <p:to>
+                                        <p:strVal val="visible"/>
+                                      </p:to>
+                                    </p:set>
+                                  </p:childTnLst>
+                                </p:cTn>
+                              </p:par>
+                            </p:childTnLst>
+                          </p:cTn>
+                        </p:par>
+                      </p:childTnLst>
+                    </p:cTn>
+                  </p:par>
+                </p:childTnLst>
+              </p:cTn>
+              <p:prevCondLst>
+                <p:cond evt="onPrev" delay="0">
+                  <p:tgtEl>
+                    <p:sldTgt/>
+                  </p:tgtEl>
+                </p:cond>
+              </p:prevCondLst>
+              <p:nextCondLst>
+                <p:cond evt="onNext" delay="0">
+                  <p:tgtEl>
+                    <p:sldTgt/>
+                  </p:tgtEl>
+                </p:cond>
+              </p:nextCondLst>
+            </p:seq>
+          </p:childTnLst>
+        </p:cTn>
+      </p:par>
+    </p:tnLst>
+    <p:bldLst>
+      <p:bldP spid="4" grpId="0" animBg="1"/>
+    </p:bldLst>
+  </p:timing>
 </p:sld>
 </file>
 

</xml_diff>

<commit_message>
Add slides on motivating job arrays
</commit_message>
<xml_diff>
--- a/workflow_for_HPC.pptx
+++ b/workflow_for_HPC.pptx
@@ -5,7 +5,7 @@
     <p:sldMasterId id="2147483648" r:id="rId1"/>
   </p:sldMasterIdLst>
   <p:notesMasterIdLst>
-    <p:notesMasterId r:id="rId26"/>
+    <p:notesMasterId r:id="rId29"/>
   </p:notesMasterIdLst>
   <p:sldIdLst>
     <p:sldId id="257" r:id="rId2"/>
@@ -32,6 +32,9 @@
     <p:sldId id="375" r:id="rId23"/>
     <p:sldId id="376" r:id="rId24"/>
     <p:sldId id="377" r:id="rId25"/>
+    <p:sldId id="378" r:id="rId26"/>
+    <p:sldId id="379" r:id="rId27"/>
+    <p:sldId id="380" r:id="rId28"/>
   </p:sldIdLst>
   <p:sldSz cx="12192000" cy="6858000"/>
   <p:notesSz cx="6858000" cy="9144000"/>
@@ -15139,6 +15142,1778 @@
 </p:sld>
 </file>
 
+<file path=ppt/slides/slide25.xml><?xml version="1.0" encoding="utf-8"?>
+<p:sld xmlns:a="http://schemas.openxmlformats.org/drawingml/2006/main" xmlns:r="http://schemas.openxmlformats.org/officeDocument/2006/relationships" xmlns:p="http://schemas.openxmlformats.org/presentationml/2006/main">
+  <p:cSld>
+    <p:spTree>
+      <p:nvGrpSpPr>
+        <p:cNvPr id="1" name=""/>
+        <p:cNvGrpSpPr/>
+        <p:nvPr/>
+      </p:nvGrpSpPr>
+      <p:grpSpPr>
+        <a:xfrm>
+          <a:off x="0" y="0"/>
+          <a:ext cx="0" cy="0"/>
+          <a:chOff x="0" y="0"/>
+          <a:chExt cx="0" cy="0"/>
+        </a:xfrm>
+      </p:grpSpPr>
+      <p:sp>
+        <p:nvSpPr>
+          <p:cNvPr id="2" name="Title 1">
+            <a:extLst>
+              <a:ext uri="{FF2B5EF4-FFF2-40B4-BE49-F238E27FC236}">
+                <a16:creationId xmlns:a16="http://schemas.microsoft.com/office/drawing/2014/main" id="{F4A89363-77FB-FD82-EFE9-A622480C3472}"/>
+              </a:ext>
+            </a:extLst>
+          </p:cNvPr>
+          <p:cNvSpPr>
+            <a:spLocks noGrp="1"/>
+          </p:cNvSpPr>
+          <p:nvPr>
+            <p:ph type="title"/>
+          </p:nvPr>
+        </p:nvSpPr>
+        <p:spPr/>
+        <p:txBody>
+          <a:bodyPr/>
+          <a:lstStyle/>
+          <a:p>
+            <a:r>
+              <a:rPr lang="en-US" dirty="0"/>
+              <a:t>Job arrays</a:t>
+            </a:r>
+            <a:endParaRPr lang="LID4096" dirty="0"/>
+          </a:p>
+        </p:txBody>
+      </p:sp>
+      <p:sp>
+        <p:nvSpPr>
+          <p:cNvPr id="3" name="Text Placeholder 2">
+            <a:extLst>
+              <a:ext uri="{FF2B5EF4-FFF2-40B4-BE49-F238E27FC236}">
+                <a16:creationId xmlns:a16="http://schemas.microsoft.com/office/drawing/2014/main" id="{9C64F334-7FAE-AD23-4F52-5DFD884CAF8F}"/>
+              </a:ext>
+            </a:extLst>
+          </p:cNvPr>
+          <p:cNvSpPr>
+            <a:spLocks noGrp="1"/>
+          </p:cNvSpPr>
+          <p:nvPr>
+            <p:ph type="body" idx="1"/>
+          </p:nvPr>
+        </p:nvSpPr>
+        <p:spPr/>
+        <p:txBody>
+          <a:bodyPr/>
+          <a:lstStyle/>
+          <a:p>
+            <a:endParaRPr lang="LID4096"/>
+          </a:p>
+        </p:txBody>
+      </p:sp>
+      <p:sp>
+        <p:nvSpPr>
+          <p:cNvPr id="4" name="Slide Number Placeholder 3">
+            <a:extLst>
+              <a:ext uri="{FF2B5EF4-FFF2-40B4-BE49-F238E27FC236}">
+                <a16:creationId xmlns:a16="http://schemas.microsoft.com/office/drawing/2014/main" id="{7BD1240D-5294-6108-4BCE-67957BE2F115}"/>
+              </a:ext>
+            </a:extLst>
+          </p:cNvPr>
+          <p:cNvSpPr>
+            <a:spLocks noGrp="1"/>
+          </p:cNvSpPr>
+          <p:nvPr>
+            <p:ph type="sldNum" sz="quarter" idx="12"/>
+          </p:nvPr>
+        </p:nvSpPr>
+        <p:spPr/>
+        <p:txBody>
+          <a:bodyPr/>
+          <a:lstStyle/>
+          <a:p>
+            <a:fld id="{9C7CE217-4467-4B8D-A735-B008FA7C4816}" type="slidenum">
+              <a:rPr lang="LID4096" smtClean="0"/>
+              <a:t>25</a:t>
+            </a:fld>
+            <a:endParaRPr lang="LID4096"/>
+          </a:p>
+        </p:txBody>
+      </p:sp>
+    </p:spTree>
+    <p:extLst>
+      <p:ext uri="{BB962C8B-B14F-4D97-AF65-F5344CB8AC3E}">
+        <p14:creationId xmlns:p14="http://schemas.microsoft.com/office/powerpoint/2010/main" val="2526814874"/>
+      </p:ext>
+    </p:extLst>
+  </p:cSld>
+  <p:clrMapOvr>
+    <a:masterClrMapping/>
+  </p:clrMapOvr>
+</p:sld>
+</file>
+
+<file path=ppt/slides/slide26.xml><?xml version="1.0" encoding="utf-8"?>
+<p:sld xmlns:a="http://schemas.openxmlformats.org/drawingml/2006/main" xmlns:r="http://schemas.openxmlformats.org/officeDocument/2006/relationships" xmlns:p="http://schemas.openxmlformats.org/presentationml/2006/main">
+  <p:cSld>
+    <p:spTree>
+      <p:nvGrpSpPr>
+        <p:cNvPr id="1" name="">
+          <a:extLst>
+            <a:ext uri="{FF2B5EF4-FFF2-40B4-BE49-F238E27FC236}">
+              <a16:creationId xmlns:a16="http://schemas.microsoft.com/office/drawing/2014/main" id="{B945BE48-A336-E880-BB69-2257B9CC5D84}"/>
+            </a:ext>
+          </a:extLst>
+        </p:cNvPr>
+        <p:cNvGrpSpPr/>
+        <p:nvPr/>
+      </p:nvGrpSpPr>
+      <p:grpSpPr>
+        <a:xfrm>
+          <a:off x="0" y="0"/>
+          <a:ext cx="0" cy="0"/>
+          <a:chOff x="0" y="0"/>
+          <a:chExt cx="0" cy="0"/>
+        </a:xfrm>
+      </p:grpSpPr>
+      <p:sp>
+        <p:nvSpPr>
+          <p:cNvPr id="2" name="Title 1">
+            <a:extLst>
+              <a:ext uri="{FF2B5EF4-FFF2-40B4-BE49-F238E27FC236}">
+                <a16:creationId xmlns:a16="http://schemas.microsoft.com/office/drawing/2014/main" id="{2F6F9F71-39AC-FDE0-B670-AF8157AEB99F}"/>
+              </a:ext>
+            </a:extLst>
+          </p:cNvPr>
+          <p:cNvSpPr>
+            <a:spLocks noGrp="1"/>
+          </p:cNvSpPr>
+          <p:nvPr>
+            <p:ph type="title"/>
+          </p:nvPr>
+        </p:nvSpPr>
+        <p:spPr/>
+        <p:txBody>
+          <a:bodyPr/>
+          <a:lstStyle/>
+          <a:p>
+            <a:r>
+              <a:rPr lang="en-US" dirty="0"/>
+              <a:t>Motivation</a:t>
+            </a:r>
+            <a:endParaRPr lang="LID4096" dirty="0"/>
+          </a:p>
+        </p:txBody>
+      </p:sp>
+      <p:sp>
+        <p:nvSpPr>
+          <p:cNvPr id="3" name="Content Placeholder 2">
+            <a:extLst>
+              <a:ext uri="{FF2B5EF4-FFF2-40B4-BE49-F238E27FC236}">
+                <a16:creationId xmlns:a16="http://schemas.microsoft.com/office/drawing/2014/main" id="{33D94890-8FB1-3E30-91E3-D98E06EF0D8E}"/>
+              </a:ext>
+            </a:extLst>
+          </p:cNvPr>
+          <p:cNvSpPr>
+            <a:spLocks noGrp="1"/>
+          </p:cNvSpPr>
+          <p:nvPr>
+            <p:ph idx="1"/>
+          </p:nvPr>
+        </p:nvSpPr>
+        <p:spPr/>
+        <p:txBody>
+          <a:bodyPr>
+            <a:normAutofit/>
+          </a:bodyPr>
+          <a:lstStyle/>
+          <a:p>
+            <a:r>
+              <a:rPr lang="en-US" dirty="0"/>
+              <a:t>Characteristics</a:t>
+            </a:r>
+          </a:p>
+          <a:p>
+            <a:pPr lvl="1"/>
+            <a:r>
+              <a:rPr lang="en-US" dirty="0"/>
+              <a:t>Non-interactive</a:t>
+            </a:r>
+          </a:p>
+          <a:p>
+            <a:pPr lvl="1"/>
+            <a:r>
+              <a:rPr lang="en-US" dirty="0"/>
+              <a:t>Execute many independent, similar tasks</a:t>
+            </a:r>
+          </a:p>
+          <a:p>
+            <a:pPr lvl="1"/>
+            <a:r>
+              <a:rPr lang="en-US" dirty="0"/>
+              <a:t>Potential inefficient resource usage</a:t>
+            </a:r>
+          </a:p>
+          <a:p>
+            <a:r>
+              <a:rPr lang="en-US" dirty="0"/>
+              <a:t>Use cases</a:t>
+            </a:r>
+          </a:p>
+          <a:p>
+            <a:pPr lvl="1"/>
+            <a:r>
+              <a:rPr lang="en-US" dirty="0"/>
+              <a:t>Parameter exploration</a:t>
+            </a:r>
+          </a:p>
+          <a:p>
+            <a:pPr lvl="1"/>
+            <a:r>
+              <a:rPr lang="en-US" dirty="0"/>
+              <a:t>Processing many files</a:t>
+            </a:r>
+          </a:p>
+        </p:txBody>
+      </p:sp>
+      <p:sp>
+        <p:nvSpPr>
+          <p:cNvPr id="4" name="Slide Number Placeholder 3">
+            <a:extLst>
+              <a:ext uri="{FF2B5EF4-FFF2-40B4-BE49-F238E27FC236}">
+                <a16:creationId xmlns:a16="http://schemas.microsoft.com/office/drawing/2014/main" id="{148D0D39-5864-A475-D465-A7856BB2D0D4}"/>
+              </a:ext>
+            </a:extLst>
+          </p:cNvPr>
+          <p:cNvSpPr>
+            <a:spLocks noGrp="1"/>
+          </p:cNvSpPr>
+          <p:nvPr>
+            <p:ph type="sldNum" sz="quarter" idx="12"/>
+          </p:nvPr>
+        </p:nvSpPr>
+        <p:spPr/>
+        <p:txBody>
+          <a:bodyPr/>
+          <a:lstStyle/>
+          <a:p>
+            <a:fld id="{9C7CE217-4467-4B8D-A735-B008FA7C4816}" type="slidenum">
+              <a:rPr lang="LID4096" smtClean="0"/>
+              <a:t>26</a:t>
+            </a:fld>
+            <a:endParaRPr lang="LID4096"/>
+          </a:p>
+        </p:txBody>
+      </p:sp>
+    </p:spTree>
+    <p:extLst>
+      <p:ext uri="{BB962C8B-B14F-4D97-AF65-F5344CB8AC3E}">
+        <p14:creationId xmlns:p14="http://schemas.microsoft.com/office/powerpoint/2010/main" val="3420340981"/>
+      </p:ext>
+    </p:extLst>
+  </p:cSld>
+  <p:clrMapOvr>
+    <a:masterClrMapping/>
+  </p:clrMapOvr>
+</p:sld>
+</file>
+
+<file path=ppt/slides/slide27.xml><?xml version="1.0" encoding="utf-8"?>
+<p:sld xmlns:a="http://schemas.openxmlformats.org/drawingml/2006/main" xmlns:r="http://schemas.openxmlformats.org/officeDocument/2006/relationships" xmlns:p="http://schemas.openxmlformats.org/presentationml/2006/main">
+  <p:cSld>
+    <p:spTree>
+      <p:nvGrpSpPr>
+        <p:cNvPr id="1" name=""/>
+        <p:cNvGrpSpPr/>
+        <p:nvPr/>
+      </p:nvGrpSpPr>
+      <p:grpSpPr>
+        <a:xfrm>
+          <a:off x="0" y="0"/>
+          <a:ext cx="0" cy="0"/>
+          <a:chOff x="0" y="0"/>
+          <a:chExt cx="0" cy="0"/>
+        </a:xfrm>
+      </p:grpSpPr>
+      <p:sp>
+        <p:nvSpPr>
+          <p:cNvPr id="2" name="Title 1">
+            <a:extLst>
+              <a:ext uri="{FF2B5EF4-FFF2-40B4-BE49-F238E27FC236}">
+                <a16:creationId xmlns:a16="http://schemas.microsoft.com/office/drawing/2014/main" id="{276659BE-82E9-A1CF-4388-AD54CFB20B45}"/>
+              </a:ext>
+            </a:extLst>
+          </p:cNvPr>
+          <p:cNvSpPr>
+            <a:spLocks noGrp="1"/>
+          </p:cNvSpPr>
+          <p:nvPr>
+            <p:ph type="title"/>
+          </p:nvPr>
+        </p:nvSpPr>
+        <p:spPr/>
+        <p:txBody>
+          <a:bodyPr/>
+          <a:lstStyle/>
+          <a:p>
+            <a:r>
+              <a:rPr lang="en-US" dirty="0"/>
+              <a:t>Problem example</a:t>
+            </a:r>
+            <a:endParaRPr lang="LID4096" dirty="0"/>
+          </a:p>
+        </p:txBody>
+      </p:sp>
+      <p:sp>
+        <p:nvSpPr>
+          <p:cNvPr id="3" name="Slide Number Placeholder 2">
+            <a:extLst>
+              <a:ext uri="{FF2B5EF4-FFF2-40B4-BE49-F238E27FC236}">
+                <a16:creationId xmlns:a16="http://schemas.microsoft.com/office/drawing/2014/main" id="{5F4EB138-E3F9-4537-3237-7191E32C09EF}"/>
+              </a:ext>
+            </a:extLst>
+          </p:cNvPr>
+          <p:cNvSpPr>
+            <a:spLocks noGrp="1"/>
+          </p:cNvSpPr>
+          <p:nvPr>
+            <p:ph type="sldNum" sz="quarter" idx="12"/>
+          </p:nvPr>
+        </p:nvSpPr>
+        <p:spPr/>
+        <p:txBody>
+          <a:bodyPr/>
+          <a:lstStyle/>
+          <a:p>
+            <a:fld id="{9C7CE217-4467-4B8D-A735-B008FA7C4816}" type="slidenum">
+              <a:rPr lang="LID4096" smtClean="0"/>
+              <a:t>27</a:t>
+            </a:fld>
+            <a:endParaRPr lang="LID4096"/>
+          </a:p>
+        </p:txBody>
+      </p:sp>
+      <p:grpSp>
+        <p:nvGrpSpPr>
+          <p:cNvPr id="24" name="Group 23">
+            <a:extLst>
+              <a:ext uri="{FF2B5EF4-FFF2-40B4-BE49-F238E27FC236}">
+                <a16:creationId xmlns:a16="http://schemas.microsoft.com/office/drawing/2014/main" id="{D028674E-918C-A7E9-DC17-67EBEB5067B6}"/>
+              </a:ext>
+            </a:extLst>
+          </p:cNvPr>
+          <p:cNvGrpSpPr/>
+          <p:nvPr/>
+        </p:nvGrpSpPr>
+        <p:grpSpPr>
+          <a:xfrm>
+            <a:off x="529580" y="1690688"/>
+            <a:ext cx="3248028" cy="3060148"/>
+            <a:chOff x="1335125" y="1523997"/>
+            <a:chExt cx="3248028" cy="3060148"/>
+          </a:xfrm>
+        </p:grpSpPr>
+        <p:grpSp>
+          <p:nvGrpSpPr>
+            <p:cNvPr id="17" name="Group 16">
+              <a:extLst>
+                <a:ext uri="{FF2B5EF4-FFF2-40B4-BE49-F238E27FC236}">
+                  <a16:creationId xmlns:a16="http://schemas.microsoft.com/office/drawing/2014/main" id="{EA30483D-9CBD-A722-6B34-1D4089238ADA}"/>
+                </a:ext>
+              </a:extLst>
+            </p:cNvPr>
+            <p:cNvGrpSpPr/>
+            <p:nvPr/>
+          </p:nvGrpSpPr>
+          <p:grpSpPr>
+            <a:xfrm>
+              <a:off x="1897647" y="2954689"/>
+              <a:ext cx="1495153" cy="1197431"/>
+              <a:chOff x="2340424" y="1545770"/>
+              <a:chExt cx="1495153" cy="1197431"/>
+            </a:xfrm>
+          </p:grpSpPr>
+          <p:sp>
+            <p:nvSpPr>
+              <p:cNvPr id="18" name="Rectangle: Folded Corner 17">
+                <a:extLst>
+                  <a:ext uri="{FF2B5EF4-FFF2-40B4-BE49-F238E27FC236}">
+                    <a16:creationId xmlns:a16="http://schemas.microsoft.com/office/drawing/2014/main" id="{9EC0092C-B5D4-66B1-858B-1E618B46141A}"/>
+                  </a:ext>
+                </a:extLst>
+              </p:cNvPr>
+              <p:cNvSpPr/>
+              <p:nvPr/>
+            </p:nvSpPr>
+            <p:spPr>
+              <a:xfrm>
+                <a:off x="2804972" y="1948544"/>
+                <a:ext cx="566057" cy="794657"/>
+              </a:xfrm>
+              <a:prstGeom prst="foldedCorner">
+                <a:avLst/>
+              </a:prstGeom>
+              <a:solidFill>
+                <a:schemeClr val="bg1"/>
+              </a:solidFill>
+            </p:spPr>
+            <p:style>
+              <a:lnRef idx="2">
+                <a:schemeClr val="accent1">
+                  <a:shade val="15000"/>
+                </a:schemeClr>
+              </a:lnRef>
+              <a:fillRef idx="1">
+                <a:schemeClr val="accent1"/>
+              </a:fillRef>
+              <a:effectRef idx="0">
+                <a:schemeClr val="accent1"/>
+              </a:effectRef>
+              <a:fontRef idx="minor">
+                <a:schemeClr val="lt1"/>
+              </a:fontRef>
+            </p:style>
+            <p:txBody>
+              <a:bodyPr rtlCol="0" anchor="ctr"/>
+              <a:lstStyle/>
+              <a:p>
+                <a:pPr algn="ctr"/>
+                <a:endParaRPr lang="LID4096"/>
+              </a:p>
+            </p:txBody>
+          </p:sp>
+          <p:sp>
+            <p:nvSpPr>
+              <p:cNvPr id="19" name="TextBox 18">
+                <a:extLst>
+                  <a:ext uri="{FF2B5EF4-FFF2-40B4-BE49-F238E27FC236}">
+                    <a16:creationId xmlns:a16="http://schemas.microsoft.com/office/drawing/2014/main" id="{C792772B-E6FC-8058-E67B-B9FF8B1E01F9}"/>
+                  </a:ext>
+                </a:extLst>
+              </p:cNvPr>
+              <p:cNvSpPr txBox="1"/>
+              <p:nvPr/>
+            </p:nvSpPr>
+            <p:spPr>
+              <a:xfrm>
+                <a:off x="2340424" y="1545770"/>
+                <a:ext cx="1495153" cy="369332"/>
+              </a:xfrm>
+              <a:prstGeom prst="rect">
+                <a:avLst/>
+              </a:prstGeom>
+              <a:solidFill>
+                <a:schemeClr val="bg1"/>
+              </a:solidFill>
+            </p:spPr>
+            <p:txBody>
+              <a:bodyPr wrap="none" rtlCol="0">
+                <a:spAutoFit/>
+              </a:bodyPr>
+              <a:lstStyle/>
+              <a:p>
+                <a:r>
+                  <a:rPr lang="en-US" dirty="0"/>
+                  <a:t>data_199.dat</a:t>
+                </a:r>
+                <a:endParaRPr lang="LID4096" dirty="0"/>
+              </a:p>
+            </p:txBody>
+          </p:sp>
+        </p:grpSp>
+        <p:grpSp>
+          <p:nvGrpSpPr>
+            <p:cNvPr id="11" name="Group 10">
+              <a:extLst>
+                <a:ext uri="{FF2B5EF4-FFF2-40B4-BE49-F238E27FC236}">
+                  <a16:creationId xmlns:a16="http://schemas.microsoft.com/office/drawing/2014/main" id="{9B84FDAA-554F-A9A9-E0B1-C5685202C414}"/>
+                </a:ext>
+              </a:extLst>
+            </p:cNvPr>
+            <p:cNvGrpSpPr/>
+            <p:nvPr/>
+          </p:nvGrpSpPr>
+          <p:grpSpPr>
+            <a:xfrm>
+              <a:off x="2725098" y="1523997"/>
+              <a:ext cx="1495153" cy="1197431"/>
+              <a:chOff x="2340424" y="1545770"/>
+              <a:chExt cx="1495153" cy="1197431"/>
+            </a:xfrm>
+          </p:grpSpPr>
+          <p:sp>
+            <p:nvSpPr>
+              <p:cNvPr id="12" name="Rectangle: Folded Corner 11">
+                <a:extLst>
+                  <a:ext uri="{FF2B5EF4-FFF2-40B4-BE49-F238E27FC236}">
+                    <a16:creationId xmlns:a16="http://schemas.microsoft.com/office/drawing/2014/main" id="{CF9EF4DA-8787-3D74-DE71-8EC83BC2C250}"/>
+                  </a:ext>
+                </a:extLst>
+              </p:cNvPr>
+              <p:cNvSpPr/>
+              <p:nvPr/>
+            </p:nvSpPr>
+            <p:spPr>
+              <a:xfrm>
+                <a:off x="2804972" y="1948544"/>
+                <a:ext cx="566057" cy="794657"/>
+              </a:xfrm>
+              <a:prstGeom prst="foldedCorner">
+                <a:avLst/>
+              </a:prstGeom>
+              <a:solidFill>
+                <a:schemeClr val="bg1"/>
+              </a:solidFill>
+            </p:spPr>
+            <p:style>
+              <a:lnRef idx="2">
+                <a:schemeClr val="accent1">
+                  <a:shade val="15000"/>
+                </a:schemeClr>
+              </a:lnRef>
+              <a:fillRef idx="1">
+                <a:schemeClr val="accent1"/>
+              </a:fillRef>
+              <a:effectRef idx="0">
+                <a:schemeClr val="accent1"/>
+              </a:effectRef>
+              <a:fontRef idx="minor">
+                <a:schemeClr val="lt1"/>
+              </a:fontRef>
+            </p:style>
+            <p:txBody>
+              <a:bodyPr rtlCol="0" anchor="ctr"/>
+              <a:lstStyle/>
+              <a:p>
+                <a:pPr algn="ctr"/>
+                <a:endParaRPr lang="LID4096"/>
+              </a:p>
+            </p:txBody>
+          </p:sp>
+          <p:sp>
+            <p:nvSpPr>
+              <p:cNvPr id="13" name="TextBox 12">
+                <a:extLst>
+                  <a:ext uri="{FF2B5EF4-FFF2-40B4-BE49-F238E27FC236}">
+                    <a16:creationId xmlns:a16="http://schemas.microsoft.com/office/drawing/2014/main" id="{C6DB1F4A-242B-CDE3-DCC2-06F3690AEFC3}"/>
+                  </a:ext>
+                </a:extLst>
+              </p:cNvPr>
+              <p:cNvSpPr txBox="1"/>
+              <p:nvPr/>
+            </p:nvSpPr>
+            <p:spPr>
+              <a:xfrm>
+                <a:off x="2340424" y="1545770"/>
+                <a:ext cx="1495153" cy="369332"/>
+              </a:xfrm>
+              <a:prstGeom prst="rect">
+                <a:avLst/>
+              </a:prstGeom>
+              <a:solidFill>
+                <a:schemeClr val="bg1"/>
+              </a:solidFill>
+            </p:spPr>
+            <p:txBody>
+              <a:bodyPr wrap="none" rtlCol="0">
+                <a:spAutoFit/>
+              </a:bodyPr>
+              <a:lstStyle/>
+              <a:p>
+                <a:r>
+                  <a:rPr lang="en-US" dirty="0"/>
+                  <a:t>data_002.dat</a:t>
+                </a:r>
+                <a:endParaRPr lang="LID4096" dirty="0"/>
+              </a:p>
+            </p:txBody>
+          </p:sp>
+        </p:grpSp>
+        <p:grpSp>
+          <p:nvGrpSpPr>
+            <p:cNvPr id="8" name="Group 7">
+              <a:extLst>
+                <a:ext uri="{FF2B5EF4-FFF2-40B4-BE49-F238E27FC236}">
+                  <a16:creationId xmlns:a16="http://schemas.microsoft.com/office/drawing/2014/main" id="{1EF7EEC3-BF08-FC03-B72A-A8E1DE848E54}"/>
+                </a:ext>
+              </a:extLst>
+            </p:cNvPr>
+            <p:cNvGrpSpPr/>
+            <p:nvPr/>
+          </p:nvGrpSpPr>
+          <p:grpSpPr>
+            <a:xfrm>
+              <a:off x="3088000" y="2122713"/>
+              <a:ext cx="1495153" cy="1197431"/>
+              <a:chOff x="2340424" y="1545770"/>
+              <a:chExt cx="1495153" cy="1197431"/>
+            </a:xfrm>
+          </p:grpSpPr>
+          <p:sp>
+            <p:nvSpPr>
+              <p:cNvPr id="9" name="Rectangle: Folded Corner 8">
+                <a:extLst>
+                  <a:ext uri="{FF2B5EF4-FFF2-40B4-BE49-F238E27FC236}">
+                    <a16:creationId xmlns:a16="http://schemas.microsoft.com/office/drawing/2014/main" id="{80D2F76B-4F04-C7D6-9337-1AD428871C7A}"/>
+                  </a:ext>
+                </a:extLst>
+              </p:cNvPr>
+              <p:cNvSpPr/>
+              <p:nvPr/>
+            </p:nvSpPr>
+            <p:spPr>
+              <a:xfrm>
+                <a:off x="2804972" y="1948544"/>
+                <a:ext cx="566057" cy="794657"/>
+              </a:xfrm>
+              <a:prstGeom prst="foldedCorner">
+                <a:avLst/>
+              </a:prstGeom>
+              <a:solidFill>
+                <a:schemeClr val="bg1"/>
+              </a:solidFill>
+            </p:spPr>
+            <p:style>
+              <a:lnRef idx="2">
+                <a:schemeClr val="accent1">
+                  <a:shade val="15000"/>
+                </a:schemeClr>
+              </a:lnRef>
+              <a:fillRef idx="1">
+                <a:schemeClr val="accent1"/>
+              </a:fillRef>
+              <a:effectRef idx="0">
+                <a:schemeClr val="accent1"/>
+              </a:effectRef>
+              <a:fontRef idx="minor">
+                <a:schemeClr val="lt1"/>
+              </a:fontRef>
+            </p:style>
+            <p:txBody>
+              <a:bodyPr rtlCol="0" anchor="ctr"/>
+              <a:lstStyle/>
+              <a:p>
+                <a:pPr algn="ctr"/>
+                <a:endParaRPr lang="LID4096"/>
+              </a:p>
+            </p:txBody>
+          </p:sp>
+          <p:sp>
+            <p:nvSpPr>
+              <p:cNvPr id="10" name="TextBox 9">
+                <a:extLst>
+                  <a:ext uri="{FF2B5EF4-FFF2-40B4-BE49-F238E27FC236}">
+                    <a16:creationId xmlns:a16="http://schemas.microsoft.com/office/drawing/2014/main" id="{28473A4E-4410-11F9-817F-480305A3901A}"/>
+                  </a:ext>
+                </a:extLst>
+              </p:cNvPr>
+              <p:cNvSpPr txBox="1"/>
+              <p:nvPr/>
+            </p:nvSpPr>
+            <p:spPr>
+              <a:xfrm>
+                <a:off x="2340424" y="1545770"/>
+                <a:ext cx="1495153" cy="369332"/>
+              </a:xfrm>
+              <a:prstGeom prst="rect">
+                <a:avLst/>
+              </a:prstGeom>
+              <a:solidFill>
+                <a:schemeClr val="bg1"/>
+              </a:solidFill>
+            </p:spPr>
+            <p:txBody>
+              <a:bodyPr wrap="none" rtlCol="0">
+                <a:spAutoFit/>
+              </a:bodyPr>
+              <a:lstStyle/>
+              <a:p>
+                <a:r>
+                  <a:rPr lang="en-US" dirty="0"/>
+                  <a:t>data_003.dat</a:t>
+                </a:r>
+                <a:endParaRPr lang="LID4096" dirty="0"/>
+              </a:p>
+            </p:txBody>
+          </p:sp>
+        </p:grpSp>
+        <p:grpSp>
+          <p:nvGrpSpPr>
+            <p:cNvPr id="14" name="Group 13">
+              <a:extLst>
+                <a:ext uri="{FF2B5EF4-FFF2-40B4-BE49-F238E27FC236}">
+                  <a16:creationId xmlns:a16="http://schemas.microsoft.com/office/drawing/2014/main" id="{7619E6F0-BC3B-E975-805E-A1C8D039772A}"/>
+                </a:ext>
+              </a:extLst>
+            </p:cNvPr>
+            <p:cNvGrpSpPr/>
+            <p:nvPr/>
+          </p:nvGrpSpPr>
+          <p:grpSpPr>
+            <a:xfrm>
+              <a:off x="2645223" y="3386714"/>
+              <a:ext cx="1495153" cy="1197431"/>
+              <a:chOff x="2340424" y="1545770"/>
+              <a:chExt cx="1495153" cy="1197431"/>
+            </a:xfrm>
+          </p:grpSpPr>
+          <p:sp>
+            <p:nvSpPr>
+              <p:cNvPr id="15" name="Rectangle: Folded Corner 14">
+                <a:extLst>
+                  <a:ext uri="{FF2B5EF4-FFF2-40B4-BE49-F238E27FC236}">
+                    <a16:creationId xmlns:a16="http://schemas.microsoft.com/office/drawing/2014/main" id="{7A11E51A-4160-3647-9F8A-AF8AC376F1E4}"/>
+                  </a:ext>
+                </a:extLst>
+              </p:cNvPr>
+              <p:cNvSpPr/>
+              <p:nvPr/>
+            </p:nvSpPr>
+            <p:spPr>
+              <a:xfrm>
+                <a:off x="2804972" y="1948544"/>
+                <a:ext cx="566057" cy="794657"/>
+              </a:xfrm>
+              <a:prstGeom prst="foldedCorner">
+                <a:avLst/>
+              </a:prstGeom>
+              <a:solidFill>
+                <a:schemeClr val="bg1"/>
+              </a:solidFill>
+            </p:spPr>
+            <p:style>
+              <a:lnRef idx="2">
+                <a:schemeClr val="accent1">
+                  <a:shade val="15000"/>
+                </a:schemeClr>
+              </a:lnRef>
+              <a:fillRef idx="1">
+                <a:schemeClr val="accent1"/>
+              </a:fillRef>
+              <a:effectRef idx="0">
+                <a:schemeClr val="accent1"/>
+              </a:effectRef>
+              <a:fontRef idx="minor">
+                <a:schemeClr val="lt1"/>
+              </a:fontRef>
+            </p:style>
+            <p:txBody>
+              <a:bodyPr rtlCol="0" anchor="ctr"/>
+              <a:lstStyle/>
+              <a:p>
+                <a:pPr algn="ctr"/>
+                <a:endParaRPr lang="LID4096"/>
+              </a:p>
+            </p:txBody>
+          </p:sp>
+          <p:sp>
+            <p:nvSpPr>
+              <p:cNvPr id="16" name="TextBox 15">
+                <a:extLst>
+                  <a:ext uri="{FF2B5EF4-FFF2-40B4-BE49-F238E27FC236}">
+                    <a16:creationId xmlns:a16="http://schemas.microsoft.com/office/drawing/2014/main" id="{B027AA5E-E940-D27F-7A57-367C27F8647F}"/>
+                  </a:ext>
+                </a:extLst>
+              </p:cNvPr>
+              <p:cNvSpPr txBox="1"/>
+              <p:nvPr/>
+            </p:nvSpPr>
+            <p:spPr>
+              <a:xfrm>
+                <a:off x="2340424" y="1545770"/>
+                <a:ext cx="1495153" cy="369332"/>
+              </a:xfrm>
+              <a:prstGeom prst="rect">
+                <a:avLst/>
+              </a:prstGeom>
+              <a:solidFill>
+                <a:schemeClr val="bg1"/>
+              </a:solidFill>
+            </p:spPr>
+            <p:txBody>
+              <a:bodyPr wrap="none" rtlCol="0">
+                <a:spAutoFit/>
+              </a:bodyPr>
+              <a:lstStyle/>
+              <a:p>
+                <a:r>
+                  <a:rPr lang="en-US" dirty="0"/>
+                  <a:t>data_200.dat</a:t>
+                </a:r>
+                <a:endParaRPr lang="LID4096" dirty="0"/>
+              </a:p>
+            </p:txBody>
+          </p:sp>
+        </p:grpSp>
+        <p:grpSp>
+          <p:nvGrpSpPr>
+            <p:cNvPr id="20" name="Group 19">
+              <a:extLst>
+                <a:ext uri="{FF2B5EF4-FFF2-40B4-BE49-F238E27FC236}">
+                  <a16:creationId xmlns:a16="http://schemas.microsoft.com/office/drawing/2014/main" id="{7D9E386C-FE70-310F-431A-DD6D4F76F1A9}"/>
+                </a:ext>
+              </a:extLst>
+            </p:cNvPr>
+            <p:cNvGrpSpPr/>
+            <p:nvPr/>
+          </p:nvGrpSpPr>
+          <p:grpSpPr>
+            <a:xfrm>
+              <a:off x="1335125" y="1708663"/>
+              <a:ext cx="1495153" cy="1197431"/>
+              <a:chOff x="2340424" y="1545770"/>
+              <a:chExt cx="1495153" cy="1197431"/>
+            </a:xfrm>
+          </p:grpSpPr>
+          <p:sp>
+            <p:nvSpPr>
+              <p:cNvPr id="21" name="Rectangle: Folded Corner 20">
+                <a:extLst>
+                  <a:ext uri="{FF2B5EF4-FFF2-40B4-BE49-F238E27FC236}">
+                    <a16:creationId xmlns:a16="http://schemas.microsoft.com/office/drawing/2014/main" id="{CF4FDBCE-B19E-1A58-682E-22B8833F81B3}"/>
+                  </a:ext>
+                </a:extLst>
+              </p:cNvPr>
+              <p:cNvSpPr/>
+              <p:nvPr/>
+            </p:nvSpPr>
+            <p:spPr>
+              <a:xfrm>
+                <a:off x="2804972" y="1948544"/>
+                <a:ext cx="566057" cy="794657"/>
+              </a:xfrm>
+              <a:prstGeom prst="foldedCorner">
+                <a:avLst/>
+              </a:prstGeom>
+              <a:solidFill>
+                <a:schemeClr val="bg1"/>
+              </a:solidFill>
+            </p:spPr>
+            <p:style>
+              <a:lnRef idx="2">
+                <a:schemeClr val="accent1">
+                  <a:shade val="15000"/>
+                </a:schemeClr>
+              </a:lnRef>
+              <a:fillRef idx="1">
+                <a:schemeClr val="accent1"/>
+              </a:fillRef>
+              <a:effectRef idx="0">
+                <a:schemeClr val="accent1"/>
+              </a:effectRef>
+              <a:fontRef idx="minor">
+                <a:schemeClr val="lt1"/>
+              </a:fontRef>
+            </p:style>
+            <p:txBody>
+              <a:bodyPr rtlCol="0" anchor="ctr"/>
+              <a:lstStyle/>
+              <a:p>
+                <a:pPr algn="ctr"/>
+                <a:endParaRPr lang="LID4096"/>
+              </a:p>
+            </p:txBody>
+          </p:sp>
+          <p:sp>
+            <p:nvSpPr>
+              <p:cNvPr id="22" name="TextBox 21">
+                <a:extLst>
+                  <a:ext uri="{FF2B5EF4-FFF2-40B4-BE49-F238E27FC236}">
+                    <a16:creationId xmlns:a16="http://schemas.microsoft.com/office/drawing/2014/main" id="{EE96F564-42CC-7B4B-EB82-F45F2874E7E4}"/>
+                  </a:ext>
+                </a:extLst>
+              </p:cNvPr>
+              <p:cNvSpPr txBox="1"/>
+              <p:nvPr/>
+            </p:nvSpPr>
+            <p:spPr>
+              <a:xfrm>
+                <a:off x="2340424" y="1545770"/>
+                <a:ext cx="1495153" cy="369332"/>
+              </a:xfrm>
+              <a:prstGeom prst="rect">
+                <a:avLst/>
+              </a:prstGeom>
+              <a:solidFill>
+                <a:schemeClr val="bg1"/>
+              </a:solidFill>
+            </p:spPr>
+            <p:txBody>
+              <a:bodyPr wrap="none" rtlCol="0">
+                <a:spAutoFit/>
+              </a:bodyPr>
+              <a:lstStyle/>
+              <a:p>
+                <a:r>
+                  <a:rPr lang="en-US" dirty="0"/>
+                  <a:t>data_001.dat</a:t>
+                </a:r>
+                <a:endParaRPr lang="LID4096" dirty="0"/>
+              </a:p>
+            </p:txBody>
+          </p:sp>
+        </p:grpSp>
+        <p:sp>
+          <p:nvSpPr>
+            <p:cNvPr id="23" name="TextBox 22">
+              <a:extLst>
+                <a:ext uri="{FF2B5EF4-FFF2-40B4-BE49-F238E27FC236}">
+                  <a16:creationId xmlns:a16="http://schemas.microsoft.com/office/drawing/2014/main" id="{FE1150C8-FD60-3009-EC88-DB6F2C3945C5}"/>
+                </a:ext>
+              </a:extLst>
+            </p:cNvPr>
+            <p:cNvSpPr txBox="1"/>
+            <p:nvPr/>
+          </p:nvSpPr>
+          <p:spPr>
+            <a:xfrm>
+              <a:off x="2631953" y="2473127"/>
+              <a:ext cx="506870" cy="523220"/>
+            </a:xfrm>
+            <a:prstGeom prst="rect">
+              <a:avLst/>
+            </a:prstGeom>
+            <a:noFill/>
+          </p:spPr>
+          <p:txBody>
+            <a:bodyPr wrap="none" rtlCol="0">
+              <a:spAutoFit/>
+            </a:bodyPr>
+            <a:lstStyle/>
+            <a:p>
+              <a:r>
+                <a:rPr lang="en-US" sz="2800" b="1" dirty="0"/>
+                <a:t>...</a:t>
+              </a:r>
+              <a:endParaRPr lang="LID4096" sz="2800" b="1" dirty="0"/>
+            </a:p>
+          </p:txBody>
+        </p:sp>
+      </p:grpSp>
+      <p:grpSp>
+        <p:nvGrpSpPr>
+          <p:cNvPr id="25" name="Group 24">
+            <a:extLst>
+              <a:ext uri="{FF2B5EF4-FFF2-40B4-BE49-F238E27FC236}">
+                <a16:creationId xmlns:a16="http://schemas.microsoft.com/office/drawing/2014/main" id="{41152C27-575A-1695-A74F-3445189C641A}"/>
+              </a:ext>
+            </a:extLst>
+          </p:cNvPr>
+          <p:cNvGrpSpPr/>
+          <p:nvPr/>
+        </p:nvGrpSpPr>
+        <p:grpSpPr>
+          <a:xfrm>
+            <a:off x="5348015" y="1690688"/>
+            <a:ext cx="3293553" cy="3060148"/>
+            <a:chOff x="1335125" y="1523997"/>
+            <a:chExt cx="3293553" cy="3060148"/>
+          </a:xfrm>
+        </p:grpSpPr>
+        <p:grpSp>
+          <p:nvGrpSpPr>
+            <p:cNvPr id="26" name="Group 25">
+              <a:extLst>
+                <a:ext uri="{FF2B5EF4-FFF2-40B4-BE49-F238E27FC236}">
+                  <a16:creationId xmlns:a16="http://schemas.microsoft.com/office/drawing/2014/main" id="{D6E226D9-E634-316C-C572-B0109637F3C0}"/>
+                </a:ext>
+              </a:extLst>
+            </p:cNvPr>
+            <p:cNvGrpSpPr/>
+            <p:nvPr/>
+          </p:nvGrpSpPr>
+          <p:grpSpPr>
+            <a:xfrm>
+              <a:off x="1897647" y="2954689"/>
+              <a:ext cx="1540678" cy="1197431"/>
+              <a:chOff x="2340424" y="1545770"/>
+              <a:chExt cx="1540678" cy="1197431"/>
+            </a:xfrm>
+          </p:grpSpPr>
+          <p:sp>
+            <p:nvSpPr>
+              <p:cNvPr id="40" name="Rectangle: Folded Corner 39">
+                <a:extLst>
+                  <a:ext uri="{FF2B5EF4-FFF2-40B4-BE49-F238E27FC236}">
+                    <a16:creationId xmlns:a16="http://schemas.microsoft.com/office/drawing/2014/main" id="{2F79C86C-26C9-ECB5-F353-207027769758}"/>
+                  </a:ext>
+                </a:extLst>
+              </p:cNvPr>
+              <p:cNvSpPr/>
+              <p:nvPr/>
+            </p:nvSpPr>
+            <p:spPr>
+              <a:xfrm>
+                <a:off x="2804972" y="1948544"/>
+                <a:ext cx="566057" cy="794657"/>
+              </a:xfrm>
+              <a:prstGeom prst="foldedCorner">
+                <a:avLst/>
+              </a:prstGeom>
+              <a:solidFill>
+                <a:schemeClr val="bg1"/>
+              </a:solidFill>
+            </p:spPr>
+            <p:style>
+              <a:lnRef idx="2">
+                <a:schemeClr val="accent1">
+                  <a:shade val="15000"/>
+                </a:schemeClr>
+              </a:lnRef>
+              <a:fillRef idx="1">
+                <a:schemeClr val="accent1"/>
+              </a:fillRef>
+              <a:effectRef idx="0">
+                <a:schemeClr val="accent1"/>
+              </a:effectRef>
+              <a:fontRef idx="minor">
+                <a:schemeClr val="lt1"/>
+              </a:fontRef>
+            </p:style>
+            <p:txBody>
+              <a:bodyPr rtlCol="0" anchor="ctr"/>
+              <a:lstStyle/>
+              <a:p>
+                <a:pPr algn="ctr"/>
+                <a:endParaRPr lang="LID4096"/>
+              </a:p>
+            </p:txBody>
+          </p:sp>
+          <p:sp>
+            <p:nvSpPr>
+              <p:cNvPr id="41" name="TextBox 40">
+                <a:extLst>
+                  <a:ext uri="{FF2B5EF4-FFF2-40B4-BE49-F238E27FC236}">
+                    <a16:creationId xmlns:a16="http://schemas.microsoft.com/office/drawing/2014/main" id="{E0018956-80D4-90AC-CD46-216456D0B384}"/>
+                  </a:ext>
+                </a:extLst>
+              </p:cNvPr>
+              <p:cNvSpPr txBox="1"/>
+              <p:nvPr/>
+            </p:nvSpPr>
+            <p:spPr>
+              <a:xfrm>
+                <a:off x="2340424" y="1545770"/>
+                <a:ext cx="1540678" cy="369332"/>
+              </a:xfrm>
+              <a:prstGeom prst="rect">
+                <a:avLst/>
+              </a:prstGeom>
+              <a:solidFill>
+                <a:schemeClr val="bg1"/>
+              </a:solidFill>
+            </p:spPr>
+            <p:txBody>
+              <a:bodyPr wrap="none" rtlCol="0">
+                <a:spAutoFit/>
+              </a:bodyPr>
+              <a:lstStyle/>
+              <a:p>
+                <a:r>
+                  <a:rPr lang="en-US" dirty="0"/>
+                  <a:t>result_199.txt</a:t>
+                </a:r>
+                <a:endParaRPr lang="LID4096" dirty="0"/>
+              </a:p>
+            </p:txBody>
+          </p:sp>
+        </p:grpSp>
+        <p:grpSp>
+          <p:nvGrpSpPr>
+            <p:cNvPr id="27" name="Group 26">
+              <a:extLst>
+                <a:ext uri="{FF2B5EF4-FFF2-40B4-BE49-F238E27FC236}">
+                  <a16:creationId xmlns:a16="http://schemas.microsoft.com/office/drawing/2014/main" id="{AB8930D6-C257-6719-F093-F9119961C07A}"/>
+                </a:ext>
+              </a:extLst>
+            </p:cNvPr>
+            <p:cNvGrpSpPr/>
+            <p:nvPr/>
+          </p:nvGrpSpPr>
+          <p:grpSpPr>
+            <a:xfrm>
+              <a:off x="2725098" y="1523997"/>
+              <a:ext cx="1540678" cy="1197431"/>
+              <a:chOff x="2340424" y="1545770"/>
+              <a:chExt cx="1540678" cy="1197431"/>
+            </a:xfrm>
+          </p:grpSpPr>
+          <p:sp>
+            <p:nvSpPr>
+              <p:cNvPr id="38" name="Rectangle: Folded Corner 37">
+                <a:extLst>
+                  <a:ext uri="{FF2B5EF4-FFF2-40B4-BE49-F238E27FC236}">
+                    <a16:creationId xmlns:a16="http://schemas.microsoft.com/office/drawing/2014/main" id="{9D2C14F8-AEA3-4038-060F-C4843935454F}"/>
+                  </a:ext>
+                </a:extLst>
+              </p:cNvPr>
+              <p:cNvSpPr/>
+              <p:nvPr/>
+            </p:nvSpPr>
+            <p:spPr>
+              <a:xfrm>
+                <a:off x="2804972" y="1948544"/>
+                <a:ext cx="566057" cy="794657"/>
+              </a:xfrm>
+              <a:prstGeom prst="foldedCorner">
+                <a:avLst/>
+              </a:prstGeom>
+              <a:solidFill>
+                <a:schemeClr val="bg1"/>
+              </a:solidFill>
+            </p:spPr>
+            <p:style>
+              <a:lnRef idx="2">
+                <a:schemeClr val="accent1">
+                  <a:shade val="15000"/>
+                </a:schemeClr>
+              </a:lnRef>
+              <a:fillRef idx="1">
+                <a:schemeClr val="accent1"/>
+              </a:fillRef>
+              <a:effectRef idx="0">
+                <a:schemeClr val="accent1"/>
+              </a:effectRef>
+              <a:fontRef idx="minor">
+                <a:schemeClr val="lt1"/>
+              </a:fontRef>
+            </p:style>
+            <p:txBody>
+              <a:bodyPr rtlCol="0" anchor="ctr"/>
+              <a:lstStyle/>
+              <a:p>
+                <a:pPr algn="ctr"/>
+                <a:endParaRPr lang="LID4096"/>
+              </a:p>
+            </p:txBody>
+          </p:sp>
+          <p:sp>
+            <p:nvSpPr>
+              <p:cNvPr id="39" name="TextBox 38">
+                <a:extLst>
+                  <a:ext uri="{FF2B5EF4-FFF2-40B4-BE49-F238E27FC236}">
+                    <a16:creationId xmlns:a16="http://schemas.microsoft.com/office/drawing/2014/main" id="{BE70D8C3-27C8-9630-1766-B513A496A530}"/>
+                  </a:ext>
+                </a:extLst>
+              </p:cNvPr>
+              <p:cNvSpPr txBox="1"/>
+              <p:nvPr/>
+            </p:nvSpPr>
+            <p:spPr>
+              <a:xfrm>
+                <a:off x="2340424" y="1545770"/>
+                <a:ext cx="1540678" cy="369332"/>
+              </a:xfrm>
+              <a:prstGeom prst="rect">
+                <a:avLst/>
+              </a:prstGeom>
+              <a:solidFill>
+                <a:schemeClr val="bg1"/>
+              </a:solidFill>
+            </p:spPr>
+            <p:txBody>
+              <a:bodyPr wrap="none" rtlCol="0">
+                <a:spAutoFit/>
+              </a:bodyPr>
+              <a:lstStyle/>
+              <a:p>
+                <a:r>
+                  <a:rPr lang="en-US" dirty="0"/>
+                  <a:t>result_002.txt</a:t>
+                </a:r>
+                <a:endParaRPr lang="LID4096" dirty="0"/>
+              </a:p>
+            </p:txBody>
+          </p:sp>
+        </p:grpSp>
+        <p:grpSp>
+          <p:nvGrpSpPr>
+            <p:cNvPr id="28" name="Group 27">
+              <a:extLst>
+                <a:ext uri="{FF2B5EF4-FFF2-40B4-BE49-F238E27FC236}">
+                  <a16:creationId xmlns:a16="http://schemas.microsoft.com/office/drawing/2014/main" id="{902CC249-90AC-56AF-5162-CFD4E4AF70DF}"/>
+                </a:ext>
+              </a:extLst>
+            </p:cNvPr>
+            <p:cNvGrpSpPr/>
+            <p:nvPr/>
+          </p:nvGrpSpPr>
+          <p:grpSpPr>
+            <a:xfrm>
+              <a:off x="3088000" y="2122713"/>
+              <a:ext cx="1540678" cy="1197431"/>
+              <a:chOff x="2340424" y="1545770"/>
+              <a:chExt cx="1540678" cy="1197431"/>
+            </a:xfrm>
+          </p:grpSpPr>
+          <p:sp>
+            <p:nvSpPr>
+              <p:cNvPr id="36" name="Rectangle: Folded Corner 35">
+                <a:extLst>
+                  <a:ext uri="{FF2B5EF4-FFF2-40B4-BE49-F238E27FC236}">
+                    <a16:creationId xmlns:a16="http://schemas.microsoft.com/office/drawing/2014/main" id="{8641EE75-CD94-06FA-3D27-F09FE7878721}"/>
+                  </a:ext>
+                </a:extLst>
+              </p:cNvPr>
+              <p:cNvSpPr/>
+              <p:nvPr/>
+            </p:nvSpPr>
+            <p:spPr>
+              <a:xfrm>
+                <a:off x="2804972" y="1948544"/>
+                <a:ext cx="566057" cy="794657"/>
+              </a:xfrm>
+              <a:prstGeom prst="foldedCorner">
+                <a:avLst/>
+              </a:prstGeom>
+              <a:solidFill>
+                <a:schemeClr val="bg1"/>
+              </a:solidFill>
+            </p:spPr>
+            <p:style>
+              <a:lnRef idx="2">
+                <a:schemeClr val="accent1">
+                  <a:shade val="15000"/>
+                </a:schemeClr>
+              </a:lnRef>
+              <a:fillRef idx="1">
+                <a:schemeClr val="accent1"/>
+              </a:fillRef>
+              <a:effectRef idx="0">
+                <a:schemeClr val="accent1"/>
+              </a:effectRef>
+              <a:fontRef idx="minor">
+                <a:schemeClr val="lt1"/>
+              </a:fontRef>
+            </p:style>
+            <p:txBody>
+              <a:bodyPr rtlCol="0" anchor="ctr"/>
+              <a:lstStyle/>
+              <a:p>
+                <a:pPr algn="ctr"/>
+                <a:endParaRPr lang="LID4096"/>
+              </a:p>
+            </p:txBody>
+          </p:sp>
+          <p:sp>
+            <p:nvSpPr>
+              <p:cNvPr id="37" name="TextBox 36">
+                <a:extLst>
+                  <a:ext uri="{FF2B5EF4-FFF2-40B4-BE49-F238E27FC236}">
+                    <a16:creationId xmlns:a16="http://schemas.microsoft.com/office/drawing/2014/main" id="{6A778D18-CA9F-61CF-0DC4-5D4363317BB2}"/>
+                  </a:ext>
+                </a:extLst>
+              </p:cNvPr>
+              <p:cNvSpPr txBox="1"/>
+              <p:nvPr/>
+            </p:nvSpPr>
+            <p:spPr>
+              <a:xfrm>
+                <a:off x="2340424" y="1545770"/>
+                <a:ext cx="1540678" cy="369332"/>
+              </a:xfrm>
+              <a:prstGeom prst="rect">
+                <a:avLst/>
+              </a:prstGeom>
+              <a:solidFill>
+                <a:schemeClr val="bg1"/>
+              </a:solidFill>
+            </p:spPr>
+            <p:txBody>
+              <a:bodyPr wrap="none" rtlCol="0">
+                <a:spAutoFit/>
+              </a:bodyPr>
+              <a:lstStyle/>
+              <a:p>
+                <a:r>
+                  <a:rPr lang="en-US" dirty="0"/>
+                  <a:t>result_003.txt</a:t>
+                </a:r>
+                <a:endParaRPr lang="LID4096" dirty="0"/>
+              </a:p>
+            </p:txBody>
+          </p:sp>
+        </p:grpSp>
+        <p:grpSp>
+          <p:nvGrpSpPr>
+            <p:cNvPr id="29" name="Group 28">
+              <a:extLst>
+                <a:ext uri="{FF2B5EF4-FFF2-40B4-BE49-F238E27FC236}">
+                  <a16:creationId xmlns:a16="http://schemas.microsoft.com/office/drawing/2014/main" id="{61A8A302-FBD8-C6C4-4A5B-1B86AF7258F1}"/>
+                </a:ext>
+              </a:extLst>
+            </p:cNvPr>
+            <p:cNvGrpSpPr/>
+            <p:nvPr/>
+          </p:nvGrpSpPr>
+          <p:grpSpPr>
+            <a:xfrm>
+              <a:off x="2645223" y="3386714"/>
+              <a:ext cx="1540678" cy="1197431"/>
+              <a:chOff x="2340424" y="1545770"/>
+              <a:chExt cx="1540678" cy="1197431"/>
+            </a:xfrm>
+          </p:grpSpPr>
+          <p:sp>
+            <p:nvSpPr>
+              <p:cNvPr id="34" name="Rectangle: Folded Corner 33">
+                <a:extLst>
+                  <a:ext uri="{FF2B5EF4-FFF2-40B4-BE49-F238E27FC236}">
+                    <a16:creationId xmlns:a16="http://schemas.microsoft.com/office/drawing/2014/main" id="{158D751A-3BFB-4FBB-BF0B-FAC0D81FEFFF}"/>
+                  </a:ext>
+                </a:extLst>
+              </p:cNvPr>
+              <p:cNvSpPr/>
+              <p:nvPr/>
+            </p:nvSpPr>
+            <p:spPr>
+              <a:xfrm>
+                <a:off x="2804972" y="1948544"/>
+                <a:ext cx="566057" cy="794657"/>
+              </a:xfrm>
+              <a:prstGeom prst="foldedCorner">
+                <a:avLst/>
+              </a:prstGeom>
+              <a:solidFill>
+                <a:schemeClr val="bg1"/>
+              </a:solidFill>
+            </p:spPr>
+            <p:style>
+              <a:lnRef idx="2">
+                <a:schemeClr val="accent1">
+                  <a:shade val="15000"/>
+                </a:schemeClr>
+              </a:lnRef>
+              <a:fillRef idx="1">
+                <a:schemeClr val="accent1"/>
+              </a:fillRef>
+              <a:effectRef idx="0">
+                <a:schemeClr val="accent1"/>
+              </a:effectRef>
+              <a:fontRef idx="minor">
+                <a:schemeClr val="lt1"/>
+              </a:fontRef>
+            </p:style>
+            <p:txBody>
+              <a:bodyPr rtlCol="0" anchor="ctr"/>
+              <a:lstStyle/>
+              <a:p>
+                <a:pPr algn="ctr"/>
+                <a:endParaRPr lang="LID4096"/>
+              </a:p>
+            </p:txBody>
+          </p:sp>
+          <p:sp>
+            <p:nvSpPr>
+              <p:cNvPr id="35" name="TextBox 34">
+                <a:extLst>
+                  <a:ext uri="{FF2B5EF4-FFF2-40B4-BE49-F238E27FC236}">
+                    <a16:creationId xmlns:a16="http://schemas.microsoft.com/office/drawing/2014/main" id="{E7863961-D354-78A0-6B6D-DCD7E1C84AA0}"/>
+                  </a:ext>
+                </a:extLst>
+              </p:cNvPr>
+              <p:cNvSpPr txBox="1"/>
+              <p:nvPr/>
+            </p:nvSpPr>
+            <p:spPr>
+              <a:xfrm>
+                <a:off x="2340424" y="1545770"/>
+                <a:ext cx="1540678" cy="369332"/>
+              </a:xfrm>
+              <a:prstGeom prst="rect">
+                <a:avLst/>
+              </a:prstGeom>
+              <a:solidFill>
+                <a:schemeClr val="bg1"/>
+              </a:solidFill>
+            </p:spPr>
+            <p:txBody>
+              <a:bodyPr wrap="none" rtlCol="0">
+                <a:spAutoFit/>
+              </a:bodyPr>
+              <a:lstStyle/>
+              <a:p>
+                <a:r>
+                  <a:rPr lang="en-US" dirty="0"/>
+                  <a:t>result_200.txt</a:t>
+                </a:r>
+                <a:endParaRPr lang="LID4096" dirty="0"/>
+              </a:p>
+            </p:txBody>
+          </p:sp>
+        </p:grpSp>
+        <p:grpSp>
+          <p:nvGrpSpPr>
+            <p:cNvPr id="30" name="Group 29">
+              <a:extLst>
+                <a:ext uri="{FF2B5EF4-FFF2-40B4-BE49-F238E27FC236}">
+                  <a16:creationId xmlns:a16="http://schemas.microsoft.com/office/drawing/2014/main" id="{F70B5CA9-1F3A-1D6D-FD60-235948A497C1}"/>
+                </a:ext>
+              </a:extLst>
+            </p:cNvPr>
+            <p:cNvGrpSpPr/>
+            <p:nvPr/>
+          </p:nvGrpSpPr>
+          <p:grpSpPr>
+            <a:xfrm>
+              <a:off x="1335125" y="1708663"/>
+              <a:ext cx="1540678" cy="1197431"/>
+              <a:chOff x="2340424" y="1545770"/>
+              <a:chExt cx="1540678" cy="1197431"/>
+            </a:xfrm>
+          </p:grpSpPr>
+          <p:sp>
+            <p:nvSpPr>
+              <p:cNvPr id="32" name="Rectangle: Folded Corner 31">
+                <a:extLst>
+                  <a:ext uri="{FF2B5EF4-FFF2-40B4-BE49-F238E27FC236}">
+                    <a16:creationId xmlns:a16="http://schemas.microsoft.com/office/drawing/2014/main" id="{536A3DE7-E2BC-1220-D597-E59F1F3EDCFC}"/>
+                  </a:ext>
+                </a:extLst>
+              </p:cNvPr>
+              <p:cNvSpPr/>
+              <p:nvPr/>
+            </p:nvSpPr>
+            <p:spPr>
+              <a:xfrm>
+                <a:off x="2804972" y="1948544"/>
+                <a:ext cx="566057" cy="794657"/>
+              </a:xfrm>
+              <a:prstGeom prst="foldedCorner">
+                <a:avLst/>
+              </a:prstGeom>
+              <a:solidFill>
+                <a:schemeClr val="bg1"/>
+              </a:solidFill>
+            </p:spPr>
+            <p:style>
+              <a:lnRef idx="2">
+                <a:schemeClr val="accent1">
+                  <a:shade val="15000"/>
+                </a:schemeClr>
+              </a:lnRef>
+              <a:fillRef idx="1">
+                <a:schemeClr val="accent1"/>
+              </a:fillRef>
+              <a:effectRef idx="0">
+                <a:schemeClr val="accent1"/>
+              </a:effectRef>
+              <a:fontRef idx="minor">
+                <a:schemeClr val="lt1"/>
+              </a:fontRef>
+            </p:style>
+            <p:txBody>
+              <a:bodyPr rtlCol="0" anchor="ctr"/>
+              <a:lstStyle/>
+              <a:p>
+                <a:pPr algn="ctr"/>
+                <a:endParaRPr lang="LID4096"/>
+              </a:p>
+            </p:txBody>
+          </p:sp>
+          <p:sp>
+            <p:nvSpPr>
+              <p:cNvPr id="33" name="TextBox 32">
+                <a:extLst>
+                  <a:ext uri="{FF2B5EF4-FFF2-40B4-BE49-F238E27FC236}">
+                    <a16:creationId xmlns:a16="http://schemas.microsoft.com/office/drawing/2014/main" id="{A902E32E-23A5-AD0F-FE22-99C69FCF03EB}"/>
+                  </a:ext>
+                </a:extLst>
+              </p:cNvPr>
+              <p:cNvSpPr txBox="1"/>
+              <p:nvPr/>
+            </p:nvSpPr>
+            <p:spPr>
+              <a:xfrm>
+                <a:off x="2340424" y="1545770"/>
+                <a:ext cx="1540678" cy="369332"/>
+              </a:xfrm>
+              <a:prstGeom prst="rect">
+                <a:avLst/>
+              </a:prstGeom>
+              <a:solidFill>
+                <a:schemeClr val="bg1"/>
+              </a:solidFill>
+            </p:spPr>
+            <p:txBody>
+              <a:bodyPr wrap="none" rtlCol="0">
+                <a:spAutoFit/>
+              </a:bodyPr>
+              <a:lstStyle/>
+              <a:p>
+                <a:r>
+                  <a:rPr lang="en-US" dirty="0"/>
+                  <a:t>result_001.txt</a:t>
+                </a:r>
+                <a:endParaRPr lang="LID4096" dirty="0"/>
+              </a:p>
+            </p:txBody>
+          </p:sp>
+        </p:grpSp>
+        <p:sp>
+          <p:nvSpPr>
+            <p:cNvPr id="31" name="TextBox 30">
+              <a:extLst>
+                <a:ext uri="{FF2B5EF4-FFF2-40B4-BE49-F238E27FC236}">
+                  <a16:creationId xmlns:a16="http://schemas.microsoft.com/office/drawing/2014/main" id="{C5AC24EA-3B36-2F9B-50AC-A302D9F314E1}"/>
+                </a:ext>
+              </a:extLst>
+            </p:cNvPr>
+            <p:cNvSpPr txBox="1"/>
+            <p:nvPr/>
+          </p:nvSpPr>
+          <p:spPr>
+            <a:xfrm>
+              <a:off x="2631953" y="2473127"/>
+              <a:ext cx="506870" cy="523220"/>
+            </a:xfrm>
+            <a:prstGeom prst="rect">
+              <a:avLst/>
+            </a:prstGeom>
+            <a:noFill/>
+          </p:spPr>
+          <p:txBody>
+            <a:bodyPr wrap="none" rtlCol="0">
+              <a:spAutoFit/>
+            </a:bodyPr>
+            <a:lstStyle/>
+            <a:p>
+              <a:r>
+                <a:rPr lang="en-US" sz="2800" b="1" dirty="0"/>
+                <a:t>...</a:t>
+              </a:r>
+              <a:endParaRPr lang="LID4096" sz="2800" b="1" dirty="0"/>
+            </a:p>
+          </p:txBody>
+        </p:sp>
+      </p:grpSp>
+      <p:sp>
+        <p:nvSpPr>
+          <p:cNvPr id="42" name="Arrow: Right 41">
+            <a:extLst>
+              <a:ext uri="{FF2B5EF4-FFF2-40B4-BE49-F238E27FC236}">
+                <a16:creationId xmlns:a16="http://schemas.microsoft.com/office/drawing/2014/main" id="{30586CD2-77CE-08CA-9C76-D55235B5E8FB}"/>
+              </a:ext>
+            </a:extLst>
+          </p:cNvPr>
+          <p:cNvSpPr/>
+          <p:nvPr/>
+        </p:nvSpPr>
+        <p:spPr>
+          <a:xfrm>
+            <a:off x="4102753" y="2827896"/>
+            <a:ext cx="1200562" cy="523220"/>
+          </a:xfrm>
+          <a:prstGeom prst="rightArrow">
+            <a:avLst/>
+          </a:prstGeom>
+        </p:spPr>
+        <p:style>
+          <a:lnRef idx="2">
+            <a:schemeClr val="accent1">
+              <a:shade val="15000"/>
+            </a:schemeClr>
+          </a:lnRef>
+          <a:fillRef idx="1">
+            <a:schemeClr val="accent1"/>
+          </a:fillRef>
+          <a:effectRef idx="0">
+            <a:schemeClr val="accent1"/>
+          </a:effectRef>
+          <a:fontRef idx="minor">
+            <a:schemeClr val="lt1"/>
+          </a:fontRef>
+        </p:style>
+        <p:txBody>
+          <a:bodyPr rtlCol="0" anchor="ctr"/>
+          <a:lstStyle/>
+          <a:p>
+            <a:pPr algn="ctr"/>
+            <a:endParaRPr lang="LID4096"/>
+          </a:p>
+        </p:txBody>
+      </p:sp>
+      <p:sp>
+        <p:nvSpPr>
+          <p:cNvPr id="43" name="TextBox 42">
+            <a:extLst>
+              <a:ext uri="{FF2B5EF4-FFF2-40B4-BE49-F238E27FC236}">
+                <a16:creationId xmlns:a16="http://schemas.microsoft.com/office/drawing/2014/main" id="{2C42520C-0DF2-615A-5EA0-6232E60F0590}"/>
+              </a:ext>
+            </a:extLst>
+          </p:cNvPr>
+          <p:cNvSpPr txBox="1"/>
+          <p:nvPr/>
+        </p:nvSpPr>
+        <p:spPr>
+          <a:xfrm>
+            <a:off x="2282455" y="5070117"/>
+            <a:ext cx="5486138" cy="523220"/>
+          </a:xfrm>
+          <a:prstGeom prst="rect">
+            <a:avLst/>
+          </a:prstGeom>
+          <a:noFill/>
+          <a:ln>
+            <a:solidFill>
+              <a:schemeClr val="tx1"/>
+            </a:solidFill>
+          </a:ln>
+        </p:spPr>
+        <p:txBody>
+          <a:bodyPr wrap="square" rtlCol="0">
+            <a:spAutoFit/>
+          </a:bodyPr>
+          <a:lstStyle/>
+          <a:p>
+            <a:r>
+              <a:rPr lang="en-US" sz="2800" dirty="0">
+                <a:latin typeface="Courier New" panose="02070309020205020404" pitchFamily="49" charset="0"/>
+                <a:cs typeface="Courier New" panose="02070309020205020404" pitchFamily="49" charset="0"/>
+              </a:rPr>
+              <a:t>data_*.dat</a:t>
+            </a:r>
+            <a:r>
+              <a:rPr lang="en-US" sz="2800" dirty="0"/>
+              <a:t> </a:t>
+            </a:r>
+            <a:r>
+              <a:rPr lang="en-US" sz="2800" dirty="0">
+                <a:sym typeface="Symbol" panose="05050102010706020507" pitchFamily="18" charset="2"/>
+              </a:rPr>
+              <a:t></a:t>
+            </a:r>
+            <a:r>
+              <a:rPr lang="en-US" sz="2800" dirty="0"/>
+              <a:t> </a:t>
+            </a:r>
+            <a:r>
+              <a:rPr lang="en-US" sz="2800" dirty="0">
+                <a:latin typeface="Courier New" panose="02070309020205020404" pitchFamily="49" charset="0"/>
+                <a:cs typeface="Courier New" panose="02070309020205020404" pitchFamily="49" charset="0"/>
+              </a:rPr>
+              <a:t>result_*.txt</a:t>
+            </a:r>
+            <a:endParaRPr lang="LID4096" sz="2800" dirty="0">
+              <a:latin typeface="Courier New" panose="02070309020205020404" pitchFamily="49" charset="0"/>
+              <a:cs typeface="Courier New" panose="02070309020205020404" pitchFamily="49" charset="0"/>
+            </a:endParaRPr>
+          </a:p>
+        </p:txBody>
+      </p:sp>
+      <p:grpSp>
+        <p:nvGrpSpPr>
+          <p:cNvPr id="44" name="Group 43">
+            <a:extLst>
+              <a:ext uri="{FF2B5EF4-FFF2-40B4-BE49-F238E27FC236}">
+                <a16:creationId xmlns:a16="http://schemas.microsoft.com/office/drawing/2014/main" id="{316BB558-C3C8-DFE7-CFDE-259F1036016C}"/>
+              </a:ext>
+            </a:extLst>
+          </p:cNvPr>
+          <p:cNvGrpSpPr/>
+          <p:nvPr/>
+        </p:nvGrpSpPr>
+        <p:grpSpPr>
+          <a:xfrm>
+            <a:off x="8393135" y="4785045"/>
+            <a:ext cx="3485542" cy="1080435"/>
+            <a:chOff x="7957705" y="5089846"/>
+            <a:chExt cx="3485542" cy="1080435"/>
+          </a:xfrm>
+        </p:grpSpPr>
+        <p:sp>
+          <p:nvSpPr>
+            <p:cNvPr id="45" name="TextBox 44">
+              <a:extLst>
+                <a:ext uri="{FF2B5EF4-FFF2-40B4-BE49-F238E27FC236}">
+                  <a16:creationId xmlns:a16="http://schemas.microsoft.com/office/drawing/2014/main" id="{DF1BF197-86E8-7891-E8F0-AAE49F2029CC}"/>
+                </a:ext>
+              </a:extLst>
+            </p:cNvPr>
+            <p:cNvSpPr txBox="1"/>
+            <p:nvPr/>
+          </p:nvSpPr>
+          <p:spPr>
+            <a:xfrm>
+              <a:off x="8281741" y="5647061"/>
+              <a:ext cx="3161506" cy="523220"/>
+            </a:xfrm>
+            <a:prstGeom prst="rect">
+              <a:avLst/>
+            </a:prstGeom>
+            <a:noFill/>
+            <a:ln>
+              <a:solidFill>
+                <a:schemeClr val="tx1"/>
+              </a:solidFill>
+            </a:ln>
+          </p:spPr>
+          <p:txBody>
+            <a:bodyPr wrap="none" rtlCol="0">
+              <a:spAutoFit/>
+            </a:bodyPr>
+            <a:lstStyle/>
+            <a:p>
+              <a:r>
+                <a:rPr lang="en-US" sz="2800" dirty="0"/>
+                <a:t>Independent tasks!</a:t>
+              </a:r>
+              <a:endParaRPr lang="LID4096" sz="2800" dirty="0"/>
+            </a:p>
+          </p:txBody>
+        </p:sp>
+        <p:pic>
+          <p:nvPicPr>
+            <p:cNvPr id="46" name="Graphic 45" descr="Warning with solid fill">
+              <a:extLst>
+                <a:ext uri="{FF2B5EF4-FFF2-40B4-BE49-F238E27FC236}">
+                  <a16:creationId xmlns:a16="http://schemas.microsoft.com/office/drawing/2014/main" id="{FFBF1D6B-5232-670A-1EB7-17DFB42475A8}"/>
+                </a:ext>
+              </a:extLst>
+            </p:cNvPr>
+            <p:cNvPicPr>
+              <a:picLocks noChangeAspect="1"/>
+            </p:cNvPicPr>
+            <p:nvPr/>
+          </p:nvPicPr>
+          <p:blipFill>
+            <a:blip r:embed="rId2">
+              <a:extLst>
+                <a:ext uri="{96DAC541-7B7A-43D3-8B79-37D633B846F1}">
+                  <asvg:svgBlip xmlns:asvg="http://schemas.microsoft.com/office/drawing/2016/SVG/main" r:embed="rId3"/>
+                </a:ext>
+              </a:extLst>
+            </a:blip>
+            <a:stretch>
+              <a:fillRect/>
+            </a:stretch>
+          </p:blipFill>
+          <p:spPr>
+            <a:xfrm>
+              <a:off x="7957705" y="5089846"/>
+              <a:ext cx="648072" cy="648072"/>
+            </a:xfrm>
+            <a:prstGeom prst="rect">
+              <a:avLst/>
+            </a:prstGeom>
+          </p:spPr>
+        </p:pic>
+      </p:grpSp>
+    </p:spTree>
+    <p:extLst>
+      <p:ext uri="{BB962C8B-B14F-4D97-AF65-F5344CB8AC3E}">
+        <p14:creationId xmlns:p14="http://schemas.microsoft.com/office/powerpoint/2010/main" val="1436582853"/>
+      </p:ext>
+    </p:extLst>
+  </p:cSld>
+  <p:clrMapOvr>
+    <a:masterClrMapping/>
+  </p:clrMapOvr>
+</p:sld>
+</file>
+
 <file path=ppt/slides/slide3.xml><?xml version="1.0" encoding="utf-8"?>
 <p:sld xmlns:a="http://schemas.openxmlformats.org/drawingml/2006/main" xmlns:r="http://schemas.openxmlformats.org/officeDocument/2006/relationships" xmlns:p="http://schemas.openxmlformats.org/presentationml/2006/main">
   <p:cSld>

</xml_diff>

<commit_message>
Add job array Slurm script
</commit_message>
<xml_diff>
--- a/workflow_for_HPC.pptx
+++ b/workflow_for_HPC.pptx
@@ -5,7 +5,7 @@
     <p:sldMasterId id="2147483648" r:id="rId1"/>
   </p:sldMasterIdLst>
   <p:notesMasterIdLst>
-    <p:notesMasterId r:id="rId29"/>
+    <p:notesMasterId r:id="rId30"/>
   </p:notesMasterIdLst>
   <p:sldIdLst>
     <p:sldId id="257" r:id="rId2"/>
@@ -35,6 +35,7 @@
     <p:sldId id="378" r:id="rId26"/>
     <p:sldId id="379" r:id="rId27"/>
     <p:sldId id="380" r:id="rId28"/>
+    <p:sldId id="381" r:id="rId29"/>
   </p:sldIdLst>
   <p:sldSz cx="12192000" cy="6858000"/>
   <p:notesSz cx="6858000" cy="9144000"/>
@@ -12980,10 +12981,10 @@
         </p:nvGrpSpPr>
         <p:grpSpPr>
           <a:xfrm>
-            <a:off x="7835426" y="5153031"/>
-            <a:ext cx="3388788" cy="977467"/>
-            <a:chOff x="7835426" y="5153031"/>
-            <a:chExt cx="3388788" cy="977467"/>
+            <a:off x="7704794" y="5153031"/>
+            <a:ext cx="3519420" cy="977467"/>
+            <a:chOff x="7704794" y="5153031"/>
+            <a:chExt cx="3519420" cy="977467"/>
           </a:xfrm>
         </p:grpSpPr>
         <p:sp>
@@ -13000,8 +13001,8 @@
           </p:nvSpPr>
           <p:spPr>
             <a:xfrm>
-              <a:off x="7835426" y="5668833"/>
-              <a:ext cx="3072701" cy="461665"/>
+              <a:off x="7704794" y="5668833"/>
+              <a:ext cx="3237809" cy="461665"/>
             </a:xfrm>
             <a:prstGeom prst="rect">
               <a:avLst/>
@@ -13021,7 +13022,7 @@
             <a:p>
               <a:r>
                 <a:rPr lang="en-US" sz="2400" dirty="0"/>
-                <a:t>Note: workflow = DAG</a:t>
+                <a:t>Note: workflow == DAG</a:t>
               </a:r>
               <a:endParaRPr lang="LID4096" sz="2400" dirty="0"/>
             </a:p>
@@ -16914,6 +16915,1163 @@
 </p:sld>
 </file>
 
+<file path=ppt/slides/slide28.xml><?xml version="1.0" encoding="utf-8"?>
+<p:sld xmlns:a="http://schemas.openxmlformats.org/drawingml/2006/main" xmlns:r="http://schemas.openxmlformats.org/officeDocument/2006/relationships" xmlns:p="http://schemas.openxmlformats.org/presentationml/2006/main">
+  <p:cSld>
+    <p:spTree>
+      <p:nvGrpSpPr>
+        <p:cNvPr id="1" name=""/>
+        <p:cNvGrpSpPr/>
+        <p:nvPr/>
+      </p:nvGrpSpPr>
+      <p:grpSpPr>
+        <a:xfrm>
+          <a:off x="0" y="0"/>
+          <a:ext cx="0" cy="0"/>
+          <a:chOff x="0" y="0"/>
+          <a:chExt cx="0" cy="0"/>
+        </a:xfrm>
+      </p:grpSpPr>
+      <p:sp>
+        <p:nvSpPr>
+          <p:cNvPr id="2" name="Title 1">
+            <a:extLst>
+              <a:ext uri="{FF2B5EF4-FFF2-40B4-BE49-F238E27FC236}">
+                <a16:creationId xmlns:a16="http://schemas.microsoft.com/office/drawing/2014/main" id="{62C65F77-B93F-715F-88A6-609E416CEC75}"/>
+              </a:ext>
+            </a:extLst>
+          </p:cNvPr>
+          <p:cNvSpPr>
+            <a:spLocks noGrp="1"/>
+          </p:cNvSpPr>
+          <p:nvPr>
+            <p:ph type="title"/>
+          </p:nvPr>
+        </p:nvSpPr>
+        <p:spPr/>
+        <p:txBody>
+          <a:bodyPr/>
+          <a:lstStyle/>
+          <a:p>
+            <a:r>
+              <a:rPr lang="en-US" dirty="0"/>
+              <a:t>Solution: job arrays</a:t>
+            </a:r>
+            <a:endParaRPr lang="LID4096" dirty="0"/>
+          </a:p>
+        </p:txBody>
+      </p:sp>
+      <p:sp>
+        <p:nvSpPr>
+          <p:cNvPr id="3" name="Slide Number Placeholder 2">
+            <a:extLst>
+              <a:ext uri="{FF2B5EF4-FFF2-40B4-BE49-F238E27FC236}">
+                <a16:creationId xmlns:a16="http://schemas.microsoft.com/office/drawing/2014/main" id="{5B370876-3B45-C4CA-7DE7-8BD8DCB4949C}"/>
+              </a:ext>
+            </a:extLst>
+          </p:cNvPr>
+          <p:cNvSpPr>
+            <a:spLocks noGrp="1"/>
+          </p:cNvSpPr>
+          <p:nvPr>
+            <p:ph type="sldNum" sz="quarter" idx="12"/>
+          </p:nvPr>
+        </p:nvSpPr>
+        <p:spPr/>
+        <p:txBody>
+          <a:bodyPr/>
+          <a:lstStyle/>
+          <a:p>
+            <a:fld id="{9C7CE217-4467-4B8D-A735-B008FA7C4816}" type="slidenum">
+              <a:rPr lang="LID4096" smtClean="0"/>
+              <a:t>28</a:t>
+            </a:fld>
+            <a:endParaRPr lang="LID4096"/>
+          </a:p>
+        </p:txBody>
+      </p:sp>
+      <p:grpSp>
+        <p:nvGrpSpPr>
+          <p:cNvPr id="4" name="Group 3">
+            <a:extLst>
+              <a:ext uri="{FF2B5EF4-FFF2-40B4-BE49-F238E27FC236}">
+                <a16:creationId xmlns:a16="http://schemas.microsoft.com/office/drawing/2014/main" id="{DC15D296-9C55-4257-CC12-F748D325920D}"/>
+              </a:ext>
+            </a:extLst>
+          </p:cNvPr>
+          <p:cNvGrpSpPr/>
+          <p:nvPr/>
+        </p:nvGrpSpPr>
+        <p:grpSpPr>
+          <a:xfrm>
+            <a:off x="1026836" y="1616761"/>
+            <a:ext cx="10261650" cy="3699215"/>
+            <a:chOff x="275722" y="3238731"/>
+            <a:chExt cx="10261650" cy="3699215"/>
+          </a:xfrm>
+        </p:grpSpPr>
+        <p:sp>
+          <p:nvSpPr>
+            <p:cNvPr id="5" name="TextBox 4">
+              <a:extLst>
+                <a:ext uri="{FF2B5EF4-FFF2-40B4-BE49-F238E27FC236}">
+                  <a16:creationId xmlns:a16="http://schemas.microsoft.com/office/drawing/2014/main" id="{9567114C-211F-0CC1-96D6-C6F076B84277}"/>
+                </a:ext>
+              </a:extLst>
+            </p:cNvPr>
+            <p:cNvSpPr txBox="1"/>
+            <p:nvPr/>
+          </p:nvSpPr>
+          <p:spPr>
+            <a:xfrm>
+              <a:off x="275722" y="3244627"/>
+              <a:ext cx="10261650" cy="3693319"/>
+            </a:xfrm>
+            <a:prstGeom prst="rect">
+              <a:avLst/>
+            </a:prstGeom>
+            <a:solidFill>
+              <a:schemeClr val="bg1">
+                <a:lumMod val="85000"/>
+              </a:schemeClr>
+            </a:solidFill>
+          </p:spPr>
+          <p:txBody>
+            <a:bodyPr wrap="square" rtlCol="0">
+              <a:spAutoFit/>
+            </a:bodyPr>
+            <a:lstStyle/>
+            <a:p>
+              <a:pPr lvl="0">
+                <a:defRPr/>
+              </a:pPr>
+              <a:r>
+                <a:rPr lang="en-US" dirty="0">
+                  <a:solidFill>
+                    <a:prstClr val="black"/>
+                  </a:solidFill>
+                  <a:latin typeface="Courier New" pitchFamily="49" charset="0"/>
+                  <a:cs typeface="Courier New" pitchFamily="49" charset="0"/>
+                </a:rPr>
+                <a:t>#!/usr/bin/env -S bash -l</a:t>
+              </a:r>
+            </a:p>
+            <a:p>
+              <a:pPr lvl="0">
+                <a:defRPr/>
+              </a:pPr>
+              <a:r>
+                <a:rPr lang="en-US" dirty="0">
+                  <a:solidFill>
+                    <a:prstClr val="black"/>
+                  </a:solidFill>
+                  <a:latin typeface="Courier New" pitchFamily="49" charset="0"/>
+                  <a:cs typeface="Courier New" pitchFamily="49" charset="0"/>
+                </a:rPr>
+                <a:t>#SBATCH --account=lpt2_sysadmin</a:t>
+              </a:r>
+            </a:p>
+            <a:p>
+              <a:pPr lvl="0">
+                <a:defRPr/>
+              </a:pPr>
+              <a:r>
+                <a:rPr lang="en-US" dirty="0">
+                  <a:solidFill>
+                    <a:prstClr val="black"/>
+                  </a:solidFill>
+                  <a:latin typeface="Courier New" pitchFamily="49" charset="0"/>
+                  <a:cs typeface="Courier New" pitchFamily="49" charset="0"/>
+                </a:rPr>
+                <a:t>#SBATCH --cluster=</a:t>
+              </a:r>
+              <a:r>
+                <a:rPr lang="en-US" dirty="0" err="1">
+                  <a:solidFill>
+                    <a:prstClr val="black"/>
+                  </a:solidFill>
+                  <a:latin typeface="Courier New" pitchFamily="49" charset="0"/>
+                  <a:cs typeface="Courier New" pitchFamily="49" charset="0"/>
+                </a:rPr>
+                <a:t>wice</a:t>
+              </a:r>
+              <a:endParaRPr lang="en-US" dirty="0">
+                <a:solidFill>
+                  <a:prstClr val="black"/>
+                </a:solidFill>
+                <a:latin typeface="Courier New" pitchFamily="49" charset="0"/>
+                <a:cs typeface="Courier New" pitchFamily="49" charset="0"/>
+              </a:endParaRPr>
+            </a:p>
+            <a:p>
+              <a:pPr lvl="0">
+                <a:defRPr/>
+              </a:pPr>
+              <a:r>
+                <a:rPr lang="en-US" dirty="0">
+                  <a:solidFill>
+                    <a:prstClr val="black"/>
+                  </a:solidFill>
+                  <a:latin typeface="Courier New" pitchFamily="49" charset="0"/>
+                  <a:cs typeface="Courier New" pitchFamily="49" charset="0"/>
+                </a:rPr>
+                <a:t>#SBATCH --time=00:05:00</a:t>
+              </a:r>
+            </a:p>
+            <a:p>
+              <a:pPr lvl="0">
+                <a:defRPr/>
+              </a:pPr>
+              <a:endParaRPr lang="en-US" dirty="0">
+                <a:solidFill>
+                  <a:prstClr val="black"/>
+                </a:solidFill>
+                <a:latin typeface="Courier New" pitchFamily="49" charset="0"/>
+                <a:cs typeface="Courier New" pitchFamily="49" charset="0"/>
+              </a:endParaRPr>
+            </a:p>
+            <a:p>
+              <a:pPr lvl="0">
+                <a:defRPr/>
+              </a:pPr>
+              <a:r>
+                <a:rPr lang="en-US" dirty="0" err="1">
+                  <a:solidFill>
+                    <a:prstClr val="black"/>
+                  </a:solidFill>
+                  <a:latin typeface="Courier New" pitchFamily="49" charset="0"/>
+                  <a:cs typeface="Courier New" pitchFamily="49" charset="0"/>
+                </a:rPr>
+                <a:t>max_id</a:t>
+              </a:r>
+              <a:r>
+                <a:rPr lang="en-US" dirty="0">
+                  <a:solidFill>
+                    <a:prstClr val="black"/>
+                  </a:solidFill>
+                  <a:latin typeface="Courier New" pitchFamily="49" charset="0"/>
+                  <a:cs typeface="Courier New" pitchFamily="49" charset="0"/>
+                </a:rPr>
+                <a:t>=$(( </a:t>
+              </a:r>
+              <a:r>
+                <a:rPr lang="en-US" b="1" dirty="0">
+                  <a:solidFill>
+                    <a:srgbClr val="00B0F0"/>
+                  </a:solidFill>
+                  <a:latin typeface="Courier New" pitchFamily="49" charset="0"/>
+                  <a:cs typeface="Courier New" pitchFamily="49" charset="0"/>
+                </a:rPr>
+                <a:t>$SLURM_ARRAY_TASK_ID</a:t>
+              </a:r>
+              <a:r>
+                <a:rPr lang="en-US" dirty="0">
+                  <a:solidFill>
+                    <a:prstClr val="black"/>
+                  </a:solidFill>
+                  <a:latin typeface="Courier New" pitchFamily="49" charset="0"/>
+                  <a:cs typeface="Courier New" pitchFamily="49" charset="0"/>
+                </a:rPr>
+                <a:t> + </a:t>
+              </a:r>
+              <a:r>
+                <a:rPr lang="en-US" b="1" dirty="0">
+                  <a:solidFill>
+                    <a:srgbClr val="FF0000"/>
+                  </a:solidFill>
+                  <a:latin typeface="Courier New" pitchFamily="49" charset="0"/>
+                  <a:cs typeface="Courier New" pitchFamily="49" charset="0"/>
+                </a:rPr>
+                <a:t>$SLURM_ARRAY_TASK_STEP</a:t>
+              </a:r>
+              <a:r>
+                <a:rPr lang="en-US" dirty="0">
+                  <a:solidFill>
+                    <a:prstClr val="black"/>
+                  </a:solidFill>
+                  <a:latin typeface="Courier New" pitchFamily="49" charset="0"/>
+                  <a:cs typeface="Courier New" pitchFamily="49" charset="0"/>
+                </a:rPr>
+                <a:t> - 1 ))</a:t>
+              </a:r>
+            </a:p>
+            <a:p>
+              <a:pPr lvl="0">
+                <a:defRPr/>
+              </a:pPr>
+              <a:r>
+                <a:rPr lang="en-US" dirty="0">
+                  <a:solidFill>
+                    <a:prstClr val="black"/>
+                  </a:solidFill>
+                  <a:latin typeface="Courier New" pitchFamily="49" charset="0"/>
+                  <a:cs typeface="Courier New" pitchFamily="49" charset="0"/>
+                </a:rPr>
+                <a:t>for id in $(seq </a:t>
+              </a:r>
+              <a:r>
+                <a:rPr lang="en-US" dirty="0">
+                  <a:solidFill>
+                    <a:srgbClr val="00B0F0"/>
+                  </a:solidFill>
+                  <a:latin typeface="Courier New" pitchFamily="49" charset="0"/>
+                  <a:cs typeface="Courier New" pitchFamily="49" charset="0"/>
+                </a:rPr>
+                <a:t>$SLURM_ARRAY_TASK_ID</a:t>
+              </a:r>
+              <a:r>
+                <a:rPr lang="en-US" dirty="0">
+                  <a:solidFill>
+                    <a:prstClr val="black"/>
+                  </a:solidFill>
+                  <a:latin typeface="Courier New" pitchFamily="49" charset="0"/>
+                  <a:cs typeface="Courier New" pitchFamily="49" charset="0"/>
+                </a:rPr>
+                <a:t> $</a:t>
+              </a:r>
+              <a:r>
+                <a:rPr lang="en-US" dirty="0" err="1">
+                  <a:solidFill>
+                    <a:prstClr val="black"/>
+                  </a:solidFill>
+                  <a:latin typeface="Courier New" pitchFamily="49" charset="0"/>
+                  <a:cs typeface="Courier New" pitchFamily="49" charset="0"/>
+                </a:rPr>
+                <a:t>max_id</a:t>
+              </a:r>
+              <a:r>
+                <a:rPr lang="en-US" dirty="0">
+                  <a:solidFill>
+                    <a:prstClr val="black"/>
+                  </a:solidFill>
+                  <a:latin typeface="Courier New" pitchFamily="49" charset="0"/>
+                  <a:cs typeface="Courier New" pitchFamily="49" charset="0"/>
+                </a:rPr>
+                <a:t>)</a:t>
+              </a:r>
+            </a:p>
+            <a:p>
+              <a:pPr lvl="0">
+                <a:defRPr/>
+              </a:pPr>
+              <a:r>
+                <a:rPr lang="en-US" dirty="0">
+                  <a:solidFill>
+                    <a:prstClr val="black"/>
+                  </a:solidFill>
+                  <a:latin typeface="Courier New" pitchFamily="49" charset="0"/>
+                  <a:cs typeface="Courier New" pitchFamily="49" charset="0"/>
+                </a:rPr>
+                <a:t>do</a:t>
+              </a:r>
+            </a:p>
+            <a:p>
+              <a:pPr lvl="0">
+                <a:defRPr/>
+              </a:pPr>
+              <a:r>
+                <a:rPr lang="en-US" dirty="0">
+                  <a:solidFill>
+                    <a:prstClr val="black"/>
+                  </a:solidFill>
+                  <a:latin typeface="Courier New" pitchFamily="49" charset="0"/>
+                  <a:cs typeface="Courier New" pitchFamily="49" charset="0"/>
+                </a:rPr>
+                <a:t>    </a:t>
+              </a:r>
+              <a:r>
+                <a:rPr lang="en-US" dirty="0" err="1">
+                  <a:solidFill>
+                    <a:prstClr val="black"/>
+                  </a:solidFill>
+                  <a:latin typeface="Courier New" pitchFamily="49" charset="0"/>
+                  <a:cs typeface="Courier New" pitchFamily="49" charset="0"/>
+                </a:rPr>
+                <a:t>file_nr</a:t>
+              </a:r>
+              <a:r>
+                <a:rPr lang="en-US" dirty="0">
+                  <a:solidFill>
+                    <a:prstClr val="black"/>
+                  </a:solidFill>
+                  <a:latin typeface="Courier New" pitchFamily="49" charset="0"/>
+                  <a:cs typeface="Courier New" pitchFamily="49" charset="0"/>
+                </a:rPr>
+                <a:t>=$(</a:t>
+              </a:r>
+              <a:r>
+                <a:rPr lang="en-US" dirty="0" err="1">
+                  <a:solidFill>
+                    <a:prstClr val="black"/>
+                  </a:solidFill>
+                  <a:latin typeface="Courier New" pitchFamily="49" charset="0"/>
+                  <a:cs typeface="Courier New" pitchFamily="49" charset="0"/>
+                </a:rPr>
+                <a:t>printf</a:t>
+              </a:r>
+              <a:r>
+                <a:rPr lang="en-US" dirty="0">
+                  <a:solidFill>
+                    <a:prstClr val="black"/>
+                  </a:solidFill>
+                  <a:latin typeface="Courier New" pitchFamily="49" charset="0"/>
+                  <a:cs typeface="Courier New" pitchFamily="49" charset="0"/>
+                </a:rPr>
+                <a:t> "%03d" $id)</a:t>
+              </a:r>
+            </a:p>
+            <a:p>
+              <a:pPr lvl="0">
+                <a:defRPr/>
+              </a:pPr>
+              <a:r>
+                <a:rPr lang="en-US" dirty="0">
+                  <a:solidFill>
+                    <a:prstClr val="black"/>
+                  </a:solidFill>
+                  <a:latin typeface="Courier New" pitchFamily="49" charset="0"/>
+                  <a:cs typeface="Courier New" pitchFamily="49" charset="0"/>
+                </a:rPr>
+                <a:t>    </a:t>
+              </a:r>
+              <a:r>
+                <a:rPr lang="en-US" dirty="0" err="1">
+                  <a:solidFill>
+                    <a:prstClr val="black"/>
+                  </a:solidFill>
+                  <a:latin typeface="Courier New" pitchFamily="49" charset="0"/>
+                  <a:cs typeface="Courier New" pitchFamily="49" charset="0"/>
+                </a:rPr>
+                <a:t>input_file</a:t>
+              </a:r>
+              <a:r>
+                <a:rPr lang="en-US" dirty="0">
+                  <a:solidFill>
+                    <a:prstClr val="black"/>
+                  </a:solidFill>
+                  <a:latin typeface="Courier New" pitchFamily="49" charset="0"/>
+                  <a:cs typeface="Courier New" pitchFamily="49" charset="0"/>
+                </a:rPr>
+                <a:t>="input/data_${</a:t>
+              </a:r>
+              <a:r>
+                <a:rPr lang="en-US" dirty="0" err="1">
+                  <a:solidFill>
+                    <a:prstClr val="black"/>
+                  </a:solidFill>
+                  <a:latin typeface="Courier New" pitchFamily="49" charset="0"/>
+                  <a:cs typeface="Courier New" pitchFamily="49" charset="0"/>
+                </a:rPr>
+                <a:t>file_nr</a:t>
+              </a:r>
+              <a:r>
+                <a:rPr lang="en-US" dirty="0">
+                  <a:solidFill>
+                    <a:prstClr val="black"/>
+                  </a:solidFill>
+                  <a:latin typeface="Courier New" pitchFamily="49" charset="0"/>
+                  <a:cs typeface="Courier New" pitchFamily="49" charset="0"/>
+                </a:rPr>
+                <a:t>}.</a:t>
+              </a:r>
+              <a:r>
+                <a:rPr lang="en-US" dirty="0" err="1">
+                  <a:solidFill>
+                    <a:prstClr val="black"/>
+                  </a:solidFill>
+                  <a:latin typeface="Courier New" pitchFamily="49" charset="0"/>
+                  <a:cs typeface="Courier New" pitchFamily="49" charset="0"/>
+                </a:rPr>
+                <a:t>dat</a:t>
+              </a:r>
+              <a:r>
+                <a:rPr lang="en-US" dirty="0">
+                  <a:solidFill>
+                    <a:prstClr val="black"/>
+                  </a:solidFill>
+                  <a:latin typeface="Courier New" pitchFamily="49" charset="0"/>
+                  <a:cs typeface="Courier New" pitchFamily="49" charset="0"/>
+                </a:rPr>
+                <a:t>"</a:t>
+              </a:r>
+            </a:p>
+            <a:p>
+              <a:pPr lvl="0">
+                <a:defRPr/>
+              </a:pPr>
+              <a:r>
+                <a:rPr lang="en-US" dirty="0">
+                  <a:solidFill>
+                    <a:prstClr val="black"/>
+                  </a:solidFill>
+                  <a:latin typeface="Courier New" pitchFamily="49" charset="0"/>
+                  <a:cs typeface="Courier New" pitchFamily="49" charset="0"/>
+                </a:rPr>
+                <a:t>    </a:t>
+              </a:r>
+              <a:r>
+                <a:rPr lang="en-US" dirty="0" err="1">
+                  <a:solidFill>
+                    <a:prstClr val="black"/>
+                  </a:solidFill>
+                  <a:latin typeface="Courier New" pitchFamily="49" charset="0"/>
+                  <a:cs typeface="Courier New" pitchFamily="49" charset="0"/>
+                </a:rPr>
+                <a:t>output_file</a:t>
+              </a:r>
+              <a:r>
+                <a:rPr lang="en-US" dirty="0">
+                  <a:solidFill>
+                    <a:prstClr val="black"/>
+                  </a:solidFill>
+                  <a:latin typeface="Courier New" pitchFamily="49" charset="0"/>
+                  <a:cs typeface="Courier New" pitchFamily="49" charset="0"/>
+                </a:rPr>
+                <a:t>="output/result_${</a:t>
+              </a:r>
+              <a:r>
+                <a:rPr lang="en-US" dirty="0" err="1">
+                  <a:solidFill>
+                    <a:prstClr val="black"/>
+                  </a:solidFill>
+                  <a:latin typeface="Courier New" pitchFamily="49" charset="0"/>
+                  <a:cs typeface="Courier New" pitchFamily="49" charset="0"/>
+                </a:rPr>
+                <a:t>file_nr</a:t>
+              </a:r>
+              <a:r>
+                <a:rPr lang="en-US" dirty="0">
+                  <a:solidFill>
+                    <a:prstClr val="black"/>
+                  </a:solidFill>
+                  <a:latin typeface="Courier New" pitchFamily="49" charset="0"/>
+                  <a:cs typeface="Courier New" pitchFamily="49" charset="0"/>
+                </a:rPr>
+                <a:t>}.txt"</a:t>
+              </a:r>
+            </a:p>
+            <a:p>
+              <a:pPr lvl="0">
+                <a:defRPr/>
+              </a:pPr>
+              <a:r>
+                <a:rPr lang="en-US" dirty="0">
+                  <a:solidFill>
+                    <a:prstClr val="black"/>
+                  </a:solidFill>
+                  <a:latin typeface="Courier New" pitchFamily="49" charset="0"/>
+                  <a:cs typeface="Courier New" pitchFamily="49" charset="0"/>
+                </a:rPr>
+                <a:t>    ./process.py --</a:t>
+              </a:r>
+              <a:r>
+                <a:rPr lang="en-US" dirty="0" err="1">
+                  <a:solidFill>
+                    <a:prstClr val="black"/>
+                  </a:solidFill>
+                  <a:latin typeface="Courier New" pitchFamily="49" charset="0"/>
+                  <a:cs typeface="Courier New" pitchFamily="49" charset="0"/>
+                </a:rPr>
+                <a:t>input_file</a:t>
+              </a:r>
+              <a:r>
+                <a:rPr lang="en-US" dirty="0">
+                  <a:solidFill>
+                    <a:prstClr val="black"/>
+                  </a:solidFill>
+                  <a:latin typeface="Courier New" pitchFamily="49" charset="0"/>
+                  <a:cs typeface="Courier New" pitchFamily="49" charset="0"/>
+                </a:rPr>
+                <a:t> "$</a:t>
+              </a:r>
+              <a:r>
+                <a:rPr lang="en-US" dirty="0" err="1">
+                  <a:solidFill>
+                    <a:prstClr val="black"/>
+                  </a:solidFill>
+                  <a:latin typeface="Courier New" pitchFamily="49" charset="0"/>
+                  <a:cs typeface="Courier New" pitchFamily="49" charset="0"/>
+                </a:rPr>
+                <a:t>input_file</a:t>
+              </a:r>
+              <a:r>
+                <a:rPr lang="en-US" dirty="0">
+                  <a:solidFill>
+                    <a:prstClr val="black"/>
+                  </a:solidFill>
+                  <a:latin typeface="Courier New" pitchFamily="49" charset="0"/>
+                  <a:cs typeface="Courier New" pitchFamily="49" charset="0"/>
+                </a:rPr>
+                <a:t>"  --</a:t>
+              </a:r>
+              <a:r>
+                <a:rPr lang="en-US" dirty="0" err="1">
+                  <a:solidFill>
+                    <a:prstClr val="black"/>
+                  </a:solidFill>
+                  <a:latin typeface="Courier New" pitchFamily="49" charset="0"/>
+                  <a:cs typeface="Courier New" pitchFamily="49" charset="0"/>
+                </a:rPr>
+                <a:t>output_file</a:t>
+              </a:r>
+              <a:r>
+                <a:rPr lang="en-US" dirty="0">
+                  <a:solidFill>
+                    <a:prstClr val="black"/>
+                  </a:solidFill>
+                  <a:latin typeface="Courier New" pitchFamily="49" charset="0"/>
+                  <a:cs typeface="Courier New" pitchFamily="49" charset="0"/>
+                </a:rPr>
+                <a:t> "$</a:t>
+              </a:r>
+              <a:r>
+                <a:rPr lang="en-US" dirty="0" err="1">
+                  <a:solidFill>
+                    <a:prstClr val="black"/>
+                  </a:solidFill>
+                  <a:latin typeface="Courier New" pitchFamily="49" charset="0"/>
+                  <a:cs typeface="Courier New" pitchFamily="49" charset="0"/>
+                </a:rPr>
+                <a:t>output_file</a:t>
+              </a:r>
+              <a:r>
+                <a:rPr lang="en-US" dirty="0">
+                  <a:solidFill>
+                    <a:prstClr val="black"/>
+                  </a:solidFill>
+                  <a:latin typeface="Courier New" pitchFamily="49" charset="0"/>
+                  <a:cs typeface="Courier New" pitchFamily="49" charset="0"/>
+                </a:rPr>
+                <a:t>"</a:t>
+              </a:r>
+            </a:p>
+            <a:p>
+              <a:pPr lvl="0">
+                <a:defRPr/>
+              </a:pPr>
+              <a:r>
+                <a:rPr lang="en-US" dirty="0">
+                  <a:solidFill>
+                    <a:prstClr val="black"/>
+                  </a:solidFill>
+                  <a:latin typeface="Courier New" pitchFamily="49" charset="0"/>
+                  <a:cs typeface="Courier New" pitchFamily="49" charset="0"/>
+                </a:rPr>
+                <a:t>done</a:t>
+              </a:r>
+              <a:endParaRPr kumimoji="0" lang="en-US" sz="1800" b="0" i="0" u="none" strike="noStrike" kern="1200" cap="none" spc="0" normalizeH="0" baseline="0" noProof="0" dirty="0">
+                <a:ln>
+                  <a:noFill/>
+                </a:ln>
+                <a:solidFill>
+                  <a:prstClr val="black"/>
+                </a:solidFill>
+                <a:effectLst/>
+                <a:uLnTx/>
+                <a:uFillTx/>
+                <a:latin typeface="Courier New" pitchFamily="49" charset="0"/>
+                <a:ea typeface="+mn-ea"/>
+                <a:cs typeface="Courier New" pitchFamily="49" charset="0"/>
+              </a:endParaRPr>
+            </a:p>
+          </p:txBody>
+        </p:sp>
+        <p:sp>
+          <p:nvSpPr>
+            <p:cNvPr id="6" name="TextBox 5">
+              <a:extLst>
+                <a:ext uri="{FF2B5EF4-FFF2-40B4-BE49-F238E27FC236}">
+                  <a16:creationId xmlns:a16="http://schemas.microsoft.com/office/drawing/2014/main" id="{375CC980-C9B8-0ADD-4587-77C07830484C}"/>
+                </a:ext>
+              </a:extLst>
+            </p:cNvPr>
+            <p:cNvSpPr txBox="1"/>
+            <p:nvPr/>
+          </p:nvSpPr>
+          <p:spPr>
+            <a:xfrm>
+              <a:off x="7998012" y="3238731"/>
+              <a:ext cx="2529860" cy="338554"/>
+            </a:xfrm>
+            <a:prstGeom prst="rect">
+              <a:avLst/>
+            </a:prstGeom>
+            <a:solidFill>
+              <a:schemeClr val="bg1"/>
+            </a:solidFill>
+            <a:ln>
+              <a:solidFill>
+                <a:schemeClr val="tx1"/>
+              </a:solidFill>
+            </a:ln>
+          </p:spPr>
+          <p:txBody>
+            <a:bodyPr wrap="none" rtlCol="0">
+              <a:spAutoFit/>
+            </a:bodyPr>
+            <a:lstStyle/>
+            <a:p>
+              <a:r>
+                <a:rPr lang="en-US" sz="1600" dirty="0" err="1">
+                  <a:latin typeface="Courier New" panose="02070309020205020404" pitchFamily="49" charset="0"/>
+                  <a:cs typeface="Courier New" panose="02070309020205020404" pitchFamily="49" charset="0"/>
+                </a:rPr>
+                <a:t>Process_batch.slurm</a:t>
+              </a:r>
+              <a:endParaRPr lang="LID4096" sz="1600" dirty="0">
+                <a:latin typeface="Courier New" panose="02070309020205020404" pitchFamily="49" charset="0"/>
+                <a:cs typeface="Courier New" panose="02070309020205020404" pitchFamily="49" charset="0"/>
+              </a:endParaRPr>
+            </a:p>
+          </p:txBody>
+        </p:sp>
+      </p:grpSp>
+      <p:sp>
+        <p:nvSpPr>
+          <p:cNvPr id="9" name="TextBox 8">
+            <a:extLst>
+              <a:ext uri="{FF2B5EF4-FFF2-40B4-BE49-F238E27FC236}">
+                <a16:creationId xmlns:a16="http://schemas.microsoft.com/office/drawing/2014/main" id="{A8607298-678B-3DC5-7632-53CC9F40B485}"/>
+              </a:ext>
+            </a:extLst>
+          </p:cNvPr>
+          <p:cNvSpPr txBox="1"/>
+          <p:nvPr/>
+        </p:nvSpPr>
+        <p:spPr>
+          <a:xfrm>
+            <a:off x="1026836" y="5595127"/>
+            <a:ext cx="10252150" cy="369332"/>
+          </a:xfrm>
+          <a:prstGeom prst="rect">
+            <a:avLst/>
+          </a:prstGeom>
+          <a:solidFill>
+            <a:schemeClr val="tx1"/>
+          </a:solidFill>
+          <a:ln>
+            <a:solidFill>
+              <a:schemeClr val="tx1"/>
+            </a:solidFill>
+          </a:ln>
+        </p:spPr>
+        <p:txBody>
+          <a:bodyPr wrap="square" rtlCol="0">
+            <a:spAutoFit/>
+          </a:bodyPr>
+          <a:lstStyle/>
+          <a:p>
+            <a:r>
+              <a:rPr lang="en-US" b="1" dirty="0">
+                <a:solidFill>
+                  <a:schemeClr val="bg1"/>
+                </a:solidFill>
+                <a:latin typeface="Courier New" pitchFamily="49" charset="0"/>
+                <a:cs typeface="Courier New" pitchFamily="49" charset="0"/>
+              </a:rPr>
+              <a:t>$ </a:t>
+            </a:r>
+            <a:r>
+              <a:rPr lang="en-US" b="1" dirty="0" err="1">
+                <a:solidFill>
+                  <a:schemeClr val="bg1"/>
+                </a:solidFill>
+                <a:latin typeface="Courier New" pitchFamily="49" charset="0"/>
+                <a:cs typeface="Courier New" pitchFamily="49" charset="0"/>
+              </a:rPr>
+              <a:t>sbatch</a:t>
+            </a:r>
+            <a:r>
+              <a:rPr lang="en-US" b="1" dirty="0">
+                <a:solidFill>
+                  <a:schemeClr val="bg1"/>
+                </a:solidFill>
+                <a:latin typeface="Courier New" pitchFamily="49" charset="0"/>
+                <a:cs typeface="Courier New" pitchFamily="49" charset="0"/>
+              </a:rPr>
+              <a:t>  --array=</a:t>
+            </a:r>
+            <a:r>
+              <a:rPr lang="en-US" b="1" dirty="0">
+                <a:solidFill>
+                  <a:srgbClr val="00B0F0"/>
+                </a:solidFill>
+                <a:latin typeface="Courier New" pitchFamily="49" charset="0"/>
+                <a:cs typeface="Courier New" pitchFamily="49" charset="0"/>
+              </a:rPr>
+              <a:t>1-200</a:t>
+            </a:r>
+            <a:r>
+              <a:rPr lang="en-US" b="1" dirty="0">
+                <a:solidFill>
+                  <a:schemeClr val="bg1"/>
+                </a:solidFill>
+                <a:latin typeface="Courier New" pitchFamily="49" charset="0"/>
+                <a:cs typeface="Courier New" pitchFamily="49" charset="0"/>
+              </a:rPr>
+              <a:t>:</a:t>
+            </a:r>
+            <a:r>
+              <a:rPr lang="en-US" b="1" dirty="0">
+                <a:solidFill>
+                  <a:srgbClr val="FF0000"/>
+                </a:solidFill>
+                <a:latin typeface="Courier New" pitchFamily="49" charset="0"/>
+                <a:cs typeface="Courier New" pitchFamily="49" charset="0"/>
+              </a:rPr>
+              <a:t>50</a:t>
+            </a:r>
+            <a:r>
+              <a:rPr lang="en-US" b="1" dirty="0">
+                <a:solidFill>
+                  <a:schemeClr val="bg1"/>
+                </a:solidFill>
+                <a:latin typeface="Courier New" pitchFamily="49" charset="0"/>
+                <a:cs typeface="Courier New" pitchFamily="49" charset="0"/>
+              </a:rPr>
+              <a:t>  </a:t>
+            </a:r>
+            <a:r>
+              <a:rPr lang="en-US" b="1" dirty="0" err="1">
+                <a:solidFill>
+                  <a:schemeClr val="bg1"/>
+                </a:solidFill>
+                <a:latin typeface="Courier New" pitchFamily="49" charset="0"/>
+                <a:cs typeface="Courier New" pitchFamily="49" charset="0"/>
+              </a:rPr>
+              <a:t>process_batch.slurm</a:t>
+            </a:r>
+            <a:endParaRPr lang="en-US" b="1" dirty="0">
+              <a:solidFill>
+                <a:schemeClr val="bg1"/>
+              </a:solidFill>
+              <a:latin typeface="Courier New" pitchFamily="49" charset="0"/>
+              <a:cs typeface="Courier New" pitchFamily="49" charset="0"/>
+            </a:endParaRPr>
+          </a:p>
+        </p:txBody>
+      </p:sp>
+      <p:sp>
+        <p:nvSpPr>
+          <p:cNvPr id="10" name="TextBox 9">
+            <a:extLst>
+              <a:ext uri="{FF2B5EF4-FFF2-40B4-BE49-F238E27FC236}">
+                <a16:creationId xmlns:a16="http://schemas.microsoft.com/office/drawing/2014/main" id="{69F87B50-FF6B-D700-EC8E-CFCD8714EB33}"/>
+              </a:ext>
+            </a:extLst>
+          </p:cNvPr>
+          <p:cNvSpPr txBox="1"/>
+          <p:nvPr/>
+        </p:nvSpPr>
+        <p:spPr>
+          <a:xfrm>
+            <a:off x="5441971" y="6183711"/>
+            <a:ext cx="4572085" cy="369332"/>
+          </a:xfrm>
+          <a:prstGeom prst="rect">
+            <a:avLst/>
+          </a:prstGeom>
+          <a:noFill/>
+          <a:ln>
+            <a:solidFill>
+              <a:schemeClr val="tx1"/>
+            </a:solidFill>
+          </a:ln>
+        </p:spPr>
+        <p:txBody>
+          <a:bodyPr wrap="none" rtlCol="0">
+            <a:spAutoFit/>
+          </a:bodyPr>
+          <a:lstStyle/>
+          <a:p>
+            <a:r>
+              <a:rPr lang="en-US" b="1" dirty="0">
+                <a:solidFill>
+                  <a:srgbClr val="00B0F0"/>
+                </a:solidFill>
+                <a:latin typeface="Courier New" panose="02070309020205020404" pitchFamily="49" charset="0"/>
+                <a:cs typeface="Courier New" panose="02070309020205020404" pitchFamily="49" charset="0"/>
+              </a:rPr>
+              <a:t>SLURM_ARRAY_TASK_ID</a:t>
+            </a:r>
+            <a:r>
+              <a:rPr lang="en-US" dirty="0"/>
+              <a:t> </a:t>
+            </a:r>
+            <a:r>
+              <a:rPr lang="en-US" dirty="0">
+                <a:sym typeface="Symbol" panose="05050102010706020507" pitchFamily="18" charset="2"/>
+              </a:rPr>
+              <a:t></a:t>
+            </a:r>
+            <a:r>
+              <a:rPr lang="en-US" dirty="0"/>
+              <a:t> 1, 51, 101, 151</a:t>
+            </a:r>
+            <a:endParaRPr lang="LID4096" dirty="0"/>
+          </a:p>
+        </p:txBody>
+      </p:sp>
+      <p:sp>
+        <p:nvSpPr>
+          <p:cNvPr id="11" name="TextBox 10">
+            <a:extLst>
+              <a:ext uri="{FF2B5EF4-FFF2-40B4-BE49-F238E27FC236}">
+                <a16:creationId xmlns:a16="http://schemas.microsoft.com/office/drawing/2014/main" id="{F765A21B-63B7-5EC5-BCD9-5FB44ED54E3A}"/>
+              </a:ext>
+            </a:extLst>
+          </p:cNvPr>
+          <p:cNvSpPr txBox="1"/>
+          <p:nvPr/>
+        </p:nvSpPr>
+        <p:spPr>
+          <a:xfrm>
+            <a:off x="1026836" y="6189576"/>
+            <a:ext cx="3680816" cy="369332"/>
+          </a:xfrm>
+          <a:prstGeom prst="rect">
+            <a:avLst/>
+          </a:prstGeom>
+          <a:noFill/>
+          <a:ln>
+            <a:solidFill>
+              <a:schemeClr val="tx1"/>
+            </a:solidFill>
+          </a:ln>
+        </p:spPr>
+        <p:txBody>
+          <a:bodyPr wrap="none" rtlCol="0">
+            <a:spAutoFit/>
+          </a:bodyPr>
+          <a:lstStyle/>
+          <a:p>
+            <a:r>
+              <a:rPr lang="fr-BE" i="0" dirty="0">
+                <a:solidFill>
+                  <a:srgbClr val="46545C"/>
+                </a:solidFill>
+                <a:effectLst/>
+                <a:latin typeface="Courier New" panose="02070309020205020404" pitchFamily="49" charset="0"/>
+                <a:cs typeface="Courier New" panose="02070309020205020404" pitchFamily="49" charset="0"/>
+              </a:rPr>
+              <a:t>SLURM_ARRAY_TASK_COUNT</a:t>
+            </a:r>
+            <a:r>
+              <a:rPr lang="en-US" dirty="0"/>
+              <a:t> </a:t>
+            </a:r>
+            <a:r>
+              <a:rPr lang="en-US" dirty="0">
+                <a:sym typeface="Symbol" panose="05050102010706020507" pitchFamily="18" charset="2"/>
+              </a:rPr>
+              <a:t>== 4</a:t>
+            </a:r>
+            <a:endParaRPr lang="LID4096" dirty="0"/>
+          </a:p>
+        </p:txBody>
+      </p:sp>
+      <p:grpSp>
+        <p:nvGrpSpPr>
+          <p:cNvPr id="12" name="Group 11">
+            <a:extLst>
+              <a:ext uri="{FF2B5EF4-FFF2-40B4-BE49-F238E27FC236}">
+                <a16:creationId xmlns:a16="http://schemas.microsoft.com/office/drawing/2014/main" id="{21917416-9F95-84AB-01EA-85C3C507E2BA}"/>
+              </a:ext>
+            </a:extLst>
+          </p:cNvPr>
+          <p:cNvGrpSpPr/>
+          <p:nvPr/>
+        </p:nvGrpSpPr>
+        <p:grpSpPr>
+          <a:xfrm>
+            <a:off x="5441971" y="880106"/>
+            <a:ext cx="4949070" cy="976646"/>
+            <a:chOff x="7272985" y="3505591"/>
+            <a:chExt cx="4949070" cy="976646"/>
+          </a:xfrm>
+        </p:grpSpPr>
+        <p:cxnSp>
+          <p:nvCxnSpPr>
+            <p:cNvPr id="13" name="Straight Arrow Connector 12">
+              <a:extLst>
+                <a:ext uri="{FF2B5EF4-FFF2-40B4-BE49-F238E27FC236}">
+                  <a16:creationId xmlns:a16="http://schemas.microsoft.com/office/drawing/2014/main" id="{5C0C365B-8520-10FA-AFBE-68BE0B8CA3CA}"/>
+                </a:ext>
+              </a:extLst>
+            </p:cNvPr>
+            <p:cNvCxnSpPr>
+              <a:cxnSpLocks/>
+              <a:stCxn id="14" idx="1"/>
+            </p:cNvCxnSpPr>
+            <p:nvPr/>
+          </p:nvCxnSpPr>
+          <p:spPr>
+            <a:xfrm flipH="1">
+              <a:off x="7272985" y="3736424"/>
+              <a:ext cx="1096862" cy="745813"/>
+            </a:xfrm>
+            <a:prstGeom prst="straightConnector1">
+              <a:avLst/>
+            </a:prstGeom>
+            <a:ln w="28575">
+              <a:solidFill>
+                <a:schemeClr val="tx1"/>
+              </a:solidFill>
+              <a:tailEnd type="stealth" w="lg" len="lg"/>
+            </a:ln>
+          </p:spPr>
+          <p:style>
+            <a:lnRef idx="2">
+              <a:schemeClr val="accent1"/>
+            </a:lnRef>
+            <a:fillRef idx="0">
+              <a:schemeClr val="accent1"/>
+            </a:fillRef>
+            <a:effectRef idx="1">
+              <a:schemeClr val="accent1"/>
+            </a:effectRef>
+            <a:fontRef idx="minor">
+              <a:schemeClr val="tx1"/>
+            </a:fontRef>
+          </p:style>
+        </p:cxnSp>
+        <p:sp>
+          <p:nvSpPr>
+            <p:cNvPr id="14" name="TextBox 13">
+              <a:extLst>
+                <a:ext uri="{FF2B5EF4-FFF2-40B4-BE49-F238E27FC236}">
+                  <a16:creationId xmlns:a16="http://schemas.microsoft.com/office/drawing/2014/main" id="{75AC5AC8-7D8D-A473-AA73-839F5CD8073C}"/>
+                </a:ext>
+              </a:extLst>
+            </p:cNvPr>
+            <p:cNvSpPr txBox="1"/>
+            <p:nvPr/>
+          </p:nvSpPr>
+          <p:spPr>
+            <a:xfrm>
+              <a:off x="8369847" y="3505591"/>
+              <a:ext cx="3852208" cy="461665"/>
+            </a:xfrm>
+            <a:prstGeom prst="rect">
+              <a:avLst/>
+            </a:prstGeom>
+            <a:noFill/>
+            <a:ln>
+              <a:solidFill>
+                <a:schemeClr val="tx1"/>
+              </a:solidFill>
+            </a:ln>
+          </p:spPr>
+          <p:txBody>
+            <a:bodyPr wrap="none" rtlCol="0">
+              <a:spAutoFit/>
+            </a:bodyPr>
+            <a:lstStyle/>
+            <a:p>
+              <a:pPr algn="ctr"/>
+              <a:r>
+                <a:rPr lang="en-US" sz="2400" dirty="0"/>
+                <a:t>Resources for individual job</a:t>
+              </a:r>
+              <a:endParaRPr lang="LID4096" sz="2400" dirty="0"/>
+            </a:p>
+          </p:txBody>
+        </p:sp>
+      </p:grpSp>
+    </p:spTree>
+    <p:extLst>
+      <p:ext uri="{BB962C8B-B14F-4D97-AF65-F5344CB8AC3E}">
+        <p14:creationId xmlns:p14="http://schemas.microsoft.com/office/powerpoint/2010/main" val="919326678"/>
+      </p:ext>
+    </p:extLst>
+  </p:cSld>
+  <p:clrMapOvr>
+    <a:masterClrMapping/>
+  </p:clrMapOvr>
+  <p:timing>
+    <p:tnLst>
+      <p:par>
+        <p:cTn id="1" dur="indefinite" restart="never" nodeType="tmRoot">
+          <p:childTnLst>
+            <p:seq concurrent="1" nextAc="seek">
+              <p:cTn id="2" dur="indefinite" nodeType="mainSeq">
+                <p:childTnLst>
+                  <p:par>
+                    <p:cTn id="3" fill="hold">
+                      <p:stCondLst>
+                        <p:cond delay="indefinite"/>
+                        <p:cond evt="onBegin" delay="0">
+                          <p:tn val="2"/>
+                        </p:cond>
+                      </p:stCondLst>
+                      <p:childTnLst>
+                        <p:par>
+                          <p:cTn id="4" fill="hold">
+                            <p:stCondLst>
+                              <p:cond delay="0"/>
+                            </p:stCondLst>
+                            <p:childTnLst>
+                              <p:par>
+                                <p:cTn id="5" presetID="1" presetClass="entr" presetSubtype="0" fill="hold" grpId="0" nodeType="withEffect">
+                                  <p:stCondLst>
+                                    <p:cond delay="0"/>
+                                  </p:stCondLst>
+                                  <p:childTnLst>
+                                    <p:set>
+                                      <p:cBhvr>
+                                        <p:cTn id="6" dur="1" fill="hold">
+                                          <p:stCondLst>
+                                            <p:cond delay="0"/>
+                                          </p:stCondLst>
+                                        </p:cTn>
+                                        <p:tgtEl>
+                                          <p:spTgt spid="9"/>
+                                        </p:tgtEl>
+                                        <p:attrNameLst>
+                                          <p:attrName>style.visibility</p:attrName>
+                                        </p:attrNameLst>
+                                      </p:cBhvr>
+                                      <p:to>
+                                        <p:strVal val="visible"/>
+                                      </p:to>
+                                    </p:set>
+                                  </p:childTnLst>
+                                </p:cTn>
+                              </p:par>
+                            </p:childTnLst>
+                          </p:cTn>
+                        </p:par>
+                      </p:childTnLst>
+                    </p:cTn>
+                  </p:par>
+                </p:childTnLst>
+              </p:cTn>
+              <p:prevCondLst>
+                <p:cond evt="onPrev" delay="0">
+                  <p:tgtEl>
+                    <p:sldTgt/>
+                  </p:tgtEl>
+                </p:cond>
+              </p:prevCondLst>
+              <p:nextCondLst>
+                <p:cond evt="onNext" delay="0">
+                  <p:tgtEl>
+                    <p:sldTgt/>
+                  </p:tgtEl>
+                </p:cond>
+              </p:nextCondLst>
+            </p:seq>
+          </p:childTnLst>
+        </p:cTn>
+      </p:par>
+    </p:tnLst>
+    <p:bldLst>
+      <p:bldP spid="9" grpId="0" animBg="1"/>
+    </p:bldLst>
+  </p:timing>
+</p:sld>
+</file>
+
 <file path=ppt/slides/slide3.xml><?xml version="1.0" encoding="utf-8"?>
 <p:sld xmlns:a="http://schemas.openxmlformats.org/drawingml/2006/main" xmlns:r="http://schemas.openxmlformats.org/officeDocument/2006/relationships" xmlns:p="http://schemas.openxmlformats.org/presentationml/2006/main">
   <p:cSld>

</xml_diff>

<commit_message>
Add slide on maximum job array size
</commit_message>
<xml_diff>
--- a/workflow_for_HPC.pptx
+++ b/workflow_for_HPC.pptx
@@ -5,7 +5,7 @@
     <p:sldMasterId id="2147483648" r:id="rId1"/>
   </p:sldMasterIdLst>
   <p:notesMasterIdLst>
-    <p:notesMasterId r:id="rId30"/>
+    <p:notesMasterId r:id="rId33"/>
   </p:notesMasterIdLst>
   <p:sldIdLst>
     <p:sldId id="257" r:id="rId2"/>
@@ -36,6 +36,9 @@
     <p:sldId id="379" r:id="rId27"/>
     <p:sldId id="380" r:id="rId28"/>
     <p:sldId id="381" r:id="rId29"/>
+    <p:sldId id="382" r:id="rId30"/>
+    <p:sldId id="383" r:id="rId31"/>
+    <p:sldId id="384" r:id="rId32"/>
   </p:sldIdLst>
   <p:sldSz cx="12192000" cy="6858000"/>
   <p:notesSz cx="6858000" cy="9144000"/>
@@ -18072,6 +18075,2258 @@
 </p:sld>
 </file>
 
+<file path=ppt/slides/slide29.xml><?xml version="1.0" encoding="utf-8"?>
+<p:sld xmlns:a="http://schemas.openxmlformats.org/drawingml/2006/main" xmlns:r="http://schemas.openxmlformats.org/officeDocument/2006/relationships" xmlns:p="http://schemas.openxmlformats.org/presentationml/2006/main">
+  <p:cSld>
+    <p:spTree>
+      <p:nvGrpSpPr>
+        <p:cNvPr id="1" name=""/>
+        <p:cNvGrpSpPr/>
+        <p:nvPr/>
+      </p:nvGrpSpPr>
+      <p:grpSpPr>
+        <a:xfrm>
+          <a:off x="0" y="0"/>
+          <a:ext cx="0" cy="0"/>
+          <a:chOff x="0" y="0"/>
+          <a:chExt cx="0" cy="0"/>
+        </a:xfrm>
+      </p:grpSpPr>
+      <p:sp>
+        <p:nvSpPr>
+          <p:cNvPr id="2" name="Title 1">
+            <a:extLst>
+              <a:ext uri="{FF2B5EF4-FFF2-40B4-BE49-F238E27FC236}">
+                <a16:creationId xmlns:a16="http://schemas.microsoft.com/office/drawing/2014/main" id="{C605E367-26F5-7EE2-573C-F9A9A1848EE3}"/>
+              </a:ext>
+            </a:extLst>
+          </p:cNvPr>
+          <p:cNvSpPr>
+            <a:spLocks noGrp="1"/>
+          </p:cNvSpPr>
+          <p:nvPr>
+            <p:ph type="title"/>
+          </p:nvPr>
+        </p:nvSpPr>
+        <p:spPr/>
+        <p:txBody>
+          <a:bodyPr/>
+          <a:lstStyle/>
+          <a:p>
+            <a:r>
+              <a:rPr lang="en-US" dirty="0"/>
+              <a:t>Job array execution</a:t>
+            </a:r>
+            <a:endParaRPr lang="LID4096" dirty="0"/>
+          </a:p>
+        </p:txBody>
+      </p:sp>
+      <p:sp>
+        <p:nvSpPr>
+          <p:cNvPr id="3" name="Slide Number Placeholder 2">
+            <a:extLst>
+              <a:ext uri="{FF2B5EF4-FFF2-40B4-BE49-F238E27FC236}">
+                <a16:creationId xmlns:a16="http://schemas.microsoft.com/office/drawing/2014/main" id="{7987E356-676F-4AF3-F251-C05FE5F2512D}"/>
+              </a:ext>
+            </a:extLst>
+          </p:cNvPr>
+          <p:cNvSpPr>
+            <a:spLocks noGrp="1"/>
+          </p:cNvSpPr>
+          <p:nvPr>
+            <p:ph type="sldNum" sz="quarter" idx="12"/>
+          </p:nvPr>
+        </p:nvSpPr>
+        <p:spPr/>
+        <p:txBody>
+          <a:bodyPr/>
+          <a:lstStyle/>
+          <a:p>
+            <a:fld id="{9C7CE217-4467-4B8D-A735-B008FA7C4816}" type="slidenum">
+              <a:rPr lang="LID4096" smtClean="0"/>
+              <a:t>29</a:t>
+            </a:fld>
+            <a:endParaRPr lang="LID4096"/>
+          </a:p>
+        </p:txBody>
+      </p:sp>
+      <p:grpSp>
+        <p:nvGrpSpPr>
+          <p:cNvPr id="25" name="Group 24">
+            <a:extLst>
+              <a:ext uri="{FF2B5EF4-FFF2-40B4-BE49-F238E27FC236}">
+                <a16:creationId xmlns:a16="http://schemas.microsoft.com/office/drawing/2014/main" id="{3EE07462-A83C-8CFC-2E3B-82D0655C232E}"/>
+              </a:ext>
+            </a:extLst>
+          </p:cNvPr>
+          <p:cNvGrpSpPr/>
+          <p:nvPr/>
+        </p:nvGrpSpPr>
+        <p:grpSpPr>
+          <a:xfrm>
+            <a:off x="954123" y="1657638"/>
+            <a:ext cx="2990306" cy="1197431"/>
+            <a:chOff x="529580" y="1875354"/>
+            <a:chExt cx="2990306" cy="1197431"/>
+          </a:xfrm>
+        </p:grpSpPr>
+        <p:grpSp>
+          <p:nvGrpSpPr>
+            <p:cNvPr id="7" name="Group 6">
+              <a:extLst>
+                <a:ext uri="{FF2B5EF4-FFF2-40B4-BE49-F238E27FC236}">
+                  <a16:creationId xmlns:a16="http://schemas.microsoft.com/office/drawing/2014/main" id="{E6BAF67E-A88E-CFDD-F25D-29134D5119FB}"/>
+                </a:ext>
+              </a:extLst>
+            </p:cNvPr>
+            <p:cNvGrpSpPr/>
+            <p:nvPr/>
+          </p:nvGrpSpPr>
+          <p:grpSpPr>
+            <a:xfrm>
+              <a:off x="529580" y="1875354"/>
+              <a:ext cx="1495153" cy="1197431"/>
+              <a:chOff x="529580" y="1875354"/>
+              <a:chExt cx="1495153" cy="1197431"/>
+            </a:xfrm>
+          </p:grpSpPr>
+          <p:sp>
+            <p:nvSpPr>
+              <p:cNvPr id="8" name="Rectangle: Folded Corner 7">
+                <a:extLst>
+                  <a:ext uri="{FF2B5EF4-FFF2-40B4-BE49-F238E27FC236}">
+                    <a16:creationId xmlns:a16="http://schemas.microsoft.com/office/drawing/2014/main" id="{43E7E5C0-6531-193A-103F-E8B6A2352BDE}"/>
+                  </a:ext>
+                </a:extLst>
+              </p:cNvPr>
+              <p:cNvSpPr/>
+              <p:nvPr/>
+            </p:nvSpPr>
+            <p:spPr>
+              <a:xfrm>
+                <a:off x="994128" y="2278128"/>
+                <a:ext cx="566057" cy="794657"/>
+              </a:xfrm>
+              <a:prstGeom prst="foldedCorner">
+                <a:avLst/>
+              </a:prstGeom>
+              <a:solidFill>
+                <a:schemeClr val="bg1"/>
+              </a:solidFill>
+            </p:spPr>
+            <p:style>
+              <a:lnRef idx="2">
+                <a:schemeClr val="accent1">
+                  <a:shade val="15000"/>
+                </a:schemeClr>
+              </a:lnRef>
+              <a:fillRef idx="1">
+                <a:schemeClr val="accent1"/>
+              </a:fillRef>
+              <a:effectRef idx="0">
+                <a:schemeClr val="accent1"/>
+              </a:effectRef>
+              <a:fontRef idx="minor">
+                <a:schemeClr val="lt1"/>
+              </a:fontRef>
+            </p:style>
+            <p:txBody>
+              <a:bodyPr rtlCol="0" anchor="ctr"/>
+              <a:lstStyle/>
+              <a:p>
+                <a:pPr algn="ctr"/>
+                <a:endParaRPr lang="LID4096"/>
+              </a:p>
+            </p:txBody>
+          </p:sp>
+          <p:sp>
+            <p:nvSpPr>
+              <p:cNvPr id="9" name="TextBox 8">
+                <a:extLst>
+                  <a:ext uri="{FF2B5EF4-FFF2-40B4-BE49-F238E27FC236}">
+                    <a16:creationId xmlns:a16="http://schemas.microsoft.com/office/drawing/2014/main" id="{392D3D4A-B9EE-C0FA-4800-FDDB7B3E794B}"/>
+                  </a:ext>
+                </a:extLst>
+              </p:cNvPr>
+              <p:cNvSpPr txBox="1"/>
+              <p:nvPr/>
+            </p:nvSpPr>
+            <p:spPr>
+              <a:xfrm>
+                <a:off x="529580" y="1875354"/>
+                <a:ext cx="1495153" cy="369332"/>
+              </a:xfrm>
+              <a:prstGeom prst="rect">
+                <a:avLst/>
+              </a:prstGeom>
+              <a:solidFill>
+                <a:schemeClr val="bg1"/>
+              </a:solidFill>
+            </p:spPr>
+            <p:txBody>
+              <a:bodyPr wrap="none" rtlCol="0">
+                <a:spAutoFit/>
+              </a:bodyPr>
+              <a:lstStyle/>
+              <a:p>
+                <a:r>
+                  <a:rPr lang="en-US" dirty="0"/>
+                  <a:t>data_001.dat</a:t>
+                </a:r>
+                <a:endParaRPr lang="LID4096" dirty="0"/>
+              </a:p>
+            </p:txBody>
+          </p:sp>
+        </p:grpSp>
+        <p:grpSp>
+          <p:nvGrpSpPr>
+            <p:cNvPr id="10" name="Group 9">
+              <a:extLst>
+                <a:ext uri="{FF2B5EF4-FFF2-40B4-BE49-F238E27FC236}">
+                  <a16:creationId xmlns:a16="http://schemas.microsoft.com/office/drawing/2014/main" id="{75EFF5CC-62BE-3603-78AC-E6C20335CFE3}"/>
+                </a:ext>
+              </a:extLst>
+            </p:cNvPr>
+            <p:cNvGrpSpPr/>
+            <p:nvPr/>
+          </p:nvGrpSpPr>
+          <p:grpSpPr>
+            <a:xfrm>
+              <a:off x="2024733" y="1875354"/>
+              <a:ext cx="1495153" cy="1197431"/>
+              <a:chOff x="529580" y="1875354"/>
+              <a:chExt cx="1495153" cy="1197431"/>
+            </a:xfrm>
+          </p:grpSpPr>
+          <p:sp>
+            <p:nvSpPr>
+              <p:cNvPr id="11" name="Rectangle: Folded Corner 10">
+                <a:extLst>
+                  <a:ext uri="{FF2B5EF4-FFF2-40B4-BE49-F238E27FC236}">
+                    <a16:creationId xmlns:a16="http://schemas.microsoft.com/office/drawing/2014/main" id="{76E6A6FF-9AFC-9923-FD6F-C366E137B010}"/>
+                  </a:ext>
+                </a:extLst>
+              </p:cNvPr>
+              <p:cNvSpPr/>
+              <p:nvPr/>
+            </p:nvSpPr>
+            <p:spPr>
+              <a:xfrm>
+                <a:off x="994128" y="2278128"/>
+                <a:ext cx="566057" cy="794657"/>
+              </a:xfrm>
+              <a:prstGeom prst="foldedCorner">
+                <a:avLst/>
+              </a:prstGeom>
+              <a:solidFill>
+                <a:schemeClr val="bg1"/>
+              </a:solidFill>
+            </p:spPr>
+            <p:style>
+              <a:lnRef idx="2">
+                <a:schemeClr val="accent1">
+                  <a:shade val="15000"/>
+                </a:schemeClr>
+              </a:lnRef>
+              <a:fillRef idx="1">
+                <a:schemeClr val="accent1"/>
+              </a:fillRef>
+              <a:effectRef idx="0">
+                <a:schemeClr val="accent1"/>
+              </a:effectRef>
+              <a:fontRef idx="minor">
+                <a:schemeClr val="lt1"/>
+              </a:fontRef>
+            </p:style>
+            <p:txBody>
+              <a:bodyPr rtlCol="0" anchor="ctr"/>
+              <a:lstStyle/>
+              <a:p>
+                <a:pPr algn="ctr"/>
+                <a:endParaRPr lang="LID4096"/>
+              </a:p>
+            </p:txBody>
+          </p:sp>
+          <p:sp>
+            <p:nvSpPr>
+              <p:cNvPr id="12" name="TextBox 11">
+                <a:extLst>
+                  <a:ext uri="{FF2B5EF4-FFF2-40B4-BE49-F238E27FC236}">
+                    <a16:creationId xmlns:a16="http://schemas.microsoft.com/office/drawing/2014/main" id="{0A0E4ABD-67F7-91EB-9A05-EC577B3232F0}"/>
+                  </a:ext>
+                </a:extLst>
+              </p:cNvPr>
+              <p:cNvSpPr txBox="1"/>
+              <p:nvPr/>
+            </p:nvSpPr>
+            <p:spPr>
+              <a:xfrm>
+                <a:off x="529580" y="1875354"/>
+                <a:ext cx="1495153" cy="369332"/>
+              </a:xfrm>
+              <a:prstGeom prst="rect">
+                <a:avLst/>
+              </a:prstGeom>
+              <a:solidFill>
+                <a:schemeClr val="bg1"/>
+              </a:solidFill>
+            </p:spPr>
+            <p:txBody>
+              <a:bodyPr wrap="none" rtlCol="0">
+                <a:spAutoFit/>
+              </a:bodyPr>
+              <a:lstStyle/>
+              <a:p>
+                <a:r>
+                  <a:rPr lang="en-US" dirty="0"/>
+                  <a:t>data_050.dat</a:t>
+                </a:r>
+                <a:endParaRPr lang="LID4096" dirty="0"/>
+              </a:p>
+            </p:txBody>
+          </p:sp>
+        </p:grpSp>
+        <p:sp>
+          <p:nvSpPr>
+            <p:cNvPr id="13" name="TextBox 12">
+              <a:extLst>
+                <a:ext uri="{FF2B5EF4-FFF2-40B4-BE49-F238E27FC236}">
+                  <a16:creationId xmlns:a16="http://schemas.microsoft.com/office/drawing/2014/main" id="{10CACF18-FE02-C31F-F8D3-3B7C88FD2F5E}"/>
+                </a:ext>
+              </a:extLst>
+            </p:cNvPr>
+            <p:cNvSpPr txBox="1"/>
+            <p:nvPr/>
+          </p:nvSpPr>
+          <p:spPr>
+            <a:xfrm>
+              <a:off x="1826408" y="2345904"/>
+              <a:ext cx="506870" cy="523220"/>
+            </a:xfrm>
+            <a:prstGeom prst="rect">
+              <a:avLst/>
+            </a:prstGeom>
+            <a:noFill/>
+          </p:spPr>
+          <p:txBody>
+            <a:bodyPr wrap="none" rtlCol="0">
+              <a:spAutoFit/>
+            </a:bodyPr>
+            <a:lstStyle/>
+            <a:p>
+              <a:r>
+                <a:rPr lang="en-US" sz="2800" b="1" dirty="0"/>
+                <a:t>...</a:t>
+              </a:r>
+              <a:endParaRPr lang="LID4096" sz="2800" b="1" dirty="0"/>
+            </a:p>
+          </p:txBody>
+        </p:sp>
+      </p:grpSp>
+      <p:sp>
+        <p:nvSpPr>
+          <p:cNvPr id="14" name="Rectangle: Rounded Corners 13">
+            <a:extLst>
+              <a:ext uri="{FF2B5EF4-FFF2-40B4-BE49-F238E27FC236}">
+                <a16:creationId xmlns:a16="http://schemas.microsoft.com/office/drawing/2014/main" id="{268A45E0-1797-0BB5-61AE-A4AD2CC4A057}"/>
+              </a:ext>
+            </a:extLst>
+          </p:cNvPr>
+          <p:cNvSpPr/>
+          <p:nvPr/>
+        </p:nvSpPr>
+        <p:spPr>
+          <a:xfrm>
+            <a:off x="1375126" y="3291837"/>
+            <a:ext cx="2061201" cy="523220"/>
+          </a:xfrm>
+          <a:prstGeom prst="roundRect">
+            <a:avLst/>
+          </a:prstGeom>
+        </p:spPr>
+        <p:style>
+          <a:lnRef idx="2">
+            <a:schemeClr val="accent1">
+              <a:shade val="15000"/>
+            </a:schemeClr>
+          </a:lnRef>
+          <a:fillRef idx="1">
+            <a:schemeClr val="accent1"/>
+          </a:fillRef>
+          <a:effectRef idx="0">
+            <a:schemeClr val="accent1"/>
+          </a:effectRef>
+          <a:fontRef idx="minor">
+            <a:schemeClr val="lt1"/>
+          </a:fontRef>
+        </p:style>
+        <p:txBody>
+          <a:bodyPr rtlCol="0" anchor="ctr"/>
+          <a:lstStyle/>
+          <a:p>
+            <a:pPr algn="ctr"/>
+            <a:r>
+              <a:rPr lang="en-US" dirty="0"/>
+              <a:t>Job 523_1</a:t>
+            </a:r>
+            <a:endParaRPr lang="LID4096" dirty="0"/>
+          </a:p>
+        </p:txBody>
+      </p:sp>
+      <p:grpSp>
+        <p:nvGrpSpPr>
+          <p:cNvPr id="26" name="Group 25">
+            <a:extLst>
+              <a:ext uri="{FF2B5EF4-FFF2-40B4-BE49-F238E27FC236}">
+                <a16:creationId xmlns:a16="http://schemas.microsoft.com/office/drawing/2014/main" id="{51D9852C-B211-DD2E-C44C-1CEADF594419}"/>
+              </a:ext>
+            </a:extLst>
+          </p:cNvPr>
+          <p:cNvGrpSpPr/>
+          <p:nvPr/>
+        </p:nvGrpSpPr>
+        <p:grpSpPr>
+          <a:xfrm>
+            <a:off x="954123" y="3047998"/>
+            <a:ext cx="3035831" cy="2487083"/>
+            <a:chOff x="529580" y="3265714"/>
+            <a:chExt cx="3035831" cy="2487083"/>
+          </a:xfrm>
+        </p:grpSpPr>
+        <p:grpSp>
+          <p:nvGrpSpPr>
+            <p:cNvPr id="15" name="Group 14">
+              <a:extLst>
+                <a:ext uri="{FF2B5EF4-FFF2-40B4-BE49-F238E27FC236}">
+                  <a16:creationId xmlns:a16="http://schemas.microsoft.com/office/drawing/2014/main" id="{384B1F06-B378-46A8-1E21-53245AA21008}"/>
+                </a:ext>
+              </a:extLst>
+            </p:cNvPr>
+            <p:cNvGrpSpPr/>
+            <p:nvPr/>
+          </p:nvGrpSpPr>
+          <p:grpSpPr>
+            <a:xfrm>
+              <a:off x="529580" y="4555366"/>
+              <a:ext cx="1540678" cy="1197431"/>
+              <a:chOff x="529580" y="1875354"/>
+              <a:chExt cx="1540678" cy="1197431"/>
+            </a:xfrm>
+          </p:grpSpPr>
+          <p:sp>
+            <p:nvSpPr>
+              <p:cNvPr id="16" name="Rectangle: Folded Corner 15">
+                <a:extLst>
+                  <a:ext uri="{FF2B5EF4-FFF2-40B4-BE49-F238E27FC236}">
+                    <a16:creationId xmlns:a16="http://schemas.microsoft.com/office/drawing/2014/main" id="{C1D78D9C-B11D-6732-391E-2665A8646F46}"/>
+                  </a:ext>
+                </a:extLst>
+              </p:cNvPr>
+              <p:cNvSpPr/>
+              <p:nvPr/>
+            </p:nvSpPr>
+            <p:spPr>
+              <a:xfrm>
+                <a:off x="994128" y="2278128"/>
+                <a:ext cx="566057" cy="794657"/>
+              </a:xfrm>
+              <a:prstGeom prst="foldedCorner">
+                <a:avLst/>
+              </a:prstGeom>
+              <a:solidFill>
+                <a:schemeClr val="bg1"/>
+              </a:solidFill>
+            </p:spPr>
+            <p:style>
+              <a:lnRef idx="2">
+                <a:schemeClr val="accent1">
+                  <a:shade val="15000"/>
+                </a:schemeClr>
+              </a:lnRef>
+              <a:fillRef idx="1">
+                <a:schemeClr val="accent1"/>
+              </a:fillRef>
+              <a:effectRef idx="0">
+                <a:schemeClr val="accent1"/>
+              </a:effectRef>
+              <a:fontRef idx="minor">
+                <a:schemeClr val="lt1"/>
+              </a:fontRef>
+            </p:style>
+            <p:txBody>
+              <a:bodyPr rtlCol="0" anchor="ctr"/>
+              <a:lstStyle/>
+              <a:p>
+                <a:pPr algn="ctr"/>
+                <a:endParaRPr lang="LID4096"/>
+              </a:p>
+            </p:txBody>
+          </p:sp>
+          <p:sp>
+            <p:nvSpPr>
+              <p:cNvPr id="17" name="TextBox 16">
+                <a:extLst>
+                  <a:ext uri="{FF2B5EF4-FFF2-40B4-BE49-F238E27FC236}">
+                    <a16:creationId xmlns:a16="http://schemas.microsoft.com/office/drawing/2014/main" id="{4EE10072-BF85-E7F0-8406-CB47D5AB2E04}"/>
+                  </a:ext>
+                </a:extLst>
+              </p:cNvPr>
+              <p:cNvSpPr txBox="1"/>
+              <p:nvPr/>
+            </p:nvSpPr>
+            <p:spPr>
+              <a:xfrm>
+                <a:off x="529580" y="1875354"/>
+                <a:ext cx="1540678" cy="369332"/>
+              </a:xfrm>
+              <a:prstGeom prst="rect">
+                <a:avLst/>
+              </a:prstGeom>
+              <a:solidFill>
+                <a:schemeClr val="bg1"/>
+              </a:solidFill>
+            </p:spPr>
+            <p:txBody>
+              <a:bodyPr wrap="none" rtlCol="0">
+                <a:spAutoFit/>
+              </a:bodyPr>
+              <a:lstStyle/>
+              <a:p>
+                <a:r>
+                  <a:rPr lang="en-US" dirty="0"/>
+                  <a:t>result_001.txt</a:t>
+                </a:r>
+                <a:endParaRPr lang="LID4096" dirty="0"/>
+              </a:p>
+            </p:txBody>
+          </p:sp>
+        </p:grpSp>
+        <p:grpSp>
+          <p:nvGrpSpPr>
+            <p:cNvPr id="18" name="Group 17">
+              <a:extLst>
+                <a:ext uri="{FF2B5EF4-FFF2-40B4-BE49-F238E27FC236}">
+                  <a16:creationId xmlns:a16="http://schemas.microsoft.com/office/drawing/2014/main" id="{95735FA2-CA78-5E05-0F97-FB73FFA55144}"/>
+                </a:ext>
+              </a:extLst>
+            </p:cNvPr>
+            <p:cNvGrpSpPr/>
+            <p:nvPr/>
+          </p:nvGrpSpPr>
+          <p:grpSpPr>
+            <a:xfrm>
+              <a:off x="2024733" y="4555366"/>
+              <a:ext cx="1540678" cy="1197431"/>
+              <a:chOff x="529580" y="1875354"/>
+              <a:chExt cx="1540678" cy="1197431"/>
+            </a:xfrm>
+          </p:grpSpPr>
+          <p:sp>
+            <p:nvSpPr>
+              <p:cNvPr id="19" name="Rectangle: Folded Corner 18">
+                <a:extLst>
+                  <a:ext uri="{FF2B5EF4-FFF2-40B4-BE49-F238E27FC236}">
+                    <a16:creationId xmlns:a16="http://schemas.microsoft.com/office/drawing/2014/main" id="{3B3F20E4-BC6F-05DF-A8C2-68DBE9DCF84B}"/>
+                  </a:ext>
+                </a:extLst>
+              </p:cNvPr>
+              <p:cNvSpPr/>
+              <p:nvPr/>
+            </p:nvSpPr>
+            <p:spPr>
+              <a:xfrm>
+                <a:off x="994128" y="2278128"/>
+                <a:ext cx="566057" cy="794657"/>
+              </a:xfrm>
+              <a:prstGeom prst="foldedCorner">
+                <a:avLst/>
+              </a:prstGeom>
+              <a:solidFill>
+                <a:schemeClr val="bg1"/>
+              </a:solidFill>
+            </p:spPr>
+            <p:style>
+              <a:lnRef idx="2">
+                <a:schemeClr val="accent1">
+                  <a:shade val="15000"/>
+                </a:schemeClr>
+              </a:lnRef>
+              <a:fillRef idx="1">
+                <a:schemeClr val="accent1"/>
+              </a:fillRef>
+              <a:effectRef idx="0">
+                <a:schemeClr val="accent1"/>
+              </a:effectRef>
+              <a:fontRef idx="minor">
+                <a:schemeClr val="lt1"/>
+              </a:fontRef>
+            </p:style>
+            <p:txBody>
+              <a:bodyPr rtlCol="0" anchor="ctr"/>
+              <a:lstStyle/>
+              <a:p>
+                <a:pPr algn="ctr"/>
+                <a:endParaRPr lang="LID4096"/>
+              </a:p>
+            </p:txBody>
+          </p:sp>
+          <p:sp>
+            <p:nvSpPr>
+              <p:cNvPr id="20" name="TextBox 19">
+                <a:extLst>
+                  <a:ext uri="{FF2B5EF4-FFF2-40B4-BE49-F238E27FC236}">
+                    <a16:creationId xmlns:a16="http://schemas.microsoft.com/office/drawing/2014/main" id="{25E2C14E-77EF-D97B-E2DD-BA11C9AED422}"/>
+                  </a:ext>
+                </a:extLst>
+              </p:cNvPr>
+              <p:cNvSpPr txBox="1"/>
+              <p:nvPr/>
+            </p:nvSpPr>
+            <p:spPr>
+              <a:xfrm>
+                <a:off x="529580" y="1875354"/>
+                <a:ext cx="1540678" cy="369332"/>
+              </a:xfrm>
+              <a:prstGeom prst="rect">
+                <a:avLst/>
+              </a:prstGeom>
+              <a:solidFill>
+                <a:schemeClr val="bg1"/>
+              </a:solidFill>
+            </p:spPr>
+            <p:txBody>
+              <a:bodyPr wrap="none" rtlCol="0">
+                <a:spAutoFit/>
+              </a:bodyPr>
+              <a:lstStyle/>
+              <a:p>
+                <a:r>
+                  <a:rPr lang="en-US" dirty="0"/>
+                  <a:t>result_050.txt</a:t>
+                </a:r>
+                <a:endParaRPr lang="LID4096" dirty="0"/>
+              </a:p>
+            </p:txBody>
+          </p:sp>
+        </p:grpSp>
+        <p:sp>
+          <p:nvSpPr>
+            <p:cNvPr id="21" name="TextBox 20">
+              <a:extLst>
+                <a:ext uri="{FF2B5EF4-FFF2-40B4-BE49-F238E27FC236}">
+                  <a16:creationId xmlns:a16="http://schemas.microsoft.com/office/drawing/2014/main" id="{E90A3AFD-613D-2F96-9C65-27ED34785B9D}"/>
+                </a:ext>
+              </a:extLst>
+            </p:cNvPr>
+            <p:cNvSpPr txBox="1"/>
+            <p:nvPr/>
+          </p:nvSpPr>
+          <p:spPr>
+            <a:xfrm>
+              <a:off x="1826408" y="5025916"/>
+              <a:ext cx="506870" cy="523220"/>
+            </a:xfrm>
+            <a:prstGeom prst="rect">
+              <a:avLst/>
+            </a:prstGeom>
+            <a:noFill/>
+          </p:spPr>
+          <p:txBody>
+            <a:bodyPr wrap="none" rtlCol="0">
+              <a:spAutoFit/>
+            </a:bodyPr>
+            <a:lstStyle/>
+            <a:p>
+              <a:r>
+                <a:rPr lang="en-US" sz="2800" b="1" dirty="0"/>
+                <a:t>...</a:t>
+              </a:r>
+              <a:endParaRPr lang="LID4096" sz="2800" b="1" dirty="0"/>
+            </a:p>
+          </p:txBody>
+        </p:sp>
+        <p:cxnSp>
+          <p:nvCxnSpPr>
+            <p:cNvPr id="23" name="Straight Arrow Connector 22">
+              <a:extLst>
+                <a:ext uri="{FF2B5EF4-FFF2-40B4-BE49-F238E27FC236}">
+                  <a16:creationId xmlns:a16="http://schemas.microsoft.com/office/drawing/2014/main" id="{D2CFAA66-5549-9AD3-1D21-F87AA0C1EF86}"/>
+                </a:ext>
+              </a:extLst>
+            </p:cNvPr>
+            <p:cNvCxnSpPr/>
+            <p:nvPr/>
+          </p:nvCxnSpPr>
+          <p:spPr>
+            <a:xfrm>
+              <a:off x="1230076" y="3265714"/>
+              <a:ext cx="0" cy="1164772"/>
+            </a:xfrm>
+            <a:prstGeom prst="straightConnector1">
+              <a:avLst/>
+            </a:prstGeom>
+            <a:ln w="57150">
+              <a:tailEnd type="stealth" w="lg" len="lg"/>
+            </a:ln>
+          </p:spPr>
+          <p:style>
+            <a:lnRef idx="2">
+              <a:schemeClr val="accent1"/>
+            </a:lnRef>
+            <a:fillRef idx="0">
+              <a:schemeClr val="accent1"/>
+            </a:fillRef>
+            <a:effectRef idx="1">
+              <a:schemeClr val="accent1"/>
+            </a:effectRef>
+            <a:fontRef idx="minor">
+              <a:schemeClr val="tx1"/>
+            </a:fontRef>
+          </p:style>
+        </p:cxnSp>
+        <p:cxnSp>
+          <p:nvCxnSpPr>
+            <p:cNvPr id="24" name="Straight Arrow Connector 23">
+              <a:extLst>
+                <a:ext uri="{FF2B5EF4-FFF2-40B4-BE49-F238E27FC236}">
+                  <a16:creationId xmlns:a16="http://schemas.microsoft.com/office/drawing/2014/main" id="{86EE206C-DDB5-E79B-EEA6-2885CF6B930B}"/>
+                </a:ext>
+              </a:extLst>
+            </p:cNvPr>
+            <p:cNvCxnSpPr/>
+            <p:nvPr/>
+          </p:nvCxnSpPr>
+          <p:spPr>
+            <a:xfrm>
+              <a:off x="2699648" y="3265714"/>
+              <a:ext cx="0" cy="1164772"/>
+            </a:xfrm>
+            <a:prstGeom prst="straightConnector1">
+              <a:avLst/>
+            </a:prstGeom>
+            <a:ln w="57150">
+              <a:tailEnd type="stealth" w="lg" len="lg"/>
+            </a:ln>
+          </p:spPr>
+          <p:style>
+            <a:lnRef idx="2">
+              <a:schemeClr val="accent1"/>
+            </a:lnRef>
+            <a:fillRef idx="0">
+              <a:schemeClr val="accent1"/>
+            </a:fillRef>
+            <a:effectRef idx="1">
+              <a:schemeClr val="accent1"/>
+            </a:effectRef>
+            <a:fontRef idx="minor">
+              <a:schemeClr val="tx1"/>
+            </a:fontRef>
+          </p:style>
+        </p:cxnSp>
+      </p:grpSp>
+      <p:grpSp>
+        <p:nvGrpSpPr>
+          <p:cNvPr id="27" name="Group 26">
+            <a:extLst>
+              <a:ext uri="{FF2B5EF4-FFF2-40B4-BE49-F238E27FC236}">
+                <a16:creationId xmlns:a16="http://schemas.microsoft.com/office/drawing/2014/main" id="{D382125C-2A04-912A-6A63-E73DCFF23170}"/>
+              </a:ext>
+            </a:extLst>
+          </p:cNvPr>
+          <p:cNvGrpSpPr/>
+          <p:nvPr/>
+        </p:nvGrpSpPr>
+        <p:grpSpPr>
+          <a:xfrm>
+            <a:off x="4252974" y="1657638"/>
+            <a:ext cx="2990306" cy="1197431"/>
+            <a:chOff x="529580" y="1875354"/>
+            <a:chExt cx="2990306" cy="1197431"/>
+          </a:xfrm>
+        </p:grpSpPr>
+        <p:grpSp>
+          <p:nvGrpSpPr>
+            <p:cNvPr id="28" name="Group 27">
+              <a:extLst>
+                <a:ext uri="{FF2B5EF4-FFF2-40B4-BE49-F238E27FC236}">
+                  <a16:creationId xmlns:a16="http://schemas.microsoft.com/office/drawing/2014/main" id="{9A4F83FC-94E7-B035-8C49-5B69D122E778}"/>
+                </a:ext>
+              </a:extLst>
+            </p:cNvPr>
+            <p:cNvGrpSpPr/>
+            <p:nvPr/>
+          </p:nvGrpSpPr>
+          <p:grpSpPr>
+            <a:xfrm>
+              <a:off x="529580" y="1875354"/>
+              <a:ext cx="1495153" cy="1197431"/>
+              <a:chOff x="529580" y="1875354"/>
+              <a:chExt cx="1495153" cy="1197431"/>
+            </a:xfrm>
+          </p:grpSpPr>
+          <p:sp>
+            <p:nvSpPr>
+              <p:cNvPr id="33" name="Rectangle: Folded Corner 32">
+                <a:extLst>
+                  <a:ext uri="{FF2B5EF4-FFF2-40B4-BE49-F238E27FC236}">
+                    <a16:creationId xmlns:a16="http://schemas.microsoft.com/office/drawing/2014/main" id="{B5895856-D660-91EA-F456-5CBFF5397C65}"/>
+                  </a:ext>
+                </a:extLst>
+              </p:cNvPr>
+              <p:cNvSpPr/>
+              <p:nvPr/>
+            </p:nvSpPr>
+            <p:spPr>
+              <a:xfrm>
+                <a:off x="994128" y="2278128"/>
+                <a:ext cx="566057" cy="794657"/>
+              </a:xfrm>
+              <a:prstGeom prst="foldedCorner">
+                <a:avLst/>
+              </a:prstGeom>
+              <a:solidFill>
+                <a:schemeClr val="bg1"/>
+              </a:solidFill>
+            </p:spPr>
+            <p:style>
+              <a:lnRef idx="2">
+                <a:schemeClr val="accent1">
+                  <a:shade val="15000"/>
+                </a:schemeClr>
+              </a:lnRef>
+              <a:fillRef idx="1">
+                <a:schemeClr val="accent1"/>
+              </a:fillRef>
+              <a:effectRef idx="0">
+                <a:schemeClr val="accent1"/>
+              </a:effectRef>
+              <a:fontRef idx="minor">
+                <a:schemeClr val="lt1"/>
+              </a:fontRef>
+            </p:style>
+            <p:txBody>
+              <a:bodyPr rtlCol="0" anchor="ctr"/>
+              <a:lstStyle/>
+              <a:p>
+                <a:pPr algn="ctr"/>
+                <a:endParaRPr lang="LID4096"/>
+              </a:p>
+            </p:txBody>
+          </p:sp>
+          <p:sp>
+            <p:nvSpPr>
+              <p:cNvPr id="34" name="TextBox 33">
+                <a:extLst>
+                  <a:ext uri="{FF2B5EF4-FFF2-40B4-BE49-F238E27FC236}">
+                    <a16:creationId xmlns:a16="http://schemas.microsoft.com/office/drawing/2014/main" id="{5D2C140E-C2E1-7380-376D-0D4B858BBA3A}"/>
+                  </a:ext>
+                </a:extLst>
+              </p:cNvPr>
+              <p:cNvSpPr txBox="1"/>
+              <p:nvPr/>
+            </p:nvSpPr>
+            <p:spPr>
+              <a:xfrm>
+                <a:off x="529580" y="1875354"/>
+                <a:ext cx="1495153" cy="369332"/>
+              </a:xfrm>
+              <a:prstGeom prst="rect">
+                <a:avLst/>
+              </a:prstGeom>
+              <a:solidFill>
+                <a:schemeClr val="bg1"/>
+              </a:solidFill>
+            </p:spPr>
+            <p:txBody>
+              <a:bodyPr wrap="none" rtlCol="0">
+                <a:spAutoFit/>
+              </a:bodyPr>
+              <a:lstStyle/>
+              <a:p>
+                <a:r>
+                  <a:rPr lang="en-US" dirty="0"/>
+                  <a:t>data_051.dat</a:t>
+                </a:r>
+                <a:endParaRPr lang="LID4096" dirty="0"/>
+              </a:p>
+            </p:txBody>
+          </p:sp>
+        </p:grpSp>
+        <p:grpSp>
+          <p:nvGrpSpPr>
+            <p:cNvPr id="29" name="Group 28">
+              <a:extLst>
+                <a:ext uri="{FF2B5EF4-FFF2-40B4-BE49-F238E27FC236}">
+                  <a16:creationId xmlns:a16="http://schemas.microsoft.com/office/drawing/2014/main" id="{772EFC66-3AF6-6292-CF66-2BE20789FAA6}"/>
+                </a:ext>
+              </a:extLst>
+            </p:cNvPr>
+            <p:cNvGrpSpPr/>
+            <p:nvPr/>
+          </p:nvGrpSpPr>
+          <p:grpSpPr>
+            <a:xfrm>
+              <a:off x="2024733" y="1875354"/>
+              <a:ext cx="1495153" cy="1197431"/>
+              <a:chOff x="529580" y="1875354"/>
+              <a:chExt cx="1495153" cy="1197431"/>
+            </a:xfrm>
+          </p:grpSpPr>
+          <p:sp>
+            <p:nvSpPr>
+              <p:cNvPr id="31" name="Rectangle: Folded Corner 30">
+                <a:extLst>
+                  <a:ext uri="{FF2B5EF4-FFF2-40B4-BE49-F238E27FC236}">
+                    <a16:creationId xmlns:a16="http://schemas.microsoft.com/office/drawing/2014/main" id="{825F5D35-2AE6-AD8D-77A2-00EB35318815}"/>
+                  </a:ext>
+                </a:extLst>
+              </p:cNvPr>
+              <p:cNvSpPr/>
+              <p:nvPr/>
+            </p:nvSpPr>
+            <p:spPr>
+              <a:xfrm>
+                <a:off x="994128" y="2278128"/>
+                <a:ext cx="566057" cy="794657"/>
+              </a:xfrm>
+              <a:prstGeom prst="foldedCorner">
+                <a:avLst/>
+              </a:prstGeom>
+              <a:solidFill>
+                <a:schemeClr val="bg1"/>
+              </a:solidFill>
+            </p:spPr>
+            <p:style>
+              <a:lnRef idx="2">
+                <a:schemeClr val="accent1">
+                  <a:shade val="15000"/>
+                </a:schemeClr>
+              </a:lnRef>
+              <a:fillRef idx="1">
+                <a:schemeClr val="accent1"/>
+              </a:fillRef>
+              <a:effectRef idx="0">
+                <a:schemeClr val="accent1"/>
+              </a:effectRef>
+              <a:fontRef idx="minor">
+                <a:schemeClr val="lt1"/>
+              </a:fontRef>
+            </p:style>
+            <p:txBody>
+              <a:bodyPr rtlCol="0" anchor="ctr"/>
+              <a:lstStyle/>
+              <a:p>
+                <a:pPr algn="ctr"/>
+                <a:endParaRPr lang="LID4096"/>
+              </a:p>
+            </p:txBody>
+          </p:sp>
+          <p:sp>
+            <p:nvSpPr>
+              <p:cNvPr id="32" name="TextBox 31">
+                <a:extLst>
+                  <a:ext uri="{FF2B5EF4-FFF2-40B4-BE49-F238E27FC236}">
+                    <a16:creationId xmlns:a16="http://schemas.microsoft.com/office/drawing/2014/main" id="{26E1E98A-F78B-59E6-A12E-91827020F3A3}"/>
+                  </a:ext>
+                </a:extLst>
+              </p:cNvPr>
+              <p:cNvSpPr txBox="1"/>
+              <p:nvPr/>
+            </p:nvSpPr>
+            <p:spPr>
+              <a:xfrm>
+                <a:off x="529580" y="1875354"/>
+                <a:ext cx="1495153" cy="369332"/>
+              </a:xfrm>
+              <a:prstGeom prst="rect">
+                <a:avLst/>
+              </a:prstGeom>
+              <a:solidFill>
+                <a:schemeClr val="bg1"/>
+              </a:solidFill>
+            </p:spPr>
+            <p:txBody>
+              <a:bodyPr wrap="none" rtlCol="0">
+                <a:spAutoFit/>
+              </a:bodyPr>
+              <a:lstStyle/>
+              <a:p>
+                <a:r>
+                  <a:rPr lang="en-US" dirty="0"/>
+                  <a:t>data_100.dat</a:t>
+                </a:r>
+                <a:endParaRPr lang="LID4096" dirty="0"/>
+              </a:p>
+            </p:txBody>
+          </p:sp>
+        </p:grpSp>
+        <p:sp>
+          <p:nvSpPr>
+            <p:cNvPr id="30" name="TextBox 29">
+              <a:extLst>
+                <a:ext uri="{FF2B5EF4-FFF2-40B4-BE49-F238E27FC236}">
+                  <a16:creationId xmlns:a16="http://schemas.microsoft.com/office/drawing/2014/main" id="{D867A291-CCF9-3423-0267-B0788BF8DCB8}"/>
+                </a:ext>
+              </a:extLst>
+            </p:cNvPr>
+            <p:cNvSpPr txBox="1"/>
+            <p:nvPr/>
+          </p:nvSpPr>
+          <p:spPr>
+            <a:xfrm>
+              <a:off x="1826408" y="2345904"/>
+              <a:ext cx="506870" cy="523220"/>
+            </a:xfrm>
+            <a:prstGeom prst="rect">
+              <a:avLst/>
+            </a:prstGeom>
+            <a:noFill/>
+          </p:spPr>
+          <p:txBody>
+            <a:bodyPr wrap="none" rtlCol="0">
+              <a:spAutoFit/>
+            </a:bodyPr>
+            <a:lstStyle/>
+            <a:p>
+              <a:r>
+                <a:rPr lang="en-US" sz="2800" b="1" dirty="0"/>
+                <a:t>...</a:t>
+              </a:r>
+              <a:endParaRPr lang="LID4096" sz="2800" b="1" dirty="0"/>
+            </a:p>
+          </p:txBody>
+        </p:sp>
+      </p:grpSp>
+      <p:sp>
+        <p:nvSpPr>
+          <p:cNvPr id="35" name="Rectangle: Rounded Corners 34">
+            <a:extLst>
+              <a:ext uri="{FF2B5EF4-FFF2-40B4-BE49-F238E27FC236}">
+                <a16:creationId xmlns:a16="http://schemas.microsoft.com/office/drawing/2014/main" id="{E7B0A8F6-94D8-0986-BD16-249CFC8218E4}"/>
+              </a:ext>
+            </a:extLst>
+          </p:cNvPr>
+          <p:cNvSpPr/>
+          <p:nvPr/>
+        </p:nvSpPr>
+        <p:spPr>
+          <a:xfrm>
+            <a:off x="4673977" y="3291837"/>
+            <a:ext cx="2061201" cy="523220"/>
+          </a:xfrm>
+          <a:prstGeom prst="roundRect">
+            <a:avLst/>
+          </a:prstGeom>
+        </p:spPr>
+        <p:style>
+          <a:lnRef idx="2">
+            <a:schemeClr val="accent1">
+              <a:shade val="15000"/>
+            </a:schemeClr>
+          </a:lnRef>
+          <a:fillRef idx="1">
+            <a:schemeClr val="accent1"/>
+          </a:fillRef>
+          <a:effectRef idx="0">
+            <a:schemeClr val="accent1"/>
+          </a:effectRef>
+          <a:fontRef idx="minor">
+            <a:schemeClr val="lt1"/>
+          </a:fontRef>
+        </p:style>
+        <p:txBody>
+          <a:bodyPr rtlCol="0" anchor="ctr"/>
+          <a:lstStyle/>
+          <a:p>
+            <a:pPr algn="ctr"/>
+            <a:r>
+              <a:rPr lang="en-US" dirty="0"/>
+              <a:t>Job 523_51</a:t>
+            </a:r>
+            <a:endParaRPr lang="LID4096" dirty="0"/>
+          </a:p>
+        </p:txBody>
+      </p:sp>
+      <p:grpSp>
+        <p:nvGrpSpPr>
+          <p:cNvPr id="36" name="Group 35">
+            <a:extLst>
+              <a:ext uri="{FF2B5EF4-FFF2-40B4-BE49-F238E27FC236}">
+                <a16:creationId xmlns:a16="http://schemas.microsoft.com/office/drawing/2014/main" id="{B6538F82-3313-171A-CBAC-595EF7380FAC}"/>
+              </a:ext>
+            </a:extLst>
+          </p:cNvPr>
+          <p:cNvGrpSpPr/>
+          <p:nvPr/>
+        </p:nvGrpSpPr>
+        <p:grpSpPr>
+          <a:xfrm>
+            <a:off x="4252974" y="3047998"/>
+            <a:ext cx="3035831" cy="2487083"/>
+            <a:chOff x="529580" y="3265714"/>
+            <a:chExt cx="3035831" cy="2487083"/>
+          </a:xfrm>
+        </p:grpSpPr>
+        <p:grpSp>
+          <p:nvGrpSpPr>
+            <p:cNvPr id="37" name="Group 36">
+              <a:extLst>
+                <a:ext uri="{FF2B5EF4-FFF2-40B4-BE49-F238E27FC236}">
+                  <a16:creationId xmlns:a16="http://schemas.microsoft.com/office/drawing/2014/main" id="{2F5D2E71-CCAB-1ABD-82E2-20114B455D76}"/>
+                </a:ext>
+              </a:extLst>
+            </p:cNvPr>
+            <p:cNvGrpSpPr/>
+            <p:nvPr/>
+          </p:nvGrpSpPr>
+          <p:grpSpPr>
+            <a:xfrm>
+              <a:off x="529580" y="4555366"/>
+              <a:ext cx="1540678" cy="1197431"/>
+              <a:chOff x="529580" y="1875354"/>
+              <a:chExt cx="1540678" cy="1197431"/>
+            </a:xfrm>
+          </p:grpSpPr>
+          <p:sp>
+            <p:nvSpPr>
+              <p:cNvPr id="44" name="Rectangle: Folded Corner 43">
+                <a:extLst>
+                  <a:ext uri="{FF2B5EF4-FFF2-40B4-BE49-F238E27FC236}">
+                    <a16:creationId xmlns:a16="http://schemas.microsoft.com/office/drawing/2014/main" id="{1EA9C1F2-3ED1-4202-573A-0F1E0F8042D9}"/>
+                  </a:ext>
+                </a:extLst>
+              </p:cNvPr>
+              <p:cNvSpPr/>
+              <p:nvPr/>
+            </p:nvSpPr>
+            <p:spPr>
+              <a:xfrm>
+                <a:off x="994128" y="2278128"/>
+                <a:ext cx="566057" cy="794657"/>
+              </a:xfrm>
+              <a:prstGeom prst="foldedCorner">
+                <a:avLst/>
+              </a:prstGeom>
+              <a:solidFill>
+                <a:schemeClr val="bg1"/>
+              </a:solidFill>
+            </p:spPr>
+            <p:style>
+              <a:lnRef idx="2">
+                <a:schemeClr val="accent1">
+                  <a:shade val="15000"/>
+                </a:schemeClr>
+              </a:lnRef>
+              <a:fillRef idx="1">
+                <a:schemeClr val="accent1"/>
+              </a:fillRef>
+              <a:effectRef idx="0">
+                <a:schemeClr val="accent1"/>
+              </a:effectRef>
+              <a:fontRef idx="minor">
+                <a:schemeClr val="lt1"/>
+              </a:fontRef>
+            </p:style>
+            <p:txBody>
+              <a:bodyPr rtlCol="0" anchor="ctr"/>
+              <a:lstStyle/>
+              <a:p>
+                <a:pPr algn="ctr"/>
+                <a:endParaRPr lang="LID4096"/>
+              </a:p>
+            </p:txBody>
+          </p:sp>
+          <p:sp>
+            <p:nvSpPr>
+              <p:cNvPr id="45" name="TextBox 44">
+                <a:extLst>
+                  <a:ext uri="{FF2B5EF4-FFF2-40B4-BE49-F238E27FC236}">
+                    <a16:creationId xmlns:a16="http://schemas.microsoft.com/office/drawing/2014/main" id="{FA3E7FE9-4010-232A-CBAC-7C33F531055C}"/>
+                  </a:ext>
+                </a:extLst>
+              </p:cNvPr>
+              <p:cNvSpPr txBox="1"/>
+              <p:nvPr/>
+            </p:nvSpPr>
+            <p:spPr>
+              <a:xfrm>
+                <a:off x="529580" y="1875354"/>
+                <a:ext cx="1540678" cy="369332"/>
+              </a:xfrm>
+              <a:prstGeom prst="rect">
+                <a:avLst/>
+              </a:prstGeom>
+              <a:solidFill>
+                <a:schemeClr val="bg1"/>
+              </a:solidFill>
+            </p:spPr>
+            <p:txBody>
+              <a:bodyPr wrap="none" rtlCol="0">
+                <a:spAutoFit/>
+              </a:bodyPr>
+              <a:lstStyle/>
+              <a:p>
+                <a:r>
+                  <a:rPr lang="en-US" dirty="0"/>
+                  <a:t>result_051.txt</a:t>
+                </a:r>
+                <a:endParaRPr lang="LID4096" dirty="0"/>
+              </a:p>
+            </p:txBody>
+          </p:sp>
+        </p:grpSp>
+        <p:grpSp>
+          <p:nvGrpSpPr>
+            <p:cNvPr id="38" name="Group 37">
+              <a:extLst>
+                <a:ext uri="{FF2B5EF4-FFF2-40B4-BE49-F238E27FC236}">
+                  <a16:creationId xmlns:a16="http://schemas.microsoft.com/office/drawing/2014/main" id="{02A19AD1-B5C6-000F-E57B-5D5F2EDCA3EC}"/>
+                </a:ext>
+              </a:extLst>
+            </p:cNvPr>
+            <p:cNvGrpSpPr/>
+            <p:nvPr/>
+          </p:nvGrpSpPr>
+          <p:grpSpPr>
+            <a:xfrm>
+              <a:off x="2024733" y="4555366"/>
+              <a:ext cx="1540678" cy="1197431"/>
+              <a:chOff x="529580" y="1875354"/>
+              <a:chExt cx="1540678" cy="1197431"/>
+            </a:xfrm>
+          </p:grpSpPr>
+          <p:sp>
+            <p:nvSpPr>
+              <p:cNvPr id="42" name="Rectangle: Folded Corner 41">
+                <a:extLst>
+                  <a:ext uri="{FF2B5EF4-FFF2-40B4-BE49-F238E27FC236}">
+                    <a16:creationId xmlns:a16="http://schemas.microsoft.com/office/drawing/2014/main" id="{61603B95-FBDE-4027-72F0-25BD1B769E1D}"/>
+                  </a:ext>
+                </a:extLst>
+              </p:cNvPr>
+              <p:cNvSpPr/>
+              <p:nvPr/>
+            </p:nvSpPr>
+            <p:spPr>
+              <a:xfrm>
+                <a:off x="994128" y="2278128"/>
+                <a:ext cx="566057" cy="794657"/>
+              </a:xfrm>
+              <a:prstGeom prst="foldedCorner">
+                <a:avLst/>
+              </a:prstGeom>
+              <a:solidFill>
+                <a:schemeClr val="bg1"/>
+              </a:solidFill>
+            </p:spPr>
+            <p:style>
+              <a:lnRef idx="2">
+                <a:schemeClr val="accent1">
+                  <a:shade val="15000"/>
+                </a:schemeClr>
+              </a:lnRef>
+              <a:fillRef idx="1">
+                <a:schemeClr val="accent1"/>
+              </a:fillRef>
+              <a:effectRef idx="0">
+                <a:schemeClr val="accent1"/>
+              </a:effectRef>
+              <a:fontRef idx="minor">
+                <a:schemeClr val="lt1"/>
+              </a:fontRef>
+            </p:style>
+            <p:txBody>
+              <a:bodyPr rtlCol="0" anchor="ctr"/>
+              <a:lstStyle/>
+              <a:p>
+                <a:pPr algn="ctr"/>
+                <a:endParaRPr lang="LID4096"/>
+              </a:p>
+            </p:txBody>
+          </p:sp>
+          <p:sp>
+            <p:nvSpPr>
+              <p:cNvPr id="43" name="TextBox 42">
+                <a:extLst>
+                  <a:ext uri="{FF2B5EF4-FFF2-40B4-BE49-F238E27FC236}">
+                    <a16:creationId xmlns:a16="http://schemas.microsoft.com/office/drawing/2014/main" id="{717D2485-E203-AEBA-93B8-98D68CF3CAB5}"/>
+                  </a:ext>
+                </a:extLst>
+              </p:cNvPr>
+              <p:cNvSpPr txBox="1"/>
+              <p:nvPr/>
+            </p:nvSpPr>
+            <p:spPr>
+              <a:xfrm>
+                <a:off x="529580" y="1875354"/>
+                <a:ext cx="1540678" cy="369332"/>
+              </a:xfrm>
+              <a:prstGeom prst="rect">
+                <a:avLst/>
+              </a:prstGeom>
+              <a:solidFill>
+                <a:schemeClr val="bg1"/>
+              </a:solidFill>
+            </p:spPr>
+            <p:txBody>
+              <a:bodyPr wrap="none" rtlCol="0">
+                <a:spAutoFit/>
+              </a:bodyPr>
+              <a:lstStyle/>
+              <a:p>
+                <a:r>
+                  <a:rPr lang="en-US" dirty="0"/>
+                  <a:t>result_100.txt</a:t>
+                </a:r>
+                <a:endParaRPr lang="LID4096" dirty="0"/>
+              </a:p>
+            </p:txBody>
+          </p:sp>
+        </p:grpSp>
+        <p:sp>
+          <p:nvSpPr>
+            <p:cNvPr id="39" name="TextBox 38">
+              <a:extLst>
+                <a:ext uri="{FF2B5EF4-FFF2-40B4-BE49-F238E27FC236}">
+                  <a16:creationId xmlns:a16="http://schemas.microsoft.com/office/drawing/2014/main" id="{70312635-0D1F-4DB5-3B96-12834A2A68B3}"/>
+                </a:ext>
+              </a:extLst>
+            </p:cNvPr>
+            <p:cNvSpPr txBox="1"/>
+            <p:nvPr/>
+          </p:nvSpPr>
+          <p:spPr>
+            <a:xfrm>
+              <a:off x="1826408" y="5025916"/>
+              <a:ext cx="506870" cy="523220"/>
+            </a:xfrm>
+            <a:prstGeom prst="rect">
+              <a:avLst/>
+            </a:prstGeom>
+            <a:noFill/>
+          </p:spPr>
+          <p:txBody>
+            <a:bodyPr wrap="none" rtlCol="0">
+              <a:spAutoFit/>
+            </a:bodyPr>
+            <a:lstStyle/>
+            <a:p>
+              <a:r>
+                <a:rPr lang="en-US" sz="2800" b="1" dirty="0"/>
+                <a:t>...</a:t>
+              </a:r>
+              <a:endParaRPr lang="LID4096" sz="2800" b="1" dirty="0"/>
+            </a:p>
+          </p:txBody>
+        </p:sp>
+        <p:cxnSp>
+          <p:nvCxnSpPr>
+            <p:cNvPr id="40" name="Straight Arrow Connector 39">
+              <a:extLst>
+                <a:ext uri="{FF2B5EF4-FFF2-40B4-BE49-F238E27FC236}">
+                  <a16:creationId xmlns:a16="http://schemas.microsoft.com/office/drawing/2014/main" id="{D74ECA9B-9682-6388-31D5-6D83F60F9021}"/>
+                </a:ext>
+              </a:extLst>
+            </p:cNvPr>
+            <p:cNvCxnSpPr/>
+            <p:nvPr/>
+          </p:nvCxnSpPr>
+          <p:spPr>
+            <a:xfrm>
+              <a:off x="1230076" y="3265714"/>
+              <a:ext cx="0" cy="1164772"/>
+            </a:xfrm>
+            <a:prstGeom prst="straightConnector1">
+              <a:avLst/>
+            </a:prstGeom>
+            <a:ln w="57150">
+              <a:tailEnd type="stealth" w="lg" len="lg"/>
+            </a:ln>
+          </p:spPr>
+          <p:style>
+            <a:lnRef idx="2">
+              <a:schemeClr val="accent1"/>
+            </a:lnRef>
+            <a:fillRef idx="0">
+              <a:schemeClr val="accent1"/>
+            </a:fillRef>
+            <a:effectRef idx="1">
+              <a:schemeClr val="accent1"/>
+            </a:effectRef>
+            <a:fontRef idx="minor">
+              <a:schemeClr val="tx1"/>
+            </a:fontRef>
+          </p:style>
+        </p:cxnSp>
+        <p:cxnSp>
+          <p:nvCxnSpPr>
+            <p:cNvPr id="41" name="Straight Arrow Connector 40">
+              <a:extLst>
+                <a:ext uri="{FF2B5EF4-FFF2-40B4-BE49-F238E27FC236}">
+                  <a16:creationId xmlns:a16="http://schemas.microsoft.com/office/drawing/2014/main" id="{B64AF392-E9CA-3109-1CE5-3691120E572F}"/>
+                </a:ext>
+              </a:extLst>
+            </p:cNvPr>
+            <p:cNvCxnSpPr/>
+            <p:nvPr/>
+          </p:nvCxnSpPr>
+          <p:spPr>
+            <a:xfrm>
+              <a:off x="2699648" y="3265714"/>
+              <a:ext cx="0" cy="1164772"/>
+            </a:xfrm>
+            <a:prstGeom prst="straightConnector1">
+              <a:avLst/>
+            </a:prstGeom>
+            <a:ln w="57150">
+              <a:tailEnd type="stealth" w="lg" len="lg"/>
+            </a:ln>
+          </p:spPr>
+          <p:style>
+            <a:lnRef idx="2">
+              <a:schemeClr val="accent1"/>
+            </a:lnRef>
+            <a:fillRef idx="0">
+              <a:schemeClr val="accent1"/>
+            </a:fillRef>
+            <a:effectRef idx="1">
+              <a:schemeClr val="accent1"/>
+            </a:effectRef>
+            <a:fontRef idx="minor">
+              <a:schemeClr val="tx1"/>
+            </a:fontRef>
+          </p:style>
+        </p:cxnSp>
+      </p:grpSp>
+      <p:sp>
+        <p:nvSpPr>
+          <p:cNvPr id="46" name="TextBox 45">
+            <a:extLst>
+              <a:ext uri="{FF2B5EF4-FFF2-40B4-BE49-F238E27FC236}">
+                <a16:creationId xmlns:a16="http://schemas.microsoft.com/office/drawing/2014/main" id="{27804311-7DD4-9AF0-AB81-18EC0C98CF12}"/>
+              </a:ext>
+            </a:extLst>
+          </p:cNvPr>
+          <p:cNvSpPr txBox="1"/>
+          <p:nvPr/>
+        </p:nvSpPr>
+        <p:spPr>
+          <a:xfrm>
+            <a:off x="7465958" y="3211284"/>
+            <a:ext cx="506870" cy="523220"/>
+          </a:xfrm>
+          <a:prstGeom prst="rect">
+            <a:avLst/>
+          </a:prstGeom>
+          <a:noFill/>
+        </p:spPr>
+        <p:txBody>
+          <a:bodyPr wrap="none" rtlCol="0">
+            <a:spAutoFit/>
+          </a:bodyPr>
+          <a:lstStyle/>
+          <a:p>
+            <a:r>
+              <a:rPr lang="en-US" sz="2800" b="1" dirty="0"/>
+              <a:t>...</a:t>
+            </a:r>
+            <a:endParaRPr lang="LID4096" sz="2800" b="1" dirty="0"/>
+          </a:p>
+        </p:txBody>
+      </p:sp>
+      <p:grpSp>
+        <p:nvGrpSpPr>
+          <p:cNvPr id="47" name="Group 46">
+            <a:extLst>
+              <a:ext uri="{FF2B5EF4-FFF2-40B4-BE49-F238E27FC236}">
+                <a16:creationId xmlns:a16="http://schemas.microsoft.com/office/drawing/2014/main" id="{B31C2C7D-DAF3-AC50-3790-038ED572FDC4}"/>
+              </a:ext>
+            </a:extLst>
+          </p:cNvPr>
+          <p:cNvGrpSpPr/>
+          <p:nvPr/>
+        </p:nvGrpSpPr>
+        <p:grpSpPr>
+          <a:xfrm>
+            <a:off x="8230331" y="1657638"/>
+            <a:ext cx="2990306" cy="1197431"/>
+            <a:chOff x="529580" y="1875354"/>
+            <a:chExt cx="2990306" cy="1197431"/>
+          </a:xfrm>
+        </p:grpSpPr>
+        <p:grpSp>
+          <p:nvGrpSpPr>
+            <p:cNvPr id="48" name="Group 47">
+              <a:extLst>
+                <a:ext uri="{FF2B5EF4-FFF2-40B4-BE49-F238E27FC236}">
+                  <a16:creationId xmlns:a16="http://schemas.microsoft.com/office/drawing/2014/main" id="{CA53C53A-E85A-EFEA-13C0-9D63C38E2F66}"/>
+                </a:ext>
+              </a:extLst>
+            </p:cNvPr>
+            <p:cNvGrpSpPr/>
+            <p:nvPr/>
+          </p:nvGrpSpPr>
+          <p:grpSpPr>
+            <a:xfrm>
+              <a:off x="529580" y="1875354"/>
+              <a:ext cx="1495153" cy="1197431"/>
+              <a:chOff x="529580" y="1875354"/>
+              <a:chExt cx="1495153" cy="1197431"/>
+            </a:xfrm>
+          </p:grpSpPr>
+          <p:sp>
+            <p:nvSpPr>
+              <p:cNvPr id="53" name="Rectangle: Folded Corner 52">
+                <a:extLst>
+                  <a:ext uri="{FF2B5EF4-FFF2-40B4-BE49-F238E27FC236}">
+                    <a16:creationId xmlns:a16="http://schemas.microsoft.com/office/drawing/2014/main" id="{EDD349F9-BCD7-41B6-1FB5-69E66C0252AC}"/>
+                  </a:ext>
+                </a:extLst>
+              </p:cNvPr>
+              <p:cNvSpPr/>
+              <p:nvPr/>
+            </p:nvSpPr>
+            <p:spPr>
+              <a:xfrm>
+                <a:off x="994128" y="2278128"/>
+                <a:ext cx="566057" cy="794657"/>
+              </a:xfrm>
+              <a:prstGeom prst="foldedCorner">
+                <a:avLst/>
+              </a:prstGeom>
+              <a:solidFill>
+                <a:schemeClr val="bg1"/>
+              </a:solidFill>
+            </p:spPr>
+            <p:style>
+              <a:lnRef idx="2">
+                <a:schemeClr val="accent1">
+                  <a:shade val="15000"/>
+                </a:schemeClr>
+              </a:lnRef>
+              <a:fillRef idx="1">
+                <a:schemeClr val="accent1"/>
+              </a:fillRef>
+              <a:effectRef idx="0">
+                <a:schemeClr val="accent1"/>
+              </a:effectRef>
+              <a:fontRef idx="minor">
+                <a:schemeClr val="lt1"/>
+              </a:fontRef>
+            </p:style>
+            <p:txBody>
+              <a:bodyPr rtlCol="0" anchor="ctr"/>
+              <a:lstStyle/>
+              <a:p>
+                <a:pPr algn="ctr"/>
+                <a:endParaRPr lang="LID4096"/>
+              </a:p>
+            </p:txBody>
+          </p:sp>
+          <p:sp>
+            <p:nvSpPr>
+              <p:cNvPr id="54" name="TextBox 53">
+                <a:extLst>
+                  <a:ext uri="{FF2B5EF4-FFF2-40B4-BE49-F238E27FC236}">
+                    <a16:creationId xmlns:a16="http://schemas.microsoft.com/office/drawing/2014/main" id="{5B539C17-2266-3E25-8541-4C3A7BF67105}"/>
+                  </a:ext>
+                </a:extLst>
+              </p:cNvPr>
+              <p:cNvSpPr txBox="1"/>
+              <p:nvPr/>
+            </p:nvSpPr>
+            <p:spPr>
+              <a:xfrm>
+                <a:off x="529580" y="1875354"/>
+                <a:ext cx="1495153" cy="369332"/>
+              </a:xfrm>
+              <a:prstGeom prst="rect">
+                <a:avLst/>
+              </a:prstGeom>
+              <a:solidFill>
+                <a:schemeClr val="bg1"/>
+              </a:solidFill>
+            </p:spPr>
+            <p:txBody>
+              <a:bodyPr wrap="none" rtlCol="0">
+                <a:spAutoFit/>
+              </a:bodyPr>
+              <a:lstStyle/>
+              <a:p>
+                <a:r>
+                  <a:rPr lang="en-US" dirty="0"/>
+                  <a:t>data_151.dat</a:t>
+                </a:r>
+                <a:endParaRPr lang="LID4096" dirty="0"/>
+              </a:p>
+            </p:txBody>
+          </p:sp>
+        </p:grpSp>
+        <p:grpSp>
+          <p:nvGrpSpPr>
+            <p:cNvPr id="49" name="Group 48">
+              <a:extLst>
+                <a:ext uri="{FF2B5EF4-FFF2-40B4-BE49-F238E27FC236}">
+                  <a16:creationId xmlns:a16="http://schemas.microsoft.com/office/drawing/2014/main" id="{9E5A40CD-6455-7EF7-5278-908F3DF84097}"/>
+                </a:ext>
+              </a:extLst>
+            </p:cNvPr>
+            <p:cNvGrpSpPr/>
+            <p:nvPr/>
+          </p:nvGrpSpPr>
+          <p:grpSpPr>
+            <a:xfrm>
+              <a:off x="2024733" y="1875354"/>
+              <a:ext cx="1495153" cy="1197431"/>
+              <a:chOff x="529580" y="1875354"/>
+              <a:chExt cx="1495153" cy="1197431"/>
+            </a:xfrm>
+          </p:grpSpPr>
+          <p:sp>
+            <p:nvSpPr>
+              <p:cNvPr id="51" name="Rectangle: Folded Corner 50">
+                <a:extLst>
+                  <a:ext uri="{FF2B5EF4-FFF2-40B4-BE49-F238E27FC236}">
+                    <a16:creationId xmlns:a16="http://schemas.microsoft.com/office/drawing/2014/main" id="{BD748555-2C58-E627-C129-1ABA0CB20302}"/>
+                  </a:ext>
+                </a:extLst>
+              </p:cNvPr>
+              <p:cNvSpPr/>
+              <p:nvPr/>
+            </p:nvSpPr>
+            <p:spPr>
+              <a:xfrm>
+                <a:off x="994128" y="2278128"/>
+                <a:ext cx="566057" cy="794657"/>
+              </a:xfrm>
+              <a:prstGeom prst="foldedCorner">
+                <a:avLst/>
+              </a:prstGeom>
+              <a:solidFill>
+                <a:schemeClr val="bg1"/>
+              </a:solidFill>
+            </p:spPr>
+            <p:style>
+              <a:lnRef idx="2">
+                <a:schemeClr val="accent1">
+                  <a:shade val="15000"/>
+                </a:schemeClr>
+              </a:lnRef>
+              <a:fillRef idx="1">
+                <a:schemeClr val="accent1"/>
+              </a:fillRef>
+              <a:effectRef idx="0">
+                <a:schemeClr val="accent1"/>
+              </a:effectRef>
+              <a:fontRef idx="minor">
+                <a:schemeClr val="lt1"/>
+              </a:fontRef>
+            </p:style>
+            <p:txBody>
+              <a:bodyPr rtlCol="0" anchor="ctr"/>
+              <a:lstStyle/>
+              <a:p>
+                <a:pPr algn="ctr"/>
+                <a:endParaRPr lang="LID4096"/>
+              </a:p>
+            </p:txBody>
+          </p:sp>
+          <p:sp>
+            <p:nvSpPr>
+              <p:cNvPr id="52" name="TextBox 51">
+                <a:extLst>
+                  <a:ext uri="{FF2B5EF4-FFF2-40B4-BE49-F238E27FC236}">
+                    <a16:creationId xmlns:a16="http://schemas.microsoft.com/office/drawing/2014/main" id="{479FDFD4-259A-3EE8-B247-4109FD3B18CD}"/>
+                  </a:ext>
+                </a:extLst>
+              </p:cNvPr>
+              <p:cNvSpPr txBox="1"/>
+              <p:nvPr/>
+            </p:nvSpPr>
+            <p:spPr>
+              <a:xfrm>
+                <a:off x="529580" y="1875354"/>
+                <a:ext cx="1495153" cy="369332"/>
+              </a:xfrm>
+              <a:prstGeom prst="rect">
+                <a:avLst/>
+              </a:prstGeom>
+              <a:solidFill>
+                <a:schemeClr val="bg1"/>
+              </a:solidFill>
+            </p:spPr>
+            <p:txBody>
+              <a:bodyPr wrap="none" rtlCol="0">
+                <a:spAutoFit/>
+              </a:bodyPr>
+              <a:lstStyle/>
+              <a:p>
+                <a:r>
+                  <a:rPr lang="en-US" dirty="0"/>
+                  <a:t>data_200.dat</a:t>
+                </a:r>
+                <a:endParaRPr lang="LID4096" dirty="0"/>
+              </a:p>
+            </p:txBody>
+          </p:sp>
+        </p:grpSp>
+        <p:sp>
+          <p:nvSpPr>
+            <p:cNvPr id="50" name="TextBox 49">
+              <a:extLst>
+                <a:ext uri="{FF2B5EF4-FFF2-40B4-BE49-F238E27FC236}">
+                  <a16:creationId xmlns:a16="http://schemas.microsoft.com/office/drawing/2014/main" id="{928B588F-3CA7-9CD8-35FA-124CA1B44F32}"/>
+                </a:ext>
+              </a:extLst>
+            </p:cNvPr>
+            <p:cNvSpPr txBox="1"/>
+            <p:nvPr/>
+          </p:nvSpPr>
+          <p:spPr>
+            <a:xfrm>
+              <a:off x="1826408" y="2345904"/>
+              <a:ext cx="506870" cy="523220"/>
+            </a:xfrm>
+            <a:prstGeom prst="rect">
+              <a:avLst/>
+            </a:prstGeom>
+            <a:noFill/>
+          </p:spPr>
+          <p:txBody>
+            <a:bodyPr wrap="none" rtlCol="0">
+              <a:spAutoFit/>
+            </a:bodyPr>
+            <a:lstStyle/>
+            <a:p>
+              <a:r>
+                <a:rPr lang="en-US" sz="2800" b="1" dirty="0"/>
+                <a:t>...</a:t>
+              </a:r>
+              <a:endParaRPr lang="LID4096" sz="2800" b="1" dirty="0"/>
+            </a:p>
+          </p:txBody>
+        </p:sp>
+      </p:grpSp>
+      <p:sp>
+        <p:nvSpPr>
+          <p:cNvPr id="55" name="Rectangle: Rounded Corners 54">
+            <a:extLst>
+              <a:ext uri="{FF2B5EF4-FFF2-40B4-BE49-F238E27FC236}">
+                <a16:creationId xmlns:a16="http://schemas.microsoft.com/office/drawing/2014/main" id="{75DF3987-5C6B-2D3E-C394-159DE1AB914B}"/>
+              </a:ext>
+            </a:extLst>
+          </p:cNvPr>
+          <p:cNvSpPr/>
+          <p:nvPr/>
+        </p:nvSpPr>
+        <p:spPr>
+          <a:xfrm>
+            <a:off x="8651334" y="3291837"/>
+            <a:ext cx="2061201" cy="523220"/>
+          </a:xfrm>
+          <a:prstGeom prst="roundRect">
+            <a:avLst/>
+          </a:prstGeom>
+        </p:spPr>
+        <p:style>
+          <a:lnRef idx="2">
+            <a:schemeClr val="accent1">
+              <a:shade val="15000"/>
+            </a:schemeClr>
+          </a:lnRef>
+          <a:fillRef idx="1">
+            <a:schemeClr val="accent1"/>
+          </a:fillRef>
+          <a:effectRef idx="0">
+            <a:schemeClr val="accent1"/>
+          </a:effectRef>
+          <a:fontRef idx="minor">
+            <a:schemeClr val="lt1"/>
+          </a:fontRef>
+        </p:style>
+        <p:txBody>
+          <a:bodyPr rtlCol="0" anchor="ctr"/>
+          <a:lstStyle/>
+          <a:p>
+            <a:pPr algn="ctr"/>
+            <a:r>
+              <a:rPr lang="en-US" dirty="0"/>
+              <a:t>Job 523_151</a:t>
+            </a:r>
+            <a:endParaRPr lang="LID4096" dirty="0"/>
+          </a:p>
+        </p:txBody>
+      </p:sp>
+      <p:grpSp>
+        <p:nvGrpSpPr>
+          <p:cNvPr id="56" name="Group 55">
+            <a:extLst>
+              <a:ext uri="{FF2B5EF4-FFF2-40B4-BE49-F238E27FC236}">
+                <a16:creationId xmlns:a16="http://schemas.microsoft.com/office/drawing/2014/main" id="{067E28FA-3AB8-AB23-4EBF-6EEF5B14D668}"/>
+              </a:ext>
+            </a:extLst>
+          </p:cNvPr>
+          <p:cNvGrpSpPr/>
+          <p:nvPr/>
+        </p:nvGrpSpPr>
+        <p:grpSpPr>
+          <a:xfrm>
+            <a:off x="8230331" y="3047998"/>
+            <a:ext cx="3035831" cy="2487083"/>
+            <a:chOff x="529580" y="3265714"/>
+            <a:chExt cx="3035831" cy="2487083"/>
+          </a:xfrm>
+        </p:grpSpPr>
+        <p:grpSp>
+          <p:nvGrpSpPr>
+            <p:cNvPr id="57" name="Group 56">
+              <a:extLst>
+                <a:ext uri="{FF2B5EF4-FFF2-40B4-BE49-F238E27FC236}">
+                  <a16:creationId xmlns:a16="http://schemas.microsoft.com/office/drawing/2014/main" id="{08E9A555-AB32-78CC-492E-853863505833}"/>
+                </a:ext>
+              </a:extLst>
+            </p:cNvPr>
+            <p:cNvGrpSpPr/>
+            <p:nvPr/>
+          </p:nvGrpSpPr>
+          <p:grpSpPr>
+            <a:xfrm>
+              <a:off x="529580" y="4555366"/>
+              <a:ext cx="1540678" cy="1197431"/>
+              <a:chOff x="529580" y="1875354"/>
+              <a:chExt cx="1540678" cy="1197431"/>
+            </a:xfrm>
+          </p:grpSpPr>
+          <p:sp>
+            <p:nvSpPr>
+              <p:cNvPr id="64" name="Rectangle: Folded Corner 63">
+                <a:extLst>
+                  <a:ext uri="{FF2B5EF4-FFF2-40B4-BE49-F238E27FC236}">
+                    <a16:creationId xmlns:a16="http://schemas.microsoft.com/office/drawing/2014/main" id="{29A4D5F4-F389-EFF6-44E4-5A84E5C5148F}"/>
+                  </a:ext>
+                </a:extLst>
+              </p:cNvPr>
+              <p:cNvSpPr/>
+              <p:nvPr/>
+            </p:nvSpPr>
+            <p:spPr>
+              <a:xfrm>
+                <a:off x="994128" y="2278128"/>
+                <a:ext cx="566057" cy="794657"/>
+              </a:xfrm>
+              <a:prstGeom prst="foldedCorner">
+                <a:avLst/>
+              </a:prstGeom>
+              <a:solidFill>
+                <a:schemeClr val="bg1"/>
+              </a:solidFill>
+            </p:spPr>
+            <p:style>
+              <a:lnRef idx="2">
+                <a:schemeClr val="accent1">
+                  <a:shade val="15000"/>
+                </a:schemeClr>
+              </a:lnRef>
+              <a:fillRef idx="1">
+                <a:schemeClr val="accent1"/>
+              </a:fillRef>
+              <a:effectRef idx="0">
+                <a:schemeClr val="accent1"/>
+              </a:effectRef>
+              <a:fontRef idx="minor">
+                <a:schemeClr val="lt1"/>
+              </a:fontRef>
+            </p:style>
+            <p:txBody>
+              <a:bodyPr rtlCol="0" anchor="ctr"/>
+              <a:lstStyle/>
+              <a:p>
+                <a:pPr algn="ctr"/>
+                <a:endParaRPr lang="LID4096"/>
+              </a:p>
+            </p:txBody>
+          </p:sp>
+          <p:sp>
+            <p:nvSpPr>
+              <p:cNvPr id="65" name="TextBox 64">
+                <a:extLst>
+                  <a:ext uri="{FF2B5EF4-FFF2-40B4-BE49-F238E27FC236}">
+                    <a16:creationId xmlns:a16="http://schemas.microsoft.com/office/drawing/2014/main" id="{2B0DA2DD-3A29-4DCE-4171-6DDAAA13671C}"/>
+                  </a:ext>
+                </a:extLst>
+              </p:cNvPr>
+              <p:cNvSpPr txBox="1"/>
+              <p:nvPr/>
+            </p:nvSpPr>
+            <p:spPr>
+              <a:xfrm>
+                <a:off x="529580" y="1875354"/>
+                <a:ext cx="1540678" cy="369332"/>
+              </a:xfrm>
+              <a:prstGeom prst="rect">
+                <a:avLst/>
+              </a:prstGeom>
+              <a:solidFill>
+                <a:schemeClr val="bg1"/>
+              </a:solidFill>
+            </p:spPr>
+            <p:txBody>
+              <a:bodyPr wrap="none" rtlCol="0">
+                <a:spAutoFit/>
+              </a:bodyPr>
+              <a:lstStyle/>
+              <a:p>
+                <a:r>
+                  <a:rPr lang="en-US" dirty="0"/>
+                  <a:t>result_151.txt</a:t>
+                </a:r>
+                <a:endParaRPr lang="LID4096" dirty="0"/>
+              </a:p>
+            </p:txBody>
+          </p:sp>
+        </p:grpSp>
+        <p:grpSp>
+          <p:nvGrpSpPr>
+            <p:cNvPr id="58" name="Group 57">
+              <a:extLst>
+                <a:ext uri="{FF2B5EF4-FFF2-40B4-BE49-F238E27FC236}">
+                  <a16:creationId xmlns:a16="http://schemas.microsoft.com/office/drawing/2014/main" id="{101D6AAC-651E-3AA8-8D54-39FA1CFD8AC6}"/>
+                </a:ext>
+              </a:extLst>
+            </p:cNvPr>
+            <p:cNvGrpSpPr/>
+            <p:nvPr/>
+          </p:nvGrpSpPr>
+          <p:grpSpPr>
+            <a:xfrm>
+              <a:off x="2024733" y="4555366"/>
+              <a:ext cx="1540678" cy="1197431"/>
+              <a:chOff x="529580" y="1875354"/>
+              <a:chExt cx="1540678" cy="1197431"/>
+            </a:xfrm>
+          </p:grpSpPr>
+          <p:sp>
+            <p:nvSpPr>
+              <p:cNvPr id="62" name="Rectangle: Folded Corner 61">
+                <a:extLst>
+                  <a:ext uri="{FF2B5EF4-FFF2-40B4-BE49-F238E27FC236}">
+                    <a16:creationId xmlns:a16="http://schemas.microsoft.com/office/drawing/2014/main" id="{438A9513-2CBF-03CF-54CA-87E5709772D6}"/>
+                  </a:ext>
+                </a:extLst>
+              </p:cNvPr>
+              <p:cNvSpPr/>
+              <p:nvPr/>
+            </p:nvSpPr>
+            <p:spPr>
+              <a:xfrm>
+                <a:off x="994128" y="2278128"/>
+                <a:ext cx="566057" cy="794657"/>
+              </a:xfrm>
+              <a:prstGeom prst="foldedCorner">
+                <a:avLst/>
+              </a:prstGeom>
+              <a:solidFill>
+                <a:schemeClr val="bg1"/>
+              </a:solidFill>
+            </p:spPr>
+            <p:style>
+              <a:lnRef idx="2">
+                <a:schemeClr val="accent1">
+                  <a:shade val="15000"/>
+                </a:schemeClr>
+              </a:lnRef>
+              <a:fillRef idx="1">
+                <a:schemeClr val="accent1"/>
+              </a:fillRef>
+              <a:effectRef idx="0">
+                <a:schemeClr val="accent1"/>
+              </a:effectRef>
+              <a:fontRef idx="minor">
+                <a:schemeClr val="lt1"/>
+              </a:fontRef>
+            </p:style>
+            <p:txBody>
+              <a:bodyPr rtlCol="0" anchor="ctr"/>
+              <a:lstStyle/>
+              <a:p>
+                <a:pPr algn="ctr"/>
+                <a:endParaRPr lang="LID4096"/>
+              </a:p>
+            </p:txBody>
+          </p:sp>
+          <p:sp>
+            <p:nvSpPr>
+              <p:cNvPr id="63" name="TextBox 62">
+                <a:extLst>
+                  <a:ext uri="{FF2B5EF4-FFF2-40B4-BE49-F238E27FC236}">
+                    <a16:creationId xmlns:a16="http://schemas.microsoft.com/office/drawing/2014/main" id="{CB847F54-1464-C2EF-B55B-54CA2EFCB022}"/>
+                  </a:ext>
+                </a:extLst>
+              </p:cNvPr>
+              <p:cNvSpPr txBox="1"/>
+              <p:nvPr/>
+            </p:nvSpPr>
+            <p:spPr>
+              <a:xfrm>
+                <a:off x="529580" y="1875354"/>
+                <a:ext cx="1540678" cy="369332"/>
+              </a:xfrm>
+              <a:prstGeom prst="rect">
+                <a:avLst/>
+              </a:prstGeom>
+              <a:solidFill>
+                <a:schemeClr val="bg1"/>
+              </a:solidFill>
+            </p:spPr>
+            <p:txBody>
+              <a:bodyPr wrap="none" rtlCol="0">
+                <a:spAutoFit/>
+              </a:bodyPr>
+              <a:lstStyle/>
+              <a:p>
+                <a:r>
+                  <a:rPr lang="en-US" dirty="0"/>
+                  <a:t>result_200.txt</a:t>
+                </a:r>
+                <a:endParaRPr lang="LID4096" dirty="0"/>
+              </a:p>
+            </p:txBody>
+          </p:sp>
+        </p:grpSp>
+        <p:sp>
+          <p:nvSpPr>
+            <p:cNvPr id="59" name="TextBox 58">
+              <a:extLst>
+                <a:ext uri="{FF2B5EF4-FFF2-40B4-BE49-F238E27FC236}">
+                  <a16:creationId xmlns:a16="http://schemas.microsoft.com/office/drawing/2014/main" id="{D775098E-1503-32D9-E35F-0CDD4F1245BF}"/>
+                </a:ext>
+              </a:extLst>
+            </p:cNvPr>
+            <p:cNvSpPr txBox="1"/>
+            <p:nvPr/>
+          </p:nvSpPr>
+          <p:spPr>
+            <a:xfrm>
+              <a:off x="1826408" y="5025916"/>
+              <a:ext cx="506870" cy="523220"/>
+            </a:xfrm>
+            <a:prstGeom prst="rect">
+              <a:avLst/>
+            </a:prstGeom>
+            <a:noFill/>
+          </p:spPr>
+          <p:txBody>
+            <a:bodyPr wrap="none" rtlCol="0">
+              <a:spAutoFit/>
+            </a:bodyPr>
+            <a:lstStyle/>
+            <a:p>
+              <a:r>
+                <a:rPr lang="en-US" sz="2800" b="1" dirty="0"/>
+                <a:t>...</a:t>
+              </a:r>
+              <a:endParaRPr lang="LID4096" sz="2800" b="1" dirty="0"/>
+            </a:p>
+          </p:txBody>
+        </p:sp>
+        <p:cxnSp>
+          <p:nvCxnSpPr>
+            <p:cNvPr id="60" name="Straight Arrow Connector 59">
+              <a:extLst>
+                <a:ext uri="{FF2B5EF4-FFF2-40B4-BE49-F238E27FC236}">
+                  <a16:creationId xmlns:a16="http://schemas.microsoft.com/office/drawing/2014/main" id="{FA589ED2-A503-9B18-B4D7-F0981573B61F}"/>
+                </a:ext>
+              </a:extLst>
+            </p:cNvPr>
+            <p:cNvCxnSpPr/>
+            <p:nvPr/>
+          </p:nvCxnSpPr>
+          <p:spPr>
+            <a:xfrm>
+              <a:off x="1230076" y="3265714"/>
+              <a:ext cx="0" cy="1164772"/>
+            </a:xfrm>
+            <a:prstGeom prst="straightConnector1">
+              <a:avLst/>
+            </a:prstGeom>
+            <a:ln w="57150">
+              <a:tailEnd type="stealth" w="lg" len="lg"/>
+            </a:ln>
+          </p:spPr>
+          <p:style>
+            <a:lnRef idx="2">
+              <a:schemeClr val="accent1"/>
+            </a:lnRef>
+            <a:fillRef idx="0">
+              <a:schemeClr val="accent1"/>
+            </a:fillRef>
+            <a:effectRef idx="1">
+              <a:schemeClr val="accent1"/>
+            </a:effectRef>
+            <a:fontRef idx="minor">
+              <a:schemeClr val="tx1"/>
+            </a:fontRef>
+          </p:style>
+        </p:cxnSp>
+        <p:cxnSp>
+          <p:nvCxnSpPr>
+            <p:cNvPr id="61" name="Straight Arrow Connector 60">
+              <a:extLst>
+                <a:ext uri="{FF2B5EF4-FFF2-40B4-BE49-F238E27FC236}">
+                  <a16:creationId xmlns:a16="http://schemas.microsoft.com/office/drawing/2014/main" id="{5E8419E2-5DDE-966E-A3A6-A40602FF27F9}"/>
+                </a:ext>
+              </a:extLst>
+            </p:cNvPr>
+            <p:cNvCxnSpPr/>
+            <p:nvPr/>
+          </p:nvCxnSpPr>
+          <p:spPr>
+            <a:xfrm>
+              <a:off x="2699648" y="3265714"/>
+              <a:ext cx="0" cy="1164772"/>
+            </a:xfrm>
+            <a:prstGeom prst="straightConnector1">
+              <a:avLst/>
+            </a:prstGeom>
+            <a:ln w="57150">
+              <a:tailEnd type="stealth" w="lg" len="lg"/>
+            </a:ln>
+          </p:spPr>
+          <p:style>
+            <a:lnRef idx="2">
+              <a:schemeClr val="accent1"/>
+            </a:lnRef>
+            <a:fillRef idx="0">
+              <a:schemeClr val="accent1"/>
+            </a:fillRef>
+            <a:effectRef idx="1">
+              <a:schemeClr val="accent1"/>
+            </a:effectRef>
+            <a:fontRef idx="minor">
+              <a:schemeClr val="tx1"/>
+            </a:fontRef>
+          </p:style>
+        </p:cxnSp>
+      </p:grpSp>
+      <p:grpSp>
+        <p:nvGrpSpPr>
+          <p:cNvPr id="66" name="Group 65">
+            <a:extLst>
+              <a:ext uri="{FF2B5EF4-FFF2-40B4-BE49-F238E27FC236}">
+                <a16:creationId xmlns:a16="http://schemas.microsoft.com/office/drawing/2014/main" id="{3802C8AE-7920-24A8-E94B-929379E3FEA9}"/>
+              </a:ext>
+            </a:extLst>
+          </p:cNvPr>
+          <p:cNvGrpSpPr/>
+          <p:nvPr/>
+        </p:nvGrpSpPr>
+        <p:grpSpPr>
+          <a:xfrm>
+            <a:off x="3620690" y="5600539"/>
+            <a:ext cx="6228976" cy="924352"/>
+            <a:chOff x="8281741" y="5245929"/>
+            <a:chExt cx="6228976" cy="924352"/>
+          </a:xfrm>
+        </p:grpSpPr>
+        <p:sp>
+          <p:nvSpPr>
+            <p:cNvPr id="67" name="TextBox 66">
+              <a:extLst>
+                <a:ext uri="{FF2B5EF4-FFF2-40B4-BE49-F238E27FC236}">
+                  <a16:creationId xmlns:a16="http://schemas.microsoft.com/office/drawing/2014/main" id="{AF7D88D3-3D73-A1AB-A9C7-ECA685C91DBC}"/>
+                </a:ext>
+              </a:extLst>
+            </p:cNvPr>
+            <p:cNvSpPr txBox="1"/>
+            <p:nvPr/>
+          </p:nvSpPr>
+          <p:spPr>
+            <a:xfrm>
+              <a:off x="8281741" y="5647061"/>
+              <a:ext cx="5729517" cy="523220"/>
+            </a:xfrm>
+            <a:prstGeom prst="rect">
+              <a:avLst/>
+            </a:prstGeom>
+            <a:noFill/>
+            <a:ln>
+              <a:solidFill>
+                <a:schemeClr val="tx1"/>
+              </a:solidFill>
+            </a:ln>
+          </p:spPr>
+          <p:txBody>
+            <a:bodyPr wrap="none" rtlCol="0">
+              <a:spAutoFit/>
+            </a:bodyPr>
+            <a:lstStyle/>
+            <a:p>
+              <a:r>
+                <a:rPr lang="en-US" sz="2800" dirty="0"/>
+                <a:t>Can, but </a:t>
+              </a:r>
+              <a:r>
+                <a:rPr lang="en-US" sz="2800" i="1" dirty="0"/>
+                <a:t>need not</a:t>
+              </a:r>
+              <a:r>
+                <a:rPr lang="en-US" sz="2800" dirty="0"/>
+                <a:t> run at same time!</a:t>
+              </a:r>
+              <a:endParaRPr lang="LID4096" sz="2800" dirty="0"/>
+            </a:p>
+          </p:txBody>
+        </p:sp>
+        <p:pic>
+          <p:nvPicPr>
+            <p:cNvPr id="68" name="Graphic 67" descr="Warning with solid fill">
+              <a:extLst>
+                <a:ext uri="{FF2B5EF4-FFF2-40B4-BE49-F238E27FC236}">
+                  <a16:creationId xmlns:a16="http://schemas.microsoft.com/office/drawing/2014/main" id="{9C2BCE33-C1AB-EDE4-958F-9ACB43A89EC1}"/>
+                </a:ext>
+              </a:extLst>
+            </p:cNvPr>
+            <p:cNvPicPr>
+              <a:picLocks noChangeAspect="1"/>
+            </p:cNvPicPr>
+            <p:nvPr/>
+          </p:nvPicPr>
+          <p:blipFill>
+            <a:blip r:embed="rId2">
+              <a:extLst>
+                <a:ext uri="{96DAC541-7B7A-43D3-8B79-37D633B846F1}">
+                  <asvg:svgBlip xmlns:asvg="http://schemas.microsoft.com/office/drawing/2016/SVG/main" r:embed="rId3"/>
+                </a:ext>
+              </a:extLst>
+            </a:blip>
+            <a:stretch>
+              <a:fillRect/>
+            </a:stretch>
+          </p:blipFill>
+          <p:spPr>
+            <a:xfrm>
+              <a:off x="13862645" y="5245929"/>
+              <a:ext cx="648072" cy="648072"/>
+            </a:xfrm>
+            <a:prstGeom prst="rect">
+              <a:avLst/>
+            </a:prstGeom>
+          </p:spPr>
+        </p:pic>
+      </p:grpSp>
+    </p:spTree>
+    <p:extLst>
+      <p:ext uri="{BB962C8B-B14F-4D97-AF65-F5344CB8AC3E}">
+        <p14:creationId xmlns:p14="http://schemas.microsoft.com/office/powerpoint/2010/main" val="3374591955"/>
+      </p:ext>
+    </p:extLst>
+  </p:cSld>
+  <p:clrMapOvr>
+    <a:masterClrMapping/>
+  </p:clrMapOvr>
+</p:sld>
+</file>
+
 <file path=ppt/slides/slide3.xml><?xml version="1.0" encoding="utf-8"?>
 <p:sld xmlns:a="http://schemas.openxmlformats.org/drawingml/2006/main" xmlns:r="http://schemas.openxmlformats.org/officeDocument/2006/relationships" xmlns:p="http://schemas.openxmlformats.org/presentationml/2006/main">
   <p:cSld>
@@ -18164,6 +20419,1273 @@
   <p:clrMapOvr>
     <a:masterClrMapping/>
   </p:clrMapOvr>
+</p:sld>
+</file>
+
+<file path=ppt/slides/slide30.xml><?xml version="1.0" encoding="utf-8"?>
+<p:sld xmlns:a="http://schemas.openxmlformats.org/drawingml/2006/main" xmlns:r="http://schemas.openxmlformats.org/officeDocument/2006/relationships" xmlns:p="http://schemas.openxmlformats.org/presentationml/2006/main">
+  <p:cSld>
+    <p:spTree>
+      <p:nvGrpSpPr>
+        <p:cNvPr id="1" name=""/>
+        <p:cNvGrpSpPr/>
+        <p:nvPr/>
+      </p:nvGrpSpPr>
+      <p:grpSpPr>
+        <a:xfrm>
+          <a:off x="0" y="0"/>
+          <a:ext cx="0" cy="0"/>
+          <a:chOff x="0" y="0"/>
+          <a:chExt cx="0" cy="0"/>
+        </a:xfrm>
+      </p:grpSpPr>
+      <p:sp>
+        <p:nvSpPr>
+          <p:cNvPr id="2" name="Title 1">
+            <a:extLst>
+              <a:ext uri="{FF2B5EF4-FFF2-40B4-BE49-F238E27FC236}">
+                <a16:creationId xmlns:a16="http://schemas.microsoft.com/office/drawing/2014/main" id="{D1E068C9-A476-5031-C93D-C54869FE695F}"/>
+              </a:ext>
+            </a:extLst>
+          </p:cNvPr>
+          <p:cNvSpPr>
+            <a:spLocks noGrp="1"/>
+          </p:cNvSpPr>
+          <p:nvPr>
+            <p:ph type="title"/>
+          </p:nvPr>
+        </p:nvSpPr>
+        <p:spPr/>
+        <p:txBody>
+          <a:bodyPr/>
+          <a:lstStyle/>
+          <a:p>
+            <a:r>
+              <a:rPr lang="en-US" dirty="0"/>
+              <a:t>Job array indices</a:t>
+            </a:r>
+            <a:endParaRPr lang="LID4096" dirty="0"/>
+          </a:p>
+        </p:txBody>
+      </p:sp>
+      <p:sp>
+        <p:nvSpPr>
+          <p:cNvPr id="3" name="Content Placeholder 2">
+            <a:extLst>
+              <a:ext uri="{FF2B5EF4-FFF2-40B4-BE49-F238E27FC236}">
+                <a16:creationId xmlns:a16="http://schemas.microsoft.com/office/drawing/2014/main" id="{69481C58-BE8B-D51D-2E67-D5A3B3AACB48}"/>
+              </a:ext>
+            </a:extLst>
+          </p:cNvPr>
+          <p:cNvSpPr>
+            <a:spLocks noGrp="1"/>
+          </p:cNvSpPr>
+          <p:nvPr>
+            <p:ph sz="half" idx="1"/>
+          </p:nvPr>
+        </p:nvSpPr>
+        <p:spPr/>
+        <p:txBody>
+          <a:bodyPr>
+            <a:normAutofit fontScale="85000" lnSpcReduction="10000"/>
+          </a:bodyPr>
+          <a:lstStyle/>
+          <a:p>
+            <a:r>
+              <a:rPr lang="en-US" dirty="0">
+                <a:latin typeface="Courier New" panose="02070309020205020404" pitchFamily="49" charset="0"/>
+                <a:cs typeface="Courier New" panose="02070309020205020404" pitchFamily="49" charset="0"/>
+              </a:rPr>
+              <a:t>--array=5-18</a:t>
+            </a:r>
+          </a:p>
+          <a:p>
+            <a:pPr lvl="1"/>
+            <a:r>
+              <a:rPr lang="en-US" dirty="0">
+                <a:latin typeface="Courier New" panose="02070309020205020404" pitchFamily="49" charset="0"/>
+                <a:cs typeface="Courier New" panose="02070309020205020404" pitchFamily="49" charset="0"/>
+              </a:rPr>
+              <a:t>SLURM_ARRAY_TASK_MIN</a:t>
+            </a:r>
+            <a:r>
+              <a:rPr lang="en-US" dirty="0"/>
+              <a:t> == 5</a:t>
+            </a:r>
+          </a:p>
+          <a:p>
+            <a:pPr lvl="1"/>
+            <a:r>
+              <a:rPr lang="en-US" dirty="0">
+                <a:latin typeface="Courier New" panose="02070309020205020404" pitchFamily="49" charset="0"/>
+                <a:cs typeface="Courier New" panose="02070309020205020404" pitchFamily="49" charset="0"/>
+              </a:rPr>
+              <a:t>SLURM_ARRAY_TASK_MAX</a:t>
+            </a:r>
+            <a:r>
+              <a:rPr lang="en-US" dirty="0"/>
+              <a:t> == 18</a:t>
+            </a:r>
+          </a:p>
+          <a:p>
+            <a:pPr lvl="1"/>
+            <a:r>
+              <a:rPr lang="en-US" dirty="0">
+                <a:latin typeface="Courier New" panose="02070309020205020404" pitchFamily="49" charset="0"/>
+                <a:cs typeface="Courier New" panose="02070309020205020404" pitchFamily="49" charset="0"/>
+              </a:rPr>
+              <a:t>SLURM_ARRAY_TASK_STEP</a:t>
+            </a:r>
+            <a:r>
+              <a:rPr lang="en-US" dirty="0"/>
+              <a:t> == 1</a:t>
+            </a:r>
+          </a:p>
+          <a:p>
+            <a:pPr lvl="1"/>
+            <a:r>
+              <a:rPr lang="en-US" dirty="0">
+                <a:latin typeface="Courier New" panose="02070309020205020404" pitchFamily="49" charset="0"/>
+                <a:cs typeface="Courier New" panose="02070309020205020404" pitchFamily="49" charset="0"/>
+              </a:rPr>
+              <a:t>SLURM_ARRAY_TASK_COUNT</a:t>
+            </a:r>
+            <a:r>
+              <a:rPr lang="en-US" dirty="0"/>
+              <a:t> == 14</a:t>
+            </a:r>
+          </a:p>
+          <a:p>
+            <a:pPr lvl="1"/>
+            <a:r>
+              <a:rPr lang="en-US" dirty="0">
+                <a:latin typeface="Courier New" panose="02070309020205020404" pitchFamily="49" charset="0"/>
+                <a:cs typeface="Courier New" panose="02070309020205020404" pitchFamily="49" charset="0"/>
+              </a:rPr>
+              <a:t>SLURM_ARRAY_TASK_ID</a:t>
+            </a:r>
+            <a:r>
+              <a:rPr lang="en-US" dirty="0"/>
+              <a:t> </a:t>
+            </a:r>
+            <a:r>
+              <a:rPr lang="en-US" dirty="0">
+                <a:sym typeface="Symbol" panose="05050102010706020507" pitchFamily="18" charset="2"/>
+              </a:rPr>
+              <a:t></a:t>
+            </a:r>
+            <a:r>
+              <a:rPr lang="en-US" dirty="0"/>
+              <a:t> 5, ..., 18</a:t>
+            </a:r>
+          </a:p>
+          <a:p>
+            <a:r>
+              <a:rPr lang="en-US" dirty="0">
+                <a:latin typeface="Courier New" panose="02070309020205020404" pitchFamily="49" charset="0"/>
+                <a:cs typeface="Courier New" panose="02070309020205020404" pitchFamily="49" charset="0"/>
+              </a:rPr>
+              <a:t>--array=5-18:3</a:t>
+            </a:r>
+          </a:p>
+          <a:p>
+            <a:pPr lvl="1"/>
+            <a:r>
+              <a:rPr lang="en-US" dirty="0">
+                <a:latin typeface="Courier New" panose="02070309020205020404" pitchFamily="49" charset="0"/>
+                <a:cs typeface="Courier New" panose="02070309020205020404" pitchFamily="49" charset="0"/>
+              </a:rPr>
+              <a:t>SLURM_ARRAY_TASK_MIN</a:t>
+            </a:r>
+            <a:r>
+              <a:rPr lang="en-US" dirty="0"/>
+              <a:t> == 5</a:t>
+            </a:r>
+          </a:p>
+          <a:p>
+            <a:pPr lvl="1"/>
+            <a:r>
+              <a:rPr lang="en-US" dirty="0">
+                <a:latin typeface="Courier New" panose="02070309020205020404" pitchFamily="49" charset="0"/>
+                <a:cs typeface="Courier New" panose="02070309020205020404" pitchFamily="49" charset="0"/>
+              </a:rPr>
+              <a:t>SLURM_ARRAY_TASK_MAX</a:t>
+            </a:r>
+            <a:r>
+              <a:rPr lang="en-US" dirty="0"/>
+              <a:t> == </a:t>
+            </a:r>
+            <a:r>
+              <a:rPr lang="en-US" b="1" dirty="0">
+                <a:solidFill>
+                  <a:srgbClr val="FF0000"/>
+                </a:solidFill>
+              </a:rPr>
+              <a:t>17</a:t>
+            </a:r>
+          </a:p>
+          <a:p>
+            <a:pPr lvl="1"/>
+            <a:r>
+              <a:rPr lang="en-US" dirty="0">
+                <a:latin typeface="Courier New" panose="02070309020205020404" pitchFamily="49" charset="0"/>
+                <a:cs typeface="Courier New" panose="02070309020205020404" pitchFamily="49" charset="0"/>
+              </a:rPr>
+              <a:t>SLURM_ARRAY_TASK_STEP</a:t>
+            </a:r>
+            <a:r>
+              <a:rPr lang="en-US" dirty="0"/>
+              <a:t> == 3</a:t>
+            </a:r>
+          </a:p>
+          <a:p>
+            <a:pPr lvl="1"/>
+            <a:r>
+              <a:rPr lang="en-US" dirty="0">
+                <a:latin typeface="Courier New" panose="02070309020205020404" pitchFamily="49" charset="0"/>
+                <a:cs typeface="Courier New" panose="02070309020205020404" pitchFamily="49" charset="0"/>
+              </a:rPr>
+              <a:t>SLURM_ARRAY_TASK_COUNT</a:t>
+            </a:r>
+            <a:r>
+              <a:rPr lang="en-US" dirty="0"/>
+              <a:t> == 5</a:t>
+            </a:r>
+          </a:p>
+          <a:p>
+            <a:pPr lvl="1"/>
+            <a:r>
+              <a:rPr lang="en-US" dirty="0">
+                <a:latin typeface="Courier New" panose="02070309020205020404" pitchFamily="49" charset="0"/>
+                <a:cs typeface="Courier New" panose="02070309020205020404" pitchFamily="49" charset="0"/>
+              </a:rPr>
+              <a:t>SLURM_ARRAY_TASK_ID</a:t>
+            </a:r>
+            <a:r>
+              <a:rPr lang="en-US" dirty="0"/>
+              <a:t> </a:t>
+            </a:r>
+            <a:r>
+              <a:rPr lang="en-US" dirty="0">
+                <a:sym typeface="Symbol" panose="05050102010706020507" pitchFamily="18" charset="2"/>
+              </a:rPr>
+              <a:t></a:t>
+            </a:r>
+            <a:r>
+              <a:rPr lang="en-US" dirty="0"/>
+              <a:t> 5, 8, .., 17</a:t>
+            </a:r>
+            <a:endParaRPr lang="LID4096" dirty="0"/>
+          </a:p>
+        </p:txBody>
+      </p:sp>
+      <p:sp>
+        <p:nvSpPr>
+          <p:cNvPr id="4" name="Content Placeholder 3">
+            <a:extLst>
+              <a:ext uri="{FF2B5EF4-FFF2-40B4-BE49-F238E27FC236}">
+                <a16:creationId xmlns:a16="http://schemas.microsoft.com/office/drawing/2014/main" id="{8DB21F8D-0E53-C591-8000-7D9C92120C59}"/>
+              </a:ext>
+            </a:extLst>
+          </p:cNvPr>
+          <p:cNvSpPr>
+            <a:spLocks noGrp="1"/>
+          </p:cNvSpPr>
+          <p:nvPr>
+            <p:ph sz="half" idx="2"/>
+          </p:nvPr>
+        </p:nvSpPr>
+        <p:spPr/>
+        <p:txBody>
+          <a:bodyPr>
+            <a:normAutofit fontScale="85000" lnSpcReduction="10000"/>
+          </a:bodyPr>
+          <a:lstStyle/>
+          <a:p>
+            <a:r>
+              <a:rPr lang="en-US" dirty="0">
+                <a:latin typeface="Courier New" panose="02070309020205020404" pitchFamily="49" charset="0"/>
+                <a:cs typeface="Courier New" panose="02070309020205020404" pitchFamily="49" charset="0"/>
+              </a:rPr>
+              <a:t>--array=5,9,14</a:t>
+            </a:r>
+          </a:p>
+          <a:p>
+            <a:pPr lvl="1"/>
+            <a:r>
+              <a:rPr lang="en-US" dirty="0">
+                <a:latin typeface="Courier New" panose="02070309020205020404" pitchFamily="49" charset="0"/>
+                <a:cs typeface="Courier New" panose="02070309020205020404" pitchFamily="49" charset="0"/>
+              </a:rPr>
+              <a:t>SLURM_ARRAY_TASK_MIN</a:t>
+            </a:r>
+            <a:r>
+              <a:rPr lang="en-US" dirty="0"/>
+              <a:t> == 5</a:t>
+            </a:r>
+          </a:p>
+          <a:p>
+            <a:pPr lvl="1"/>
+            <a:r>
+              <a:rPr lang="en-US" dirty="0">
+                <a:latin typeface="Courier New" panose="02070309020205020404" pitchFamily="49" charset="0"/>
+                <a:cs typeface="Courier New" panose="02070309020205020404" pitchFamily="49" charset="0"/>
+              </a:rPr>
+              <a:t>SLURM_ARRAY_TASK_MAX</a:t>
+            </a:r>
+            <a:r>
+              <a:rPr lang="en-US" dirty="0"/>
+              <a:t> == 14</a:t>
+            </a:r>
+          </a:p>
+          <a:p>
+            <a:pPr lvl="1"/>
+            <a:r>
+              <a:rPr lang="en-US" dirty="0">
+                <a:latin typeface="Courier New" panose="02070309020205020404" pitchFamily="49" charset="0"/>
+                <a:cs typeface="Courier New" panose="02070309020205020404" pitchFamily="49" charset="0"/>
+              </a:rPr>
+              <a:t>SLURM_ARRAY_TASK_STEP</a:t>
+            </a:r>
+            <a:r>
+              <a:rPr lang="en-US" dirty="0"/>
+              <a:t> == </a:t>
+            </a:r>
+            <a:r>
+              <a:rPr lang="en-US" b="1" dirty="0">
+                <a:solidFill>
+                  <a:srgbClr val="FF0000"/>
+                </a:solidFill>
+              </a:rPr>
+              <a:t>1</a:t>
+            </a:r>
+          </a:p>
+          <a:p>
+            <a:pPr lvl="1"/>
+            <a:r>
+              <a:rPr lang="en-US" dirty="0">
+                <a:latin typeface="Courier New" panose="02070309020205020404" pitchFamily="49" charset="0"/>
+                <a:cs typeface="Courier New" panose="02070309020205020404" pitchFamily="49" charset="0"/>
+              </a:rPr>
+              <a:t>SLURM_ARRAY_TASK_COUNT</a:t>
+            </a:r>
+            <a:r>
+              <a:rPr lang="en-US" dirty="0"/>
+              <a:t> == 3</a:t>
+            </a:r>
+          </a:p>
+          <a:p>
+            <a:pPr lvl="1"/>
+            <a:r>
+              <a:rPr lang="en-US" dirty="0">
+                <a:latin typeface="Courier New" panose="02070309020205020404" pitchFamily="49" charset="0"/>
+                <a:cs typeface="Courier New" panose="02070309020205020404" pitchFamily="49" charset="0"/>
+              </a:rPr>
+              <a:t>SLURM_ARRAY_TASK_ID</a:t>
+            </a:r>
+            <a:r>
+              <a:rPr lang="en-US" dirty="0"/>
+              <a:t> </a:t>
+            </a:r>
+            <a:r>
+              <a:rPr lang="en-US" dirty="0">
+                <a:sym typeface="Symbol" panose="05050102010706020507" pitchFamily="18" charset="2"/>
+              </a:rPr>
+              <a:t></a:t>
+            </a:r>
+            <a:r>
+              <a:rPr lang="en-US" dirty="0"/>
+              <a:t> 5, 9, 14</a:t>
+            </a:r>
+          </a:p>
+          <a:p>
+            <a:r>
+              <a:rPr lang="en-US" dirty="0">
+                <a:latin typeface="Courier New" panose="02070309020205020404" pitchFamily="49" charset="0"/>
+                <a:cs typeface="Courier New" panose="02070309020205020404" pitchFamily="49" charset="0"/>
+              </a:rPr>
+              <a:t>--array=5,9-18:3</a:t>
+            </a:r>
+          </a:p>
+          <a:p>
+            <a:pPr lvl="1"/>
+            <a:r>
+              <a:rPr lang="en-US" dirty="0">
+                <a:latin typeface="Courier New" panose="02070309020205020404" pitchFamily="49" charset="0"/>
+                <a:cs typeface="Courier New" panose="02070309020205020404" pitchFamily="49" charset="0"/>
+              </a:rPr>
+              <a:t>SLURM_ARRAY_TASK_MIN</a:t>
+            </a:r>
+            <a:r>
+              <a:rPr lang="en-US" dirty="0"/>
+              <a:t> == 1</a:t>
+            </a:r>
+          </a:p>
+          <a:p>
+            <a:pPr lvl="1"/>
+            <a:r>
+              <a:rPr lang="en-US" dirty="0">
+                <a:latin typeface="Courier New" panose="02070309020205020404" pitchFamily="49" charset="0"/>
+                <a:cs typeface="Courier New" panose="02070309020205020404" pitchFamily="49" charset="0"/>
+              </a:rPr>
+              <a:t>SLURM_ARRAY_TASK_MAX</a:t>
+            </a:r>
+            <a:r>
+              <a:rPr lang="en-US" dirty="0"/>
+              <a:t> == 18</a:t>
+            </a:r>
+          </a:p>
+          <a:p>
+            <a:pPr lvl="1"/>
+            <a:r>
+              <a:rPr lang="en-US" dirty="0">
+                <a:latin typeface="Courier New" panose="02070309020205020404" pitchFamily="49" charset="0"/>
+                <a:cs typeface="Courier New" panose="02070309020205020404" pitchFamily="49" charset="0"/>
+              </a:rPr>
+              <a:t>SLURM_ARRAY_TASK_STEP</a:t>
+            </a:r>
+            <a:r>
+              <a:rPr lang="en-US" dirty="0"/>
+              <a:t> == </a:t>
+            </a:r>
+            <a:r>
+              <a:rPr lang="en-US" b="1" dirty="0">
+                <a:solidFill>
+                  <a:srgbClr val="FF0000"/>
+                </a:solidFill>
+              </a:rPr>
+              <a:t>3</a:t>
+            </a:r>
+          </a:p>
+          <a:p>
+            <a:pPr lvl="1"/>
+            <a:r>
+              <a:rPr lang="en-US" dirty="0">
+                <a:latin typeface="Courier New" panose="02070309020205020404" pitchFamily="49" charset="0"/>
+                <a:cs typeface="Courier New" panose="02070309020205020404" pitchFamily="49" charset="0"/>
+              </a:rPr>
+              <a:t>SLURM_ARRAY_TASK_COUNT</a:t>
+            </a:r>
+            <a:r>
+              <a:rPr lang="en-US" dirty="0"/>
+              <a:t> == 5</a:t>
+            </a:r>
+          </a:p>
+          <a:p>
+            <a:pPr lvl="1"/>
+            <a:r>
+              <a:rPr lang="en-US" dirty="0">
+                <a:latin typeface="Courier New" panose="02070309020205020404" pitchFamily="49" charset="0"/>
+                <a:cs typeface="Courier New" panose="02070309020205020404" pitchFamily="49" charset="0"/>
+              </a:rPr>
+              <a:t>SLURM_ARRAY_TASK_ID</a:t>
+            </a:r>
+            <a:r>
+              <a:rPr lang="en-US" dirty="0"/>
+              <a:t> </a:t>
+            </a:r>
+            <a:r>
+              <a:rPr lang="en-US" dirty="0">
+                <a:sym typeface="Symbol" panose="05050102010706020507" pitchFamily="18" charset="2"/>
+              </a:rPr>
+              <a:t></a:t>
+            </a:r>
+            <a:r>
+              <a:rPr lang="en-US" dirty="0"/>
+              <a:t> 1, 9, 12,...,18</a:t>
+            </a:r>
+            <a:endParaRPr lang="LID4096" dirty="0"/>
+          </a:p>
+        </p:txBody>
+      </p:sp>
+      <p:sp>
+        <p:nvSpPr>
+          <p:cNvPr id="5" name="Slide Number Placeholder 4">
+            <a:extLst>
+              <a:ext uri="{FF2B5EF4-FFF2-40B4-BE49-F238E27FC236}">
+                <a16:creationId xmlns:a16="http://schemas.microsoft.com/office/drawing/2014/main" id="{5DDC20D7-011A-5405-7353-A4197AE505CD}"/>
+              </a:ext>
+            </a:extLst>
+          </p:cNvPr>
+          <p:cNvSpPr>
+            <a:spLocks noGrp="1"/>
+          </p:cNvSpPr>
+          <p:nvPr>
+            <p:ph type="sldNum" sz="quarter" idx="12"/>
+          </p:nvPr>
+        </p:nvSpPr>
+        <p:spPr/>
+        <p:txBody>
+          <a:bodyPr/>
+          <a:lstStyle/>
+          <a:p>
+            <a:fld id="{9C7CE217-4467-4B8D-A735-B008FA7C4816}" type="slidenum">
+              <a:rPr lang="LID4096" smtClean="0"/>
+              <a:t>30</a:t>
+            </a:fld>
+            <a:endParaRPr lang="LID4096"/>
+          </a:p>
+        </p:txBody>
+      </p:sp>
+    </p:spTree>
+    <p:extLst>
+      <p:ext uri="{BB962C8B-B14F-4D97-AF65-F5344CB8AC3E}">
+        <p14:creationId xmlns:p14="http://schemas.microsoft.com/office/powerpoint/2010/main" val="2567206314"/>
+      </p:ext>
+    </p:extLst>
+  </p:cSld>
+  <p:clrMapOvr>
+    <a:masterClrMapping/>
+  </p:clrMapOvr>
+</p:sld>
+</file>
+
+<file path=ppt/slides/slide31.xml><?xml version="1.0" encoding="utf-8"?>
+<p:sld xmlns:a="http://schemas.openxmlformats.org/drawingml/2006/main" xmlns:r="http://schemas.openxmlformats.org/officeDocument/2006/relationships" xmlns:p="http://schemas.openxmlformats.org/presentationml/2006/main">
+  <p:cSld>
+    <p:spTree>
+      <p:nvGrpSpPr>
+        <p:cNvPr id="1" name=""/>
+        <p:cNvGrpSpPr/>
+        <p:nvPr/>
+      </p:nvGrpSpPr>
+      <p:grpSpPr>
+        <a:xfrm>
+          <a:off x="0" y="0"/>
+          <a:ext cx="0" cy="0"/>
+          <a:chOff x="0" y="0"/>
+          <a:chExt cx="0" cy="0"/>
+        </a:xfrm>
+      </p:grpSpPr>
+      <p:sp>
+        <p:nvSpPr>
+          <p:cNvPr id="2" name="Title 1">
+            <a:extLst>
+              <a:ext uri="{FF2B5EF4-FFF2-40B4-BE49-F238E27FC236}">
+                <a16:creationId xmlns:a16="http://schemas.microsoft.com/office/drawing/2014/main" id="{8AFC1782-5CB1-4582-63C3-6B1B391B049B}"/>
+              </a:ext>
+            </a:extLst>
+          </p:cNvPr>
+          <p:cNvSpPr>
+            <a:spLocks noGrp="1"/>
+          </p:cNvSpPr>
+          <p:nvPr>
+            <p:ph type="title"/>
+          </p:nvPr>
+        </p:nvSpPr>
+        <p:spPr/>
+        <p:txBody>
+          <a:bodyPr/>
+          <a:lstStyle/>
+          <a:p>
+            <a:r>
+              <a:rPr lang="en-US" dirty="0"/>
+              <a:t>Limits on parallel array execution</a:t>
+            </a:r>
+            <a:endParaRPr lang="LID4096" dirty="0"/>
+          </a:p>
+        </p:txBody>
+      </p:sp>
+      <p:sp>
+        <p:nvSpPr>
+          <p:cNvPr id="6" name="Content Placeholder 5">
+            <a:extLst>
+              <a:ext uri="{FF2B5EF4-FFF2-40B4-BE49-F238E27FC236}">
+                <a16:creationId xmlns:a16="http://schemas.microsoft.com/office/drawing/2014/main" id="{21071377-45C0-390A-CBE6-131291266BDF}"/>
+              </a:ext>
+            </a:extLst>
+          </p:cNvPr>
+          <p:cNvSpPr>
+            <a:spLocks noGrp="1"/>
+          </p:cNvSpPr>
+          <p:nvPr>
+            <p:ph idx="1"/>
+          </p:nvPr>
+        </p:nvSpPr>
+        <p:spPr/>
+        <p:txBody>
+          <a:bodyPr/>
+          <a:lstStyle/>
+          <a:p>
+            <a:r>
+              <a:rPr lang="en-US" dirty="0">
+                <a:cs typeface="Courier New" panose="02070309020205020404" pitchFamily="49" charset="0"/>
+              </a:rPr>
+              <a:t>Array size limited by </a:t>
+            </a:r>
+            <a:r>
+              <a:rPr lang="en-US" dirty="0" err="1">
+                <a:cs typeface="Courier New" panose="02070309020205020404" pitchFamily="49" charset="0"/>
+              </a:rPr>
+              <a:t>Slurm</a:t>
+            </a:r>
+            <a:r>
+              <a:rPr lang="en-US" dirty="0">
+                <a:cs typeface="Courier New" panose="02070309020205020404" pitchFamily="49" charset="0"/>
+              </a:rPr>
+              <a:t> configuration:</a:t>
+            </a:r>
+          </a:p>
+          <a:p>
+            <a:pPr lvl="1"/>
+            <a:r>
+              <a:rPr lang="en-US" dirty="0">
+                <a:cs typeface="Courier New" panose="02070309020205020404" pitchFamily="49" charset="0"/>
+              </a:rPr>
+              <a:t> </a:t>
+            </a:r>
+            <a:r>
+              <a:rPr lang="en-US" dirty="0">
+                <a:latin typeface="Courier New" panose="02070309020205020404" pitchFamily="49" charset="0"/>
+                <a:cs typeface="Courier New" panose="02070309020205020404" pitchFamily="49" charset="0"/>
+              </a:rPr>
+              <a:t>SLURM_ARRAY_TASK_COUNT</a:t>
+            </a:r>
+            <a:r>
+              <a:rPr lang="en-US" dirty="0"/>
+              <a:t> &lt; </a:t>
+            </a:r>
+            <a:r>
+              <a:rPr lang="fr-BE" b="0" i="0" dirty="0" err="1">
+                <a:solidFill>
+                  <a:srgbClr val="46545C"/>
+                </a:solidFill>
+                <a:effectLst/>
+                <a:latin typeface="Courier New" panose="02070309020205020404" pitchFamily="49" charset="0"/>
+                <a:cs typeface="Courier New" panose="02070309020205020404" pitchFamily="49" charset="0"/>
+              </a:rPr>
+              <a:t>MaxArraySize</a:t>
+            </a:r>
+            <a:endParaRPr lang="en-US" dirty="0">
+              <a:cs typeface="Courier New" panose="02070309020205020404" pitchFamily="49" charset="0"/>
+            </a:endParaRPr>
+          </a:p>
+          <a:p>
+            <a:pPr lvl="1"/>
+            <a:r>
+              <a:rPr lang="en-US" dirty="0">
+                <a:cs typeface="Courier New" panose="02070309020205020404" pitchFamily="49" charset="0"/>
+              </a:rPr>
+              <a:t> </a:t>
+            </a:r>
+            <a:r>
+              <a:rPr lang="en-US" dirty="0">
+                <a:latin typeface="Courier New" panose="02070309020205020404" pitchFamily="49" charset="0"/>
+                <a:cs typeface="Courier New" panose="02070309020205020404" pitchFamily="49" charset="0"/>
+              </a:rPr>
+              <a:t>SLURM_ARRAY_TASK_COUNT</a:t>
+            </a:r>
+            <a:r>
+              <a:rPr lang="en-US" dirty="0"/>
+              <a:t> &lt; </a:t>
+            </a:r>
+            <a:r>
+              <a:rPr lang="fr-BE" b="0" i="0" dirty="0" err="1">
+                <a:solidFill>
+                  <a:srgbClr val="46545C"/>
+                </a:solidFill>
+                <a:effectLst/>
+                <a:latin typeface="Courier New" panose="02070309020205020404" pitchFamily="49" charset="0"/>
+                <a:cs typeface="Courier New" panose="02070309020205020404" pitchFamily="49" charset="0"/>
+              </a:rPr>
+              <a:t>MaxSubmitPU</a:t>
+            </a:r>
+            <a:endParaRPr lang="fr-BE" b="0" i="0" dirty="0">
+              <a:solidFill>
+                <a:srgbClr val="46545C"/>
+              </a:solidFill>
+              <a:effectLst/>
+              <a:latin typeface="Courier New" panose="02070309020205020404" pitchFamily="49" charset="0"/>
+              <a:cs typeface="Courier New" panose="02070309020205020404" pitchFamily="49" charset="0"/>
+            </a:endParaRPr>
+          </a:p>
+          <a:p>
+            <a:pPr lvl="1"/>
+            <a:endParaRPr lang="fr-BE" dirty="0">
+              <a:solidFill>
+                <a:srgbClr val="46545C"/>
+              </a:solidFill>
+              <a:latin typeface="Courier New" panose="02070309020205020404" pitchFamily="49" charset="0"/>
+              <a:cs typeface="Courier New" panose="02070309020205020404" pitchFamily="49" charset="0"/>
+            </a:endParaRPr>
+          </a:p>
+          <a:p>
+            <a:endParaRPr lang="fr-BE" dirty="0">
+              <a:solidFill>
+                <a:srgbClr val="46545C"/>
+              </a:solidFill>
+              <a:latin typeface="Courier New" panose="02070309020205020404" pitchFamily="49" charset="0"/>
+              <a:cs typeface="Courier New" panose="02070309020205020404" pitchFamily="49" charset="0"/>
+            </a:endParaRPr>
+          </a:p>
+          <a:p>
+            <a:endParaRPr lang="fr-BE" dirty="0">
+              <a:solidFill>
+                <a:srgbClr val="46545C"/>
+              </a:solidFill>
+              <a:cs typeface="Courier New" panose="02070309020205020404" pitchFamily="49" charset="0"/>
+            </a:endParaRPr>
+          </a:p>
+          <a:p>
+            <a:endParaRPr lang="fr-BE" dirty="0">
+              <a:solidFill>
+                <a:srgbClr val="46545C"/>
+              </a:solidFill>
+              <a:cs typeface="Courier New" panose="02070309020205020404" pitchFamily="49" charset="0"/>
+            </a:endParaRPr>
+          </a:p>
+          <a:p>
+            <a:endParaRPr lang="fr-BE" dirty="0">
+              <a:solidFill>
+                <a:srgbClr val="46545C"/>
+              </a:solidFill>
+              <a:cs typeface="Courier New" panose="02070309020205020404" pitchFamily="49" charset="0"/>
+            </a:endParaRPr>
+          </a:p>
+          <a:p>
+            <a:r>
+              <a:rPr lang="fr-BE" dirty="0">
+                <a:solidFill>
+                  <a:srgbClr val="46545C"/>
+                </a:solidFill>
+                <a:cs typeface="Courier New" panose="02070309020205020404" pitchFamily="49" charset="0"/>
+              </a:rPr>
+              <a:t>User </a:t>
+            </a:r>
+            <a:r>
+              <a:rPr lang="fr-BE" dirty="0" err="1">
+                <a:solidFill>
+                  <a:srgbClr val="46545C"/>
+                </a:solidFill>
+                <a:cs typeface="Courier New" panose="02070309020205020404" pitchFamily="49" charset="0"/>
+              </a:rPr>
+              <a:t>limit</a:t>
+            </a:r>
+            <a:r>
+              <a:rPr lang="fr-BE" dirty="0">
+                <a:solidFill>
+                  <a:srgbClr val="46545C"/>
+                </a:solidFill>
+                <a:cs typeface="Courier New" panose="02070309020205020404" pitchFamily="49" charset="0"/>
+              </a:rPr>
+              <a:t> on running jobs: </a:t>
+            </a:r>
+            <a:r>
+              <a:rPr lang="fr-BE" dirty="0">
+                <a:solidFill>
+                  <a:srgbClr val="46545C"/>
+                </a:solidFill>
+                <a:latin typeface="Courier New" panose="02070309020205020404" pitchFamily="49" charset="0"/>
+                <a:cs typeface="Courier New" panose="02070309020205020404" pitchFamily="49" charset="0"/>
+              </a:rPr>
+              <a:t>--</a:t>
+            </a:r>
+            <a:r>
+              <a:rPr lang="fr-BE" dirty="0" err="1">
+                <a:solidFill>
+                  <a:srgbClr val="46545C"/>
+                </a:solidFill>
+                <a:latin typeface="Courier New" panose="02070309020205020404" pitchFamily="49" charset="0"/>
+                <a:cs typeface="Courier New" panose="02070309020205020404" pitchFamily="49" charset="0"/>
+              </a:rPr>
+              <a:t>array</a:t>
+            </a:r>
+            <a:r>
+              <a:rPr lang="fr-BE" dirty="0">
+                <a:solidFill>
+                  <a:srgbClr val="46545C"/>
+                </a:solidFill>
+                <a:latin typeface="Courier New" panose="02070309020205020404" pitchFamily="49" charset="0"/>
+                <a:cs typeface="Courier New" panose="02070309020205020404" pitchFamily="49" charset="0"/>
+              </a:rPr>
+              <a:t>=1-200</a:t>
+            </a:r>
+            <a:r>
+              <a:rPr lang="fr-BE" b="1" dirty="0">
+                <a:solidFill>
+                  <a:srgbClr val="FF0000"/>
+                </a:solidFill>
+                <a:latin typeface="Courier New" panose="02070309020205020404" pitchFamily="49" charset="0"/>
+                <a:cs typeface="Courier New" panose="02070309020205020404" pitchFamily="49" charset="0"/>
+              </a:rPr>
+              <a:t>%5</a:t>
+            </a:r>
+            <a:endParaRPr lang="LID4096" b="1" dirty="0">
+              <a:solidFill>
+                <a:srgbClr val="FF0000"/>
+              </a:solidFill>
+              <a:latin typeface="Courier New" panose="02070309020205020404" pitchFamily="49" charset="0"/>
+              <a:cs typeface="Courier New" panose="02070309020205020404" pitchFamily="49" charset="0"/>
+            </a:endParaRPr>
+          </a:p>
+        </p:txBody>
+      </p:sp>
+      <p:sp>
+        <p:nvSpPr>
+          <p:cNvPr id="5" name="Slide Number Placeholder 4">
+            <a:extLst>
+              <a:ext uri="{FF2B5EF4-FFF2-40B4-BE49-F238E27FC236}">
+                <a16:creationId xmlns:a16="http://schemas.microsoft.com/office/drawing/2014/main" id="{1634A59A-6C1A-2F9B-2010-F83E4DA54DCA}"/>
+              </a:ext>
+            </a:extLst>
+          </p:cNvPr>
+          <p:cNvSpPr>
+            <a:spLocks noGrp="1"/>
+          </p:cNvSpPr>
+          <p:nvPr>
+            <p:ph type="sldNum" sz="quarter" idx="12"/>
+          </p:nvPr>
+        </p:nvSpPr>
+        <p:spPr/>
+        <p:txBody>
+          <a:bodyPr/>
+          <a:lstStyle/>
+          <a:p>
+            <a:fld id="{9C7CE217-4467-4B8D-A735-B008FA7C4816}" type="slidenum">
+              <a:rPr lang="LID4096" smtClean="0"/>
+              <a:t>31</a:t>
+            </a:fld>
+            <a:endParaRPr lang="LID4096"/>
+          </a:p>
+        </p:txBody>
+      </p:sp>
+      <p:sp>
+        <p:nvSpPr>
+          <p:cNvPr id="7" name="TextBox 6">
+            <a:extLst>
+              <a:ext uri="{FF2B5EF4-FFF2-40B4-BE49-F238E27FC236}">
+                <a16:creationId xmlns:a16="http://schemas.microsoft.com/office/drawing/2014/main" id="{B0B0089F-F7E8-A365-EB02-5496D885A138}"/>
+              </a:ext>
+            </a:extLst>
+          </p:cNvPr>
+          <p:cNvSpPr txBox="1"/>
+          <p:nvPr/>
+        </p:nvSpPr>
+        <p:spPr>
+          <a:xfrm>
+            <a:off x="1886807" y="3219669"/>
+            <a:ext cx="7072135" cy="2031325"/>
+          </a:xfrm>
+          <a:prstGeom prst="rect">
+            <a:avLst/>
+          </a:prstGeom>
+          <a:solidFill>
+            <a:schemeClr val="tx1"/>
+          </a:solidFill>
+          <a:ln>
+            <a:solidFill>
+              <a:schemeClr val="tx1"/>
+            </a:solidFill>
+          </a:ln>
+        </p:spPr>
+        <p:txBody>
+          <a:bodyPr wrap="square" rtlCol="0">
+            <a:spAutoFit/>
+          </a:bodyPr>
+          <a:lstStyle/>
+          <a:p>
+            <a:r>
+              <a:rPr lang="en-US" b="1" dirty="0">
+                <a:solidFill>
+                  <a:schemeClr val="bg1"/>
+                </a:solidFill>
+                <a:latin typeface="Courier New" pitchFamily="49" charset="0"/>
+                <a:cs typeface="Courier New" pitchFamily="49" charset="0"/>
+              </a:rPr>
+              <a:t>$ </a:t>
+            </a:r>
+            <a:r>
+              <a:rPr lang="en-US" b="1" dirty="0" err="1">
+                <a:solidFill>
+                  <a:schemeClr val="bg1"/>
+                </a:solidFill>
+                <a:latin typeface="Courier New" pitchFamily="49" charset="0"/>
+                <a:cs typeface="Courier New" pitchFamily="49" charset="0"/>
+              </a:rPr>
+              <a:t>scontrol</a:t>
+            </a:r>
+            <a:r>
+              <a:rPr lang="en-US" b="1" dirty="0">
+                <a:solidFill>
+                  <a:schemeClr val="bg1"/>
+                </a:solidFill>
+                <a:latin typeface="Courier New" pitchFamily="49" charset="0"/>
+                <a:cs typeface="Courier New" pitchFamily="49" charset="0"/>
+              </a:rPr>
+              <a:t> show config | grep </a:t>
+            </a:r>
+            <a:r>
+              <a:rPr lang="en-US" b="1" dirty="0" err="1">
+                <a:solidFill>
+                  <a:schemeClr val="bg1"/>
+                </a:solidFill>
+                <a:latin typeface="Courier New" pitchFamily="49" charset="0"/>
+                <a:cs typeface="Courier New" pitchFamily="49" charset="0"/>
+              </a:rPr>
+              <a:t>MaxArraySize</a:t>
+            </a:r>
+            <a:endParaRPr lang="en-US" b="1" dirty="0">
+              <a:solidFill>
+                <a:schemeClr val="bg1"/>
+              </a:solidFill>
+              <a:latin typeface="Courier New" pitchFamily="49" charset="0"/>
+              <a:cs typeface="Courier New" pitchFamily="49" charset="0"/>
+            </a:endParaRPr>
+          </a:p>
+          <a:p>
+            <a:r>
+              <a:rPr lang="en-US" b="1" dirty="0" err="1">
+                <a:solidFill>
+                  <a:schemeClr val="bg1"/>
+                </a:solidFill>
+                <a:latin typeface="Courier New" pitchFamily="49" charset="0"/>
+                <a:cs typeface="Courier New" pitchFamily="49" charset="0"/>
+              </a:rPr>
+              <a:t>MaxArraySize</a:t>
+            </a:r>
+            <a:r>
+              <a:rPr lang="en-US" b="1" dirty="0">
+                <a:solidFill>
+                  <a:schemeClr val="bg1"/>
+                </a:solidFill>
+                <a:latin typeface="Courier New" pitchFamily="49" charset="0"/>
+                <a:cs typeface="Courier New" pitchFamily="49" charset="0"/>
+              </a:rPr>
+              <a:t>            = 1001</a:t>
+            </a:r>
+          </a:p>
+          <a:p>
+            <a:endParaRPr lang="en-US" b="1" dirty="0">
+              <a:solidFill>
+                <a:schemeClr val="bg1"/>
+              </a:solidFill>
+              <a:latin typeface="Courier New" pitchFamily="49" charset="0"/>
+              <a:cs typeface="Courier New" pitchFamily="49" charset="0"/>
+            </a:endParaRPr>
+          </a:p>
+          <a:p>
+            <a:r>
+              <a:rPr lang="en-US" b="1" dirty="0">
+                <a:solidFill>
+                  <a:schemeClr val="bg1"/>
+                </a:solidFill>
+                <a:latin typeface="Courier New" pitchFamily="49" charset="0"/>
+                <a:cs typeface="Courier New" pitchFamily="49" charset="0"/>
+              </a:rPr>
+              <a:t>$ </a:t>
+            </a:r>
+            <a:r>
+              <a:rPr lang="en-US" b="1" dirty="0" err="1">
+                <a:solidFill>
+                  <a:schemeClr val="bg1"/>
+                </a:solidFill>
+                <a:latin typeface="Courier New" pitchFamily="49" charset="0"/>
+                <a:cs typeface="Courier New" pitchFamily="49" charset="0"/>
+              </a:rPr>
+              <a:t>sacctmgr</a:t>
+            </a:r>
+            <a:r>
+              <a:rPr lang="en-US" b="1" dirty="0">
+                <a:solidFill>
+                  <a:schemeClr val="bg1"/>
+                </a:solidFill>
+                <a:latin typeface="Courier New" pitchFamily="49" charset="0"/>
+                <a:cs typeface="Courier New" pitchFamily="49" charset="0"/>
+              </a:rPr>
+              <a:t> show </a:t>
+            </a:r>
+            <a:r>
+              <a:rPr lang="en-US" b="1" dirty="0" err="1">
+                <a:solidFill>
+                  <a:schemeClr val="bg1"/>
+                </a:solidFill>
+                <a:latin typeface="Courier New" pitchFamily="49" charset="0"/>
+                <a:cs typeface="Courier New" pitchFamily="49" charset="0"/>
+              </a:rPr>
+              <a:t>qos</a:t>
+            </a:r>
+            <a:r>
+              <a:rPr lang="en-US" b="1" dirty="0">
+                <a:solidFill>
+                  <a:schemeClr val="bg1"/>
+                </a:solidFill>
+                <a:latin typeface="Courier New" pitchFamily="49" charset="0"/>
+                <a:cs typeface="Courier New" pitchFamily="49" charset="0"/>
+              </a:rPr>
+              <a:t> normal format=</a:t>
+            </a:r>
+            <a:r>
+              <a:rPr lang="en-US" b="1" dirty="0" err="1">
+                <a:solidFill>
+                  <a:schemeClr val="bg1"/>
+                </a:solidFill>
+                <a:latin typeface="Courier New" pitchFamily="49" charset="0"/>
+                <a:cs typeface="Courier New" pitchFamily="49" charset="0"/>
+              </a:rPr>
+              <a:t>Name,MaxSubmitPU</a:t>
+            </a:r>
+            <a:endParaRPr lang="en-US" b="1" dirty="0">
+              <a:solidFill>
+                <a:schemeClr val="bg1"/>
+              </a:solidFill>
+              <a:latin typeface="Courier New" pitchFamily="49" charset="0"/>
+              <a:cs typeface="Courier New" pitchFamily="49" charset="0"/>
+            </a:endParaRPr>
+          </a:p>
+          <a:p>
+            <a:r>
+              <a:rPr lang="en-US" b="1" dirty="0">
+                <a:solidFill>
+                  <a:schemeClr val="bg1"/>
+                </a:solidFill>
+                <a:latin typeface="Courier New" pitchFamily="49" charset="0"/>
+                <a:cs typeface="Courier New" pitchFamily="49" charset="0"/>
+              </a:rPr>
+              <a:t>      Name </a:t>
+            </a:r>
+            <a:r>
+              <a:rPr lang="en-US" b="1" dirty="0" err="1">
+                <a:solidFill>
+                  <a:schemeClr val="bg1"/>
+                </a:solidFill>
+                <a:latin typeface="Courier New" pitchFamily="49" charset="0"/>
+                <a:cs typeface="Courier New" pitchFamily="49" charset="0"/>
+              </a:rPr>
+              <a:t>MaxSubmitPU</a:t>
+            </a:r>
+            <a:endParaRPr lang="en-US" b="1" dirty="0">
+              <a:solidFill>
+                <a:schemeClr val="bg1"/>
+              </a:solidFill>
+              <a:latin typeface="Courier New" pitchFamily="49" charset="0"/>
+              <a:cs typeface="Courier New" pitchFamily="49" charset="0"/>
+            </a:endParaRPr>
+          </a:p>
+          <a:p>
+            <a:r>
+              <a:rPr lang="en-US" b="1" dirty="0">
+                <a:solidFill>
+                  <a:schemeClr val="bg1"/>
+                </a:solidFill>
+                <a:latin typeface="Courier New" pitchFamily="49" charset="0"/>
+                <a:cs typeface="Courier New" pitchFamily="49" charset="0"/>
+              </a:rPr>
+              <a:t>---------- -----------</a:t>
+            </a:r>
+          </a:p>
+          <a:p>
+            <a:r>
+              <a:rPr lang="en-US" b="1" dirty="0">
+                <a:solidFill>
+                  <a:schemeClr val="bg1"/>
+                </a:solidFill>
+                <a:latin typeface="Courier New" pitchFamily="49" charset="0"/>
+                <a:cs typeface="Courier New" pitchFamily="49" charset="0"/>
+              </a:rPr>
+              <a:t>    normal         150</a:t>
+            </a:r>
+          </a:p>
+        </p:txBody>
+      </p:sp>
+      <p:grpSp>
+        <p:nvGrpSpPr>
+          <p:cNvPr id="8" name="Group 7">
+            <a:extLst>
+              <a:ext uri="{FF2B5EF4-FFF2-40B4-BE49-F238E27FC236}">
+                <a16:creationId xmlns:a16="http://schemas.microsoft.com/office/drawing/2014/main" id="{A33F83EB-DFE4-1CEE-49F3-73FD6F2B24C3}"/>
+              </a:ext>
+            </a:extLst>
+          </p:cNvPr>
+          <p:cNvGrpSpPr/>
+          <p:nvPr/>
+        </p:nvGrpSpPr>
+        <p:grpSpPr>
+          <a:xfrm>
+            <a:off x="3581401" y="6009166"/>
+            <a:ext cx="4561113" cy="578016"/>
+            <a:chOff x="4008158" y="4263763"/>
+            <a:chExt cx="4561113" cy="578016"/>
+          </a:xfrm>
+        </p:grpSpPr>
+        <p:cxnSp>
+          <p:nvCxnSpPr>
+            <p:cNvPr id="9" name="Straight Arrow Connector 8">
+              <a:extLst>
+                <a:ext uri="{FF2B5EF4-FFF2-40B4-BE49-F238E27FC236}">
+                  <a16:creationId xmlns:a16="http://schemas.microsoft.com/office/drawing/2014/main" id="{7C4CA3ED-7A4E-A09C-77C0-915A79CE36BD}"/>
+                </a:ext>
+              </a:extLst>
+            </p:cNvPr>
+            <p:cNvCxnSpPr>
+              <a:cxnSpLocks/>
+              <a:stCxn id="10" idx="3"/>
+            </p:cNvCxnSpPr>
+            <p:nvPr/>
+          </p:nvCxnSpPr>
+          <p:spPr>
+            <a:xfrm flipV="1">
+              <a:off x="8019577" y="4263763"/>
+              <a:ext cx="549694" cy="347184"/>
+            </a:xfrm>
+            <a:prstGeom prst="straightConnector1">
+              <a:avLst/>
+            </a:prstGeom>
+            <a:ln w="28575">
+              <a:solidFill>
+                <a:schemeClr val="tx1"/>
+              </a:solidFill>
+              <a:tailEnd type="stealth" w="lg" len="lg"/>
+            </a:ln>
+          </p:spPr>
+          <p:style>
+            <a:lnRef idx="2">
+              <a:schemeClr val="accent1"/>
+            </a:lnRef>
+            <a:fillRef idx="0">
+              <a:schemeClr val="accent1"/>
+            </a:fillRef>
+            <a:effectRef idx="1">
+              <a:schemeClr val="accent1"/>
+            </a:effectRef>
+            <a:fontRef idx="minor">
+              <a:schemeClr val="tx1"/>
+            </a:fontRef>
+          </p:style>
+        </p:cxnSp>
+        <p:sp>
+          <p:nvSpPr>
+            <p:cNvPr id="10" name="TextBox 9">
+              <a:extLst>
+                <a:ext uri="{FF2B5EF4-FFF2-40B4-BE49-F238E27FC236}">
+                  <a16:creationId xmlns:a16="http://schemas.microsoft.com/office/drawing/2014/main" id="{5E1985E9-6A2A-8A7E-95DF-23E5FDBD63FB}"/>
+                </a:ext>
+              </a:extLst>
+            </p:cNvPr>
+            <p:cNvSpPr txBox="1"/>
+            <p:nvPr/>
+          </p:nvSpPr>
+          <p:spPr>
+            <a:xfrm>
+              <a:off x="4008158" y="4380114"/>
+              <a:ext cx="4011419" cy="461665"/>
+            </a:xfrm>
+            <a:prstGeom prst="rect">
+              <a:avLst/>
+            </a:prstGeom>
+            <a:noFill/>
+            <a:ln>
+              <a:solidFill>
+                <a:schemeClr val="tx1"/>
+              </a:solidFill>
+            </a:ln>
+          </p:spPr>
+          <p:txBody>
+            <a:bodyPr wrap="none" rtlCol="0">
+              <a:spAutoFit/>
+            </a:bodyPr>
+            <a:lstStyle/>
+            <a:p>
+              <a:pPr algn="ctr"/>
+              <a:r>
+                <a:rPr lang="en-US" sz="2400" dirty="0"/>
+                <a:t>Maximum simultaneous jobs</a:t>
+              </a:r>
+              <a:endParaRPr lang="LID4096" sz="2400" dirty="0"/>
+            </a:p>
+          </p:txBody>
+        </p:sp>
+      </p:grpSp>
+    </p:spTree>
+    <p:extLst>
+      <p:ext uri="{BB962C8B-B14F-4D97-AF65-F5344CB8AC3E}">
+        <p14:creationId xmlns:p14="http://schemas.microsoft.com/office/powerpoint/2010/main" val="2436118566"/>
+      </p:ext>
+    </p:extLst>
+  </p:cSld>
+  <p:clrMapOvr>
+    <a:masterClrMapping/>
+  </p:clrMapOvr>
+  <p:timing>
+    <p:tnLst>
+      <p:par>
+        <p:cTn id="1" dur="indefinite" restart="never" nodeType="tmRoot">
+          <p:childTnLst>
+            <p:seq concurrent="1" nextAc="seek">
+              <p:cTn id="2" dur="indefinite" nodeType="mainSeq">
+                <p:childTnLst>
+                  <p:par>
+                    <p:cTn id="3" fill="hold">
+                      <p:stCondLst>
+                        <p:cond delay="indefinite"/>
+                        <p:cond evt="onBegin" delay="0">
+                          <p:tn val="2"/>
+                        </p:cond>
+                      </p:stCondLst>
+                      <p:childTnLst>
+                        <p:par>
+                          <p:cTn id="4" fill="hold">
+                            <p:stCondLst>
+                              <p:cond delay="0"/>
+                            </p:stCondLst>
+                            <p:childTnLst>
+                              <p:par>
+                                <p:cTn id="5" presetID="1" presetClass="entr" presetSubtype="0" fill="hold" grpId="0" nodeType="withEffect">
+                                  <p:stCondLst>
+                                    <p:cond delay="0"/>
+                                  </p:stCondLst>
+                                  <p:childTnLst>
+                                    <p:set>
+                                      <p:cBhvr>
+                                        <p:cTn id="6" dur="1" fill="hold">
+                                          <p:stCondLst>
+                                            <p:cond delay="0"/>
+                                          </p:stCondLst>
+                                        </p:cTn>
+                                        <p:tgtEl>
+                                          <p:spTgt spid="7"/>
+                                        </p:tgtEl>
+                                        <p:attrNameLst>
+                                          <p:attrName>style.visibility</p:attrName>
+                                        </p:attrNameLst>
+                                      </p:cBhvr>
+                                      <p:to>
+                                        <p:strVal val="visible"/>
+                                      </p:to>
+                                    </p:set>
+                                  </p:childTnLst>
+                                </p:cTn>
+                              </p:par>
+                            </p:childTnLst>
+                          </p:cTn>
+                        </p:par>
+                      </p:childTnLst>
+                    </p:cTn>
+                  </p:par>
+                </p:childTnLst>
+              </p:cTn>
+              <p:prevCondLst>
+                <p:cond evt="onPrev" delay="0">
+                  <p:tgtEl>
+                    <p:sldTgt/>
+                  </p:tgtEl>
+                </p:cond>
+              </p:prevCondLst>
+              <p:nextCondLst>
+                <p:cond evt="onNext" delay="0">
+                  <p:tgtEl>
+                    <p:sldTgt/>
+                  </p:tgtEl>
+                </p:cond>
+              </p:nextCondLst>
+            </p:seq>
+          </p:childTnLst>
+        </p:cTn>
+      </p:par>
+    </p:tnLst>
+    <p:bldLst>
+      <p:bldP spid="7" grpId="0" animBg="1"/>
+    </p:bldLst>
+  </p:timing>
 </p:sld>
 </file>
 

</xml_diff>

<commit_message>
Add slide on dependencies on array jobs
</commit_message>
<xml_diff>
--- a/workflow_for_HPC.pptx
+++ b/workflow_for_HPC.pptx
@@ -5,7 +5,7 @@
     <p:sldMasterId id="2147483648" r:id="rId1"/>
   </p:sldMasterIdLst>
   <p:notesMasterIdLst>
-    <p:notesMasterId r:id="rId33"/>
+    <p:notesMasterId r:id="rId34"/>
   </p:notesMasterIdLst>
   <p:sldIdLst>
     <p:sldId id="257" r:id="rId2"/>
@@ -39,6 +39,7 @@
     <p:sldId id="382" r:id="rId30"/>
     <p:sldId id="383" r:id="rId31"/>
     <p:sldId id="384" r:id="rId32"/>
+    <p:sldId id="386" r:id="rId33"/>
   </p:sldIdLst>
   <p:sldSz cx="12192000" cy="6858000"/>
   <p:notesSz cx="6858000" cy="9144000"/>
@@ -21689,6 +21690,1767 @@
 </p:sld>
 </file>
 
+<file path=ppt/slides/slide32.xml><?xml version="1.0" encoding="utf-8"?>
+<p:sld xmlns:a="http://schemas.openxmlformats.org/drawingml/2006/main" xmlns:r="http://schemas.openxmlformats.org/officeDocument/2006/relationships" xmlns:p="http://schemas.openxmlformats.org/presentationml/2006/main">
+  <p:cSld>
+    <p:spTree>
+      <p:nvGrpSpPr>
+        <p:cNvPr id="1" name=""/>
+        <p:cNvGrpSpPr/>
+        <p:nvPr/>
+      </p:nvGrpSpPr>
+      <p:grpSpPr>
+        <a:xfrm>
+          <a:off x="0" y="0"/>
+          <a:ext cx="0" cy="0"/>
+          <a:chOff x="0" y="0"/>
+          <a:chExt cx="0" cy="0"/>
+        </a:xfrm>
+      </p:grpSpPr>
+      <p:sp>
+        <p:nvSpPr>
+          <p:cNvPr id="2" name="Title 1">
+            <a:extLst>
+              <a:ext uri="{FF2B5EF4-FFF2-40B4-BE49-F238E27FC236}">
+                <a16:creationId xmlns:a16="http://schemas.microsoft.com/office/drawing/2014/main" id="{02D41FC0-A6BC-0F58-79FD-74C501963F34}"/>
+              </a:ext>
+            </a:extLst>
+          </p:cNvPr>
+          <p:cNvSpPr>
+            <a:spLocks noGrp="1"/>
+          </p:cNvSpPr>
+          <p:nvPr>
+            <p:ph type="title"/>
+          </p:nvPr>
+        </p:nvSpPr>
+        <p:spPr/>
+        <p:txBody>
+          <a:bodyPr/>
+          <a:lstStyle/>
+          <a:p>
+            <a:r>
+              <a:rPr lang="en-US" dirty="0"/>
+              <a:t>Job dependencies &amp; arrays</a:t>
+            </a:r>
+            <a:endParaRPr lang="LID4096" dirty="0"/>
+          </a:p>
+        </p:txBody>
+      </p:sp>
+      <p:sp>
+        <p:nvSpPr>
+          <p:cNvPr id="3" name="Content Placeholder 2">
+            <a:extLst>
+              <a:ext uri="{FF2B5EF4-FFF2-40B4-BE49-F238E27FC236}">
+                <a16:creationId xmlns:a16="http://schemas.microsoft.com/office/drawing/2014/main" id="{164F14EA-5D2F-3508-D3BA-326324506707}"/>
+              </a:ext>
+            </a:extLst>
+          </p:cNvPr>
+          <p:cNvSpPr>
+            <a:spLocks noGrp="1"/>
+          </p:cNvSpPr>
+          <p:nvPr>
+            <p:ph sz="half" idx="1"/>
+          </p:nvPr>
+        </p:nvSpPr>
+        <p:spPr/>
+        <p:txBody>
+          <a:bodyPr/>
+          <a:lstStyle/>
+          <a:p>
+            <a:r>
+              <a:rPr lang="en-US" sz="2400" dirty="0"/>
+              <a:t>Start after successful completion of all array jobs </a:t>
+            </a:r>
+            <a:r>
+              <a:rPr lang="en-US" sz="2400" dirty="0">
+                <a:latin typeface="Courier New" panose="02070309020205020404" pitchFamily="49" charset="0"/>
+                <a:cs typeface="Courier New" panose="02070309020205020404" pitchFamily="49" charset="0"/>
+              </a:rPr>
+              <a:t>553[1-200]</a:t>
+            </a:r>
+            <a:br>
+              <a:rPr lang="en-US" sz="2400" dirty="0">
+                <a:latin typeface="Courier New" panose="02070309020205020404" pitchFamily="49" charset="0"/>
+                <a:cs typeface="Courier New" panose="02070309020205020404" pitchFamily="49" charset="0"/>
+              </a:rPr>
+            </a:br>
+            <a:r>
+              <a:rPr lang="en-US" sz="2400" dirty="0">
+                <a:latin typeface="Courier New" panose="02070309020205020404" pitchFamily="49" charset="0"/>
+                <a:cs typeface="Courier New" panose="02070309020205020404" pitchFamily="49" charset="0"/>
+              </a:rPr>
+              <a:t>--dependency=afterok:553</a:t>
+            </a:r>
+            <a:endParaRPr lang="LID4096" dirty="0"/>
+          </a:p>
+        </p:txBody>
+      </p:sp>
+      <p:sp>
+        <p:nvSpPr>
+          <p:cNvPr id="4" name="Content Placeholder 3">
+            <a:extLst>
+              <a:ext uri="{FF2B5EF4-FFF2-40B4-BE49-F238E27FC236}">
+                <a16:creationId xmlns:a16="http://schemas.microsoft.com/office/drawing/2014/main" id="{5BAE1618-60D4-5D52-507B-09D391D9089A}"/>
+              </a:ext>
+            </a:extLst>
+          </p:cNvPr>
+          <p:cNvSpPr>
+            <a:spLocks noGrp="1"/>
+          </p:cNvSpPr>
+          <p:nvPr>
+            <p:ph sz="half" idx="2"/>
+          </p:nvPr>
+        </p:nvSpPr>
+        <p:spPr/>
+        <p:txBody>
+          <a:bodyPr>
+            <a:normAutofit/>
+          </a:bodyPr>
+          <a:lstStyle/>
+          <a:p>
+            <a:r>
+              <a:rPr lang="en-US" sz="2400" dirty="0"/>
+              <a:t>Chain array job after array jobs </a:t>
+            </a:r>
+            <a:r>
+              <a:rPr lang="en-US" sz="2400" dirty="0">
+                <a:latin typeface="Courier New" panose="02070309020205020404" pitchFamily="49" charset="0"/>
+                <a:cs typeface="Courier New" panose="02070309020205020404" pitchFamily="49" charset="0"/>
+              </a:rPr>
+              <a:t>553[1-200]</a:t>
+            </a:r>
+            <a:br>
+              <a:rPr lang="en-US" sz="2400" dirty="0">
+                <a:latin typeface="Courier New" panose="02070309020205020404" pitchFamily="49" charset="0"/>
+                <a:cs typeface="Courier New" panose="02070309020205020404" pitchFamily="49" charset="0"/>
+              </a:rPr>
+            </a:br>
+            <a:r>
+              <a:rPr lang="en-US" sz="2400" dirty="0">
+                <a:latin typeface="Courier New" panose="02070309020205020404" pitchFamily="49" charset="0"/>
+                <a:cs typeface="Courier New" panose="02070309020205020404" pitchFamily="49" charset="0"/>
+              </a:rPr>
+              <a:t>--dependency=aftercorr:553</a:t>
+            </a:r>
+            <a:endParaRPr lang="LID4096" sz="2400" dirty="0"/>
+          </a:p>
+        </p:txBody>
+      </p:sp>
+      <p:sp>
+        <p:nvSpPr>
+          <p:cNvPr id="5" name="Slide Number Placeholder 4">
+            <a:extLst>
+              <a:ext uri="{FF2B5EF4-FFF2-40B4-BE49-F238E27FC236}">
+                <a16:creationId xmlns:a16="http://schemas.microsoft.com/office/drawing/2014/main" id="{241D67D0-18EA-C244-DDF4-C80C108FFC0C}"/>
+              </a:ext>
+            </a:extLst>
+          </p:cNvPr>
+          <p:cNvSpPr>
+            <a:spLocks noGrp="1"/>
+          </p:cNvSpPr>
+          <p:nvPr>
+            <p:ph type="sldNum" sz="quarter" idx="12"/>
+          </p:nvPr>
+        </p:nvSpPr>
+        <p:spPr/>
+        <p:txBody>
+          <a:bodyPr/>
+          <a:lstStyle/>
+          <a:p>
+            <a:fld id="{9C7CE217-4467-4B8D-A735-B008FA7C4816}" type="slidenum">
+              <a:rPr lang="LID4096" smtClean="0"/>
+              <a:t>32</a:t>
+            </a:fld>
+            <a:endParaRPr lang="LID4096"/>
+          </a:p>
+        </p:txBody>
+      </p:sp>
+      <p:sp>
+        <p:nvSpPr>
+          <p:cNvPr id="6" name="TextBox 5">
+            <a:extLst>
+              <a:ext uri="{FF2B5EF4-FFF2-40B4-BE49-F238E27FC236}">
+                <a16:creationId xmlns:a16="http://schemas.microsoft.com/office/drawing/2014/main" id="{DC226FCF-1EAC-80F1-6437-EC3C833FB145}"/>
+              </a:ext>
+            </a:extLst>
+          </p:cNvPr>
+          <p:cNvSpPr txBox="1"/>
+          <p:nvPr/>
+        </p:nvSpPr>
+        <p:spPr>
+          <a:xfrm>
+            <a:off x="7270013" y="4876795"/>
+            <a:ext cx="506870" cy="523220"/>
+          </a:xfrm>
+          <a:prstGeom prst="rect">
+            <a:avLst/>
+          </a:prstGeom>
+          <a:noFill/>
+        </p:spPr>
+        <p:txBody>
+          <a:bodyPr wrap="none" rtlCol="0">
+            <a:spAutoFit/>
+          </a:bodyPr>
+          <a:lstStyle/>
+          <a:p>
+            <a:r>
+              <a:rPr lang="en-US" sz="2800" b="1" dirty="0"/>
+              <a:t>...</a:t>
+            </a:r>
+            <a:endParaRPr lang="LID4096" sz="2800" b="1" dirty="0"/>
+          </a:p>
+        </p:txBody>
+      </p:sp>
+      <p:grpSp>
+        <p:nvGrpSpPr>
+          <p:cNvPr id="7" name="Group 6">
+            <a:extLst>
+              <a:ext uri="{FF2B5EF4-FFF2-40B4-BE49-F238E27FC236}">
+                <a16:creationId xmlns:a16="http://schemas.microsoft.com/office/drawing/2014/main" id="{3FDB27B0-248E-D0C8-7BDA-5E090ED33C37}"/>
+              </a:ext>
+            </a:extLst>
+          </p:cNvPr>
+          <p:cNvGrpSpPr/>
+          <p:nvPr/>
+        </p:nvGrpSpPr>
+        <p:grpSpPr>
+          <a:xfrm>
+            <a:off x="6643806" y="3678510"/>
+            <a:ext cx="1736965" cy="615519"/>
+            <a:chOff x="1375126" y="3678510"/>
+            <a:chExt cx="1736965" cy="615519"/>
+          </a:xfrm>
+        </p:grpSpPr>
+        <p:sp>
+          <p:nvSpPr>
+            <p:cNvPr id="8" name="Rectangle: Rounded Corners 7">
+              <a:extLst>
+                <a:ext uri="{FF2B5EF4-FFF2-40B4-BE49-F238E27FC236}">
+                  <a16:creationId xmlns:a16="http://schemas.microsoft.com/office/drawing/2014/main" id="{255A91AA-2D1C-F736-2BD0-F5F51DC95998}"/>
+                </a:ext>
+              </a:extLst>
+            </p:cNvPr>
+            <p:cNvSpPr/>
+            <p:nvPr/>
+          </p:nvSpPr>
+          <p:spPr>
+            <a:xfrm>
+              <a:off x="1375126" y="3770809"/>
+              <a:ext cx="1574903" cy="523220"/>
+            </a:xfrm>
+            <a:prstGeom prst="roundRect">
+              <a:avLst/>
+            </a:prstGeom>
+          </p:spPr>
+          <p:style>
+            <a:lnRef idx="2">
+              <a:schemeClr val="accent1">
+                <a:shade val="15000"/>
+              </a:schemeClr>
+            </a:lnRef>
+            <a:fillRef idx="1">
+              <a:schemeClr val="accent1"/>
+            </a:fillRef>
+            <a:effectRef idx="0">
+              <a:schemeClr val="accent1"/>
+            </a:effectRef>
+            <a:fontRef idx="minor">
+              <a:schemeClr val="lt1"/>
+            </a:fontRef>
+          </p:style>
+          <p:txBody>
+            <a:bodyPr rtlCol="0" anchor="ctr"/>
+            <a:lstStyle/>
+            <a:p>
+              <a:pPr algn="ctr"/>
+              <a:r>
+                <a:rPr lang="en-US" dirty="0"/>
+                <a:t>Job 553_1</a:t>
+              </a:r>
+              <a:endParaRPr lang="LID4096" dirty="0"/>
+            </a:p>
+          </p:txBody>
+        </p:sp>
+        <p:sp>
+          <p:nvSpPr>
+            <p:cNvPr id="9" name="TextBox 8">
+              <a:extLst>
+                <a:ext uri="{FF2B5EF4-FFF2-40B4-BE49-F238E27FC236}">
+                  <a16:creationId xmlns:a16="http://schemas.microsoft.com/office/drawing/2014/main" id="{72D32BCD-2B07-911D-AEE3-CCB58CC02AE5}"/>
+                </a:ext>
+              </a:extLst>
+            </p:cNvPr>
+            <p:cNvSpPr txBox="1"/>
+            <p:nvPr/>
+          </p:nvSpPr>
+          <p:spPr>
+            <a:xfrm>
+              <a:off x="2787963" y="3678510"/>
+              <a:ext cx="324128" cy="369332"/>
+            </a:xfrm>
+            <a:prstGeom prst="rect">
+              <a:avLst/>
+            </a:prstGeom>
+            <a:solidFill>
+              <a:schemeClr val="bg1"/>
+            </a:solidFill>
+            <a:ln>
+              <a:solidFill>
+                <a:schemeClr val="tx1"/>
+              </a:solidFill>
+            </a:ln>
+          </p:spPr>
+          <p:txBody>
+            <a:bodyPr wrap="none" rtlCol="0">
+              <a:spAutoFit/>
+            </a:bodyPr>
+            <a:lstStyle/>
+            <a:p>
+              <a:r>
+                <a:rPr lang="en-US" dirty="0"/>
+                <a:t>R</a:t>
+              </a:r>
+              <a:endParaRPr lang="LID4096" dirty="0"/>
+            </a:p>
+          </p:txBody>
+        </p:sp>
+      </p:grpSp>
+      <p:grpSp>
+        <p:nvGrpSpPr>
+          <p:cNvPr id="10" name="Group 9">
+            <a:extLst>
+              <a:ext uri="{FF2B5EF4-FFF2-40B4-BE49-F238E27FC236}">
+                <a16:creationId xmlns:a16="http://schemas.microsoft.com/office/drawing/2014/main" id="{C5A98D5D-E828-09F4-F9C2-9C79DFB4B173}"/>
+              </a:ext>
+            </a:extLst>
+          </p:cNvPr>
+          <p:cNvGrpSpPr/>
+          <p:nvPr/>
+        </p:nvGrpSpPr>
+        <p:grpSpPr>
+          <a:xfrm>
+            <a:off x="6643805" y="4386174"/>
+            <a:ext cx="1736966" cy="581955"/>
+            <a:chOff x="1375125" y="4386174"/>
+            <a:chExt cx="1736966" cy="581955"/>
+          </a:xfrm>
+        </p:grpSpPr>
+        <p:sp>
+          <p:nvSpPr>
+            <p:cNvPr id="11" name="Rectangle: Rounded Corners 10">
+              <a:extLst>
+                <a:ext uri="{FF2B5EF4-FFF2-40B4-BE49-F238E27FC236}">
+                  <a16:creationId xmlns:a16="http://schemas.microsoft.com/office/drawing/2014/main" id="{09BADB98-B729-3D0F-FFE3-6CE230102EEF}"/>
+                </a:ext>
+              </a:extLst>
+            </p:cNvPr>
+            <p:cNvSpPr/>
+            <p:nvPr/>
+          </p:nvSpPr>
+          <p:spPr>
+            <a:xfrm>
+              <a:off x="1375125" y="4444909"/>
+              <a:ext cx="1574903" cy="523220"/>
+            </a:xfrm>
+            <a:prstGeom prst="roundRect">
+              <a:avLst/>
+            </a:prstGeom>
+          </p:spPr>
+          <p:style>
+            <a:lnRef idx="2">
+              <a:schemeClr val="accent1">
+                <a:shade val="15000"/>
+              </a:schemeClr>
+            </a:lnRef>
+            <a:fillRef idx="1">
+              <a:schemeClr val="accent1"/>
+            </a:fillRef>
+            <a:effectRef idx="0">
+              <a:schemeClr val="accent1"/>
+            </a:effectRef>
+            <a:fontRef idx="minor">
+              <a:schemeClr val="lt1"/>
+            </a:fontRef>
+          </p:style>
+          <p:txBody>
+            <a:bodyPr rtlCol="0" anchor="ctr"/>
+            <a:lstStyle/>
+            <a:p>
+              <a:pPr algn="ctr"/>
+              <a:r>
+                <a:rPr lang="en-US" dirty="0"/>
+                <a:t>Job 553_2</a:t>
+              </a:r>
+              <a:endParaRPr lang="LID4096" dirty="0"/>
+            </a:p>
+          </p:txBody>
+        </p:sp>
+        <p:sp>
+          <p:nvSpPr>
+            <p:cNvPr id="12" name="TextBox 11">
+              <a:extLst>
+                <a:ext uri="{FF2B5EF4-FFF2-40B4-BE49-F238E27FC236}">
+                  <a16:creationId xmlns:a16="http://schemas.microsoft.com/office/drawing/2014/main" id="{73F47BB9-DF65-F128-E587-42B7C3652530}"/>
+                </a:ext>
+              </a:extLst>
+            </p:cNvPr>
+            <p:cNvSpPr txBox="1"/>
+            <p:nvPr/>
+          </p:nvSpPr>
+          <p:spPr>
+            <a:xfrm>
+              <a:off x="2787963" y="4386174"/>
+              <a:ext cx="324128" cy="369332"/>
+            </a:xfrm>
+            <a:prstGeom prst="rect">
+              <a:avLst/>
+            </a:prstGeom>
+            <a:solidFill>
+              <a:schemeClr val="bg1"/>
+            </a:solidFill>
+            <a:ln>
+              <a:solidFill>
+                <a:schemeClr val="tx1"/>
+              </a:solidFill>
+            </a:ln>
+          </p:spPr>
+          <p:txBody>
+            <a:bodyPr wrap="none" rtlCol="0">
+              <a:spAutoFit/>
+            </a:bodyPr>
+            <a:lstStyle/>
+            <a:p>
+              <a:r>
+                <a:rPr lang="en-US" dirty="0"/>
+                <a:t>R</a:t>
+              </a:r>
+              <a:endParaRPr lang="LID4096" dirty="0"/>
+            </a:p>
+          </p:txBody>
+        </p:sp>
+      </p:grpSp>
+      <p:grpSp>
+        <p:nvGrpSpPr>
+          <p:cNvPr id="13" name="Group 12">
+            <a:extLst>
+              <a:ext uri="{FF2B5EF4-FFF2-40B4-BE49-F238E27FC236}">
+                <a16:creationId xmlns:a16="http://schemas.microsoft.com/office/drawing/2014/main" id="{A2167E89-800E-D7D4-BB15-4DED36724D8D}"/>
+              </a:ext>
+            </a:extLst>
+          </p:cNvPr>
+          <p:cNvGrpSpPr/>
+          <p:nvPr/>
+        </p:nvGrpSpPr>
+        <p:grpSpPr>
+          <a:xfrm>
+            <a:off x="6643804" y="5373556"/>
+            <a:ext cx="1860397" cy="631491"/>
+            <a:chOff x="1375124" y="5373556"/>
+            <a:chExt cx="1860397" cy="631491"/>
+          </a:xfrm>
+        </p:grpSpPr>
+        <p:sp>
+          <p:nvSpPr>
+            <p:cNvPr id="14" name="Rectangle: Rounded Corners 13">
+              <a:extLst>
+                <a:ext uri="{FF2B5EF4-FFF2-40B4-BE49-F238E27FC236}">
+                  <a16:creationId xmlns:a16="http://schemas.microsoft.com/office/drawing/2014/main" id="{62A90B81-3D95-82A2-6F00-F26B70295565}"/>
+                </a:ext>
+              </a:extLst>
+            </p:cNvPr>
+            <p:cNvSpPr/>
+            <p:nvPr/>
+          </p:nvSpPr>
+          <p:spPr>
+            <a:xfrm>
+              <a:off x="1375124" y="5481827"/>
+              <a:ext cx="1574903" cy="523220"/>
+            </a:xfrm>
+            <a:prstGeom prst="roundRect">
+              <a:avLst/>
+            </a:prstGeom>
+          </p:spPr>
+          <p:style>
+            <a:lnRef idx="2">
+              <a:schemeClr val="accent1">
+                <a:shade val="15000"/>
+              </a:schemeClr>
+            </a:lnRef>
+            <a:fillRef idx="1">
+              <a:schemeClr val="accent1"/>
+            </a:fillRef>
+            <a:effectRef idx="0">
+              <a:schemeClr val="accent1"/>
+            </a:effectRef>
+            <a:fontRef idx="minor">
+              <a:schemeClr val="lt1"/>
+            </a:fontRef>
+          </p:style>
+          <p:txBody>
+            <a:bodyPr rtlCol="0" anchor="ctr"/>
+            <a:lstStyle/>
+            <a:p>
+              <a:pPr algn="ctr"/>
+              <a:r>
+                <a:rPr lang="en-US" dirty="0"/>
+                <a:t>Job 553_200</a:t>
+              </a:r>
+              <a:endParaRPr lang="LID4096" dirty="0"/>
+            </a:p>
+          </p:txBody>
+        </p:sp>
+        <p:sp>
+          <p:nvSpPr>
+            <p:cNvPr id="15" name="TextBox 14">
+              <a:extLst>
+                <a:ext uri="{FF2B5EF4-FFF2-40B4-BE49-F238E27FC236}">
+                  <a16:creationId xmlns:a16="http://schemas.microsoft.com/office/drawing/2014/main" id="{B95A1362-1D83-3595-AC03-1A31BE4EBC3B}"/>
+                </a:ext>
+              </a:extLst>
+            </p:cNvPr>
+            <p:cNvSpPr txBox="1"/>
+            <p:nvPr/>
+          </p:nvSpPr>
+          <p:spPr>
+            <a:xfrm>
+              <a:off x="2787963" y="5373556"/>
+              <a:ext cx="447558" cy="369332"/>
+            </a:xfrm>
+            <a:prstGeom prst="rect">
+              <a:avLst/>
+            </a:prstGeom>
+            <a:solidFill>
+              <a:schemeClr val="bg1"/>
+            </a:solidFill>
+            <a:ln>
+              <a:solidFill>
+                <a:schemeClr val="tx1"/>
+              </a:solidFill>
+            </a:ln>
+          </p:spPr>
+          <p:txBody>
+            <a:bodyPr wrap="none" rtlCol="0">
+              <a:spAutoFit/>
+            </a:bodyPr>
+            <a:lstStyle/>
+            <a:p>
+              <a:r>
+                <a:rPr lang="en-US" dirty="0"/>
+                <a:t>Pd</a:t>
+              </a:r>
+              <a:endParaRPr lang="LID4096" dirty="0"/>
+            </a:p>
+          </p:txBody>
+        </p:sp>
+      </p:grpSp>
+      <p:sp>
+        <p:nvSpPr>
+          <p:cNvPr id="16" name="Rectangle: Rounded Corners 15">
+            <a:extLst>
+              <a:ext uri="{FF2B5EF4-FFF2-40B4-BE49-F238E27FC236}">
+                <a16:creationId xmlns:a16="http://schemas.microsoft.com/office/drawing/2014/main" id="{2D9CD302-808A-C937-4733-3ED1DD075F96}"/>
+              </a:ext>
+            </a:extLst>
+          </p:cNvPr>
+          <p:cNvSpPr/>
+          <p:nvPr/>
+        </p:nvSpPr>
+        <p:spPr>
+          <a:xfrm>
+            <a:off x="9528519" y="4444909"/>
+            <a:ext cx="1574903" cy="523220"/>
+          </a:xfrm>
+          <a:prstGeom prst="roundRect">
+            <a:avLst/>
+          </a:prstGeom>
+        </p:spPr>
+        <p:style>
+          <a:lnRef idx="2">
+            <a:schemeClr val="accent1">
+              <a:shade val="15000"/>
+            </a:schemeClr>
+          </a:lnRef>
+          <a:fillRef idx="1">
+            <a:schemeClr val="accent1"/>
+          </a:fillRef>
+          <a:effectRef idx="0">
+            <a:schemeClr val="accent1"/>
+          </a:effectRef>
+          <a:fontRef idx="minor">
+            <a:schemeClr val="lt1"/>
+          </a:fontRef>
+        </p:style>
+        <p:txBody>
+          <a:bodyPr rtlCol="0" anchor="ctr"/>
+          <a:lstStyle/>
+          <a:p>
+            <a:pPr algn="ctr"/>
+            <a:r>
+              <a:rPr lang="en-US" dirty="0"/>
+              <a:t>Job 554_2</a:t>
+            </a:r>
+            <a:endParaRPr lang="LID4096" dirty="0"/>
+          </a:p>
+        </p:txBody>
+      </p:sp>
+      <p:sp>
+        <p:nvSpPr>
+          <p:cNvPr id="17" name="TextBox 16">
+            <a:extLst>
+              <a:ext uri="{FF2B5EF4-FFF2-40B4-BE49-F238E27FC236}">
+                <a16:creationId xmlns:a16="http://schemas.microsoft.com/office/drawing/2014/main" id="{858B84C1-38DB-B572-A7BB-D2DFF3E0C5D8}"/>
+              </a:ext>
+            </a:extLst>
+          </p:cNvPr>
+          <p:cNvSpPr txBox="1"/>
+          <p:nvPr/>
+        </p:nvSpPr>
+        <p:spPr>
+          <a:xfrm>
+            <a:off x="10154727" y="4876795"/>
+            <a:ext cx="506870" cy="523220"/>
+          </a:xfrm>
+          <a:prstGeom prst="rect">
+            <a:avLst/>
+          </a:prstGeom>
+          <a:noFill/>
+        </p:spPr>
+        <p:txBody>
+          <a:bodyPr wrap="none" rtlCol="0">
+            <a:spAutoFit/>
+          </a:bodyPr>
+          <a:lstStyle/>
+          <a:p>
+            <a:r>
+              <a:rPr lang="en-US" sz="2800" b="1" dirty="0"/>
+              <a:t>...</a:t>
+            </a:r>
+            <a:endParaRPr lang="LID4096" sz="2800" b="1" dirty="0"/>
+          </a:p>
+        </p:txBody>
+      </p:sp>
+      <p:grpSp>
+        <p:nvGrpSpPr>
+          <p:cNvPr id="18" name="Group 17">
+            <a:extLst>
+              <a:ext uri="{FF2B5EF4-FFF2-40B4-BE49-F238E27FC236}">
+                <a16:creationId xmlns:a16="http://schemas.microsoft.com/office/drawing/2014/main" id="{907BA7DB-CAA3-E8A7-5A37-2F52C7B15DD1}"/>
+              </a:ext>
+            </a:extLst>
+          </p:cNvPr>
+          <p:cNvGrpSpPr/>
+          <p:nvPr/>
+        </p:nvGrpSpPr>
+        <p:grpSpPr>
+          <a:xfrm>
+            <a:off x="9528520" y="3678510"/>
+            <a:ext cx="1860395" cy="615519"/>
+            <a:chOff x="1375126" y="3678510"/>
+            <a:chExt cx="1860395" cy="615519"/>
+          </a:xfrm>
+        </p:grpSpPr>
+        <p:sp>
+          <p:nvSpPr>
+            <p:cNvPr id="19" name="Rectangle: Rounded Corners 18">
+              <a:extLst>
+                <a:ext uri="{FF2B5EF4-FFF2-40B4-BE49-F238E27FC236}">
+                  <a16:creationId xmlns:a16="http://schemas.microsoft.com/office/drawing/2014/main" id="{AB2DFE36-F31F-CC46-6E33-C69A5776D526}"/>
+                </a:ext>
+              </a:extLst>
+            </p:cNvPr>
+            <p:cNvSpPr/>
+            <p:nvPr/>
+          </p:nvSpPr>
+          <p:spPr>
+            <a:xfrm>
+              <a:off x="1375126" y="3770809"/>
+              <a:ext cx="1574903" cy="523220"/>
+            </a:xfrm>
+            <a:prstGeom prst="roundRect">
+              <a:avLst/>
+            </a:prstGeom>
+          </p:spPr>
+          <p:style>
+            <a:lnRef idx="2">
+              <a:schemeClr val="accent1">
+                <a:shade val="15000"/>
+              </a:schemeClr>
+            </a:lnRef>
+            <a:fillRef idx="1">
+              <a:schemeClr val="accent1"/>
+            </a:fillRef>
+            <a:effectRef idx="0">
+              <a:schemeClr val="accent1"/>
+            </a:effectRef>
+            <a:fontRef idx="minor">
+              <a:schemeClr val="lt1"/>
+            </a:fontRef>
+          </p:style>
+          <p:txBody>
+            <a:bodyPr rtlCol="0" anchor="ctr"/>
+            <a:lstStyle/>
+            <a:p>
+              <a:pPr algn="ctr"/>
+              <a:r>
+                <a:rPr lang="en-US" dirty="0"/>
+                <a:t>Job 554_1</a:t>
+              </a:r>
+              <a:endParaRPr lang="LID4096" dirty="0"/>
+            </a:p>
+          </p:txBody>
+        </p:sp>
+        <p:sp>
+          <p:nvSpPr>
+            <p:cNvPr id="20" name="TextBox 19">
+              <a:extLst>
+                <a:ext uri="{FF2B5EF4-FFF2-40B4-BE49-F238E27FC236}">
+                  <a16:creationId xmlns:a16="http://schemas.microsoft.com/office/drawing/2014/main" id="{95C4F9BB-1C18-4762-82B8-BA5C80E3AC50}"/>
+                </a:ext>
+              </a:extLst>
+            </p:cNvPr>
+            <p:cNvSpPr txBox="1"/>
+            <p:nvPr/>
+          </p:nvSpPr>
+          <p:spPr>
+            <a:xfrm>
+              <a:off x="2787963" y="3678510"/>
+              <a:ext cx="447558" cy="369332"/>
+            </a:xfrm>
+            <a:prstGeom prst="rect">
+              <a:avLst/>
+            </a:prstGeom>
+            <a:solidFill>
+              <a:schemeClr val="bg1"/>
+            </a:solidFill>
+            <a:ln>
+              <a:solidFill>
+                <a:schemeClr val="tx1"/>
+              </a:solidFill>
+            </a:ln>
+          </p:spPr>
+          <p:txBody>
+            <a:bodyPr wrap="none" rtlCol="0">
+              <a:spAutoFit/>
+            </a:bodyPr>
+            <a:lstStyle/>
+            <a:p>
+              <a:r>
+                <a:rPr lang="en-US" dirty="0"/>
+                <a:t>Pd</a:t>
+              </a:r>
+              <a:endParaRPr lang="LID4096" dirty="0"/>
+            </a:p>
+          </p:txBody>
+        </p:sp>
+      </p:grpSp>
+      <p:sp>
+        <p:nvSpPr>
+          <p:cNvPr id="21" name="TextBox 20">
+            <a:extLst>
+              <a:ext uri="{FF2B5EF4-FFF2-40B4-BE49-F238E27FC236}">
+                <a16:creationId xmlns:a16="http://schemas.microsoft.com/office/drawing/2014/main" id="{98384A0B-BE3C-209A-02BC-F844AE82CAE8}"/>
+              </a:ext>
+            </a:extLst>
+          </p:cNvPr>
+          <p:cNvSpPr txBox="1"/>
+          <p:nvPr/>
+        </p:nvSpPr>
+        <p:spPr>
+          <a:xfrm>
+            <a:off x="10941357" y="4386174"/>
+            <a:ext cx="447558" cy="369332"/>
+          </a:xfrm>
+          <a:prstGeom prst="rect">
+            <a:avLst/>
+          </a:prstGeom>
+          <a:solidFill>
+            <a:schemeClr val="bg1"/>
+          </a:solidFill>
+          <a:ln>
+            <a:solidFill>
+              <a:schemeClr val="tx1"/>
+            </a:solidFill>
+          </a:ln>
+        </p:spPr>
+        <p:txBody>
+          <a:bodyPr wrap="none" rtlCol="0">
+            <a:spAutoFit/>
+          </a:bodyPr>
+          <a:lstStyle/>
+          <a:p>
+            <a:r>
+              <a:rPr lang="en-US" dirty="0"/>
+              <a:t>Pd</a:t>
+            </a:r>
+            <a:endParaRPr lang="LID4096" dirty="0"/>
+          </a:p>
+        </p:txBody>
+      </p:sp>
+      <p:grpSp>
+        <p:nvGrpSpPr>
+          <p:cNvPr id="22" name="Group 21">
+            <a:extLst>
+              <a:ext uri="{FF2B5EF4-FFF2-40B4-BE49-F238E27FC236}">
+                <a16:creationId xmlns:a16="http://schemas.microsoft.com/office/drawing/2014/main" id="{39C58243-2400-D56B-B866-E7E1AC9E4162}"/>
+              </a:ext>
+            </a:extLst>
+          </p:cNvPr>
+          <p:cNvGrpSpPr/>
+          <p:nvPr/>
+        </p:nvGrpSpPr>
+        <p:grpSpPr>
+          <a:xfrm>
+            <a:off x="9528518" y="5373556"/>
+            <a:ext cx="1860397" cy="631491"/>
+            <a:chOff x="1375124" y="5373556"/>
+            <a:chExt cx="1860397" cy="631491"/>
+          </a:xfrm>
+        </p:grpSpPr>
+        <p:sp>
+          <p:nvSpPr>
+            <p:cNvPr id="23" name="Rectangle: Rounded Corners 22">
+              <a:extLst>
+                <a:ext uri="{FF2B5EF4-FFF2-40B4-BE49-F238E27FC236}">
+                  <a16:creationId xmlns:a16="http://schemas.microsoft.com/office/drawing/2014/main" id="{D76FBEBD-C87F-7523-51EB-AB5A7085A69E}"/>
+                </a:ext>
+              </a:extLst>
+            </p:cNvPr>
+            <p:cNvSpPr/>
+            <p:nvPr/>
+          </p:nvSpPr>
+          <p:spPr>
+            <a:xfrm>
+              <a:off x="1375124" y="5481827"/>
+              <a:ext cx="1574903" cy="523220"/>
+            </a:xfrm>
+            <a:prstGeom prst="roundRect">
+              <a:avLst/>
+            </a:prstGeom>
+          </p:spPr>
+          <p:style>
+            <a:lnRef idx="2">
+              <a:schemeClr val="accent1">
+                <a:shade val="15000"/>
+              </a:schemeClr>
+            </a:lnRef>
+            <a:fillRef idx="1">
+              <a:schemeClr val="accent1"/>
+            </a:fillRef>
+            <a:effectRef idx="0">
+              <a:schemeClr val="accent1"/>
+            </a:effectRef>
+            <a:fontRef idx="minor">
+              <a:schemeClr val="lt1"/>
+            </a:fontRef>
+          </p:style>
+          <p:txBody>
+            <a:bodyPr rtlCol="0" anchor="ctr"/>
+            <a:lstStyle/>
+            <a:p>
+              <a:pPr algn="ctr"/>
+              <a:r>
+                <a:rPr lang="en-US" dirty="0"/>
+                <a:t>Job 554_200</a:t>
+              </a:r>
+              <a:endParaRPr lang="LID4096" dirty="0"/>
+            </a:p>
+          </p:txBody>
+        </p:sp>
+        <p:sp>
+          <p:nvSpPr>
+            <p:cNvPr id="24" name="TextBox 23">
+              <a:extLst>
+                <a:ext uri="{FF2B5EF4-FFF2-40B4-BE49-F238E27FC236}">
+                  <a16:creationId xmlns:a16="http://schemas.microsoft.com/office/drawing/2014/main" id="{7EA9B337-C273-4B54-E0A9-9302B39A36D7}"/>
+                </a:ext>
+              </a:extLst>
+            </p:cNvPr>
+            <p:cNvSpPr txBox="1"/>
+            <p:nvPr/>
+          </p:nvSpPr>
+          <p:spPr>
+            <a:xfrm>
+              <a:off x="2787963" y="5373556"/>
+              <a:ext cx="447558" cy="369332"/>
+            </a:xfrm>
+            <a:prstGeom prst="rect">
+              <a:avLst/>
+            </a:prstGeom>
+            <a:solidFill>
+              <a:schemeClr val="bg1"/>
+            </a:solidFill>
+            <a:ln>
+              <a:solidFill>
+                <a:schemeClr val="tx1"/>
+              </a:solidFill>
+            </a:ln>
+          </p:spPr>
+          <p:txBody>
+            <a:bodyPr wrap="none" rtlCol="0">
+              <a:spAutoFit/>
+            </a:bodyPr>
+            <a:lstStyle/>
+            <a:p>
+              <a:r>
+                <a:rPr lang="en-US" dirty="0"/>
+                <a:t>Pd</a:t>
+              </a:r>
+              <a:endParaRPr lang="LID4096" dirty="0"/>
+            </a:p>
+          </p:txBody>
+        </p:sp>
+      </p:grpSp>
+      <p:sp>
+        <p:nvSpPr>
+          <p:cNvPr id="25" name="TextBox 24">
+            <a:extLst>
+              <a:ext uri="{FF2B5EF4-FFF2-40B4-BE49-F238E27FC236}">
+                <a16:creationId xmlns:a16="http://schemas.microsoft.com/office/drawing/2014/main" id="{DFFD71B0-08E1-7719-C871-58114956C4AE}"/>
+              </a:ext>
+            </a:extLst>
+          </p:cNvPr>
+          <p:cNvSpPr txBox="1"/>
+          <p:nvPr/>
+        </p:nvSpPr>
+        <p:spPr>
+          <a:xfrm>
+            <a:off x="11518300" y="4386174"/>
+            <a:ext cx="324128" cy="369332"/>
+          </a:xfrm>
+          <a:prstGeom prst="rect">
+            <a:avLst/>
+          </a:prstGeom>
+          <a:solidFill>
+            <a:schemeClr val="bg1"/>
+          </a:solidFill>
+          <a:ln>
+            <a:solidFill>
+              <a:schemeClr val="tx1"/>
+            </a:solidFill>
+          </a:ln>
+        </p:spPr>
+        <p:txBody>
+          <a:bodyPr wrap="none" rtlCol="0">
+            <a:spAutoFit/>
+          </a:bodyPr>
+          <a:lstStyle/>
+          <a:p>
+            <a:r>
+              <a:rPr lang="en-US" dirty="0"/>
+              <a:t>R</a:t>
+            </a:r>
+            <a:endParaRPr lang="LID4096" dirty="0"/>
+          </a:p>
+        </p:txBody>
+      </p:sp>
+      <p:sp>
+        <p:nvSpPr>
+          <p:cNvPr id="26" name="Arrow: Up 25">
+            <a:extLst>
+              <a:ext uri="{FF2B5EF4-FFF2-40B4-BE49-F238E27FC236}">
+                <a16:creationId xmlns:a16="http://schemas.microsoft.com/office/drawing/2014/main" id="{CEB7B571-6253-9186-F401-9C32EF7D1A7F}"/>
+              </a:ext>
+            </a:extLst>
+          </p:cNvPr>
+          <p:cNvSpPr/>
+          <p:nvPr/>
+        </p:nvSpPr>
+        <p:spPr>
+          <a:xfrm rot="16200000">
+            <a:off x="8845787" y="3726453"/>
+            <a:ext cx="217715" cy="611930"/>
+          </a:xfrm>
+          <a:prstGeom prst="upArrow">
+            <a:avLst/>
+          </a:prstGeom>
+          <a:solidFill>
+            <a:srgbClr val="00B050"/>
+          </a:solidFill>
+          <a:ln>
+            <a:solidFill>
+              <a:srgbClr val="00B050"/>
+            </a:solidFill>
+          </a:ln>
+        </p:spPr>
+        <p:style>
+          <a:lnRef idx="2">
+            <a:schemeClr val="accent1">
+              <a:shade val="15000"/>
+            </a:schemeClr>
+          </a:lnRef>
+          <a:fillRef idx="1">
+            <a:schemeClr val="accent1"/>
+          </a:fillRef>
+          <a:effectRef idx="0">
+            <a:schemeClr val="accent1"/>
+          </a:effectRef>
+          <a:fontRef idx="minor">
+            <a:schemeClr val="lt1"/>
+          </a:fontRef>
+        </p:style>
+        <p:txBody>
+          <a:bodyPr rtlCol="0" anchor="ctr"/>
+          <a:lstStyle/>
+          <a:p>
+            <a:pPr algn="ctr"/>
+            <a:endParaRPr lang="LID4096"/>
+          </a:p>
+        </p:txBody>
+      </p:sp>
+      <p:sp>
+        <p:nvSpPr>
+          <p:cNvPr id="27" name="Arrow: Up 26">
+            <a:extLst>
+              <a:ext uri="{FF2B5EF4-FFF2-40B4-BE49-F238E27FC236}">
+                <a16:creationId xmlns:a16="http://schemas.microsoft.com/office/drawing/2014/main" id="{D2F64DA5-6AE3-8B50-9B40-FF47DE266C3E}"/>
+              </a:ext>
+            </a:extLst>
+          </p:cNvPr>
+          <p:cNvSpPr/>
+          <p:nvPr/>
+        </p:nvSpPr>
+        <p:spPr>
+          <a:xfrm rot="16200000">
+            <a:off x="8828204" y="4373341"/>
+            <a:ext cx="217715" cy="611930"/>
+          </a:xfrm>
+          <a:prstGeom prst="upArrow">
+            <a:avLst/>
+          </a:prstGeom>
+          <a:solidFill>
+            <a:srgbClr val="00B050"/>
+          </a:solidFill>
+          <a:ln>
+            <a:solidFill>
+              <a:srgbClr val="00B050"/>
+            </a:solidFill>
+          </a:ln>
+        </p:spPr>
+        <p:style>
+          <a:lnRef idx="2">
+            <a:schemeClr val="accent1">
+              <a:shade val="15000"/>
+            </a:schemeClr>
+          </a:lnRef>
+          <a:fillRef idx="1">
+            <a:schemeClr val="accent1"/>
+          </a:fillRef>
+          <a:effectRef idx="0">
+            <a:schemeClr val="accent1"/>
+          </a:effectRef>
+          <a:fontRef idx="minor">
+            <a:schemeClr val="lt1"/>
+          </a:fontRef>
+        </p:style>
+        <p:txBody>
+          <a:bodyPr rtlCol="0" anchor="ctr"/>
+          <a:lstStyle/>
+          <a:p>
+            <a:pPr algn="ctr"/>
+            <a:endParaRPr lang="LID4096"/>
+          </a:p>
+        </p:txBody>
+      </p:sp>
+      <p:sp>
+        <p:nvSpPr>
+          <p:cNvPr id="28" name="Arrow: Up 27">
+            <a:extLst>
+              <a:ext uri="{FF2B5EF4-FFF2-40B4-BE49-F238E27FC236}">
+                <a16:creationId xmlns:a16="http://schemas.microsoft.com/office/drawing/2014/main" id="{0D522AA1-9F8B-AB2D-F844-B52A1888D304}"/>
+              </a:ext>
+            </a:extLst>
+          </p:cNvPr>
+          <p:cNvSpPr/>
+          <p:nvPr/>
+        </p:nvSpPr>
+        <p:spPr>
+          <a:xfrm rot="16200000">
+            <a:off x="8828204" y="5436922"/>
+            <a:ext cx="217715" cy="611930"/>
+          </a:xfrm>
+          <a:prstGeom prst="upArrow">
+            <a:avLst/>
+          </a:prstGeom>
+          <a:solidFill>
+            <a:srgbClr val="00B050"/>
+          </a:solidFill>
+          <a:ln>
+            <a:solidFill>
+              <a:srgbClr val="00B050"/>
+            </a:solidFill>
+          </a:ln>
+        </p:spPr>
+        <p:style>
+          <a:lnRef idx="2">
+            <a:schemeClr val="accent1">
+              <a:shade val="15000"/>
+            </a:schemeClr>
+          </a:lnRef>
+          <a:fillRef idx="1">
+            <a:schemeClr val="accent1"/>
+          </a:fillRef>
+          <a:effectRef idx="0">
+            <a:schemeClr val="accent1"/>
+          </a:effectRef>
+          <a:fontRef idx="minor">
+            <a:schemeClr val="lt1"/>
+          </a:fontRef>
+        </p:style>
+        <p:txBody>
+          <a:bodyPr rtlCol="0" anchor="ctr"/>
+          <a:lstStyle/>
+          <a:p>
+            <a:pPr algn="ctr"/>
+            <a:endParaRPr lang="LID4096"/>
+          </a:p>
+        </p:txBody>
+      </p:sp>
+      <p:sp>
+        <p:nvSpPr>
+          <p:cNvPr id="29" name="TextBox 28">
+            <a:extLst>
+              <a:ext uri="{FF2B5EF4-FFF2-40B4-BE49-F238E27FC236}">
+                <a16:creationId xmlns:a16="http://schemas.microsoft.com/office/drawing/2014/main" id="{D9D90CFE-30C2-E39C-E2F0-C88F77339CAC}"/>
+              </a:ext>
+            </a:extLst>
+          </p:cNvPr>
+          <p:cNvSpPr txBox="1"/>
+          <p:nvPr/>
+        </p:nvSpPr>
+        <p:spPr>
+          <a:xfrm>
+            <a:off x="1620331" y="4887678"/>
+            <a:ext cx="506870" cy="523220"/>
+          </a:xfrm>
+          <a:prstGeom prst="rect">
+            <a:avLst/>
+          </a:prstGeom>
+          <a:noFill/>
+        </p:spPr>
+        <p:txBody>
+          <a:bodyPr wrap="none" rtlCol="0">
+            <a:spAutoFit/>
+          </a:bodyPr>
+          <a:lstStyle/>
+          <a:p>
+            <a:r>
+              <a:rPr lang="en-US" sz="2800" b="1" dirty="0"/>
+              <a:t>...</a:t>
+            </a:r>
+            <a:endParaRPr lang="LID4096" sz="2800" b="1" dirty="0"/>
+          </a:p>
+        </p:txBody>
+      </p:sp>
+      <p:grpSp>
+        <p:nvGrpSpPr>
+          <p:cNvPr id="30" name="Group 29">
+            <a:extLst>
+              <a:ext uri="{FF2B5EF4-FFF2-40B4-BE49-F238E27FC236}">
+                <a16:creationId xmlns:a16="http://schemas.microsoft.com/office/drawing/2014/main" id="{8CEFB937-4D49-5D57-3236-69D3BE9E90CC}"/>
+              </a:ext>
+            </a:extLst>
+          </p:cNvPr>
+          <p:cNvGrpSpPr/>
+          <p:nvPr/>
+        </p:nvGrpSpPr>
+        <p:grpSpPr>
+          <a:xfrm>
+            <a:off x="994124" y="3689393"/>
+            <a:ext cx="1736965" cy="615519"/>
+            <a:chOff x="1375126" y="3678510"/>
+            <a:chExt cx="1736965" cy="615519"/>
+          </a:xfrm>
+        </p:grpSpPr>
+        <p:sp>
+          <p:nvSpPr>
+            <p:cNvPr id="31" name="Rectangle: Rounded Corners 30">
+              <a:extLst>
+                <a:ext uri="{FF2B5EF4-FFF2-40B4-BE49-F238E27FC236}">
+                  <a16:creationId xmlns:a16="http://schemas.microsoft.com/office/drawing/2014/main" id="{5B719D96-29F1-26B5-A935-A1CC2B1DF3C9}"/>
+                </a:ext>
+              </a:extLst>
+            </p:cNvPr>
+            <p:cNvSpPr/>
+            <p:nvPr/>
+          </p:nvSpPr>
+          <p:spPr>
+            <a:xfrm>
+              <a:off x="1375126" y="3770809"/>
+              <a:ext cx="1574903" cy="523220"/>
+            </a:xfrm>
+            <a:prstGeom prst="roundRect">
+              <a:avLst/>
+            </a:prstGeom>
+          </p:spPr>
+          <p:style>
+            <a:lnRef idx="2">
+              <a:schemeClr val="accent1">
+                <a:shade val="15000"/>
+              </a:schemeClr>
+            </a:lnRef>
+            <a:fillRef idx="1">
+              <a:schemeClr val="accent1"/>
+            </a:fillRef>
+            <a:effectRef idx="0">
+              <a:schemeClr val="accent1"/>
+            </a:effectRef>
+            <a:fontRef idx="minor">
+              <a:schemeClr val="lt1"/>
+            </a:fontRef>
+          </p:style>
+          <p:txBody>
+            <a:bodyPr rtlCol="0" anchor="ctr"/>
+            <a:lstStyle/>
+            <a:p>
+              <a:pPr algn="ctr"/>
+              <a:r>
+                <a:rPr lang="en-US" dirty="0"/>
+                <a:t>Job 553_1</a:t>
+              </a:r>
+              <a:endParaRPr lang="LID4096" dirty="0"/>
+            </a:p>
+          </p:txBody>
+        </p:sp>
+        <p:sp>
+          <p:nvSpPr>
+            <p:cNvPr id="32" name="TextBox 31">
+              <a:extLst>
+                <a:ext uri="{FF2B5EF4-FFF2-40B4-BE49-F238E27FC236}">
+                  <a16:creationId xmlns:a16="http://schemas.microsoft.com/office/drawing/2014/main" id="{0EAF1980-1FC8-6C6F-4B65-ADCC597CE56F}"/>
+                </a:ext>
+              </a:extLst>
+            </p:cNvPr>
+            <p:cNvSpPr txBox="1"/>
+            <p:nvPr/>
+          </p:nvSpPr>
+          <p:spPr>
+            <a:xfrm>
+              <a:off x="2787963" y="3678510"/>
+              <a:ext cx="324128" cy="369332"/>
+            </a:xfrm>
+            <a:prstGeom prst="rect">
+              <a:avLst/>
+            </a:prstGeom>
+            <a:solidFill>
+              <a:schemeClr val="bg1"/>
+            </a:solidFill>
+            <a:ln>
+              <a:solidFill>
+                <a:schemeClr val="tx1"/>
+              </a:solidFill>
+            </a:ln>
+          </p:spPr>
+          <p:txBody>
+            <a:bodyPr wrap="none" rtlCol="0">
+              <a:spAutoFit/>
+            </a:bodyPr>
+            <a:lstStyle/>
+            <a:p>
+              <a:r>
+                <a:rPr lang="en-US" dirty="0"/>
+                <a:t>R</a:t>
+              </a:r>
+              <a:endParaRPr lang="LID4096" dirty="0"/>
+            </a:p>
+          </p:txBody>
+        </p:sp>
+      </p:grpSp>
+      <p:grpSp>
+        <p:nvGrpSpPr>
+          <p:cNvPr id="33" name="Group 32">
+            <a:extLst>
+              <a:ext uri="{FF2B5EF4-FFF2-40B4-BE49-F238E27FC236}">
+                <a16:creationId xmlns:a16="http://schemas.microsoft.com/office/drawing/2014/main" id="{4C006311-DCBA-32B1-5A85-630120B44196}"/>
+              </a:ext>
+            </a:extLst>
+          </p:cNvPr>
+          <p:cNvGrpSpPr/>
+          <p:nvPr/>
+        </p:nvGrpSpPr>
+        <p:grpSpPr>
+          <a:xfrm>
+            <a:off x="994123" y="4397057"/>
+            <a:ext cx="1736966" cy="581955"/>
+            <a:chOff x="1375125" y="4386174"/>
+            <a:chExt cx="1736966" cy="581955"/>
+          </a:xfrm>
+        </p:grpSpPr>
+        <p:sp>
+          <p:nvSpPr>
+            <p:cNvPr id="34" name="Rectangle: Rounded Corners 33">
+              <a:extLst>
+                <a:ext uri="{FF2B5EF4-FFF2-40B4-BE49-F238E27FC236}">
+                  <a16:creationId xmlns:a16="http://schemas.microsoft.com/office/drawing/2014/main" id="{65BAD891-E0E4-EE04-B701-00E4D55F94F1}"/>
+                </a:ext>
+              </a:extLst>
+            </p:cNvPr>
+            <p:cNvSpPr/>
+            <p:nvPr/>
+          </p:nvSpPr>
+          <p:spPr>
+            <a:xfrm>
+              <a:off x="1375125" y="4444909"/>
+              <a:ext cx="1574903" cy="523220"/>
+            </a:xfrm>
+            <a:prstGeom prst="roundRect">
+              <a:avLst/>
+            </a:prstGeom>
+          </p:spPr>
+          <p:style>
+            <a:lnRef idx="2">
+              <a:schemeClr val="accent1">
+                <a:shade val="15000"/>
+              </a:schemeClr>
+            </a:lnRef>
+            <a:fillRef idx="1">
+              <a:schemeClr val="accent1"/>
+            </a:fillRef>
+            <a:effectRef idx="0">
+              <a:schemeClr val="accent1"/>
+            </a:effectRef>
+            <a:fontRef idx="minor">
+              <a:schemeClr val="lt1"/>
+            </a:fontRef>
+          </p:style>
+          <p:txBody>
+            <a:bodyPr rtlCol="0" anchor="ctr"/>
+            <a:lstStyle/>
+            <a:p>
+              <a:pPr algn="ctr"/>
+              <a:r>
+                <a:rPr lang="en-US" dirty="0"/>
+                <a:t>Job 553_2</a:t>
+              </a:r>
+              <a:endParaRPr lang="LID4096" dirty="0"/>
+            </a:p>
+          </p:txBody>
+        </p:sp>
+        <p:sp>
+          <p:nvSpPr>
+            <p:cNvPr id="35" name="TextBox 34">
+              <a:extLst>
+                <a:ext uri="{FF2B5EF4-FFF2-40B4-BE49-F238E27FC236}">
+                  <a16:creationId xmlns:a16="http://schemas.microsoft.com/office/drawing/2014/main" id="{0002A379-09A2-4BD0-FEC7-BF88C36C03A8}"/>
+                </a:ext>
+              </a:extLst>
+            </p:cNvPr>
+            <p:cNvSpPr txBox="1"/>
+            <p:nvPr/>
+          </p:nvSpPr>
+          <p:spPr>
+            <a:xfrm>
+              <a:off x="2787963" y="4386174"/>
+              <a:ext cx="324128" cy="369332"/>
+            </a:xfrm>
+            <a:prstGeom prst="rect">
+              <a:avLst/>
+            </a:prstGeom>
+            <a:solidFill>
+              <a:schemeClr val="bg1"/>
+            </a:solidFill>
+            <a:ln>
+              <a:solidFill>
+                <a:schemeClr val="tx1"/>
+              </a:solidFill>
+            </a:ln>
+          </p:spPr>
+          <p:txBody>
+            <a:bodyPr wrap="none" rtlCol="0">
+              <a:spAutoFit/>
+            </a:bodyPr>
+            <a:lstStyle/>
+            <a:p>
+              <a:r>
+                <a:rPr lang="en-US" dirty="0"/>
+                <a:t>R</a:t>
+              </a:r>
+              <a:endParaRPr lang="LID4096" dirty="0"/>
+            </a:p>
+          </p:txBody>
+        </p:sp>
+      </p:grpSp>
+      <p:grpSp>
+        <p:nvGrpSpPr>
+          <p:cNvPr id="36" name="Group 35">
+            <a:extLst>
+              <a:ext uri="{FF2B5EF4-FFF2-40B4-BE49-F238E27FC236}">
+                <a16:creationId xmlns:a16="http://schemas.microsoft.com/office/drawing/2014/main" id="{A58BC9D6-D2CA-79CD-0620-666C81DC99A5}"/>
+              </a:ext>
+            </a:extLst>
+          </p:cNvPr>
+          <p:cNvGrpSpPr/>
+          <p:nvPr/>
+        </p:nvGrpSpPr>
+        <p:grpSpPr>
+          <a:xfrm>
+            <a:off x="994122" y="5384439"/>
+            <a:ext cx="1860397" cy="631491"/>
+            <a:chOff x="1375124" y="5373556"/>
+            <a:chExt cx="1860397" cy="631491"/>
+          </a:xfrm>
+        </p:grpSpPr>
+        <p:sp>
+          <p:nvSpPr>
+            <p:cNvPr id="37" name="Rectangle: Rounded Corners 36">
+              <a:extLst>
+                <a:ext uri="{FF2B5EF4-FFF2-40B4-BE49-F238E27FC236}">
+                  <a16:creationId xmlns:a16="http://schemas.microsoft.com/office/drawing/2014/main" id="{C9B15334-08FF-1B33-4D73-0C56B029CCA8}"/>
+                </a:ext>
+              </a:extLst>
+            </p:cNvPr>
+            <p:cNvSpPr/>
+            <p:nvPr/>
+          </p:nvSpPr>
+          <p:spPr>
+            <a:xfrm>
+              <a:off x="1375124" y="5481827"/>
+              <a:ext cx="1574903" cy="523220"/>
+            </a:xfrm>
+            <a:prstGeom prst="roundRect">
+              <a:avLst/>
+            </a:prstGeom>
+          </p:spPr>
+          <p:style>
+            <a:lnRef idx="2">
+              <a:schemeClr val="accent1">
+                <a:shade val="15000"/>
+              </a:schemeClr>
+            </a:lnRef>
+            <a:fillRef idx="1">
+              <a:schemeClr val="accent1"/>
+            </a:fillRef>
+            <a:effectRef idx="0">
+              <a:schemeClr val="accent1"/>
+            </a:effectRef>
+            <a:fontRef idx="minor">
+              <a:schemeClr val="lt1"/>
+            </a:fontRef>
+          </p:style>
+          <p:txBody>
+            <a:bodyPr rtlCol="0" anchor="ctr"/>
+            <a:lstStyle/>
+            <a:p>
+              <a:pPr algn="ctr"/>
+              <a:r>
+                <a:rPr lang="en-US" dirty="0"/>
+                <a:t>Job 553_200</a:t>
+              </a:r>
+              <a:endParaRPr lang="LID4096" dirty="0"/>
+            </a:p>
+          </p:txBody>
+        </p:sp>
+        <p:sp>
+          <p:nvSpPr>
+            <p:cNvPr id="38" name="TextBox 37">
+              <a:extLst>
+                <a:ext uri="{FF2B5EF4-FFF2-40B4-BE49-F238E27FC236}">
+                  <a16:creationId xmlns:a16="http://schemas.microsoft.com/office/drawing/2014/main" id="{F740C544-01F2-FEE8-EC28-C9E4E508EA86}"/>
+                </a:ext>
+              </a:extLst>
+            </p:cNvPr>
+            <p:cNvSpPr txBox="1"/>
+            <p:nvPr/>
+          </p:nvSpPr>
+          <p:spPr>
+            <a:xfrm>
+              <a:off x="2787963" y="5373556"/>
+              <a:ext cx="447558" cy="369332"/>
+            </a:xfrm>
+            <a:prstGeom prst="rect">
+              <a:avLst/>
+            </a:prstGeom>
+            <a:solidFill>
+              <a:schemeClr val="bg1"/>
+            </a:solidFill>
+            <a:ln>
+              <a:solidFill>
+                <a:schemeClr val="tx1"/>
+              </a:solidFill>
+            </a:ln>
+          </p:spPr>
+          <p:txBody>
+            <a:bodyPr wrap="none" rtlCol="0">
+              <a:spAutoFit/>
+            </a:bodyPr>
+            <a:lstStyle/>
+            <a:p>
+              <a:r>
+                <a:rPr lang="en-US" dirty="0"/>
+                <a:t>Pd</a:t>
+              </a:r>
+              <a:endParaRPr lang="LID4096" dirty="0"/>
+            </a:p>
+          </p:txBody>
+        </p:sp>
+      </p:grpSp>
+      <p:sp>
+        <p:nvSpPr>
+          <p:cNvPr id="39" name="Rectangle: Rounded Corners 38">
+            <a:extLst>
+              <a:ext uri="{FF2B5EF4-FFF2-40B4-BE49-F238E27FC236}">
+                <a16:creationId xmlns:a16="http://schemas.microsoft.com/office/drawing/2014/main" id="{A92FD284-B51B-0B9C-1EF3-151C60D27CDE}"/>
+              </a:ext>
+            </a:extLst>
+          </p:cNvPr>
+          <p:cNvSpPr/>
+          <p:nvPr/>
+        </p:nvSpPr>
+        <p:spPr>
+          <a:xfrm>
+            <a:off x="3878837" y="4455792"/>
+            <a:ext cx="1574903" cy="523220"/>
+          </a:xfrm>
+          <a:prstGeom prst="roundRect">
+            <a:avLst/>
+          </a:prstGeom>
+        </p:spPr>
+        <p:style>
+          <a:lnRef idx="2">
+            <a:schemeClr val="accent1">
+              <a:shade val="15000"/>
+            </a:schemeClr>
+          </a:lnRef>
+          <a:fillRef idx="1">
+            <a:schemeClr val="accent1"/>
+          </a:fillRef>
+          <a:effectRef idx="0">
+            <a:schemeClr val="accent1"/>
+          </a:effectRef>
+          <a:fontRef idx="minor">
+            <a:schemeClr val="lt1"/>
+          </a:fontRef>
+        </p:style>
+        <p:txBody>
+          <a:bodyPr rtlCol="0" anchor="ctr"/>
+          <a:lstStyle/>
+          <a:p>
+            <a:pPr algn="ctr"/>
+            <a:r>
+              <a:rPr lang="en-US" dirty="0"/>
+              <a:t>Job 554</a:t>
+            </a:r>
+            <a:endParaRPr lang="LID4096" dirty="0"/>
+          </a:p>
+        </p:txBody>
+      </p:sp>
+      <p:sp>
+        <p:nvSpPr>
+          <p:cNvPr id="44" name="TextBox 43">
+            <a:extLst>
+              <a:ext uri="{FF2B5EF4-FFF2-40B4-BE49-F238E27FC236}">
+                <a16:creationId xmlns:a16="http://schemas.microsoft.com/office/drawing/2014/main" id="{5BD2C257-A384-9A54-70DF-2734EFDF85C8}"/>
+              </a:ext>
+            </a:extLst>
+          </p:cNvPr>
+          <p:cNvSpPr txBox="1"/>
+          <p:nvPr/>
+        </p:nvSpPr>
+        <p:spPr>
+          <a:xfrm>
+            <a:off x="5291675" y="4397057"/>
+            <a:ext cx="447558" cy="369332"/>
+          </a:xfrm>
+          <a:prstGeom prst="rect">
+            <a:avLst/>
+          </a:prstGeom>
+          <a:solidFill>
+            <a:schemeClr val="bg1"/>
+          </a:solidFill>
+          <a:ln>
+            <a:solidFill>
+              <a:schemeClr val="tx1"/>
+            </a:solidFill>
+          </a:ln>
+        </p:spPr>
+        <p:txBody>
+          <a:bodyPr wrap="none" rtlCol="0">
+            <a:spAutoFit/>
+          </a:bodyPr>
+          <a:lstStyle/>
+          <a:p>
+            <a:r>
+              <a:rPr lang="en-US" dirty="0"/>
+              <a:t>Pd</a:t>
+            </a:r>
+            <a:endParaRPr lang="LID4096" dirty="0"/>
+          </a:p>
+        </p:txBody>
+      </p:sp>
+      <p:sp>
+        <p:nvSpPr>
+          <p:cNvPr id="49" name="Arrow: Up 48">
+            <a:extLst>
+              <a:ext uri="{FF2B5EF4-FFF2-40B4-BE49-F238E27FC236}">
+                <a16:creationId xmlns:a16="http://schemas.microsoft.com/office/drawing/2014/main" id="{6F0CDFBC-DD5B-A99D-C20F-447FF2EF7471}"/>
+              </a:ext>
+            </a:extLst>
+          </p:cNvPr>
+          <p:cNvSpPr/>
+          <p:nvPr/>
+        </p:nvSpPr>
+        <p:spPr>
+          <a:xfrm rot="17857928">
+            <a:off x="3196105" y="3889738"/>
+            <a:ext cx="217715" cy="611930"/>
+          </a:xfrm>
+          <a:prstGeom prst="upArrow">
+            <a:avLst/>
+          </a:prstGeom>
+          <a:solidFill>
+            <a:srgbClr val="00B050"/>
+          </a:solidFill>
+          <a:ln>
+            <a:solidFill>
+              <a:srgbClr val="00B050"/>
+            </a:solidFill>
+          </a:ln>
+        </p:spPr>
+        <p:style>
+          <a:lnRef idx="2">
+            <a:schemeClr val="accent1">
+              <a:shade val="15000"/>
+            </a:schemeClr>
+          </a:lnRef>
+          <a:fillRef idx="1">
+            <a:schemeClr val="accent1"/>
+          </a:fillRef>
+          <a:effectRef idx="0">
+            <a:schemeClr val="accent1"/>
+          </a:effectRef>
+          <a:fontRef idx="minor">
+            <a:schemeClr val="lt1"/>
+          </a:fontRef>
+        </p:style>
+        <p:txBody>
+          <a:bodyPr rtlCol="0" anchor="ctr"/>
+          <a:lstStyle/>
+          <a:p>
+            <a:pPr algn="ctr"/>
+            <a:endParaRPr lang="LID4096"/>
+          </a:p>
+        </p:txBody>
+      </p:sp>
+      <p:sp>
+        <p:nvSpPr>
+          <p:cNvPr id="50" name="Arrow: Up 49">
+            <a:extLst>
+              <a:ext uri="{FF2B5EF4-FFF2-40B4-BE49-F238E27FC236}">
+                <a16:creationId xmlns:a16="http://schemas.microsoft.com/office/drawing/2014/main" id="{BDAA9926-44D7-1B5E-9C99-D38BB5D22A10}"/>
+              </a:ext>
+            </a:extLst>
+          </p:cNvPr>
+          <p:cNvSpPr/>
+          <p:nvPr/>
+        </p:nvSpPr>
+        <p:spPr>
+          <a:xfrm rot="16200000">
+            <a:off x="3178522" y="4384224"/>
+            <a:ext cx="217715" cy="611930"/>
+          </a:xfrm>
+          <a:prstGeom prst="upArrow">
+            <a:avLst/>
+          </a:prstGeom>
+          <a:solidFill>
+            <a:srgbClr val="00B050"/>
+          </a:solidFill>
+          <a:ln>
+            <a:solidFill>
+              <a:srgbClr val="00B050"/>
+            </a:solidFill>
+          </a:ln>
+        </p:spPr>
+        <p:style>
+          <a:lnRef idx="2">
+            <a:schemeClr val="accent1">
+              <a:shade val="15000"/>
+            </a:schemeClr>
+          </a:lnRef>
+          <a:fillRef idx="1">
+            <a:schemeClr val="accent1"/>
+          </a:fillRef>
+          <a:effectRef idx="0">
+            <a:schemeClr val="accent1"/>
+          </a:effectRef>
+          <a:fontRef idx="minor">
+            <a:schemeClr val="lt1"/>
+          </a:fontRef>
+        </p:style>
+        <p:txBody>
+          <a:bodyPr rtlCol="0" anchor="ctr"/>
+          <a:lstStyle/>
+          <a:p>
+            <a:pPr algn="ctr"/>
+            <a:endParaRPr lang="LID4096"/>
+          </a:p>
+        </p:txBody>
+      </p:sp>
+      <p:sp>
+        <p:nvSpPr>
+          <p:cNvPr id="51" name="Arrow: Up 50">
+            <a:extLst>
+              <a:ext uri="{FF2B5EF4-FFF2-40B4-BE49-F238E27FC236}">
+                <a16:creationId xmlns:a16="http://schemas.microsoft.com/office/drawing/2014/main" id="{B1A8EDEF-7203-E954-6836-1378B99BACC6}"/>
+              </a:ext>
+            </a:extLst>
+          </p:cNvPr>
+          <p:cNvSpPr/>
+          <p:nvPr/>
+        </p:nvSpPr>
+        <p:spPr>
+          <a:xfrm rot="14120619">
+            <a:off x="3204027" y="4980417"/>
+            <a:ext cx="217715" cy="611930"/>
+          </a:xfrm>
+          <a:prstGeom prst="upArrow">
+            <a:avLst/>
+          </a:prstGeom>
+          <a:solidFill>
+            <a:srgbClr val="00B050"/>
+          </a:solidFill>
+          <a:ln>
+            <a:solidFill>
+              <a:srgbClr val="00B050"/>
+            </a:solidFill>
+          </a:ln>
+        </p:spPr>
+        <p:style>
+          <a:lnRef idx="2">
+            <a:schemeClr val="accent1">
+              <a:shade val="15000"/>
+            </a:schemeClr>
+          </a:lnRef>
+          <a:fillRef idx="1">
+            <a:schemeClr val="accent1"/>
+          </a:fillRef>
+          <a:effectRef idx="0">
+            <a:schemeClr val="accent1"/>
+          </a:effectRef>
+          <a:fontRef idx="minor">
+            <a:schemeClr val="lt1"/>
+          </a:fontRef>
+        </p:style>
+        <p:txBody>
+          <a:bodyPr rtlCol="0" anchor="ctr"/>
+          <a:lstStyle/>
+          <a:p>
+            <a:pPr algn="ctr"/>
+            <a:endParaRPr lang="LID4096"/>
+          </a:p>
+        </p:txBody>
+      </p:sp>
+    </p:spTree>
+    <p:extLst>
+      <p:ext uri="{BB962C8B-B14F-4D97-AF65-F5344CB8AC3E}">
+        <p14:creationId xmlns:p14="http://schemas.microsoft.com/office/powerpoint/2010/main" val="3000525440"/>
+      </p:ext>
+    </p:extLst>
+  </p:cSld>
+  <p:clrMapOvr>
+    <a:masterClrMapping/>
+  </p:clrMapOvr>
+</p:sld>
+</file>
+
 <file path=ppt/slides/slide4.xml><?xml version="1.0" encoding="utf-8"?>
 <p:sld xmlns:a="http://schemas.openxmlformats.org/drawingml/2006/main" xmlns:r="http://schemas.openxmlformats.org/officeDocument/2006/relationships" xmlns:p="http://schemas.openxmlformats.org/presentationml/2006/main">
   <p:cSld>

</xml_diff>

<commit_message>
Improve formatting of atools lides
</commit_message>
<xml_diff>
--- a/workflow_for_HPC.pptx
+++ b/workflow_for_HPC.pptx
@@ -5,7 +5,7 @@
     <p:sldMasterId id="2147483648" r:id="rId1"/>
   </p:sldMasterIdLst>
   <p:notesMasterIdLst>
-    <p:notesMasterId r:id="rId50"/>
+    <p:notesMasterId r:id="rId51"/>
   </p:notesMasterIdLst>
   <p:sldIdLst>
     <p:sldId id="257" r:id="rId2"/>
@@ -41,21 +41,22 @@
     <p:sldId id="384" r:id="rId32"/>
     <p:sldId id="386" r:id="rId33"/>
     <p:sldId id="387" r:id="rId34"/>
-    <p:sldId id="314" r:id="rId35"/>
-    <p:sldId id="315" r:id="rId36"/>
-    <p:sldId id="316" r:id="rId37"/>
-    <p:sldId id="340" r:id="rId38"/>
-    <p:sldId id="341" r:id="rId39"/>
-    <p:sldId id="319" r:id="rId40"/>
-    <p:sldId id="320" r:id="rId41"/>
-    <p:sldId id="322" r:id="rId42"/>
-    <p:sldId id="323" r:id="rId43"/>
-    <p:sldId id="321" r:id="rId44"/>
-    <p:sldId id="325" r:id="rId45"/>
-    <p:sldId id="326" r:id="rId46"/>
-    <p:sldId id="328" r:id="rId47"/>
-    <p:sldId id="354" r:id="rId48"/>
-    <p:sldId id="352" r:id="rId49"/>
+    <p:sldId id="388" r:id="rId35"/>
+    <p:sldId id="314" r:id="rId36"/>
+    <p:sldId id="315" r:id="rId37"/>
+    <p:sldId id="316" r:id="rId38"/>
+    <p:sldId id="340" r:id="rId39"/>
+    <p:sldId id="341" r:id="rId40"/>
+    <p:sldId id="319" r:id="rId41"/>
+    <p:sldId id="320" r:id="rId42"/>
+    <p:sldId id="322" r:id="rId43"/>
+    <p:sldId id="323" r:id="rId44"/>
+    <p:sldId id="321" r:id="rId45"/>
+    <p:sldId id="325" r:id="rId46"/>
+    <p:sldId id="326" r:id="rId47"/>
+    <p:sldId id="328" r:id="rId48"/>
+    <p:sldId id="354" r:id="rId49"/>
+    <p:sldId id="352" r:id="rId50"/>
   </p:sldIdLst>
   <p:sldSz cx="12192000" cy="6858000"/>
   <p:notesSz cx="6858000" cy="9144000"/>
@@ -635,7 +636,7 @@
           <a:p>
             <a:fld id="{19D97038-7595-45D6-8411-BE59ABE7F953}" type="slidenum">
               <a:rPr lang="en-US" smtClean="0"/>
-              <a:t>34</a:t>
+              <a:t>35</a:t>
             </a:fld>
             <a:endParaRPr lang="en-US"/>
           </a:p>
@@ -741,7 +742,7 @@
           <a:p>
             <a:fld id="{19D97038-7595-45D6-8411-BE59ABE7F953}" type="slidenum">
               <a:rPr lang="en-US" smtClean="0"/>
-              <a:t>35</a:t>
+              <a:t>36</a:t>
             </a:fld>
             <a:endParaRPr lang="en-US"/>
           </a:p>
@@ -847,7 +848,7 @@
           <a:p>
             <a:fld id="{19D97038-7595-45D6-8411-BE59ABE7F953}" type="slidenum">
               <a:rPr lang="en-US" smtClean="0"/>
-              <a:t>36</a:t>
+              <a:t>37</a:t>
             </a:fld>
             <a:endParaRPr lang="en-US"/>
           </a:p>
@@ -953,7 +954,7 @@
           <a:p>
             <a:fld id="{19D97038-7595-45D6-8411-BE59ABE7F953}" type="slidenum">
               <a:rPr lang="en-US" smtClean="0"/>
-              <a:t>38</a:t>
+              <a:t>39</a:t>
             </a:fld>
             <a:endParaRPr lang="en-US"/>
           </a:p>
@@ -1059,7 +1060,7 @@
           <a:p>
             <a:fld id="{19D97038-7595-45D6-8411-BE59ABE7F953}" type="slidenum">
               <a:rPr lang="en-US" smtClean="0"/>
-              <a:t>39</a:t>
+              <a:t>40</a:t>
             </a:fld>
             <a:endParaRPr lang="en-US"/>
           </a:p>
@@ -1165,7 +1166,7 @@
           <a:p>
             <a:fld id="{19D97038-7595-45D6-8411-BE59ABE7F953}" type="slidenum">
               <a:rPr lang="en-US" smtClean="0"/>
-              <a:t>42</a:t>
+              <a:t>43</a:t>
             </a:fld>
             <a:endParaRPr lang="en-US"/>
           </a:p>
@@ -1271,7 +1272,7 @@
           <a:p>
             <a:fld id="{19D97038-7595-45D6-8411-BE59ABE7F953}" type="slidenum">
               <a:rPr lang="en-US" smtClean="0"/>
-              <a:t>44</a:t>
+              <a:t>45</a:t>
             </a:fld>
             <a:endParaRPr lang="en-US"/>
           </a:p>
@@ -1377,7 +1378,7 @@
           <a:p>
             <a:fld id="{19D97038-7595-45D6-8411-BE59ABE7F953}" type="slidenum">
               <a:rPr lang="en-US" smtClean="0"/>
-              <a:t>45</a:t>
+              <a:t>46</a:t>
             </a:fld>
             <a:endParaRPr lang="en-US"/>
           </a:p>
@@ -1483,7 +1484,7 @@
           <a:p>
             <a:fld id="{19D97038-7595-45D6-8411-BE59ABE7F953}" type="slidenum">
               <a:rPr lang="en-US" smtClean="0"/>
-              <a:t>46</a:t>
+              <a:t>47</a:t>
             </a:fld>
             <a:endParaRPr lang="en-US"/>
           </a:p>
@@ -24932,6 +24933,210 @@
   <p:cSld>
     <p:spTree>
       <p:nvGrpSpPr>
+        <p:cNvPr id="1" name="">
+          <a:extLst>
+            <a:ext uri="{FF2B5EF4-FFF2-40B4-BE49-F238E27FC236}">
+              <a16:creationId xmlns:a16="http://schemas.microsoft.com/office/drawing/2014/main" id="{3597A7B7-5CC3-68B3-B803-6726D3A1398F}"/>
+            </a:ext>
+          </a:extLst>
+        </p:cNvPr>
+        <p:cNvGrpSpPr/>
+        <p:nvPr/>
+      </p:nvGrpSpPr>
+      <p:grpSpPr>
+        <a:xfrm>
+          <a:off x="0" y="0"/>
+          <a:ext cx="0" cy="0"/>
+          <a:chOff x="0" y="0"/>
+          <a:chExt cx="0" cy="0"/>
+        </a:xfrm>
+      </p:grpSpPr>
+      <p:sp>
+        <p:nvSpPr>
+          <p:cNvPr id="2" name="Title 1">
+            <a:extLst>
+              <a:ext uri="{FF2B5EF4-FFF2-40B4-BE49-F238E27FC236}">
+                <a16:creationId xmlns:a16="http://schemas.microsoft.com/office/drawing/2014/main" id="{C9CBAA14-8A3A-F11A-C6D9-1050368F0779}"/>
+              </a:ext>
+            </a:extLst>
+          </p:cNvPr>
+          <p:cNvSpPr>
+            <a:spLocks noGrp="1"/>
+          </p:cNvSpPr>
+          <p:nvPr>
+            <p:ph type="title"/>
+          </p:nvPr>
+        </p:nvSpPr>
+        <p:spPr/>
+        <p:txBody>
+          <a:bodyPr/>
+          <a:lstStyle/>
+          <a:p>
+            <a:r>
+              <a:rPr lang="en-US" dirty="0"/>
+              <a:t>Motivation</a:t>
+            </a:r>
+            <a:endParaRPr lang="LID4096" dirty="0"/>
+          </a:p>
+        </p:txBody>
+      </p:sp>
+      <p:sp>
+        <p:nvSpPr>
+          <p:cNvPr id="3" name="Content Placeholder 2">
+            <a:extLst>
+              <a:ext uri="{FF2B5EF4-FFF2-40B4-BE49-F238E27FC236}">
+                <a16:creationId xmlns:a16="http://schemas.microsoft.com/office/drawing/2014/main" id="{AF706421-81A0-A940-1B47-B49AD8D224C6}"/>
+              </a:ext>
+            </a:extLst>
+          </p:cNvPr>
+          <p:cNvSpPr>
+            <a:spLocks noGrp="1"/>
+          </p:cNvSpPr>
+          <p:nvPr>
+            <p:ph idx="1"/>
+          </p:nvPr>
+        </p:nvSpPr>
+        <p:spPr/>
+        <p:txBody>
+          <a:bodyPr>
+            <a:normAutofit lnSpcReduction="10000"/>
+          </a:bodyPr>
+          <a:lstStyle/>
+          <a:p>
+            <a:r>
+              <a:rPr lang="en-US" dirty="0"/>
+              <a:t>Characteristics</a:t>
+            </a:r>
+          </a:p>
+          <a:p>
+            <a:pPr lvl="1"/>
+            <a:r>
+              <a:rPr lang="en-US" dirty="0"/>
+              <a:t>Non-interactive</a:t>
+            </a:r>
+          </a:p>
+          <a:p>
+            <a:pPr lvl="1"/>
+            <a:r>
+              <a:rPr lang="en-US" dirty="0"/>
+              <a:t>Execute many independent, similar tasks</a:t>
+            </a:r>
+          </a:p>
+          <a:p>
+            <a:pPr lvl="1"/>
+            <a:r>
+              <a:rPr lang="en-US" dirty="0"/>
+              <a:t>Potential inefficient resource usage</a:t>
+            </a:r>
+          </a:p>
+          <a:p>
+            <a:r>
+              <a:rPr lang="en-US" dirty="0"/>
+              <a:t>Use cases</a:t>
+            </a:r>
+          </a:p>
+          <a:p>
+            <a:pPr lvl="1"/>
+            <a:r>
+              <a:rPr lang="en-US" dirty="0"/>
+              <a:t>Parameter exploration</a:t>
+            </a:r>
+          </a:p>
+          <a:p>
+            <a:pPr lvl="1"/>
+            <a:r>
+              <a:rPr lang="en-US" dirty="0"/>
+              <a:t>Processing many files</a:t>
+            </a:r>
+          </a:p>
+          <a:p>
+            <a:r>
+              <a:rPr lang="en-US" dirty="0"/>
+              <a:t>Job arrays: </a:t>
+            </a:r>
+            <a:r>
+              <a:rPr lang="en-US" i="1" dirty="0"/>
+              <a:t>you</a:t>
+            </a:r>
+            <a:r>
+              <a:rPr lang="en-US" dirty="0"/>
+              <a:t> do the bookkeeping</a:t>
+            </a:r>
+          </a:p>
+          <a:p>
+            <a:pPr lvl="1"/>
+            <a:r>
+              <a:rPr lang="en-US" dirty="0"/>
+              <a:t>Parameter exploration?</a:t>
+            </a:r>
+          </a:p>
+          <a:p>
+            <a:pPr lvl="1"/>
+            <a:r>
+              <a:rPr lang="en-US" dirty="0"/>
+              <a:t>What succeeded/failed?</a:t>
+            </a:r>
+          </a:p>
+          <a:p>
+            <a:pPr lvl="1"/>
+            <a:r>
+              <a:rPr lang="en-US" dirty="0"/>
+              <a:t>Data aggregation?</a:t>
+            </a:r>
+          </a:p>
+          <a:p>
+            <a:pPr lvl="1"/>
+            <a:endParaRPr lang="en-US" dirty="0"/>
+          </a:p>
+        </p:txBody>
+      </p:sp>
+      <p:sp>
+        <p:nvSpPr>
+          <p:cNvPr id="4" name="Slide Number Placeholder 3">
+            <a:extLst>
+              <a:ext uri="{FF2B5EF4-FFF2-40B4-BE49-F238E27FC236}">
+                <a16:creationId xmlns:a16="http://schemas.microsoft.com/office/drawing/2014/main" id="{83080F6D-EFD3-3971-FBC7-51E5A09FD7EA}"/>
+              </a:ext>
+            </a:extLst>
+          </p:cNvPr>
+          <p:cNvSpPr>
+            <a:spLocks noGrp="1"/>
+          </p:cNvSpPr>
+          <p:nvPr>
+            <p:ph type="sldNum" sz="quarter" idx="12"/>
+          </p:nvPr>
+        </p:nvSpPr>
+        <p:spPr/>
+        <p:txBody>
+          <a:bodyPr/>
+          <a:lstStyle/>
+          <a:p>
+            <a:fld id="{9C7CE217-4467-4B8D-A735-B008FA7C4816}" type="slidenum">
+              <a:rPr lang="LID4096" smtClean="0"/>
+              <a:t>34</a:t>
+            </a:fld>
+            <a:endParaRPr lang="LID4096"/>
+          </a:p>
+        </p:txBody>
+      </p:sp>
+    </p:spTree>
+    <p:extLst>
+      <p:ext uri="{BB962C8B-B14F-4D97-AF65-F5344CB8AC3E}">
+        <p14:creationId xmlns:p14="http://schemas.microsoft.com/office/powerpoint/2010/main" val="1855128041"/>
+      </p:ext>
+    </p:extLst>
+  </p:cSld>
+  <p:clrMapOvr>
+    <a:masterClrMapping/>
+  </p:clrMapOvr>
+</p:sld>
+</file>
+
+<file path=ppt/slides/slide35.xml><?xml version="1.0" encoding="utf-8"?>
+<p:sld xmlns:a="http://schemas.openxmlformats.org/drawingml/2006/main" xmlns:r="http://schemas.openxmlformats.org/officeDocument/2006/relationships" xmlns:p="http://schemas.openxmlformats.org/presentationml/2006/main">
+  <p:cSld>
+    <p:spTree>
+      <p:nvGrpSpPr>
         <p:cNvPr id="1" name=""/>
         <p:cNvGrpSpPr/>
         <p:nvPr/>
@@ -24951,25 +25156,43 @@
             <a:spLocks noGrp="1"/>
           </p:cNvSpPr>
           <p:nvPr>
-            <p:ph type="title" idx="4294967295"/>
+            <p:ph type="title"/>
           </p:nvPr>
         </p:nvSpPr>
-        <p:spPr>
-          <a:xfrm>
-            <a:off x="2009775" y="274638"/>
-            <a:ext cx="8229600" cy="1143000"/>
-          </a:xfrm>
-        </p:spPr>
+        <p:spPr/>
         <p:txBody>
           <a:bodyPr/>
           <a:lstStyle/>
           <a:p>
-            <a:pPr eaLnBrk="1" hangingPunct="1"/>
             <a:r>
               <a:rPr lang="en-US" dirty="0"/>
-              <a:t>Use case: parameter exploration  </a:t>
+              <a:t>Problem example</a:t>
             </a:r>
             <a:endParaRPr lang="nl-BE" dirty="0"/>
+          </a:p>
+        </p:txBody>
+      </p:sp>
+      <p:sp>
+        <p:nvSpPr>
+          <p:cNvPr id="6" name="Slide Number Placeholder 5"/>
+          <p:cNvSpPr>
+            <a:spLocks noGrp="1"/>
+          </p:cNvSpPr>
+          <p:nvPr>
+            <p:ph type="sldNum" sz="quarter" idx="12"/>
+          </p:nvPr>
+        </p:nvSpPr>
+        <p:spPr/>
+        <p:txBody>
+          <a:bodyPr/>
+          <a:lstStyle/>
+          <a:p>
+            <a:fld id="{0AA598EC-1C61-495B-A9F8-4410E339CCF5}" type="slidenum">
+              <a:rPr lang="en-US" smtClean="0"/>
+              <a:pPr/>
+              <a:t>35</a:t>
+            </a:fld>
+            <a:endParaRPr lang="en-US"/>
           </a:p>
         </p:txBody>
       </p:sp>
@@ -25637,29 +25860,6 @@
           </p:txBody>
         </p:sp>
       </p:grpSp>
-      <p:sp>
-        <p:nvSpPr>
-          <p:cNvPr id="6" name="Slide Number Placeholder 5"/>
-          <p:cNvSpPr>
-            <a:spLocks noGrp="1"/>
-          </p:cNvSpPr>
-          <p:nvPr>
-            <p:ph type="sldNum" sz="quarter" idx="12"/>
-          </p:nvPr>
-        </p:nvSpPr>
-        <p:spPr/>
-        <p:txBody>
-          <a:bodyPr/>
-          <a:lstStyle/>
-          <a:p>
-            <a:fld id="{0AA598EC-1C61-495B-A9F8-4410E339CCF5}" type="slidenum">
-              <a:rPr lang="en-US" smtClean="0"/>
-              <a:t>34</a:t>
-            </a:fld>
-            <a:endParaRPr lang="en-US"/>
-          </a:p>
-        </p:txBody>
-      </p:sp>
       <p:grpSp>
         <p:nvGrpSpPr>
           <p:cNvPr id="18" name="Group 17"/>
@@ -26846,7 +27046,7 @@
 </p:sld>
 </file>
 
-<file path=ppt/slides/slide35.xml><?xml version="1.0" encoding="utf-8"?>
+<file path=ppt/slides/slide36.xml><?xml version="1.0" encoding="utf-8"?>
 <p:sld xmlns:a="http://schemas.openxmlformats.org/drawingml/2006/main" xmlns:r="http://schemas.openxmlformats.org/officeDocument/2006/relationships" xmlns:p="http://schemas.openxmlformats.org/presentationml/2006/main">
   <p:cSld>
     <p:spTree>
@@ -26870,32 +27070,47 @@
             <a:spLocks noGrp="1"/>
           </p:cNvSpPr>
           <p:nvPr>
-            <p:ph type="title" idx="4294967295"/>
+            <p:ph type="title"/>
           </p:nvPr>
         </p:nvSpPr>
-        <p:spPr>
-          <a:xfrm>
-            <a:off x="2009775" y="274638"/>
-            <a:ext cx="8229600" cy="1143000"/>
-          </a:xfrm>
-        </p:spPr>
+        <p:spPr/>
         <p:txBody>
           <a:bodyPr/>
           <a:lstStyle/>
           <a:p>
-            <a:pPr eaLnBrk="1" hangingPunct="1"/>
             <a:r>
               <a:rPr lang="en-US" dirty="0"/>
               <a:t>Solution: </a:t>
             </a:r>
             <a:r>
-              <a:rPr lang="en-US" dirty="0" err="1">
-                <a:latin typeface="Courier New" pitchFamily="49" charset="0"/>
-                <a:cs typeface="Courier New" pitchFamily="49" charset="0"/>
-              </a:rPr>
+              <a:rPr lang="en-US" dirty="0" err="1"/>
               <a:t>aenv</a:t>
             </a:r>
             <a:endParaRPr lang="nl-BE" dirty="0"/>
+          </a:p>
+        </p:txBody>
+      </p:sp>
+      <p:sp>
+        <p:nvSpPr>
+          <p:cNvPr id="4" name="Slide Number Placeholder 3"/>
+          <p:cNvSpPr>
+            <a:spLocks noGrp="1"/>
+          </p:cNvSpPr>
+          <p:nvPr>
+            <p:ph type="sldNum" sz="quarter" idx="12"/>
+          </p:nvPr>
+        </p:nvSpPr>
+        <p:spPr/>
+        <p:txBody>
+          <a:bodyPr/>
+          <a:lstStyle/>
+          <a:p>
+            <a:fld id="{0AA598EC-1C61-495B-A9F8-4410E339CCF5}" type="slidenum">
+              <a:rPr lang="en-US" smtClean="0"/>
+              <a:pPr/>
+              <a:t>36</a:t>
+            </a:fld>
+            <a:endParaRPr lang="en-US" dirty="0"/>
           </a:p>
         </p:txBody>
       </p:sp>
@@ -27709,29 +27924,6 @@
           </p:txBody>
         </p:sp>
       </p:grpSp>
-      <p:sp>
-        <p:nvSpPr>
-          <p:cNvPr id="4" name="Slide Number Placeholder 3"/>
-          <p:cNvSpPr>
-            <a:spLocks noGrp="1"/>
-          </p:cNvSpPr>
-          <p:nvPr>
-            <p:ph type="sldNum" sz="quarter" idx="12"/>
-          </p:nvPr>
-        </p:nvSpPr>
-        <p:spPr/>
-        <p:txBody>
-          <a:bodyPr/>
-          <a:lstStyle/>
-          <a:p>
-            <a:fld id="{0AA598EC-1C61-495B-A9F8-4410E339CCF5}" type="slidenum">
-              <a:rPr lang="en-US" smtClean="0"/>
-              <a:t>35</a:t>
-            </a:fld>
-            <a:endParaRPr lang="en-US" dirty="0"/>
-          </a:p>
-        </p:txBody>
-      </p:sp>
       <p:graphicFrame>
         <p:nvGraphicFramePr>
           <p:cNvPr id="11" name="Table 10"/>
@@ -28263,7 +28455,7 @@
 </p:sld>
 </file>
 
-<file path=ppt/slides/slide36.xml><?xml version="1.0" encoding="utf-8"?>
+<file path=ppt/slides/slide37.xml><?xml version="1.0" encoding="utf-8"?>
 <p:sld xmlns:a="http://schemas.openxmlformats.org/drawingml/2006/main" xmlns:r="http://schemas.openxmlformats.org/officeDocument/2006/relationships" xmlns:p="http://schemas.openxmlformats.org/presentationml/2006/main">
   <p:cSld>
     <p:spTree>
@@ -28405,7 +28597,7 @@
           <a:p>
             <a:fld id="{0AA598EC-1C61-495B-A9F8-4410E339CCF5}" type="slidenum">
               <a:rPr lang="en-US" smtClean="0"/>
-              <a:t>36</a:t>
+              <a:t>37</a:t>
             </a:fld>
             <a:endParaRPr lang="en-US"/>
           </a:p>
@@ -28669,7 +28861,7 @@
 </p:sld>
 </file>
 
-<file path=ppt/slides/slide37.xml><?xml version="1.0" encoding="utf-8"?>
+<file path=ppt/slides/slide38.xml><?xml version="1.0" encoding="utf-8"?>
 <p:sld xmlns:a="http://schemas.openxmlformats.org/drawingml/2006/main" xmlns:r="http://schemas.openxmlformats.org/officeDocument/2006/relationships" xmlns:p="http://schemas.openxmlformats.org/presentationml/2006/main">
   <p:cSld>
     <p:spTree>
@@ -28764,7 +28956,7 @@
           <a:p>
             <a:fld id="{0AA598EC-1C61-495B-A9F8-4410E339CCF5}" type="slidenum">
               <a:rPr lang="en-US" smtClean="0"/>
-              <a:t>37</a:t>
+              <a:t>38</a:t>
             </a:fld>
             <a:endParaRPr lang="en-US"/>
           </a:p>
@@ -28778,7 +28970,7 @@
         </p:nvSpPr>
         <p:spPr>
           <a:xfrm>
-            <a:off x="1741737" y="2818672"/>
+            <a:off x="1741737" y="2919152"/>
             <a:ext cx="8648521" cy="2554545"/>
           </a:xfrm>
           <a:prstGeom prst="rect">
@@ -29301,7 +29493,7 @@
 </p:sld>
 </file>
 
-<file path=ppt/slides/slide38.xml><?xml version="1.0" encoding="utf-8"?>
+<file path=ppt/slides/slide39.xml><?xml version="1.0" encoding="utf-8"?>
 <p:sld xmlns:a="http://schemas.openxmlformats.org/drawingml/2006/main" xmlns:r="http://schemas.openxmlformats.org/officeDocument/2006/relationships" xmlns:p="http://schemas.openxmlformats.org/presentationml/2006/main">
   <p:cSld>
     <p:spTree>
@@ -33226,7 +33418,7 @@
           <a:p>
             <a:fld id="{0AA598EC-1C61-495B-A9F8-4410E339CCF5}" type="slidenum">
               <a:rPr lang="en-US" smtClean="0"/>
-              <a:t>38</a:t>
+              <a:t>39</a:t>
             </a:fld>
             <a:endParaRPr lang="en-US" dirty="0"/>
           </a:p>
@@ -33573,453 +33765,6 @@
     <p:bldLst>
       <p:bldP spid="5" grpId="0" animBg="1"/>
       <p:bldP spid="57" grpId="0" animBg="1"/>
-    </p:bldLst>
-  </p:timing>
-</p:sld>
-</file>
-
-<file path=ppt/slides/slide39.xml><?xml version="1.0" encoding="utf-8"?>
-<p:sld xmlns:a="http://schemas.openxmlformats.org/drawingml/2006/main" xmlns:r="http://schemas.openxmlformats.org/officeDocument/2006/relationships" xmlns:p="http://schemas.openxmlformats.org/presentationml/2006/main">
-  <p:cSld>
-    <p:spTree>
-      <p:nvGrpSpPr>
-        <p:cNvPr id="1" name=""/>
-        <p:cNvGrpSpPr/>
-        <p:nvPr/>
-      </p:nvGrpSpPr>
-      <p:grpSpPr>
-        <a:xfrm>
-          <a:off x="0" y="0"/>
-          <a:ext cx="0" cy="0"/>
-          <a:chOff x="0" y="0"/>
-          <a:chExt cx="0" cy="0"/>
-        </a:xfrm>
-      </p:grpSpPr>
-      <p:sp>
-        <p:nvSpPr>
-          <p:cNvPr id="14338" name="Title 1"/>
-          <p:cNvSpPr>
-            <a:spLocks noGrp="1"/>
-          </p:cNvSpPr>
-          <p:nvPr>
-            <p:ph type="title"/>
-          </p:nvPr>
-        </p:nvSpPr>
-        <p:spPr>
-          <a:xfrm>
-            <a:off x="838200" y="365125"/>
-            <a:ext cx="10515600" cy="1325563"/>
-          </a:xfrm>
-        </p:spPr>
-        <p:txBody>
-          <a:bodyPr/>
-          <a:lstStyle/>
-          <a:p>
-            <a:r>
-              <a:rPr lang="en-US" dirty="0"/>
-              <a:t>Logging</a:t>
-            </a:r>
-            <a:endParaRPr lang="nl-BE" dirty="0"/>
-          </a:p>
-        </p:txBody>
-      </p:sp>
-      <p:sp>
-        <p:nvSpPr>
-          <p:cNvPr id="14339" name="Content Placeholder 2"/>
-          <p:cNvSpPr>
-            <a:spLocks noGrp="1"/>
-          </p:cNvSpPr>
-          <p:nvPr>
-            <p:ph idx="1"/>
-          </p:nvPr>
-        </p:nvSpPr>
-        <p:spPr>
-          <a:xfrm>
-            <a:off x="838200" y="1825625"/>
-            <a:ext cx="10515600" cy="4351338"/>
-          </a:xfrm>
-        </p:spPr>
-        <p:txBody>
-          <a:bodyPr/>
-          <a:lstStyle/>
-          <a:p>
-            <a:r>
-              <a:rPr lang="en-US" dirty="0"/>
-              <a:t>Logging for</a:t>
-            </a:r>
-          </a:p>
-          <a:p>
-            <a:pPr lvl="1"/>
-            <a:r>
-              <a:rPr lang="en-US" dirty="0"/>
-              <a:t>bookkeeping: success/failures?</a:t>
-            </a:r>
-          </a:p>
-          <a:p>
-            <a:pPr lvl="1"/>
-            <a:r>
-              <a:rPr lang="en-US" dirty="0"/>
-              <a:t>redo failures</a:t>
-            </a:r>
-          </a:p>
-          <a:p>
-            <a:pPr lvl="1"/>
-            <a:r>
-              <a:rPr lang="en-US" dirty="0"/>
-              <a:t>performance analysis</a:t>
-            </a:r>
-          </a:p>
-          <a:p>
-            <a:r>
-              <a:rPr lang="en-US" dirty="0"/>
-              <a:t>Scheduler provides logs</a:t>
-            </a:r>
-          </a:p>
-          <a:p>
-            <a:pPr lvl="1"/>
-            <a:r>
-              <a:rPr lang="en-US" dirty="0"/>
-              <a:t>inconvenient</a:t>
-            </a:r>
-          </a:p>
-          <a:p>
-            <a:pPr lvl="1"/>
-            <a:r>
-              <a:rPr lang="en-US" dirty="0"/>
-              <a:t>not always user-accessible</a:t>
-            </a:r>
-          </a:p>
-          <a:p>
-            <a:endParaRPr lang="en-US" dirty="0"/>
-          </a:p>
-        </p:txBody>
-      </p:sp>
-      <p:sp>
-        <p:nvSpPr>
-          <p:cNvPr id="2" name="Slide Number Placeholder 1"/>
-          <p:cNvSpPr>
-            <a:spLocks noGrp="1"/>
-          </p:cNvSpPr>
-          <p:nvPr>
-            <p:ph type="sldNum" sz="quarter" idx="12"/>
-          </p:nvPr>
-        </p:nvSpPr>
-        <p:spPr>
-          <a:xfrm>
-            <a:off x="8610600" y="6356350"/>
-            <a:ext cx="2743200" cy="365125"/>
-          </a:xfrm>
-        </p:spPr>
-        <p:txBody>
-          <a:bodyPr/>
-          <a:lstStyle/>
-          <a:p>
-            <a:fld id="{0AA598EC-1C61-495B-A9F8-4410E339CCF5}" type="slidenum">
-              <a:rPr lang="en-US" smtClean="0"/>
-              <a:pPr/>
-              <a:t>39</a:t>
-            </a:fld>
-            <a:endParaRPr lang="en-US"/>
-          </a:p>
-        </p:txBody>
-      </p:sp>
-    </p:spTree>
-    <p:extLst>
-      <p:ext uri="{BB962C8B-B14F-4D97-AF65-F5344CB8AC3E}">
-        <p14:creationId xmlns:p14="http://schemas.microsoft.com/office/powerpoint/2010/main" val="653068579"/>
-      </p:ext>
-    </p:extLst>
-  </p:cSld>
-  <p:clrMapOvr>
-    <a:masterClrMapping/>
-  </p:clrMapOvr>
-  <p:timing>
-    <p:tnLst>
-      <p:par>
-        <p:cTn id="1" dur="indefinite" restart="never" nodeType="tmRoot">
-          <p:childTnLst>
-            <p:seq concurrent="1" nextAc="seek">
-              <p:cTn id="2" dur="indefinite" nodeType="mainSeq">
-                <p:childTnLst>
-                  <p:par>
-                    <p:cTn id="3" fill="hold">
-                      <p:stCondLst>
-                        <p:cond delay="indefinite"/>
-                        <p:cond evt="onBegin" delay="0">
-                          <p:tn val="2"/>
-                        </p:cond>
-                      </p:stCondLst>
-                      <p:childTnLst>
-                        <p:par>
-                          <p:cTn id="4" fill="hold">
-                            <p:stCondLst>
-                              <p:cond delay="0"/>
-                            </p:stCondLst>
-                            <p:childTnLst>
-                              <p:par>
-                                <p:cTn id="5" presetID="1" presetClass="entr" presetSubtype="0" fill="hold" grpId="0" nodeType="withEffect">
-                                  <p:stCondLst>
-                                    <p:cond delay="0"/>
-                                  </p:stCondLst>
-                                  <p:childTnLst>
-                                    <p:set>
-                                      <p:cBhvr>
-                                        <p:cTn id="6" dur="1" fill="hold">
-                                          <p:stCondLst>
-                                            <p:cond delay="0"/>
-                                          </p:stCondLst>
-                                        </p:cTn>
-                                        <p:tgtEl>
-                                          <p:spTgt spid="14339">
-                                            <p:txEl>
-                                              <p:pRg st="0" end="0"/>
-                                            </p:txEl>
-                                          </p:spTgt>
-                                        </p:tgtEl>
-                                        <p:attrNameLst>
-                                          <p:attrName>style.visibility</p:attrName>
-                                        </p:attrNameLst>
-                                      </p:cBhvr>
-                                      <p:to>
-                                        <p:strVal val="visible"/>
-                                      </p:to>
-                                    </p:set>
-                                  </p:childTnLst>
-                                </p:cTn>
-                              </p:par>
-                              <p:par>
-                                <p:cTn id="7" presetID="1" presetClass="entr" presetSubtype="0" fill="hold" grpId="0" nodeType="withEffect">
-                                  <p:stCondLst>
-                                    <p:cond delay="0"/>
-                                  </p:stCondLst>
-                                  <p:childTnLst>
-                                    <p:set>
-                                      <p:cBhvr>
-                                        <p:cTn id="8" dur="1" fill="hold">
-                                          <p:stCondLst>
-                                            <p:cond delay="0"/>
-                                          </p:stCondLst>
-                                        </p:cTn>
-                                        <p:tgtEl>
-                                          <p:spTgt spid="14339">
-                                            <p:txEl>
-                                              <p:pRg st="1" end="1"/>
-                                            </p:txEl>
-                                          </p:spTgt>
-                                        </p:tgtEl>
-                                        <p:attrNameLst>
-                                          <p:attrName>style.visibility</p:attrName>
-                                        </p:attrNameLst>
-                                      </p:cBhvr>
-                                      <p:to>
-                                        <p:strVal val="visible"/>
-                                      </p:to>
-                                    </p:set>
-                                  </p:childTnLst>
-                                </p:cTn>
-                              </p:par>
-                              <p:par>
-                                <p:cTn id="9" presetID="1" presetClass="entr" presetSubtype="0" fill="hold" grpId="0" nodeType="withEffect">
-                                  <p:stCondLst>
-                                    <p:cond delay="0"/>
-                                  </p:stCondLst>
-                                  <p:childTnLst>
-                                    <p:set>
-                                      <p:cBhvr>
-                                        <p:cTn id="10" dur="1" fill="hold">
-                                          <p:stCondLst>
-                                            <p:cond delay="0"/>
-                                          </p:stCondLst>
-                                        </p:cTn>
-                                        <p:tgtEl>
-                                          <p:spTgt spid="14339">
-                                            <p:txEl>
-                                              <p:pRg st="2" end="2"/>
-                                            </p:txEl>
-                                          </p:spTgt>
-                                        </p:tgtEl>
-                                        <p:attrNameLst>
-                                          <p:attrName>style.visibility</p:attrName>
-                                        </p:attrNameLst>
-                                      </p:cBhvr>
-                                      <p:to>
-                                        <p:strVal val="visible"/>
-                                      </p:to>
-                                    </p:set>
-                                  </p:childTnLst>
-                                </p:cTn>
-                              </p:par>
-                              <p:par>
-                                <p:cTn id="11" presetID="1" presetClass="entr" presetSubtype="0" fill="hold" grpId="0" nodeType="withEffect">
-                                  <p:stCondLst>
-                                    <p:cond delay="0"/>
-                                  </p:stCondLst>
-                                  <p:childTnLst>
-                                    <p:set>
-                                      <p:cBhvr>
-                                        <p:cTn id="12" dur="1" fill="hold">
-                                          <p:stCondLst>
-                                            <p:cond delay="0"/>
-                                          </p:stCondLst>
-                                        </p:cTn>
-                                        <p:tgtEl>
-                                          <p:spTgt spid="14339">
-                                            <p:txEl>
-                                              <p:pRg st="3" end="3"/>
-                                            </p:txEl>
-                                          </p:spTgt>
-                                        </p:tgtEl>
-                                        <p:attrNameLst>
-                                          <p:attrName>style.visibility</p:attrName>
-                                        </p:attrNameLst>
-                                      </p:cBhvr>
-                                      <p:to>
-                                        <p:strVal val="visible"/>
-                                      </p:to>
-                                    </p:set>
-                                  </p:childTnLst>
-                                </p:cTn>
-                              </p:par>
-                            </p:childTnLst>
-                          </p:cTn>
-                        </p:par>
-                      </p:childTnLst>
-                    </p:cTn>
-                  </p:par>
-                  <p:par>
-                    <p:cTn id="13" fill="hold">
-                      <p:stCondLst>
-                        <p:cond delay="indefinite"/>
-                      </p:stCondLst>
-                      <p:childTnLst>
-                        <p:par>
-                          <p:cTn id="14" fill="hold">
-                            <p:stCondLst>
-                              <p:cond delay="0"/>
-                            </p:stCondLst>
-                            <p:childTnLst>
-                              <p:par>
-                                <p:cTn id="15" presetID="1" presetClass="entr" presetSubtype="0" fill="hold" grpId="0" nodeType="clickEffect">
-                                  <p:stCondLst>
-                                    <p:cond delay="0"/>
-                                  </p:stCondLst>
-                                  <p:childTnLst>
-                                    <p:set>
-                                      <p:cBhvr>
-                                        <p:cTn id="16" dur="1" fill="hold">
-                                          <p:stCondLst>
-                                            <p:cond delay="0"/>
-                                          </p:stCondLst>
-                                        </p:cTn>
-                                        <p:tgtEl>
-                                          <p:spTgt spid="14339">
-                                            <p:txEl>
-                                              <p:pRg st="4" end="4"/>
-                                            </p:txEl>
-                                          </p:spTgt>
-                                        </p:tgtEl>
-                                        <p:attrNameLst>
-                                          <p:attrName>style.visibility</p:attrName>
-                                        </p:attrNameLst>
-                                      </p:cBhvr>
-                                      <p:to>
-                                        <p:strVal val="visible"/>
-                                      </p:to>
-                                    </p:set>
-                                  </p:childTnLst>
-                                </p:cTn>
-                              </p:par>
-                              <p:par>
-                                <p:cTn id="17" presetID="1" presetClass="entr" presetSubtype="0" fill="hold" grpId="0" nodeType="withEffect">
-                                  <p:stCondLst>
-                                    <p:cond delay="0"/>
-                                  </p:stCondLst>
-                                  <p:childTnLst>
-                                    <p:set>
-                                      <p:cBhvr>
-                                        <p:cTn id="18" dur="1" fill="hold">
-                                          <p:stCondLst>
-                                            <p:cond delay="0"/>
-                                          </p:stCondLst>
-                                        </p:cTn>
-                                        <p:tgtEl>
-                                          <p:spTgt spid="14339">
-                                            <p:txEl>
-                                              <p:pRg st="5" end="5"/>
-                                            </p:txEl>
-                                          </p:spTgt>
-                                        </p:tgtEl>
-                                        <p:attrNameLst>
-                                          <p:attrName>style.visibility</p:attrName>
-                                        </p:attrNameLst>
-                                      </p:cBhvr>
-                                      <p:to>
-                                        <p:strVal val="visible"/>
-                                      </p:to>
-                                    </p:set>
-                                  </p:childTnLst>
-                                </p:cTn>
-                              </p:par>
-                              <p:par>
-                                <p:cTn id="19" presetID="1" presetClass="entr" presetSubtype="0" fill="hold" grpId="0" nodeType="withEffect">
-                                  <p:stCondLst>
-                                    <p:cond delay="0"/>
-                                  </p:stCondLst>
-                                  <p:childTnLst>
-                                    <p:set>
-                                      <p:cBhvr>
-                                        <p:cTn id="20" dur="1" fill="hold">
-                                          <p:stCondLst>
-                                            <p:cond delay="0"/>
-                                          </p:stCondLst>
-                                        </p:cTn>
-                                        <p:tgtEl>
-                                          <p:spTgt spid="14339">
-                                            <p:txEl>
-                                              <p:pRg st="6" end="6"/>
-                                            </p:txEl>
-                                          </p:spTgt>
-                                        </p:tgtEl>
-                                        <p:attrNameLst>
-                                          <p:attrName>style.visibility</p:attrName>
-                                        </p:attrNameLst>
-                                      </p:cBhvr>
-                                      <p:to>
-                                        <p:strVal val="visible"/>
-                                      </p:to>
-                                    </p:set>
-                                  </p:childTnLst>
-                                </p:cTn>
-                              </p:par>
-                            </p:childTnLst>
-                          </p:cTn>
-                        </p:par>
-                      </p:childTnLst>
-                    </p:cTn>
-                  </p:par>
-                </p:childTnLst>
-              </p:cTn>
-              <p:prevCondLst>
-                <p:cond evt="onPrev" delay="0">
-                  <p:tgtEl>
-                    <p:sldTgt/>
-                  </p:tgtEl>
-                </p:cond>
-              </p:prevCondLst>
-              <p:nextCondLst>
-                <p:cond evt="onNext" delay="0">
-                  <p:tgtEl>
-                    <p:sldTgt/>
-                  </p:tgtEl>
-                </p:cond>
-              </p:nextCondLst>
-            </p:seq>
-          </p:childTnLst>
-        </p:cTn>
-      </p:par>
-    </p:tnLst>
-    <p:bldLst>
-      <p:bldP spid="14339" grpId="0" build="p"/>
     </p:bldLst>
   </p:timing>
 </p:sld>
@@ -35366,6 +35111,453 @@
       </p:grpSpPr>
       <p:sp>
         <p:nvSpPr>
+          <p:cNvPr id="14338" name="Title 1"/>
+          <p:cNvSpPr>
+            <a:spLocks noGrp="1"/>
+          </p:cNvSpPr>
+          <p:nvPr>
+            <p:ph type="title"/>
+          </p:nvPr>
+        </p:nvSpPr>
+        <p:spPr>
+          <a:xfrm>
+            <a:off x="838200" y="365125"/>
+            <a:ext cx="10515600" cy="1325563"/>
+          </a:xfrm>
+        </p:spPr>
+        <p:txBody>
+          <a:bodyPr/>
+          <a:lstStyle/>
+          <a:p>
+            <a:r>
+              <a:rPr lang="en-US" dirty="0"/>
+              <a:t>Logging</a:t>
+            </a:r>
+            <a:endParaRPr lang="nl-BE" dirty="0"/>
+          </a:p>
+        </p:txBody>
+      </p:sp>
+      <p:sp>
+        <p:nvSpPr>
+          <p:cNvPr id="14339" name="Content Placeholder 2"/>
+          <p:cNvSpPr>
+            <a:spLocks noGrp="1"/>
+          </p:cNvSpPr>
+          <p:nvPr>
+            <p:ph idx="1"/>
+          </p:nvPr>
+        </p:nvSpPr>
+        <p:spPr>
+          <a:xfrm>
+            <a:off x="838200" y="1825625"/>
+            <a:ext cx="10515600" cy="4351338"/>
+          </a:xfrm>
+        </p:spPr>
+        <p:txBody>
+          <a:bodyPr/>
+          <a:lstStyle/>
+          <a:p>
+            <a:r>
+              <a:rPr lang="en-US" dirty="0"/>
+              <a:t>Logging for</a:t>
+            </a:r>
+          </a:p>
+          <a:p>
+            <a:pPr lvl="1"/>
+            <a:r>
+              <a:rPr lang="en-US" dirty="0"/>
+              <a:t>bookkeeping: success/failures?</a:t>
+            </a:r>
+          </a:p>
+          <a:p>
+            <a:pPr lvl="1"/>
+            <a:r>
+              <a:rPr lang="en-US" dirty="0"/>
+              <a:t>redo failures</a:t>
+            </a:r>
+          </a:p>
+          <a:p>
+            <a:pPr lvl="1"/>
+            <a:r>
+              <a:rPr lang="en-US" dirty="0"/>
+              <a:t>performance analysis</a:t>
+            </a:r>
+          </a:p>
+          <a:p>
+            <a:r>
+              <a:rPr lang="en-US" dirty="0"/>
+              <a:t>Scheduler provides logs</a:t>
+            </a:r>
+          </a:p>
+          <a:p>
+            <a:pPr lvl="1"/>
+            <a:r>
+              <a:rPr lang="en-US" dirty="0"/>
+              <a:t>inconvenient</a:t>
+            </a:r>
+          </a:p>
+          <a:p>
+            <a:pPr lvl="1"/>
+            <a:r>
+              <a:rPr lang="en-US" dirty="0"/>
+              <a:t>not always user-accessible</a:t>
+            </a:r>
+          </a:p>
+          <a:p>
+            <a:endParaRPr lang="en-US" dirty="0"/>
+          </a:p>
+        </p:txBody>
+      </p:sp>
+      <p:sp>
+        <p:nvSpPr>
+          <p:cNvPr id="2" name="Slide Number Placeholder 1"/>
+          <p:cNvSpPr>
+            <a:spLocks noGrp="1"/>
+          </p:cNvSpPr>
+          <p:nvPr>
+            <p:ph type="sldNum" sz="quarter" idx="12"/>
+          </p:nvPr>
+        </p:nvSpPr>
+        <p:spPr>
+          <a:xfrm>
+            <a:off x="8610600" y="6356350"/>
+            <a:ext cx="2743200" cy="365125"/>
+          </a:xfrm>
+        </p:spPr>
+        <p:txBody>
+          <a:bodyPr/>
+          <a:lstStyle/>
+          <a:p>
+            <a:fld id="{0AA598EC-1C61-495B-A9F8-4410E339CCF5}" type="slidenum">
+              <a:rPr lang="en-US" smtClean="0"/>
+              <a:pPr/>
+              <a:t>40</a:t>
+            </a:fld>
+            <a:endParaRPr lang="en-US"/>
+          </a:p>
+        </p:txBody>
+      </p:sp>
+    </p:spTree>
+    <p:extLst>
+      <p:ext uri="{BB962C8B-B14F-4D97-AF65-F5344CB8AC3E}">
+        <p14:creationId xmlns:p14="http://schemas.microsoft.com/office/powerpoint/2010/main" val="653068579"/>
+      </p:ext>
+    </p:extLst>
+  </p:cSld>
+  <p:clrMapOvr>
+    <a:masterClrMapping/>
+  </p:clrMapOvr>
+  <p:timing>
+    <p:tnLst>
+      <p:par>
+        <p:cTn id="1" dur="indefinite" restart="never" nodeType="tmRoot">
+          <p:childTnLst>
+            <p:seq concurrent="1" nextAc="seek">
+              <p:cTn id="2" dur="indefinite" nodeType="mainSeq">
+                <p:childTnLst>
+                  <p:par>
+                    <p:cTn id="3" fill="hold">
+                      <p:stCondLst>
+                        <p:cond delay="indefinite"/>
+                        <p:cond evt="onBegin" delay="0">
+                          <p:tn val="2"/>
+                        </p:cond>
+                      </p:stCondLst>
+                      <p:childTnLst>
+                        <p:par>
+                          <p:cTn id="4" fill="hold">
+                            <p:stCondLst>
+                              <p:cond delay="0"/>
+                            </p:stCondLst>
+                            <p:childTnLst>
+                              <p:par>
+                                <p:cTn id="5" presetID="1" presetClass="entr" presetSubtype="0" fill="hold" grpId="0" nodeType="withEffect">
+                                  <p:stCondLst>
+                                    <p:cond delay="0"/>
+                                  </p:stCondLst>
+                                  <p:childTnLst>
+                                    <p:set>
+                                      <p:cBhvr>
+                                        <p:cTn id="6" dur="1" fill="hold">
+                                          <p:stCondLst>
+                                            <p:cond delay="0"/>
+                                          </p:stCondLst>
+                                        </p:cTn>
+                                        <p:tgtEl>
+                                          <p:spTgt spid="14339">
+                                            <p:txEl>
+                                              <p:pRg st="0" end="0"/>
+                                            </p:txEl>
+                                          </p:spTgt>
+                                        </p:tgtEl>
+                                        <p:attrNameLst>
+                                          <p:attrName>style.visibility</p:attrName>
+                                        </p:attrNameLst>
+                                      </p:cBhvr>
+                                      <p:to>
+                                        <p:strVal val="visible"/>
+                                      </p:to>
+                                    </p:set>
+                                  </p:childTnLst>
+                                </p:cTn>
+                              </p:par>
+                              <p:par>
+                                <p:cTn id="7" presetID="1" presetClass="entr" presetSubtype="0" fill="hold" grpId="0" nodeType="withEffect">
+                                  <p:stCondLst>
+                                    <p:cond delay="0"/>
+                                  </p:stCondLst>
+                                  <p:childTnLst>
+                                    <p:set>
+                                      <p:cBhvr>
+                                        <p:cTn id="8" dur="1" fill="hold">
+                                          <p:stCondLst>
+                                            <p:cond delay="0"/>
+                                          </p:stCondLst>
+                                        </p:cTn>
+                                        <p:tgtEl>
+                                          <p:spTgt spid="14339">
+                                            <p:txEl>
+                                              <p:pRg st="1" end="1"/>
+                                            </p:txEl>
+                                          </p:spTgt>
+                                        </p:tgtEl>
+                                        <p:attrNameLst>
+                                          <p:attrName>style.visibility</p:attrName>
+                                        </p:attrNameLst>
+                                      </p:cBhvr>
+                                      <p:to>
+                                        <p:strVal val="visible"/>
+                                      </p:to>
+                                    </p:set>
+                                  </p:childTnLst>
+                                </p:cTn>
+                              </p:par>
+                              <p:par>
+                                <p:cTn id="9" presetID="1" presetClass="entr" presetSubtype="0" fill="hold" grpId="0" nodeType="withEffect">
+                                  <p:stCondLst>
+                                    <p:cond delay="0"/>
+                                  </p:stCondLst>
+                                  <p:childTnLst>
+                                    <p:set>
+                                      <p:cBhvr>
+                                        <p:cTn id="10" dur="1" fill="hold">
+                                          <p:stCondLst>
+                                            <p:cond delay="0"/>
+                                          </p:stCondLst>
+                                        </p:cTn>
+                                        <p:tgtEl>
+                                          <p:spTgt spid="14339">
+                                            <p:txEl>
+                                              <p:pRg st="2" end="2"/>
+                                            </p:txEl>
+                                          </p:spTgt>
+                                        </p:tgtEl>
+                                        <p:attrNameLst>
+                                          <p:attrName>style.visibility</p:attrName>
+                                        </p:attrNameLst>
+                                      </p:cBhvr>
+                                      <p:to>
+                                        <p:strVal val="visible"/>
+                                      </p:to>
+                                    </p:set>
+                                  </p:childTnLst>
+                                </p:cTn>
+                              </p:par>
+                              <p:par>
+                                <p:cTn id="11" presetID="1" presetClass="entr" presetSubtype="0" fill="hold" grpId="0" nodeType="withEffect">
+                                  <p:stCondLst>
+                                    <p:cond delay="0"/>
+                                  </p:stCondLst>
+                                  <p:childTnLst>
+                                    <p:set>
+                                      <p:cBhvr>
+                                        <p:cTn id="12" dur="1" fill="hold">
+                                          <p:stCondLst>
+                                            <p:cond delay="0"/>
+                                          </p:stCondLst>
+                                        </p:cTn>
+                                        <p:tgtEl>
+                                          <p:spTgt spid="14339">
+                                            <p:txEl>
+                                              <p:pRg st="3" end="3"/>
+                                            </p:txEl>
+                                          </p:spTgt>
+                                        </p:tgtEl>
+                                        <p:attrNameLst>
+                                          <p:attrName>style.visibility</p:attrName>
+                                        </p:attrNameLst>
+                                      </p:cBhvr>
+                                      <p:to>
+                                        <p:strVal val="visible"/>
+                                      </p:to>
+                                    </p:set>
+                                  </p:childTnLst>
+                                </p:cTn>
+                              </p:par>
+                            </p:childTnLst>
+                          </p:cTn>
+                        </p:par>
+                      </p:childTnLst>
+                    </p:cTn>
+                  </p:par>
+                  <p:par>
+                    <p:cTn id="13" fill="hold">
+                      <p:stCondLst>
+                        <p:cond delay="indefinite"/>
+                      </p:stCondLst>
+                      <p:childTnLst>
+                        <p:par>
+                          <p:cTn id="14" fill="hold">
+                            <p:stCondLst>
+                              <p:cond delay="0"/>
+                            </p:stCondLst>
+                            <p:childTnLst>
+                              <p:par>
+                                <p:cTn id="15" presetID="1" presetClass="entr" presetSubtype="0" fill="hold" grpId="0" nodeType="clickEffect">
+                                  <p:stCondLst>
+                                    <p:cond delay="0"/>
+                                  </p:stCondLst>
+                                  <p:childTnLst>
+                                    <p:set>
+                                      <p:cBhvr>
+                                        <p:cTn id="16" dur="1" fill="hold">
+                                          <p:stCondLst>
+                                            <p:cond delay="0"/>
+                                          </p:stCondLst>
+                                        </p:cTn>
+                                        <p:tgtEl>
+                                          <p:spTgt spid="14339">
+                                            <p:txEl>
+                                              <p:pRg st="4" end="4"/>
+                                            </p:txEl>
+                                          </p:spTgt>
+                                        </p:tgtEl>
+                                        <p:attrNameLst>
+                                          <p:attrName>style.visibility</p:attrName>
+                                        </p:attrNameLst>
+                                      </p:cBhvr>
+                                      <p:to>
+                                        <p:strVal val="visible"/>
+                                      </p:to>
+                                    </p:set>
+                                  </p:childTnLst>
+                                </p:cTn>
+                              </p:par>
+                              <p:par>
+                                <p:cTn id="17" presetID="1" presetClass="entr" presetSubtype="0" fill="hold" grpId="0" nodeType="withEffect">
+                                  <p:stCondLst>
+                                    <p:cond delay="0"/>
+                                  </p:stCondLst>
+                                  <p:childTnLst>
+                                    <p:set>
+                                      <p:cBhvr>
+                                        <p:cTn id="18" dur="1" fill="hold">
+                                          <p:stCondLst>
+                                            <p:cond delay="0"/>
+                                          </p:stCondLst>
+                                        </p:cTn>
+                                        <p:tgtEl>
+                                          <p:spTgt spid="14339">
+                                            <p:txEl>
+                                              <p:pRg st="5" end="5"/>
+                                            </p:txEl>
+                                          </p:spTgt>
+                                        </p:tgtEl>
+                                        <p:attrNameLst>
+                                          <p:attrName>style.visibility</p:attrName>
+                                        </p:attrNameLst>
+                                      </p:cBhvr>
+                                      <p:to>
+                                        <p:strVal val="visible"/>
+                                      </p:to>
+                                    </p:set>
+                                  </p:childTnLst>
+                                </p:cTn>
+                              </p:par>
+                              <p:par>
+                                <p:cTn id="19" presetID="1" presetClass="entr" presetSubtype="0" fill="hold" grpId="0" nodeType="withEffect">
+                                  <p:stCondLst>
+                                    <p:cond delay="0"/>
+                                  </p:stCondLst>
+                                  <p:childTnLst>
+                                    <p:set>
+                                      <p:cBhvr>
+                                        <p:cTn id="20" dur="1" fill="hold">
+                                          <p:stCondLst>
+                                            <p:cond delay="0"/>
+                                          </p:stCondLst>
+                                        </p:cTn>
+                                        <p:tgtEl>
+                                          <p:spTgt spid="14339">
+                                            <p:txEl>
+                                              <p:pRg st="6" end="6"/>
+                                            </p:txEl>
+                                          </p:spTgt>
+                                        </p:tgtEl>
+                                        <p:attrNameLst>
+                                          <p:attrName>style.visibility</p:attrName>
+                                        </p:attrNameLst>
+                                      </p:cBhvr>
+                                      <p:to>
+                                        <p:strVal val="visible"/>
+                                      </p:to>
+                                    </p:set>
+                                  </p:childTnLst>
+                                </p:cTn>
+                              </p:par>
+                            </p:childTnLst>
+                          </p:cTn>
+                        </p:par>
+                      </p:childTnLst>
+                    </p:cTn>
+                  </p:par>
+                </p:childTnLst>
+              </p:cTn>
+              <p:prevCondLst>
+                <p:cond evt="onPrev" delay="0">
+                  <p:tgtEl>
+                    <p:sldTgt/>
+                  </p:tgtEl>
+                </p:cond>
+              </p:prevCondLst>
+              <p:nextCondLst>
+                <p:cond evt="onNext" delay="0">
+                  <p:tgtEl>
+                    <p:sldTgt/>
+                  </p:tgtEl>
+                </p:cond>
+              </p:nextCondLst>
+            </p:seq>
+          </p:childTnLst>
+        </p:cTn>
+      </p:par>
+    </p:tnLst>
+    <p:bldLst>
+      <p:bldP spid="14339" grpId="0" build="p"/>
+    </p:bldLst>
+  </p:timing>
+</p:sld>
+</file>
+
+<file path=ppt/slides/slide41.xml><?xml version="1.0" encoding="utf-8"?>
+<p:sld xmlns:a="http://schemas.openxmlformats.org/drawingml/2006/main" xmlns:r="http://schemas.openxmlformats.org/officeDocument/2006/relationships" xmlns:p="http://schemas.openxmlformats.org/presentationml/2006/main">
+  <p:cSld>
+    <p:spTree>
+      <p:nvGrpSpPr>
+        <p:cNvPr id="1" name=""/>
+        <p:cNvGrpSpPr/>
+        <p:nvPr/>
+      </p:nvGrpSpPr>
+      <p:grpSpPr>
+        <a:xfrm>
+          <a:off x="0" y="0"/>
+          <a:ext cx="0" cy="0"/>
+          <a:chOff x="0" y="0"/>
+          <a:chExt cx="0" cy="0"/>
+        </a:xfrm>
+      </p:grpSpPr>
+      <p:sp>
+        <p:nvSpPr>
           <p:cNvPr id="2" name="Title 1"/>
           <p:cNvSpPr>
             <a:spLocks noGrp="1"/>
@@ -35414,7 +35606,7 @@
           <a:p>
             <a:fld id="{0AA598EC-1C61-495B-A9F8-4410E339CCF5}" type="slidenum">
               <a:rPr lang="en-US" smtClean="0"/>
-              <a:t>40</a:t>
+              <a:t>41</a:t>
             </a:fld>
             <a:endParaRPr lang="en-US"/>
           </a:p>
@@ -36242,7 +36434,7 @@
 </p:sld>
 </file>
 
-<file path=ppt/slides/slide41.xml><?xml version="1.0" encoding="utf-8"?>
+<file path=ppt/slides/slide42.xml><?xml version="1.0" encoding="utf-8"?>
 <p:sld xmlns:a="http://schemas.openxmlformats.org/drawingml/2006/main" xmlns:r="http://schemas.openxmlformats.org/officeDocument/2006/relationships" xmlns:p="http://schemas.openxmlformats.org/presentationml/2006/main">
   <p:cSld>
     <p:spTree>
@@ -36331,7 +36523,7 @@
           <a:p>
             <a:fld id="{0AA598EC-1C61-495B-A9F8-4410E339CCF5}" type="slidenum">
               <a:rPr lang="en-US" smtClean="0"/>
-              <a:t>41</a:t>
+              <a:t>42</a:t>
             </a:fld>
             <a:endParaRPr lang="en-US"/>
           </a:p>
@@ -36639,7 +36831,7 @@
 </p:sld>
 </file>
 
-<file path=ppt/slides/slide42.xml><?xml version="1.0" encoding="utf-8"?>
+<file path=ppt/slides/slide43.xml><?xml version="1.0" encoding="utf-8"?>
 <p:sld xmlns:a="http://schemas.openxmlformats.org/drawingml/2006/main" xmlns:r="http://schemas.openxmlformats.org/officeDocument/2006/relationships" xmlns:p="http://schemas.openxmlformats.org/presentationml/2006/main">
   <p:cSld>
     <p:spTree>
@@ -36731,6 +36923,9 @@
             <a:endParaRPr lang="en-US" dirty="0"/>
           </a:p>
           <a:p>
+            <a:endParaRPr lang="en-US" dirty="0"/>
+          </a:p>
+          <a:p>
             <a:r>
               <a:rPr lang="en-US" dirty="0"/>
               <a:t>Redo failed work items</a:t>
@@ -36749,7 +36944,7 @@
         </p:nvSpPr>
         <p:spPr bwMode="auto">
           <a:xfrm>
-            <a:off x="1631505" y="4328187"/>
+            <a:off x="1631505" y="5071761"/>
             <a:ext cx="8826384" cy="1200329"/>
           </a:xfrm>
           <a:prstGeom prst="rect">
@@ -36971,7 +37166,7 @@
           <a:p>
             <a:fld id="{0AA598EC-1C61-495B-A9F8-4410E339CCF5}" type="slidenum">
               <a:rPr lang="en-US" smtClean="0"/>
-              <a:t>42</a:t>
+              <a:t>43</a:t>
             </a:fld>
             <a:endParaRPr lang="en-US"/>
           </a:p>
@@ -36987,7 +37182,7 @@
         </p:nvSpPr>
         <p:spPr bwMode="auto">
           <a:xfrm>
-            <a:off x="1631506" y="2276689"/>
+            <a:off x="1631506" y="2547994"/>
             <a:ext cx="8856983" cy="1569660"/>
           </a:xfrm>
           <a:prstGeom prst="rect">
@@ -37387,7 +37582,7 @@
                                         <p:tgtEl>
                                           <p:spTgt spid="15363">
                                             <p:txEl>
-                                              <p:pRg st="4" end="4"/>
+                                              <p:pRg st="5" end="5"/>
                                             </p:txEl>
                                           </p:spTgt>
                                         </p:tgtEl>
@@ -37465,7 +37660,7 @@
 </p:sld>
 </file>
 
-<file path=ppt/slides/slide43.xml><?xml version="1.0" encoding="utf-8"?>
+<file path=ppt/slides/slide44.xml><?xml version="1.0" encoding="utf-8"?>
 <p:sld xmlns:a="http://schemas.openxmlformats.org/drawingml/2006/main" xmlns:r="http://schemas.openxmlformats.org/officeDocument/2006/relationships" xmlns:p="http://schemas.openxmlformats.org/presentationml/2006/main">
   <p:cSld>
     <p:spTree>
@@ -37573,6 +37768,10 @@
           </a:p>
           <a:p>
             <a:pPr lvl="1"/>
+            <a:endParaRPr lang="en-US" dirty="0"/>
+          </a:p>
+          <a:p>
+            <a:pPr lvl="1"/>
             <a:r>
               <a:rPr lang="en-US" dirty="0"/>
               <a:t>logging and using </a:t>
@@ -37608,7 +37807,7 @@
           <a:p>
             <a:fld id="{0AA598EC-1C61-495B-A9F8-4410E339CCF5}" type="slidenum">
               <a:rPr lang="en-US" smtClean="0"/>
-              <a:t>43</a:t>
+              <a:t>44</a:t>
             </a:fld>
             <a:endParaRPr lang="en-US"/>
           </a:p>
@@ -37624,7 +37823,7 @@
         </p:nvSpPr>
         <p:spPr bwMode="auto">
           <a:xfrm>
-            <a:off x="2171663" y="2780929"/>
+            <a:off x="2171663" y="2901506"/>
             <a:ext cx="7848674" cy="461665"/>
           </a:xfrm>
           <a:prstGeom prst="rect">
@@ -37830,7 +38029,7 @@
         </p:nvSpPr>
         <p:spPr bwMode="auto">
           <a:xfrm>
-            <a:off x="2171663" y="4387572"/>
+            <a:off x="2171663" y="4447861"/>
             <a:ext cx="7848674" cy="830997"/>
           </a:xfrm>
           <a:prstGeom prst="rect">
@@ -38195,7 +38394,7 @@
                                         <p:tgtEl>
                                           <p:spTgt spid="3">
                                             <p:txEl>
-                                              <p:pRg st="4" end="4"/>
+                                              <p:pRg st="5" end="5"/>
                                             </p:txEl>
                                           </p:spTgt>
                                         </p:tgtEl>
@@ -38273,7 +38472,7 @@
 </p:sld>
 </file>
 
-<file path=ppt/slides/slide44.xml><?xml version="1.0" encoding="utf-8"?>
+<file path=ppt/slides/slide45.xml><?xml version="1.0" encoding="utf-8"?>
 <p:sld xmlns:a="http://schemas.openxmlformats.org/drawingml/2006/main" xmlns:r="http://schemas.openxmlformats.org/officeDocument/2006/relationships" xmlns:p="http://schemas.openxmlformats.org/presentationml/2006/main">
   <p:cSld>
     <p:spTree>
@@ -38355,6 +38554,9 @@
             <a:endParaRPr lang="en-US" dirty="0"/>
           </a:p>
           <a:p>
+            <a:endParaRPr lang="en-US" dirty="0"/>
+          </a:p>
+          <a:p>
             <a:r>
               <a:rPr lang="en-US" dirty="0"/>
               <a:t>Takes care of</a:t>
@@ -38485,6 +38687,7 @@
             </a:r>
           </a:p>
           <a:p>
+            <a:pPr lvl="1"/>
             <a:r>
               <a:rPr lang="en-US" dirty="0"/>
               <a:t>For CSV, use </a:t>
@@ -38498,10 +38701,10 @@
             </a:r>
           </a:p>
           <a:p>
-            <a:pPr lvl="1"/>
+            <a:pPr lvl="2"/>
             <a:r>
               <a:rPr lang="en-US" dirty="0"/>
-              <a:t>single column row</a:t>
+              <a:t>single column title row</a:t>
             </a:r>
           </a:p>
         </p:txBody>
@@ -38516,14 +38719,14 @@
         </p:nvSpPr>
         <p:spPr bwMode="auto">
           <a:xfrm>
-            <a:off x="2132415" y="1988841"/>
-            <a:ext cx="7005444" cy="1200329"/>
+            <a:off x="1822535" y="2247716"/>
+            <a:ext cx="7189789" cy="1200329"/>
           </a:xfrm>
           <a:prstGeom prst="rect">
             <a:avLst/>
           </a:prstGeom>
           <a:solidFill>
-            <a:schemeClr val="bg1"/>
+            <a:schemeClr val="tx1"/>
           </a:solidFill>
           <a:ln>
             <a:noFill/>
@@ -38643,21 +38846,50 @@
           <a:p>
             <a:pPr eaLnBrk="1" hangingPunct="1"/>
             <a:r>
-              <a:rPr lang="nl-BE" sz="2400" dirty="0">
+              <a:rPr lang="nl-BE" sz="2400" b="1" dirty="0">
+                <a:solidFill>
+                  <a:schemeClr val="bg1"/>
+                </a:solidFill>
                 <a:latin typeface="Courier New" pitchFamily="49" charset="0"/>
                 <a:cs typeface="Courier New" pitchFamily="49" charset="0"/>
               </a:rPr>
-              <a:t>areduce  --t 1-100  </a:t>
-            </a:r>
-            <a:r>
-              <a:rPr lang="en-BE" sz="2400" dirty="0">
+              <a:t>$ </a:t>
+            </a:r>
+            <a:r>
+              <a:rPr lang="nl-BE" sz="2400" b="1" dirty="0" err="1">
+                <a:solidFill>
+                  <a:schemeClr val="bg1"/>
+                </a:solidFill>
+                <a:latin typeface="Courier New" pitchFamily="49" charset="0"/>
+                <a:cs typeface="Courier New" pitchFamily="49" charset="0"/>
+              </a:rPr>
+              <a:t>areduce</a:t>
+            </a:r>
+            <a:r>
+              <a:rPr lang="nl-BE" sz="2400" b="1" dirty="0">
+                <a:solidFill>
+                  <a:schemeClr val="bg1"/>
+                </a:solidFill>
+                <a:latin typeface="Courier New" pitchFamily="49" charset="0"/>
+                <a:cs typeface="Courier New" pitchFamily="49" charset="0"/>
+              </a:rPr>
+              <a:t>  --t 1-100  </a:t>
+            </a:r>
+            <a:r>
+              <a:rPr lang="en-BE" sz="2400" b="1" dirty="0">
+                <a:solidFill>
+                  <a:schemeClr val="bg1"/>
+                </a:solidFill>
                 <a:latin typeface="Courier New" pitchFamily="49" charset="0"/>
                 <a:cs typeface="Courier New" pitchFamily="49" charset="0"/>
               </a:rPr>
               <a:t>             </a:t>
             </a:r>
             <a:r>
-              <a:rPr lang="nl-BE" sz="2400" dirty="0">
+              <a:rPr lang="nl-BE" sz="2400" b="1" dirty="0">
+                <a:solidFill>
+                  <a:schemeClr val="bg1"/>
+                </a:solidFill>
                 <a:latin typeface="Courier New" pitchFamily="49" charset="0"/>
                 <a:cs typeface="Courier New" pitchFamily="49" charset="0"/>
               </a:rPr>
@@ -38667,38 +38899,27 @@
           <a:p>
             <a:pPr eaLnBrk="1" hangingPunct="1"/>
             <a:r>
-              <a:rPr lang="nl-BE" sz="2400" dirty="0">
+              <a:rPr lang="nl-BE" sz="2400" b="1" dirty="0">
+                <a:solidFill>
+                  <a:schemeClr val="bg1"/>
+                </a:solidFill>
                 <a:latin typeface="Courier New" pitchFamily="49" charset="0"/>
                 <a:cs typeface="Courier New" pitchFamily="49" charset="0"/>
               </a:rPr>
-              <a:t>         --pattern output-</a:t>
-            </a:r>
+              <a:t>           --pattern output-{t}.txt  \</a:t>
+            </a:r>
+          </a:p>
+          <a:p>
+            <a:pPr eaLnBrk="1" hangingPunct="1"/>
             <a:r>
               <a:rPr lang="nl-BE" sz="2400" b="1" dirty="0">
                 <a:solidFill>
-                  <a:srgbClr val="C00000"/>
+                  <a:schemeClr val="bg1"/>
                 </a:solidFill>
                 <a:latin typeface="Courier New" pitchFamily="49" charset="0"/>
                 <a:cs typeface="Courier New" pitchFamily="49" charset="0"/>
               </a:rPr>
-              <a:t>{t}</a:t>
-            </a:r>
-            <a:r>
-              <a:rPr lang="nl-BE" sz="2400" dirty="0">
-                <a:latin typeface="Courier New" pitchFamily="49" charset="0"/>
-                <a:cs typeface="Courier New" pitchFamily="49" charset="0"/>
-              </a:rPr>
-              <a:t>.txt  \</a:t>
-            </a:r>
-          </a:p>
-          <a:p>
-            <a:pPr eaLnBrk="1" hangingPunct="1"/>
-            <a:r>
-              <a:rPr lang="nl-BE" sz="2400" dirty="0">
-                <a:latin typeface="Courier New" pitchFamily="49" charset="0"/>
-                <a:cs typeface="Courier New" pitchFamily="49" charset="0"/>
-              </a:rPr>
-              <a:t>         --output output.txt</a:t>
+              <a:t>           --output output.txt</a:t>
             </a:r>
           </a:p>
         </p:txBody>
@@ -38711,7 +38932,7 @@
         </p:nvGrpSpPr>
         <p:grpSpPr>
           <a:xfrm>
-            <a:off x="7104112" y="2779457"/>
+            <a:off x="7224692" y="3111112"/>
             <a:ext cx="3816424" cy="853254"/>
             <a:chOff x="5140023" y="3018835"/>
             <a:chExt cx="3816424" cy="853254"/>
@@ -38830,7 +39051,7 @@
           <a:p>
             <a:fld id="{0AA598EC-1C61-495B-A9F8-4410E339CCF5}" type="slidenum">
               <a:rPr lang="en-US" smtClean="0"/>
-              <a:t>44</a:t>
+              <a:t>45</a:t>
             </a:fld>
             <a:endParaRPr lang="en-US"/>
           </a:p>
@@ -39006,7 +39227,7 @@
                                         <p:tgtEl>
                                           <p:spTgt spid="3">
                                             <p:txEl>
-                                              <p:pRg st="4" end="4"/>
+                                              <p:pRg st="5" end="5"/>
                                             </p:txEl>
                                           </p:spTgt>
                                         </p:tgtEl>
@@ -39037,7 +39258,7 @@
                                         <p:tgtEl>
                                           <p:spTgt spid="3">
                                             <p:txEl>
-                                              <p:pRg st="5" end="5"/>
+                                              <p:pRg st="6" end="6"/>
                                             </p:txEl>
                                           </p:spTgt>
                                         </p:tgtEl>
@@ -39068,7 +39289,7 @@
                                         <p:tgtEl>
                                           <p:spTgt spid="3">
                                             <p:txEl>
-                                              <p:pRg st="6" end="6"/>
+                                              <p:pRg st="7" end="7"/>
                                             </p:txEl>
                                           </p:spTgt>
                                         </p:tgtEl>
@@ -39099,55 +39320,6 @@
                                         <p:tgtEl>
                                           <p:spTgt spid="3">
                                             <p:txEl>
-                                              <p:pRg st="7" end="7"/>
-                                            </p:txEl>
-                                          </p:spTgt>
-                                        </p:tgtEl>
-                                        <p:attrNameLst>
-                                          <p:attrName>style.visibility</p:attrName>
-                                        </p:attrNameLst>
-                                      </p:cBhvr>
-                                      <p:to>
-                                        <p:strVal val="visible"/>
-                                      </p:to>
-                                    </p:set>
-                                  </p:childTnLst>
-                                </p:cTn>
-                              </p:par>
-                            </p:childTnLst>
-                          </p:cTn>
-                        </p:par>
-                      </p:childTnLst>
-                    </p:cTn>
-                  </p:par>
-                  <p:par>
-                    <p:cTn id="23" fill="hold">
-                      <p:stCondLst>
-                        <p:cond delay="indefinite"/>
-                      </p:stCondLst>
-                      <p:childTnLst>
-                        <p:par>
-                          <p:cTn id="24" fill="hold">
-                            <p:stCondLst>
-                              <p:cond delay="0"/>
-                            </p:stCondLst>
-                            <p:childTnLst>
-                              <p:par>
-                                <p:cTn id="25" presetID="1" presetClass="entr" presetSubtype="0" fill="hold" grpId="0" nodeType="clickEffect">
-                                  <p:stCondLst>
-                                    <p:cond delay="0"/>
-                                  </p:stCondLst>
-                                  <p:childTnLst>
-                                    <p:set>
-                                      <p:cBhvr>
-                                        <p:cTn id="26" dur="1" fill="hold">
-                                          <p:stCondLst>
-                                            <p:cond delay="0"/>
-                                          </p:stCondLst>
-                                        </p:cTn>
-                                        <p:tgtEl>
-                                          <p:spTgt spid="3">
-                                            <p:txEl>
                                               <p:pRg st="8" end="8"/>
                                             </p:txEl>
                                           </p:spTgt>
@@ -39164,14 +39336,14 @@
                                 </p:cTn>
                               </p:par>
                               <p:par>
-                                <p:cTn id="27" presetID="1" presetClass="entr" presetSubtype="0" fill="hold" grpId="0" nodeType="withEffect">
+                                <p:cTn id="23" presetID="1" presetClass="entr" presetSubtype="0" fill="hold" grpId="0" nodeType="withEffect">
                                   <p:stCondLst>
                                     <p:cond delay="0"/>
                                   </p:stCondLst>
                                   <p:childTnLst>
                                     <p:set>
                                       <p:cBhvr>
-                                        <p:cTn id="28" dur="1" fill="hold">
+                                        <p:cTn id="24" dur="1" fill="hold">
                                           <p:stCondLst>
                                             <p:cond delay="0"/>
                                           </p:stCondLst>
@@ -39180,6 +39352,37 @@
                                           <p:spTgt spid="3">
                                             <p:txEl>
                                               <p:pRg st="9" end="9"/>
+                                            </p:txEl>
+                                          </p:spTgt>
+                                        </p:tgtEl>
+                                        <p:attrNameLst>
+                                          <p:attrName>style.visibility</p:attrName>
+                                        </p:attrNameLst>
+                                      </p:cBhvr>
+                                      <p:to>
+                                        <p:strVal val="visible"/>
+                                      </p:to>
+                                    </p:set>
+                                  </p:childTnLst>
+                                </p:cTn>
+                              </p:par>
+                              <p:par>
+                                <p:cTn id="25" presetID="1" presetClass="entr" presetSubtype="0" fill="hold" grpId="0" nodeType="withEffect">
+                                  <p:stCondLst>
+                                    <p:cond delay="0"/>
+                                  </p:stCondLst>
+                                  <p:childTnLst>
+                                    <p:set>
+                                      <p:cBhvr>
+                                        <p:cTn id="26" dur="1" fill="hold">
+                                          <p:stCondLst>
+                                            <p:cond delay="0"/>
+                                          </p:stCondLst>
+                                        </p:cTn>
+                                        <p:tgtEl>
+                                          <p:spTgt spid="3">
+                                            <p:txEl>
+                                              <p:pRg st="10" end="10"/>
                                             </p:txEl>
                                           </p:spTgt>
                                         </p:tgtEl>
@@ -39229,7 +39432,7 @@
 </p:sld>
 </file>
 
-<file path=ppt/slides/slide45.xml><?xml version="1.0" encoding="utf-8"?>
+<file path=ppt/slides/slide46.xml><?xml version="1.0" encoding="utf-8"?>
 <p:sld xmlns:a="http://schemas.openxmlformats.org/drawingml/2006/main" xmlns:r="http://schemas.openxmlformats.org/officeDocument/2006/relationships" xmlns:p="http://schemas.openxmlformats.org/presentationml/2006/main">
   <p:cSld>
     <p:spTree>
@@ -39294,7 +39497,7 @@
         <p:spPr/>
         <p:txBody>
           <a:bodyPr>
-            <a:normAutofit fontScale="85000" lnSpcReduction="20000"/>
+            <a:normAutofit fontScale="77500" lnSpcReduction="20000"/>
           </a:bodyPr>
           <a:lstStyle/>
           <a:p>
@@ -39319,13 +39522,12 @@
             <a:endParaRPr lang="en-US" dirty="0"/>
           </a:p>
           <a:p>
-            <a:r>
-              <a:rPr lang="en-US" dirty="0" err="1"/>
-              <a:t>Reductor</a:t>
-            </a:r>
+            <a:endParaRPr lang="en-US" dirty="0"/>
+          </a:p>
+          <a:p>
             <a:r>
               <a:rPr lang="en-US" dirty="0"/>
-              <a:t> can be any executable</a:t>
+              <a:t>Reductor can be any executable</a:t>
             </a:r>
           </a:p>
           <a:p>
@@ -39402,13 +39604,15 @@
         </p:nvSpPr>
         <p:spPr bwMode="auto">
           <a:xfrm>
-            <a:off x="2132416" y="2003356"/>
-            <a:ext cx="7374135" cy="1938992"/>
+            <a:off x="1559659" y="2224419"/>
+            <a:ext cx="7558479" cy="1938992"/>
           </a:xfrm>
           <a:prstGeom prst="rect">
             <a:avLst/>
           </a:prstGeom>
-          <a:noFill/>
+          <a:solidFill>
+            <a:schemeClr val="tx1"/>
+          </a:solidFill>
           <a:ln>
             <a:noFill/>
           </a:ln>
@@ -39527,11 +39731,77 @@
           <a:p>
             <a:pPr eaLnBrk="1" hangingPunct="1"/>
             <a:r>
+              <a:rPr lang="nl-BE" sz="2400" b="1" dirty="0">
+                <a:solidFill>
+                  <a:schemeClr val="bg1"/>
+                </a:solidFill>
+                <a:latin typeface="Courier New" pitchFamily="49" charset="0"/>
+                <a:cs typeface="Courier New" pitchFamily="49" charset="0"/>
+              </a:rPr>
+              <a:t>$ </a:t>
+            </a:r>
+            <a:r>
+              <a:rPr lang="nl-BE" sz="2400" b="1" dirty="0" err="1">
+                <a:solidFill>
+                  <a:schemeClr val="bg1"/>
+                </a:solidFill>
+                <a:latin typeface="Courier New" pitchFamily="49" charset="0"/>
+                <a:cs typeface="Courier New" pitchFamily="49" charset="0"/>
+              </a:rPr>
+              <a:t>areduce</a:t>
+            </a:r>
+            <a:r>
+              <a:rPr lang="nl-BE" sz="2400" b="1" dirty="0">
+                <a:solidFill>
+                  <a:schemeClr val="bg1"/>
+                </a:solidFill>
+                <a:latin typeface="Courier New" pitchFamily="49" charset="0"/>
+                <a:cs typeface="Courier New" pitchFamily="49" charset="0"/>
+              </a:rPr>
+              <a:t>  –-t 1-100  --data data.csv  \</a:t>
+            </a:r>
+          </a:p>
+          <a:p>
+            <a:pPr eaLnBrk="1" hangingPunct="1"/>
+            <a:r>
+              <a:rPr lang="nl-BE" sz="2400" b="1" dirty="0">
+                <a:solidFill>
+                  <a:schemeClr val="bg1"/>
+                </a:solidFill>
+                <a:latin typeface="Courier New" pitchFamily="49" charset="0"/>
+                <a:cs typeface="Courier New" pitchFamily="49" charset="0"/>
+              </a:rPr>
+              <a:t>           --pattern output-{t}.txt    \</a:t>
+            </a:r>
+          </a:p>
+          <a:p>
+            <a:pPr eaLnBrk="1" hangingPunct="1"/>
+            <a:r>
               <a:rPr lang="nl-BE" sz="2400" dirty="0">
                 <a:latin typeface="Courier New" pitchFamily="49" charset="0"/>
                 <a:cs typeface="Courier New" pitchFamily="49" charset="0"/>
               </a:rPr>
-              <a:t>areduce  –-t 1-100  --data data.csv  \</a:t>
+              <a:t>           </a:t>
+            </a:r>
+            <a:r>
+              <a:rPr lang="nl-BE" sz="2400" b="1" dirty="0">
+                <a:solidFill>
+                  <a:srgbClr val="C00000"/>
+                </a:solidFill>
+                <a:latin typeface="Courier New" pitchFamily="49" charset="0"/>
+                <a:cs typeface="Courier New" pitchFamily="49" charset="0"/>
+              </a:rPr>
+              <a:t>--empty empty.bin</a:t>
+            </a:r>
+            <a:r>
+              <a:rPr lang="nl-BE" sz="2400" b="1" dirty="0">
+                <a:solidFill>
+                  <a:schemeClr val="bg1"/>
+                </a:solidFill>
+                <a:latin typeface="Courier New" pitchFamily="49" charset="0"/>
+                <a:cs typeface="Courier New" pitchFamily="49" charset="0"/>
+              </a:rPr>
+              <a:t>           \</a:t>
             </a:r>
           </a:p>
           <a:p>
@@ -39541,7 +39811,27 @@
                 <a:latin typeface="Courier New" pitchFamily="49" charset="0"/>
                 <a:cs typeface="Courier New" pitchFamily="49" charset="0"/>
               </a:rPr>
-              <a:t>         --pattern output-{t}.txt    \</a:t>
+              <a:t>           </a:t>
+            </a:r>
+            <a:r>
+              <a:rPr lang="nl-BE" sz="2400" b="1" dirty="0">
+                <a:solidFill>
+                  <a:srgbClr val="C00000"/>
+                </a:solidFill>
+                <a:latin typeface="Courier New" pitchFamily="49" charset="0"/>
+                <a:cs typeface="Courier New" pitchFamily="49" charset="0"/>
+              </a:rPr>
+              <a:t>--reduce reductor.sh</a:t>
+            </a:r>
+            <a:r>
+              <a:rPr lang="nl-BE" sz="2400" b="1" dirty="0">
+                <a:solidFill>
+                  <a:schemeClr val="bg1"/>
+                </a:solidFill>
+                <a:latin typeface="Courier New" pitchFamily="49" charset="0"/>
+                <a:cs typeface="Courier New" pitchFamily="49" charset="0"/>
+              </a:rPr>
+              <a:t>        \</a:t>
             </a:r>
           </a:p>
           <a:p>
@@ -39551,61 +39841,17 @@
                 <a:latin typeface="Courier New" pitchFamily="49" charset="0"/>
                 <a:cs typeface="Courier New" pitchFamily="49" charset="0"/>
               </a:rPr>
-              <a:t>         </a:t>
-            </a:r>
-            <a:r>
-              <a:rPr lang="nl-BE" sz="2400" b="1" dirty="0">
-                <a:solidFill>
-                  <a:srgbClr val="C00000"/>
+              <a:t> </a:t>
+            </a:r>
+            <a:r>
+              <a:rPr lang="nl-BE" sz="2400" dirty="0">
+                <a:solidFill>
+                  <a:schemeClr val="bg1"/>
                 </a:solidFill>
                 <a:latin typeface="Courier New" pitchFamily="49" charset="0"/>
                 <a:cs typeface="Courier New" pitchFamily="49" charset="0"/>
               </a:rPr>
-              <a:t>--empty empty.bin</a:t>
-            </a:r>
-            <a:r>
-              <a:rPr lang="nl-BE" sz="2400" dirty="0">
-                <a:latin typeface="Courier New" pitchFamily="49" charset="0"/>
-                <a:cs typeface="Courier New" pitchFamily="49" charset="0"/>
-              </a:rPr>
-              <a:t>           \</a:t>
-            </a:r>
-          </a:p>
-          <a:p>
-            <a:pPr eaLnBrk="1" hangingPunct="1"/>
-            <a:r>
-              <a:rPr lang="nl-BE" sz="2400" dirty="0">
-                <a:latin typeface="Courier New" pitchFamily="49" charset="0"/>
-                <a:cs typeface="Courier New" pitchFamily="49" charset="0"/>
-              </a:rPr>
-              <a:t>         </a:t>
-            </a:r>
-            <a:r>
-              <a:rPr lang="nl-BE" sz="2400" b="1" dirty="0">
-                <a:solidFill>
-                  <a:srgbClr val="C00000"/>
-                </a:solidFill>
-                <a:latin typeface="Courier New" pitchFamily="49" charset="0"/>
-                <a:cs typeface="Courier New" pitchFamily="49" charset="0"/>
-              </a:rPr>
-              <a:t>--reduce reductor.sh</a:t>
-            </a:r>
-            <a:r>
-              <a:rPr lang="nl-BE" sz="2400" dirty="0">
-                <a:latin typeface="Courier New" pitchFamily="49" charset="0"/>
-                <a:cs typeface="Courier New" pitchFamily="49" charset="0"/>
-              </a:rPr>
-              <a:t>        \</a:t>
-            </a:r>
-          </a:p>
-          <a:p>
-            <a:pPr eaLnBrk="1" hangingPunct="1"/>
-            <a:r>
-              <a:rPr lang="nl-BE" sz="2400" dirty="0">
-                <a:latin typeface="Courier New" pitchFamily="49" charset="0"/>
-                <a:cs typeface="Courier New" pitchFamily="49" charset="0"/>
-              </a:rPr>
-              <a:t>         --out output.bin</a:t>
+              <a:t>          --out output.bin</a:t>
             </a:r>
           </a:p>
         </p:txBody>
@@ -39627,7 +39873,7 @@
           <a:p>
             <a:fld id="{0AA598EC-1C61-495B-A9F8-4410E339CCF5}" type="slidenum">
               <a:rPr lang="en-US" smtClean="0"/>
-              <a:t>45</a:t>
+              <a:t>46</a:t>
             </a:fld>
             <a:endParaRPr lang="en-US"/>
           </a:p>
@@ -39731,7 +39977,7 @@
                                         <p:tgtEl>
                                           <p:spTgt spid="3">
                                             <p:txEl>
-                                              <p:pRg st="6" end="6"/>
+                                              <p:pRg st="7" end="7"/>
                                             </p:txEl>
                                           </p:spTgt>
                                         </p:tgtEl>
@@ -39762,7 +40008,7 @@
                                         <p:tgtEl>
                                           <p:spTgt spid="3">
                                             <p:txEl>
-                                              <p:pRg st="7" end="7"/>
+                                              <p:pRg st="8" end="8"/>
                                             </p:txEl>
                                           </p:spTgt>
                                         </p:tgtEl>
@@ -39793,7 +40039,7 @@
                                         <p:tgtEl>
                                           <p:spTgt spid="3">
                                             <p:txEl>
-                                              <p:pRg st="8" end="8"/>
+                                              <p:pRg st="9" end="9"/>
                                             </p:txEl>
                                           </p:spTgt>
                                         </p:tgtEl>
@@ -39824,7 +40070,7 @@
                                         <p:tgtEl>
                                           <p:spTgt spid="3">
                                             <p:txEl>
-                                              <p:pRg st="9" end="9"/>
+                                              <p:pRg st="10" end="10"/>
                                             </p:txEl>
                                           </p:spTgt>
                                         </p:tgtEl>
@@ -39855,7 +40101,7 @@
                                         <p:tgtEl>
                                           <p:spTgt spid="3">
                                             <p:txEl>
-                                              <p:pRg st="10" end="10"/>
+                                              <p:pRg st="11" end="11"/>
                                             </p:txEl>
                                           </p:spTgt>
                                         </p:tgtEl>
@@ -39886,7 +40132,7 @@
                                         <p:tgtEl>
                                           <p:spTgt spid="3">
                                             <p:txEl>
-                                              <p:pRg st="11" end="11"/>
+                                              <p:pRg st="12" end="12"/>
                                             </p:txEl>
                                           </p:spTgt>
                                         </p:tgtEl>
@@ -39935,7 +40181,7 @@
 </p:sld>
 </file>
 
-<file path=ppt/slides/slide46.xml><?xml version="1.0" encoding="utf-8"?>
+<file path=ppt/slides/slide47.xml><?xml version="1.0" encoding="utf-8"?>
 <p:sld xmlns:a="http://schemas.openxmlformats.org/drawingml/2006/main" xmlns:r="http://schemas.openxmlformats.org/officeDocument/2006/relationships" xmlns:p="http://schemas.openxmlformats.org/presentationml/2006/main">
   <p:cSld>
     <p:spTree>
@@ -40100,7 +40346,7 @@
           <a:p>
             <a:fld id="{0AA598EC-1C61-495B-A9F8-4410E339CCF5}" type="slidenum">
               <a:rPr lang="en-US" smtClean="0"/>
-              <a:t>46</a:t>
+              <a:t>47</a:t>
             </a:fld>
             <a:endParaRPr lang="en-US"/>
           </a:p>
@@ -40593,7 +40839,7 @@
 </p:sld>
 </file>
 
-<file path=ppt/slides/slide47.xml><?xml version="1.0" encoding="utf-8"?>
+<file path=ppt/slides/slide48.xml><?xml version="1.0" encoding="utf-8"?>
 <p:sld xmlns:a="http://schemas.openxmlformats.org/drawingml/2006/main" xmlns:r="http://schemas.openxmlformats.org/officeDocument/2006/relationships" xmlns:p="http://schemas.openxmlformats.org/presentationml/2006/main">
   <p:cSld>
     <p:spTree>
@@ -40726,7 +40972,7 @@
           <a:p>
             <a:fld id="{0AA598EC-1C61-495B-A9F8-4410E339CCF5}" type="slidenum">
               <a:rPr lang="en-US" smtClean="0"/>
-              <a:t>47</a:t>
+              <a:t>48</a:t>
             </a:fld>
             <a:endParaRPr lang="en-US"/>
           </a:p>
@@ -40972,7 +41218,7 @@
 </p:sld>
 </file>
 
-<file path=ppt/slides/slide48.xml><?xml version="1.0" encoding="utf-8"?>
+<file path=ppt/slides/slide49.xml><?xml version="1.0" encoding="utf-8"?>
 <p:sld xmlns:a="http://schemas.openxmlformats.org/drawingml/2006/main" xmlns:r="http://schemas.openxmlformats.org/officeDocument/2006/relationships" xmlns:p="http://schemas.openxmlformats.org/presentationml/2006/main">
   <p:cSld>
     <p:spTree>
@@ -41120,7 +41366,7 @@
           <a:p>
             <a:fld id="{0AA598EC-1C61-495B-A9F8-4410E339CCF5}" type="slidenum">
               <a:rPr lang="en-US" smtClean="0"/>
-              <a:t>48</a:t>
+              <a:t>49</a:t>
             </a:fld>
             <a:endParaRPr lang="en-US"/>
           </a:p>

</xml_diff>

<commit_message>
Add more slides on Nextflow
</commit_message>
<xml_diff>
--- a/workflow_for_HPC.pptx
+++ b/workflow_for_HPC.pptx
@@ -5,7 +5,7 @@
     <p:sldMasterId id="2147483648" r:id="rId1"/>
   </p:sldMasterIdLst>
   <p:notesMasterIdLst>
-    <p:notesMasterId r:id="rId56"/>
+    <p:notesMasterId r:id="rId60"/>
   </p:notesMasterIdLst>
   <p:sldIdLst>
     <p:sldId id="257" r:id="rId2"/>
@@ -62,6 +62,10 @@
     <p:sldId id="392" r:id="rId53"/>
     <p:sldId id="389" r:id="rId54"/>
     <p:sldId id="393" r:id="rId55"/>
+    <p:sldId id="394" r:id="rId56"/>
+    <p:sldId id="395" r:id="rId57"/>
+    <p:sldId id="396" r:id="rId58"/>
+    <p:sldId id="397" r:id="rId59"/>
   </p:sldIdLst>
   <p:sldSz cx="12192000" cy="6858000"/>
   <p:notesSz cx="6858000" cy="9144000"/>
@@ -42495,7 +42499,7 @@
         <p:spPr/>
         <p:txBody>
           <a:bodyPr>
-            <a:normAutofit/>
+            <a:normAutofit lnSpcReduction="10000"/>
           </a:bodyPr>
           <a:lstStyle/>
           <a:p>
@@ -42516,6 +42520,13 @@
             <a:r>
               <a:rPr lang="en-US" dirty="0"/>
               <a:t>Execute intricate workflows with dependencies</a:t>
+            </a:r>
+          </a:p>
+          <a:p>
+            <a:pPr lvl="1"/>
+            <a:r>
+              <a:rPr lang="en-US" dirty="0"/>
+              <a:t>Execute workflow many times</a:t>
             </a:r>
           </a:p>
           <a:p>
@@ -43139,6 +43150,20 @@
             <a:endParaRPr lang="en-US" dirty="0"/>
           </a:p>
           <a:p>
+            <a:pPr lvl="1"/>
+            <a:r>
+              <a:rPr lang="en-US" dirty="0"/>
+              <a:t>Most popular</a:t>
+            </a:r>
+          </a:p>
+          <a:p>
+            <a:pPr lvl="1"/>
+            <a:r>
+              <a:rPr lang="en-US" dirty="0"/>
+              <a:t>YAPL: Groovy</a:t>
+            </a:r>
+          </a:p>
+          <a:p>
             <a:endParaRPr lang="en-US" dirty="0"/>
           </a:p>
           <a:p>
@@ -43146,6 +43171,24 @@
               <a:rPr lang="en-US" dirty="0" err="1"/>
               <a:t>Snakemake</a:t>
             </a:r>
+            <a:endParaRPr lang="en-US" dirty="0"/>
+          </a:p>
+          <a:p>
+            <a:pPr lvl="1"/>
+            <a:r>
+              <a:rPr lang="en-US" dirty="0"/>
+              <a:t>Also popular, but less so</a:t>
+            </a:r>
+          </a:p>
+          <a:p>
+            <a:pPr lvl="1"/>
+            <a:r>
+              <a:rPr lang="en-US" dirty="0"/>
+              <a:t>Python-based</a:t>
+            </a:r>
+          </a:p>
+          <a:p>
+            <a:pPr lvl="1"/>
             <a:endParaRPr lang="en-US" dirty="0"/>
           </a:p>
           <a:p>
@@ -43202,7 +43245,7 @@
         </p:nvGrpSpPr>
         <p:grpSpPr>
           <a:xfrm>
-            <a:off x="3052269" y="4524742"/>
+            <a:off x="2682155" y="5568523"/>
             <a:ext cx="6087461" cy="924352"/>
             <a:chOff x="8423256" y="5245929"/>
             <a:chExt cx="6087461" cy="924352"/>
@@ -43315,7 +43358,7 @@
         </p:blipFill>
         <p:spPr bwMode="auto">
           <a:xfrm>
-            <a:off x="7387884" y="1932126"/>
+            <a:off x="7681445" y="2545023"/>
             <a:ext cx="3055031" cy="2234253"/>
           </a:xfrm>
           <a:prstGeom prst="rect">
@@ -43411,7 +43454,7 @@
         </p:blipFill>
         <p:spPr>
           <a:xfrm>
-            <a:off x="3172242" y="2646738"/>
+            <a:off x="3570162" y="3240804"/>
             <a:ext cx="2906837" cy="825806"/>
           </a:xfrm>
           <a:prstGeom prst="rect">
@@ -43441,7 +43484,7 @@
         </p:blipFill>
         <p:spPr>
           <a:xfrm>
-            <a:off x="3153988" y="1735579"/>
+            <a:off x="3570161" y="1669536"/>
             <a:ext cx="2906838" cy="638086"/>
           </a:xfrm>
           <a:prstGeom prst="rect">
@@ -43649,14 +43692,14 @@
             <a:pPr algn="ctr"/>
             <a:r>
               <a:rPr lang="en-US" dirty="0"/>
-              <a:t>Preprocess</a:t>
+              <a:t>Generate</a:t>
             </a:r>
             <a:br>
               <a:rPr lang="en-US" dirty="0"/>
             </a:br>
             <a:r>
               <a:rPr lang="en-US" dirty="0"/>
-              <a:t>data</a:t>
+              <a:t>points</a:t>
             </a:r>
             <a:endParaRPr lang="LID4096" dirty="0"/>
           </a:p>
@@ -43706,14 +43749,14 @@
             <a:pPr algn="ctr"/>
             <a:r>
               <a:rPr lang="en-US" dirty="0"/>
-              <a:t>Process</a:t>
+              <a:t>Compute</a:t>
             </a:r>
             <a:br>
               <a:rPr lang="en-US" dirty="0"/>
             </a:br>
             <a:r>
               <a:rPr lang="en-US" dirty="0"/>
-              <a:t>data</a:t>
+              <a:t>distances</a:t>
             </a:r>
             <a:endParaRPr lang="LID4096" dirty="0"/>
           </a:p>
@@ -43763,14 +43806,14 @@
             <a:pPr algn="ctr"/>
             <a:r>
               <a:rPr lang="en-US" dirty="0"/>
-              <a:t>Postprocess</a:t>
+              <a:t>Compute</a:t>
             </a:r>
             <a:br>
               <a:rPr lang="en-US" dirty="0"/>
             </a:br>
             <a:r>
               <a:rPr lang="en-US" dirty="0"/>
-              <a:t>data</a:t>
+              <a:t>distribution</a:t>
             </a:r>
             <a:endParaRPr lang="LID4096" dirty="0"/>
           </a:p>
@@ -44309,6 +44352,4021 @@
     <p:extLst>
       <p:ext uri="{BB962C8B-B14F-4D97-AF65-F5344CB8AC3E}">
         <p14:creationId xmlns:p14="http://schemas.microsoft.com/office/powerpoint/2010/main" val="4231902241"/>
+      </p:ext>
+    </p:extLst>
+  </p:cSld>
+  <p:clrMapOvr>
+    <a:masterClrMapping/>
+  </p:clrMapOvr>
+</p:sld>
+</file>
+
+<file path=ppt/slides/slide55.xml><?xml version="1.0" encoding="utf-8"?>
+<p:sld xmlns:a="http://schemas.openxmlformats.org/drawingml/2006/main" xmlns:r="http://schemas.openxmlformats.org/officeDocument/2006/relationships" xmlns:p="http://schemas.openxmlformats.org/presentationml/2006/main">
+  <p:cSld>
+    <p:spTree>
+      <p:nvGrpSpPr>
+        <p:cNvPr id="1" name=""/>
+        <p:cNvGrpSpPr/>
+        <p:nvPr/>
+      </p:nvGrpSpPr>
+      <p:grpSpPr>
+        <a:xfrm>
+          <a:off x="0" y="0"/>
+          <a:ext cx="0" cy="0"/>
+          <a:chOff x="0" y="0"/>
+          <a:chExt cx="0" cy="0"/>
+        </a:xfrm>
+      </p:grpSpPr>
+      <p:sp>
+        <p:nvSpPr>
+          <p:cNvPr id="2" name="Title 1">
+            <a:extLst>
+              <a:ext uri="{FF2B5EF4-FFF2-40B4-BE49-F238E27FC236}">
+                <a16:creationId xmlns:a16="http://schemas.microsoft.com/office/drawing/2014/main" id="{D94D3369-8B8E-6BB6-440A-AC7D11D61A3C}"/>
+              </a:ext>
+            </a:extLst>
+          </p:cNvPr>
+          <p:cNvSpPr>
+            <a:spLocks noGrp="1"/>
+          </p:cNvSpPr>
+          <p:nvPr>
+            <p:ph type="title"/>
+          </p:nvPr>
+        </p:nvSpPr>
+        <p:spPr/>
+        <p:txBody>
+          <a:bodyPr/>
+          <a:lstStyle/>
+          <a:p>
+            <a:r>
+              <a:rPr lang="en-US" dirty="0" err="1"/>
+              <a:t>Nextflow</a:t>
+            </a:r>
+            <a:r>
+              <a:rPr lang="en-US" dirty="0"/>
+              <a:t> process: </a:t>
+            </a:r>
+            <a:r>
+              <a:rPr lang="en-US" dirty="0" err="1">
+                <a:latin typeface="Courier New" panose="02070309020205020404" pitchFamily="49" charset="0"/>
+                <a:cs typeface="Courier New" panose="02070309020205020404" pitchFamily="49" charset="0"/>
+              </a:rPr>
+              <a:t>ComputeDistances</a:t>
+            </a:r>
+            <a:endParaRPr lang="LID4096" dirty="0">
+              <a:latin typeface="Courier New" panose="02070309020205020404" pitchFamily="49" charset="0"/>
+              <a:cs typeface="Courier New" panose="02070309020205020404" pitchFamily="49" charset="0"/>
+            </a:endParaRPr>
+          </a:p>
+        </p:txBody>
+      </p:sp>
+      <p:sp>
+        <p:nvSpPr>
+          <p:cNvPr id="3" name="Slide Number Placeholder 2">
+            <a:extLst>
+              <a:ext uri="{FF2B5EF4-FFF2-40B4-BE49-F238E27FC236}">
+                <a16:creationId xmlns:a16="http://schemas.microsoft.com/office/drawing/2014/main" id="{003455CB-881C-02BE-4D3D-9347AC29DA1E}"/>
+              </a:ext>
+            </a:extLst>
+          </p:cNvPr>
+          <p:cNvSpPr>
+            <a:spLocks noGrp="1"/>
+          </p:cNvSpPr>
+          <p:nvPr>
+            <p:ph type="sldNum" sz="quarter" idx="12"/>
+          </p:nvPr>
+        </p:nvSpPr>
+        <p:spPr/>
+        <p:txBody>
+          <a:bodyPr/>
+          <a:lstStyle/>
+          <a:p>
+            <a:fld id="{9C7CE217-4467-4B8D-A735-B008FA7C4816}" type="slidenum">
+              <a:rPr lang="LID4096" smtClean="0"/>
+              <a:t>55</a:t>
+            </a:fld>
+            <a:endParaRPr lang="LID4096"/>
+          </a:p>
+        </p:txBody>
+      </p:sp>
+      <p:grpSp>
+        <p:nvGrpSpPr>
+          <p:cNvPr id="4" name="Group 3">
+            <a:extLst>
+              <a:ext uri="{FF2B5EF4-FFF2-40B4-BE49-F238E27FC236}">
+                <a16:creationId xmlns:a16="http://schemas.microsoft.com/office/drawing/2014/main" id="{E4E17D04-4206-A9A3-FA57-3173FED723CE}"/>
+              </a:ext>
+            </a:extLst>
+          </p:cNvPr>
+          <p:cNvGrpSpPr/>
+          <p:nvPr/>
+        </p:nvGrpSpPr>
+        <p:grpSpPr>
+          <a:xfrm>
+            <a:off x="250370" y="1366163"/>
+            <a:ext cx="10134149" cy="5078313"/>
+            <a:chOff x="-1815414" y="3967896"/>
+            <a:chExt cx="10134149" cy="5078313"/>
+          </a:xfrm>
+        </p:grpSpPr>
+        <p:sp>
+          <p:nvSpPr>
+            <p:cNvPr id="5" name="TextBox 3">
+              <a:extLst>
+                <a:ext uri="{FF2B5EF4-FFF2-40B4-BE49-F238E27FC236}">
+                  <a16:creationId xmlns:a16="http://schemas.microsoft.com/office/drawing/2014/main" id="{C889547F-7290-2FC1-5F5E-C2805E48ACFF}"/>
+                </a:ext>
+              </a:extLst>
+            </p:cNvPr>
+            <p:cNvSpPr txBox="1">
+              <a:spLocks noChangeArrowheads="1"/>
+            </p:cNvSpPr>
+            <p:nvPr/>
+          </p:nvSpPr>
+          <p:spPr bwMode="auto">
+            <a:xfrm>
+              <a:off x="-1815414" y="3967896"/>
+              <a:ext cx="10134149" cy="5078313"/>
+            </a:xfrm>
+            <a:prstGeom prst="rect">
+              <a:avLst/>
+            </a:prstGeom>
+            <a:solidFill>
+              <a:schemeClr val="bg1">
+                <a:lumMod val="85000"/>
+              </a:schemeClr>
+            </a:solidFill>
+            <a:ln w="9525">
+              <a:solidFill>
+                <a:schemeClr val="tx1"/>
+              </a:solidFill>
+              <a:miter lim="800000"/>
+              <a:headEnd/>
+              <a:tailEnd/>
+            </a:ln>
+          </p:spPr>
+          <p:txBody>
+            <a:bodyPr wrap="square">
+              <a:spAutoFit/>
+            </a:bodyPr>
+            <a:lstStyle>
+              <a:lvl1pPr eaLnBrk="0" hangingPunct="0">
+                <a:defRPr>
+                  <a:solidFill>
+                    <a:schemeClr val="tx1"/>
+                  </a:solidFill>
+                  <a:latin typeface="Arial" charset="0"/>
+                  <a:cs typeface="Arial" charset="0"/>
+                </a:defRPr>
+              </a:lvl1pPr>
+              <a:lvl2pPr marL="742950" indent="-285750" eaLnBrk="0" hangingPunct="0">
+                <a:defRPr>
+                  <a:solidFill>
+                    <a:schemeClr val="tx1"/>
+                  </a:solidFill>
+                  <a:latin typeface="Arial" charset="0"/>
+                  <a:cs typeface="Arial" charset="0"/>
+                </a:defRPr>
+              </a:lvl2pPr>
+              <a:lvl3pPr marL="1143000" indent="-228600" eaLnBrk="0" hangingPunct="0">
+                <a:defRPr>
+                  <a:solidFill>
+                    <a:schemeClr val="tx1"/>
+                  </a:solidFill>
+                  <a:latin typeface="Arial" charset="0"/>
+                  <a:cs typeface="Arial" charset="0"/>
+                </a:defRPr>
+              </a:lvl3pPr>
+              <a:lvl4pPr marL="1600200" indent="-228600" eaLnBrk="0" hangingPunct="0">
+                <a:defRPr>
+                  <a:solidFill>
+                    <a:schemeClr val="tx1"/>
+                  </a:solidFill>
+                  <a:latin typeface="Arial" charset="0"/>
+                  <a:cs typeface="Arial" charset="0"/>
+                </a:defRPr>
+              </a:lvl4pPr>
+              <a:lvl5pPr marL="2057400" indent="-228600" eaLnBrk="0" hangingPunct="0">
+                <a:defRPr>
+                  <a:solidFill>
+                    <a:schemeClr val="tx1"/>
+                  </a:solidFill>
+                  <a:latin typeface="Arial" charset="0"/>
+                  <a:cs typeface="Arial" charset="0"/>
+                </a:defRPr>
+              </a:lvl5pPr>
+              <a:lvl6pPr marL="2514600" indent="-228600" eaLnBrk="0" fontAlgn="base" hangingPunct="0">
+                <a:spcBef>
+                  <a:spcPct val="0"/>
+                </a:spcBef>
+                <a:spcAft>
+                  <a:spcPct val="0"/>
+                </a:spcAft>
+                <a:defRPr>
+                  <a:solidFill>
+                    <a:schemeClr val="tx1"/>
+                  </a:solidFill>
+                  <a:latin typeface="Arial" charset="0"/>
+                  <a:cs typeface="Arial" charset="0"/>
+                </a:defRPr>
+              </a:lvl6pPr>
+              <a:lvl7pPr marL="2971800" indent="-228600" eaLnBrk="0" fontAlgn="base" hangingPunct="0">
+                <a:spcBef>
+                  <a:spcPct val="0"/>
+                </a:spcBef>
+                <a:spcAft>
+                  <a:spcPct val="0"/>
+                </a:spcAft>
+                <a:defRPr>
+                  <a:solidFill>
+                    <a:schemeClr val="tx1"/>
+                  </a:solidFill>
+                  <a:latin typeface="Arial" charset="0"/>
+                  <a:cs typeface="Arial" charset="0"/>
+                </a:defRPr>
+              </a:lvl7pPr>
+              <a:lvl8pPr marL="3429000" indent="-228600" eaLnBrk="0" fontAlgn="base" hangingPunct="0">
+                <a:spcBef>
+                  <a:spcPct val="0"/>
+                </a:spcBef>
+                <a:spcAft>
+                  <a:spcPct val="0"/>
+                </a:spcAft>
+                <a:defRPr>
+                  <a:solidFill>
+                    <a:schemeClr val="tx1"/>
+                  </a:solidFill>
+                  <a:latin typeface="Arial" charset="0"/>
+                  <a:cs typeface="Arial" charset="0"/>
+                </a:defRPr>
+              </a:lvl8pPr>
+              <a:lvl9pPr marL="3886200" indent="-228600" eaLnBrk="0" fontAlgn="base" hangingPunct="0">
+                <a:spcBef>
+                  <a:spcPct val="0"/>
+                </a:spcBef>
+                <a:spcAft>
+                  <a:spcPct val="0"/>
+                </a:spcAft>
+                <a:defRPr>
+                  <a:solidFill>
+                    <a:schemeClr val="tx1"/>
+                  </a:solidFill>
+                  <a:latin typeface="Arial" charset="0"/>
+                  <a:cs typeface="Arial" charset="0"/>
+                </a:defRPr>
+              </a:lvl9pPr>
+            </a:lstStyle>
+            <a:p>
+              <a:pPr eaLnBrk="1" hangingPunct="1"/>
+              <a:r>
+                <a:rPr lang="en-US" dirty="0">
+                  <a:latin typeface="Courier New" pitchFamily="49" charset="0"/>
+                  <a:cs typeface="Courier New" pitchFamily="49" charset="0"/>
+                  <a:sym typeface="Symbol" panose="05050102010706020507" pitchFamily="18" charset="2"/>
+                </a:rPr>
+                <a:t></a:t>
+              </a:r>
+            </a:p>
+            <a:p>
+              <a:pPr eaLnBrk="1" hangingPunct="1"/>
+              <a:r>
+                <a:rPr lang="en-US" dirty="0">
+                  <a:latin typeface="Courier New" pitchFamily="49" charset="0"/>
+                  <a:cs typeface="Courier New" pitchFamily="49" charset="0"/>
+                  <a:sym typeface="Symbol" panose="05050102010706020507" pitchFamily="18" charset="2"/>
+                </a:rPr>
+                <a:t>process </a:t>
+              </a:r>
+              <a:r>
+                <a:rPr lang="en-US" dirty="0" err="1">
+                  <a:latin typeface="Courier New" pitchFamily="49" charset="0"/>
+                  <a:cs typeface="Courier New" pitchFamily="49" charset="0"/>
+                  <a:sym typeface="Symbol" panose="05050102010706020507" pitchFamily="18" charset="2"/>
+                </a:rPr>
+                <a:t>ComputeDistances</a:t>
+              </a:r>
+              <a:r>
+                <a:rPr lang="en-US" dirty="0">
+                  <a:latin typeface="Courier New" pitchFamily="49" charset="0"/>
+                  <a:cs typeface="Courier New" pitchFamily="49" charset="0"/>
+                  <a:sym typeface="Symbol" panose="05050102010706020507" pitchFamily="18" charset="2"/>
+                </a:rPr>
+                <a:t> {</a:t>
+              </a:r>
+            </a:p>
+            <a:p>
+              <a:pPr eaLnBrk="1" hangingPunct="1"/>
+              <a:r>
+                <a:rPr lang="en-US" dirty="0">
+                  <a:latin typeface="Courier New" pitchFamily="49" charset="0"/>
+                  <a:cs typeface="Courier New" pitchFamily="49" charset="0"/>
+                  <a:sym typeface="Symbol" panose="05050102010706020507" pitchFamily="18" charset="2"/>
+                </a:rPr>
+                <a:t>    input:</a:t>
+              </a:r>
+            </a:p>
+            <a:p>
+              <a:pPr eaLnBrk="1" hangingPunct="1"/>
+              <a:r>
+                <a:rPr lang="en-US" dirty="0">
+                  <a:latin typeface="Courier New" pitchFamily="49" charset="0"/>
+                  <a:cs typeface="Courier New" pitchFamily="49" charset="0"/>
+                  <a:sym typeface="Symbol" panose="05050102010706020507" pitchFamily="18" charset="2"/>
+                </a:rPr>
+                <a:t>    </a:t>
+              </a:r>
+              <a:r>
+                <a:rPr lang="en-US" dirty="0" err="1">
+                  <a:latin typeface="Courier New" pitchFamily="49" charset="0"/>
+                  <a:cs typeface="Courier New" pitchFamily="49" charset="0"/>
+                  <a:sym typeface="Symbol" panose="05050102010706020507" pitchFamily="18" charset="2"/>
+                </a:rPr>
+                <a:t>val</a:t>
+              </a:r>
+              <a:r>
+                <a:rPr lang="en-US" dirty="0">
+                  <a:latin typeface="Courier New" pitchFamily="49" charset="0"/>
+                  <a:cs typeface="Courier New" pitchFamily="49" charset="0"/>
+                  <a:sym typeface="Symbol" panose="05050102010706020507" pitchFamily="18" charset="2"/>
+                </a:rPr>
+                <a:t> state</a:t>
+              </a:r>
+            </a:p>
+            <a:p>
+              <a:pPr eaLnBrk="1" hangingPunct="1"/>
+              <a:r>
+                <a:rPr lang="en-US" dirty="0">
+                  <a:latin typeface="Courier New" pitchFamily="49" charset="0"/>
+                  <a:cs typeface="Courier New" pitchFamily="49" charset="0"/>
+                  <a:sym typeface="Symbol" panose="05050102010706020507" pitchFamily="18" charset="2"/>
+                </a:rPr>
+                <a:t>    path </a:t>
+              </a:r>
+              <a:r>
+                <a:rPr lang="en-US" dirty="0" err="1">
+                  <a:latin typeface="Courier New" pitchFamily="49" charset="0"/>
+                  <a:cs typeface="Courier New" pitchFamily="49" charset="0"/>
+                  <a:sym typeface="Symbol" panose="05050102010706020507" pitchFamily="18" charset="2"/>
+                </a:rPr>
+                <a:t>points_file</a:t>
+              </a:r>
+              <a:endParaRPr lang="en-US" dirty="0">
+                <a:latin typeface="Courier New" pitchFamily="49" charset="0"/>
+                <a:cs typeface="Courier New" pitchFamily="49" charset="0"/>
+                <a:sym typeface="Symbol" panose="05050102010706020507" pitchFamily="18" charset="2"/>
+              </a:endParaRPr>
+            </a:p>
+            <a:p>
+              <a:pPr eaLnBrk="1" hangingPunct="1"/>
+              <a:endParaRPr lang="en-US" dirty="0">
+                <a:latin typeface="Courier New" pitchFamily="49" charset="0"/>
+                <a:cs typeface="Courier New" pitchFamily="49" charset="0"/>
+                <a:sym typeface="Symbol" panose="05050102010706020507" pitchFamily="18" charset="2"/>
+              </a:endParaRPr>
+            </a:p>
+            <a:p>
+              <a:pPr eaLnBrk="1" hangingPunct="1"/>
+              <a:r>
+                <a:rPr lang="en-US" dirty="0">
+                  <a:latin typeface="Courier New" pitchFamily="49" charset="0"/>
+                  <a:cs typeface="Courier New" pitchFamily="49" charset="0"/>
+                  <a:sym typeface="Symbol" panose="05050102010706020507" pitchFamily="18" charset="2"/>
+                </a:rPr>
+                <a:t>    output:</a:t>
+              </a:r>
+            </a:p>
+            <a:p>
+              <a:pPr eaLnBrk="1" hangingPunct="1"/>
+              <a:r>
+                <a:rPr lang="en-US" dirty="0">
+                  <a:latin typeface="Courier New" pitchFamily="49" charset="0"/>
+                  <a:cs typeface="Courier New" pitchFamily="49" charset="0"/>
+                  <a:sym typeface="Symbol" panose="05050102010706020507" pitchFamily="18" charset="2"/>
+                </a:rPr>
+                <a:t>    path "${</a:t>
+              </a:r>
+              <a:r>
+                <a:rPr lang="en-US" dirty="0" err="1">
+                  <a:latin typeface="Courier New" pitchFamily="49" charset="0"/>
+                  <a:cs typeface="Courier New" pitchFamily="49" charset="0"/>
+                  <a:sym typeface="Symbol" panose="05050102010706020507" pitchFamily="18" charset="2"/>
+                </a:rPr>
+                <a:t>params.distances_file</a:t>
+              </a:r>
+              <a:r>
+                <a:rPr lang="en-US" dirty="0">
+                  <a:latin typeface="Courier New" pitchFamily="49" charset="0"/>
+                  <a:cs typeface="Courier New" pitchFamily="49" charset="0"/>
+                  <a:sym typeface="Symbol" panose="05050102010706020507" pitchFamily="18" charset="2"/>
+                </a:rPr>
+                <a:t>}"</a:t>
+              </a:r>
+            </a:p>
+            <a:p>
+              <a:pPr eaLnBrk="1" hangingPunct="1"/>
+              <a:endParaRPr lang="en-US" dirty="0">
+                <a:latin typeface="Courier New" pitchFamily="49" charset="0"/>
+                <a:cs typeface="Courier New" pitchFamily="49" charset="0"/>
+                <a:sym typeface="Symbol" panose="05050102010706020507" pitchFamily="18" charset="2"/>
+              </a:endParaRPr>
+            </a:p>
+            <a:p>
+              <a:pPr eaLnBrk="1" hangingPunct="1"/>
+              <a:r>
+                <a:rPr lang="en-US" dirty="0">
+                  <a:latin typeface="Courier New" pitchFamily="49" charset="0"/>
+                  <a:cs typeface="Courier New" pitchFamily="49" charset="0"/>
+                  <a:sym typeface="Symbol" panose="05050102010706020507" pitchFamily="18" charset="2"/>
+                </a:rPr>
+                <a:t>    script:</a:t>
+              </a:r>
+            </a:p>
+            <a:p>
+              <a:pPr eaLnBrk="1" hangingPunct="1"/>
+              <a:r>
+                <a:rPr lang="en-US" dirty="0">
+                  <a:latin typeface="Courier New" pitchFamily="49" charset="0"/>
+                  <a:cs typeface="Courier New" pitchFamily="49" charset="0"/>
+                  <a:sym typeface="Symbol" panose="05050102010706020507" pitchFamily="18" charset="2"/>
+                </a:rPr>
+                <a:t>    """</a:t>
+              </a:r>
+            </a:p>
+            <a:p>
+              <a:pPr eaLnBrk="1" hangingPunct="1"/>
+              <a:r>
+                <a:rPr lang="en-US" dirty="0">
+                  <a:latin typeface="Courier New" pitchFamily="49" charset="0"/>
+                  <a:cs typeface="Courier New" pitchFamily="49" charset="0"/>
+                  <a:sym typeface="Symbol" panose="05050102010706020507" pitchFamily="18" charset="2"/>
+                </a:rPr>
+                <a:t>    </a:t>
+              </a:r>
+              <a:r>
+                <a:rPr lang="en-US" dirty="0" err="1">
+                  <a:latin typeface="Courier New" pitchFamily="49" charset="0"/>
+                  <a:cs typeface="Courier New" pitchFamily="49" charset="0"/>
+                  <a:sym typeface="Symbol" panose="05050102010706020507" pitchFamily="18" charset="2"/>
+                </a:rPr>
+                <a:t>conda</a:t>
+              </a:r>
+              <a:r>
+                <a:rPr lang="en-US" dirty="0">
+                  <a:latin typeface="Courier New" pitchFamily="49" charset="0"/>
+                  <a:cs typeface="Courier New" pitchFamily="49" charset="0"/>
+                  <a:sym typeface="Symbol" panose="05050102010706020507" pitchFamily="18" charset="2"/>
+                </a:rPr>
+                <a:t> activate ${</a:t>
+              </a:r>
+              <a:r>
+                <a:rPr lang="en-US" dirty="0" err="1">
+                  <a:latin typeface="Courier New" pitchFamily="49" charset="0"/>
+                  <a:cs typeface="Courier New" pitchFamily="49" charset="0"/>
+                  <a:sym typeface="Symbol" panose="05050102010706020507" pitchFamily="18" charset="2"/>
+                </a:rPr>
+                <a:t>params.environment_name</a:t>
+              </a:r>
+              <a:r>
+                <a:rPr lang="en-US" dirty="0">
+                  <a:latin typeface="Courier New" pitchFamily="49" charset="0"/>
+                  <a:cs typeface="Courier New" pitchFamily="49" charset="0"/>
+                  <a:sym typeface="Symbol" panose="05050102010706020507" pitchFamily="18" charset="2"/>
+                </a:rPr>
+                <a:t>}</a:t>
+              </a:r>
+            </a:p>
+            <a:p>
+              <a:pPr eaLnBrk="1" hangingPunct="1"/>
+              <a:r>
+                <a:rPr lang="en-US" dirty="0">
+                  <a:latin typeface="Courier New" pitchFamily="49" charset="0"/>
+                  <a:cs typeface="Courier New" pitchFamily="49" charset="0"/>
+                  <a:sym typeface="Symbol" panose="05050102010706020507" pitchFamily="18" charset="2"/>
+                </a:rPr>
+                <a:t>    python ${</a:t>
+              </a:r>
+              <a:r>
+                <a:rPr lang="en-US" dirty="0" err="1">
+                  <a:latin typeface="Courier New" pitchFamily="49" charset="0"/>
+                  <a:cs typeface="Courier New" pitchFamily="49" charset="0"/>
+                  <a:sym typeface="Symbol" panose="05050102010706020507" pitchFamily="18" charset="2"/>
+                </a:rPr>
+                <a:t>projectDir</a:t>
+              </a:r>
+              <a:r>
+                <a:rPr lang="en-US" dirty="0">
+                  <a:latin typeface="Courier New" pitchFamily="49" charset="0"/>
+                  <a:cs typeface="Courier New" pitchFamily="49" charset="0"/>
+                  <a:sym typeface="Symbol" panose="05050102010706020507" pitchFamily="18" charset="2"/>
+                </a:rPr>
+                <a:t>}/process.py --</a:t>
+              </a:r>
+              <a:r>
+                <a:rPr lang="en-US" dirty="0" err="1">
+                  <a:latin typeface="Courier New" pitchFamily="49" charset="0"/>
+                  <a:cs typeface="Courier New" pitchFamily="49" charset="0"/>
+                  <a:sym typeface="Symbol" panose="05050102010706020507" pitchFamily="18" charset="2"/>
+                </a:rPr>
+                <a:t>points_file</a:t>
+              </a:r>
+              <a:r>
+                <a:rPr lang="en-US" dirty="0">
+                  <a:latin typeface="Courier New" pitchFamily="49" charset="0"/>
+                  <a:cs typeface="Courier New" pitchFamily="49" charset="0"/>
+                  <a:sym typeface="Symbol" panose="05050102010706020507" pitchFamily="18" charset="2"/>
+                </a:rPr>
+                <a:t> $</a:t>
+              </a:r>
+              <a:r>
+                <a:rPr lang="en-US" dirty="0" err="1">
+                  <a:latin typeface="Courier New" pitchFamily="49" charset="0"/>
+                  <a:cs typeface="Courier New" pitchFamily="49" charset="0"/>
+                  <a:sym typeface="Symbol" panose="05050102010706020507" pitchFamily="18" charset="2"/>
+                </a:rPr>
+                <a:t>points_file</a:t>
+              </a:r>
+              <a:r>
+                <a:rPr lang="en-US" dirty="0">
+                  <a:latin typeface="Courier New" pitchFamily="49" charset="0"/>
+                  <a:cs typeface="Courier New" pitchFamily="49" charset="0"/>
+                  <a:sym typeface="Symbol" panose="05050102010706020507" pitchFamily="18" charset="2"/>
+                </a:rPr>
+                <a:t> \</a:t>
+              </a:r>
+            </a:p>
+            <a:p>
+              <a:pPr eaLnBrk="1" hangingPunct="1"/>
+              <a:r>
+                <a:rPr lang="en-US" dirty="0">
+                  <a:latin typeface="Courier New" pitchFamily="49" charset="0"/>
+                  <a:cs typeface="Courier New" pitchFamily="49" charset="0"/>
+                  <a:sym typeface="Symbol" panose="05050102010706020507" pitchFamily="18" charset="2"/>
+                </a:rPr>
+                <a:t>        --</a:t>
+              </a:r>
+              <a:r>
+                <a:rPr lang="en-US" dirty="0" err="1">
+                  <a:latin typeface="Courier New" pitchFamily="49" charset="0"/>
+                  <a:cs typeface="Courier New" pitchFamily="49" charset="0"/>
+                  <a:sym typeface="Symbol" panose="05050102010706020507" pitchFamily="18" charset="2"/>
+                </a:rPr>
+                <a:t>nr_processes</a:t>
+              </a:r>
+              <a:r>
+                <a:rPr lang="en-US" dirty="0">
+                  <a:latin typeface="Courier New" pitchFamily="49" charset="0"/>
+                  <a:cs typeface="Courier New" pitchFamily="49" charset="0"/>
+                  <a:sym typeface="Symbol" panose="05050102010706020507" pitchFamily="18" charset="2"/>
+                </a:rPr>
+                <a:t> $</a:t>
+              </a:r>
+              <a:r>
+                <a:rPr lang="en-US" dirty="0" err="1">
+                  <a:latin typeface="Courier New" pitchFamily="49" charset="0"/>
+                  <a:cs typeface="Courier New" pitchFamily="49" charset="0"/>
+                  <a:sym typeface="Symbol" panose="05050102010706020507" pitchFamily="18" charset="2"/>
+                </a:rPr>
+                <a:t>task.cpus</a:t>
+              </a:r>
+              <a:r>
+                <a:rPr lang="en-US" dirty="0">
+                  <a:latin typeface="Courier New" pitchFamily="49" charset="0"/>
+                  <a:cs typeface="Courier New" pitchFamily="49" charset="0"/>
+                  <a:sym typeface="Symbol" panose="05050102010706020507" pitchFamily="18" charset="2"/>
+                </a:rPr>
+                <a:t>   --</a:t>
+              </a:r>
+              <a:r>
+                <a:rPr lang="en-US" dirty="0" err="1">
+                  <a:latin typeface="Courier New" pitchFamily="49" charset="0"/>
+                  <a:cs typeface="Courier New" pitchFamily="49" charset="0"/>
+                  <a:sym typeface="Symbol" panose="05050102010706020507" pitchFamily="18" charset="2"/>
+                </a:rPr>
+                <a:t>batch_size</a:t>
+              </a:r>
+              <a:r>
+                <a:rPr lang="en-US" dirty="0">
+                  <a:latin typeface="Courier New" pitchFamily="49" charset="0"/>
+                  <a:cs typeface="Courier New" pitchFamily="49" charset="0"/>
+                  <a:sym typeface="Symbol" panose="05050102010706020507" pitchFamily="18" charset="2"/>
+                </a:rPr>
+                <a:t> ${</a:t>
+              </a:r>
+              <a:r>
+                <a:rPr lang="en-US" dirty="0" err="1">
+                  <a:latin typeface="Courier New" pitchFamily="49" charset="0"/>
+                  <a:cs typeface="Courier New" pitchFamily="49" charset="0"/>
+                  <a:sym typeface="Symbol" panose="05050102010706020507" pitchFamily="18" charset="2"/>
+                </a:rPr>
+                <a:t>params.batch_size</a:t>
+              </a:r>
+              <a:r>
+                <a:rPr lang="en-US" dirty="0">
+                  <a:latin typeface="Courier New" pitchFamily="49" charset="0"/>
+                  <a:cs typeface="Courier New" pitchFamily="49" charset="0"/>
+                  <a:sym typeface="Symbol" panose="05050102010706020507" pitchFamily="18" charset="2"/>
+                </a:rPr>
+                <a:t>} \</a:t>
+              </a:r>
+            </a:p>
+            <a:p>
+              <a:pPr eaLnBrk="1" hangingPunct="1"/>
+              <a:r>
+                <a:rPr lang="en-US" dirty="0">
+                  <a:latin typeface="Courier New" pitchFamily="49" charset="0"/>
+                  <a:cs typeface="Courier New" pitchFamily="49" charset="0"/>
+                  <a:sym typeface="Symbol" panose="05050102010706020507" pitchFamily="18" charset="2"/>
+                </a:rPr>
+                <a:t>        --</a:t>
+              </a:r>
+              <a:r>
+                <a:rPr lang="en-US" dirty="0" err="1">
+                  <a:latin typeface="Courier New" pitchFamily="49" charset="0"/>
+                  <a:cs typeface="Courier New" pitchFamily="49" charset="0"/>
+                  <a:sym typeface="Symbol" panose="05050102010706020507" pitchFamily="18" charset="2"/>
+                </a:rPr>
+                <a:t>distances_file</a:t>
+              </a:r>
+              <a:r>
+                <a:rPr lang="en-US" dirty="0">
+                  <a:latin typeface="Courier New" pitchFamily="49" charset="0"/>
+                  <a:cs typeface="Courier New" pitchFamily="49" charset="0"/>
+                  <a:sym typeface="Symbol" panose="05050102010706020507" pitchFamily="18" charset="2"/>
+                </a:rPr>
+                <a:t> ${</a:t>
+              </a:r>
+              <a:r>
+                <a:rPr lang="en-US" dirty="0" err="1">
+                  <a:latin typeface="Courier New" pitchFamily="49" charset="0"/>
+                  <a:cs typeface="Courier New" pitchFamily="49" charset="0"/>
+                  <a:sym typeface="Symbol" panose="05050102010706020507" pitchFamily="18" charset="2"/>
+                </a:rPr>
+                <a:t>params.distances_file</a:t>
+              </a:r>
+              <a:r>
+                <a:rPr lang="en-US" dirty="0">
+                  <a:latin typeface="Courier New" pitchFamily="49" charset="0"/>
+                  <a:cs typeface="Courier New" pitchFamily="49" charset="0"/>
+                  <a:sym typeface="Symbol" panose="05050102010706020507" pitchFamily="18" charset="2"/>
+                </a:rPr>
+                <a:t>}</a:t>
+              </a:r>
+            </a:p>
+            <a:p>
+              <a:pPr eaLnBrk="1" hangingPunct="1"/>
+              <a:r>
+                <a:rPr lang="en-US" dirty="0">
+                  <a:latin typeface="Courier New" pitchFamily="49" charset="0"/>
+                  <a:cs typeface="Courier New" pitchFamily="49" charset="0"/>
+                  <a:sym typeface="Symbol" panose="05050102010706020507" pitchFamily="18" charset="2"/>
+                </a:rPr>
+                <a:t>    """</a:t>
+              </a:r>
+            </a:p>
+            <a:p>
+              <a:pPr eaLnBrk="1" hangingPunct="1"/>
+              <a:r>
+                <a:rPr lang="en-US" dirty="0">
+                  <a:latin typeface="Courier New" pitchFamily="49" charset="0"/>
+                  <a:cs typeface="Courier New" pitchFamily="49" charset="0"/>
+                  <a:sym typeface="Symbol" panose="05050102010706020507" pitchFamily="18" charset="2"/>
+                </a:rPr>
+                <a:t>}</a:t>
+              </a:r>
+            </a:p>
+            <a:p>
+              <a:pPr eaLnBrk="1" hangingPunct="1"/>
+              <a:r>
+                <a:rPr lang="en-US" dirty="0">
+                  <a:latin typeface="Courier New" pitchFamily="49" charset="0"/>
+                  <a:cs typeface="Courier New" pitchFamily="49" charset="0"/>
+                  <a:sym typeface="Symbol" panose="05050102010706020507" pitchFamily="18" charset="2"/>
+                </a:rPr>
+                <a:t></a:t>
+              </a:r>
+              <a:endParaRPr lang="en-US" b="1" dirty="0">
+                <a:solidFill>
+                  <a:srgbClr val="C00000"/>
+                </a:solidFill>
+                <a:latin typeface="Courier New" panose="02070309020205020404" pitchFamily="49" charset="0"/>
+                <a:cs typeface="Courier New" panose="02070309020205020404" pitchFamily="49" charset="0"/>
+              </a:endParaRPr>
+            </a:p>
+          </p:txBody>
+        </p:sp>
+        <p:sp>
+          <p:nvSpPr>
+            <p:cNvPr id="6" name="TextBox 8">
+              <a:extLst>
+                <a:ext uri="{FF2B5EF4-FFF2-40B4-BE49-F238E27FC236}">
+                  <a16:creationId xmlns:a16="http://schemas.microsoft.com/office/drawing/2014/main" id="{AE009E7C-99DF-C9F0-B3B6-AF899E0F5333}"/>
+                </a:ext>
+              </a:extLst>
+            </p:cNvPr>
+            <p:cNvSpPr txBox="1">
+              <a:spLocks noChangeArrowheads="1"/>
+            </p:cNvSpPr>
+            <p:nvPr/>
+          </p:nvSpPr>
+          <p:spPr bwMode="auto">
+            <a:xfrm>
+              <a:off x="7107694" y="3967896"/>
+              <a:ext cx="1207382" cy="276999"/>
+            </a:xfrm>
+            <a:prstGeom prst="rect">
+              <a:avLst/>
+            </a:prstGeom>
+            <a:solidFill>
+              <a:srgbClr val="FFFFFF"/>
+            </a:solidFill>
+            <a:ln w="9525">
+              <a:solidFill>
+                <a:srgbClr val="000000"/>
+              </a:solidFill>
+              <a:miter lim="800000"/>
+              <a:headEnd/>
+              <a:tailEnd/>
+            </a:ln>
+          </p:spPr>
+          <p:txBody>
+            <a:bodyPr wrap="none">
+              <a:spAutoFit/>
+            </a:bodyPr>
+            <a:lstStyle>
+              <a:lvl1pPr eaLnBrk="0" hangingPunct="0">
+                <a:defRPr>
+                  <a:solidFill>
+                    <a:schemeClr val="tx1"/>
+                  </a:solidFill>
+                  <a:latin typeface="Arial" charset="0"/>
+                  <a:cs typeface="Arial" charset="0"/>
+                </a:defRPr>
+              </a:lvl1pPr>
+              <a:lvl2pPr marL="742950" indent="-285750" eaLnBrk="0" hangingPunct="0">
+                <a:defRPr>
+                  <a:solidFill>
+                    <a:schemeClr val="tx1"/>
+                  </a:solidFill>
+                  <a:latin typeface="Arial" charset="0"/>
+                  <a:cs typeface="Arial" charset="0"/>
+                </a:defRPr>
+              </a:lvl2pPr>
+              <a:lvl3pPr marL="1143000" indent="-228600" eaLnBrk="0" hangingPunct="0">
+                <a:defRPr>
+                  <a:solidFill>
+                    <a:schemeClr val="tx1"/>
+                  </a:solidFill>
+                  <a:latin typeface="Arial" charset="0"/>
+                  <a:cs typeface="Arial" charset="0"/>
+                </a:defRPr>
+              </a:lvl3pPr>
+              <a:lvl4pPr marL="1600200" indent="-228600" eaLnBrk="0" hangingPunct="0">
+                <a:defRPr>
+                  <a:solidFill>
+                    <a:schemeClr val="tx1"/>
+                  </a:solidFill>
+                  <a:latin typeface="Arial" charset="0"/>
+                  <a:cs typeface="Arial" charset="0"/>
+                </a:defRPr>
+              </a:lvl4pPr>
+              <a:lvl5pPr marL="2057400" indent="-228600" eaLnBrk="0" hangingPunct="0">
+                <a:defRPr>
+                  <a:solidFill>
+                    <a:schemeClr val="tx1"/>
+                  </a:solidFill>
+                  <a:latin typeface="Arial" charset="0"/>
+                  <a:cs typeface="Arial" charset="0"/>
+                </a:defRPr>
+              </a:lvl5pPr>
+              <a:lvl6pPr marL="2514600" indent="-228600" eaLnBrk="0" fontAlgn="base" hangingPunct="0">
+                <a:spcBef>
+                  <a:spcPct val="0"/>
+                </a:spcBef>
+                <a:spcAft>
+                  <a:spcPct val="0"/>
+                </a:spcAft>
+                <a:defRPr>
+                  <a:solidFill>
+                    <a:schemeClr val="tx1"/>
+                  </a:solidFill>
+                  <a:latin typeface="Arial" charset="0"/>
+                  <a:cs typeface="Arial" charset="0"/>
+                </a:defRPr>
+              </a:lvl6pPr>
+              <a:lvl7pPr marL="2971800" indent="-228600" eaLnBrk="0" fontAlgn="base" hangingPunct="0">
+                <a:spcBef>
+                  <a:spcPct val="0"/>
+                </a:spcBef>
+                <a:spcAft>
+                  <a:spcPct val="0"/>
+                </a:spcAft>
+                <a:defRPr>
+                  <a:solidFill>
+                    <a:schemeClr val="tx1"/>
+                  </a:solidFill>
+                  <a:latin typeface="Arial" charset="0"/>
+                  <a:cs typeface="Arial" charset="0"/>
+                </a:defRPr>
+              </a:lvl7pPr>
+              <a:lvl8pPr marL="3429000" indent="-228600" eaLnBrk="0" fontAlgn="base" hangingPunct="0">
+                <a:spcBef>
+                  <a:spcPct val="0"/>
+                </a:spcBef>
+                <a:spcAft>
+                  <a:spcPct val="0"/>
+                </a:spcAft>
+                <a:defRPr>
+                  <a:solidFill>
+                    <a:schemeClr val="tx1"/>
+                  </a:solidFill>
+                  <a:latin typeface="Arial" charset="0"/>
+                  <a:cs typeface="Arial" charset="0"/>
+                </a:defRPr>
+              </a:lvl8pPr>
+              <a:lvl9pPr marL="3886200" indent="-228600" eaLnBrk="0" fontAlgn="base" hangingPunct="0">
+                <a:spcBef>
+                  <a:spcPct val="0"/>
+                </a:spcBef>
+                <a:spcAft>
+                  <a:spcPct val="0"/>
+                </a:spcAft>
+                <a:defRPr>
+                  <a:solidFill>
+                    <a:schemeClr val="tx1"/>
+                  </a:solidFill>
+                  <a:latin typeface="Arial" charset="0"/>
+                  <a:cs typeface="Arial" charset="0"/>
+                </a:defRPr>
+              </a:lvl9pPr>
+            </a:lstStyle>
+            <a:p>
+              <a:pPr eaLnBrk="1" hangingPunct="1"/>
+              <a:r>
+                <a:rPr lang="en-US" sz="1200" b="1" dirty="0">
+                  <a:latin typeface="Courier New" panose="02070309020205020404" pitchFamily="49" charset="0"/>
+                  <a:cs typeface="Courier New" panose="02070309020205020404" pitchFamily="49" charset="0"/>
+                </a:rPr>
+                <a:t>workflow.nf</a:t>
+              </a:r>
+              <a:endParaRPr lang="nl-BE" sz="1200" b="1" dirty="0">
+                <a:latin typeface="Courier New" panose="02070309020205020404" pitchFamily="49" charset="0"/>
+                <a:cs typeface="Courier New" panose="02070309020205020404" pitchFamily="49" charset="0"/>
+              </a:endParaRPr>
+            </a:p>
+          </p:txBody>
+        </p:sp>
+      </p:grpSp>
+      <p:grpSp>
+        <p:nvGrpSpPr>
+          <p:cNvPr id="7" name="Group 6">
+            <a:extLst>
+              <a:ext uri="{FF2B5EF4-FFF2-40B4-BE49-F238E27FC236}">
+                <a16:creationId xmlns:a16="http://schemas.microsoft.com/office/drawing/2014/main" id="{71DA7BA4-4CBF-BC9E-D3BD-7E1EAF4EF1AA}"/>
+              </a:ext>
+            </a:extLst>
+          </p:cNvPr>
+          <p:cNvGrpSpPr/>
+          <p:nvPr/>
+        </p:nvGrpSpPr>
+        <p:grpSpPr>
+          <a:xfrm>
+            <a:off x="2481943" y="1866310"/>
+            <a:ext cx="9459687" cy="461665"/>
+            <a:chOff x="3434386" y="3505591"/>
+            <a:chExt cx="9459687" cy="461665"/>
+          </a:xfrm>
+        </p:grpSpPr>
+        <p:cxnSp>
+          <p:nvCxnSpPr>
+            <p:cNvPr id="8" name="Straight Arrow Connector 7">
+              <a:extLst>
+                <a:ext uri="{FF2B5EF4-FFF2-40B4-BE49-F238E27FC236}">
+                  <a16:creationId xmlns:a16="http://schemas.microsoft.com/office/drawing/2014/main" id="{D16834F6-034B-4235-4433-5F919C279678}"/>
+                </a:ext>
+              </a:extLst>
+            </p:cNvPr>
+            <p:cNvCxnSpPr>
+              <a:cxnSpLocks/>
+              <a:stCxn id="9" idx="1"/>
+            </p:cNvCxnSpPr>
+            <p:nvPr/>
+          </p:nvCxnSpPr>
+          <p:spPr>
+            <a:xfrm flipH="1">
+              <a:off x="3434386" y="3736424"/>
+              <a:ext cx="4263456" cy="230832"/>
+            </a:xfrm>
+            <a:prstGeom prst="straightConnector1">
+              <a:avLst/>
+            </a:prstGeom>
+            <a:ln w="28575">
+              <a:solidFill>
+                <a:schemeClr val="tx1"/>
+              </a:solidFill>
+              <a:tailEnd type="stealth" w="lg" len="lg"/>
+            </a:ln>
+          </p:spPr>
+          <p:style>
+            <a:lnRef idx="2">
+              <a:schemeClr val="accent1"/>
+            </a:lnRef>
+            <a:fillRef idx="0">
+              <a:schemeClr val="accent1"/>
+            </a:fillRef>
+            <a:effectRef idx="1">
+              <a:schemeClr val="accent1"/>
+            </a:effectRef>
+            <a:fontRef idx="minor">
+              <a:schemeClr val="tx1"/>
+            </a:fontRef>
+          </p:style>
+        </p:cxnSp>
+        <p:sp>
+          <p:nvSpPr>
+            <p:cNvPr id="9" name="TextBox 8">
+              <a:extLst>
+                <a:ext uri="{FF2B5EF4-FFF2-40B4-BE49-F238E27FC236}">
+                  <a16:creationId xmlns:a16="http://schemas.microsoft.com/office/drawing/2014/main" id="{B910A464-6F6E-5947-6997-BD4E8FCA27A3}"/>
+                </a:ext>
+              </a:extLst>
+            </p:cNvPr>
+            <p:cNvSpPr txBox="1"/>
+            <p:nvPr/>
+          </p:nvSpPr>
+          <p:spPr>
+            <a:xfrm>
+              <a:off x="7697842" y="3505591"/>
+              <a:ext cx="5196231" cy="461665"/>
+            </a:xfrm>
+            <a:prstGeom prst="rect">
+              <a:avLst/>
+            </a:prstGeom>
+            <a:solidFill>
+              <a:schemeClr val="bg1"/>
+            </a:solidFill>
+            <a:ln>
+              <a:solidFill>
+                <a:schemeClr val="tx1"/>
+              </a:solidFill>
+            </a:ln>
+          </p:spPr>
+          <p:txBody>
+            <a:bodyPr wrap="none" rtlCol="0">
+              <a:spAutoFit/>
+            </a:bodyPr>
+            <a:lstStyle/>
+            <a:p>
+              <a:pPr algn="ctr"/>
+              <a:r>
+                <a:rPr lang="en-US" sz="2400" dirty="0"/>
+                <a:t>Channel from </a:t>
+              </a:r>
+              <a:r>
+                <a:rPr lang="en-US" sz="2400" dirty="0" err="1">
+                  <a:latin typeface="Courier New" panose="02070309020205020404" pitchFamily="49" charset="0"/>
+                  <a:cs typeface="Courier New" panose="02070309020205020404" pitchFamily="49" charset="0"/>
+                </a:rPr>
+                <a:t>CreateEnvironment</a:t>
+              </a:r>
+              <a:endParaRPr lang="LID4096" sz="2400" dirty="0">
+                <a:latin typeface="Courier New" panose="02070309020205020404" pitchFamily="49" charset="0"/>
+                <a:cs typeface="Courier New" panose="02070309020205020404" pitchFamily="49" charset="0"/>
+              </a:endParaRPr>
+            </a:p>
+          </p:txBody>
+        </p:sp>
+      </p:grpSp>
+      <p:grpSp>
+        <p:nvGrpSpPr>
+          <p:cNvPr id="11" name="Group 10">
+            <a:extLst>
+              <a:ext uri="{FF2B5EF4-FFF2-40B4-BE49-F238E27FC236}">
+                <a16:creationId xmlns:a16="http://schemas.microsoft.com/office/drawing/2014/main" id="{3145C79D-3B7C-952A-F45C-899BE4C1B0A9}"/>
+              </a:ext>
+            </a:extLst>
+          </p:cNvPr>
+          <p:cNvGrpSpPr/>
+          <p:nvPr/>
+        </p:nvGrpSpPr>
+        <p:grpSpPr>
+          <a:xfrm>
+            <a:off x="5317444" y="3443654"/>
+            <a:ext cx="6624186" cy="461665"/>
+            <a:chOff x="6276079" y="3505591"/>
+            <a:chExt cx="6624186" cy="461665"/>
+          </a:xfrm>
+        </p:grpSpPr>
+        <p:cxnSp>
+          <p:nvCxnSpPr>
+            <p:cNvPr id="12" name="Straight Arrow Connector 11">
+              <a:extLst>
+                <a:ext uri="{FF2B5EF4-FFF2-40B4-BE49-F238E27FC236}">
+                  <a16:creationId xmlns:a16="http://schemas.microsoft.com/office/drawing/2014/main" id="{2709FDBC-990A-1BE6-5C8A-D0ECD4414FCF}"/>
+                </a:ext>
+              </a:extLst>
+            </p:cNvPr>
+            <p:cNvCxnSpPr>
+              <a:cxnSpLocks/>
+              <a:stCxn id="13" idx="1"/>
+            </p:cNvCxnSpPr>
+            <p:nvPr/>
+          </p:nvCxnSpPr>
+          <p:spPr>
+            <a:xfrm flipH="1" flipV="1">
+              <a:off x="6276079" y="3556484"/>
+              <a:ext cx="1415580" cy="179940"/>
+            </a:xfrm>
+            <a:prstGeom prst="straightConnector1">
+              <a:avLst/>
+            </a:prstGeom>
+            <a:ln w="28575">
+              <a:solidFill>
+                <a:schemeClr val="tx1"/>
+              </a:solidFill>
+              <a:tailEnd type="stealth" w="lg" len="lg"/>
+            </a:ln>
+          </p:spPr>
+          <p:style>
+            <a:lnRef idx="2">
+              <a:schemeClr val="accent1"/>
+            </a:lnRef>
+            <a:fillRef idx="0">
+              <a:schemeClr val="accent1"/>
+            </a:fillRef>
+            <a:effectRef idx="1">
+              <a:schemeClr val="accent1"/>
+            </a:effectRef>
+            <a:fontRef idx="minor">
+              <a:schemeClr val="tx1"/>
+            </a:fontRef>
+          </p:style>
+        </p:cxnSp>
+        <p:sp>
+          <p:nvSpPr>
+            <p:cNvPr id="13" name="TextBox 12">
+              <a:extLst>
+                <a:ext uri="{FF2B5EF4-FFF2-40B4-BE49-F238E27FC236}">
+                  <a16:creationId xmlns:a16="http://schemas.microsoft.com/office/drawing/2014/main" id="{8AD99F9A-4A93-CAAF-EDCC-503059C4012C}"/>
+                </a:ext>
+              </a:extLst>
+            </p:cNvPr>
+            <p:cNvSpPr txBox="1"/>
+            <p:nvPr/>
+          </p:nvSpPr>
+          <p:spPr>
+            <a:xfrm>
+              <a:off x="7691659" y="3505591"/>
+              <a:ext cx="5208606" cy="461665"/>
+            </a:xfrm>
+            <a:prstGeom prst="rect">
+              <a:avLst/>
+            </a:prstGeom>
+            <a:solidFill>
+              <a:schemeClr val="bg1"/>
+            </a:solidFill>
+            <a:ln>
+              <a:solidFill>
+                <a:schemeClr val="tx1"/>
+              </a:solidFill>
+            </a:ln>
+          </p:spPr>
+          <p:txBody>
+            <a:bodyPr wrap="none" rtlCol="0">
+              <a:spAutoFit/>
+            </a:bodyPr>
+            <a:lstStyle/>
+            <a:p>
+              <a:pPr algn="ctr"/>
+              <a:r>
+                <a:rPr lang="en-US" sz="2400" dirty="0"/>
+                <a:t>Channel to </a:t>
+              </a:r>
+              <a:r>
+                <a:rPr lang="en-US" sz="2400" dirty="0" err="1">
+                  <a:latin typeface="Courier New" panose="02070309020205020404" pitchFamily="49" charset="0"/>
+                  <a:cs typeface="Courier New" panose="02070309020205020404" pitchFamily="49" charset="0"/>
+                </a:rPr>
+                <a:t>ComputeDistribution</a:t>
+              </a:r>
+              <a:endParaRPr lang="LID4096" sz="2400" dirty="0">
+                <a:latin typeface="Courier New" panose="02070309020205020404" pitchFamily="49" charset="0"/>
+                <a:cs typeface="Courier New" panose="02070309020205020404" pitchFamily="49" charset="0"/>
+              </a:endParaRPr>
+            </a:p>
+          </p:txBody>
+        </p:sp>
+      </p:grpSp>
+      <p:grpSp>
+        <p:nvGrpSpPr>
+          <p:cNvPr id="16" name="Group 15">
+            <a:extLst>
+              <a:ext uri="{FF2B5EF4-FFF2-40B4-BE49-F238E27FC236}">
+                <a16:creationId xmlns:a16="http://schemas.microsoft.com/office/drawing/2014/main" id="{8856CC4B-2697-5C72-309D-445F5D22973D}"/>
+              </a:ext>
+            </a:extLst>
+          </p:cNvPr>
+          <p:cNvGrpSpPr/>
+          <p:nvPr/>
+        </p:nvGrpSpPr>
+        <p:grpSpPr>
+          <a:xfrm>
+            <a:off x="3298371" y="2578902"/>
+            <a:ext cx="8643259" cy="461665"/>
+            <a:chOff x="3789952" y="3505591"/>
+            <a:chExt cx="8643259" cy="461665"/>
+          </a:xfrm>
+        </p:grpSpPr>
+        <p:cxnSp>
+          <p:nvCxnSpPr>
+            <p:cNvPr id="17" name="Straight Arrow Connector 16">
+              <a:extLst>
+                <a:ext uri="{FF2B5EF4-FFF2-40B4-BE49-F238E27FC236}">
+                  <a16:creationId xmlns:a16="http://schemas.microsoft.com/office/drawing/2014/main" id="{E4227F68-3068-AFCD-3603-4E62E2EA0291}"/>
+                </a:ext>
+              </a:extLst>
+            </p:cNvPr>
+            <p:cNvCxnSpPr>
+              <a:cxnSpLocks/>
+              <a:stCxn id="18" idx="1"/>
+            </p:cNvCxnSpPr>
+            <p:nvPr/>
+          </p:nvCxnSpPr>
+          <p:spPr>
+            <a:xfrm flipH="1" flipV="1">
+              <a:off x="3789952" y="3644975"/>
+              <a:ext cx="4368754" cy="91449"/>
+            </a:xfrm>
+            <a:prstGeom prst="straightConnector1">
+              <a:avLst/>
+            </a:prstGeom>
+            <a:ln w="28575">
+              <a:solidFill>
+                <a:schemeClr val="tx1"/>
+              </a:solidFill>
+              <a:tailEnd type="stealth" w="lg" len="lg"/>
+            </a:ln>
+          </p:spPr>
+          <p:style>
+            <a:lnRef idx="2">
+              <a:schemeClr val="accent1"/>
+            </a:lnRef>
+            <a:fillRef idx="0">
+              <a:schemeClr val="accent1"/>
+            </a:fillRef>
+            <a:effectRef idx="1">
+              <a:schemeClr val="accent1"/>
+            </a:effectRef>
+            <a:fontRef idx="minor">
+              <a:schemeClr val="tx1"/>
+            </a:fontRef>
+          </p:style>
+        </p:cxnSp>
+        <p:sp>
+          <p:nvSpPr>
+            <p:cNvPr id="18" name="TextBox 17">
+              <a:extLst>
+                <a:ext uri="{FF2B5EF4-FFF2-40B4-BE49-F238E27FC236}">
+                  <a16:creationId xmlns:a16="http://schemas.microsoft.com/office/drawing/2014/main" id="{80B31675-D91D-51DE-DFBA-9C010F6B2164}"/>
+                </a:ext>
+              </a:extLst>
+            </p:cNvPr>
+            <p:cNvSpPr txBox="1"/>
+            <p:nvPr/>
+          </p:nvSpPr>
+          <p:spPr>
+            <a:xfrm>
+              <a:off x="8158706" y="3505591"/>
+              <a:ext cx="4274505" cy="461665"/>
+            </a:xfrm>
+            <a:prstGeom prst="rect">
+              <a:avLst/>
+            </a:prstGeom>
+            <a:solidFill>
+              <a:schemeClr val="bg1"/>
+            </a:solidFill>
+            <a:ln>
+              <a:solidFill>
+                <a:schemeClr val="tx1"/>
+              </a:solidFill>
+            </a:ln>
+          </p:spPr>
+          <p:txBody>
+            <a:bodyPr wrap="none" rtlCol="0">
+              <a:spAutoFit/>
+            </a:bodyPr>
+            <a:lstStyle/>
+            <a:p>
+              <a:pPr algn="ctr"/>
+              <a:r>
+                <a:rPr lang="en-US" sz="2400" dirty="0"/>
+                <a:t>Channel from </a:t>
+              </a:r>
+              <a:r>
+                <a:rPr lang="en-US" sz="2400" dirty="0" err="1">
+                  <a:latin typeface="Courier New" panose="02070309020205020404" pitchFamily="49" charset="0"/>
+                  <a:cs typeface="Courier New" panose="02070309020205020404" pitchFamily="49" charset="0"/>
+                </a:rPr>
+                <a:t>CreatePoints</a:t>
+              </a:r>
+              <a:endParaRPr lang="LID4096" sz="2400" dirty="0">
+                <a:latin typeface="Courier New" panose="02070309020205020404" pitchFamily="49" charset="0"/>
+                <a:cs typeface="Courier New" panose="02070309020205020404" pitchFamily="49" charset="0"/>
+              </a:endParaRPr>
+            </a:p>
+          </p:txBody>
+        </p:sp>
+      </p:grpSp>
+      <p:grpSp>
+        <p:nvGrpSpPr>
+          <p:cNvPr id="20" name="Group 19">
+            <a:extLst>
+              <a:ext uri="{FF2B5EF4-FFF2-40B4-BE49-F238E27FC236}">
+                <a16:creationId xmlns:a16="http://schemas.microsoft.com/office/drawing/2014/main" id="{201F9EE0-94A4-B55D-5379-9C8F18FE2832}"/>
+              </a:ext>
+            </a:extLst>
+          </p:cNvPr>
+          <p:cNvGrpSpPr/>
+          <p:nvPr/>
+        </p:nvGrpSpPr>
+        <p:grpSpPr>
+          <a:xfrm>
+            <a:off x="2144486" y="4052503"/>
+            <a:ext cx="9797144" cy="601103"/>
+            <a:chOff x="1686225" y="3366153"/>
+            <a:chExt cx="9797144" cy="601103"/>
+          </a:xfrm>
+        </p:grpSpPr>
+        <p:cxnSp>
+          <p:nvCxnSpPr>
+            <p:cNvPr id="21" name="Straight Arrow Connector 20">
+              <a:extLst>
+                <a:ext uri="{FF2B5EF4-FFF2-40B4-BE49-F238E27FC236}">
+                  <a16:creationId xmlns:a16="http://schemas.microsoft.com/office/drawing/2014/main" id="{3E858667-50CD-77B8-0072-6F04EF4BA1A0}"/>
+                </a:ext>
+              </a:extLst>
+            </p:cNvPr>
+            <p:cNvCxnSpPr>
+              <a:cxnSpLocks/>
+              <a:stCxn id="22" idx="1"/>
+            </p:cNvCxnSpPr>
+            <p:nvPr/>
+          </p:nvCxnSpPr>
+          <p:spPr>
+            <a:xfrm flipH="1" flipV="1">
+              <a:off x="1686225" y="3366153"/>
+              <a:ext cx="7422327" cy="370271"/>
+            </a:xfrm>
+            <a:prstGeom prst="straightConnector1">
+              <a:avLst/>
+            </a:prstGeom>
+            <a:ln w="28575">
+              <a:solidFill>
+                <a:schemeClr val="tx1"/>
+              </a:solidFill>
+              <a:tailEnd type="stealth" w="lg" len="lg"/>
+            </a:ln>
+          </p:spPr>
+          <p:style>
+            <a:lnRef idx="2">
+              <a:schemeClr val="accent1"/>
+            </a:lnRef>
+            <a:fillRef idx="0">
+              <a:schemeClr val="accent1"/>
+            </a:fillRef>
+            <a:effectRef idx="1">
+              <a:schemeClr val="accent1"/>
+            </a:effectRef>
+            <a:fontRef idx="minor">
+              <a:schemeClr val="tx1"/>
+            </a:fontRef>
+          </p:style>
+        </p:cxnSp>
+        <p:sp>
+          <p:nvSpPr>
+            <p:cNvPr id="22" name="TextBox 21">
+              <a:extLst>
+                <a:ext uri="{FF2B5EF4-FFF2-40B4-BE49-F238E27FC236}">
+                  <a16:creationId xmlns:a16="http://schemas.microsoft.com/office/drawing/2014/main" id="{8831112F-A5C6-C2D5-D0F9-FC2F1DE1A9E8}"/>
+                </a:ext>
+              </a:extLst>
+            </p:cNvPr>
+            <p:cNvSpPr txBox="1"/>
+            <p:nvPr/>
+          </p:nvSpPr>
+          <p:spPr>
+            <a:xfrm>
+              <a:off x="9108552" y="3505591"/>
+              <a:ext cx="2374817" cy="461665"/>
+            </a:xfrm>
+            <a:prstGeom prst="rect">
+              <a:avLst/>
+            </a:prstGeom>
+            <a:solidFill>
+              <a:schemeClr val="bg1"/>
+            </a:solidFill>
+            <a:ln>
+              <a:solidFill>
+                <a:schemeClr val="tx1"/>
+              </a:solidFill>
+            </a:ln>
+          </p:spPr>
+          <p:txBody>
+            <a:bodyPr wrap="none" rtlCol="0">
+              <a:spAutoFit/>
+            </a:bodyPr>
+            <a:lstStyle/>
+            <a:p>
+              <a:pPr algn="ctr"/>
+              <a:r>
+                <a:rPr lang="en-US" sz="2400" dirty="0"/>
+                <a:t>Process payload</a:t>
+              </a:r>
+              <a:endParaRPr lang="LID4096" sz="2400" dirty="0">
+                <a:latin typeface="Courier New" panose="02070309020205020404" pitchFamily="49" charset="0"/>
+                <a:cs typeface="Courier New" panose="02070309020205020404" pitchFamily="49" charset="0"/>
+              </a:endParaRPr>
+            </a:p>
+          </p:txBody>
+        </p:sp>
+      </p:grpSp>
+    </p:spTree>
+    <p:extLst>
+      <p:ext uri="{BB962C8B-B14F-4D97-AF65-F5344CB8AC3E}">
+        <p14:creationId xmlns:p14="http://schemas.microsoft.com/office/powerpoint/2010/main" val="2219001834"/>
+      </p:ext>
+    </p:extLst>
+  </p:cSld>
+  <p:clrMapOvr>
+    <a:masterClrMapping/>
+  </p:clrMapOvr>
+</p:sld>
+</file>
+
+<file path=ppt/slides/slide56.xml><?xml version="1.0" encoding="utf-8"?>
+<p:sld xmlns:a="http://schemas.openxmlformats.org/drawingml/2006/main" xmlns:r="http://schemas.openxmlformats.org/officeDocument/2006/relationships" xmlns:p="http://schemas.openxmlformats.org/presentationml/2006/main">
+  <p:cSld>
+    <p:spTree>
+      <p:nvGrpSpPr>
+        <p:cNvPr id="1" name=""/>
+        <p:cNvGrpSpPr/>
+        <p:nvPr/>
+      </p:nvGrpSpPr>
+      <p:grpSpPr>
+        <a:xfrm>
+          <a:off x="0" y="0"/>
+          <a:ext cx="0" cy="0"/>
+          <a:chOff x="0" y="0"/>
+          <a:chExt cx="0" cy="0"/>
+        </a:xfrm>
+      </p:grpSpPr>
+      <p:sp>
+        <p:nvSpPr>
+          <p:cNvPr id="2" name="Title 1">
+            <a:extLst>
+              <a:ext uri="{FF2B5EF4-FFF2-40B4-BE49-F238E27FC236}">
+                <a16:creationId xmlns:a16="http://schemas.microsoft.com/office/drawing/2014/main" id="{EBBD0C62-DA2D-7AA0-9CF8-0C2BD48A9EDA}"/>
+              </a:ext>
+            </a:extLst>
+          </p:cNvPr>
+          <p:cNvSpPr>
+            <a:spLocks noGrp="1"/>
+          </p:cNvSpPr>
+          <p:nvPr>
+            <p:ph type="title"/>
+          </p:nvPr>
+        </p:nvSpPr>
+        <p:spPr/>
+        <p:txBody>
+          <a:bodyPr/>
+          <a:lstStyle/>
+          <a:p>
+            <a:r>
+              <a:rPr lang="en-US" dirty="0" err="1"/>
+              <a:t>Nextflow</a:t>
+            </a:r>
+            <a:r>
+              <a:rPr lang="en-US" dirty="0"/>
+              <a:t> workflow </a:t>
+            </a:r>
+            <a:endParaRPr lang="LID4096" dirty="0"/>
+          </a:p>
+        </p:txBody>
+      </p:sp>
+      <p:sp>
+        <p:nvSpPr>
+          <p:cNvPr id="3" name="Slide Number Placeholder 2">
+            <a:extLst>
+              <a:ext uri="{FF2B5EF4-FFF2-40B4-BE49-F238E27FC236}">
+                <a16:creationId xmlns:a16="http://schemas.microsoft.com/office/drawing/2014/main" id="{740AAFD0-2C2C-0BE9-A652-AC2BCA89A5F6}"/>
+              </a:ext>
+            </a:extLst>
+          </p:cNvPr>
+          <p:cNvSpPr>
+            <a:spLocks noGrp="1"/>
+          </p:cNvSpPr>
+          <p:nvPr>
+            <p:ph type="sldNum" sz="quarter" idx="12"/>
+          </p:nvPr>
+        </p:nvSpPr>
+        <p:spPr/>
+        <p:txBody>
+          <a:bodyPr/>
+          <a:lstStyle/>
+          <a:p>
+            <a:fld id="{9C7CE217-4467-4B8D-A735-B008FA7C4816}" type="slidenum">
+              <a:rPr lang="LID4096" smtClean="0"/>
+              <a:t>56</a:t>
+            </a:fld>
+            <a:endParaRPr lang="LID4096"/>
+          </a:p>
+        </p:txBody>
+      </p:sp>
+      <p:grpSp>
+        <p:nvGrpSpPr>
+          <p:cNvPr id="4" name="Group 3">
+            <a:extLst>
+              <a:ext uri="{FF2B5EF4-FFF2-40B4-BE49-F238E27FC236}">
+                <a16:creationId xmlns:a16="http://schemas.microsoft.com/office/drawing/2014/main" id="{C658D3C4-5594-5389-CB0F-975CF7072244}"/>
+              </a:ext>
+            </a:extLst>
+          </p:cNvPr>
+          <p:cNvGrpSpPr/>
+          <p:nvPr/>
+        </p:nvGrpSpPr>
+        <p:grpSpPr>
+          <a:xfrm>
+            <a:off x="696684" y="4190907"/>
+            <a:ext cx="10134149" cy="2585323"/>
+            <a:chOff x="-1815414" y="3967896"/>
+            <a:chExt cx="10134149" cy="2585323"/>
+          </a:xfrm>
+        </p:grpSpPr>
+        <p:sp>
+          <p:nvSpPr>
+            <p:cNvPr id="5" name="TextBox 3">
+              <a:extLst>
+                <a:ext uri="{FF2B5EF4-FFF2-40B4-BE49-F238E27FC236}">
+                  <a16:creationId xmlns:a16="http://schemas.microsoft.com/office/drawing/2014/main" id="{2A4C9305-32D0-D764-A514-473FA264C3D7}"/>
+                </a:ext>
+              </a:extLst>
+            </p:cNvPr>
+            <p:cNvSpPr txBox="1">
+              <a:spLocks noChangeArrowheads="1"/>
+            </p:cNvSpPr>
+            <p:nvPr/>
+          </p:nvSpPr>
+          <p:spPr bwMode="auto">
+            <a:xfrm>
+              <a:off x="-1815414" y="3967896"/>
+              <a:ext cx="10134149" cy="2585323"/>
+            </a:xfrm>
+            <a:prstGeom prst="rect">
+              <a:avLst/>
+            </a:prstGeom>
+            <a:solidFill>
+              <a:schemeClr val="bg1">
+                <a:lumMod val="85000"/>
+              </a:schemeClr>
+            </a:solidFill>
+            <a:ln w="9525">
+              <a:solidFill>
+                <a:schemeClr val="tx1"/>
+              </a:solidFill>
+              <a:miter lim="800000"/>
+              <a:headEnd/>
+              <a:tailEnd/>
+            </a:ln>
+          </p:spPr>
+          <p:txBody>
+            <a:bodyPr wrap="square">
+              <a:spAutoFit/>
+            </a:bodyPr>
+            <a:lstStyle>
+              <a:lvl1pPr eaLnBrk="0" hangingPunct="0">
+                <a:defRPr>
+                  <a:solidFill>
+                    <a:schemeClr val="tx1"/>
+                  </a:solidFill>
+                  <a:latin typeface="Arial" charset="0"/>
+                  <a:cs typeface="Arial" charset="0"/>
+                </a:defRPr>
+              </a:lvl1pPr>
+              <a:lvl2pPr marL="742950" indent="-285750" eaLnBrk="0" hangingPunct="0">
+                <a:defRPr>
+                  <a:solidFill>
+                    <a:schemeClr val="tx1"/>
+                  </a:solidFill>
+                  <a:latin typeface="Arial" charset="0"/>
+                  <a:cs typeface="Arial" charset="0"/>
+                </a:defRPr>
+              </a:lvl2pPr>
+              <a:lvl3pPr marL="1143000" indent="-228600" eaLnBrk="0" hangingPunct="0">
+                <a:defRPr>
+                  <a:solidFill>
+                    <a:schemeClr val="tx1"/>
+                  </a:solidFill>
+                  <a:latin typeface="Arial" charset="0"/>
+                  <a:cs typeface="Arial" charset="0"/>
+                </a:defRPr>
+              </a:lvl3pPr>
+              <a:lvl4pPr marL="1600200" indent="-228600" eaLnBrk="0" hangingPunct="0">
+                <a:defRPr>
+                  <a:solidFill>
+                    <a:schemeClr val="tx1"/>
+                  </a:solidFill>
+                  <a:latin typeface="Arial" charset="0"/>
+                  <a:cs typeface="Arial" charset="0"/>
+                </a:defRPr>
+              </a:lvl4pPr>
+              <a:lvl5pPr marL="2057400" indent="-228600" eaLnBrk="0" hangingPunct="0">
+                <a:defRPr>
+                  <a:solidFill>
+                    <a:schemeClr val="tx1"/>
+                  </a:solidFill>
+                  <a:latin typeface="Arial" charset="0"/>
+                  <a:cs typeface="Arial" charset="0"/>
+                </a:defRPr>
+              </a:lvl5pPr>
+              <a:lvl6pPr marL="2514600" indent="-228600" eaLnBrk="0" fontAlgn="base" hangingPunct="0">
+                <a:spcBef>
+                  <a:spcPct val="0"/>
+                </a:spcBef>
+                <a:spcAft>
+                  <a:spcPct val="0"/>
+                </a:spcAft>
+                <a:defRPr>
+                  <a:solidFill>
+                    <a:schemeClr val="tx1"/>
+                  </a:solidFill>
+                  <a:latin typeface="Arial" charset="0"/>
+                  <a:cs typeface="Arial" charset="0"/>
+                </a:defRPr>
+              </a:lvl6pPr>
+              <a:lvl7pPr marL="2971800" indent="-228600" eaLnBrk="0" fontAlgn="base" hangingPunct="0">
+                <a:spcBef>
+                  <a:spcPct val="0"/>
+                </a:spcBef>
+                <a:spcAft>
+                  <a:spcPct val="0"/>
+                </a:spcAft>
+                <a:defRPr>
+                  <a:solidFill>
+                    <a:schemeClr val="tx1"/>
+                  </a:solidFill>
+                  <a:latin typeface="Arial" charset="0"/>
+                  <a:cs typeface="Arial" charset="0"/>
+                </a:defRPr>
+              </a:lvl7pPr>
+              <a:lvl8pPr marL="3429000" indent="-228600" eaLnBrk="0" fontAlgn="base" hangingPunct="0">
+                <a:spcBef>
+                  <a:spcPct val="0"/>
+                </a:spcBef>
+                <a:spcAft>
+                  <a:spcPct val="0"/>
+                </a:spcAft>
+                <a:defRPr>
+                  <a:solidFill>
+                    <a:schemeClr val="tx1"/>
+                  </a:solidFill>
+                  <a:latin typeface="Arial" charset="0"/>
+                  <a:cs typeface="Arial" charset="0"/>
+                </a:defRPr>
+              </a:lvl8pPr>
+              <a:lvl9pPr marL="3886200" indent="-228600" eaLnBrk="0" fontAlgn="base" hangingPunct="0">
+                <a:spcBef>
+                  <a:spcPct val="0"/>
+                </a:spcBef>
+                <a:spcAft>
+                  <a:spcPct val="0"/>
+                </a:spcAft>
+                <a:defRPr>
+                  <a:solidFill>
+                    <a:schemeClr val="tx1"/>
+                  </a:solidFill>
+                  <a:latin typeface="Arial" charset="0"/>
+                  <a:cs typeface="Arial" charset="0"/>
+                </a:defRPr>
+              </a:lvl9pPr>
+            </a:lstStyle>
+            <a:p>
+              <a:pPr eaLnBrk="1" hangingPunct="1"/>
+              <a:r>
+                <a:rPr lang="en-US" dirty="0">
+                  <a:latin typeface="Courier New" pitchFamily="49" charset="0"/>
+                  <a:cs typeface="Courier New" pitchFamily="49" charset="0"/>
+                  <a:sym typeface="Symbol" panose="05050102010706020507" pitchFamily="18" charset="2"/>
+                </a:rPr>
+                <a:t></a:t>
+              </a:r>
+            </a:p>
+            <a:p>
+              <a:pPr eaLnBrk="1" hangingPunct="1"/>
+              <a:r>
+                <a:rPr lang="en-US" dirty="0">
+                  <a:latin typeface="Courier New" pitchFamily="49" charset="0"/>
+                  <a:cs typeface="Courier New" pitchFamily="49" charset="0"/>
+                  <a:sym typeface="Symbol" panose="05050102010706020507" pitchFamily="18" charset="2"/>
+                </a:rPr>
+                <a:t>workflow {</a:t>
+              </a:r>
+            </a:p>
+            <a:p>
+              <a:pPr eaLnBrk="1" hangingPunct="1"/>
+              <a:r>
+                <a:rPr lang="en-US" dirty="0">
+                  <a:latin typeface="Courier New" pitchFamily="49" charset="0"/>
+                  <a:cs typeface="Courier New" pitchFamily="49" charset="0"/>
+                  <a:sym typeface="Symbol" panose="05050102010706020507" pitchFamily="18" charset="2"/>
+                </a:rPr>
+                <a:t>    </a:t>
+              </a:r>
+              <a:r>
+                <a:rPr lang="en-US" dirty="0" err="1">
+                  <a:latin typeface="Courier New" pitchFamily="49" charset="0"/>
+                  <a:cs typeface="Courier New" pitchFamily="49" charset="0"/>
+                  <a:sym typeface="Symbol" panose="05050102010706020507" pitchFamily="18" charset="2"/>
+                </a:rPr>
+                <a:t>environment_channel</a:t>
+              </a:r>
+              <a:r>
+                <a:rPr lang="en-US" dirty="0">
+                  <a:latin typeface="Courier New" pitchFamily="49" charset="0"/>
+                  <a:cs typeface="Courier New" pitchFamily="49" charset="0"/>
+                  <a:sym typeface="Symbol" panose="05050102010706020507" pitchFamily="18" charset="2"/>
+                </a:rPr>
+                <a:t> = </a:t>
+              </a:r>
+              <a:r>
+                <a:rPr lang="en-US" dirty="0" err="1">
+                  <a:latin typeface="Courier New" pitchFamily="49" charset="0"/>
+                  <a:cs typeface="Courier New" pitchFamily="49" charset="0"/>
+                  <a:sym typeface="Symbol" panose="05050102010706020507" pitchFamily="18" charset="2"/>
+                </a:rPr>
+                <a:t>CreateEnvironment</a:t>
+              </a:r>
+              <a:r>
+                <a:rPr lang="en-US" dirty="0">
+                  <a:latin typeface="Courier New" pitchFamily="49" charset="0"/>
+                  <a:cs typeface="Courier New" pitchFamily="49" charset="0"/>
+                  <a:sym typeface="Symbol" panose="05050102010706020507" pitchFamily="18" charset="2"/>
+                </a:rPr>
+                <a:t>()</a:t>
+              </a:r>
+            </a:p>
+            <a:p>
+              <a:pPr eaLnBrk="1" hangingPunct="1"/>
+              <a:r>
+                <a:rPr lang="en-US" dirty="0">
+                  <a:latin typeface="Courier New" pitchFamily="49" charset="0"/>
+                  <a:cs typeface="Courier New" pitchFamily="49" charset="0"/>
+                  <a:sym typeface="Symbol" panose="05050102010706020507" pitchFamily="18" charset="2"/>
+                </a:rPr>
+                <a:t>    </a:t>
+              </a:r>
+              <a:r>
+                <a:rPr lang="en-US" dirty="0" err="1">
+                  <a:latin typeface="Courier New" pitchFamily="49" charset="0"/>
+                  <a:cs typeface="Courier New" pitchFamily="49" charset="0"/>
+                  <a:sym typeface="Symbol" panose="05050102010706020507" pitchFamily="18" charset="2"/>
+                </a:rPr>
+                <a:t>parameter_channel</a:t>
+              </a:r>
+              <a:r>
+                <a:rPr lang="en-US" dirty="0">
+                  <a:latin typeface="Courier New" pitchFamily="49" charset="0"/>
+                  <a:cs typeface="Courier New" pitchFamily="49" charset="0"/>
+                  <a:sym typeface="Symbol" panose="05050102010706020507" pitchFamily="18" charset="2"/>
+                </a:rPr>
+                <a:t> = </a:t>
+              </a:r>
+              <a:r>
+                <a:rPr lang="en-US" dirty="0" err="1">
+                  <a:latin typeface="Courier New" pitchFamily="49" charset="0"/>
+                  <a:cs typeface="Courier New" pitchFamily="49" charset="0"/>
+                  <a:sym typeface="Symbol" panose="05050102010706020507" pitchFamily="18" charset="2"/>
+                </a:rPr>
+                <a:t>channel.of</a:t>
+              </a:r>
+              <a:r>
+                <a:rPr lang="en-US" dirty="0">
+                  <a:latin typeface="Courier New" pitchFamily="49" charset="0"/>
+                  <a:cs typeface="Courier New" pitchFamily="49" charset="0"/>
+                  <a:sym typeface="Symbol" panose="05050102010706020507" pitchFamily="18" charset="2"/>
+                </a:rPr>
+                <a:t>(</a:t>
+              </a:r>
+              <a:r>
+                <a:rPr lang="en-US" dirty="0" err="1">
+                  <a:latin typeface="Courier New" pitchFamily="49" charset="0"/>
+                  <a:cs typeface="Courier New" pitchFamily="49" charset="0"/>
+                  <a:sym typeface="Symbol" panose="05050102010706020507" pitchFamily="18" charset="2"/>
+                </a:rPr>
+                <a:t>params.nr_points</a:t>
+              </a:r>
+              <a:r>
+                <a:rPr lang="en-US" dirty="0">
+                  <a:latin typeface="Courier New" pitchFamily="49" charset="0"/>
+                  <a:cs typeface="Courier New" pitchFamily="49" charset="0"/>
+                  <a:sym typeface="Symbol" panose="05050102010706020507" pitchFamily="18" charset="2"/>
+                </a:rPr>
+                <a:t>)</a:t>
+              </a:r>
+            </a:p>
+            <a:p>
+              <a:pPr eaLnBrk="1" hangingPunct="1"/>
+              <a:r>
+                <a:rPr lang="en-US" dirty="0">
+                  <a:latin typeface="Courier New" pitchFamily="49" charset="0"/>
+                  <a:cs typeface="Courier New" pitchFamily="49" charset="0"/>
+                  <a:sym typeface="Symbol" panose="05050102010706020507" pitchFamily="18" charset="2"/>
+                </a:rPr>
+                <a:t>    </a:t>
+              </a:r>
+              <a:r>
+                <a:rPr lang="en-US" dirty="0" err="1">
+                  <a:latin typeface="Courier New" pitchFamily="49" charset="0"/>
+                  <a:cs typeface="Courier New" pitchFamily="49" charset="0"/>
+                  <a:sym typeface="Symbol" panose="05050102010706020507" pitchFamily="18" charset="2"/>
+                </a:rPr>
+                <a:t>create_points_channel</a:t>
+              </a:r>
+              <a:r>
+                <a:rPr lang="en-US" dirty="0">
+                  <a:latin typeface="Courier New" pitchFamily="49" charset="0"/>
+                  <a:cs typeface="Courier New" pitchFamily="49" charset="0"/>
+                  <a:sym typeface="Symbol" panose="05050102010706020507" pitchFamily="18" charset="2"/>
+                </a:rPr>
+                <a:t> = </a:t>
+              </a:r>
+              <a:r>
+                <a:rPr lang="en-US" dirty="0" err="1">
+                  <a:latin typeface="Courier New" pitchFamily="49" charset="0"/>
+                  <a:cs typeface="Courier New" pitchFamily="49" charset="0"/>
+                  <a:sym typeface="Symbol" panose="05050102010706020507" pitchFamily="18" charset="2"/>
+                </a:rPr>
+                <a:t>CreatePoints</a:t>
+              </a:r>
+              <a:r>
+                <a:rPr lang="en-US" dirty="0">
+                  <a:latin typeface="Courier New" pitchFamily="49" charset="0"/>
+                  <a:cs typeface="Courier New" pitchFamily="49" charset="0"/>
+                  <a:sym typeface="Symbol" panose="05050102010706020507" pitchFamily="18" charset="2"/>
+                </a:rPr>
+                <a:t>(</a:t>
+              </a:r>
+              <a:r>
+                <a:rPr lang="en-US" dirty="0" err="1">
+                  <a:latin typeface="Courier New" pitchFamily="49" charset="0"/>
+                  <a:cs typeface="Courier New" pitchFamily="49" charset="0"/>
+                  <a:sym typeface="Symbol" panose="05050102010706020507" pitchFamily="18" charset="2"/>
+                </a:rPr>
+                <a:t>parameter_channel</a:t>
+              </a:r>
+              <a:r>
+                <a:rPr lang="en-US" dirty="0">
+                  <a:latin typeface="Courier New" pitchFamily="49" charset="0"/>
+                  <a:cs typeface="Courier New" pitchFamily="49" charset="0"/>
+                  <a:sym typeface="Symbol" panose="05050102010706020507" pitchFamily="18" charset="2"/>
+                </a:rPr>
+                <a:t>)</a:t>
+              </a:r>
+            </a:p>
+            <a:p>
+              <a:pPr eaLnBrk="1" hangingPunct="1"/>
+              <a:r>
+                <a:rPr lang="en-US" dirty="0">
+                  <a:latin typeface="Courier New" pitchFamily="49" charset="0"/>
+                  <a:cs typeface="Courier New" pitchFamily="49" charset="0"/>
+                  <a:sym typeface="Symbol" panose="05050102010706020507" pitchFamily="18" charset="2"/>
+                </a:rPr>
+                <a:t>    </a:t>
+              </a:r>
+              <a:r>
+                <a:rPr lang="en-US" dirty="0" err="1">
+                  <a:latin typeface="Courier New" pitchFamily="49" charset="0"/>
+                  <a:cs typeface="Courier New" pitchFamily="49" charset="0"/>
+                  <a:sym typeface="Symbol" panose="05050102010706020507" pitchFamily="18" charset="2"/>
+                </a:rPr>
+                <a:t>compute_distances_channel</a:t>
+              </a:r>
+              <a:r>
+                <a:rPr lang="en-US" dirty="0">
+                  <a:latin typeface="Courier New" pitchFamily="49" charset="0"/>
+                  <a:cs typeface="Courier New" pitchFamily="49" charset="0"/>
+                  <a:sym typeface="Symbol" panose="05050102010706020507" pitchFamily="18" charset="2"/>
+                </a:rPr>
+                <a:t> = </a:t>
+              </a:r>
+              <a:r>
+                <a:rPr lang="en-US" dirty="0" err="1">
+                  <a:latin typeface="Courier New" pitchFamily="49" charset="0"/>
+                  <a:cs typeface="Courier New" pitchFamily="49" charset="0"/>
+                  <a:sym typeface="Symbol" panose="05050102010706020507" pitchFamily="18" charset="2"/>
+                </a:rPr>
+                <a:t>ComputeDistances</a:t>
+              </a:r>
+              <a:r>
+                <a:rPr lang="en-US" dirty="0">
+                  <a:latin typeface="Courier New" pitchFamily="49" charset="0"/>
+                  <a:cs typeface="Courier New" pitchFamily="49" charset="0"/>
+                  <a:sym typeface="Symbol" panose="05050102010706020507" pitchFamily="18" charset="2"/>
+                </a:rPr>
+                <a:t>(</a:t>
+              </a:r>
+              <a:r>
+                <a:rPr lang="en-US" dirty="0" err="1">
+                  <a:latin typeface="Courier New" pitchFamily="49" charset="0"/>
+                  <a:cs typeface="Courier New" pitchFamily="49" charset="0"/>
+                  <a:sym typeface="Symbol" panose="05050102010706020507" pitchFamily="18" charset="2"/>
+                </a:rPr>
+                <a:t>environment_channel</a:t>
+              </a:r>
+              <a:r>
+                <a:rPr lang="en-US" dirty="0">
+                  <a:latin typeface="Courier New" pitchFamily="49" charset="0"/>
+                  <a:cs typeface="Courier New" pitchFamily="49" charset="0"/>
+                  <a:sym typeface="Symbol" panose="05050102010706020507" pitchFamily="18" charset="2"/>
+                </a:rPr>
+                <a:t>,</a:t>
+              </a:r>
+            </a:p>
+            <a:p>
+              <a:pPr eaLnBrk="1" hangingPunct="1"/>
+              <a:r>
+                <a:rPr lang="en-US" dirty="0">
+                  <a:latin typeface="Courier New" pitchFamily="49" charset="0"/>
+                  <a:cs typeface="Courier New" pitchFamily="49" charset="0"/>
+                  <a:sym typeface="Symbol" panose="05050102010706020507" pitchFamily="18" charset="2"/>
+                </a:rPr>
+                <a:t>                                                 </a:t>
+              </a:r>
+              <a:r>
+                <a:rPr lang="en-US" dirty="0" err="1">
+                  <a:latin typeface="Courier New" pitchFamily="49" charset="0"/>
+                  <a:cs typeface="Courier New" pitchFamily="49" charset="0"/>
+                  <a:sym typeface="Symbol" panose="05050102010706020507" pitchFamily="18" charset="2"/>
+                </a:rPr>
+                <a:t>create_points_channel</a:t>
+              </a:r>
+              <a:r>
+                <a:rPr lang="en-US" dirty="0">
+                  <a:latin typeface="Courier New" pitchFamily="49" charset="0"/>
+                  <a:cs typeface="Courier New" pitchFamily="49" charset="0"/>
+                  <a:sym typeface="Symbol" panose="05050102010706020507" pitchFamily="18" charset="2"/>
+                </a:rPr>
+                <a:t>)</a:t>
+              </a:r>
+            </a:p>
+            <a:p>
+              <a:pPr eaLnBrk="1" hangingPunct="1"/>
+              <a:r>
+                <a:rPr lang="en-US" dirty="0">
+                  <a:latin typeface="Courier New" pitchFamily="49" charset="0"/>
+                  <a:cs typeface="Courier New" pitchFamily="49" charset="0"/>
+                  <a:sym typeface="Symbol" panose="05050102010706020507" pitchFamily="18" charset="2"/>
+                </a:rPr>
+                <a:t>    </a:t>
+              </a:r>
+              <a:r>
+                <a:rPr lang="en-US" dirty="0" err="1">
+                  <a:latin typeface="Courier New" pitchFamily="49" charset="0"/>
+                  <a:cs typeface="Courier New" pitchFamily="49" charset="0"/>
+                  <a:sym typeface="Symbol" panose="05050102010706020507" pitchFamily="18" charset="2"/>
+                </a:rPr>
+                <a:t>ComputeDistribution</a:t>
+              </a:r>
+              <a:r>
+                <a:rPr lang="en-US" dirty="0">
+                  <a:latin typeface="Courier New" pitchFamily="49" charset="0"/>
+                  <a:cs typeface="Courier New" pitchFamily="49" charset="0"/>
+                  <a:sym typeface="Symbol" panose="05050102010706020507" pitchFamily="18" charset="2"/>
+                </a:rPr>
+                <a:t>(</a:t>
+              </a:r>
+              <a:r>
+                <a:rPr lang="en-US" dirty="0" err="1">
+                  <a:latin typeface="Courier New" pitchFamily="49" charset="0"/>
+                  <a:cs typeface="Courier New" pitchFamily="49" charset="0"/>
+                  <a:sym typeface="Symbol" panose="05050102010706020507" pitchFamily="18" charset="2"/>
+                </a:rPr>
+                <a:t>compute_distances_channel</a:t>
+              </a:r>
+              <a:r>
+                <a:rPr lang="en-US" dirty="0">
+                  <a:latin typeface="Courier New" pitchFamily="49" charset="0"/>
+                  <a:cs typeface="Courier New" pitchFamily="49" charset="0"/>
+                  <a:sym typeface="Symbol" panose="05050102010706020507" pitchFamily="18" charset="2"/>
+                </a:rPr>
+                <a:t>).view()</a:t>
+              </a:r>
+            </a:p>
+            <a:p>
+              <a:pPr eaLnBrk="1" hangingPunct="1"/>
+              <a:r>
+                <a:rPr lang="en-US" dirty="0">
+                  <a:latin typeface="Courier New" pitchFamily="49" charset="0"/>
+                  <a:cs typeface="Courier New" pitchFamily="49" charset="0"/>
+                  <a:sym typeface="Symbol" panose="05050102010706020507" pitchFamily="18" charset="2"/>
+                </a:rPr>
+                <a:t>}</a:t>
+              </a:r>
+              <a:endParaRPr lang="en-US" b="1" dirty="0">
+                <a:solidFill>
+                  <a:srgbClr val="C00000"/>
+                </a:solidFill>
+                <a:latin typeface="Courier New" panose="02070309020205020404" pitchFamily="49" charset="0"/>
+                <a:cs typeface="Courier New" panose="02070309020205020404" pitchFamily="49" charset="0"/>
+              </a:endParaRPr>
+            </a:p>
+          </p:txBody>
+        </p:sp>
+        <p:sp>
+          <p:nvSpPr>
+            <p:cNvPr id="6" name="TextBox 8">
+              <a:extLst>
+                <a:ext uri="{FF2B5EF4-FFF2-40B4-BE49-F238E27FC236}">
+                  <a16:creationId xmlns:a16="http://schemas.microsoft.com/office/drawing/2014/main" id="{1E03D6FA-F8FA-BC82-E6D7-E0E8659AED8C}"/>
+                </a:ext>
+              </a:extLst>
+            </p:cNvPr>
+            <p:cNvSpPr txBox="1">
+              <a:spLocks noChangeArrowheads="1"/>
+            </p:cNvSpPr>
+            <p:nvPr/>
+          </p:nvSpPr>
+          <p:spPr bwMode="auto">
+            <a:xfrm>
+              <a:off x="7107694" y="3967896"/>
+              <a:ext cx="1207382" cy="276999"/>
+            </a:xfrm>
+            <a:prstGeom prst="rect">
+              <a:avLst/>
+            </a:prstGeom>
+            <a:solidFill>
+              <a:srgbClr val="FFFFFF"/>
+            </a:solidFill>
+            <a:ln w="9525">
+              <a:solidFill>
+                <a:srgbClr val="000000"/>
+              </a:solidFill>
+              <a:miter lim="800000"/>
+              <a:headEnd/>
+              <a:tailEnd/>
+            </a:ln>
+          </p:spPr>
+          <p:txBody>
+            <a:bodyPr wrap="none">
+              <a:spAutoFit/>
+            </a:bodyPr>
+            <a:lstStyle>
+              <a:lvl1pPr eaLnBrk="0" hangingPunct="0">
+                <a:defRPr>
+                  <a:solidFill>
+                    <a:schemeClr val="tx1"/>
+                  </a:solidFill>
+                  <a:latin typeface="Arial" charset="0"/>
+                  <a:cs typeface="Arial" charset="0"/>
+                </a:defRPr>
+              </a:lvl1pPr>
+              <a:lvl2pPr marL="742950" indent="-285750" eaLnBrk="0" hangingPunct="0">
+                <a:defRPr>
+                  <a:solidFill>
+                    <a:schemeClr val="tx1"/>
+                  </a:solidFill>
+                  <a:latin typeface="Arial" charset="0"/>
+                  <a:cs typeface="Arial" charset="0"/>
+                </a:defRPr>
+              </a:lvl2pPr>
+              <a:lvl3pPr marL="1143000" indent="-228600" eaLnBrk="0" hangingPunct="0">
+                <a:defRPr>
+                  <a:solidFill>
+                    <a:schemeClr val="tx1"/>
+                  </a:solidFill>
+                  <a:latin typeface="Arial" charset="0"/>
+                  <a:cs typeface="Arial" charset="0"/>
+                </a:defRPr>
+              </a:lvl3pPr>
+              <a:lvl4pPr marL="1600200" indent="-228600" eaLnBrk="0" hangingPunct="0">
+                <a:defRPr>
+                  <a:solidFill>
+                    <a:schemeClr val="tx1"/>
+                  </a:solidFill>
+                  <a:latin typeface="Arial" charset="0"/>
+                  <a:cs typeface="Arial" charset="0"/>
+                </a:defRPr>
+              </a:lvl4pPr>
+              <a:lvl5pPr marL="2057400" indent="-228600" eaLnBrk="0" hangingPunct="0">
+                <a:defRPr>
+                  <a:solidFill>
+                    <a:schemeClr val="tx1"/>
+                  </a:solidFill>
+                  <a:latin typeface="Arial" charset="0"/>
+                  <a:cs typeface="Arial" charset="0"/>
+                </a:defRPr>
+              </a:lvl5pPr>
+              <a:lvl6pPr marL="2514600" indent="-228600" eaLnBrk="0" fontAlgn="base" hangingPunct="0">
+                <a:spcBef>
+                  <a:spcPct val="0"/>
+                </a:spcBef>
+                <a:spcAft>
+                  <a:spcPct val="0"/>
+                </a:spcAft>
+                <a:defRPr>
+                  <a:solidFill>
+                    <a:schemeClr val="tx1"/>
+                  </a:solidFill>
+                  <a:latin typeface="Arial" charset="0"/>
+                  <a:cs typeface="Arial" charset="0"/>
+                </a:defRPr>
+              </a:lvl6pPr>
+              <a:lvl7pPr marL="2971800" indent="-228600" eaLnBrk="0" fontAlgn="base" hangingPunct="0">
+                <a:spcBef>
+                  <a:spcPct val="0"/>
+                </a:spcBef>
+                <a:spcAft>
+                  <a:spcPct val="0"/>
+                </a:spcAft>
+                <a:defRPr>
+                  <a:solidFill>
+                    <a:schemeClr val="tx1"/>
+                  </a:solidFill>
+                  <a:latin typeface="Arial" charset="0"/>
+                  <a:cs typeface="Arial" charset="0"/>
+                </a:defRPr>
+              </a:lvl7pPr>
+              <a:lvl8pPr marL="3429000" indent="-228600" eaLnBrk="0" fontAlgn="base" hangingPunct="0">
+                <a:spcBef>
+                  <a:spcPct val="0"/>
+                </a:spcBef>
+                <a:spcAft>
+                  <a:spcPct val="0"/>
+                </a:spcAft>
+                <a:defRPr>
+                  <a:solidFill>
+                    <a:schemeClr val="tx1"/>
+                  </a:solidFill>
+                  <a:latin typeface="Arial" charset="0"/>
+                  <a:cs typeface="Arial" charset="0"/>
+                </a:defRPr>
+              </a:lvl8pPr>
+              <a:lvl9pPr marL="3886200" indent="-228600" eaLnBrk="0" fontAlgn="base" hangingPunct="0">
+                <a:spcBef>
+                  <a:spcPct val="0"/>
+                </a:spcBef>
+                <a:spcAft>
+                  <a:spcPct val="0"/>
+                </a:spcAft>
+                <a:defRPr>
+                  <a:solidFill>
+                    <a:schemeClr val="tx1"/>
+                  </a:solidFill>
+                  <a:latin typeface="Arial" charset="0"/>
+                  <a:cs typeface="Arial" charset="0"/>
+                </a:defRPr>
+              </a:lvl9pPr>
+            </a:lstStyle>
+            <a:p>
+              <a:pPr eaLnBrk="1" hangingPunct="1"/>
+              <a:r>
+                <a:rPr lang="en-US" sz="1200" b="1" dirty="0">
+                  <a:latin typeface="Courier New" panose="02070309020205020404" pitchFamily="49" charset="0"/>
+                  <a:cs typeface="Courier New" panose="02070309020205020404" pitchFamily="49" charset="0"/>
+                </a:rPr>
+                <a:t>workflow.nf</a:t>
+              </a:r>
+              <a:endParaRPr lang="nl-BE" sz="1200" b="1" dirty="0">
+                <a:latin typeface="Courier New" panose="02070309020205020404" pitchFamily="49" charset="0"/>
+                <a:cs typeface="Courier New" panose="02070309020205020404" pitchFamily="49" charset="0"/>
+              </a:endParaRPr>
+            </a:p>
+          </p:txBody>
+        </p:sp>
+      </p:grpSp>
+      <p:grpSp>
+        <p:nvGrpSpPr>
+          <p:cNvPr id="15" name="Group 14">
+            <a:extLst>
+              <a:ext uri="{FF2B5EF4-FFF2-40B4-BE49-F238E27FC236}">
+                <a16:creationId xmlns:a16="http://schemas.microsoft.com/office/drawing/2014/main" id="{7B0816EB-FAE6-E2F1-4104-197C7C6FC6FD}"/>
+              </a:ext>
+            </a:extLst>
+          </p:cNvPr>
+          <p:cNvGrpSpPr/>
+          <p:nvPr/>
+        </p:nvGrpSpPr>
+        <p:grpSpPr>
+          <a:xfrm>
+            <a:off x="1475013" y="1431568"/>
+            <a:ext cx="8327573" cy="2471050"/>
+            <a:chOff x="1932213" y="1594016"/>
+            <a:chExt cx="8327573" cy="2471050"/>
+          </a:xfrm>
+        </p:grpSpPr>
+        <p:sp>
+          <p:nvSpPr>
+            <p:cNvPr id="7" name="Rectangle: Rounded Corners 6">
+              <a:extLst>
+                <a:ext uri="{FF2B5EF4-FFF2-40B4-BE49-F238E27FC236}">
+                  <a16:creationId xmlns:a16="http://schemas.microsoft.com/office/drawing/2014/main" id="{B576FD1C-1B63-F40F-BD11-78C5CC323A8A}"/>
+                </a:ext>
+              </a:extLst>
+            </p:cNvPr>
+            <p:cNvSpPr/>
+            <p:nvPr/>
+          </p:nvSpPr>
+          <p:spPr>
+            <a:xfrm>
+              <a:off x="1932213" y="1594016"/>
+              <a:ext cx="1687286" cy="914400"/>
+            </a:xfrm>
+            <a:prstGeom prst="roundRect">
+              <a:avLst/>
+            </a:prstGeom>
+          </p:spPr>
+          <p:style>
+            <a:lnRef idx="2">
+              <a:schemeClr val="accent1">
+                <a:shade val="15000"/>
+              </a:schemeClr>
+            </a:lnRef>
+            <a:fillRef idx="1">
+              <a:schemeClr val="accent1"/>
+            </a:fillRef>
+            <a:effectRef idx="0">
+              <a:schemeClr val="accent1"/>
+            </a:effectRef>
+            <a:fontRef idx="minor">
+              <a:schemeClr val="lt1"/>
+            </a:fontRef>
+          </p:style>
+          <p:txBody>
+            <a:bodyPr rtlCol="0" anchor="ctr"/>
+            <a:lstStyle/>
+            <a:p>
+              <a:pPr algn="ctr"/>
+              <a:r>
+                <a:rPr lang="en-US" dirty="0"/>
+                <a:t>Create </a:t>
+              </a:r>
+              <a:r>
+                <a:rPr lang="en-US" dirty="0" err="1"/>
+                <a:t>conda</a:t>
+              </a:r>
+              <a:r>
+                <a:rPr lang="en-US" dirty="0"/>
+                <a:t> environment</a:t>
+              </a:r>
+              <a:endParaRPr lang="LID4096" dirty="0"/>
+            </a:p>
+          </p:txBody>
+        </p:sp>
+        <p:sp>
+          <p:nvSpPr>
+            <p:cNvPr id="8" name="Rectangle: Rounded Corners 7">
+              <a:extLst>
+                <a:ext uri="{FF2B5EF4-FFF2-40B4-BE49-F238E27FC236}">
+                  <a16:creationId xmlns:a16="http://schemas.microsoft.com/office/drawing/2014/main" id="{67FEB810-418E-5C2E-27EE-8EAC613CB2A9}"/>
+                </a:ext>
+              </a:extLst>
+            </p:cNvPr>
+            <p:cNvSpPr/>
+            <p:nvPr/>
+          </p:nvSpPr>
+          <p:spPr>
+            <a:xfrm>
+              <a:off x="1932213" y="3150666"/>
+              <a:ext cx="1687286" cy="914400"/>
+            </a:xfrm>
+            <a:prstGeom prst="roundRect">
+              <a:avLst/>
+            </a:prstGeom>
+          </p:spPr>
+          <p:style>
+            <a:lnRef idx="2">
+              <a:schemeClr val="accent1">
+                <a:shade val="15000"/>
+              </a:schemeClr>
+            </a:lnRef>
+            <a:fillRef idx="1">
+              <a:schemeClr val="accent1"/>
+            </a:fillRef>
+            <a:effectRef idx="0">
+              <a:schemeClr val="accent1"/>
+            </a:effectRef>
+            <a:fontRef idx="minor">
+              <a:schemeClr val="lt1"/>
+            </a:fontRef>
+          </p:style>
+          <p:txBody>
+            <a:bodyPr rtlCol="0" anchor="ctr"/>
+            <a:lstStyle/>
+            <a:p>
+              <a:pPr algn="ctr"/>
+              <a:r>
+                <a:rPr lang="en-US" dirty="0"/>
+                <a:t>Preprocess</a:t>
+              </a:r>
+              <a:br>
+                <a:rPr lang="en-US" dirty="0"/>
+              </a:br>
+              <a:r>
+                <a:rPr lang="en-US" dirty="0"/>
+                <a:t>data</a:t>
+              </a:r>
+              <a:endParaRPr lang="LID4096" dirty="0"/>
+            </a:p>
+          </p:txBody>
+        </p:sp>
+        <p:sp>
+          <p:nvSpPr>
+            <p:cNvPr id="9" name="Rectangle: Rounded Corners 8">
+              <a:extLst>
+                <a:ext uri="{FF2B5EF4-FFF2-40B4-BE49-F238E27FC236}">
+                  <a16:creationId xmlns:a16="http://schemas.microsoft.com/office/drawing/2014/main" id="{AD2BA561-A1D7-3C42-01CF-EA19832EA2FC}"/>
+                </a:ext>
+              </a:extLst>
+            </p:cNvPr>
+            <p:cNvSpPr/>
+            <p:nvPr/>
+          </p:nvSpPr>
+          <p:spPr>
+            <a:xfrm>
+              <a:off x="5143500" y="2399556"/>
+              <a:ext cx="1687286" cy="914400"/>
+            </a:xfrm>
+            <a:prstGeom prst="roundRect">
+              <a:avLst/>
+            </a:prstGeom>
+          </p:spPr>
+          <p:style>
+            <a:lnRef idx="2">
+              <a:schemeClr val="accent1">
+                <a:shade val="15000"/>
+              </a:schemeClr>
+            </a:lnRef>
+            <a:fillRef idx="1">
+              <a:schemeClr val="accent1"/>
+            </a:fillRef>
+            <a:effectRef idx="0">
+              <a:schemeClr val="accent1"/>
+            </a:effectRef>
+            <a:fontRef idx="minor">
+              <a:schemeClr val="lt1"/>
+            </a:fontRef>
+          </p:style>
+          <p:txBody>
+            <a:bodyPr rtlCol="0" anchor="ctr"/>
+            <a:lstStyle/>
+            <a:p>
+              <a:pPr algn="ctr"/>
+              <a:r>
+                <a:rPr lang="en-US" dirty="0"/>
+                <a:t>Process</a:t>
+              </a:r>
+              <a:br>
+                <a:rPr lang="en-US" dirty="0"/>
+              </a:br>
+              <a:r>
+                <a:rPr lang="en-US" dirty="0"/>
+                <a:t>data</a:t>
+              </a:r>
+              <a:endParaRPr lang="LID4096" dirty="0"/>
+            </a:p>
+          </p:txBody>
+        </p:sp>
+        <p:sp>
+          <p:nvSpPr>
+            <p:cNvPr id="10" name="Rectangle: Rounded Corners 9">
+              <a:extLst>
+                <a:ext uri="{FF2B5EF4-FFF2-40B4-BE49-F238E27FC236}">
+                  <a16:creationId xmlns:a16="http://schemas.microsoft.com/office/drawing/2014/main" id="{8D12BD25-0E49-3986-568B-5F689BC9D188}"/>
+                </a:ext>
+              </a:extLst>
+            </p:cNvPr>
+            <p:cNvSpPr/>
+            <p:nvPr/>
+          </p:nvSpPr>
+          <p:spPr>
+            <a:xfrm>
+              <a:off x="8572500" y="2399556"/>
+              <a:ext cx="1687286" cy="914400"/>
+            </a:xfrm>
+            <a:prstGeom prst="roundRect">
+              <a:avLst/>
+            </a:prstGeom>
+          </p:spPr>
+          <p:style>
+            <a:lnRef idx="2">
+              <a:schemeClr val="accent1">
+                <a:shade val="15000"/>
+              </a:schemeClr>
+            </a:lnRef>
+            <a:fillRef idx="1">
+              <a:schemeClr val="accent1"/>
+            </a:fillRef>
+            <a:effectRef idx="0">
+              <a:schemeClr val="accent1"/>
+            </a:effectRef>
+            <a:fontRef idx="minor">
+              <a:schemeClr val="lt1"/>
+            </a:fontRef>
+          </p:style>
+          <p:txBody>
+            <a:bodyPr rtlCol="0" anchor="ctr"/>
+            <a:lstStyle/>
+            <a:p>
+              <a:pPr algn="ctr"/>
+              <a:r>
+                <a:rPr lang="en-US" dirty="0"/>
+                <a:t>Postprocess</a:t>
+              </a:r>
+              <a:br>
+                <a:rPr lang="en-US" dirty="0"/>
+              </a:br>
+              <a:r>
+                <a:rPr lang="en-US" dirty="0"/>
+                <a:t>data</a:t>
+              </a:r>
+              <a:endParaRPr lang="LID4096" dirty="0"/>
+            </a:p>
+          </p:txBody>
+        </p:sp>
+        <p:sp>
+          <p:nvSpPr>
+            <p:cNvPr id="11" name="Arrow: Right 10">
+              <a:extLst>
+                <a:ext uri="{FF2B5EF4-FFF2-40B4-BE49-F238E27FC236}">
+                  <a16:creationId xmlns:a16="http://schemas.microsoft.com/office/drawing/2014/main" id="{819FD8F2-5D24-F43F-219F-0C332C84751B}"/>
+                </a:ext>
+              </a:extLst>
+            </p:cNvPr>
+            <p:cNvSpPr/>
+            <p:nvPr/>
+          </p:nvSpPr>
+          <p:spPr>
+            <a:xfrm>
+              <a:off x="7101362" y="2595146"/>
+              <a:ext cx="1200562" cy="523220"/>
+            </a:xfrm>
+            <a:prstGeom prst="rightArrow">
+              <a:avLst/>
+            </a:prstGeom>
+          </p:spPr>
+          <p:style>
+            <a:lnRef idx="2">
+              <a:schemeClr val="accent1">
+                <a:shade val="15000"/>
+              </a:schemeClr>
+            </a:lnRef>
+            <a:fillRef idx="1">
+              <a:schemeClr val="accent1"/>
+            </a:fillRef>
+            <a:effectRef idx="0">
+              <a:schemeClr val="accent1"/>
+            </a:effectRef>
+            <a:fontRef idx="minor">
+              <a:schemeClr val="lt1"/>
+            </a:fontRef>
+          </p:style>
+          <p:txBody>
+            <a:bodyPr rtlCol="0" anchor="ctr"/>
+            <a:lstStyle/>
+            <a:p>
+              <a:pPr algn="ctr"/>
+              <a:endParaRPr lang="LID4096"/>
+            </a:p>
+          </p:txBody>
+        </p:sp>
+        <p:sp>
+          <p:nvSpPr>
+            <p:cNvPr id="12" name="Arrow: Right 11">
+              <a:extLst>
+                <a:ext uri="{FF2B5EF4-FFF2-40B4-BE49-F238E27FC236}">
+                  <a16:creationId xmlns:a16="http://schemas.microsoft.com/office/drawing/2014/main" id="{67855F3F-DA09-1793-A106-DDB1A3EE5C55}"/>
+                </a:ext>
+              </a:extLst>
+            </p:cNvPr>
+            <p:cNvSpPr/>
+            <p:nvPr/>
+          </p:nvSpPr>
+          <p:spPr>
+            <a:xfrm rot="1221803">
+              <a:off x="3781219" y="2041676"/>
+              <a:ext cx="1200562" cy="523220"/>
+            </a:xfrm>
+            <a:prstGeom prst="rightArrow">
+              <a:avLst/>
+            </a:prstGeom>
+          </p:spPr>
+          <p:style>
+            <a:lnRef idx="2">
+              <a:schemeClr val="accent1">
+                <a:shade val="15000"/>
+              </a:schemeClr>
+            </a:lnRef>
+            <a:fillRef idx="1">
+              <a:schemeClr val="accent1"/>
+            </a:fillRef>
+            <a:effectRef idx="0">
+              <a:schemeClr val="accent1"/>
+            </a:effectRef>
+            <a:fontRef idx="minor">
+              <a:schemeClr val="lt1"/>
+            </a:fontRef>
+          </p:style>
+          <p:txBody>
+            <a:bodyPr rtlCol="0" anchor="ctr"/>
+            <a:lstStyle/>
+            <a:p>
+              <a:pPr algn="ctr"/>
+              <a:endParaRPr lang="LID4096"/>
+            </a:p>
+          </p:txBody>
+        </p:sp>
+        <p:sp>
+          <p:nvSpPr>
+            <p:cNvPr id="13" name="Arrow: Right 12">
+              <a:extLst>
+                <a:ext uri="{FF2B5EF4-FFF2-40B4-BE49-F238E27FC236}">
+                  <a16:creationId xmlns:a16="http://schemas.microsoft.com/office/drawing/2014/main" id="{B5959290-F9DC-5B27-8975-6C39613CDEBA}"/>
+                </a:ext>
+              </a:extLst>
+            </p:cNvPr>
+            <p:cNvSpPr/>
+            <p:nvPr/>
+          </p:nvSpPr>
+          <p:spPr>
+            <a:xfrm rot="20378197" flipV="1">
+              <a:off x="3781220" y="3005744"/>
+              <a:ext cx="1200562" cy="523220"/>
+            </a:xfrm>
+            <a:prstGeom prst="rightArrow">
+              <a:avLst/>
+            </a:prstGeom>
+          </p:spPr>
+          <p:style>
+            <a:lnRef idx="2">
+              <a:schemeClr val="accent1">
+                <a:shade val="15000"/>
+              </a:schemeClr>
+            </a:lnRef>
+            <a:fillRef idx="1">
+              <a:schemeClr val="accent1"/>
+            </a:fillRef>
+            <a:effectRef idx="0">
+              <a:schemeClr val="accent1"/>
+            </a:effectRef>
+            <a:fontRef idx="minor">
+              <a:schemeClr val="lt1"/>
+            </a:fontRef>
+          </p:style>
+          <p:txBody>
+            <a:bodyPr rtlCol="0" anchor="ctr"/>
+            <a:lstStyle/>
+            <a:p>
+              <a:pPr algn="ctr"/>
+              <a:endParaRPr lang="LID4096"/>
+            </a:p>
+          </p:txBody>
+        </p:sp>
+      </p:grpSp>
+    </p:spTree>
+    <p:extLst>
+      <p:ext uri="{BB962C8B-B14F-4D97-AF65-F5344CB8AC3E}">
+        <p14:creationId xmlns:p14="http://schemas.microsoft.com/office/powerpoint/2010/main" val="3119811344"/>
+      </p:ext>
+    </p:extLst>
+  </p:cSld>
+  <p:clrMapOvr>
+    <a:masterClrMapping/>
+  </p:clrMapOvr>
+</p:sld>
+</file>
+
+<file path=ppt/slides/slide57.xml><?xml version="1.0" encoding="utf-8"?>
+<p:sld xmlns:a="http://schemas.openxmlformats.org/drawingml/2006/main" xmlns:r="http://schemas.openxmlformats.org/officeDocument/2006/relationships" xmlns:p="http://schemas.openxmlformats.org/presentationml/2006/main">
+  <p:cSld>
+    <p:spTree>
+      <p:nvGrpSpPr>
+        <p:cNvPr id="1" name=""/>
+        <p:cNvGrpSpPr/>
+        <p:nvPr/>
+      </p:nvGrpSpPr>
+      <p:grpSpPr>
+        <a:xfrm>
+          <a:off x="0" y="0"/>
+          <a:ext cx="0" cy="0"/>
+          <a:chOff x="0" y="0"/>
+          <a:chExt cx="0" cy="0"/>
+        </a:xfrm>
+      </p:grpSpPr>
+      <p:sp>
+        <p:nvSpPr>
+          <p:cNvPr id="2" name="Title 1">
+            <a:extLst>
+              <a:ext uri="{FF2B5EF4-FFF2-40B4-BE49-F238E27FC236}">
+                <a16:creationId xmlns:a16="http://schemas.microsoft.com/office/drawing/2014/main" id="{827C5F9B-AD9F-5DD5-286C-7AFADC355C89}"/>
+              </a:ext>
+            </a:extLst>
+          </p:cNvPr>
+          <p:cNvSpPr>
+            <a:spLocks noGrp="1"/>
+          </p:cNvSpPr>
+          <p:nvPr>
+            <p:ph type="title"/>
+          </p:nvPr>
+        </p:nvSpPr>
+        <p:spPr/>
+        <p:txBody>
+          <a:bodyPr/>
+          <a:lstStyle/>
+          <a:p>
+            <a:r>
+              <a:rPr lang="en-US" dirty="0" err="1"/>
+              <a:t>Nextflow</a:t>
+            </a:r>
+            <a:r>
+              <a:rPr lang="en-US" dirty="0"/>
+              <a:t> configuration</a:t>
+            </a:r>
+            <a:endParaRPr lang="LID4096" dirty="0"/>
+          </a:p>
+        </p:txBody>
+      </p:sp>
+      <p:sp>
+        <p:nvSpPr>
+          <p:cNvPr id="4" name="Content Placeholder 3">
+            <a:extLst>
+              <a:ext uri="{FF2B5EF4-FFF2-40B4-BE49-F238E27FC236}">
+                <a16:creationId xmlns:a16="http://schemas.microsoft.com/office/drawing/2014/main" id="{81A32282-ED96-0AA7-8B2F-A5F8D40AB7BA}"/>
+              </a:ext>
+            </a:extLst>
+          </p:cNvPr>
+          <p:cNvSpPr>
+            <a:spLocks noGrp="1"/>
+          </p:cNvSpPr>
+          <p:nvPr>
+            <p:ph idx="1"/>
+          </p:nvPr>
+        </p:nvSpPr>
+        <p:spPr/>
+        <p:txBody>
+          <a:bodyPr/>
+          <a:lstStyle/>
+          <a:p>
+            <a:r>
+              <a:rPr lang="en-US" dirty="0"/>
+              <a:t>In workflow definition</a:t>
+            </a:r>
+          </a:p>
+          <a:p>
+            <a:endParaRPr lang="en-US" dirty="0"/>
+          </a:p>
+          <a:p>
+            <a:endParaRPr lang="en-US" dirty="0"/>
+          </a:p>
+          <a:p>
+            <a:endParaRPr lang="en-US" dirty="0"/>
+          </a:p>
+          <a:p>
+            <a:r>
+              <a:rPr lang="en-US" dirty="0"/>
+              <a:t>In configuration file</a:t>
+            </a:r>
+          </a:p>
+          <a:p>
+            <a:endParaRPr lang="en-US" dirty="0"/>
+          </a:p>
+          <a:p>
+            <a:endParaRPr lang="en-US" dirty="0"/>
+          </a:p>
+          <a:p>
+            <a:r>
+              <a:rPr lang="en-US" dirty="0"/>
+              <a:t>On command line</a:t>
+            </a:r>
+            <a:endParaRPr lang="LID4096" dirty="0"/>
+          </a:p>
+        </p:txBody>
+      </p:sp>
+      <p:sp>
+        <p:nvSpPr>
+          <p:cNvPr id="3" name="Slide Number Placeholder 2">
+            <a:extLst>
+              <a:ext uri="{FF2B5EF4-FFF2-40B4-BE49-F238E27FC236}">
+                <a16:creationId xmlns:a16="http://schemas.microsoft.com/office/drawing/2014/main" id="{A3B4EB8E-FA82-26BA-D571-4DADCB91FA01}"/>
+              </a:ext>
+            </a:extLst>
+          </p:cNvPr>
+          <p:cNvSpPr>
+            <a:spLocks noGrp="1"/>
+          </p:cNvSpPr>
+          <p:nvPr>
+            <p:ph type="sldNum" sz="quarter" idx="12"/>
+          </p:nvPr>
+        </p:nvSpPr>
+        <p:spPr/>
+        <p:txBody>
+          <a:bodyPr/>
+          <a:lstStyle/>
+          <a:p>
+            <a:fld id="{9C7CE217-4467-4B8D-A735-B008FA7C4816}" type="slidenum">
+              <a:rPr lang="LID4096" smtClean="0"/>
+              <a:t>57</a:t>
+            </a:fld>
+            <a:endParaRPr lang="LID4096"/>
+          </a:p>
+        </p:txBody>
+      </p:sp>
+      <p:grpSp>
+        <p:nvGrpSpPr>
+          <p:cNvPr id="5" name="Group 4">
+            <a:extLst>
+              <a:ext uri="{FF2B5EF4-FFF2-40B4-BE49-F238E27FC236}">
+                <a16:creationId xmlns:a16="http://schemas.microsoft.com/office/drawing/2014/main" id="{A2588DAB-4D91-2FC0-E992-B4CAD1D3B442}"/>
+              </a:ext>
+            </a:extLst>
+          </p:cNvPr>
+          <p:cNvGrpSpPr/>
+          <p:nvPr/>
+        </p:nvGrpSpPr>
+        <p:grpSpPr>
+          <a:xfrm>
+            <a:off x="1219651" y="2449191"/>
+            <a:ext cx="10134149" cy="1200329"/>
+            <a:chOff x="-1815414" y="3967896"/>
+            <a:chExt cx="10134149" cy="1200329"/>
+          </a:xfrm>
+        </p:grpSpPr>
+        <p:sp>
+          <p:nvSpPr>
+            <p:cNvPr id="6" name="TextBox 3">
+              <a:extLst>
+                <a:ext uri="{FF2B5EF4-FFF2-40B4-BE49-F238E27FC236}">
+                  <a16:creationId xmlns:a16="http://schemas.microsoft.com/office/drawing/2014/main" id="{5EDA1C69-B1F9-AAA6-2FBD-0A3CAC5BD87E}"/>
+                </a:ext>
+              </a:extLst>
+            </p:cNvPr>
+            <p:cNvSpPr txBox="1">
+              <a:spLocks noChangeArrowheads="1"/>
+            </p:cNvSpPr>
+            <p:nvPr/>
+          </p:nvSpPr>
+          <p:spPr bwMode="auto">
+            <a:xfrm>
+              <a:off x="-1815414" y="3967896"/>
+              <a:ext cx="10134149" cy="1200329"/>
+            </a:xfrm>
+            <a:prstGeom prst="rect">
+              <a:avLst/>
+            </a:prstGeom>
+            <a:solidFill>
+              <a:schemeClr val="bg1">
+                <a:lumMod val="85000"/>
+              </a:schemeClr>
+            </a:solidFill>
+            <a:ln w="9525">
+              <a:solidFill>
+                <a:schemeClr val="tx1"/>
+              </a:solidFill>
+              <a:miter lim="800000"/>
+              <a:headEnd/>
+              <a:tailEnd/>
+            </a:ln>
+          </p:spPr>
+          <p:txBody>
+            <a:bodyPr wrap="square">
+              <a:spAutoFit/>
+            </a:bodyPr>
+            <a:lstStyle>
+              <a:lvl1pPr eaLnBrk="0" hangingPunct="0">
+                <a:defRPr>
+                  <a:solidFill>
+                    <a:schemeClr val="tx1"/>
+                  </a:solidFill>
+                  <a:latin typeface="Arial" charset="0"/>
+                  <a:cs typeface="Arial" charset="0"/>
+                </a:defRPr>
+              </a:lvl1pPr>
+              <a:lvl2pPr marL="742950" indent="-285750" eaLnBrk="0" hangingPunct="0">
+                <a:defRPr>
+                  <a:solidFill>
+                    <a:schemeClr val="tx1"/>
+                  </a:solidFill>
+                  <a:latin typeface="Arial" charset="0"/>
+                  <a:cs typeface="Arial" charset="0"/>
+                </a:defRPr>
+              </a:lvl2pPr>
+              <a:lvl3pPr marL="1143000" indent="-228600" eaLnBrk="0" hangingPunct="0">
+                <a:defRPr>
+                  <a:solidFill>
+                    <a:schemeClr val="tx1"/>
+                  </a:solidFill>
+                  <a:latin typeface="Arial" charset="0"/>
+                  <a:cs typeface="Arial" charset="0"/>
+                </a:defRPr>
+              </a:lvl3pPr>
+              <a:lvl4pPr marL="1600200" indent="-228600" eaLnBrk="0" hangingPunct="0">
+                <a:defRPr>
+                  <a:solidFill>
+                    <a:schemeClr val="tx1"/>
+                  </a:solidFill>
+                  <a:latin typeface="Arial" charset="0"/>
+                  <a:cs typeface="Arial" charset="0"/>
+                </a:defRPr>
+              </a:lvl4pPr>
+              <a:lvl5pPr marL="2057400" indent="-228600" eaLnBrk="0" hangingPunct="0">
+                <a:defRPr>
+                  <a:solidFill>
+                    <a:schemeClr val="tx1"/>
+                  </a:solidFill>
+                  <a:latin typeface="Arial" charset="0"/>
+                  <a:cs typeface="Arial" charset="0"/>
+                </a:defRPr>
+              </a:lvl5pPr>
+              <a:lvl6pPr marL="2514600" indent="-228600" eaLnBrk="0" fontAlgn="base" hangingPunct="0">
+                <a:spcBef>
+                  <a:spcPct val="0"/>
+                </a:spcBef>
+                <a:spcAft>
+                  <a:spcPct val="0"/>
+                </a:spcAft>
+                <a:defRPr>
+                  <a:solidFill>
+                    <a:schemeClr val="tx1"/>
+                  </a:solidFill>
+                  <a:latin typeface="Arial" charset="0"/>
+                  <a:cs typeface="Arial" charset="0"/>
+                </a:defRPr>
+              </a:lvl6pPr>
+              <a:lvl7pPr marL="2971800" indent="-228600" eaLnBrk="0" fontAlgn="base" hangingPunct="0">
+                <a:spcBef>
+                  <a:spcPct val="0"/>
+                </a:spcBef>
+                <a:spcAft>
+                  <a:spcPct val="0"/>
+                </a:spcAft>
+                <a:defRPr>
+                  <a:solidFill>
+                    <a:schemeClr val="tx1"/>
+                  </a:solidFill>
+                  <a:latin typeface="Arial" charset="0"/>
+                  <a:cs typeface="Arial" charset="0"/>
+                </a:defRPr>
+              </a:lvl7pPr>
+              <a:lvl8pPr marL="3429000" indent="-228600" eaLnBrk="0" fontAlgn="base" hangingPunct="0">
+                <a:spcBef>
+                  <a:spcPct val="0"/>
+                </a:spcBef>
+                <a:spcAft>
+                  <a:spcPct val="0"/>
+                </a:spcAft>
+                <a:defRPr>
+                  <a:solidFill>
+                    <a:schemeClr val="tx1"/>
+                  </a:solidFill>
+                  <a:latin typeface="Arial" charset="0"/>
+                  <a:cs typeface="Arial" charset="0"/>
+                </a:defRPr>
+              </a:lvl8pPr>
+              <a:lvl9pPr marL="3886200" indent="-228600" eaLnBrk="0" fontAlgn="base" hangingPunct="0">
+                <a:spcBef>
+                  <a:spcPct val="0"/>
+                </a:spcBef>
+                <a:spcAft>
+                  <a:spcPct val="0"/>
+                </a:spcAft>
+                <a:defRPr>
+                  <a:solidFill>
+                    <a:schemeClr val="tx1"/>
+                  </a:solidFill>
+                  <a:latin typeface="Arial" charset="0"/>
+                  <a:cs typeface="Arial" charset="0"/>
+                </a:defRPr>
+              </a:lvl9pPr>
+            </a:lstStyle>
+            <a:p>
+              <a:pPr eaLnBrk="1" hangingPunct="1"/>
+              <a:r>
+                <a:rPr lang="en-US" dirty="0">
+                  <a:latin typeface="Courier New" pitchFamily="49" charset="0"/>
+                  <a:cs typeface="Courier New" pitchFamily="49" charset="0"/>
+                  <a:sym typeface="Symbol" panose="05050102010706020507" pitchFamily="18" charset="2"/>
+                </a:rPr>
+                <a:t>// parameters for creating the environment</a:t>
+              </a:r>
+            </a:p>
+            <a:p>
+              <a:pPr eaLnBrk="1" hangingPunct="1"/>
+              <a:r>
+                <a:rPr lang="en-US" dirty="0" err="1">
+                  <a:latin typeface="Courier New" pitchFamily="49" charset="0"/>
+                  <a:cs typeface="Courier New" pitchFamily="49" charset="0"/>
+                  <a:sym typeface="Symbol" panose="05050102010706020507" pitchFamily="18" charset="2"/>
+                </a:rPr>
+                <a:t>params.conda_environment_name</a:t>
+              </a:r>
+              <a:r>
+                <a:rPr lang="en-US" dirty="0">
+                  <a:latin typeface="Courier New" pitchFamily="49" charset="0"/>
+                  <a:cs typeface="Courier New" pitchFamily="49" charset="0"/>
+                  <a:sym typeface="Symbol" panose="05050102010706020507" pitchFamily="18" charset="2"/>
+                </a:rPr>
+                <a:t> = '</a:t>
+              </a:r>
+              <a:r>
+                <a:rPr lang="en-US" dirty="0" err="1">
+                  <a:latin typeface="Courier New" pitchFamily="49" charset="0"/>
+                  <a:cs typeface="Courier New" pitchFamily="49" charset="0"/>
+                  <a:sym typeface="Symbol" panose="05050102010706020507" pitchFamily="18" charset="2"/>
+                </a:rPr>
+                <a:t>workflows_for_hpc</a:t>
+              </a:r>
+              <a:r>
+                <a:rPr lang="en-US" dirty="0">
+                  <a:latin typeface="Courier New" pitchFamily="49" charset="0"/>
+                  <a:cs typeface="Courier New" pitchFamily="49" charset="0"/>
+                  <a:sym typeface="Symbol" panose="05050102010706020507" pitchFamily="18" charset="2"/>
+                </a:rPr>
+                <a:t>'</a:t>
+              </a:r>
+            </a:p>
+            <a:p>
+              <a:pPr eaLnBrk="1" hangingPunct="1"/>
+              <a:r>
+                <a:rPr lang="en-US" dirty="0" err="1">
+                  <a:latin typeface="Courier New" pitchFamily="49" charset="0"/>
+                  <a:cs typeface="Courier New" pitchFamily="49" charset="0"/>
+                  <a:sym typeface="Symbol" panose="05050102010706020507" pitchFamily="18" charset="2"/>
+                </a:rPr>
+                <a:t>params.conda_init_file</a:t>
+              </a:r>
+              <a:r>
+                <a:rPr lang="en-US" dirty="0">
+                  <a:latin typeface="Courier New" pitchFamily="49" charset="0"/>
+                  <a:cs typeface="Courier New" pitchFamily="49" charset="0"/>
+                  <a:sym typeface="Symbol" panose="05050102010706020507" pitchFamily="18" charset="2"/>
+                </a:rPr>
+                <a:t> = 'conda_init.sh'</a:t>
+              </a:r>
+            </a:p>
+            <a:p>
+              <a:pPr eaLnBrk="1" hangingPunct="1"/>
+              <a:r>
+                <a:rPr lang="en-US" dirty="0">
+                  <a:latin typeface="Courier New" pitchFamily="49" charset="0"/>
+                  <a:cs typeface="Courier New" pitchFamily="49" charset="0"/>
+                  <a:sym typeface="Symbol" panose="05050102010706020507" pitchFamily="18" charset="2"/>
+                </a:rPr>
+                <a:t></a:t>
+              </a:r>
+            </a:p>
+          </p:txBody>
+        </p:sp>
+        <p:sp>
+          <p:nvSpPr>
+            <p:cNvPr id="7" name="TextBox 8">
+              <a:extLst>
+                <a:ext uri="{FF2B5EF4-FFF2-40B4-BE49-F238E27FC236}">
+                  <a16:creationId xmlns:a16="http://schemas.microsoft.com/office/drawing/2014/main" id="{77DB9E97-BB8B-EB14-B8A6-025AC1C7BF3A}"/>
+                </a:ext>
+              </a:extLst>
+            </p:cNvPr>
+            <p:cNvSpPr txBox="1">
+              <a:spLocks noChangeArrowheads="1"/>
+            </p:cNvSpPr>
+            <p:nvPr/>
+          </p:nvSpPr>
+          <p:spPr bwMode="auto">
+            <a:xfrm>
+              <a:off x="7107694" y="3967896"/>
+              <a:ext cx="1207382" cy="276999"/>
+            </a:xfrm>
+            <a:prstGeom prst="rect">
+              <a:avLst/>
+            </a:prstGeom>
+            <a:solidFill>
+              <a:srgbClr val="FFFFFF"/>
+            </a:solidFill>
+            <a:ln w="9525">
+              <a:solidFill>
+                <a:srgbClr val="000000"/>
+              </a:solidFill>
+              <a:miter lim="800000"/>
+              <a:headEnd/>
+              <a:tailEnd/>
+            </a:ln>
+          </p:spPr>
+          <p:txBody>
+            <a:bodyPr wrap="none">
+              <a:spAutoFit/>
+            </a:bodyPr>
+            <a:lstStyle>
+              <a:lvl1pPr eaLnBrk="0" hangingPunct="0">
+                <a:defRPr>
+                  <a:solidFill>
+                    <a:schemeClr val="tx1"/>
+                  </a:solidFill>
+                  <a:latin typeface="Arial" charset="0"/>
+                  <a:cs typeface="Arial" charset="0"/>
+                </a:defRPr>
+              </a:lvl1pPr>
+              <a:lvl2pPr marL="742950" indent="-285750" eaLnBrk="0" hangingPunct="0">
+                <a:defRPr>
+                  <a:solidFill>
+                    <a:schemeClr val="tx1"/>
+                  </a:solidFill>
+                  <a:latin typeface="Arial" charset="0"/>
+                  <a:cs typeface="Arial" charset="0"/>
+                </a:defRPr>
+              </a:lvl2pPr>
+              <a:lvl3pPr marL="1143000" indent="-228600" eaLnBrk="0" hangingPunct="0">
+                <a:defRPr>
+                  <a:solidFill>
+                    <a:schemeClr val="tx1"/>
+                  </a:solidFill>
+                  <a:latin typeface="Arial" charset="0"/>
+                  <a:cs typeface="Arial" charset="0"/>
+                </a:defRPr>
+              </a:lvl3pPr>
+              <a:lvl4pPr marL="1600200" indent="-228600" eaLnBrk="0" hangingPunct="0">
+                <a:defRPr>
+                  <a:solidFill>
+                    <a:schemeClr val="tx1"/>
+                  </a:solidFill>
+                  <a:latin typeface="Arial" charset="0"/>
+                  <a:cs typeface="Arial" charset="0"/>
+                </a:defRPr>
+              </a:lvl4pPr>
+              <a:lvl5pPr marL="2057400" indent="-228600" eaLnBrk="0" hangingPunct="0">
+                <a:defRPr>
+                  <a:solidFill>
+                    <a:schemeClr val="tx1"/>
+                  </a:solidFill>
+                  <a:latin typeface="Arial" charset="0"/>
+                  <a:cs typeface="Arial" charset="0"/>
+                </a:defRPr>
+              </a:lvl5pPr>
+              <a:lvl6pPr marL="2514600" indent="-228600" eaLnBrk="0" fontAlgn="base" hangingPunct="0">
+                <a:spcBef>
+                  <a:spcPct val="0"/>
+                </a:spcBef>
+                <a:spcAft>
+                  <a:spcPct val="0"/>
+                </a:spcAft>
+                <a:defRPr>
+                  <a:solidFill>
+                    <a:schemeClr val="tx1"/>
+                  </a:solidFill>
+                  <a:latin typeface="Arial" charset="0"/>
+                  <a:cs typeface="Arial" charset="0"/>
+                </a:defRPr>
+              </a:lvl6pPr>
+              <a:lvl7pPr marL="2971800" indent="-228600" eaLnBrk="0" fontAlgn="base" hangingPunct="0">
+                <a:spcBef>
+                  <a:spcPct val="0"/>
+                </a:spcBef>
+                <a:spcAft>
+                  <a:spcPct val="0"/>
+                </a:spcAft>
+                <a:defRPr>
+                  <a:solidFill>
+                    <a:schemeClr val="tx1"/>
+                  </a:solidFill>
+                  <a:latin typeface="Arial" charset="0"/>
+                  <a:cs typeface="Arial" charset="0"/>
+                </a:defRPr>
+              </a:lvl7pPr>
+              <a:lvl8pPr marL="3429000" indent="-228600" eaLnBrk="0" fontAlgn="base" hangingPunct="0">
+                <a:spcBef>
+                  <a:spcPct val="0"/>
+                </a:spcBef>
+                <a:spcAft>
+                  <a:spcPct val="0"/>
+                </a:spcAft>
+                <a:defRPr>
+                  <a:solidFill>
+                    <a:schemeClr val="tx1"/>
+                  </a:solidFill>
+                  <a:latin typeface="Arial" charset="0"/>
+                  <a:cs typeface="Arial" charset="0"/>
+                </a:defRPr>
+              </a:lvl8pPr>
+              <a:lvl9pPr marL="3886200" indent="-228600" eaLnBrk="0" fontAlgn="base" hangingPunct="0">
+                <a:spcBef>
+                  <a:spcPct val="0"/>
+                </a:spcBef>
+                <a:spcAft>
+                  <a:spcPct val="0"/>
+                </a:spcAft>
+                <a:defRPr>
+                  <a:solidFill>
+                    <a:schemeClr val="tx1"/>
+                  </a:solidFill>
+                  <a:latin typeface="Arial" charset="0"/>
+                  <a:cs typeface="Arial" charset="0"/>
+                </a:defRPr>
+              </a:lvl9pPr>
+            </a:lstStyle>
+            <a:p>
+              <a:pPr eaLnBrk="1" hangingPunct="1"/>
+              <a:r>
+                <a:rPr lang="en-US" sz="1200" b="1" dirty="0">
+                  <a:latin typeface="Courier New" panose="02070309020205020404" pitchFamily="49" charset="0"/>
+                  <a:cs typeface="Courier New" panose="02070309020205020404" pitchFamily="49" charset="0"/>
+                </a:rPr>
+                <a:t>workflow.nf</a:t>
+              </a:r>
+              <a:endParaRPr lang="nl-BE" sz="1200" b="1" dirty="0">
+                <a:latin typeface="Courier New" panose="02070309020205020404" pitchFamily="49" charset="0"/>
+                <a:cs typeface="Courier New" panose="02070309020205020404" pitchFamily="49" charset="0"/>
+              </a:endParaRPr>
+            </a:p>
+          </p:txBody>
+        </p:sp>
+      </p:grpSp>
+      <p:grpSp>
+        <p:nvGrpSpPr>
+          <p:cNvPr id="8" name="Group 7">
+            <a:extLst>
+              <a:ext uri="{FF2B5EF4-FFF2-40B4-BE49-F238E27FC236}">
+                <a16:creationId xmlns:a16="http://schemas.microsoft.com/office/drawing/2014/main" id="{98E44A03-FCA7-C4FC-3195-BAEE712C40D8}"/>
+              </a:ext>
+            </a:extLst>
+          </p:cNvPr>
+          <p:cNvGrpSpPr/>
+          <p:nvPr/>
+        </p:nvGrpSpPr>
+        <p:grpSpPr>
+          <a:xfrm>
+            <a:off x="1215992" y="4397984"/>
+            <a:ext cx="10134149" cy="646331"/>
+            <a:chOff x="-1815414" y="3967896"/>
+            <a:chExt cx="10134149" cy="646331"/>
+          </a:xfrm>
+        </p:grpSpPr>
+        <p:sp>
+          <p:nvSpPr>
+            <p:cNvPr id="9" name="TextBox 3">
+              <a:extLst>
+                <a:ext uri="{FF2B5EF4-FFF2-40B4-BE49-F238E27FC236}">
+                  <a16:creationId xmlns:a16="http://schemas.microsoft.com/office/drawing/2014/main" id="{E95B199D-A9E2-355E-A6C9-D5617CB876A7}"/>
+                </a:ext>
+              </a:extLst>
+            </p:cNvPr>
+            <p:cNvSpPr txBox="1">
+              <a:spLocks noChangeArrowheads="1"/>
+            </p:cNvSpPr>
+            <p:nvPr/>
+          </p:nvSpPr>
+          <p:spPr bwMode="auto">
+            <a:xfrm>
+              <a:off x="-1815414" y="3967896"/>
+              <a:ext cx="10134149" cy="646331"/>
+            </a:xfrm>
+            <a:prstGeom prst="rect">
+              <a:avLst/>
+            </a:prstGeom>
+            <a:solidFill>
+              <a:schemeClr val="bg1">
+                <a:lumMod val="85000"/>
+              </a:schemeClr>
+            </a:solidFill>
+            <a:ln w="9525">
+              <a:solidFill>
+                <a:schemeClr val="tx1"/>
+              </a:solidFill>
+              <a:miter lim="800000"/>
+              <a:headEnd/>
+              <a:tailEnd/>
+            </a:ln>
+          </p:spPr>
+          <p:txBody>
+            <a:bodyPr wrap="square">
+              <a:spAutoFit/>
+            </a:bodyPr>
+            <a:lstStyle>
+              <a:lvl1pPr eaLnBrk="0" hangingPunct="0">
+                <a:defRPr>
+                  <a:solidFill>
+                    <a:schemeClr val="tx1"/>
+                  </a:solidFill>
+                  <a:latin typeface="Arial" charset="0"/>
+                  <a:cs typeface="Arial" charset="0"/>
+                </a:defRPr>
+              </a:lvl1pPr>
+              <a:lvl2pPr marL="742950" indent="-285750" eaLnBrk="0" hangingPunct="0">
+                <a:defRPr>
+                  <a:solidFill>
+                    <a:schemeClr val="tx1"/>
+                  </a:solidFill>
+                  <a:latin typeface="Arial" charset="0"/>
+                  <a:cs typeface="Arial" charset="0"/>
+                </a:defRPr>
+              </a:lvl2pPr>
+              <a:lvl3pPr marL="1143000" indent="-228600" eaLnBrk="0" hangingPunct="0">
+                <a:defRPr>
+                  <a:solidFill>
+                    <a:schemeClr val="tx1"/>
+                  </a:solidFill>
+                  <a:latin typeface="Arial" charset="0"/>
+                  <a:cs typeface="Arial" charset="0"/>
+                </a:defRPr>
+              </a:lvl3pPr>
+              <a:lvl4pPr marL="1600200" indent="-228600" eaLnBrk="0" hangingPunct="0">
+                <a:defRPr>
+                  <a:solidFill>
+                    <a:schemeClr val="tx1"/>
+                  </a:solidFill>
+                  <a:latin typeface="Arial" charset="0"/>
+                  <a:cs typeface="Arial" charset="0"/>
+                </a:defRPr>
+              </a:lvl4pPr>
+              <a:lvl5pPr marL="2057400" indent="-228600" eaLnBrk="0" hangingPunct="0">
+                <a:defRPr>
+                  <a:solidFill>
+                    <a:schemeClr val="tx1"/>
+                  </a:solidFill>
+                  <a:latin typeface="Arial" charset="0"/>
+                  <a:cs typeface="Arial" charset="0"/>
+                </a:defRPr>
+              </a:lvl5pPr>
+              <a:lvl6pPr marL="2514600" indent="-228600" eaLnBrk="0" fontAlgn="base" hangingPunct="0">
+                <a:spcBef>
+                  <a:spcPct val="0"/>
+                </a:spcBef>
+                <a:spcAft>
+                  <a:spcPct val="0"/>
+                </a:spcAft>
+                <a:defRPr>
+                  <a:solidFill>
+                    <a:schemeClr val="tx1"/>
+                  </a:solidFill>
+                  <a:latin typeface="Arial" charset="0"/>
+                  <a:cs typeface="Arial" charset="0"/>
+                </a:defRPr>
+              </a:lvl6pPr>
+              <a:lvl7pPr marL="2971800" indent="-228600" eaLnBrk="0" fontAlgn="base" hangingPunct="0">
+                <a:spcBef>
+                  <a:spcPct val="0"/>
+                </a:spcBef>
+                <a:spcAft>
+                  <a:spcPct val="0"/>
+                </a:spcAft>
+                <a:defRPr>
+                  <a:solidFill>
+                    <a:schemeClr val="tx1"/>
+                  </a:solidFill>
+                  <a:latin typeface="Arial" charset="0"/>
+                  <a:cs typeface="Arial" charset="0"/>
+                </a:defRPr>
+              </a:lvl7pPr>
+              <a:lvl8pPr marL="3429000" indent="-228600" eaLnBrk="0" fontAlgn="base" hangingPunct="0">
+                <a:spcBef>
+                  <a:spcPct val="0"/>
+                </a:spcBef>
+                <a:spcAft>
+                  <a:spcPct val="0"/>
+                </a:spcAft>
+                <a:defRPr>
+                  <a:solidFill>
+                    <a:schemeClr val="tx1"/>
+                  </a:solidFill>
+                  <a:latin typeface="Arial" charset="0"/>
+                  <a:cs typeface="Arial" charset="0"/>
+                </a:defRPr>
+              </a:lvl8pPr>
+              <a:lvl9pPr marL="3886200" indent="-228600" eaLnBrk="0" fontAlgn="base" hangingPunct="0">
+                <a:spcBef>
+                  <a:spcPct val="0"/>
+                </a:spcBef>
+                <a:spcAft>
+                  <a:spcPct val="0"/>
+                </a:spcAft>
+                <a:defRPr>
+                  <a:solidFill>
+                    <a:schemeClr val="tx1"/>
+                  </a:solidFill>
+                  <a:latin typeface="Arial" charset="0"/>
+                  <a:cs typeface="Arial" charset="0"/>
+                </a:defRPr>
+              </a:lvl9pPr>
+            </a:lstStyle>
+            <a:p>
+              <a:pPr eaLnBrk="1" hangingPunct="1"/>
+              <a:r>
+                <a:rPr lang="en-US" dirty="0" err="1">
+                  <a:latin typeface="Courier New" pitchFamily="49" charset="0"/>
+                  <a:cs typeface="Courier New" pitchFamily="49" charset="0"/>
+                  <a:sym typeface="Symbol" panose="05050102010706020507" pitchFamily="18" charset="2"/>
+                </a:rPr>
+                <a:t>conda.enabled</a:t>
+              </a:r>
+              <a:r>
+                <a:rPr lang="en-US" dirty="0">
+                  <a:latin typeface="Courier New" pitchFamily="49" charset="0"/>
+                  <a:cs typeface="Courier New" pitchFamily="49" charset="0"/>
+                  <a:sym typeface="Symbol" panose="05050102010706020507" pitchFamily="18" charset="2"/>
+                </a:rPr>
+                <a:t> = true</a:t>
+              </a:r>
+            </a:p>
+            <a:p>
+              <a:pPr eaLnBrk="1" hangingPunct="1"/>
+              <a:r>
+                <a:rPr lang="en-US" dirty="0">
+                  <a:latin typeface="Courier New" pitchFamily="49" charset="0"/>
+                  <a:cs typeface="Courier New" pitchFamily="49" charset="0"/>
+                  <a:sym typeface="Symbol" panose="05050102010706020507" pitchFamily="18" charset="2"/>
+                </a:rPr>
+                <a:t></a:t>
+              </a:r>
+            </a:p>
+          </p:txBody>
+        </p:sp>
+        <p:sp>
+          <p:nvSpPr>
+            <p:cNvPr id="10" name="TextBox 8">
+              <a:extLst>
+                <a:ext uri="{FF2B5EF4-FFF2-40B4-BE49-F238E27FC236}">
+                  <a16:creationId xmlns:a16="http://schemas.microsoft.com/office/drawing/2014/main" id="{89FBFB57-8914-1D58-A42E-29C707B2B278}"/>
+                </a:ext>
+              </a:extLst>
+            </p:cNvPr>
+            <p:cNvSpPr txBox="1">
+              <a:spLocks noChangeArrowheads="1"/>
+            </p:cNvSpPr>
+            <p:nvPr/>
+          </p:nvSpPr>
+          <p:spPr bwMode="auto">
+            <a:xfrm>
+              <a:off x="6737580" y="3967896"/>
+              <a:ext cx="1579278" cy="276999"/>
+            </a:xfrm>
+            <a:prstGeom prst="rect">
+              <a:avLst/>
+            </a:prstGeom>
+            <a:solidFill>
+              <a:srgbClr val="FFFFFF"/>
+            </a:solidFill>
+            <a:ln w="9525">
+              <a:solidFill>
+                <a:srgbClr val="000000"/>
+              </a:solidFill>
+              <a:miter lim="800000"/>
+              <a:headEnd/>
+              <a:tailEnd/>
+            </a:ln>
+          </p:spPr>
+          <p:txBody>
+            <a:bodyPr wrap="none">
+              <a:spAutoFit/>
+            </a:bodyPr>
+            <a:lstStyle>
+              <a:lvl1pPr eaLnBrk="0" hangingPunct="0">
+                <a:defRPr>
+                  <a:solidFill>
+                    <a:schemeClr val="tx1"/>
+                  </a:solidFill>
+                  <a:latin typeface="Arial" charset="0"/>
+                  <a:cs typeface="Arial" charset="0"/>
+                </a:defRPr>
+              </a:lvl1pPr>
+              <a:lvl2pPr marL="742950" indent="-285750" eaLnBrk="0" hangingPunct="0">
+                <a:defRPr>
+                  <a:solidFill>
+                    <a:schemeClr val="tx1"/>
+                  </a:solidFill>
+                  <a:latin typeface="Arial" charset="0"/>
+                  <a:cs typeface="Arial" charset="0"/>
+                </a:defRPr>
+              </a:lvl2pPr>
+              <a:lvl3pPr marL="1143000" indent="-228600" eaLnBrk="0" hangingPunct="0">
+                <a:defRPr>
+                  <a:solidFill>
+                    <a:schemeClr val="tx1"/>
+                  </a:solidFill>
+                  <a:latin typeface="Arial" charset="0"/>
+                  <a:cs typeface="Arial" charset="0"/>
+                </a:defRPr>
+              </a:lvl3pPr>
+              <a:lvl4pPr marL="1600200" indent="-228600" eaLnBrk="0" hangingPunct="0">
+                <a:defRPr>
+                  <a:solidFill>
+                    <a:schemeClr val="tx1"/>
+                  </a:solidFill>
+                  <a:latin typeface="Arial" charset="0"/>
+                  <a:cs typeface="Arial" charset="0"/>
+                </a:defRPr>
+              </a:lvl4pPr>
+              <a:lvl5pPr marL="2057400" indent="-228600" eaLnBrk="0" hangingPunct="0">
+                <a:defRPr>
+                  <a:solidFill>
+                    <a:schemeClr val="tx1"/>
+                  </a:solidFill>
+                  <a:latin typeface="Arial" charset="0"/>
+                  <a:cs typeface="Arial" charset="0"/>
+                </a:defRPr>
+              </a:lvl5pPr>
+              <a:lvl6pPr marL="2514600" indent="-228600" eaLnBrk="0" fontAlgn="base" hangingPunct="0">
+                <a:spcBef>
+                  <a:spcPct val="0"/>
+                </a:spcBef>
+                <a:spcAft>
+                  <a:spcPct val="0"/>
+                </a:spcAft>
+                <a:defRPr>
+                  <a:solidFill>
+                    <a:schemeClr val="tx1"/>
+                  </a:solidFill>
+                  <a:latin typeface="Arial" charset="0"/>
+                  <a:cs typeface="Arial" charset="0"/>
+                </a:defRPr>
+              </a:lvl6pPr>
+              <a:lvl7pPr marL="2971800" indent="-228600" eaLnBrk="0" fontAlgn="base" hangingPunct="0">
+                <a:spcBef>
+                  <a:spcPct val="0"/>
+                </a:spcBef>
+                <a:spcAft>
+                  <a:spcPct val="0"/>
+                </a:spcAft>
+                <a:defRPr>
+                  <a:solidFill>
+                    <a:schemeClr val="tx1"/>
+                  </a:solidFill>
+                  <a:latin typeface="Arial" charset="0"/>
+                  <a:cs typeface="Arial" charset="0"/>
+                </a:defRPr>
+              </a:lvl7pPr>
+              <a:lvl8pPr marL="3429000" indent="-228600" eaLnBrk="0" fontAlgn="base" hangingPunct="0">
+                <a:spcBef>
+                  <a:spcPct val="0"/>
+                </a:spcBef>
+                <a:spcAft>
+                  <a:spcPct val="0"/>
+                </a:spcAft>
+                <a:defRPr>
+                  <a:solidFill>
+                    <a:schemeClr val="tx1"/>
+                  </a:solidFill>
+                  <a:latin typeface="Arial" charset="0"/>
+                  <a:cs typeface="Arial" charset="0"/>
+                </a:defRPr>
+              </a:lvl8pPr>
+              <a:lvl9pPr marL="3886200" indent="-228600" eaLnBrk="0" fontAlgn="base" hangingPunct="0">
+                <a:spcBef>
+                  <a:spcPct val="0"/>
+                </a:spcBef>
+                <a:spcAft>
+                  <a:spcPct val="0"/>
+                </a:spcAft>
+                <a:defRPr>
+                  <a:solidFill>
+                    <a:schemeClr val="tx1"/>
+                  </a:solidFill>
+                  <a:latin typeface="Arial" charset="0"/>
+                  <a:cs typeface="Arial" charset="0"/>
+                </a:defRPr>
+              </a:lvl9pPr>
+            </a:lstStyle>
+            <a:p>
+              <a:pPr eaLnBrk="1" hangingPunct="1"/>
+              <a:r>
+                <a:rPr lang="en-US" sz="1200" b="1" dirty="0" err="1">
+                  <a:latin typeface="Courier New" panose="02070309020205020404" pitchFamily="49" charset="0"/>
+                  <a:cs typeface="Courier New" panose="02070309020205020404" pitchFamily="49" charset="0"/>
+                </a:rPr>
+                <a:t>nextflow.config</a:t>
+              </a:r>
+              <a:endParaRPr lang="nl-BE" sz="1200" b="1" dirty="0">
+                <a:latin typeface="Courier New" panose="02070309020205020404" pitchFamily="49" charset="0"/>
+                <a:cs typeface="Courier New" panose="02070309020205020404" pitchFamily="49" charset="0"/>
+              </a:endParaRPr>
+            </a:p>
+          </p:txBody>
+        </p:sp>
+      </p:grpSp>
+      <p:sp>
+        <p:nvSpPr>
+          <p:cNvPr id="11" name="TextBox 70">
+            <a:extLst>
+              <a:ext uri="{FF2B5EF4-FFF2-40B4-BE49-F238E27FC236}">
+                <a16:creationId xmlns:a16="http://schemas.microsoft.com/office/drawing/2014/main" id="{845ECDC7-185C-60F0-45B7-144529B04B3D}"/>
+              </a:ext>
+            </a:extLst>
+          </p:cNvPr>
+          <p:cNvSpPr txBox="1">
+            <a:spLocks noChangeArrowheads="1"/>
+          </p:cNvSpPr>
+          <p:nvPr/>
+        </p:nvSpPr>
+        <p:spPr bwMode="auto">
+          <a:xfrm>
+            <a:off x="1210688" y="5894685"/>
+            <a:ext cx="10134149" cy="461665"/>
+          </a:xfrm>
+          <a:prstGeom prst="rect">
+            <a:avLst/>
+          </a:prstGeom>
+          <a:solidFill>
+            <a:schemeClr val="tx1"/>
+          </a:solidFill>
+          <a:ln>
+            <a:noFill/>
+          </a:ln>
+        </p:spPr>
+        <p:txBody>
+          <a:bodyPr wrap="square">
+            <a:spAutoFit/>
+          </a:bodyPr>
+          <a:lstStyle>
+            <a:lvl1pPr eaLnBrk="0" hangingPunct="0">
+              <a:defRPr>
+                <a:solidFill>
+                  <a:schemeClr val="tx1"/>
+                </a:solidFill>
+                <a:latin typeface="Arial" charset="0"/>
+                <a:cs typeface="Arial" charset="0"/>
+              </a:defRPr>
+            </a:lvl1pPr>
+            <a:lvl2pPr marL="742950" indent="-285750" eaLnBrk="0" hangingPunct="0">
+              <a:defRPr>
+                <a:solidFill>
+                  <a:schemeClr val="tx1"/>
+                </a:solidFill>
+                <a:latin typeface="Arial" charset="0"/>
+                <a:cs typeface="Arial" charset="0"/>
+              </a:defRPr>
+            </a:lvl2pPr>
+            <a:lvl3pPr marL="1143000" indent="-228600" eaLnBrk="0" hangingPunct="0">
+              <a:defRPr>
+                <a:solidFill>
+                  <a:schemeClr val="tx1"/>
+                </a:solidFill>
+                <a:latin typeface="Arial" charset="0"/>
+                <a:cs typeface="Arial" charset="0"/>
+              </a:defRPr>
+            </a:lvl3pPr>
+            <a:lvl4pPr marL="1600200" indent="-228600" eaLnBrk="0" hangingPunct="0">
+              <a:defRPr>
+                <a:solidFill>
+                  <a:schemeClr val="tx1"/>
+                </a:solidFill>
+                <a:latin typeface="Arial" charset="0"/>
+                <a:cs typeface="Arial" charset="0"/>
+              </a:defRPr>
+            </a:lvl4pPr>
+            <a:lvl5pPr marL="2057400" indent="-228600" eaLnBrk="0" hangingPunct="0">
+              <a:defRPr>
+                <a:solidFill>
+                  <a:schemeClr val="tx1"/>
+                </a:solidFill>
+                <a:latin typeface="Arial" charset="0"/>
+                <a:cs typeface="Arial" charset="0"/>
+              </a:defRPr>
+            </a:lvl5pPr>
+            <a:lvl6pPr marL="2514600" indent="-228600" eaLnBrk="0" fontAlgn="base" hangingPunct="0">
+              <a:spcBef>
+                <a:spcPct val="0"/>
+              </a:spcBef>
+              <a:spcAft>
+                <a:spcPct val="0"/>
+              </a:spcAft>
+              <a:defRPr>
+                <a:solidFill>
+                  <a:schemeClr val="tx1"/>
+                </a:solidFill>
+                <a:latin typeface="Arial" charset="0"/>
+                <a:cs typeface="Arial" charset="0"/>
+              </a:defRPr>
+            </a:lvl6pPr>
+            <a:lvl7pPr marL="2971800" indent="-228600" eaLnBrk="0" fontAlgn="base" hangingPunct="0">
+              <a:spcBef>
+                <a:spcPct val="0"/>
+              </a:spcBef>
+              <a:spcAft>
+                <a:spcPct val="0"/>
+              </a:spcAft>
+              <a:defRPr>
+                <a:solidFill>
+                  <a:schemeClr val="tx1"/>
+                </a:solidFill>
+                <a:latin typeface="Arial" charset="0"/>
+                <a:cs typeface="Arial" charset="0"/>
+              </a:defRPr>
+            </a:lvl7pPr>
+            <a:lvl8pPr marL="3429000" indent="-228600" eaLnBrk="0" fontAlgn="base" hangingPunct="0">
+              <a:spcBef>
+                <a:spcPct val="0"/>
+              </a:spcBef>
+              <a:spcAft>
+                <a:spcPct val="0"/>
+              </a:spcAft>
+              <a:defRPr>
+                <a:solidFill>
+                  <a:schemeClr val="tx1"/>
+                </a:solidFill>
+                <a:latin typeface="Arial" charset="0"/>
+                <a:cs typeface="Arial" charset="0"/>
+              </a:defRPr>
+            </a:lvl8pPr>
+            <a:lvl9pPr marL="3886200" indent="-228600" eaLnBrk="0" fontAlgn="base" hangingPunct="0">
+              <a:spcBef>
+                <a:spcPct val="0"/>
+              </a:spcBef>
+              <a:spcAft>
+                <a:spcPct val="0"/>
+              </a:spcAft>
+              <a:defRPr>
+                <a:solidFill>
+                  <a:schemeClr val="tx1"/>
+                </a:solidFill>
+                <a:latin typeface="Arial" charset="0"/>
+                <a:cs typeface="Arial" charset="0"/>
+              </a:defRPr>
+            </a:lvl9pPr>
+          </a:lstStyle>
+          <a:p>
+            <a:pPr eaLnBrk="1" hangingPunct="1"/>
+            <a:r>
+              <a:rPr lang="nl-BE" sz="2400" b="1" dirty="0">
+                <a:solidFill>
+                  <a:schemeClr val="bg1"/>
+                </a:solidFill>
+                <a:latin typeface="Courier New" pitchFamily="49" charset="0"/>
+                <a:cs typeface="Courier New" pitchFamily="49" charset="0"/>
+              </a:rPr>
+              <a:t>$ </a:t>
+            </a:r>
+            <a:r>
+              <a:rPr lang="en-US" sz="2400" b="1" dirty="0" err="1">
+                <a:solidFill>
+                  <a:schemeClr val="bg1"/>
+                </a:solidFill>
+                <a:latin typeface="Courier New" pitchFamily="49" charset="0"/>
+                <a:cs typeface="Courier New" pitchFamily="49" charset="0"/>
+              </a:rPr>
+              <a:t>nextflow</a:t>
+            </a:r>
+            <a:r>
+              <a:rPr lang="en-US" sz="2400" b="1" dirty="0">
+                <a:solidFill>
+                  <a:schemeClr val="bg1"/>
+                </a:solidFill>
+                <a:latin typeface="Courier New" pitchFamily="49" charset="0"/>
+                <a:cs typeface="Courier New" pitchFamily="49" charset="0"/>
+              </a:rPr>
+              <a:t> -C </a:t>
+            </a:r>
+            <a:r>
+              <a:rPr lang="en-US" sz="2400" b="1" dirty="0" err="1">
+                <a:solidFill>
+                  <a:schemeClr val="bg1"/>
+                </a:solidFill>
+                <a:latin typeface="Courier New" pitchFamily="49" charset="0"/>
+                <a:cs typeface="Courier New" pitchFamily="49" charset="0"/>
+              </a:rPr>
+              <a:t>nextflow_custom.config</a:t>
+            </a:r>
+            <a:r>
+              <a:rPr lang="en-US" sz="2400" b="1" dirty="0">
+                <a:solidFill>
+                  <a:schemeClr val="bg1"/>
+                </a:solidFill>
+                <a:latin typeface="Courier New" pitchFamily="49" charset="0"/>
+                <a:cs typeface="Courier New" pitchFamily="49" charset="0"/>
+              </a:rPr>
+              <a:t> run workflow.nf</a:t>
+            </a:r>
+            <a:endParaRPr lang="nl-BE" sz="2400" b="1" dirty="0">
+              <a:solidFill>
+                <a:schemeClr val="bg1"/>
+              </a:solidFill>
+              <a:latin typeface="Courier New" pitchFamily="49" charset="0"/>
+              <a:cs typeface="Courier New" pitchFamily="49" charset="0"/>
+            </a:endParaRPr>
+          </a:p>
+        </p:txBody>
+      </p:sp>
+    </p:spTree>
+    <p:extLst>
+      <p:ext uri="{BB962C8B-B14F-4D97-AF65-F5344CB8AC3E}">
+        <p14:creationId xmlns:p14="http://schemas.microsoft.com/office/powerpoint/2010/main" val="1476506116"/>
+      </p:ext>
+    </p:extLst>
+  </p:cSld>
+  <p:clrMapOvr>
+    <a:masterClrMapping/>
+  </p:clrMapOvr>
+  <p:timing>
+    <p:tnLst>
+      <p:par>
+        <p:cTn id="1" dur="indefinite" restart="never" nodeType="tmRoot">
+          <p:childTnLst>
+            <p:seq concurrent="1" nextAc="seek">
+              <p:cTn id="2" dur="indefinite" nodeType="mainSeq">
+                <p:childTnLst>
+                  <p:par>
+                    <p:cTn id="3" fill="hold">
+                      <p:stCondLst>
+                        <p:cond delay="indefinite"/>
+                        <p:cond evt="onBegin" delay="0">
+                          <p:tn val="2"/>
+                        </p:cond>
+                      </p:stCondLst>
+                      <p:childTnLst>
+                        <p:par>
+                          <p:cTn id="4" fill="hold">
+                            <p:stCondLst>
+                              <p:cond delay="0"/>
+                            </p:stCondLst>
+                            <p:childTnLst>
+                              <p:par>
+                                <p:cTn id="5" presetID="1" presetClass="entr" presetSubtype="0" fill="hold" grpId="0" nodeType="withEffect">
+                                  <p:stCondLst>
+                                    <p:cond delay="0"/>
+                                  </p:stCondLst>
+                                  <p:childTnLst>
+                                    <p:set>
+                                      <p:cBhvr>
+                                        <p:cTn id="6" dur="1" fill="hold">
+                                          <p:stCondLst>
+                                            <p:cond delay="0"/>
+                                          </p:stCondLst>
+                                        </p:cTn>
+                                        <p:tgtEl>
+                                          <p:spTgt spid="11"/>
+                                        </p:tgtEl>
+                                        <p:attrNameLst>
+                                          <p:attrName>style.visibility</p:attrName>
+                                        </p:attrNameLst>
+                                      </p:cBhvr>
+                                      <p:to>
+                                        <p:strVal val="visible"/>
+                                      </p:to>
+                                    </p:set>
+                                  </p:childTnLst>
+                                </p:cTn>
+                              </p:par>
+                            </p:childTnLst>
+                          </p:cTn>
+                        </p:par>
+                      </p:childTnLst>
+                    </p:cTn>
+                  </p:par>
+                </p:childTnLst>
+              </p:cTn>
+              <p:prevCondLst>
+                <p:cond evt="onPrev" delay="0">
+                  <p:tgtEl>
+                    <p:sldTgt/>
+                  </p:tgtEl>
+                </p:cond>
+              </p:prevCondLst>
+              <p:nextCondLst>
+                <p:cond evt="onNext" delay="0">
+                  <p:tgtEl>
+                    <p:sldTgt/>
+                  </p:tgtEl>
+                </p:cond>
+              </p:nextCondLst>
+            </p:seq>
+          </p:childTnLst>
+        </p:cTn>
+      </p:par>
+    </p:tnLst>
+    <p:bldLst>
+      <p:bldP spid="11" grpId="0" animBg="1"/>
+    </p:bldLst>
+  </p:timing>
+</p:sld>
+</file>
+
+<file path=ppt/slides/slide58.xml><?xml version="1.0" encoding="utf-8"?>
+<p:sld xmlns:a="http://schemas.openxmlformats.org/drawingml/2006/main" xmlns:r="http://schemas.openxmlformats.org/officeDocument/2006/relationships" xmlns:p="http://schemas.openxmlformats.org/presentationml/2006/main">
+  <p:cSld>
+    <p:spTree>
+      <p:nvGrpSpPr>
+        <p:cNvPr id="1" name=""/>
+        <p:cNvGrpSpPr/>
+        <p:nvPr/>
+      </p:nvGrpSpPr>
+      <p:grpSpPr>
+        <a:xfrm>
+          <a:off x="0" y="0"/>
+          <a:ext cx="0" cy="0"/>
+          <a:chOff x="0" y="0"/>
+          <a:chExt cx="0" cy="0"/>
+        </a:xfrm>
+      </p:grpSpPr>
+      <p:sp>
+        <p:nvSpPr>
+          <p:cNvPr id="2" name="Title 1">
+            <a:extLst>
+              <a:ext uri="{FF2B5EF4-FFF2-40B4-BE49-F238E27FC236}">
+                <a16:creationId xmlns:a16="http://schemas.microsoft.com/office/drawing/2014/main" id="{BCBA5D33-224D-0FE8-34AD-912FB5B45C2A}"/>
+              </a:ext>
+            </a:extLst>
+          </p:cNvPr>
+          <p:cNvSpPr>
+            <a:spLocks noGrp="1"/>
+          </p:cNvSpPr>
+          <p:nvPr>
+            <p:ph type="title"/>
+          </p:nvPr>
+        </p:nvSpPr>
+        <p:spPr/>
+        <p:txBody>
+          <a:bodyPr/>
+          <a:lstStyle/>
+          <a:p>
+            <a:r>
+              <a:rPr lang="en-US" dirty="0" err="1"/>
+              <a:t>Nextflow</a:t>
+            </a:r>
+            <a:r>
+              <a:rPr lang="en-US" dirty="0"/>
+              <a:t> features</a:t>
+            </a:r>
+            <a:endParaRPr lang="LID4096" dirty="0"/>
+          </a:p>
+        </p:txBody>
+      </p:sp>
+      <p:sp>
+        <p:nvSpPr>
+          <p:cNvPr id="3" name="Content Placeholder 2">
+            <a:extLst>
+              <a:ext uri="{FF2B5EF4-FFF2-40B4-BE49-F238E27FC236}">
+                <a16:creationId xmlns:a16="http://schemas.microsoft.com/office/drawing/2014/main" id="{C8C16FD0-A026-5FDA-29F1-F9D33312AD5A}"/>
+              </a:ext>
+            </a:extLst>
+          </p:cNvPr>
+          <p:cNvSpPr>
+            <a:spLocks noGrp="1"/>
+          </p:cNvSpPr>
+          <p:nvPr>
+            <p:ph idx="1"/>
+          </p:nvPr>
+        </p:nvSpPr>
+        <p:spPr/>
+        <p:txBody>
+          <a:bodyPr>
+            <a:normAutofit/>
+          </a:bodyPr>
+          <a:lstStyle/>
+          <a:p>
+            <a:r>
+              <a:rPr lang="en-US" dirty="0"/>
+              <a:t>Resume interrupted/failed workflows</a:t>
+            </a:r>
+          </a:p>
+          <a:p>
+            <a:r>
+              <a:rPr lang="en-US" dirty="0"/>
+              <a:t>Many executors: </a:t>
+            </a:r>
+            <a:r>
+              <a:rPr lang="en-US" dirty="0">
+                <a:latin typeface="Courier New" panose="02070309020205020404" pitchFamily="49" charset="0"/>
+                <a:cs typeface="Courier New" panose="02070309020205020404" pitchFamily="49" charset="0"/>
+              </a:rPr>
+              <a:t>local</a:t>
+            </a:r>
+            <a:r>
+              <a:rPr lang="en-US" dirty="0"/>
+              <a:t> (default), </a:t>
+            </a:r>
+            <a:r>
+              <a:rPr lang="en-US" dirty="0" err="1">
+                <a:latin typeface="Courier New" panose="02070309020205020404" pitchFamily="49" charset="0"/>
+                <a:cs typeface="Courier New" panose="02070309020205020404" pitchFamily="49" charset="0"/>
+              </a:rPr>
+              <a:t>slurm</a:t>
+            </a:r>
+            <a:r>
+              <a:rPr lang="en-US" dirty="0"/>
+              <a:t>, </a:t>
+            </a:r>
+            <a:r>
+              <a:rPr lang="en-US" dirty="0" err="1">
+                <a:latin typeface="Courier New" panose="02070309020205020404" pitchFamily="49" charset="0"/>
+                <a:cs typeface="Courier New" panose="02070309020205020404" pitchFamily="49" charset="0"/>
+              </a:rPr>
+              <a:t>awsbatch</a:t>
+            </a:r>
+            <a:r>
+              <a:rPr lang="en-US" dirty="0"/>
+              <a:t>, ...</a:t>
+            </a:r>
+          </a:p>
+          <a:p>
+            <a:r>
+              <a:rPr lang="en-US" dirty="0"/>
+              <a:t>Portable workflows: tailor to executor via config files</a:t>
+            </a:r>
+          </a:p>
+          <a:p>
+            <a:r>
+              <a:rPr lang="en-US" dirty="0"/>
+              <a:t>Support for</a:t>
+            </a:r>
+          </a:p>
+          <a:p>
+            <a:pPr lvl="1"/>
+            <a:r>
+              <a:rPr lang="en-US" dirty="0"/>
+              <a:t>Conda environments</a:t>
+            </a:r>
+          </a:p>
+          <a:p>
+            <a:pPr lvl="1"/>
+            <a:r>
+              <a:rPr lang="en-US" dirty="0"/>
+              <a:t>Containers (</a:t>
+            </a:r>
+            <a:r>
+              <a:rPr lang="en-US" dirty="0" err="1"/>
+              <a:t>Apptainer</a:t>
+            </a:r>
+            <a:r>
+              <a:rPr lang="en-US" dirty="0"/>
+              <a:t>, </a:t>
+            </a:r>
+            <a:r>
+              <a:rPr lang="en-US" dirty="0" err="1"/>
+              <a:t>Podman</a:t>
+            </a:r>
+            <a:r>
+              <a:rPr lang="en-US" dirty="0"/>
+              <a:t>, ...)</a:t>
+            </a:r>
+          </a:p>
+          <a:p>
+            <a:pPr lvl="1"/>
+            <a:r>
+              <a:rPr lang="en-US" dirty="0"/>
+              <a:t>Spack</a:t>
+            </a:r>
+          </a:p>
+          <a:p>
+            <a:r>
+              <a:rPr lang="en-US" dirty="0"/>
+              <a:t>Version control: reproducible</a:t>
+            </a:r>
+            <a:endParaRPr lang="LID4096" dirty="0"/>
+          </a:p>
+        </p:txBody>
+      </p:sp>
+      <p:sp>
+        <p:nvSpPr>
+          <p:cNvPr id="4" name="Slide Number Placeholder 3">
+            <a:extLst>
+              <a:ext uri="{FF2B5EF4-FFF2-40B4-BE49-F238E27FC236}">
+                <a16:creationId xmlns:a16="http://schemas.microsoft.com/office/drawing/2014/main" id="{8CECA83A-44EC-FEC8-ABFC-549B2B3D09B7}"/>
+              </a:ext>
+            </a:extLst>
+          </p:cNvPr>
+          <p:cNvSpPr>
+            <a:spLocks noGrp="1"/>
+          </p:cNvSpPr>
+          <p:nvPr>
+            <p:ph type="sldNum" sz="quarter" idx="12"/>
+          </p:nvPr>
+        </p:nvSpPr>
+        <p:spPr/>
+        <p:txBody>
+          <a:bodyPr/>
+          <a:lstStyle/>
+          <a:p>
+            <a:fld id="{9C7CE217-4467-4B8D-A735-B008FA7C4816}" type="slidenum">
+              <a:rPr lang="LID4096" smtClean="0"/>
+              <a:t>58</a:t>
+            </a:fld>
+            <a:endParaRPr lang="LID4096"/>
+          </a:p>
+        </p:txBody>
+      </p:sp>
+      <p:grpSp>
+        <p:nvGrpSpPr>
+          <p:cNvPr id="5" name="Group 4">
+            <a:extLst>
+              <a:ext uri="{FF2B5EF4-FFF2-40B4-BE49-F238E27FC236}">
+                <a16:creationId xmlns:a16="http://schemas.microsoft.com/office/drawing/2014/main" id="{001811E5-D984-89CF-5B76-E75CD3E56BB5}"/>
+              </a:ext>
+            </a:extLst>
+          </p:cNvPr>
+          <p:cNvGrpSpPr/>
+          <p:nvPr/>
+        </p:nvGrpSpPr>
+        <p:grpSpPr>
+          <a:xfrm>
+            <a:off x="6611745" y="3429000"/>
+            <a:ext cx="3587313" cy="1329162"/>
+            <a:chOff x="6992377" y="5514655"/>
+            <a:chExt cx="3587313" cy="1329162"/>
+          </a:xfrm>
+        </p:grpSpPr>
+        <p:sp>
+          <p:nvSpPr>
+            <p:cNvPr id="6" name="TextBox 5">
+              <a:extLst>
+                <a:ext uri="{FF2B5EF4-FFF2-40B4-BE49-F238E27FC236}">
+                  <a16:creationId xmlns:a16="http://schemas.microsoft.com/office/drawing/2014/main" id="{0AB64EBC-5692-7E00-62F5-13C6360DB7E4}"/>
+                </a:ext>
+              </a:extLst>
+            </p:cNvPr>
+            <p:cNvSpPr txBox="1"/>
+            <p:nvPr/>
+          </p:nvSpPr>
+          <p:spPr>
+            <a:xfrm>
+              <a:off x="6992377" y="5889710"/>
+              <a:ext cx="3348684" cy="954107"/>
+            </a:xfrm>
+            <a:prstGeom prst="rect">
+              <a:avLst/>
+            </a:prstGeom>
+            <a:noFill/>
+            <a:ln>
+              <a:solidFill>
+                <a:schemeClr val="tx1"/>
+              </a:solidFill>
+            </a:ln>
+          </p:spPr>
+          <p:txBody>
+            <a:bodyPr wrap="square" rtlCol="0">
+              <a:spAutoFit/>
+            </a:bodyPr>
+            <a:lstStyle/>
+            <a:p>
+              <a:r>
+                <a:rPr lang="en-US" sz="2800" dirty="0"/>
+                <a:t>HPC systems:</a:t>
+              </a:r>
+              <a:br>
+                <a:rPr lang="en-US" sz="2800" dirty="0"/>
+              </a:br>
+              <a:r>
+                <a:rPr lang="en-US" sz="2800" dirty="0"/>
+                <a:t>build on login node!</a:t>
+              </a:r>
+              <a:endParaRPr lang="LID4096" sz="2800" dirty="0"/>
+            </a:p>
+          </p:txBody>
+        </p:sp>
+        <p:pic>
+          <p:nvPicPr>
+            <p:cNvPr id="7" name="Picture 2" descr="C:\Users\lucg5005\AppData\Local\Microsoft\Windows\Temporary Internet Files\Content.IE5\CWZUAEH4\lgi01a201309290600[1].jpg">
+              <a:extLst>
+                <a:ext uri="{FF2B5EF4-FFF2-40B4-BE49-F238E27FC236}">
+                  <a16:creationId xmlns:a16="http://schemas.microsoft.com/office/drawing/2014/main" id="{6BC329F5-71AA-C5D0-FC57-FFF87277A645}"/>
+                </a:ext>
+              </a:extLst>
+            </p:cNvPr>
+            <p:cNvPicPr>
+              <a:picLocks noChangeAspect="1" noChangeArrowheads="1"/>
+            </p:cNvPicPr>
+            <p:nvPr/>
+          </p:nvPicPr>
+          <p:blipFill>
+            <a:blip r:embed="rId2" cstate="print">
+              <a:extLst>
+                <a:ext uri="{28A0092B-C50C-407E-A947-70E740481C1C}">
+                  <a14:useLocalDpi xmlns:a14="http://schemas.microsoft.com/office/drawing/2010/main" val="0"/>
+                </a:ext>
+              </a:extLst>
+            </a:blip>
+            <a:srcRect/>
+            <a:stretch>
+              <a:fillRect/>
+            </a:stretch>
+          </p:blipFill>
+          <p:spPr bwMode="auto">
+            <a:xfrm>
+              <a:off x="9848635" y="5514655"/>
+              <a:ext cx="731055" cy="750110"/>
+            </a:xfrm>
+            <a:prstGeom prst="rect">
+              <a:avLst/>
+            </a:prstGeom>
+            <a:noFill/>
+            <a:extLst>
+              <a:ext uri="{909E8E84-426E-40DD-AFC4-6F175D3DCCD1}">
+                <a14:hiddenFill xmlns:a14="http://schemas.microsoft.com/office/drawing/2010/main">
+                  <a:solidFill>
+                    <a:srgbClr val="FFFFFF"/>
+                  </a:solidFill>
+                </a14:hiddenFill>
+              </a:ext>
+            </a:extLst>
+          </p:spPr>
+        </p:pic>
+      </p:grpSp>
+    </p:spTree>
+    <p:extLst>
+      <p:ext uri="{BB962C8B-B14F-4D97-AF65-F5344CB8AC3E}">
+        <p14:creationId xmlns:p14="http://schemas.microsoft.com/office/powerpoint/2010/main" val="2210551090"/>
       </p:ext>
     </p:extLst>
   </p:cSld>

</xml_diff>